<commit_message>
Updates to part 2
</commit_message>
<xml_diff>
--- a/slides/advanced_part2.pptx
+++ b/slides/advanced_part2.pptx
@@ -16,8 +16,8 @@
     <p:sldId id="265" r:id="rId10"/>
     <p:sldId id="266" r:id="rId11"/>
     <p:sldId id="267" r:id="rId12"/>
-    <p:sldId id="268" r:id="rId13"/>
-    <p:sldId id="269" r:id="rId14"/>
+    <p:sldId id="269" r:id="rId13"/>
+    <p:sldId id="268" r:id="rId14"/>
     <p:sldId id="270" r:id="rId15"/>
     <p:sldId id="271" r:id="rId16"/>
     <p:sldId id="272" r:id="rId17"/>
@@ -308,7 +308,7 @@
           <a:p>
             <a:fld id="{D735EA19-98D7-5F47-83EC-D97C4239F8D5}" type="datetimeFigureOut">
               <a:rPr lang="en-US" smtClean="0"/>
-              <a:t>05/05/15</a:t>
+              <a:t>06/05/15</a:t>
             </a:fld>
             <a:endParaRPr lang="en-GB"/>
           </a:p>
@@ -478,7 +478,7 @@
           <a:p>
             <a:fld id="{D735EA19-98D7-5F47-83EC-D97C4239F8D5}" type="datetimeFigureOut">
               <a:rPr lang="en-US" smtClean="0"/>
-              <a:t>05/05/15</a:t>
+              <a:t>06/05/15</a:t>
             </a:fld>
             <a:endParaRPr lang="en-GB"/>
           </a:p>
@@ -658,7 +658,7 @@
           <a:p>
             <a:fld id="{D735EA19-98D7-5F47-83EC-D97C4239F8D5}" type="datetimeFigureOut">
               <a:rPr lang="en-US" smtClean="0"/>
-              <a:t>05/05/15</a:t>
+              <a:t>06/05/15</a:t>
             </a:fld>
             <a:endParaRPr lang="en-GB"/>
           </a:p>
@@ -828,7 +828,7 @@
           <a:p>
             <a:fld id="{D735EA19-98D7-5F47-83EC-D97C4239F8D5}" type="datetimeFigureOut">
               <a:rPr lang="en-US" smtClean="0"/>
-              <a:t>05/05/15</a:t>
+              <a:t>06/05/15</a:t>
             </a:fld>
             <a:endParaRPr lang="en-GB"/>
           </a:p>
@@ -1074,7 +1074,7 @@
           <a:p>
             <a:fld id="{D735EA19-98D7-5F47-83EC-D97C4239F8D5}" type="datetimeFigureOut">
               <a:rPr lang="en-US" smtClean="0"/>
-              <a:t>05/05/15</a:t>
+              <a:t>06/05/15</a:t>
             </a:fld>
             <a:endParaRPr lang="en-GB"/>
           </a:p>
@@ -1362,7 +1362,7 @@
           <a:p>
             <a:fld id="{D735EA19-98D7-5F47-83EC-D97C4239F8D5}" type="datetimeFigureOut">
               <a:rPr lang="en-US" smtClean="0"/>
-              <a:t>05/05/15</a:t>
+              <a:t>06/05/15</a:t>
             </a:fld>
             <a:endParaRPr lang="en-GB"/>
           </a:p>
@@ -1784,7 +1784,7 @@
           <a:p>
             <a:fld id="{D735EA19-98D7-5F47-83EC-D97C4239F8D5}" type="datetimeFigureOut">
               <a:rPr lang="en-US" smtClean="0"/>
-              <a:t>05/05/15</a:t>
+              <a:t>06/05/15</a:t>
             </a:fld>
             <a:endParaRPr lang="en-GB"/>
           </a:p>
@@ -1902,7 +1902,7 @@
           <a:p>
             <a:fld id="{D735EA19-98D7-5F47-83EC-D97C4239F8D5}" type="datetimeFigureOut">
               <a:rPr lang="en-US" smtClean="0"/>
-              <a:t>05/05/15</a:t>
+              <a:t>06/05/15</a:t>
             </a:fld>
             <a:endParaRPr lang="en-GB"/>
           </a:p>
@@ -1997,7 +1997,7 @@
           <a:p>
             <a:fld id="{D735EA19-98D7-5F47-83EC-D97C4239F8D5}" type="datetimeFigureOut">
               <a:rPr lang="en-US" smtClean="0"/>
-              <a:t>05/05/15</a:t>
+              <a:t>06/05/15</a:t>
             </a:fld>
             <a:endParaRPr lang="en-GB"/>
           </a:p>
@@ -2274,7 +2274,7 @@
           <a:p>
             <a:fld id="{D735EA19-98D7-5F47-83EC-D97C4239F8D5}" type="datetimeFigureOut">
               <a:rPr lang="en-US" smtClean="0"/>
-              <a:t>05/05/15</a:t>
+              <a:t>06/05/15</a:t>
             </a:fld>
             <a:endParaRPr lang="en-GB"/>
           </a:p>
@@ -2527,7 +2527,7 @@
           <a:p>
             <a:fld id="{D735EA19-98D7-5F47-83EC-D97C4239F8D5}" type="datetimeFigureOut">
               <a:rPr lang="en-US" smtClean="0"/>
-              <a:t>05/05/15</a:t>
+              <a:t>06/05/15</a:t>
             </a:fld>
             <a:endParaRPr lang="en-GB"/>
           </a:p>
@@ -2740,7 +2740,7 @@
           <a:p>
             <a:fld id="{D735EA19-98D7-5F47-83EC-D97C4239F8D5}" type="datetimeFigureOut">
               <a:rPr lang="en-US" smtClean="0"/>
-              <a:t>05/05/15</a:t>
+              <a:t>06/05/15</a:t>
             </a:fld>
             <a:endParaRPr lang="en-GB"/>
           </a:p>
@@ -3132,7 +3132,23 @@
           <a:p>
             <a:r>
               <a:rPr lang="en-GB" dirty="0" smtClean="0"/>
-              <a:t>Advanced Topics in OpenCL – Kernel Issues</a:t>
+              <a:t>Advanced </a:t>
+            </a:r>
+            <a:r>
+              <a:rPr lang="en-GB" dirty="0" err="1" smtClean="0"/>
+              <a:t>OpenCL</a:t>
+            </a:r>
+            <a:r>
+              <a:rPr lang="en-GB" dirty="0" smtClean="0"/>
+              <a:t> Topics – </a:t>
+            </a:r>
+            <a:r>
+              <a:rPr lang="en-GB" dirty="0" smtClean="0"/>
+              <a:t>Kernel </a:t>
+            </a:r>
+            <a:r>
+              <a:rPr lang="en-GB" dirty="0" smtClean="0"/>
+              <a:t>Compilation</a:t>
             </a:r>
             <a:endParaRPr lang="en-GB" dirty="0"/>
           </a:p>
@@ -3159,7 +3175,7 @@
                   <a:schemeClr val="tx1"/>
                 </a:solidFill>
               </a:rPr>
-              <a:t>Lecture 10</a:t>
+              <a:t>Part 2</a:t>
             </a:r>
             <a:endParaRPr lang="en-GB" dirty="0">
               <a:solidFill>
@@ -4162,6 +4178,14 @@
   <p:clrMapOvr>
     <a:masterClrMapping/>
   </p:clrMapOvr>
+  <mc:AlternateContent xmlns:mc="http://schemas.openxmlformats.org/markup-compatibility/2006">
+    <mc:Choice xmlns:p14="http://schemas.microsoft.com/office/powerpoint/2010/main" Requires="p14">
+      <p:transition spd="slow" p14:dur="2000"/>
+    </mc:Choice>
+    <mc:Fallback>
+      <p:transition xmlns:p14="http://schemas.microsoft.com/office/powerpoint/2010/main" spd="slow"/>
+    </mc:Fallback>
+  </mc:AlternateContent>
   <p:timing>
     <p:tnLst>
       <p:par>
@@ -4225,7 +4249,7 @@
         <p:spPr/>
         <p:txBody>
           <a:bodyPr>
-            <a:normAutofit fontScale="92500" lnSpcReduction="20000"/>
+            <a:normAutofit fontScale="92500" lnSpcReduction="10000"/>
           </a:bodyPr>
           <a:lstStyle/>
           <a:p>
@@ -4237,7 +4261,45 @@
           <a:p>
             <a:r>
               <a:rPr lang="en-GB" dirty="0" smtClean="0"/>
-              <a:t>On NVIDIA platforms the ‘binary’ retrieved from </a:t>
+              <a:t>On NVIDIA platforms the ‘binary’ retrieved </a:t>
+            </a:r>
+            <a:r>
+              <a:rPr lang="en-GB" dirty="0" smtClean="0"/>
+              <a:t>is </a:t>
+            </a:r>
+            <a:r>
+              <a:rPr lang="en-GB" dirty="0" smtClean="0"/>
+              <a:t>actually PTX, their abstract assembly language</a:t>
+            </a:r>
+          </a:p>
+          <a:p>
+            <a:r>
+              <a:rPr lang="en-GB" dirty="0" smtClean="0"/>
+              <a:t>On AMD platforms you can add </a:t>
+            </a:r>
+            <a:r>
+              <a:rPr lang="en-GB" b="1" dirty="0" smtClean="0">
+                <a:solidFill>
+                  <a:srgbClr val="3366FF"/>
+                </a:solidFill>
+                <a:latin typeface="Courier New"/>
+                <a:cs typeface="Courier New"/>
+              </a:rPr>
+              <a:t>–save-temps</a:t>
+            </a:r>
+            <a:r>
+              <a:rPr lang="en-GB" dirty="0" smtClean="0"/>
+              <a:t> to the build options to generate </a:t>
+            </a:r>
+            <a:r>
+              <a:rPr lang="en-GB" b="1" dirty="0" smtClean="0">
+                <a:solidFill>
+                  <a:srgbClr val="3366FF"/>
+                </a:solidFill>
+                <a:latin typeface="Courier New"/>
+                <a:cs typeface="Courier New"/>
+              </a:rPr>
+              <a:t>.</a:t>
             </a:r>
             <a:r>
               <a:rPr lang="en-GB" b="1" dirty="0" err="1" smtClean="0">
@@ -4247,35 +4309,19 @@
                 <a:latin typeface="Courier New"/>
                 <a:cs typeface="Courier New"/>
               </a:rPr>
-              <a:t>clGetProgramInfo</a:t>
+              <a:t>il</a:t>
             </a:r>
             <a:r>
               <a:rPr lang="en-GB" b="1" dirty="0" smtClean="0">
                 <a:solidFill>
                   <a:srgbClr val="3366FF"/>
                 </a:solidFill>
-                <a:latin typeface="Courier New"/>
-                <a:cs typeface="Courier New"/>
-              </a:rPr>
-              <a:t>()</a:t>
-            </a:r>
-            <a:r>
-              <a:rPr lang="en-GB" dirty="0" smtClean="0">
-                <a:solidFill>
-                  <a:srgbClr val="3366FF"/>
-                </a:solidFill>
               </a:rPr>
               <a:t> </a:t>
             </a:r>
             <a:r>
               <a:rPr lang="en-GB" dirty="0" smtClean="0"/>
-              <a:t>is actually PTX, their abstract assembly language</a:t>
-            </a:r>
-          </a:p>
-          <a:p>
-            <a:r>
-              <a:rPr lang="en-GB" dirty="0" smtClean="0"/>
-              <a:t>On AMD platforms you can add </a:t>
+              <a:t>and </a:t>
             </a:r>
             <a:r>
               <a:rPr lang="en-GB" b="1" dirty="0" smtClean="0">
@@ -4285,20 +4331,6 @@
                 <a:latin typeface="Courier New"/>
                 <a:cs typeface="Courier New"/>
               </a:rPr>
-              <a:t>–save-temps</a:t>
-            </a:r>
-            <a:r>
-              <a:rPr lang="en-GB" dirty="0" smtClean="0"/>
-              <a:t> to the build options to generate </a:t>
-            </a:r>
-            <a:r>
-              <a:rPr lang="en-GB" b="1" dirty="0" smtClean="0">
-                <a:solidFill>
-                  <a:srgbClr val="3366FF"/>
-                </a:solidFill>
-                <a:latin typeface="Courier New"/>
-                <a:cs typeface="Courier New"/>
-              </a:rPr>
               <a:t>.</a:t>
             </a:r>
             <a:r>
@@ -4309,38 +4341,6 @@
                 <a:latin typeface="Courier New"/>
                 <a:cs typeface="Courier New"/>
               </a:rPr>
-              <a:t>il</a:t>
-            </a:r>
-            <a:r>
-              <a:rPr lang="en-GB" b="1" dirty="0" smtClean="0">
-                <a:solidFill>
-                  <a:srgbClr val="3366FF"/>
-                </a:solidFill>
-              </a:rPr>
-              <a:t> </a:t>
-            </a:r>
-            <a:r>
-              <a:rPr lang="en-GB" dirty="0" smtClean="0"/>
-              <a:t>and </a:t>
-            </a:r>
-            <a:r>
-              <a:rPr lang="en-GB" b="1" dirty="0" smtClean="0">
-                <a:solidFill>
-                  <a:srgbClr val="3366FF"/>
-                </a:solidFill>
-                <a:latin typeface="Courier New"/>
-                <a:cs typeface="Courier New"/>
-              </a:rPr>
-              <a:t>.</a:t>
-            </a:r>
-            <a:r>
-              <a:rPr lang="en-GB" b="1" dirty="0" err="1" smtClean="0">
-                <a:solidFill>
-                  <a:srgbClr val="3366FF"/>
-                </a:solidFill>
-                <a:latin typeface="Courier New"/>
-                <a:cs typeface="Courier New"/>
-              </a:rPr>
               <a:t>isa</a:t>
             </a:r>
             <a:r>
@@ -4351,7 +4351,27 @@
           <a:p>
             <a:r>
               <a:rPr lang="en-GB" dirty="0" smtClean="0"/>
-              <a:t>Intel provide an offline compiler which can generate LLVM/SPIR or x86 assembly</a:t>
+              <a:t>Other vendors may </a:t>
+            </a:r>
+            <a:r>
+              <a:rPr lang="en-GB" dirty="0" smtClean="0"/>
+              <a:t>provide </a:t>
+            </a:r>
+            <a:r>
+              <a:rPr lang="en-GB" dirty="0" smtClean="0"/>
+              <a:t>an offline compiler </a:t>
+            </a:r>
+            <a:r>
+              <a:rPr lang="en-GB" dirty="0" smtClean="0"/>
+              <a:t>which </a:t>
+            </a:r>
+            <a:r>
+              <a:rPr lang="en-GB" dirty="0" smtClean="0"/>
+              <a:t>can generate LLVM/SPIR </a:t>
+            </a:r>
+            <a:r>
+              <a:rPr lang="en-GB" dirty="0" smtClean="0"/>
+              <a:t>or assembly</a:t>
             </a:r>
             <a:endParaRPr lang="en-GB" dirty="0"/>
           </a:p>
@@ -4430,259 +4450,34 @@
         <p:spPr/>
         <p:txBody>
           <a:bodyPr>
-            <a:normAutofit fontScale="77500" lnSpcReduction="20000"/>
+            <a:normAutofit/>
           </a:bodyPr>
           <a:lstStyle/>
           <a:p>
             <a:r>
               <a:rPr lang="en-GB" dirty="0" smtClean="0"/>
-              <a:t>We can query a program object for the names of all the kernels that it contains:</a:t>
-            </a:r>
-          </a:p>
-          <a:p>
-            <a:pPr marL="400050" lvl="1" indent="0">
-              <a:buNone/>
-            </a:pPr>
-            <a:r>
-              <a:rPr lang="en-GB" b="1" dirty="0" err="1" smtClean="0">
-                <a:solidFill>
-                  <a:srgbClr val="3366FF"/>
-                </a:solidFill>
-                <a:latin typeface="Courier New"/>
-                <a:cs typeface="Courier New"/>
-              </a:rPr>
-              <a:t>clGetProgramInfo</a:t>
-            </a:r>
-            <a:r>
-              <a:rPr lang="en-GB" b="1" dirty="0" smtClean="0">
-                <a:solidFill>
-                  <a:srgbClr val="3366FF"/>
-                </a:solidFill>
-                <a:latin typeface="Courier New"/>
-                <a:cs typeface="Courier New"/>
-              </a:rPr>
-              <a:t>(…,</a:t>
-            </a:r>
-          </a:p>
-          <a:p>
-            <a:pPr marL="400050" lvl="1" indent="0">
-              <a:buNone/>
-            </a:pPr>
-            <a:r>
-              <a:rPr lang="en-GB" b="1" dirty="0" smtClean="0">
-                <a:solidFill>
-                  <a:srgbClr val="3366FF"/>
-                </a:solidFill>
-                <a:latin typeface="Courier New"/>
-                <a:cs typeface="Courier New"/>
-              </a:rPr>
-              <a:t>    CL_PROGRAM_NUM_KERNELS, …);</a:t>
-            </a:r>
-          </a:p>
-          <a:p>
-            <a:pPr marL="400050" lvl="1" indent="0">
-              <a:buNone/>
-            </a:pPr>
-            <a:r>
-              <a:rPr lang="en-GB" b="1" dirty="0" err="1" smtClean="0">
-                <a:solidFill>
-                  <a:srgbClr val="3366FF"/>
-                </a:solidFill>
-                <a:latin typeface="Courier New"/>
-                <a:cs typeface="Courier New"/>
-              </a:rPr>
-              <a:t>clGetProgramInfo</a:t>
-            </a:r>
-            <a:r>
-              <a:rPr lang="en-GB" b="1" dirty="0">
-                <a:solidFill>
-                  <a:srgbClr val="3366FF"/>
-                </a:solidFill>
-                <a:latin typeface="Courier New"/>
-                <a:cs typeface="Courier New"/>
-              </a:rPr>
-              <a:t>(…</a:t>
-            </a:r>
-            <a:r>
-              <a:rPr lang="en-GB" b="1" dirty="0" smtClean="0">
-                <a:solidFill>
-                  <a:srgbClr val="3366FF"/>
-                </a:solidFill>
-                <a:latin typeface="Courier New"/>
-                <a:cs typeface="Courier New"/>
-              </a:rPr>
-              <a:t>,</a:t>
-            </a:r>
-          </a:p>
-          <a:p>
-            <a:pPr marL="400050" lvl="1" indent="0">
-              <a:buNone/>
-            </a:pPr>
-            <a:r>
-              <a:rPr lang="en-GB" b="1" dirty="0">
-                <a:solidFill>
-                  <a:srgbClr val="3366FF"/>
-                </a:solidFill>
-                <a:latin typeface="Courier New"/>
-                <a:cs typeface="Courier New"/>
-              </a:rPr>
-              <a:t> </a:t>
-            </a:r>
-            <a:r>
-              <a:rPr lang="en-GB" b="1" dirty="0" smtClean="0">
-                <a:solidFill>
-                  <a:srgbClr val="3366FF"/>
-                </a:solidFill>
-                <a:latin typeface="Courier New"/>
-                <a:cs typeface="Courier New"/>
-              </a:rPr>
-              <a:t>   CL_PROGRAM_KERNEL_NAMES, </a:t>
-            </a:r>
-            <a:r>
-              <a:rPr lang="en-GB" b="1" dirty="0">
-                <a:solidFill>
-                  <a:srgbClr val="3366FF"/>
-                </a:solidFill>
-                <a:latin typeface="Courier New"/>
-                <a:cs typeface="Courier New"/>
-              </a:rPr>
-              <a:t>…)</a:t>
-            </a:r>
-            <a:r>
-              <a:rPr lang="en-GB" b="1" dirty="0" smtClean="0">
-                <a:solidFill>
-                  <a:srgbClr val="3366FF"/>
-                </a:solidFill>
-                <a:latin typeface="Courier New"/>
-                <a:cs typeface="Courier New"/>
-              </a:rPr>
-              <a:t>;</a:t>
-            </a:r>
-          </a:p>
-          <a:p>
-            <a:r>
-              <a:rPr lang="en-GB" dirty="0" smtClean="0"/>
-              <a:t>We can also query information about kernel arguments (OpenCL 1.2):</a:t>
-            </a:r>
-          </a:p>
-          <a:p>
-            <a:pPr marL="400050" lvl="1" indent="0">
-              <a:buNone/>
-            </a:pPr>
-            <a:r>
-              <a:rPr lang="en-GB" b="1" dirty="0" err="1" smtClean="0">
-                <a:solidFill>
-                  <a:srgbClr val="3366FF"/>
-                </a:solidFill>
-                <a:latin typeface="Courier New"/>
-                <a:cs typeface="Courier New"/>
-              </a:rPr>
-              <a:t>clGetKernelInfo</a:t>
-            </a:r>
-            <a:r>
-              <a:rPr lang="en-GB" b="1" dirty="0" smtClean="0">
-                <a:solidFill>
-                  <a:srgbClr val="3366FF"/>
-                </a:solidFill>
-                <a:latin typeface="Courier New"/>
-                <a:cs typeface="Courier New"/>
-              </a:rPr>
-              <a:t>(…, CL_KERNEL_NUM_ARGS, …);</a:t>
-            </a:r>
-          </a:p>
-          <a:p>
-            <a:pPr marL="400050" lvl="1" indent="0">
-              <a:buNone/>
-            </a:pPr>
-            <a:r>
-              <a:rPr lang="en-GB" b="1" dirty="0" err="1" smtClean="0">
-                <a:solidFill>
-                  <a:srgbClr val="3366FF"/>
-                </a:solidFill>
-                <a:latin typeface="Courier New"/>
-                <a:cs typeface="Courier New"/>
-              </a:rPr>
-              <a:t>clGetKernelArgInfo</a:t>
-            </a:r>
-            <a:r>
-              <a:rPr lang="en-GB" b="1" dirty="0" smtClean="0">
-                <a:solidFill>
-                  <a:srgbClr val="3366FF"/>
-                </a:solidFill>
-                <a:latin typeface="Courier New"/>
-                <a:cs typeface="Courier New"/>
-              </a:rPr>
-              <a:t>(…, CL_KERNEL_ARG_*, …);</a:t>
-            </a:r>
-          </a:p>
-          <a:p>
-            <a:pPr marL="0" indent="0">
-              <a:buNone/>
-            </a:pPr>
-            <a:r>
-              <a:rPr lang="en-GB" dirty="0" smtClean="0">
-                <a:latin typeface="Trebuchet MS"/>
-                <a:cs typeface="Trebuchet MS"/>
-              </a:rPr>
-              <a:t>(the program should be compiled using the</a:t>
-            </a:r>
-          </a:p>
-          <a:p>
-            <a:pPr marL="0" indent="0">
-              <a:buNone/>
-            </a:pPr>
-            <a:r>
-              <a:rPr lang="en-GB" b="1" dirty="0" smtClean="0">
-                <a:solidFill>
-                  <a:srgbClr val="3366FF"/>
-                </a:solidFill>
-                <a:latin typeface="Courier New"/>
-                <a:cs typeface="Courier New"/>
-              </a:rPr>
-              <a:t>-cl-kernel-</a:t>
-            </a:r>
-            <a:r>
-              <a:rPr lang="en-GB" b="1" dirty="0" err="1" smtClean="0">
-                <a:solidFill>
-                  <a:srgbClr val="3366FF"/>
-                </a:solidFill>
-                <a:latin typeface="Courier New"/>
-                <a:cs typeface="Courier New"/>
-              </a:rPr>
-              <a:t>arg</a:t>
-            </a:r>
-            <a:r>
-              <a:rPr lang="en-GB" b="1" dirty="0" smtClean="0">
-                <a:solidFill>
-                  <a:srgbClr val="3366FF"/>
-                </a:solidFill>
-                <a:latin typeface="Courier New"/>
-                <a:cs typeface="Courier New"/>
-              </a:rPr>
-              <a:t>-info </a:t>
-            </a:r>
-            <a:r>
-              <a:rPr lang="en-GB" dirty="0" smtClean="0">
-                <a:solidFill>
-                  <a:srgbClr val="000000"/>
-                </a:solidFill>
-                <a:cs typeface="Courier New"/>
-              </a:rPr>
-              <a:t>option)</a:t>
-            </a:r>
-            <a:endParaRPr lang="en-GB" dirty="0">
-              <a:solidFill>
-                <a:srgbClr val="3366FF"/>
-              </a:solidFill>
-              <a:cs typeface="Courier New"/>
-            </a:endParaRPr>
+              <a:t>This provides a mechanism for automatically discovering and using new kernels, without having to write any new host code</a:t>
+            </a:r>
+          </a:p>
+          <a:p>
+            <a:r>
+              <a:rPr lang="en-GB" dirty="0" smtClean="0"/>
+              <a:t>Can make it much easier to add new kernels to an existing application</a:t>
+            </a:r>
+          </a:p>
+          <a:p>
+            <a:r>
+              <a:rPr lang="en-GB" dirty="0" smtClean="0"/>
+              <a:t>Provides a means for libraries and frameworks to accept additional kernels from third parties</a:t>
+            </a:r>
+            <a:endParaRPr lang="en-GB" dirty="0"/>
           </a:p>
         </p:txBody>
       </p:sp>
     </p:spTree>
     <p:extLst>
       <p:ext uri="{BB962C8B-B14F-4D97-AF65-F5344CB8AC3E}">
-        <p14:creationId xmlns:p14="http://schemas.microsoft.com/office/powerpoint/2010/main" val="3954401298"/>
+        <p14:creationId xmlns:p14="http://schemas.microsoft.com/office/powerpoint/2010/main" val="1504436268"/>
       </p:ext>
     </p:extLst>
   </p:cSld>
@@ -4749,37 +4544,323 @@
             <p:ph idx="1"/>
           </p:nvPr>
         </p:nvSpPr>
-        <p:spPr/>
+        <p:spPr>
+          <a:xfrm>
+            <a:off x="457200" y="1600200"/>
+            <a:ext cx="8686800" cy="4525963"/>
+          </a:xfrm>
+        </p:spPr>
         <p:txBody>
           <a:bodyPr>
-            <a:normAutofit/>
+            <a:normAutofit fontScale="85000" lnSpcReduction="10000"/>
           </a:bodyPr>
           <a:lstStyle/>
           <a:p>
             <a:r>
               <a:rPr lang="en-GB" dirty="0" smtClean="0"/>
-              <a:t>This provides a mechanism for automatically discovering and using new kernels, without having to write any new host code</a:t>
-            </a:r>
-          </a:p>
-          <a:p>
-            <a:r>
-              <a:rPr lang="en-GB" dirty="0" smtClean="0"/>
-              <a:t>Can make it much easier to add new kernels to an existing application</a:t>
-            </a:r>
-          </a:p>
-          <a:p>
-            <a:r>
-              <a:rPr lang="en-GB" dirty="0" smtClean="0"/>
-              <a:t>Provides a means for libraries and frameworks to accept additional kernels from third parties</a:t>
-            </a:r>
-            <a:endParaRPr lang="en-GB" dirty="0"/>
+              <a:t>We can query a program object for the names of all the kernels that it contains:</a:t>
+            </a:r>
+          </a:p>
+          <a:p>
+            <a:pPr marL="400050" lvl="1" indent="0">
+              <a:buNone/>
+            </a:pPr>
+            <a:r>
+              <a:rPr lang="en-GB" b="1" dirty="0" err="1">
+                <a:solidFill>
+                  <a:srgbClr val="3366FF"/>
+                </a:solidFill>
+                <a:latin typeface="Courier New"/>
+                <a:cs typeface="Courier New"/>
+              </a:rPr>
+              <a:t>p</a:t>
+            </a:r>
+            <a:r>
+              <a:rPr lang="en-GB" b="1" dirty="0" err="1" smtClean="0">
+                <a:solidFill>
+                  <a:srgbClr val="3366FF"/>
+                </a:solidFill>
+                <a:latin typeface="Courier New"/>
+                <a:cs typeface="Courier New"/>
+              </a:rPr>
+              <a:t>rogram.getInfo</a:t>
+            </a:r>
+            <a:r>
+              <a:rPr lang="en-GB" b="1" dirty="0">
+                <a:solidFill>
+                  <a:srgbClr val="3366FF"/>
+                </a:solidFill>
+                <a:latin typeface="Courier New"/>
+                <a:cs typeface="Courier New"/>
+              </a:rPr>
+              <a:t>&lt;</a:t>
+            </a:r>
+            <a:r>
+              <a:rPr lang="en-GB" b="1" dirty="0" smtClean="0">
+                <a:solidFill>
+                  <a:srgbClr val="3366FF"/>
+                </a:solidFill>
+                <a:latin typeface="Courier New"/>
+                <a:cs typeface="Courier New"/>
+              </a:rPr>
+              <a:t>CL_PROGRAM_NUM_KERNELS&gt;();</a:t>
+            </a:r>
+          </a:p>
+          <a:p>
+            <a:pPr marL="400050" lvl="1" indent="0">
+              <a:buNone/>
+            </a:pPr>
+            <a:r>
+              <a:rPr lang="en-GB" b="1" dirty="0" err="1">
+                <a:solidFill>
+                  <a:srgbClr val="3366FF"/>
+                </a:solidFill>
+                <a:latin typeface="Courier New"/>
+                <a:cs typeface="Courier New"/>
+              </a:rPr>
+              <a:t>program.getInfo</a:t>
+            </a:r>
+            <a:r>
+              <a:rPr lang="en-GB" b="1" dirty="0" smtClean="0">
+                <a:solidFill>
+                  <a:srgbClr val="3366FF"/>
+                </a:solidFill>
+                <a:latin typeface="Courier New"/>
+                <a:cs typeface="Courier New"/>
+              </a:rPr>
+              <a:t>&lt;CL_PROGRAM_KERNEL_NAMES&gt;(</a:t>
+            </a:r>
+            <a:r>
+              <a:rPr lang="en-GB" b="1" dirty="0">
+                <a:solidFill>
+                  <a:srgbClr val="3366FF"/>
+                </a:solidFill>
+                <a:latin typeface="Courier New"/>
+                <a:cs typeface="Courier New"/>
+              </a:rPr>
+              <a:t>)</a:t>
+            </a:r>
+            <a:r>
+              <a:rPr lang="en-GB" b="1" dirty="0" smtClean="0">
+                <a:solidFill>
+                  <a:srgbClr val="3366FF"/>
+                </a:solidFill>
+                <a:latin typeface="Courier New"/>
+                <a:cs typeface="Courier New"/>
+              </a:rPr>
+              <a:t>;</a:t>
+            </a:r>
+            <a:endParaRPr lang="en-GB" b="1" dirty="0" smtClean="0">
+              <a:solidFill>
+                <a:srgbClr val="3366FF"/>
+              </a:solidFill>
+              <a:latin typeface="Courier New"/>
+              <a:cs typeface="Courier New"/>
+            </a:endParaRPr>
+          </a:p>
+          <a:p>
+            <a:r>
+              <a:rPr lang="en-GB" dirty="0" smtClean="0"/>
+              <a:t>We can also query information about kernel arguments (</a:t>
+            </a:r>
+            <a:r>
+              <a:rPr lang="en-GB" dirty="0" err="1" smtClean="0"/>
+              <a:t>OpenCL</a:t>
+            </a:r>
+            <a:r>
+              <a:rPr lang="en-GB" dirty="0" smtClean="0"/>
+              <a:t> 1.2):</a:t>
+            </a:r>
+          </a:p>
+          <a:p>
+            <a:pPr marL="400050" lvl="1" indent="0">
+              <a:buNone/>
+            </a:pPr>
+            <a:r>
+              <a:rPr lang="en-GB" b="1" dirty="0" err="1">
+                <a:solidFill>
+                  <a:srgbClr val="3366FF"/>
+                </a:solidFill>
+                <a:latin typeface="Courier New"/>
+                <a:cs typeface="Courier New"/>
+              </a:rPr>
+              <a:t>k</a:t>
+            </a:r>
+            <a:r>
+              <a:rPr lang="en-GB" b="1" dirty="0" err="1" smtClean="0">
+                <a:solidFill>
+                  <a:srgbClr val="3366FF"/>
+                </a:solidFill>
+                <a:latin typeface="Courier New"/>
+                <a:cs typeface="Courier New"/>
+              </a:rPr>
+              <a:t>ernel.getInfo</a:t>
+            </a:r>
+            <a:r>
+              <a:rPr lang="en-GB" b="1" dirty="0" smtClean="0">
+                <a:solidFill>
+                  <a:srgbClr val="3366FF"/>
+                </a:solidFill>
+                <a:latin typeface="Courier New"/>
+                <a:cs typeface="Courier New"/>
+              </a:rPr>
+              <a:t>&lt;</a:t>
+            </a:r>
+            <a:r>
+              <a:rPr lang="en-GB" b="1" dirty="0" smtClean="0">
+                <a:solidFill>
+                  <a:srgbClr val="3366FF"/>
+                </a:solidFill>
+                <a:latin typeface="Courier New"/>
+                <a:cs typeface="Courier New"/>
+              </a:rPr>
+              <a:t>CL_KERNEL_NUM_ARGS&gt;();</a:t>
+            </a:r>
+            <a:endParaRPr lang="en-GB" b="1" dirty="0" smtClean="0">
+              <a:solidFill>
+                <a:srgbClr val="3366FF"/>
+              </a:solidFill>
+              <a:latin typeface="Courier New"/>
+              <a:cs typeface="Courier New"/>
+            </a:endParaRPr>
+          </a:p>
+          <a:p>
+            <a:pPr marL="400050" lvl="1" indent="0">
+              <a:buNone/>
+            </a:pPr>
+            <a:r>
+              <a:rPr lang="en-GB" b="1" dirty="0" err="1">
+                <a:solidFill>
+                  <a:srgbClr val="3366FF"/>
+                </a:solidFill>
+                <a:latin typeface="Courier New"/>
+                <a:cs typeface="Courier New"/>
+              </a:rPr>
+              <a:t>k</a:t>
+            </a:r>
+            <a:r>
+              <a:rPr lang="en-GB" b="1" dirty="0" err="1" smtClean="0">
+                <a:solidFill>
+                  <a:srgbClr val="3366FF"/>
+                </a:solidFill>
+                <a:latin typeface="Courier New"/>
+                <a:cs typeface="Courier New"/>
+              </a:rPr>
+              <a:t>ernel.getArgInfo</a:t>
+            </a:r>
+            <a:r>
+              <a:rPr lang="en-GB" b="1" dirty="0" smtClean="0">
+                <a:solidFill>
+                  <a:srgbClr val="3366FF"/>
+                </a:solidFill>
+                <a:latin typeface="Courier New"/>
+                <a:cs typeface="Courier New"/>
+              </a:rPr>
+              <a:t>&lt;CL_KERNEL_ARG*&gt;();</a:t>
+            </a:r>
+            <a:endParaRPr lang="en-GB" b="1" dirty="0" smtClean="0">
+              <a:solidFill>
+                <a:srgbClr val="3366FF"/>
+              </a:solidFill>
+              <a:latin typeface="Courier New"/>
+              <a:cs typeface="Courier New"/>
+            </a:endParaRPr>
+          </a:p>
+          <a:p>
+            <a:pPr marL="0" indent="0">
+              <a:buNone/>
+            </a:pPr>
+            <a:r>
+              <a:rPr lang="en-GB" dirty="0" smtClean="0">
+                <a:latin typeface="Trebuchet MS"/>
+                <a:cs typeface="Trebuchet MS"/>
+              </a:rPr>
+              <a:t>	(</a:t>
+            </a:r>
+            <a:r>
+              <a:rPr lang="en-GB" dirty="0" smtClean="0">
+                <a:latin typeface="Trebuchet MS"/>
+                <a:cs typeface="Trebuchet MS"/>
+              </a:rPr>
+              <a:t>the program should be compiled using the</a:t>
+            </a:r>
+          </a:p>
+          <a:p>
+            <a:pPr marL="0" indent="0">
+              <a:buNone/>
+            </a:pPr>
+            <a:r>
+              <a:rPr lang="en-GB" b="1" dirty="0" smtClean="0">
+                <a:solidFill>
+                  <a:srgbClr val="3366FF"/>
+                </a:solidFill>
+                <a:latin typeface="Courier New"/>
+                <a:cs typeface="Courier New"/>
+              </a:rPr>
+              <a:t>	-</a:t>
+            </a:r>
+            <a:r>
+              <a:rPr lang="en-GB" b="1" dirty="0" smtClean="0">
+                <a:solidFill>
+                  <a:srgbClr val="3366FF"/>
+                </a:solidFill>
+                <a:latin typeface="Courier New"/>
+                <a:cs typeface="Courier New"/>
+              </a:rPr>
+              <a:t>cl-kernel-</a:t>
+            </a:r>
+            <a:r>
+              <a:rPr lang="en-GB" b="1" dirty="0" err="1" smtClean="0">
+                <a:solidFill>
+                  <a:srgbClr val="3366FF"/>
+                </a:solidFill>
+                <a:latin typeface="Courier New"/>
+                <a:cs typeface="Courier New"/>
+              </a:rPr>
+              <a:t>arg</a:t>
+            </a:r>
+            <a:r>
+              <a:rPr lang="en-GB" b="1" dirty="0" smtClean="0">
+                <a:solidFill>
+                  <a:srgbClr val="3366FF"/>
+                </a:solidFill>
+                <a:latin typeface="Courier New"/>
+                <a:cs typeface="Courier New"/>
+              </a:rPr>
+              <a:t>-info </a:t>
+            </a:r>
+            <a:r>
+              <a:rPr lang="en-GB" dirty="0" smtClean="0">
+                <a:solidFill>
+                  <a:srgbClr val="000000"/>
+                </a:solidFill>
+                <a:latin typeface="Trebuchet MS"/>
+                <a:cs typeface="Trebuchet MS"/>
+              </a:rPr>
+              <a:t>option</a:t>
+            </a:r>
+            <a:r>
+              <a:rPr lang="en-GB" dirty="0" smtClean="0">
+                <a:solidFill>
+                  <a:srgbClr val="000000"/>
+                </a:solidFill>
+                <a:cs typeface="Courier New"/>
+              </a:rPr>
+              <a:t>)</a:t>
+            </a:r>
+            <a:endParaRPr lang="en-GB" dirty="0">
+              <a:solidFill>
+                <a:srgbClr val="3366FF"/>
+              </a:solidFill>
+              <a:cs typeface="Courier New"/>
+            </a:endParaRPr>
           </a:p>
         </p:txBody>
       </p:sp>
     </p:spTree>
     <p:extLst>
       <p:ext uri="{BB962C8B-B14F-4D97-AF65-F5344CB8AC3E}">
-        <p14:creationId xmlns:p14="http://schemas.microsoft.com/office/powerpoint/2010/main" val="1504436268"/>
+        <p14:creationId xmlns:p14="http://schemas.microsoft.com/office/powerpoint/2010/main" val="3954401298"/>
       </p:ext>
     </p:extLst>
   </p:cSld>
@@ -4826,7 +4907,7 @@
         <p:spPr/>
         <p:txBody>
           <a:bodyPr>
-            <a:normAutofit fontScale="90000"/>
+            <a:normAutofit/>
           </a:bodyPr>
           <a:lstStyle/>
           <a:p>
@@ -4872,7 +4953,17 @@
                 <a:latin typeface="Courier New"/>
                 <a:cs typeface="Courier New"/>
               </a:rPr>
-              <a:t>clCompileProgram</a:t>
+              <a:t>program.</a:t>
+            </a:r>
+            <a:r>
+              <a:rPr lang="en-GB" b="1" dirty="0" err="1" smtClean="0">
+                <a:solidFill>
+                  <a:srgbClr val="3366FF"/>
+                </a:solidFill>
+                <a:latin typeface="Courier New"/>
+                <a:cs typeface="Courier New"/>
+              </a:rPr>
+              <a:t>compile</a:t>
             </a:r>
             <a:r>
               <a:rPr lang="en-GB" b="1" dirty="0" smtClean="0">
@@ -4890,6 +4981,36 @@
               <a:buNone/>
             </a:pPr>
             <a:r>
+              <a:rPr lang="en-GB" b="1" dirty="0">
+                <a:solidFill>
+                  <a:srgbClr val="3366FF"/>
+                </a:solidFill>
+                <a:latin typeface="Courier New"/>
+                <a:cs typeface="Courier New"/>
+              </a:rPr>
+              <a:t>c</a:t>
+            </a:r>
+            <a:r>
+              <a:rPr lang="en-GB" b="1" dirty="0" smtClean="0">
+                <a:solidFill>
+                  <a:srgbClr val="3366FF"/>
+                </a:solidFill>
+                <a:latin typeface="Courier New"/>
+                <a:cs typeface="Courier New"/>
+              </a:rPr>
+              <a:t>l::</a:t>
+            </a:r>
+            <a:r>
+              <a:rPr lang="en-GB" b="1" dirty="0" smtClean="0">
+                <a:solidFill>
+                  <a:srgbClr val="3366FF"/>
+                </a:solidFill>
+                <a:latin typeface="Courier New"/>
+                <a:cs typeface="Courier New"/>
+              </a:rPr>
+              <a:t>Program::</a:t>
+            </a:r>
+            <a:r>
               <a:rPr lang="en-GB" b="1" dirty="0" err="1" smtClean="0">
                 <a:solidFill>
                   <a:srgbClr val="3366FF"/>
@@ -4897,7 +5018,7 @@
                 <a:latin typeface="Courier New"/>
                 <a:cs typeface="Courier New"/>
               </a:rPr>
-              <a:t>clLinkProgram</a:t>
+              <a:t>linkProgram</a:t>
             </a:r>
             <a:r>
               <a:rPr lang="en-GB" b="1" dirty="0" smtClean="0">
@@ -4913,7 +5034,11 @@
           <a:p>
             <a:r>
               <a:rPr lang="en-GB" dirty="0" smtClean="0"/>
-              <a:t>This enables the creation of libraries of compiled OpenCL functions, that can be linked to multiple program objects</a:t>
+              <a:t>This </a:t>
+            </a:r>
+            <a:r>
+              <a:rPr lang="en-GB" dirty="0" smtClean="0"/>
+              <a:t>enables the creation of libraries of compiled OpenCL functions, that can be linked to multiple program objects</a:t>
             </a:r>
           </a:p>
         </p:txBody>
@@ -5525,7 +5650,7 @@
         </p:spPr>
         <p:txBody>
           <a:bodyPr>
-            <a:normAutofit fontScale="77500" lnSpcReduction="20000"/>
+            <a:normAutofit fontScale="85000" lnSpcReduction="20000"/>
           </a:bodyPr>
           <a:lstStyle/>
           <a:p>
@@ -5774,7 +5899,7 @@
         <p:spPr/>
         <p:txBody>
           <a:bodyPr>
-            <a:normAutofit fontScale="92500"/>
+            <a:normAutofit lnSpcReduction="10000"/>
           </a:bodyPr>
           <a:lstStyle/>
           <a:p>
@@ -7213,7 +7338,7 @@
         </p:nvSpPr>
         <p:spPr>
           <a:xfrm>
-            <a:off x="3995936" y="1988840"/>
+            <a:off x="3496695" y="1883737"/>
             <a:ext cx="3096344" cy="923330"/>
           </a:xfrm>
           <a:prstGeom prst="rect">
@@ -7256,7 +7381,7 @@
         </p:nvCxnSpPr>
         <p:spPr>
           <a:xfrm>
-            <a:off x="2627784" y="2924944"/>
+            <a:off x="2128543" y="2819841"/>
             <a:ext cx="792088" cy="0"/>
           </a:xfrm>
           <a:prstGeom prst="line">
@@ -7293,7 +7418,7 @@
         </p:nvCxnSpPr>
         <p:spPr>
           <a:xfrm flipV="1">
-            <a:off x="3419872" y="2450505"/>
+            <a:off x="2920631" y="2345402"/>
             <a:ext cx="576064" cy="474439"/>
           </a:xfrm>
           <a:prstGeom prst="line">
@@ -8133,7 +8258,21 @@
                 <a:latin typeface="Trebuchet MS"/>
                 <a:cs typeface="Trebuchet MS"/>
               </a:rPr>
-              <a:t>All of this requires that we are compiling our OpenCL sources at runtime – this doesn’t work if we are precompiling our kernels or using SPIR</a:t>
+              <a:t>All of this requires that we are compiling our OpenCL sources at </a:t>
+            </a:r>
+            <a:r>
+              <a:rPr lang="en-GB" dirty="0" smtClean="0">
+                <a:latin typeface="Trebuchet MS"/>
+                <a:cs typeface="Trebuchet MS"/>
+              </a:rPr>
+              <a:t>runtime </a:t>
+            </a:r>
+            <a:r>
+              <a:rPr lang="en-GB" dirty="0" smtClean="0">
+                <a:latin typeface="Trebuchet MS"/>
+                <a:cs typeface="Trebuchet MS"/>
+              </a:rPr>
+              <a:t>– this doesn’t work if we are precompiling our kernels or using SPIR</a:t>
             </a:r>
           </a:p>
         </p:txBody>
@@ -8286,7 +8425,19 @@
           <a:p>
             <a:r>
               <a:rPr lang="en-GB" dirty="0" smtClean="0"/>
-              <a:t>Exercise 11: optimisations</a:t>
+              <a:t>Exercise </a:t>
+            </a:r>
+            <a:r>
+              <a:rPr lang="en-GB" dirty="0"/>
+              <a:t>2</a:t>
+            </a:r>
+            <a:r>
+              <a:rPr lang="en-GB" dirty="0" smtClean="0"/>
+              <a:t>: </a:t>
+            </a:r>
+            <a:r>
+              <a:rPr lang="en-GB" dirty="0" smtClean="0"/>
+              <a:t>optimisations</a:t>
             </a:r>
             <a:endParaRPr lang="en-GB" dirty="0"/>
           </a:p>
@@ -8406,7 +8557,19 @@
           <a:p>
             <a:r>
               <a:rPr lang="en-GB" dirty="0" smtClean="0"/>
-              <a:t>Exercise 11: optimisations</a:t>
+              <a:t>Exercise </a:t>
+            </a:r>
+            <a:r>
+              <a:rPr lang="en-GB" dirty="0"/>
+              <a:t>2</a:t>
+            </a:r>
+            <a:r>
+              <a:rPr lang="en-GB" dirty="0" smtClean="0"/>
+              <a:t>: </a:t>
+            </a:r>
+            <a:r>
+              <a:rPr lang="en-GB" dirty="0" smtClean="0"/>
+              <a:t>optimisations</a:t>
             </a:r>
             <a:endParaRPr lang="en-GB" dirty="0"/>
           </a:p>
@@ -8463,7 +8626,11 @@
             </a:pPr>
             <a:r>
               <a:rPr lang="en-GB" dirty="0" smtClean="0"/>
-              <a:t>This won’t help for every parameter</a:t>
+              <a:t>Disclaimer: This </a:t>
+            </a:r>
+            <a:r>
+              <a:rPr lang="en-GB" dirty="0" smtClean="0"/>
+              <a:t>won’t help for every parameter</a:t>
             </a:r>
           </a:p>
           <a:p>
@@ -8473,8 +8640,16 @@
               </a:lnSpc>
             </a:pPr>
             <a:r>
-              <a:rPr lang="en-GB" dirty="0" smtClean="0"/>
-              <a:t>This won’t help on every device – try it on a few!</a:t>
+              <a:rPr lang="en-GB" dirty="0"/>
+              <a:t>Disclaimer</a:t>
+            </a:r>
+            <a:r>
+              <a:rPr lang="en-GB" dirty="0" smtClean="0"/>
+              <a:t>: This </a:t>
+            </a:r>
+            <a:r>
+              <a:rPr lang="en-GB" dirty="0" smtClean="0"/>
+              <a:t>won’t help on every device – try it on a few!</a:t>
             </a:r>
           </a:p>
           <a:p>
@@ -8945,8 +9120,13 @@
           <a:p>
             <a:r>
               <a:rPr lang="en-GB" dirty="0" smtClean="0"/>
-              <a:t>Retrieving the binary (single device):</a:t>
-            </a:r>
+              <a:t>Retrieving the </a:t>
+            </a:r>
+            <a:r>
+              <a:rPr lang="en-GB" dirty="0" smtClean="0"/>
+              <a:t>binary:</a:t>
+            </a:r>
+            <a:endParaRPr lang="en-GB" dirty="0" smtClean="0"/>
           </a:p>
           <a:p>
             <a:pPr marL="400050" lvl="1" indent="0">
@@ -8968,6 +9148,16 @@
               <a:buNone/>
             </a:pPr>
             <a:r>
+              <a:rPr lang="en-GB" b="1" dirty="0">
+                <a:solidFill>
+                  <a:srgbClr val="3366FF"/>
+                </a:solidFill>
+                <a:latin typeface="Courier New"/>
+                <a:cs typeface="Courier New"/>
+              </a:rPr>
+              <a:t>c</a:t>
+            </a:r>
+            <a:r>
               <a:rPr lang="en-GB" b="1" dirty="0" smtClean="0">
                 <a:solidFill>
                   <a:srgbClr val="3366FF"/>
@@ -8975,7 +9165,27 @@
                 <a:latin typeface="Courier New"/>
                 <a:cs typeface="Courier New"/>
               </a:rPr>
-              <a:t>program = </a:t>
+              <a:t>l::Program program(</a:t>
+            </a:r>
+            <a:r>
+              <a:rPr lang="en-GB" b="1" dirty="0" smtClean="0">
+                <a:solidFill>
+                  <a:srgbClr val="3366FF"/>
+                </a:solidFill>
+                <a:latin typeface="Courier New"/>
+                <a:cs typeface="Courier New"/>
+              </a:rPr>
+              <a:t>context</a:t>
+            </a:r>
+            <a:r>
+              <a:rPr lang="en-GB" b="1" dirty="0" smtClean="0">
+                <a:solidFill>
+                  <a:srgbClr val="3366FF"/>
+                </a:solidFill>
+                <a:latin typeface="Courier New"/>
+                <a:cs typeface="Courier New"/>
+              </a:rPr>
+              <a:t>, </a:t>
             </a:r>
             <a:r>
               <a:rPr lang="en-GB" b="1" dirty="0" err="1" smtClean="0">
@@ -8985,7 +9195,7 @@
                 <a:latin typeface="Courier New"/>
                 <a:cs typeface="Courier New"/>
               </a:rPr>
-              <a:t>clCreateProgramWithSource</a:t>
+              <a:t>kernel_source</a:t>
             </a:r>
             <a:r>
               <a:rPr lang="en-GB" b="1" dirty="0" smtClean="0">
@@ -8995,7 +9205,32 @@
                 <a:latin typeface="Courier New"/>
                 <a:cs typeface="Courier New"/>
               </a:rPr>
-              <a:t>(context, 1, &amp;</a:t>
+              <a:t>)</a:t>
+            </a:r>
+            <a:r>
+              <a:rPr lang="en-GB" b="1" dirty="0" smtClean="0">
+                <a:solidFill>
+                  <a:srgbClr val="3366FF"/>
+                </a:solidFill>
+                <a:latin typeface="Courier New"/>
+                <a:cs typeface="Courier New"/>
+              </a:rPr>
+              <a:t>;</a:t>
+            </a:r>
+          </a:p>
+          <a:p>
+            <a:pPr marL="400050" lvl="1" indent="0">
+              <a:buNone/>
+            </a:pPr>
+            <a:r>
+              <a:rPr lang="en-GB" b="1" dirty="0" err="1">
+                <a:solidFill>
+                  <a:srgbClr val="3366FF"/>
+                </a:solidFill>
+                <a:latin typeface="Courier New"/>
+                <a:cs typeface="Courier New"/>
+              </a:rPr>
+              <a:t>p</a:t>
             </a:r>
             <a:r>
               <a:rPr lang="en-GB" b="1" dirty="0" err="1" smtClean="0">
@@ -9005,7 +9240,7 @@
                 <a:latin typeface="Courier New"/>
                 <a:cs typeface="Courier New"/>
               </a:rPr>
-              <a:t>kernel_source</a:t>
+              <a:t>rogram.build</a:t>
             </a:r>
             <a:r>
               <a:rPr lang="en-GB" b="1" dirty="0" smtClean="0">
@@ -9015,58 +9250,8 @@
                 <a:latin typeface="Courier New"/>
                 <a:cs typeface="Courier New"/>
               </a:rPr>
-              <a:t>, NULL, &amp;err);</a:t>
-            </a:r>
-          </a:p>
-          <a:p>
-            <a:pPr marL="400050" lvl="1" indent="0">
-              <a:buNone/>
-            </a:pPr>
-            <a:r>
-              <a:rPr lang="en-GB" b="1" dirty="0" err="1" smtClean="0">
-                <a:solidFill>
-                  <a:srgbClr val="3366FF"/>
-                </a:solidFill>
-                <a:latin typeface="Courier New"/>
-                <a:cs typeface="Courier New"/>
-              </a:rPr>
-              <a:t>clBuildProgram</a:t>
-            </a:r>
-            <a:r>
-              <a:rPr lang="en-GB" b="1" dirty="0" smtClean="0">
-                <a:solidFill>
-                  <a:srgbClr val="3366FF"/>
-                </a:solidFill>
-                <a:latin typeface="Courier New"/>
-                <a:cs typeface="Courier New"/>
-              </a:rPr>
-              <a:t>(program, 1, &amp;device</a:t>
-            </a:r>
-            <a:r>
-              <a:rPr lang="en-GB" b="1" dirty="0">
-                <a:solidFill>
-                  <a:srgbClr val="3366FF"/>
-                </a:solidFill>
-                <a:latin typeface="Courier New"/>
-                <a:cs typeface="Courier New"/>
-              </a:rPr>
-              <a:t>, </a:t>
-            </a:r>
-            <a:r>
-              <a:rPr lang="en-GB" b="1" dirty="0" smtClean="0">
-                <a:solidFill>
-                  <a:srgbClr val="3366FF"/>
-                </a:solidFill>
-                <a:latin typeface="Courier New"/>
-                <a:cs typeface="Courier New"/>
-              </a:rPr>
-              <a:t>"", NULL, NULL);</a:t>
-            </a:r>
-          </a:p>
-          <a:p>
-            <a:pPr marL="400050" lvl="1" indent="0">
-              <a:buNone/>
-            </a:pPr>
+              <a:t>();</a:t>
+            </a:r>
             <a:endParaRPr lang="en-GB" b="1" dirty="0" smtClean="0">
               <a:solidFill>
                 <a:srgbClr val="3366FF"/>
@@ -9079,161 +9264,6 @@
             <a:pPr marL="400050" lvl="1" indent="0">
               <a:buNone/>
             </a:pPr>
-            <a:r>
-              <a:rPr lang="en-GB" b="1" dirty="0" smtClean="0">
-                <a:solidFill>
-                  <a:srgbClr val="3366FF"/>
-                </a:solidFill>
-                <a:latin typeface="Courier New"/>
-                <a:cs typeface="Courier New"/>
-              </a:rPr>
-              <a:t>// Get compiled binary from runtime</a:t>
-            </a:r>
-          </a:p>
-          <a:p>
-            <a:pPr marL="400050" lvl="1" indent="0">
-              <a:buNone/>
-            </a:pPr>
-            <a:r>
-              <a:rPr lang="en-GB" b="1" dirty="0" err="1" smtClean="0">
-                <a:solidFill>
-                  <a:srgbClr val="3366FF"/>
-                </a:solidFill>
-                <a:latin typeface="Courier New"/>
-                <a:cs typeface="Courier New"/>
-              </a:rPr>
-              <a:t>size_t</a:t>
-            </a:r>
-            <a:r>
-              <a:rPr lang="en-GB" b="1" dirty="0" smtClean="0">
-                <a:solidFill>
-                  <a:srgbClr val="3366FF"/>
-                </a:solidFill>
-                <a:latin typeface="Courier New"/>
-                <a:cs typeface="Courier New"/>
-              </a:rPr>
-              <a:t> size;</a:t>
-            </a:r>
-          </a:p>
-          <a:p>
-            <a:pPr marL="400050" lvl="1" indent="0">
-              <a:buNone/>
-            </a:pPr>
-            <a:r>
-              <a:rPr lang="en-GB" b="1" dirty="0" err="1" smtClean="0">
-                <a:solidFill>
-                  <a:srgbClr val="3366FF"/>
-                </a:solidFill>
-                <a:latin typeface="Courier New"/>
-                <a:cs typeface="Courier New"/>
-              </a:rPr>
-              <a:t>clGetProgramInfo</a:t>
-            </a:r>
-            <a:r>
-              <a:rPr lang="en-GB" b="1" dirty="0">
-                <a:solidFill>
-                  <a:srgbClr val="3366FF"/>
-                </a:solidFill>
-                <a:latin typeface="Courier New"/>
-                <a:cs typeface="Courier New"/>
-              </a:rPr>
-              <a:t>(</a:t>
-            </a:r>
-            <a:r>
-              <a:rPr lang="en-GB" b="1" dirty="0" smtClean="0">
-                <a:solidFill>
-                  <a:srgbClr val="3366FF"/>
-                </a:solidFill>
-                <a:latin typeface="Courier New"/>
-                <a:cs typeface="Courier New"/>
-              </a:rPr>
-              <a:t>program, CL_PROGRAM_BINARY_SIZES, </a:t>
-            </a:r>
-            <a:r>
-              <a:rPr lang="en-GB" b="1" dirty="0" err="1" smtClean="0">
-                <a:solidFill>
-                  <a:srgbClr val="3366FF"/>
-                </a:solidFill>
-                <a:latin typeface="Courier New"/>
-                <a:cs typeface="Courier New"/>
-              </a:rPr>
-              <a:t>sizeof</a:t>
-            </a:r>
-            <a:r>
-              <a:rPr lang="en-GB" b="1" dirty="0" smtClean="0">
-                <a:solidFill>
-                  <a:srgbClr val="3366FF"/>
-                </a:solidFill>
-                <a:latin typeface="Courier New"/>
-                <a:cs typeface="Courier New"/>
-              </a:rPr>
-              <a:t>(size), &amp;size, NULL);</a:t>
-            </a:r>
-          </a:p>
-          <a:p>
-            <a:pPr marL="400050" lvl="1" indent="0">
-              <a:buNone/>
-            </a:pPr>
-            <a:r>
-              <a:rPr lang="en-GB" b="1" dirty="0" smtClean="0">
-                <a:solidFill>
-                  <a:srgbClr val="3366FF"/>
-                </a:solidFill>
-                <a:latin typeface="Courier New"/>
-                <a:cs typeface="Courier New"/>
-              </a:rPr>
-              <a:t>unsigned char *binary = </a:t>
-            </a:r>
-            <a:r>
-              <a:rPr lang="en-GB" b="1" dirty="0" err="1" smtClean="0">
-                <a:solidFill>
-                  <a:srgbClr val="3366FF"/>
-                </a:solidFill>
-                <a:latin typeface="Courier New"/>
-                <a:cs typeface="Courier New"/>
-              </a:rPr>
-              <a:t>malloc</a:t>
-            </a:r>
-            <a:r>
-              <a:rPr lang="en-GB" b="1" dirty="0" smtClean="0">
-                <a:solidFill>
-                  <a:srgbClr val="3366FF"/>
-                </a:solidFill>
-                <a:latin typeface="Courier New"/>
-                <a:cs typeface="Courier New"/>
-              </a:rPr>
-              <a:t>(size);</a:t>
-            </a:r>
-          </a:p>
-          <a:p>
-            <a:pPr marL="400050" lvl="1" indent="0">
-              <a:buNone/>
-            </a:pPr>
-            <a:r>
-              <a:rPr lang="en-GB" b="1" dirty="0" err="1" smtClean="0">
-                <a:solidFill>
-                  <a:srgbClr val="3366FF"/>
-                </a:solidFill>
-                <a:latin typeface="Courier New"/>
-                <a:cs typeface="Courier New"/>
-              </a:rPr>
-              <a:t>clGetProgramInfo</a:t>
-            </a:r>
-            <a:r>
-              <a:rPr lang="en-GB" b="1" dirty="0" smtClean="0">
-                <a:solidFill>
-                  <a:srgbClr val="3366FF"/>
-                </a:solidFill>
-                <a:latin typeface="Courier New"/>
-                <a:cs typeface="Courier New"/>
-              </a:rPr>
-              <a:t>(program, CL_PROGRAM_BINARIES, size, binary, NULL);</a:t>
-            </a:r>
-          </a:p>
-          <a:p>
-            <a:pPr marL="400050" lvl="1" indent="0">
-              <a:buNone/>
-            </a:pPr>
             <a:endParaRPr lang="en-GB" b="1" dirty="0" smtClean="0">
               <a:solidFill>
                 <a:srgbClr val="3366FF"/>
@@ -9254,7 +9284,17 @@
                 <a:latin typeface="Courier New"/>
                 <a:cs typeface="Courier New"/>
               </a:rPr>
-              <a:t>// Then write binary to file</a:t>
+              <a:t>// Get compiled binary from </a:t>
+            </a:r>
+            <a:r>
+              <a:rPr lang="en-GB" b="1" dirty="0" smtClean="0">
+                <a:solidFill>
+                  <a:srgbClr val="3366FF"/>
+                </a:solidFill>
+                <a:latin typeface="Courier New"/>
+                <a:cs typeface="Courier New"/>
+              </a:rPr>
+              <a:t>runtime</a:t>
             </a:r>
           </a:p>
           <a:p>
@@ -9262,6 +9302,26 @@
               <a:buNone/>
             </a:pPr>
             <a:r>
+              <a:rPr lang="en-GB" b="1" dirty="0" err="1">
+                <a:solidFill>
+                  <a:srgbClr val="3366FF"/>
+                </a:solidFill>
+                <a:latin typeface="Courier New"/>
+                <a:cs typeface="Courier New"/>
+              </a:rPr>
+              <a:t>s</a:t>
+            </a:r>
+            <a:r>
+              <a:rPr lang="en-GB" b="1" dirty="0" err="1" smtClean="0">
+                <a:solidFill>
+                  <a:srgbClr val="3366FF"/>
+                </a:solidFill>
+                <a:latin typeface="Courier New"/>
+                <a:cs typeface="Courier New"/>
+              </a:rPr>
+              <a:t>td</a:t>
+            </a:r>
+            <a:r>
               <a:rPr lang="en-GB" b="1" dirty="0" smtClean="0">
                 <a:solidFill>
                   <a:srgbClr val="3366FF"/>
@@ -9269,13 +9329,48 @@
                 <a:latin typeface="Courier New"/>
                 <a:cs typeface="Courier New"/>
               </a:rPr>
-              <a:t>…</a:t>
-            </a:r>
-          </a:p>
-          <a:p>
-            <a:pPr marL="0" indent="0">
-              <a:buNone/>
-            </a:pPr>
+              <a:t>::vector&lt;</a:t>
+            </a:r>
+            <a:r>
+              <a:rPr lang="en-GB" b="1" dirty="0" err="1" smtClean="0">
+                <a:solidFill>
+                  <a:srgbClr val="3366FF"/>
+                </a:solidFill>
+                <a:latin typeface="Courier New"/>
+                <a:cs typeface="Courier New"/>
+              </a:rPr>
+              <a:t>size_t</a:t>
+            </a:r>
+            <a:r>
+              <a:rPr lang="en-GB" b="1" dirty="0" smtClean="0">
+                <a:solidFill>
+                  <a:srgbClr val="3366FF"/>
+                </a:solidFill>
+                <a:latin typeface="Courier New"/>
+                <a:cs typeface="Courier New"/>
+              </a:rPr>
+              <a:t>&gt; sizes = </a:t>
+            </a:r>
+            <a:r>
+              <a:rPr lang="en-GB" b="1" dirty="0" err="1" smtClean="0">
+                <a:solidFill>
+                  <a:srgbClr val="3366FF"/>
+                </a:solidFill>
+                <a:latin typeface="Courier New"/>
+                <a:cs typeface="Courier New"/>
+              </a:rPr>
+              <a:t>program.getInfo</a:t>
+            </a:r>
+            <a:r>
+              <a:rPr lang="en-GB" b="1" dirty="0" smtClean="0">
+                <a:solidFill>
+                  <a:srgbClr val="3366FF"/>
+                </a:solidFill>
+                <a:latin typeface="Courier New"/>
+                <a:cs typeface="Courier New"/>
+              </a:rPr>
+              <a:t>&lt;CL_PROGRAM_BINARY_SIZES&gt;();</a:t>
+            </a:r>
             <a:endParaRPr lang="en-GB" b="1" dirty="0" smtClean="0">
               <a:solidFill>
                 <a:srgbClr val="3366FF"/>
@@ -9285,24 +9380,18 @@
             </a:endParaRPr>
           </a:p>
           <a:p>
-            <a:r>
-              <a:rPr lang="en-GB" dirty="0"/>
-              <a:t>Loading the binary</a:t>
-            </a:r>
-          </a:p>
-          <a:p>
             <a:pPr marL="400050" lvl="1" indent="0">
               <a:buNone/>
             </a:pPr>
             <a:r>
-              <a:rPr lang="en-GB" b="1" dirty="0">
-                <a:solidFill>
-                  <a:srgbClr val="3366FF"/>
-                </a:solidFill>
-                <a:latin typeface="Courier New"/>
-                <a:cs typeface="Courier New"/>
-              </a:rPr>
-              <a:t>// Load </a:t>
+              <a:rPr lang="en-GB" b="1" dirty="0" err="1" smtClean="0">
+                <a:solidFill>
+                  <a:srgbClr val="3366FF"/>
+                </a:solidFill>
+                <a:latin typeface="Courier New"/>
+                <a:cs typeface="Courier New"/>
+              </a:rPr>
+              <a:t>std</a:t>
             </a:r>
             <a:r>
               <a:rPr lang="en-GB" b="1" dirty="0" smtClean="0">
@@ -9312,13 +9401,28 @@
                 <a:latin typeface="Courier New"/>
                 <a:cs typeface="Courier New"/>
               </a:rPr>
-              <a:t>compiled program binary from file</a:t>
-            </a:r>
-          </a:p>
-          <a:p>
-            <a:pPr marL="400050" lvl="1" indent="0">
-              <a:buNone/>
-            </a:pPr>
+              <a:t>::vector&lt;char *&gt; binaries = </a:t>
+            </a:r>
+            <a:r>
+              <a:rPr lang="en-GB" b="1" dirty="0" err="1" smtClean="0">
+                <a:solidFill>
+                  <a:srgbClr val="3366FF"/>
+                </a:solidFill>
+                <a:latin typeface="Courier New"/>
+                <a:cs typeface="Courier New"/>
+              </a:rPr>
+              <a:t>p</a:t>
+            </a:r>
+            <a:r>
+              <a:rPr lang="en-GB" b="1" dirty="0" err="1" smtClean="0">
+                <a:solidFill>
+                  <a:srgbClr val="3366FF"/>
+                </a:solidFill>
+                <a:latin typeface="Courier New"/>
+                <a:cs typeface="Courier New"/>
+              </a:rPr>
+              <a:t>rogram.getInfo</a:t>
+            </a:r>
             <a:r>
               <a:rPr lang="en-GB" b="1" dirty="0" smtClean="0">
                 <a:solidFill>
@@ -9327,13 +9431,8 @@
                 <a:latin typeface="Courier New"/>
                 <a:cs typeface="Courier New"/>
               </a:rPr>
-              <a:t>…</a:t>
-            </a:r>
-          </a:p>
-          <a:p>
-            <a:pPr marL="400050" lvl="1" indent="0">
-              <a:buNone/>
-            </a:pPr>
+              <a:t>&lt;CL_PROGRAM_BINARIES&gt;();</a:t>
+            </a:r>
             <a:endParaRPr lang="en-GB" b="1" dirty="0" smtClean="0">
               <a:solidFill>
                 <a:srgbClr val="3366FF"/>
@@ -9346,6 +9445,18 @@
             <a:pPr marL="400050" lvl="1" indent="0">
               <a:buNone/>
             </a:pPr>
+            <a:endParaRPr lang="en-GB" b="1" dirty="0" smtClean="0">
+              <a:solidFill>
+                <a:srgbClr val="3366FF"/>
+              </a:solidFill>
+              <a:latin typeface="Courier New"/>
+              <a:cs typeface="Courier New"/>
+            </a:endParaRPr>
+          </a:p>
+          <a:p>
+            <a:pPr marL="400050" lvl="1" indent="0">
+              <a:buNone/>
+            </a:pPr>
             <a:r>
               <a:rPr lang="en-GB" b="1" dirty="0" smtClean="0">
                 <a:solidFill>
@@ -9354,7 +9465,172 @@
                 <a:latin typeface="Courier New"/>
                 <a:cs typeface="Courier New"/>
               </a:rPr>
-              <a:t>// Create program using binary</a:t>
+              <a:t>// Then write binary to file</a:t>
+            </a:r>
+          </a:p>
+          <a:p>
+            <a:pPr marL="400050" lvl="1" indent="0">
+              <a:buNone/>
+            </a:pPr>
+            <a:r>
+              <a:rPr lang="en-GB" b="1" dirty="0" smtClean="0">
+                <a:solidFill>
+                  <a:srgbClr val="3366FF"/>
+                </a:solidFill>
+                <a:latin typeface="Courier New"/>
+                <a:cs typeface="Courier New"/>
+              </a:rPr>
+              <a:t>…</a:t>
+            </a:r>
+          </a:p>
+          <a:p>
+            <a:pPr marL="0" indent="0">
+              <a:buNone/>
+            </a:pPr>
+            <a:endParaRPr lang="en-GB" b="1" dirty="0" smtClean="0">
+              <a:solidFill>
+                <a:srgbClr val="3366FF"/>
+              </a:solidFill>
+              <a:latin typeface="Courier New"/>
+              <a:cs typeface="Courier New"/>
+            </a:endParaRPr>
+          </a:p>
+          <a:p>
+            <a:r>
+              <a:rPr lang="en-GB" dirty="0"/>
+              <a:t>Loading the binary</a:t>
+            </a:r>
+          </a:p>
+          <a:p>
+            <a:pPr marL="400050" lvl="1" indent="0">
+              <a:buNone/>
+            </a:pPr>
+            <a:r>
+              <a:rPr lang="en-GB" b="1" dirty="0">
+                <a:solidFill>
+                  <a:srgbClr val="3366FF"/>
+                </a:solidFill>
+                <a:latin typeface="Courier New"/>
+                <a:cs typeface="Courier New"/>
+              </a:rPr>
+              <a:t>// Load </a:t>
+            </a:r>
+            <a:r>
+              <a:rPr lang="en-GB" b="1" dirty="0" smtClean="0">
+                <a:solidFill>
+                  <a:srgbClr val="3366FF"/>
+                </a:solidFill>
+                <a:latin typeface="Courier New"/>
+                <a:cs typeface="Courier New"/>
+              </a:rPr>
+              <a:t>compiled program binary from file</a:t>
+            </a:r>
+          </a:p>
+          <a:p>
+            <a:pPr marL="400050" lvl="1" indent="0">
+              <a:buNone/>
+            </a:pPr>
+            <a:r>
+              <a:rPr lang="en-GB" b="1" dirty="0" smtClean="0">
+                <a:solidFill>
+                  <a:srgbClr val="3366FF"/>
+                </a:solidFill>
+                <a:latin typeface="Courier New"/>
+                <a:cs typeface="Courier New"/>
+              </a:rPr>
+              <a:t>…</a:t>
+            </a:r>
+          </a:p>
+          <a:p>
+            <a:pPr marL="400050" lvl="1" indent="0">
+              <a:buNone/>
+            </a:pPr>
+            <a:endParaRPr lang="en-GB" b="1" dirty="0" smtClean="0">
+              <a:solidFill>
+                <a:srgbClr val="3366FF"/>
+              </a:solidFill>
+              <a:latin typeface="Courier New"/>
+              <a:cs typeface="Courier New"/>
+            </a:endParaRPr>
+          </a:p>
+          <a:p>
+            <a:pPr marL="400050" lvl="1" indent="0">
+              <a:buNone/>
+            </a:pPr>
+            <a:r>
+              <a:rPr lang="en-GB" b="1" dirty="0" smtClean="0">
+                <a:solidFill>
+                  <a:srgbClr val="3366FF"/>
+                </a:solidFill>
+                <a:latin typeface="Courier New"/>
+                <a:cs typeface="Courier New"/>
+              </a:rPr>
+              <a:t>// Create program using </a:t>
+            </a:r>
+            <a:r>
+              <a:rPr lang="en-GB" b="1" dirty="0" smtClean="0">
+                <a:solidFill>
+                  <a:srgbClr val="3366FF"/>
+                </a:solidFill>
+                <a:latin typeface="Courier New"/>
+                <a:cs typeface="Courier New"/>
+              </a:rPr>
+              <a:t>binary</a:t>
+            </a:r>
+          </a:p>
+          <a:p>
+            <a:pPr marL="400050" lvl="1" indent="0">
+              <a:buNone/>
+            </a:pPr>
+            <a:r>
+              <a:rPr lang="en-GB" b="1" dirty="0" smtClean="0">
+                <a:solidFill>
+                  <a:srgbClr val="3366FF"/>
+                </a:solidFill>
+                <a:latin typeface="Courier New"/>
+                <a:cs typeface="Courier New"/>
+              </a:rPr>
+              <a:t>cl::Program::Binaries b(1, </a:t>
+            </a:r>
+            <a:r>
+              <a:rPr lang="en-GB" b="1" dirty="0" err="1" smtClean="0">
+                <a:solidFill>
+                  <a:srgbClr val="3366FF"/>
+                </a:solidFill>
+                <a:latin typeface="Courier New"/>
+                <a:cs typeface="Courier New"/>
+              </a:rPr>
+              <a:t>std</a:t>
+            </a:r>
+            <a:r>
+              <a:rPr lang="en-GB" b="1" dirty="0" smtClean="0">
+                <a:solidFill>
+                  <a:srgbClr val="3366FF"/>
+                </a:solidFill>
+                <a:latin typeface="Courier New"/>
+                <a:cs typeface="Courier New"/>
+              </a:rPr>
+              <a:t>::</a:t>
+            </a:r>
+            <a:r>
+              <a:rPr lang="en-GB" b="1" dirty="0" err="1" smtClean="0">
+                <a:solidFill>
+                  <a:srgbClr val="3366FF"/>
+                </a:solidFill>
+                <a:latin typeface="Courier New"/>
+                <a:cs typeface="Courier New"/>
+              </a:rPr>
+              <a:t>make_pair</a:t>
+            </a:r>
+            <a:r>
+              <a:rPr lang="en-GB" b="1" dirty="0" smtClean="0">
+                <a:solidFill>
+                  <a:srgbClr val="3366FF"/>
+                </a:solidFill>
+                <a:latin typeface="Courier New"/>
+                <a:cs typeface="Courier New"/>
+              </a:rPr>
+              <a:t>(binaries[0], sizes[0]));</a:t>
             </a:r>
             <a:endParaRPr lang="en-GB" b="1" dirty="0">
               <a:solidFill>
@@ -9369,6 +9645,16 @@
               <a:buNone/>
             </a:pPr>
             <a:r>
+              <a:rPr lang="en-GB" b="1" dirty="0">
+                <a:solidFill>
+                  <a:srgbClr val="3366FF"/>
+                </a:solidFill>
+                <a:latin typeface="Courier New"/>
+                <a:cs typeface="Courier New"/>
+              </a:rPr>
+              <a:t>c</a:t>
+            </a:r>
+            <a:r>
               <a:rPr lang="en-GB" b="1" dirty="0" smtClean="0">
                 <a:solidFill>
                   <a:srgbClr val="3366FF"/>
@@ -9376,18 +9662,20 @@
                 <a:latin typeface="Courier New"/>
                 <a:cs typeface="Courier New"/>
               </a:rPr>
-              <a:t>program </a:t>
-            </a:r>
-            <a:r>
-              <a:rPr lang="en-GB" b="1" dirty="0">
-                <a:solidFill>
-                  <a:srgbClr val="3366FF"/>
-                </a:solidFill>
-                <a:latin typeface="Courier New"/>
-                <a:cs typeface="Courier New"/>
-              </a:rPr>
-              <a:t>= </a:t>
-            </a:r>
+              <a:t>l::Program program (context, devices, b);</a:t>
+            </a:r>
+            <a:endParaRPr lang="en-GB" b="1" dirty="0" smtClean="0">
+              <a:solidFill>
+                <a:srgbClr val="3366FF"/>
+              </a:solidFill>
+              <a:latin typeface="Courier New"/>
+              <a:cs typeface="Courier New"/>
+            </a:endParaRPr>
+          </a:p>
+          <a:p>
+            <a:pPr marL="400050" lvl="1" indent="0">
+              <a:buNone/>
+            </a:pPr>
             <a:r>
               <a:rPr lang="en-GB" b="1" dirty="0" err="1">
                 <a:solidFill>
@@ -9396,7 +9684,17 @@
                 <a:latin typeface="Courier New"/>
                 <a:cs typeface="Courier New"/>
               </a:rPr>
-              <a:t>clCreateProgramWithBinary</a:t>
+              <a:t>p</a:t>
+            </a:r>
+            <a:r>
+              <a:rPr lang="en-GB" b="1" dirty="0" err="1" smtClean="0">
+                <a:solidFill>
+                  <a:srgbClr val="3366FF"/>
+                </a:solidFill>
+                <a:latin typeface="Courier New"/>
+                <a:cs typeface="Courier New"/>
+              </a:rPr>
+              <a:t>rogram.build</a:t>
             </a:r>
             <a:r>
               <a:rPr lang="en-GB" b="1" dirty="0" smtClean="0">
@@ -9406,127 +9704,7 @@
                 <a:latin typeface="Courier New"/>
                 <a:cs typeface="Courier New"/>
               </a:rPr>
-              <a:t>(context</a:t>
-            </a:r>
-            <a:r>
-              <a:rPr lang="en-GB" b="1" dirty="0">
-                <a:solidFill>
-                  <a:srgbClr val="3366FF"/>
-                </a:solidFill>
-                <a:latin typeface="Courier New"/>
-                <a:cs typeface="Courier New"/>
-              </a:rPr>
-              <a:t>, 1, &amp;device</a:t>
-            </a:r>
-            <a:r>
-              <a:rPr lang="en-GB" b="1" dirty="0" smtClean="0">
-                <a:solidFill>
-                  <a:srgbClr val="3366FF"/>
-                </a:solidFill>
-                <a:latin typeface="Courier New"/>
-                <a:cs typeface="Courier New"/>
-              </a:rPr>
-              <a:t>,</a:t>
-            </a:r>
-          </a:p>
-          <a:p>
-            <a:pPr marL="400050" lvl="1" indent="0">
-              <a:buNone/>
-            </a:pPr>
-            <a:r>
-              <a:rPr lang="en-GB" b="1" dirty="0">
-                <a:solidFill>
-                  <a:srgbClr val="3366FF"/>
-                </a:solidFill>
-                <a:latin typeface="Courier New"/>
-                <a:cs typeface="Courier New"/>
-              </a:rPr>
-              <a:t> </a:t>
-            </a:r>
-            <a:r>
-              <a:rPr lang="en-GB" b="1" dirty="0" smtClean="0">
-                <a:solidFill>
-                  <a:srgbClr val="3366FF"/>
-                </a:solidFill>
-                <a:latin typeface="Courier New"/>
-                <a:cs typeface="Courier New"/>
-              </a:rPr>
-              <a:t>                                   &amp;size, &amp;binary, NULL, &amp;err);</a:t>
-            </a:r>
-          </a:p>
-          <a:p>
-            <a:pPr marL="400050" lvl="1" indent="0">
-              <a:buNone/>
-            </a:pPr>
-            <a:r>
-              <a:rPr lang="en-GB" b="1" dirty="0" smtClean="0">
-                <a:solidFill>
-                  <a:srgbClr val="3366FF"/>
-                </a:solidFill>
-                <a:latin typeface="Courier New"/>
-                <a:cs typeface="Courier New"/>
-              </a:rPr>
-              <a:t>err = </a:t>
-            </a:r>
-            <a:r>
-              <a:rPr lang="en-GB" b="1" dirty="0" err="1" smtClean="0">
-                <a:solidFill>
-                  <a:srgbClr val="3366FF"/>
-                </a:solidFill>
-                <a:latin typeface="Courier New"/>
-                <a:cs typeface="Courier New"/>
-              </a:rPr>
-              <a:t>clBuildProgram</a:t>
-            </a:r>
-            <a:r>
-              <a:rPr lang="en-GB" b="1" dirty="0" smtClean="0">
-                <a:solidFill>
-                  <a:srgbClr val="3366FF"/>
-                </a:solidFill>
-                <a:latin typeface="Courier New"/>
-                <a:cs typeface="Courier New"/>
-              </a:rPr>
-              <a:t>(</a:t>
-            </a:r>
-            <a:r>
-              <a:rPr lang="en-GB" b="1" dirty="0" err="1" smtClean="0">
-                <a:solidFill>
-                  <a:srgbClr val="3366FF"/>
-                </a:solidFill>
-                <a:latin typeface="Courier New"/>
-                <a:cs typeface="Courier New"/>
-              </a:rPr>
-              <a:t>prog</a:t>
-            </a:r>
-            <a:r>
-              <a:rPr lang="en-GB" b="1" dirty="0" smtClean="0">
-                <a:solidFill>
-                  <a:srgbClr val="3366FF"/>
-                </a:solidFill>
-                <a:latin typeface="Courier New"/>
-                <a:cs typeface="Courier New"/>
-              </a:rPr>
-              <a:t>, 1, &amp;device, "</a:t>
-            </a:r>
-            <a:r>
-              <a:rPr lang="en-GB" b="1" dirty="0">
-                <a:solidFill>
-                  <a:srgbClr val="3366FF"/>
-                </a:solidFill>
-                <a:latin typeface="Courier New"/>
-                <a:cs typeface="Courier New"/>
-              </a:rPr>
-              <a:t>"</a:t>
-            </a:r>
-            <a:r>
-              <a:rPr lang="en-GB" b="1" dirty="0" smtClean="0">
-                <a:solidFill>
-                  <a:srgbClr val="3366FF"/>
-                </a:solidFill>
-                <a:latin typeface="Courier New"/>
-                <a:cs typeface="Courier New"/>
-              </a:rPr>
-              <a:t>, NULL, NULL);</a:t>
+              <a:t>();</a:t>
             </a:r>
             <a:endParaRPr lang="en-GB" b="1" dirty="0">
               <a:solidFill>
@@ -9596,7 +9774,7 @@
                                         <p:tgtEl>
                                           <p:spTgt spid="3">
                                             <p:txEl>
-                                              <p:pRg st="14" end="14"/>
+                                              <p:pRg st="12" end="12"/>
                                             </p:txEl>
                                           </p:spTgt>
                                         </p:tgtEl>
@@ -9627,7 +9805,7 @@
                                         <p:tgtEl>
                                           <p:spTgt spid="3">
                                             <p:txEl>
-                                              <p:pRg st="15" end="15"/>
+                                              <p:pRg st="13" end="13"/>
                                             </p:txEl>
                                           </p:spTgt>
                                         </p:tgtEl>
@@ -9658,7 +9836,7 @@
                                         <p:tgtEl>
                                           <p:spTgt spid="3">
                                             <p:txEl>
-                                              <p:pRg st="16" end="16"/>
+                                              <p:pRg st="14" end="14"/>
                                             </p:txEl>
                                           </p:spTgt>
                                         </p:tgtEl>
@@ -9689,7 +9867,7 @@
                                         <p:tgtEl>
                                           <p:spTgt spid="3">
                                             <p:txEl>
-                                              <p:pRg st="18" end="18"/>
+                                              <p:pRg st="16" end="16"/>
                                             </p:txEl>
                                           </p:spTgt>
                                         </p:tgtEl>
@@ -9720,7 +9898,7 @@
                                         <p:tgtEl>
                                           <p:spTgt spid="3">
                                             <p:txEl>
-                                              <p:pRg st="19" end="19"/>
+                                              <p:pRg st="17" end="17"/>
                                             </p:txEl>
                                           </p:spTgt>
                                         </p:tgtEl>
@@ -9751,7 +9929,7 @@
                                         <p:tgtEl>
                                           <p:spTgt spid="3">
                                             <p:txEl>
-                                              <p:pRg st="20" end="20"/>
+                                              <p:pRg st="18" end="18"/>
                                             </p:txEl>
                                           </p:spTgt>
                                         </p:tgtEl>
@@ -9782,7 +9960,7 @@
                                         <p:tgtEl>
                                           <p:spTgt spid="3">
                                             <p:txEl>
-                                              <p:pRg st="21" end="21"/>
+                                              <p:pRg st="19" end="19"/>
                                             </p:txEl>
                                           </p:spTgt>
                                         </p:tgtEl>
@@ -9881,7 +10059,7 @@
         <p:spPr/>
         <p:txBody>
           <a:bodyPr>
-            <a:normAutofit fontScale="85000" lnSpcReduction="10000"/>
+            <a:normAutofit fontScale="92500" lnSpcReduction="20000"/>
           </a:bodyPr>
           <a:lstStyle/>
           <a:p>
@@ -9914,66 +10092,12 @@
             </a:pPr>
             <a:r>
               <a:rPr lang="en-GB" dirty="0" smtClean="0"/>
-              <a:t>If a binary isn’t compatible with the target device, an error will be returned either during </a:t>
-            </a:r>
-            <a:r>
-              <a:rPr lang="en-GB" b="1" dirty="0" err="1" smtClean="0">
-                <a:solidFill>
-                  <a:srgbClr val="3366FF"/>
-                </a:solidFill>
-                <a:latin typeface="Courier New"/>
-                <a:cs typeface="Courier New"/>
-              </a:rPr>
-              <a:t>clCreateProgramWithBinary</a:t>
-            </a:r>
-            <a:r>
-              <a:rPr lang="en-GB" b="1" dirty="0" smtClean="0">
-                <a:solidFill>
-                  <a:srgbClr val="3366FF"/>
-                </a:solidFill>
-                <a:latin typeface="Courier New"/>
-                <a:cs typeface="Courier New"/>
-              </a:rPr>
-              <a:t>()</a:t>
-            </a:r>
-            <a:r>
-              <a:rPr lang="en-GB" dirty="0" smtClean="0">
-                <a:latin typeface="Courier New"/>
-                <a:cs typeface="Courier New"/>
-              </a:rPr>
-              <a:t> </a:t>
-            </a:r>
-            <a:r>
-              <a:rPr lang="en-GB" dirty="0" smtClean="0"/>
-              <a:t>or </a:t>
-            </a:r>
-            <a:r>
-              <a:rPr lang="en-GB" b="1" dirty="0" err="1" smtClean="0">
-                <a:solidFill>
-                  <a:srgbClr val="3366FF"/>
-                </a:solidFill>
-                <a:latin typeface="Courier New"/>
-                <a:cs typeface="Courier New"/>
-              </a:rPr>
-              <a:t>clBuildProgram</a:t>
-            </a:r>
-            <a:r>
-              <a:rPr lang="en-GB" b="1" dirty="0" smtClean="0">
-                <a:solidFill>
-                  <a:srgbClr val="3366FF"/>
-                </a:solidFill>
-                <a:latin typeface="Courier New"/>
-                <a:cs typeface="Courier New"/>
-              </a:rPr>
-              <a:t>()</a:t>
-            </a:r>
-          </a:p>
-          <a:p>
-            <a:pPr>
-              <a:lnSpc>
-                <a:spcPct val="110000"/>
-              </a:lnSpc>
-            </a:pPr>
+              <a:t>If a binary isn’t compatible with the target device, an error will be returned either </a:t>
+            </a:r>
+            <a:r>
+              <a:rPr lang="en-GB" dirty="0" smtClean="0"/>
+              <a:t>when creating the program or building it</a:t>
+            </a:r>
             <a:endParaRPr lang="en-GB" dirty="0"/>
           </a:p>
         </p:txBody>
@@ -10113,13 +10237,33 @@
           <a:p>
             <a:r>
               <a:rPr lang="en-GB" dirty="0" smtClean="0"/>
-              <a:t>This defines an LLVM-based binary format that is designed to be portable, allowing us to use the same binary across many platforms</a:t>
-            </a:r>
-          </a:p>
-          <a:p>
-            <a:r>
-              <a:rPr lang="en-GB" dirty="0" smtClean="0"/>
-              <a:t>Not yet supported by all vendors</a:t>
+              <a:t>This defines </a:t>
+            </a:r>
+            <a:r>
+              <a:rPr lang="en-GB" dirty="0" smtClean="0"/>
+              <a:t>a </a:t>
+            </a:r>
+            <a:r>
+              <a:rPr lang="en-GB" dirty="0" smtClean="0"/>
+              <a:t>binary format that is designed to be portable, allowing us to use the same binary across many platforms</a:t>
+            </a:r>
+          </a:p>
+          <a:p>
+            <a:r>
+              <a:rPr lang="en-GB" dirty="0" smtClean="0"/>
+              <a:t>Not yet supported by all </a:t>
+            </a:r>
+            <a:r>
+              <a:rPr lang="en-GB" dirty="0" smtClean="0"/>
+              <a:t>vendors, but SPIR-V is now core in </a:t>
+            </a:r>
+            <a:r>
+              <a:rPr lang="en-GB" dirty="0" err="1" smtClean="0"/>
+              <a:t>OpenCL</a:t>
+            </a:r>
+            <a:r>
+              <a:rPr lang="en-GB" dirty="0" smtClean="0"/>
+              <a:t> 2.1</a:t>
             </a:r>
             <a:endParaRPr lang="en-GB" dirty="0"/>
           </a:p>
@@ -10235,8 +10379,21 @@
           <a:p>
             <a:r>
               <a:rPr lang="en-GB" dirty="0" smtClean="0"/>
-              <a:t>This script then becomes part of the build process:</a:t>
-            </a:r>
+              <a:t>This script then becomes part of the build </a:t>
+            </a:r>
+            <a:r>
+              <a:rPr lang="en-GB" dirty="0" smtClean="0"/>
+              <a:t>process in the </a:t>
+            </a:r>
+            <a:r>
+              <a:rPr lang="en-GB" dirty="0" err="1" smtClean="0"/>
+              <a:t>Makefile</a:t>
+            </a:r>
+            <a:r>
+              <a:rPr lang="en-GB" dirty="0" smtClean="0"/>
+              <a:t>:</a:t>
+            </a:r>
+            <a:endParaRPr lang="en-GB" dirty="0" smtClean="0"/>
           </a:p>
           <a:p>
             <a:pPr marL="400050" lvl="1" indent="0">
@@ -10354,6 +10511,14 @@
   <p:clrMapOvr>
     <a:masterClrMapping/>
   </p:clrMapOvr>
+  <mc:AlternateContent xmlns:mc="http://schemas.openxmlformats.org/markup-compatibility/2006">
+    <mc:Choice xmlns:p14="http://schemas.microsoft.com/office/powerpoint/2010/main" Requires="p14">
+      <p:transition spd="slow" p14:dur="2000"/>
+    </mc:Choice>
+    <mc:Fallback>
+      <p:transition xmlns:p14="http://schemas.microsoft.com/office/powerpoint/2010/main" spd="slow"/>
+    </mc:Fallback>
+  </mc:AlternateContent>
   <p:timing>
     <p:tnLst>
       <p:par>
@@ -10820,6 +10985,14 @@
   <p:clrMapOvr>
     <a:masterClrMapping/>
   </p:clrMapOvr>
+  <mc:AlternateContent xmlns:mc="http://schemas.openxmlformats.org/markup-compatibility/2006">
+    <mc:Choice xmlns:p14="http://schemas.microsoft.com/office/powerpoint/2010/main" Requires="p14">
+      <p:transition spd="slow" p14:dur="2000"/>
+    </mc:Choice>
+    <mc:Fallback>
+      <p:transition xmlns:p14="http://schemas.microsoft.com/office/powerpoint/2010/main" spd="slow"/>
+    </mc:Fallback>
+  </mc:AlternateContent>
   <p:timing>
     <p:tnLst>
       <p:par>

</xml_diff>

<commit_message>
Update part 3 (and move a slide to part 2)
</commit_message>
<xml_diff>
--- a/slides/advanced_part2.pptx
+++ b/slides/advanced_part2.pptx
@@ -4,6 +4,9 @@
   <p:sldMasterIdLst>
     <p:sldMasterId id="2147483648" r:id="rId1"/>
   </p:sldMasterIdLst>
+  <p:notesMasterIdLst>
+    <p:notesMasterId r:id="rId24"/>
+  </p:notesMasterIdLst>
   <p:sldIdLst>
     <p:sldId id="257" r:id="rId2"/>
     <p:sldId id="258" r:id="rId3"/>
@@ -21,11 +24,12 @@
     <p:sldId id="270" r:id="rId15"/>
     <p:sldId id="271" r:id="rId16"/>
     <p:sldId id="272" r:id="rId17"/>
-    <p:sldId id="273" r:id="rId18"/>
-    <p:sldId id="274" r:id="rId19"/>
-    <p:sldId id="275" r:id="rId20"/>
-    <p:sldId id="276" r:id="rId21"/>
-    <p:sldId id="277" r:id="rId22"/>
+    <p:sldId id="278" r:id="rId18"/>
+    <p:sldId id="273" r:id="rId19"/>
+    <p:sldId id="274" r:id="rId20"/>
+    <p:sldId id="275" r:id="rId21"/>
+    <p:sldId id="276" r:id="rId22"/>
+    <p:sldId id="277" r:id="rId23"/>
   </p:sldIdLst>
   <p:sldSz cx="9144000" cy="6858000" type="screen4x3"/>
   <p:notesSz cx="6858000" cy="9144000"/>
@@ -125,6 +129,451 @@
     </a:lvl9pPr>
   </p:defaultTextStyle>
 </p:presentation>
+</file>
+
+<file path=ppt/notesMasters/notesMaster1.xml><?xml version="1.0" encoding="utf-8"?>
+<p:notesMaster xmlns:a="http://schemas.openxmlformats.org/drawingml/2006/main" xmlns:r="http://schemas.openxmlformats.org/officeDocument/2006/relationships" xmlns:p="http://schemas.openxmlformats.org/presentationml/2006/main">
+  <p:cSld>
+    <p:bg>
+      <p:bgRef idx="1001">
+        <a:schemeClr val="bg1"/>
+      </p:bgRef>
+    </p:bg>
+    <p:spTree>
+      <p:nvGrpSpPr>
+        <p:cNvPr id="1" name=""/>
+        <p:cNvGrpSpPr/>
+        <p:nvPr/>
+      </p:nvGrpSpPr>
+      <p:grpSpPr>
+        <a:xfrm>
+          <a:off x="0" y="0"/>
+          <a:ext cx="0" cy="0"/>
+          <a:chOff x="0" y="0"/>
+          <a:chExt cx="0" cy="0"/>
+        </a:xfrm>
+      </p:grpSpPr>
+      <p:sp>
+        <p:nvSpPr>
+          <p:cNvPr id="2" name="Header Placeholder 1"/>
+          <p:cNvSpPr>
+            <a:spLocks noGrp="1"/>
+          </p:cNvSpPr>
+          <p:nvPr>
+            <p:ph type="hdr" sz="quarter"/>
+          </p:nvPr>
+        </p:nvSpPr>
+        <p:spPr>
+          <a:xfrm>
+            <a:off x="0" y="0"/>
+            <a:ext cx="2971800" cy="457200"/>
+          </a:xfrm>
+          <a:prstGeom prst="rect">
+            <a:avLst/>
+          </a:prstGeom>
+        </p:spPr>
+        <p:txBody>
+          <a:bodyPr vert="horz" lIns="91440" tIns="45720" rIns="91440" bIns="45720" rtlCol="0"/>
+          <a:lstStyle>
+            <a:lvl1pPr algn="l">
+              <a:defRPr sz="1200"/>
+            </a:lvl1pPr>
+          </a:lstStyle>
+          <a:p>
+            <a:endParaRPr lang="en-US"/>
+          </a:p>
+        </p:txBody>
+      </p:sp>
+      <p:sp>
+        <p:nvSpPr>
+          <p:cNvPr id="3" name="Date Placeholder 2"/>
+          <p:cNvSpPr>
+            <a:spLocks noGrp="1"/>
+          </p:cNvSpPr>
+          <p:nvPr>
+            <p:ph type="dt" idx="1"/>
+          </p:nvPr>
+        </p:nvSpPr>
+        <p:spPr>
+          <a:xfrm>
+            <a:off x="3884613" y="0"/>
+            <a:ext cx="2971800" cy="457200"/>
+          </a:xfrm>
+          <a:prstGeom prst="rect">
+            <a:avLst/>
+          </a:prstGeom>
+        </p:spPr>
+        <p:txBody>
+          <a:bodyPr vert="horz" lIns="91440" tIns="45720" rIns="91440" bIns="45720" rtlCol="0"/>
+          <a:lstStyle>
+            <a:lvl1pPr algn="r">
+              <a:defRPr sz="1200"/>
+            </a:lvl1pPr>
+          </a:lstStyle>
+          <a:p>
+            <a:fld id="{7FB74D45-CC88-7D46-9D48-9989C6A85D58}" type="datetimeFigureOut">
+              <a:rPr lang="en-US" smtClean="0"/>
+              <a:t>06/05/15</a:t>
+            </a:fld>
+            <a:endParaRPr lang="en-US"/>
+          </a:p>
+        </p:txBody>
+      </p:sp>
+      <p:sp>
+        <p:nvSpPr>
+          <p:cNvPr id="4" name="Slide Image Placeholder 3"/>
+          <p:cNvSpPr>
+            <a:spLocks noGrp="1" noRot="1" noChangeAspect="1"/>
+          </p:cNvSpPr>
+          <p:nvPr>
+            <p:ph type="sldImg" idx="2"/>
+          </p:nvPr>
+        </p:nvSpPr>
+        <p:spPr>
+          <a:xfrm>
+            <a:off x="1143000" y="685800"/>
+            <a:ext cx="4572000" cy="3429000"/>
+          </a:xfrm>
+          <a:prstGeom prst="rect">
+            <a:avLst/>
+          </a:prstGeom>
+          <a:noFill/>
+          <a:ln w="12700">
+            <a:solidFill>
+              <a:prstClr val="black"/>
+            </a:solidFill>
+          </a:ln>
+        </p:spPr>
+        <p:txBody>
+          <a:bodyPr vert="horz" lIns="91440" tIns="45720" rIns="91440" bIns="45720" rtlCol="0" anchor="ctr"/>
+          <a:lstStyle/>
+          <a:p>
+            <a:endParaRPr lang="en-US"/>
+          </a:p>
+        </p:txBody>
+      </p:sp>
+      <p:sp>
+        <p:nvSpPr>
+          <p:cNvPr id="5" name="Notes Placeholder 4"/>
+          <p:cNvSpPr>
+            <a:spLocks noGrp="1"/>
+          </p:cNvSpPr>
+          <p:nvPr>
+            <p:ph type="body" sz="quarter" idx="3"/>
+          </p:nvPr>
+        </p:nvSpPr>
+        <p:spPr>
+          <a:xfrm>
+            <a:off x="685800" y="4343400"/>
+            <a:ext cx="5486400" cy="4114800"/>
+          </a:xfrm>
+          <a:prstGeom prst="rect">
+            <a:avLst/>
+          </a:prstGeom>
+        </p:spPr>
+        <p:txBody>
+          <a:bodyPr vert="horz" lIns="91440" tIns="45720" rIns="91440" bIns="45720" rtlCol="0"/>
+          <a:lstStyle/>
+          <a:p>
+            <a:pPr lvl="0"/>
+            <a:r>
+              <a:rPr lang="en-GB" smtClean="0"/>
+              <a:t>Click to edit Master text styles</a:t>
+            </a:r>
+          </a:p>
+          <a:p>
+            <a:pPr lvl="1"/>
+            <a:r>
+              <a:rPr lang="en-GB" smtClean="0"/>
+              <a:t>Second level</a:t>
+            </a:r>
+          </a:p>
+          <a:p>
+            <a:pPr lvl="2"/>
+            <a:r>
+              <a:rPr lang="en-GB" smtClean="0"/>
+              <a:t>Third level</a:t>
+            </a:r>
+          </a:p>
+          <a:p>
+            <a:pPr lvl="3"/>
+            <a:r>
+              <a:rPr lang="en-GB" smtClean="0"/>
+              <a:t>Fourth level</a:t>
+            </a:r>
+          </a:p>
+          <a:p>
+            <a:pPr lvl="4"/>
+            <a:r>
+              <a:rPr lang="en-GB" smtClean="0"/>
+              <a:t>Fifth level</a:t>
+            </a:r>
+            <a:endParaRPr lang="en-US"/>
+          </a:p>
+        </p:txBody>
+      </p:sp>
+      <p:sp>
+        <p:nvSpPr>
+          <p:cNvPr id="6" name="Footer Placeholder 5"/>
+          <p:cNvSpPr>
+            <a:spLocks noGrp="1"/>
+          </p:cNvSpPr>
+          <p:nvPr>
+            <p:ph type="ftr" sz="quarter" idx="4"/>
+          </p:nvPr>
+        </p:nvSpPr>
+        <p:spPr>
+          <a:xfrm>
+            <a:off x="0" y="8685213"/>
+            <a:ext cx="2971800" cy="457200"/>
+          </a:xfrm>
+          <a:prstGeom prst="rect">
+            <a:avLst/>
+          </a:prstGeom>
+        </p:spPr>
+        <p:txBody>
+          <a:bodyPr vert="horz" lIns="91440" tIns="45720" rIns="91440" bIns="45720" rtlCol="0" anchor="b"/>
+          <a:lstStyle>
+            <a:lvl1pPr algn="l">
+              <a:defRPr sz="1200"/>
+            </a:lvl1pPr>
+          </a:lstStyle>
+          <a:p>
+            <a:endParaRPr lang="en-US"/>
+          </a:p>
+        </p:txBody>
+      </p:sp>
+      <p:sp>
+        <p:nvSpPr>
+          <p:cNvPr id="7" name="Slide Number Placeholder 6"/>
+          <p:cNvSpPr>
+            <a:spLocks noGrp="1"/>
+          </p:cNvSpPr>
+          <p:nvPr>
+            <p:ph type="sldNum" sz="quarter" idx="5"/>
+          </p:nvPr>
+        </p:nvSpPr>
+        <p:spPr>
+          <a:xfrm>
+            <a:off x="3884613" y="8685213"/>
+            <a:ext cx="2971800" cy="457200"/>
+          </a:xfrm>
+          <a:prstGeom prst="rect">
+            <a:avLst/>
+          </a:prstGeom>
+        </p:spPr>
+        <p:txBody>
+          <a:bodyPr vert="horz" lIns="91440" tIns="45720" rIns="91440" bIns="45720" rtlCol="0" anchor="b"/>
+          <a:lstStyle>
+            <a:lvl1pPr algn="r">
+              <a:defRPr sz="1200"/>
+            </a:lvl1pPr>
+          </a:lstStyle>
+          <a:p>
+            <a:fld id="{E0B00886-CC17-8E42-AE02-995FCC132C1C}" type="slidenum">
+              <a:rPr lang="en-US" smtClean="0"/>
+              <a:t>‹#›</a:t>
+            </a:fld>
+            <a:endParaRPr lang="en-US"/>
+          </a:p>
+        </p:txBody>
+      </p:sp>
+    </p:spTree>
+    <p:extLst>
+      <p:ext uri="{BB962C8B-B14F-4D97-AF65-F5344CB8AC3E}">
+        <p14:creationId xmlns:p14="http://schemas.microsoft.com/office/powerpoint/2010/main" val="2435886276"/>
+      </p:ext>
+    </p:extLst>
+  </p:cSld>
+  <p:clrMap bg1="lt1" tx1="dk1" bg2="lt2" tx2="dk2" accent1="accent1" accent2="accent2" accent3="accent3" accent4="accent4" accent5="accent5" accent6="accent6" hlink="hlink" folHlink="folHlink"/>
+  <p:notesStyle>
+    <a:lvl1pPr marL="0" algn="l" defTabSz="457200" rtl="0" eaLnBrk="1" latinLnBrk="0" hangingPunct="1">
+      <a:defRPr sz="1200" kern="1200">
+        <a:solidFill>
+          <a:schemeClr val="tx1"/>
+        </a:solidFill>
+        <a:latin typeface="+mn-lt"/>
+        <a:ea typeface="+mn-ea"/>
+        <a:cs typeface="+mn-cs"/>
+      </a:defRPr>
+    </a:lvl1pPr>
+    <a:lvl2pPr marL="457200" algn="l" defTabSz="457200" rtl="0" eaLnBrk="1" latinLnBrk="0" hangingPunct="1">
+      <a:defRPr sz="1200" kern="1200">
+        <a:solidFill>
+          <a:schemeClr val="tx1"/>
+        </a:solidFill>
+        <a:latin typeface="+mn-lt"/>
+        <a:ea typeface="+mn-ea"/>
+        <a:cs typeface="+mn-cs"/>
+      </a:defRPr>
+    </a:lvl2pPr>
+    <a:lvl3pPr marL="914400" algn="l" defTabSz="457200" rtl="0" eaLnBrk="1" latinLnBrk="0" hangingPunct="1">
+      <a:defRPr sz="1200" kern="1200">
+        <a:solidFill>
+          <a:schemeClr val="tx1"/>
+        </a:solidFill>
+        <a:latin typeface="+mn-lt"/>
+        <a:ea typeface="+mn-ea"/>
+        <a:cs typeface="+mn-cs"/>
+      </a:defRPr>
+    </a:lvl3pPr>
+    <a:lvl4pPr marL="1371600" algn="l" defTabSz="457200" rtl="0" eaLnBrk="1" latinLnBrk="0" hangingPunct="1">
+      <a:defRPr sz="1200" kern="1200">
+        <a:solidFill>
+          <a:schemeClr val="tx1"/>
+        </a:solidFill>
+        <a:latin typeface="+mn-lt"/>
+        <a:ea typeface="+mn-ea"/>
+        <a:cs typeface="+mn-cs"/>
+      </a:defRPr>
+    </a:lvl4pPr>
+    <a:lvl5pPr marL="1828800" algn="l" defTabSz="457200" rtl="0" eaLnBrk="1" latinLnBrk="0" hangingPunct="1">
+      <a:defRPr sz="1200" kern="1200">
+        <a:solidFill>
+          <a:schemeClr val="tx1"/>
+        </a:solidFill>
+        <a:latin typeface="+mn-lt"/>
+        <a:ea typeface="+mn-ea"/>
+        <a:cs typeface="+mn-cs"/>
+      </a:defRPr>
+    </a:lvl5pPr>
+    <a:lvl6pPr marL="2286000" algn="l" defTabSz="457200" rtl="0" eaLnBrk="1" latinLnBrk="0" hangingPunct="1">
+      <a:defRPr sz="1200" kern="1200">
+        <a:solidFill>
+          <a:schemeClr val="tx1"/>
+        </a:solidFill>
+        <a:latin typeface="+mn-lt"/>
+        <a:ea typeface="+mn-ea"/>
+        <a:cs typeface="+mn-cs"/>
+      </a:defRPr>
+    </a:lvl6pPr>
+    <a:lvl7pPr marL="2743200" algn="l" defTabSz="457200" rtl="0" eaLnBrk="1" latinLnBrk="0" hangingPunct="1">
+      <a:defRPr sz="1200" kern="1200">
+        <a:solidFill>
+          <a:schemeClr val="tx1"/>
+        </a:solidFill>
+        <a:latin typeface="+mn-lt"/>
+        <a:ea typeface="+mn-ea"/>
+        <a:cs typeface="+mn-cs"/>
+      </a:defRPr>
+    </a:lvl7pPr>
+    <a:lvl8pPr marL="3200400" algn="l" defTabSz="457200" rtl="0" eaLnBrk="1" latinLnBrk="0" hangingPunct="1">
+      <a:defRPr sz="1200" kern="1200">
+        <a:solidFill>
+          <a:schemeClr val="tx1"/>
+        </a:solidFill>
+        <a:latin typeface="+mn-lt"/>
+        <a:ea typeface="+mn-ea"/>
+        <a:cs typeface="+mn-cs"/>
+      </a:defRPr>
+    </a:lvl8pPr>
+    <a:lvl9pPr marL="3657600" algn="l" defTabSz="457200" rtl="0" eaLnBrk="1" latinLnBrk="0" hangingPunct="1">
+      <a:defRPr sz="1200" kern="1200">
+        <a:solidFill>
+          <a:schemeClr val="tx1"/>
+        </a:solidFill>
+        <a:latin typeface="+mn-lt"/>
+        <a:ea typeface="+mn-ea"/>
+        <a:cs typeface="+mn-cs"/>
+      </a:defRPr>
+    </a:lvl9pPr>
+  </p:notesStyle>
+</p:notesMaster>
+</file>
+
+<file path=ppt/notesSlides/notesSlide1.xml><?xml version="1.0" encoding="utf-8"?>
+<p:notes xmlns:a="http://schemas.openxmlformats.org/drawingml/2006/main" xmlns:r="http://schemas.openxmlformats.org/officeDocument/2006/relationships" xmlns:p="http://schemas.openxmlformats.org/presentationml/2006/main">
+  <p:cSld>
+    <p:spTree>
+      <p:nvGrpSpPr>
+        <p:cNvPr id="1" name=""/>
+        <p:cNvGrpSpPr/>
+        <p:nvPr/>
+      </p:nvGrpSpPr>
+      <p:grpSpPr>
+        <a:xfrm>
+          <a:off x="0" y="0"/>
+          <a:ext cx="0" cy="0"/>
+          <a:chOff x="0" y="0"/>
+          <a:chExt cx="0" cy="0"/>
+        </a:xfrm>
+      </p:grpSpPr>
+      <p:sp>
+        <p:nvSpPr>
+          <p:cNvPr id="2" name="Slide Image Placeholder 1"/>
+          <p:cNvSpPr>
+            <a:spLocks noGrp="1" noRot="1" noChangeAspect="1"/>
+          </p:cNvSpPr>
+          <p:nvPr>
+            <p:ph type="sldImg"/>
+          </p:nvPr>
+        </p:nvSpPr>
+        <p:spPr/>
+      </p:sp>
+      <p:sp>
+        <p:nvSpPr>
+          <p:cNvPr id="3" name="Notes Placeholder 2"/>
+          <p:cNvSpPr>
+            <a:spLocks noGrp="1"/>
+          </p:cNvSpPr>
+          <p:nvPr>
+            <p:ph type="body" idx="1"/>
+          </p:nvPr>
+        </p:nvSpPr>
+        <p:spPr/>
+        <p:txBody>
+          <a:bodyPr/>
+          <a:lstStyle/>
+          <a:p>
+            <a:r>
+              <a:rPr lang="en-GB" dirty="0" smtClean="0"/>
+              <a:t>Hints</a:t>
+            </a:r>
+            <a:r>
+              <a:rPr lang="en-GB" baseline="0" dirty="0" smtClean="0"/>
+              <a:t> to compiler to make it go faster. </a:t>
+            </a:r>
+          </a:p>
+          <a:p>
+            <a:endParaRPr lang="en-GB" dirty="0"/>
+          </a:p>
+        </p:txBody>
+      </p:sp>
+      <p:sp>
+        <p:nvSpPr>
+          <p:cNvPr id="4" name="Slide Number Placeholder 3"/>
+          <p:cNvSpPr>
+            <a:spLocks noGrp="1"/>
+          </p:cNvSpPr>
+          <p:nvPr>
+            <p:ph type="sldNum" sz="quarter" idx="10"/>
+          </p:nvPr>
+        </p:nvSpPr>
+        <p:spPr/>
+        <p:txBody>
+          <a:bodyPr/>
+          <a:lstStyle/>
+          <a:p>
+            <a:fld id="{9B3F2D69-97A9-4C41-91BD-6A22F8270148}" type="slidenum">
+              <a:rPr lang="en-GB" smtClean="0"/>
+              <a:pPr/>
+              <a:t>17</a:t>
+            </a:fld>
+            <a:endParaRPr lang="en-GB"/>
+          </a:p>
+        </p:txBody>
+      </p:sp>
+    </p:spTree>
+    <p:extLst>
+      <p:ext uri="{BB962C8B-B14F-4D97-AF65-F5344CB8AC3E}">
+        <p14:creationId xmlns:p14="http://schemas.microsoft.com/office/powerpoint/2010/main" val="393086129"/>
+      </p:ext>
+    </p:extLst>
+  </p:cSld>
+  <p:clrMapOvr>
+    <a:masterClrMapping/>
+  </p:clrMapOvr>
+</p:notes>
 </file>
 
 <file path=ppt/slideLayouts/slideLayout1.xml><?xml version="1.0" encoding="utf-8"?>
@@ -3140,15 +3589,7 @@
             </a:r>
             <a:r>
               <a:rPr lang="en-GB" dirty="0" smtClean="0"/>
-              <a:t> Topics – </a:t>
-            </a:r>
-            <a:r>
-              <a:rPr lang="en-GB" dirty="0" smtClean="0"/>
-              <a:t>Kernel </a:t>
-            </a:r>
-            <a:r>
-              <a:rPr lang="en-GB" dirty="0" smtClean="0"/>
-              <a:t>Compilation</a:t>
+              <a:t> Topics – Kernel Compilation</a:t>
             </a:r>
             <a:endParaRPr lang="en-GB" dirty="0"/>
           </a:p>
@@ -4178,11 +4619,11 @@
   <p:clrMapOvr>
     <a:masterClrMapping/>
   </p:clrMapOvr>
-  <mc:AlternateContent xmlns:mc="http://schemas.openxmlformats.org/markup-compatibility/2006">
-    <mc:Choice xmlns:p14="http://schemas.microsoft.com/office/powerpoint/2010/main" Requires="p14">
+  <mc:AlternateContent xmlns:mc="http://schemas.openxmlformats.org/markup-compatibility/2006" xmlns:p14="http://schemas.microsoft.com/office/powerpoint/2010/main">
+    <mc:Choice Requires="p14">
       <p:transition spd="slow" p14:dur="2000"/>
     </mc:Choice>
-    <mc:Fallback>
+    <mc:Fallback xmlns="">
       <p:transition xmlns:p14="http://schemas.microsoft.com/office/powerpoint/2010/main" spd="slow"/>
     </mc:Fallback>
   </mc:AlternateContent>
@@ -4261,15 +4702,7 @@
           <a:p>
             <a:r>
               <a:rPr lang="en-GB" dirty="0" smtClean="0"/>
-              <a:t>On NVIDIA platforms the ‘binary’ retrieved </a:t>
-            </a:r>
-            <a:r>
-              <a:rPr lang="en-GB" dirty="0" smtClean="0"/>
-              <a:t>is </a:t>
-            </a:r>
-            <a:r>
-              <a:rPr lang="en-GB" dirty="0" smtClean="0"/>
-              <a:t>actually PTX, their abstract assembly language</a:t>
+              <a:t>On NVIDIA platforms the ‘binary’ retrieved is actually PTX, their abstract assembly language</a:t>
             </a:r>
           </a:p>
           <a:p>
@@ -4351,27 +4784,7 @@
           <a:p>
             <a:r>
               <a:rPr lang="en-GB" dirty="0" smtClean="0"/>
-              <a:t>Other vendors may </a:t>
-            </a:r>
-            <a:r>
-              <a:rPr lang="en-GB" dirty="0" smtClean="0"/>
-              <a:t>provide </a:t>
-            </a:r>
-            <a:r>
-              <a:rPr lang="en-GB" dirty="0" smtClean="0"/>
-              <a:t>an offline compiler </a:t>
-            </a:r>
-            <a:r>
-              <a:rPr lang="en-GB" dirty="0" smtClean="0"/>
-              <a:t>which </a:t>
-            </a:r>
-            <a:r>
-              <a:rPr lang="en-GB" dirty="0" smtClean="0"/>
-              <a:t>can generate LLVM/SPIR </a:t>
-            </a:r>
-            <a:r>
-              <a:rPr lang="en-GB" dirty="0" smtClean="0"/>
-              <a:t>or assembly</a:t>
+              <a:t>Other vendors may provide an offline compiler which can generate LLVM/SPIR or assembly</a:t>
             </a:r>
             <a:endParaRPr lang="en-GB" dirty="0"/>
           </a:p>
@@ -4650,13 +5063,6 @@
               </a:rPr>
               <a:t>;</a:t>
             </a:r>
-            <a:endParaRPr lang="en-GB" b="1" dirty="0" smtClean="0">
-              <a:solidFill>
-                <a:srgbClr val="3366FF"/>
-              </a:solidFill>
-              <a:latin typeface="Courier New"/>
-              <a:cs typeface="Courier New"/>
-            </a:endParaRPr>
           </a:p>
           <a:p>
             <a:r>
@@ -4704,7 +5110,32 @@
                 <a:latin typeface="Courier New"/>
                 <a:cs typeface="Courier New"/>
               </a:rPr>
-              <a:t>&lt;</a:t>
+              <a:t>&lt;CL_KERNEL_NUM_ARGS&gt;();</a:t>
+            </a:r>
+          </a:p>
+          <a:p>
+            <a:pPr marL="400050" lvl="1" indent="0">
+              <a:buNone/>
+            </a:pPr>
+            <a:r>
+              <a:rPr lang="en-GB" b="1" dirty="0" err="1">
+                <a:solidFill>
+                  <a:srgbClr val="3366FF"/>
+                </a:solidFill>
+                <a:latin typeface="Courier New"/>
+                <a:cs typeface="Courier New"/>
+              </a:rPr>
+              <a:t>k</a:t>
+            </a:r>
+            <a:r>
+              <a:rPr lang="en-GB" b="1" dirty="0" err="1" smtClean="0">
+                <a:solidFill>
+                  <a:srgbClr val="3366FF"/>
+                </a:solidFill>
+                <a:latin typeface="Courier New"/>
+                <a:cs typeface="Courier New"/>
+              </a:rPr>
+              <a:t>ernel.getArgInfo</a:t>
             </a:r>
             <a:r>
               <a:rPr lang="en-GB" b="1" dirty="0" smtClean="0">
@@ -4714,57 +5145,8 @@
                 <a:latin typeface="Courier New"/>
                 <a:cs typeface="Courier New"/>
               </a:rPr>
-              <a:t>CL_KERNEL_NUM_ARGS&gt;();</a:t>
-            </a:r>
-            <a:endParaRPr lang="en-GB" b="1" dirty="0" smtClean="0">
-              <a:solidFill>
-                <a:srgbClr val="3366FF"/>
-              </a:solidFill>
-              <a:latin typeface="Courier New"/>
-              <a:cs typeface="Courier New"/>
-            </a:endParaRPr>
-          </a:p>
-          <a:p>
-            <a:pPr marL="400050" lvl="1" indent="0">
-              <a:buNone/>
-            </a:pPr>
-            <a:r>
-              <a:rPr lang="en-GB" b="1" dirty="0" err="1">
-                <a:solidFill>
-                  <a:srgbClr val="3366FF"/>
-                </a:solidFill>
-                <a:latin typeface="Courier New"/>
-                <a:cs typeface="Courier New"/>
-              </a:rPr>
-              <a:t>k</a:t>
-            </a:r>
-            <a:r>
-              <a:rPr lang="en-GB" b="1" dirty="0" err="1" smtClean="0">
-                <a:solidFill>
-                  <a:srgbClr val="3366FF"/>
-                </a:solidFill>
-                <a:latin typeface="Courier New"/>
-                <a:cs typeface="Courier New"/>
-              </a:rPr>
-              <a:t>ernel.getArgInfo</a:t>
-            </a:r>
-            <a:r>
-              <a:rPr lang="en-GB" b="1" dirty="0" smtClean="0">
-                <a:solidFill>
-                  <a:srgbClr val="3366FF"/>
-                </a:solidFill>
-                <a:latin typeface="Courier New"/>
-                <a:cs typeface="Courier New"/>
-              </a:rPr>
               <a:t>&lt;CL_KERNEL_ARG*&gt;();</a:t>
             </a:r>
-            <a:endParaRPr lang="en-GB" b="1" dirty="0" smtClean="0">
-              <a:solidFill>
-                <a:srgbClr val="3366FF"/>
-              </a:solidFill>
-              <a:latin typeface="Courier New"/>
-              <a:cs typeface="Courier New"/>
-            </a:endParaRPr>
           </a:p>
           <a:p>
             <a:pPr marL="0" indent="0">
@@ -4775,14 +5157,7 @@
                 <a:latin typeface="Trebuchet MS"/>
                 <a:cs typeface="Trebuchet MS"/>
               </a:rPr>
-              <a:t>	(</a:t>
-            </a:r>
-            <a:r>
-              <a:rPr lang="en-GB" dirty="0" smtClean="0">
-                <a:latin typeface="Trebuchet MS"/>
-                <a:cs typeface="Trebuchet MS"/>
-              </a:rPr>
-              <a:t>the program should be compiled using the</a:t>
+              <a:t>	(the program should be compiled using the</a:t>
             </a:r>
           </a:p>
           <a:p>
@@ -4797,17 +5172,7 @@
                 <a:latin typeface="Courier New"/>
                 <a:cs typeface="Courier New"/>
               </a:rPr>
-              <a:t>	-</a:t>
-            </a:r>
-            <a:r>
-              <a:rPr lang="en-GB" b="1" dirty="0" smtClean="0">
-                <a:solidFill>
-                  <a:srgbClr val="3366FF"/>
-                </a:solidFill>
-                <a:latin typeface="Courier New"/>
-                <a:cs typeface="Courier New"/>
-              </a:rPr>
-              <a:t>cl-kernel-</a:t>
+              <a:t>	-cl-kernel-</a:t>
             </a:r>
             <a:r>
               <a:rPr lang="en-GB" b="1" dirty="0" err="1" smtClean="0">
@@ -4953,7 +5318,42 @@
                 <a:latin typeface="Courier New"/>
                 <a:cs typeface="Courier New"/>
               </a:rPr>
-              <a:t>program.</a:t>
+              <a:t>program.compile</a:t>
+            </a:r>
+            <a:r>
+              <a:rPr lang="en-GB" b="1" dirty="0" smtClean="0">
+                <a:solidFill>
+                  <a:srgbClr val="3366FF"/>
+                </a:solidFill>
+                <a:latin typeface="Courier New"/>
+                <a:cs typeface="Courier New"/>
+              </a:rPr>
+              <a:t>()</a:t>
+            </a:r>
+          </a:p>
+          <a:p>
+            <a:pPr marL="400050" lvl="1" indent="0">
+              <a:buNone/>
+            </a:pPr>
+            <a:r>
+              <a:rPr lang="en-GB" b="1" dirty="0">
+                <a:solidFill>
+                  <a:srgbClr val="3366FF"/>
+                </a:solidFill>
+                <a:latin typeface="Courier New"/>
+                <a:cs typeface="Courier New"/>
+              </a:rPr>
+              <a:t>c</a:t>
+            </a:r>
+            <a:r>
+              <a:rPr lang="en-GB" b="1" dirty="0" smtClean="0">
+                <a:solidFill>
+                  <a:srgbClr val="3366FF"/>
+                </a:solidFill>
+                <a:latin typeface="Courier New"/>
+                <a:cs typeface="Courier New"/>
+              </a:rPr>
+              <a:t>l::Program::</a:t>
             </a:r>
             <a:r>
               <a:rPr lang="en-GB" b="1" dirty="0" err="1" smtClean="0">
@@ -4963,7 +5363,7 @@
                 <a:latin typeface="Courier New"/>
                 <a:cs typeface="Courier New"/>
               </a:rPr>
-              <a:t>compile</a:t>
+              <a:t>linkProgram</a:t>
             </a:r>
             <a:r>
               <a:rPr lang="en-GB" b="1" dirty="0" smtClean="0">
@@ -4977,68 +5377,9 @@
             </a:r>
           </a:p>
           <a:p>
-            <a:pPr marL="400050" lvl="1" indent="0">
-              <a:buNone/>
-            </a:pPr>
-            <a:r>
-              <a:rPr lang="en-GB" b="1" dirty="0">
-                <a:solidFill>
-                  <a:srgbClr val="3366FF"/>
-                </a:solidFill>
-                <a:latin typeface="Courier New"/>
-                <a:cs typeface="Courier New"/>
-              </a:rPr>
-              <a:t>c</a:t>
-            </a:r>
-            <a:r>
-              <a:rPr lang="en-GB" b="1" dirty="0" smtClean="0">
-                <a:solidFill>
-                  <a:srgbClr val="3366FF"/>
-                </a:solidFill>
-                <a:latin typeface="Courier New"/>
-                <a:cs typeface="Courier New"/>
-              </a:rPr>
-              <a:t>l::</a:t>
-            </a:r>
-            <a:r>
-              <a:rPr lang="en-GB" b="1" dirty="0" smtClean="0">
-                <a:solidFill>
-                  <a:srgbClr val="3366FF"/>
-                </a:solidFill>
-                <a:latin typeface="Courier New"/>
-                <a:cs typeface="Courier New"/>
-              </a:rPr>
-              <a:t>Program::</a:t>
-            </a:r>
-            <a:r>
-              <a:rPr lang="en-GB" b="1" dirty="0" err="1" smtClean="0">
-                <a:solidFill>
-                  <a:srgbClr val="3366FF"/>
-                </a:solidFill>
-                <a:latin typeface="Courier New"/>
-                <a:cs typeface="Courier New"/>
-              </a:rPr>
-              <a:t>linkProgram</a:t>
-            </a:r>
-            <a:r>
-              <a:rPr lang="en-GB" b="1" dirty="0" smtClean="0">
-                <a:solidFill>
-                  <a:srgbClr val="3366FF"/>
-                </a:solidFill>
-                <a:latin typeface="Courier New"/>
-                <a:cs typeface="Courier New"/>
-              </a:rPr>
-              <a:t>()</a:t>
-            </a:r>
-          </a:p>
-          <a:p>
             <a:r>
               <a:rPr lang="en-GB" dirty="0" smtClean="0"/>
-              <a:t>This </a:t>
-            </a:r>
-            <a:r>
-              <a:rPr lang="en-GB" dirty="0" smtClean="0"/>
-              <a:t>enables the creation of libraries of compiled OpenCL functions, that can be linked to multiple program objects</a:t>
+              <a:t>This enables the creation of libraries of compiled OpenCL functions, that can be linked to multiple program objects</a:t>
             </a:r>
           </a:p>
         </p:txBody>
@@ -5865,6 +6206,187 @@
       </p:grpSpPr>
       <p:sp>
         <p:nvSpPr>
+          <p:cNvPr id="4" name="Title 3"/>
+          <p:cNvSpPr>
+            <a:spLocks noGrp="1"/>
+          </p:cNvSpPr>
+          <p:nvPr>
+            <p:ph type="title"/>
+          </p:nvPr>
+        </p:nvSpPr>
+        <p:spPr/>
+        <p:txBody>
+          <a:bodyPr/>
+          <a:lstStyle/>
+          <a:p>
+            <a:r>
+              <a:rPr lang="en-GB" dirty="0" smtClean="0"/>
+              <a:t>Compilation hints</a:t>
+            </a:r>
+            <a:endParaRPr lang="en-GB" dirty="0"/>
+          </a:p>
+        </p:txBody>
+      </p:sp>
+      <p:sp>
+        <p:nvSpPr>
+          <p:cNvPr id="5" name="Content Placeholder 4"/>
+          <p:cNvSpPr>
+            <a:spLocks noGrp="1"/>
+          </p:cNvSpPr>
+          <p:nvPr>
+            <p:ph idx="1"/>
+          </p:nvPr>
+        </p:nvSpPr>
+        <p:spPr/>
+        <p:txBody>
+          <a:bodyPr>
+            <a:normAutofit fontScale="92500" lnSpcReduction="10000"/>
+          </a:bodyPr>
+          <a:lstStyle/>
+          <a:p>
+            <a:pPr>
+              <a:lnSpc>
+                <a:spcPct val="120000"/>
+              </a:lnSpc>
+            </a:pPr>
+            <a:r>
+              <a:rPr lang="en-GB" dirty="0" smtClean="0"/>
+              <a:t>Can </a:t>
+            </a:r>
+            <a:r>
+              <a:rPr lang="en-GB" dirty="0" smtClean="0"/>
+              <a:t>specify the </a:t>
+            </a:r>
+            <a:r>
+              <a:rPr lang="en-GB" b="1" dirty="0" err="1" smtClean="0">
+                <a:solidFill>
+                  <a:srgbClr val="3366FF"/>
+                </a:solidFill>
+                <a:latin typeface="Courier New"/>
+                <a:cs typeface="Courier New"/>
+              </a:rPr>
+              <a:t>reqd_work_group_size</a:t>
+            </a:r>
+            <a:r>
+              <a:rPr lang="en-GB" dirty="0" smtClean="0">
+                <a:solidFill>
+                  <a:srgbClr val="3366FF"/>
+                </a:solidFill>
+              </a:rPr>
+              <a:t> </a:t>
+            </a:r>
+            <a:r>
+              <a:rPr lang="en-GB" dirty="0" smtClean="0"/>
+              <a:t>attribute to hint to the compiler what you’re going to launch it with </a:t>
+            </a:r>
+          </a:p>
+          <a:p>
+            <a:pPr>
+              <a:lnSpc>
+                <a:spcPct val="120000"/>
+              </a:lnSpc>
+            </a:pPr>
+            <a:r>
+              <a:rPr lang="en-GB" dirty="0" smtClean="0"/>
+              <a:t>As with C/C++, use the </a:t>
+            </a:r>
+            <a:r>
+              <a:rPr lang="en-GB" b="1" dirty="0" err="1" smtClean="0">
+                <a:solidFill>
+                  <a:srgbClr val="3366FF"/>
+                </a:solidFill>
+                <a:latin typeface="Courier New"/>
+                <a:cs typeface="Courier New"/>
+              </a:rPr>
+              <a:t>const</a:t>
+            </a:r>
+            <a:r>
+              <a:rPr lang="en-GB" dirty="0" smtClean="0"/>
+              <a:t>/</a:t>
+            </a:r>
+            <a:r>
+              <a:rPr lang="en-GB" b="1" dirty="0" smtClean="0">
+                <a:solidFill>
+                  <a:srgbClr val="3366FF"/>
+                </a:solidFill>
+                <a:latin typeface="Courier New"/>
+                <a:cs typeface="Courier New"/>
+              </a:rPr>
+              <a:t>restrict</a:t>
+            </a:r>
+            <a:r>
+              <a:rPr lang="en-GB" dirty="0" smtClean="0">
+                <a:solidFill>
+                  <a:srgbClr val="3366FF"/>
+                </a:solidFill>
+              </a:rPr>
+              <a:t> </a:t>
+            </a:r>
+            <a:r>
+              <a:rPr lang="en-GB" dirty="0" smtClean="0"/>
+              <a:t>keywords for the inputs where appropriate to make sure the compiler can optimise memory accesses (</a:t>
+            </a:r>
+            <a:r>
+              <a:rPr lang="en-GB" b="1" dirty="0" smtClean="0">
+                <a:solidFill>
+                  <a:srgbClr val="3366FF"/>
+                </a:solidFill>
+                <a:latin typeface="Courier New"/>
+                <a:cs typeface="Courier New"/>
+              </a:rPr>
+              <a:t>-cl-strict-aliasing</a:t>
+            </a:r>
+            <a:r>
+              <a:rPr lang="en-GB" dirty="0" smtClean="0"/>
+              <a:t> in 1.0/1.1 as well</a:t>
+            </a:r>
+            <a:r>
+              <a:rPr lang="en-GB" dirty="0" smtClean="0"/>
+              <a:t>)</a:t>
+            </a:r>
+            <a:endParaRPr lang="en-GB" dirty="0" smtClean="0"/>
+          </a:p>
+        </p:txBody>
+      </p:sp>
+    </p:spTree>
+    <p:extLst>
+      <p:ext uri="{BB962C8B-B14F-4D97-AF65-F5344CB8AC3E}">
+        <p14:creationId xmlns:p14="http://schemas.microsoft.com/office/powerpoint/2010/main" val="1138100201"/>
+      </p:ext>
+    </p:extLst>
+  </p:cSld>
+  <p:clrMapOvr>
+    <a:masterClrMapping/>
+  </p:clrMapOvr>
+  <p:timing>
+    <p:tnLst>
+      <p:par>
+        <p:cTn xmlns:p14="http://schemas.microsoft.com/office/powerpoint/2010/main" id="1" dur="indefinite" restart="never" nodeType="tmRoot"/>
+      </p:par>
+    </p:tnLst>
+  </p:timing>
+</p:sld>
+</file>
+
+<file path=ppt/slides/slide18.xml><?xml version="1.0" encoding="utf-8"?>
+<p:sld xmlns:a="http://schemas.openxmlformats.org/drawingml/2006/main" xmlns:r="http://schemas.openxmlformats.org/officeDocument/2006/relationships" xmlns:p="http://schemas.openxmlformats.org/presentationml/2006/main">
+  <p:cSld>
+    <p:spTree>
+      <p:nvGrpSpPr>
+        <p:cNvPr id="1" name=""/>
+        <p:cNvGrpSpPr/>
+        <p:nvPr/>
+      </p:nvGrpSpPr>
+      <p:grpSpPr>
+        <a:xfrm>
+          <a:off x="0" y="0"/>
+          <a:ext cx="0" cy="0"/>
+          <a:chOff x="0" y="0"/>
+          <a:chExt cx="0" cy="0"/>
+        </a:xfrm>
+      </p:grpSpPr>
+      <p:sp>
+        <p:nvSpPr>
           <p:cNvPr id="2" name="Title 1"/>
           <p:cNvSpPr>
             <a:spLocks noGrp="1"/>
@@ -6030,7 +6552,7 @@
 </p:sld>
 </file>
 
-<file path=ppt/slides/slide18.xml><?xml version="1.0" encoding="utf-8"?>
+<file path=ppt/slides/slide19.xml><?xml version="1.0" encoding="utf-8"?>
 <p:sld xmlns:a="http://schemas.openxmlformats.org/drawingml/2006/main" xmlns:r="http://schemas.openxmlformats.org/officeDocument/2006/relationships" xmlns:p="http://schemas.openxmlformats.org/presentationml/2006/main">
   <p:cSld>
     <p:spTree>
@@ -8033,270 +8555,6 @@
 </p:sld>
 </file>
 
-<file path=ppt/slides/slide19.xml><?xml version="1.0" encoding="utf-8"?>
-<p:sld xmlns:a="http://schemas.openxmlformats.org/drawingml/2006/main" xmlns:r="http://schemas.openxmlformats.org/officeDocument/2006/relationships" xmlns:p="http://schemas.openxmlformats.org/presentationml/2006/main">
-  <p:cSld>
-    <p:spTree>
-      <p:nvGrpSpPr>
-        <p:cNvPr id="1" name=""/>
-        <p:cNvGrpSpPr/>
-        <p:nvPr/>
-      </p:nvGrpSpPr>
-      <p:grpSpPr>
-        <a:xfrm>
-          <a:off x="0" y="0"/>
-          <a:ext cx="0" cy="0"/>
-          <a:chOff x="0" y="0"/>
-          <a:chExt cx="0" cy="0"/>
-        </a:xfrm>
-      </p:grpSpPr>
-      <p:sp>
-        <p:nvSpPr>
-          <p:cNvPr id="2" name="Title 1"/>
-          <p:cNvSpPr>
-            <a:spLocks noGrp="1"/>
-          </p:cNvSpPr>
-          <p:nvPr>
-            <p:ph type="title"/>
-          </p:nvPr>
-        </p:nvSpPr>
-        <p:spPr/>
-        <p:txBody>
-          <a:bodyPr/>
-          <a:lstStyle/>
-          <a:p>
-            <a:r>
-              <a:rPr lang="en-GB" dirty="0" err="1" smtClean="0"/>
-              <a:t>Metaprogramming</a:t>
-            </a:r>
-            <a:endParaRPr lang="en-GB" dirty="0"/>
-          </a:p>
-        </p:txBody>
-      </p:sp>
-      <p:sp>
-        <p:nvSpPr>
-          <p:cNvPr id="3" name="Content Placeholder 2"/>
-          <p:cNvSpPr>
-            <a:spLocks noGrp="1"/>
-          </p:cNvSpPr>
-          <p:nvPr>
-            <p:ph idx="1"/>
-          </p:nvPr>
-        </p:nvSpPr>
-        <p:spPr>
-          <a:xfrm>
-            <a:off x="457200" y="1600200"/>
-            <a:ext cx="8229600" cy="5141168"/>
-          </a:xfrm>
-        </p:spPr>
-        <p:txBody>
-          <a:bodyPr>
-            <a:normAutofit fontScale="77500" lnSpcReduction="20000"/>
-          </a:bodyPr>
-          <a:lstStyle/>
-          <a:p>
-            <a:pPr>
-              <a:lnSpc>
-                <a:spcPct val="110000"/>
-              </a:lnSpc>
-            </a:pPr>
-            <a:r>
-              <a:rPr lang="en-GB" dirty="0" smtClean="0"/>
-              <a:t>Can be used to dynamically change the precision of a kernel</a:t>
-            </a:r>
-          </a:p>
-          <a:p>
-            <a:pPr lvl="1">
-              <a:lnSpc>
-                <a:spcPct val="110000"/>
-              </a:lnSpc>
-            </a:pPr>
-            <a:r>
-              <a:rPr lang="en-GB" dirty="0" smtClean="0"/>
-              <a:t>Use </a:t>
-            </a:r>
-            <a:r>
-              <a:rPr lang="en-GB" b="1" dirty="0" smtClean="0">
-                <a:solidFill>
-                  <a:srgbClr val="3366FF"/>
-                </a:solidFill>
-                <a:latin typeface="Courier New"/>
-                <a:cs typeface="Courier New"/>
-              </a:rPr>
-              <a:t>REAL</a:t>
-            </a:r>
-            <a:r>
-              <a:rPr lang="en-GB" dirty="0" smtClean="0">
-                <a:solidFill>
-                  <a:srgbClr val="3366FF"/>
-                </a:solidFill>
-              </a:rPr>
-              <a:t> </a:t>
-            </a:r>
-            <a:r>
-              <a:rPr lang="en-GB" dirty="0" smtClean="0"/>
-              <a:t>instead of </a:t>
-            </a:r>
-            <a:r>
-              <a:rPr lang="en-GB" b="1" dirty="0" smtClean="0">
-                <a:solidFill>
-                  <a:srgbClr val="3366FF"/>
-                </a:solidFill>
-                <a:latin typeface="Courier New"/>
-                <a:cs typeface="Courier New"/>
-              </a:rPr>
-              <a:t>float/double</a:t>
-            </a:r>
-            <a:r>
-              <a:rPr lang="en-GB" dirty="0" smtClean="0"/>
-              <a:t>, then define </a:t>
-            </a:r>
-            <a:r>
-              <a:rPr lang="en-GB" b="1" dirty="0" smtClean="0">
-                <a:solidFill>
-                  <a:srgbClr val="3366FF"/>
-                </a:solidFill>
-                <a:latin typeface="Courier New"/>
-                <a:cs typeface="Courier New"/>
-              </a:rPr>
-              <a:t>REAL</a:t>
-            </a:r>
-            <a:r>
-              <a:rPr lang="en-GB" dirty="0" smtClean="0">
-                <a:solidFill>
-                  <a:srgbClr val="3366FF"/>
-                </a:solidFill>
-              </a:rPr>
-              <a:t> </a:t>
-            </a:r>
-            <a:r>
-              <a:rPr lang="en-GB" dirty="0" smtClean="0"/>
-              <a:t>at runtime using OpenCL build options: </a:t>
-            </a:r>
-            <a:r>
-              <a:rPr lang="en-GB" b="1" dirty="0" smtClean="0">
-                <a:solidFill>
-                  <a:srgbClr val="3366FF"/>
-                </a:solidFill>
-                <a:latin typeface="Courier New"/>
-                <a:cs typeface="Courier New"/>
-              </a:rPr>
-              <a:t>–DREAL=type</a:t>
-            </a:r>
-            <a:endParaRPr lang="en-GB" b="1" dirty="0">
-              <a:solidFill>
-                <a:srgbClr val="3366FF"/>
-              </a:solidFill>
-              <a:latin typeface="Courier New"/>
-              <a:cs typeface="Courier New"/>
-            </a:endParaRPr>
-          </a:p>
-          <a:p>
-            <a:pPr>
-              <a:lnSpc>
-                <a:spcPct val="110000"/>
-              </a:lnSpc>
-            </a:pPr>
-            <a:r>
-              <a:rPr lang="en-GB" dirty="0" smtClean="0">
-                <a:latin typeface="Trebuchet MS"/>
-                <a:cs typeface="Trebuchet MS"/>
-              </a:rPr>
-              <a:t>Can make runtime decisions that change the functionality of the kernel, or change the way that it is implemented to improve performance portability</a:t>
-            </a:r>
-          </a:p>
-          <a:p>
-            <a:pPr lvl="1">
-              <a:lnSpc>
-                <a:spcPct val="110000"/>
-              </a:lnSpc>
-            </a:pPr>
-            <a:r>
-              <a:rPr lang="en-GB" dirty="0" smtClean="0">
-                <a:latin typeface="Trebuchet MS"/>
-                <a:cs typeface="Trebuchet MS"/>
-              </a:rPr>
-              <a:t>Switching between scalar and vector types</a:t>
-            </a:r>
-          </a:p>
-          <a:p>
-            <a:pPr lvl="1">
-              <a:lnSpc>
-                <a:spcPct val="110000"/>
-              </a:lnSpc>
-            </a:pPr>
-            <a:r>
-              <a:rPr lang="en-GB" dirty="0" smtClean="0">
-                <a:latin typeface="Trebuchet MS"/>
-                <a:cs typeface="Trebuchet MS"/>
-              </a:rPr>
-              <a:t>Changing whether data is stored in buffers or images</a:t>
-            </a:r>
-          </a:p>
-          <a:p>
-            <a:pPr lvl="1">
-              <a:lnSpc>
-                <a:spcPct val="110000"/>
-              </a:lnSpc>
-            </a:pPr>
-            <a:r>
-              <a:rPr lang="en-GB" dirty="0" smtClean="0">
-                <a:latin typeface="Trebuchet MS"/>
-                <a:cs typeface="Trebuchet MS"/>
-              </a:rPr>
-              <a:t>Toggling use of local memory</a:t>
-            </a:r>
-          </a:p>
-          <a:p>
-            <a:pPr>
-              <a:lnSpc>
-                <a:spcPct val="110000"/>
-              </a:lnSpc>
-            </a:pPr>
-            <a:r>
-              <a:rPr lang="en-GB" dirty="0" smtClean="0">
-                <a:latin typeface="Trebuchet MS"/>
-                <a:cs typeface="Trebuchet MS"/>
-              </a:rPr>
-              <a:t>All of this requires that we are compiling our OpenCL sources at </a:t>
-            </a:r>
-            <a:r>
-              <a:rPr lang="en-GB" dirty="0" smtClean="0">
-                <a:latin typeface="Trebuchet MS"/>
-                <a:cs typeface="Trebuchet MS"/>
-              </a:rPr>
-              <a:t>runtime </a:t>
-            </a:r>
-            <a:r>
-              <a:rPr lang="en-GB" dirty="0" smtClean="0">
-                <a:latin typeface="Trebuchet MS"/>
-                <a:cs typeface="Trebuchet MS"/>
-              </a:rPr>
-              <a:t>– this doesn’t work if we are precompiling our kernels or using SPIR</a:t>
-            </a:r>
-          </a:p>
-        </p:txBody>
-      </p:sp>
-    </p:spTree>
-    <p:extLst>
-      <p:ext uri="{BB962C8B-B14F-4D97-AF65-F5344CB8AC3E}">
-        <p14:creationId xmlns:p14="http://schemas.microsoft.com/office/powerpoint/2010/main" val="4085093005"/>
-      </p:ext>
-    </p:extLst>
-  </p:cSld>
-  <p:clrMapOvr>
-    <a:masterClrMapping/>
-  </p:clrMapOvr>
-  <p:timing>
-    <p:tnLst>
-      <p:par>
-        <p:cTn xmlns:p14="http://schemas.microsoft.com/office/powerpoint/2010/main" id="1" dur="indefinite" restart="never" nodeType="tmRoot"/>
-      </p:par>
-    </p:tnLst>
-  </p:timing>
-</p:sld>
-</file>
-
 <file path=ppt/slides/slide2.xml><?xml version="1.0" encoding="utf-8"?>
 <p:sld xmlns:a="http://schemas.openxmlformats.org/drawingml/2006/main" xmlns:r="http://schemas.openxmlformats.org/officeDocument/2006/relationships" xmlns:p="http://schemas.openxmlformats.org/presentationml/2006/main">
   <p:cSld>
@@ -8424,20 +8682,8 @@
           <a:lstStyle/>
           <a:p>
             <a:r>
-              <a:rPr lang="en-GB" dirty="0" smtClean="0"/>
-              <a:t>Exercise </a:t>
-            </a:r>
-            <a:r>
-              <a:rPr lang="en-GB" dirty="0"/>
-              <a:t>2</a:t>
-            </a:r>
-            <a:r>
-              <a:rPr lang="en-GB" dirty="0" smtClean="0"/>
-              <a:t>: </a:t>
-            </a:r>
-            <a:r>
-              <a:rPr lang="en-GB" dirty="0" smtClean="0"/>
-              <a:t>optimisations</a:t>
+              <a:rPr lang="en-GB" dirty="0" err="1" smtClean="0"/>
+              <a:t>Metaprogramming</a:t>
             </a:r>
             <a:endParaRPr lang="en-GB" dirty="0"/>
           </a:p>
@@ -8453,53 +8699,190 @@
             <p:ph idx="1"/>
           </p:nvPr>
         </p:nvSpPr>
-        <p:spPr/>
+        <p:spPr>
+          <a:xfrm>
+            <a:off x="457200" y="1600200"/>
+            <a:ext cx="8229600" cy="5141168"/>
+          </a:xfrm>
+        </p:spPr>
         <p:txBody>
           <a:bodyPr>
-            <a:normAutofit/>
+            <a:normAutofit fontScale="77500" lnSpcReduction="20000"/>
           </a:bodyPr>
           <a:lstStyle/>
           <a:p>
+            <a:pPr>
+              <a:lnSpc>
+                <a:spcPct val="110000"/>
+              </a:lnSpc>
+            </a:pPr>
             <a:r>
               <a:rPr lang="en-GB" dirty="0" smtClean="0"/>
-              <a:t>The example is a simple N-Body code</a:t>
-            </a:r>
-          </a:p>
-          <a:p>
-            <a:pPr lvl="1"/>
+              <a:t>Can be used to dynamically change the precision of a kernel</a:t>
+            </a:r>
+          </a:p>
+          <a:p>
+            <a:pPr lvl="1">
+              <a:lnSpc>
+                <a:spcPct val="110000"/>
+              </a:lnSpc>
+            </a:pPr>
             <a:r>
               <a:rPr lang="en-GB" dirty="0" smtClean="0"/>
-              <a:t>At each </a:t>
-            </a:r>
-            <a:r>
-              <a:rPr lang="en-GB" dirty="0" err="1" smtClean="0"/>
-              <a:t>timestep</a:t>
+              <a:t>Use </a:t>
+            </a:r>
+            <a:r>
+              <a:rPr lang="en-GB" b="1" dirty="0" smtClean="0">
+                <a:solidFill>
+                  <a:srgbClr val="3366FF"/>
+                </a:solidFill>
+                <a:latin typeface="Courier New"/>
+                <a:cs typeface="Courier New"/>
+              </a:rPr>
+              <a:t>REAL</a:t>
+            </a:r>
+            <a:r>
+              <a:rPr lang="en-GB" dirty="0" smtClean="0">
+                <a:solidFill>
+                  <a:srgbClr val="3366FF"/>
+                </a:solidFill>
+              </a:rPr>
+              <a:t> </a:t>
             </a:r>
             <a:r>
               <a:rPr lang="en-GB" dirty="0" smtClean="0"/>
-              <a:t>, each body experiences a gravitational force from every other body in the system</a:t>
-            </a:r>
-          </a:p>
-          <a:p>
-            <a:pPr lvl="1"/>
+              <a:t>instead of </a:t>
+            </a:r>
+            <a:r>
+              <a:rPr lang="en-GB" b="1" dirty="0" smtClean="0">
+                <a:solidFill>
+                  <a:srgbClr val="3366FF"/>
+                </a:solidFill>
+                <a:latin typeface="Courier New"/>
+                <a:cs typeface="Courier New"/>
+              </a:rPr>
+              <a:t>float/double</a:t>
+            </a:r>
             <a:r>
               <a:rPr lang="en-GB" dirty="0" smtClean="0"/>
-              <a:t>Each work-item computes the forces acting on a single body, and updates its velocity and position</a:t>
-            </a:r>
-          </a:p>
-          <a:p>
+              <a:t>, then define </a:t>
+            </a:r>
+            <a:r>
+              <a:rPr lang="en-GB" b="1" dirty="0" smtClean="0">
+                <a:solidFill>
+                  <a:srgbClr val="3366FF"/>
+                </a:solidFill>
+                <a:latin typeface="Courier New"/>
+                <a:cs typeface="Courier New"/>
+              </a:rPr>
+              <a:t>REAL</a:t>
+            </a:r>
+            <a:r>
+              <a:rPr lang="en-GB" dirty="0" smtClean="0">
+                <a:solidFill>
+                  <a:srgbClr val="3366FF"/>
+                </a:solidFill>
+              </a:rPr>
+              <a:t> </a:t>
+            </a:r>
             <a:r>
               <a:rPr lang="en-GB" dirty="0" smtClean="0"/>
-              <a:t>A fully working (naïve) implementation of this code is provided as a starting point</a:t>
-            </a:r>
-            <a:endParaRPr lang="en-GB" dirty="0"/>
+              <a:t>at runtime using OpenCL build options: </a:t>
+            </a:r>
+            <a:r>
+              <a:rPr lang="en-GB" b="1" dirty="0" smtClean="0">
+                <a:solidFill>
+                  <a:srgbClr val="3366FF"/>
+                </a:solidFill>
+                <a:latin typeface="Courier New"/>
+                <a:cs typeface="Courier New"/>
+              </a:rPr>
+              <a:t>–DREAL=type</a:t>
+            </a:r>
+            <a:endParaRPr lang="en-GB" b="1" dirty="0">
+              <a:solidFill>
+                <a:srgbClr val="3366FF"/>
+              </a:solidFill>
+              <a:latin typeface="Courier New"/>
+              <a:cs typeface="Courier New"/>
+            </a:endParaRPr>
+          </a:p>
+          <a:p>
+            <a:pPr>
+              <a:lnSpc>
+                <a:spcPct val="110000"/>
+              </a:lnSpc>
+            </a:pPr>
+            <a:r>
+              <a:rPr lang="en-GB" dirty="0" smtClean="0">
+                <a:latin typeface="Trebuchet MS"/>
+                <a:cs typeface="Trebuchet MS"/>
+              </a:rPr>
+              <a:t>Can make runtime decisions that change the functionality of the kernel, or change the way that it is implemented to improve performance portability</a:t>
+            </a:r>
+          </a:p>
+          <a:p>
+            <a:pPr lvl="1">
+              <a:lnSpc>
+                <a:spcPct val="110000"/>
+              </a:lnSpc>
+            </a:pPr>
+            <a:r>
+              <a:rPr lang="en-GB" dirty="0" smtClean="0">
+                <a:latin typeface="Trebuchet MS"/>
+                <a:cs typeface="Trebuchet MS"/>
+              </a:rPr>
+              <a:t>Switching between scalar and vector types</a:t>
+            </a:r>
+          </a:p>
+          <a:p>
+            <a:pPr lvl="1">
+              <a:lnSpc>
+                <a:spcPct val="110000"/>
+              </a:lnSpc>
+            </a:pPr>
+            <a:r>
+              <a:rPr lang="en-GB" dirty="0" smtClean="0">
+                <a:latin typeface="Trebuchet MS"/>
+                <a:cs typeface="Trebuchet MS"/>
+              </a:rPr>
+              <a:t>Changing whether data is stored in buffers or images</a:t>
+            </a:r>
+          </a:p>
+          <a:p>
+            <a:pPr lvl="1">
+              <a:lnSpc>
+                <a:spcPct val="110000"/>
+              </a:lnSpc>
+            </a:pPr>
+            <a:r>
+              <a:rPr lang="en-GB" dirty="0" smtClean="0">
+                <a:latin typeface="Trebuchet MS"/>
+                <a:cs typeface="Trebuchet MS"/>
+              </a:rPr>
+              <a:t>Toggling use of local memory</a:t>
+            </a:r>
+          </a:p>
+          <a:p>
+            <a:pPr>
+              <a:lnSpc>
+                <a:spcPct val="110000"/>
+              </a:lnSpc>
+            </a:pPr>
+            <a:r>
+              <a:rPr lang="en-GB" dirty="0" smtClean="0">
+                <a:latin typeface="Trebuchet MS"/>
+                <a:cs typeface="Trebuchet MS"/>
+              </a:rPr>
+              <a:t>All of this requires that we are compiling our OpenCL sources at runtime – this doesn’t work if we are precompiling our kernels or using SPIR</a:t>
+            </a:r>
           </a:p>
         </p:txBody>
       </p:sp>
     </p:spTree>
     <p:extLst>
       <p:ext uri="{BB962C8B-B14F-4D97-AF65-F5344CB8AC3E}">
-        <p14:creationId xmlns:p14="http://schemas.microsoft.com/office/powerpoint/2010/main" val="1757202061"/>
+        <p14:creationId xmlns:p14="http://schemas.microsoft.com/office/powerpoint/2010/main" val="4085093005"/>
       </p:ext>
     </p:extLst>
   </p:cSld>
@@ -8543,6 +8926,127 @@
             <p:ph type="title"/>
           </p:nvPr>
         </p:nvSpPr>
+        <p:spPr/>
+        <p:txBody>
+          <a:bodyPr/>
+          <a:lstStyle/>
+          <a:p>
+            <a:r>
+              <a:rPr lang="en-GB" dirty="0" smtClean="0"/>
+              <a:t>Exercise </a:t>
+            </a:r>
+            <a:r>
+              <a:rPr lang="en-GB" dirty="0"/>
+              <a:t>2</a:t>
+            </a:r>
+            <a:r>
+              <a:rPr lang="en-GB" dirty="0" smtClean="0"/>
+              <a:t>: optimisations</a:t>
+            </a:r>
+            <a:endParaRPr lang="en-GB" dirty="0"/>
+          </a:p>
+        </p:txBody>
+      </p:sp>
+      <p:sp>
+        <p:nvSpPr>
+          <p:cNvPr id="3" name="Content Placeholder 2"/>
+          <p:cNvSpPr>
+            <a:spLocks noGrp="1"/>
+          </p:cNvSpPr>
+          <p:nvPr>
+            <p:ph idx="1"/>
+          </p:nvPr>
+        </p:nvSpPr>
+        <p:spPr/>
+        <p:txBody>
+          <a:bodyPr>
+            <a:normAutofit/>
+          </a:bodyPr>
+          <a:lstStyle/>
+          <a:p>
+            <a:r>
+              <a:rPr lang="en-GB" dirty="0" smtClean="0"/>
+              <a:t>The example is a simple N-Body code</a:t>
+            </a:r>
+          </a:p>
+          <a:p>
+            <a:pPr lvl="1"/>
+            <a:r>
+              <a:rPr lang="en-GB" dirty="0" smtClean="0"/>
+              <a:t>At each </a:t>
+            </a:r>
+            <a:r>
+              <a:rPr lang="en-GB" dirty="0" err="1" smtClean="0"/>
+              <a:t>timestep</a:t>
+            </a:r>
+            <a:r>
+              <a:rPr lang="en-GB" dirty="0" smtClean="0"/>
+              <a:t>, each body experiences a gravitational force from every other body in the system</a:t>
+            </a:r>
+          </a:p>
+          <a:p>
+            <a:pPr lvl="1"/>
+            <a:r>
+              <a:rPr lang="en-GB" dirty="0" smtClean="0"/>
+              <a:t>Each work-item computes the forces acting on a single body, and updates its velocity and position</a:t>
+            </a:r>
+          </a:p>
+          <a:p>
+            <a:r>
+              <a:rPr lang="en-GB" dirty="0" smtClean="0"/>
+              <a:t>A fully working (naïve) implementation of this code is provided as a starting point</a:t>
+            </a:r>
+            <a:endParaRPr lang="en-GB" dirty="0"/>
+          </a:p>
+        </p:txBody>
+      </p:sp>
+    </p:spTree>
+    <p:extLst>
+      <p:ext uri="{BB962C8B-B14F-4D97-AF65-F5344CB8AC3E}">
+        <p14:creationId xmlns:p14="http://schemas.microsoft.com/office/powerpoint/2010/main" val="1757202061"/>
+      </p:ext>
+    </p:extLst>
+  </p:cSld>
+  <p:clrMapOvr>
+    <a:masterClrMapping/>
+  </p:clrMapOvr>
+  <p:timing>
+    <p:tnLst>
+      <p:par>
+        <p:cTn xmlns:p14="http://schemas.microsoft.com/office/powerpoint/2010/main" id="1" dur="indefinite" restart="never" nodeType="tmRoot"/>
+      </p:par>
+    </p:tnLst>
+  </p:timing>
+</p:sld>
+</file>
+
+<file path=ppt/slides/slide22.xml><?xml version="1.0" encoding="utf-8"?>
+<p:sld xmlns:a="http://schemas.openxmlformats.org/drawingml/2006/main" xmlns:r="http://schemas.openxmlformats.org/officeDocument/2006/relationships" xmlns:p="http://schemas.openxmlformats.org/presentationml/2006/main">
+  <p:cSld>
+    <p:spTree>
+      <p:nvGrpSpPr>
+        <p:cNvPr id="1" name=""/>
+        <p:cNvGrpSpPr/>
+        <p:nvPr/>
+      </p:nvGrpSpPr>
+      <p:grpSpPr>
+        <a:xfrm>
+          <a:off x="0" y="0"/>
+          <a:ext cx="0" cy="0"/>
+          <a:chOff x="0" y="0"/>
+          <a:chExt cx="0" cy="0"/>
+        </a:xfrm>
+      </p:grpSpPr>
+      <p:sp>
+        <p:nvSpPr>
+          <p:cNvPr id="2" name="Title 1"/>
+          <p:cNvSpPr>
+            <a:spLocks noGrp="1"/>
+          </p:cNvSpPr>
+          <p:nvPr>
+            <p:ph type="title"/>
+          </p:nvPr>
+        </p:nvSpPr>
         <p:spPr>
           <a:xfrm>
             <a:off x="0" y="274638"/>
@@ -8565,11 +9069,7 @@
             </a:r>
             <a:r>
               <a:rPr lang="en-GB" dirty="0" smtClean="0"/>
-              <a:t>: </a:t>
-            </a:r>
-            <a:r>
-              <a:rPr lang="en-GB" dirty="0" smtClean="0"/>
-              <a:t>optimisations</a:t>
+              <a:t>: optimisations</a:t>
             </a:r>
             <a:endParaRPr lang="en-GB" dirty="0"/>
           </a:p>
@@ -8626,11 +9126,7 @@
             </a:pPr>
             <a:r>
               <a:rPr lang="en-GB" dirty="0" smtClean="0"/>
-              <a:t>Disclaimer: This </a:t>
-            </a:r>
-            <a:r>
-              <a:rPr lang="en-GB" dirty="0" smtClean="0"/>
-              <a:t>won’t help for every parameter</a:t>
+              <a:t>Disclaimer: This won’t help for every parameter</a:t>
             </a:r>
           </a:p>
           <a:p>
@@ -8645,11 +9141,7 @@
             </a:r>
             <a:r>
               <a:rPr lang="en-GB" dirty="0" smtClean="0"/>
-              <a:t>: This </a:t>
-            </a:r>
-            <a:r>
-              <a:rPr lang="en-GB" dirty="0" smtClean="0"/>
-              <a:t>won’t help on every device – try it on a few!</a:t>
+              <a:t>: This won’t help on every device – try it on a few!</a:t>
             </a:r>
           </a:p>
           <a:p>
@@ -9120,13 +9612,8 @@
           <a:p>
             <a:r>
               <a:rPr lang="en-GB" dirty="0" smtClean="0"/>
-              <a:t>Retrieving the </a:t>
-            </a:r>
-            <a:r>
-              <a:rPr lang="en-GB" dirty="0" smtClean="0"/>
-              <a:t>binary:</a:t>
-            </a:r>
-            <a:endParaRPr lang="en-GB" dirty="0" smtClean="0"/>
+              <a:t>Retrieving the binary:</a:t>
+            </a:r>
           </a:p>
           <a:p>
             <a:pPr marL="400050" lvl="1" indent="0">
@@ -9165,7 +9652,17 @@
                 <a:latin typeface="Courier New"/>
                 <a:cs typeface="Courier New"/>
               </a:rPr>
-              <a:t>l::Program program(</a:t>
+              <a:t>l::Program program(context, </a:t>
+            </a:r>
+            <a:r>
+              <a:rPr lang="en-GB" b="1" dirty="0" err="1" smtClean="0">
+                <a:solidFill>
+                  <a:srgbClr val="3366FF"/>
+                </a:solidFill>
+                <a:latin typeface="Courier New"/>
+                <a:cs typeface="Courier New"/>
+              </a:rPr>
+              <a:t>kernel_source</a:t>
             </a:r>
             <a:r>
               <a:rPr lang="en-GB" b="1" dirty="0" smtClean="0">
@@ -9175,7 +9672,32 @@
                 <a:latin typeface="Courier New"/>
                 <a:cs typeface="Courier New"/>
               </a:rPr>
-              <a:t>context</a:t>
+              <a:t>);</a:t>
+            </a:r>
+          </a:p>
+          <a:p>
+            <a:pPr marL="400050" lvl="1" indent="0">
+              <a:buNone/>
+            </a:pPr>
+            <a:r>
+              <a:rPr lang="en-GB" b="1" dirty="0" err="1">
+                <a:solidFill>
+                  <a:srgbClr val="3366FF"/>
+                </a:solidFill>
+                <a:latin typeface="Courier New"/>
+                <a:cs typeface="Courier New"/>
+              </a:rPr>
+              <a:t>p</a:t>
+            </a:r>
+            <a:r>
+              <a:rPr lang="en-GB" b="1" dirty="0" err="1" smtClean="0">
+                <a:solidFill>
+                  <a:srgbClr val="3366FF"/>
+                </a:solidFill>
+                <a:latin typeface="Courier New"/>
+                <a:cs typeface="Courier New"/>
+              </a:rPr>
+              <a:t>rogram.build</a:t>
             </a:r>
             <a:r>
               <a:rPr lang="en-GB" b="1" dirty="0" smtClean="0">
@@ -9185,73 +9707,13 @@
                 <a:latin typeface="Courier New"/>
                 <a:cs typeface="Courier New"/>
               </a:rPr>
-              <a:t>, </a:t>
-            </a:r>
-            <a:r>
-              <a:rPr lang="en-GB" b="1" dirty="0" err="1" smtClean="0">
-                <a:solidFill>
-                  <a:srgbClr val="3366FF"/>
-                </a:solidFill>
-                <a:latin typeface="Courier New"/>
-                <a:cs typeface="Courier New"/>
-              </a:rPr>
-              <a:t>kernel_source</a:t>
-            </a:r>
-            <a:r>
-              <a:rPr lang="en-GB" b="1" dirty="0" smtClean="0">
-                <a:solidFill>
-                  <a:srgbClr val="3366FF"/>
-                </a:solidFill>
-                <a:latin typeface="Courier New"/>
-                <a:cs typeface="Courier New"/>
-              </a:rPr>
-              <a:t>)</a:t>
-            </a:r>
-            <a:r>
-              <a:rPr lang="en-GB" b="1" dirty="0" smtClean="0">
-                <a:solidFill>
-                  <a:srgbClr val="3366FF"/>
-                </a:solidFill>
-                <a:latin typeface="Courier New"/>
-                <a:cs typeface="Courier New"/>
-              </a:rPr>
-              <a:t>;</a:t>
+              <a:t>();</a:t>
             </a:r>
           </a:p>
           <a:p>
             <a:pPr marL="400050" lvl="1" indent="0">
               <a:buNone/>
             </a:pPr>
-            <a:r>
-              <a:rPr lang="en-GB" b="1" dirty="0" err="1">
-                <a:solidFill>
-                  <a:srgbClr val="3366FF"/>
-                </a:solidFill>
-                <a:latin typeface="Courier New"/>
-                <a:cs typeface="Courier New"/>
-              </a:rPr>
-              <a:t>p</a:t>
-            </a:r>
-            <a:r>
-              <a:rPr lang="en-GB" b="1" dirty="0" err="1" smtClean="0">
-                <a:solidFill>
-                  <a:srgbClr val="3366FF"/>
-                </a:solidFill>
-                <a:latin typeface="Courier New"/>
-                <a:cs typeface="Courier New"/>
-              </a:rPr>
-              <a:t>rogram.build</a:t>
-            </a:r>
-            <a:r>
-              <a:rPr lang="en-GB" b="1" dirty="0" smtClean="0">
-                <a:solidFill>
-                  <a:srgbClr val="3366FF"/>
-                </a:solidFill>
-                <a:latin typeface="Courier New"/>
-                <a:cs typeface="Courier New"/>
-              </a:rPr>
-              <a:t>();</a:t>
-            </a:r>
             <a:endParaRPr lang="en-GB" b="1" dirty="0" smtClean="0">
               <a:solidFill>
                 <a:srgbClr val="3366FF"/>
@@ -9264,6 +9726,141 @@
             <a:pPr marL="400050" lvl="1" indent="0">
               <a:buNone/>
             </a:pPr>
+            <a:r>
+              <a:rPr lang="en-GB" b="1" dirty="0" smtClean="0">
+                <a:solidFill>
+                  <a:srgbClr val="3366FF"/>
+                </a:solidFill>
+                <a:latin typeface="Courier New"/>
+                <a:cs typeface="Courier New"/>
+              </a:rPr>
+              <a:t>// Get compiled binary from runtime</a:t>
+            </a:r>
+          </a:p>
+          <a:p>
+            <a:pPr marL="400050" lvl="1" indent="0">
+              <a:buNone/>
+            </a:pPr>
+            <a:r>
+              <a:rPr lang="en-GB" b="1" dirty="0" err="1">
+                <a:solidFill>
+                  <a:srgbClr val="3366FF"/>
+                </a:solidFill>
+                <a:latin typeface="Courier New"/>
+                <a:cs typeface="Courier New"/>
+              </a:rPr>
+              <a:t>s</a:t>
+            </a:r>
+            <a:r>
+              <a:rPr lang="en-GB" b="1" dirty="0" err="1" smtClean="0">
+                <a:solidFill>
+                  <a:srgbClr val="3366FF"/>
+                </a:solidFill>
+                <a:latin typeface="Courier New"/>
+                <a:cs typeface="Courier New"/>
+              </a:rPr>
+              <a:t>td</a:t>
+            </a:r>
+            <a:r>
+              <a:rPr lang="en-GB" b="1" dirty="0" smtClean="0">
+                <a:solidFill>
+                  <a:srgbClr val="3366FF"/>
+                </a:solidFill>
+                <a:latin typeface="Courier New"/>
+                <a:cs typeface="Courier New"/>
+              </a:rPr>
+              <a:t>::vector&lt;</a:t>
+            </a:r>
+            <a:r>
+              <a:rPr lang="en-GB" b="1" dirty="0" err="1" smtClean="0">
+                <a:solidFill>
+                  <a:srgbClr val="3366FF"/>
+                </a:solidFill>
+                <a:latin typeface="Courier New"/>
+                <a:cs typeface="Courier New"/>
+              </a:rPr>
+              <a:t>size_t</a:t>
+            </a:r>
+            <a:r>
+              <a:rPr lang="en-GB" b="1" dirty="0" smtClean="0">
+                <a:solidFill>
+                  <a:srgbClr val="3366FF"/>
+                </a:solidFill>
+                <a:latin typeface="Courier New"/>
+                <a:cs typeface="Courier New"/>
+              </a:rPr>
+              <a:t>&gt; sizes = </a:t>
+            </a:r>
+            <a:r>
+              <a:rPr lang="en-GB" b="1" dirty="0" err="1" smtClean="0">
+                <a:solidFill>
+                  <a:srgbClr val="3366FF"/>
+                </a:solidFill>
+                <a:latin typeface="Courier New"/>
+                <a:cs typeface="Courier New"/>
+              </a:rPr>
+              <a:t>program.getInfo</a:t>
+            </a:r>
+            <a:r>
+              <a:rPr lang="en-GB" b="1" dirty="0" smtClean="0">
+                <a:solidFill>
+                  <a:srgbClr val="3366FF"/>
+                </a:solidFill>
+                <a:latin typeface="Courier New"/>
+                <a:cs typeface="Courier New"/>
+              </a:rPr>
+              <a:t>&lt;CL_PROGRAM_BINARY_SIZES&gt;();</a:t>
+            </a:r>
+          </a:p>
+          <a:p>
+            <a:pPr marL="400050" lvl="1" indent="0">
+              <a:buNone/>
+            </a:pPr>
+            <a:r>
+              <a:rPr lang="en-GB" b="1" dirty="0" err="1" smtClean="0">
+                <a:solidFill>
+                  <a:srgbClr val="3366FF"/>
+                </a:solidFill>
+                <a:latin typeface="Courier New"/>
+                <a:cs typeface="Courier New"/>
+              </a:rPr>
+              <a:t>std</a:t>
+            </a:r>
+            <a:r>
+              <a:rPr lang="en-GB" b="1" dirty="0" smtClean="0">
+                <a:solidFill>
+                  <a:srgbClr val="3366FF"/>
+                </a:solidFill>
+                <a:latin typeface="Courier New"/>
+                <a:cs typeface="Courier New"/>
+              </a:rPr>
+              <a:t>::vector&lt;char *&gt; binaries = </a:t>
+            </a:r>
+            <a:r>
+              <a:rPr lang="en-GB" b="1" dirty="0" err="1" smtClean="0">
+                <a:solidFill>
+                  <a:srgbClr val="3366FF"/>
+                </a:solidFill>
+                <a:latin typeface="Courier New"/>
+                <a:cs typeface="Courier New"/>
+              </a:rPr>
+              <a:t>program.getInfo</a:t>
+            </a:r>
+            <a:r>
+              <a:rPr lang="en-GB" b="1" dirty="0" smtClean="0">
+                <a:solidFill>
+                  <a:srgbClr val="3366FF"/>
+                </a:solidFill>
+                <a:latin typeface="Courier New"/>
+                <a:cs typeface="Courier New"/>
+              </a:rPr>
+              <a:t>&lt;CL_PROGRAM_BINARIES&gt;();</a:t>
+            </a:r>
+          </a:p>
+          <a:p>
+            <a:pPr marL="400050" lvl="1" indent="0">
+              <a:buNone/>
+            </a:pPr>
             <a:endParaRPr lang="en-GB" b="1" dirty="0" smtClean="0">
               <a:solidFill>
                 <a:srgbClr val="3366FF"/>
@@ -9284,8 +9881,13 @@
                 <a:latin typeface="Courier New"/>
                 <a:cs typeface="Courier New"/>
               </a:rPr>
-              <a:t>// Get compiled binary from </a:t>
-            </a:r>
+              <a:t>// Then write binary to file</a:t>
+            </a:r>
+          </a:p>
+          <a:p>
+            <a:pPr marL="400050" lvl="1" indent="0">
+              <a:buNone/>
+            </a:pPr>
             <a:r>
               <a:rPr lang="en-GB" b="1" dirty="0" smtClean="0">
                 <a:solidFill>
@@ -9294,83 +9896,13 @@
                 <a:latin typeface="Courier New"/>
                 <a:cs typeface="Courier New"/>
               </a:rPr>
-              <a:t>runtime</a:t>
-            </a:r>
-          </a:p>
-          <a:p>
-            <a:pPr marL="400050" lvl="1" indent="0">
-              <a:buNone/>
-            </a:pPr>
-            <a:r>
-              <a:rPr lang="en-GB" b="1" dirty="0" err="1">
-                <a:solidFill>
-                  <a:srgbClr val="3366FF"/>
-                </a:solidFill>
-                <a:latin typeface="Courier New"/>
-                <a:cs typeface="Courier New"/>
-              </a:rPr>
-              <a:t>s</a:t>
-            </a:r>
-            <a:r>
-              <a:rPr lang="en-GB" b="1" dirty="0" err="1" smtClean="0">
-                <a:solidFill>
-                  <a:srgbClr val="3366FF"/>
-                </a:solidFill>
-                <a:latin typeface="Courier New"/>
-                <a:cs typeface="Courier New"/>
-              </a:rPr>
-              <a:t>td</a:t>
-            </a:r>
-            <a:r>
-              <a:rPr lang="en-GB" b="1" dirty="0" smtClean="0">
-                <a:solidFill>
-                  <a:srgbClr val="3366FF"/>
-                </a:solidFill>
-                <a:latin typeface="Courier New"/>
-                <a:cs typeface="Courier New"/>
-              </a:rPr>
-              <a:t>::vector&lt;</a:t>
-            </a:r>
-            <a:r>
-              <a:rPr lang="en-GB" b="1" dirty="0" err="1" smtClean="0">
-                <a:solidFill>
-                  <a:srgbClr val="3366FF"/>
-                </a:solidFill>
-                <a:latin typeface="Courier New"/>
-                <a:cs typeface="Courier New"/>
-              </a:rPr>
-              <a:t>size_t</a:t>
-            </a:r>
-            <a:r>
-              <a:rPr lang="en-GB" b="1" dirty="0" smtClean="0">
-                <a:solidFill>
-                  <a:srgbClr val="3366FF"/>
-                </a:solidFill>
-                <a:latin typeface="Courier New"/>
-                <a:cs typeface="Courier New"/>
-              </a:rPr>
-              <a:t>&gt; sizes = </a:t>
-            </a:r>
-            <a:r>
-              <a:rPr lang="en-GB" b="1" dirty="0" err="1" smtClean="0">
-                <a:solidFill>
-                  <a:srgbClr val="3366FF"/>
-                </a:solidFill>
-                <a:latin typeface="Courier New"/>
-                <a:cs typeface="Courier New"/>
-              </a:rPr>
-              <a:t>program.getInfo</a:t>
-            </a:r>
-            <a:r>
-              <a:rPr lang="en-GB" b="1" dirty="0" smtClean="0">
-                <a:solidFill>
-                  <a:srgbClr val="3366FF"/>
-                </a:solidFill>
-                <a:latin typeface="Courier New"/>
-                <a:cs typeface="Courier New"/>
-              </a:rPr>
-              <a:t>&lt;CL_PROGRAM_BINARY_SIZES&gt;();</a:t>
-            </a:r>
+              <a:t>…</a:t>
+            </a:r>
+          </a:p>
+          <a:p>
+            <a:pPr marL="0" indent="0">
+              <a:buNone/>
+            </a:pPr>
             <a:endParaRPr lang="en-GB" b="1" dirty="0" smtClean="0">
               <a:solidFill>
                 <a:srgbClr val="3366FF"/>
@@ -9380,18 +9912,24 @@
             </a:endParaRPr>
           </a:p>
           <a:p>
+            <a:r>
+              <a:rPr lang="en-GB" dirty="0"/>
+              <a:t>Loading the binary</a:t>
+            </a:r>
+          </a:p>
+          <a:p>
             <a:pPr marL="400050" lvl="1" indent="0">
               <a:buNone/>
             </a:pPr>
             <a:r>
-              <a:rPr lang="en-GB" b="1" dirty="0" err="1" smtClean="0">
-                <a:solidFill>
-                  <a:srgbClr val="3366FF"/>
-                </a:solidFill>
-                <a:latin typeface="Courier New"/>
-                <a:cs typeface="Courier New"/>
-              </a:rPr>
-              <a:t>std</a:t>
+              <a:rPr lang="en-GB" b="1" dirty="0">
+                <a:solidFill>
+                  <a:srgbClr val="3366FF"/>
+                </a:solidFill>
+                <a:latin typeface="Courier New"/>
+                <a:cs typeface="Courier New"/>
+              </a:rPr>
+              <a:t>// Load </a:t>
             </a:r>
             <a:r>
               <a:rPr lang="en-GB" b="1" dirty="0" smtClean="0">
@@ -9401,28 +9939,13 @@
                 <a:latin typeface="Courier New"/>
                 <a:cs typeface="Courier New"/>
               </a:rPr>
-              <a:t>::vector&lt;char *&gt; binaries = </a:t>
-            </a:r>
-            <a:r>
-              <a:rPr lang="en-GB" b="1" dirty="0" err="1" smtClean="0">
-                <a:solidFill>
-                  <a:srgbClr val="3366FF"/>
-                </a:solidFill>
-                <a:latin typeface="Courier New"/>
-                <a:cs typeface="Courier New"/>
-              </a:rPr>
-              <a:t>p</a:t>
-            </a:r>
-            <a:r>
-              <a:rPr lang="en-GB" b="1" dirty="0" err="1" smtClean="0">
-                <a:solidFill>
-                  <a:srgbClr val="3366FF"/>
-                </a:solidFill>
-                <a:latin typeface="Courier New"/>
-                <a:cs typeface="Courier New"/>
-              </a:rPr>
-              <a:t>rogram.getInfo</a:t>
-            </a:r>
+              <a:t>compiled program binary from file</a:t>
+            </a:r>
+          </a:p>
+          <a:p>
+            <a:pPr marL="400050" lvl="1" indent="0">
+              <a:buNone/>
+            </a:pPr>
             <a:r>
               <a:rPr lang="en-GB" b="1" dirty="0" smtClean="0">
                 <a:solidFill>
@@ -9431,8 +9954,13 @@
                 <a:latin typeface="Courier New"/>
                 <a:cs typeface="Courier New"/>
               </a:rPr>
-              <a:t>&lt;CL_PROGRAM_BINARIES&gt;();</a:t>
-            </a:r>
+              <a:t>…</a:t>
+            </a:r>
+          </a:p>
+          <a:p>
+            <a:pPr marL="400050" lvl="1" indent="0">
+              <a:buNone/>
+            </a:pPr>
             <a:endParaRPr lang="en-GB" b="1" dirty="0" smtClean="0">
               <a:solidFill>
                 <a:srgbClr val="3366FF"/>
@@ -9445,18 +9973,6 @@
             <a:pPr marL="400050" lvl="1" indent="0">
               <a:buNone/>
             </a:pPr>
-            <a:endParaRPr lang="en-GB" b="1" dirty="0" smtClean="0">
-              <a:solidFill>
-                <a:srgbClr val="3366FF"/>
-              </a:solidFill>
-              <a:latin typeface="Courier New"/>
-              <a:cs typeface="Courier New"/>
-            </a:endParaRPr>
-          </a:p>
-          <a:p>
-            <a:pPr marL="400050" lvl="1" indent="0">
-              <a:buNone/>
-            </a:pPr>
             <a:r>
               <a:rPr lang="en-GB" b="1" dirty="0" smtClean="0">
                 <a:solidFill>
@@ -9465,117 +9981,7 @@
                 <a:latin typeface="Courier New"/>
                 <a:cs typeface="Courier New"/>
               </a:rPr>
-              <a:t>// Then write binary to file</a:t>
-            </a:r>
-          </a:p>
-          <a:p>
-            <a:pPr marL="400050" lvl="1" indent="0">
-              <a:buNone/>
-            </a:pPr>
-            <a:r>
-              <a:rPr lang="en-GB" b="1" dirty="0" smtClean="0">
-                <a:solidFill>
-                  <a:srgbClr val="3366FF"/>
-                </a:solidFill>
-                <a:latin typeface="Courier New"/>
-                <a:cs typeface="Courier New"/>
-              </a:rPr>
-              <a:t>…</a:t>
-            </a:r>
-          </a:p>
-          <a:p>
-            <a:pPr marL="0" indent="0">
-              <a:buNone/>
-            </a:pPr>
-            <a:endParaRPr lang="en-GB" b="1" dirty="0" smtClean="0">
-              <a:solidFill>
-                <a:srgbClr val="3366FF"/>
-              </a:solidFill>
-              <a:latin typeface="Courier New"/>
-              <a:cs typeface="Courier New"/>
-            </a:endParaRPr>
-          </a:p>
-          <a:p>
-            <a:r>
-              <a:rPr lang="en-GB" dirty="0"/>
-              <a:t>Loading the binary</a:t>
-            </a:r>
-          </a:p>
-          <a:p>
-            <a:pPr marL="400050" lvl="1" indent="0">
-              <a:buNone/>
-            </a:pPr>
-            <a:r>
-              <a:rPr lang="en-GB" b="1" dirty="0">
-                <a:solidFill>
-                  <a:srgbClr val="3366FF"/>
-                </a:solidFill>
-                <a:latin typeface="Courier New"/>
-                <a:cs typeface="Courier New"/>
-              </a:rPr>
-              <a:t>// Load </a:t>
-            </a:r>
-            <a:r>
-              <a:rPr lang="en-GB" b="1" dirty="0" smtClean="0">
-                <a:solidFill>
-                  <a:srgbClr val="3366FF"/>
-                </a:solidFill>
-                <a:latin typeface="Courier New"/>
-                <a:cs typeface="Courier New"/>
-              </a:rPr>
-              <a:t>compiled program binary from file</a:t>
-            </a:r>
-          </a:p>
-          <a:p>
-            <a:pPr marL="400050" lvl="1" indent="0">
-              <a:buNone/>
-            </a:pPr>
-            <a:r>
-              <a:rPr lang="en-GB" b="1" dirty="0" smtClean="0">
-                <a:solidFill>
-                  <a:srgbClr val="3366FF"/>
-                </a:solidFill>
-                <a:latin typeface="Courier New"/>
-                <a:cs typeface="Courier New"/>
-              </a:rPr>
-              <a:t>…</a:t>
-            </a:r>
-          </a:p>
-          <a:p>
-            <a:pPr marL="400050" lvl="1" indent="0">
-              <a:buNone/>
-            </a:pPr>
-            <a:endParaRPr lang="en-GB" b="1" dirty="0" smtClean="0">
-              <a:solidFill>
-                <a:srgbClr val="3366FF"/>
-              </a:solidFill>
-              <a:latin typeface="Courier New"/>
-              <a:cs typeface="Courier New"/>
-            </a:endParaRPr>
-          </a:p>
-          <a:p>
-            <a:pPr marL="400050" lvl="1" indent="0">
-              <a:buNone/>
-            </a:pPr>
-            <a:r>
-              <a:rPr lang="en-GB" b="1" dirty="0" smtClean="0">
-                <a:solidFill>
-                  <a:srgbClr val="3366FF"/>
-                </a:solidFill>
-                <a:latin typeface="Courier New"/>
-                <a:cs typeface="Courier New"/>
-              </a:rPr>
-              <a:t>// Create program using </a:t>
-            </a:r>
-            <a:r>
-              <a:rPr lang="en-GB" b="1" dirty="0" smtClean="0">
-                <a:solidFill>
-                  <a:srgbClr val="3366FF"/>
-                </a:solidFill>
-                <a:latin typeface="Courier New"/>
-                <a:cs typeface="Courier New"/>
-              </a:rPr>
-              <a:t>binary</a:t>
+              <a:t>// Create program using binary</a:t>
             </a:r>
           </a:p>
           <a:p>
@@ -9664,13 +10070,6 @@
               </a:rPr>
               <a:t>l::Program program (context, devices, b);</a:t>
             </a:r>
-            <a:endParaRPr lang="en-GB" b="1" dirty="0" smtClean="0">
-              <a:solidFill>
-                <a:srgbClr val="3366FF"/>
-              </a:solidFill>
-              <a:latin typeface="Courier New"/>
-              <a:cs typeface="Courier New"/>
-            </a:endParaRPr>
           </a:p>
           <a:p>
             <a:pPr marL="400050" lvl="1" indent="0">
@@ -10092,11 +10491,7 @@
             </a:pPr>
             <a:r>
               <a:rPr lang="en-GB" dirty="0" smtClean="0"/>
-              <a:t>If a binary isn’t compatible with the target device, an error will be returned either </a:t>
-            </a:r>
-            <a:r>
-              <a:rPr lang="en-GB" dirty="0" smtClean="0"/>
-              <a:t>when creating the program or building it</a:t>
+              <a:t>If a binary isn’t compatible with the target device, an error will be returned either when creating the program or building it</a:t>
             </a:r>
             <a:endParaRPr lang="en-GB" dirty="0"/>
           </a:p>
@@ -10237,25 +10632,13 @@
           <a:p>
             <a:r>
               <a:rPr lang="en-GB" dirty="0" smtClean="0"/>
-              <a:t>This defines </a:t>
-            </a:r>
+              <a:t>This defines a binary format that is designed to be portable, allowing us to use the same binary across many platforms</a:t>
+            </a:r>
+          </a:p>
+          <a:p>
             <a:r>
               <a:rPr lang="en-GB" dirty="0" smtClean="0"/>
-              <a:t>a </a:t>
-            </a:r>
-            <a:r>
-              <a:rPr lang="en-GB" dirty="0" smtClean="0"/>
-              <a:t>binary format that is designed to be portable, allowing us to use the same binary across many platforms</a:t>
-            </a:r>
-          </a:p>
-          <a:p>
-            <a:r>
-              <a:rPr lang="en-GB" dirty="0" smtClean="0"/>
-              <a:t>Not yet supported by all </a:t>
-            </a:r>
-            <a:r>
-              <a:rPr lang="en-GB" dirty="0" smtClean="0"/>
-              <a:t>vendors, but SPIR-V is now core in </a:t>
+              <a:t>Not yet supported by all vendors, but SPIR-V is now core in </a:t>
             </a:r>
             <a:r>
               <a:rPr lang="en-GB" dirty="0" err="1" smtClean="0"/>
@@ -10379,11 +10762,7 @@
           <a:p>
             <a:r>
               <a:rPr lang="en-GB" dirty="0" smtClean="0"/>
-              <a:t>This script then becomes part of the build </a:t>
-            </a:r>
-            <a:r>
-              <a:rPr lang="en-GB" dirty="0" smtClean="0"/>
-              <a:t>process in the </a:t>
+              <a:t>This script then becomes part of the build process in the </a:t>
             </a:r>
             <a:r>
               <a:rPr lang="en-GB" dirty="0" err="1" smtClean="0"/>
@@ -10393,7 +10772,6 @@
               <a:rPr lang="en-GB" dirty="0" smtClean="0"/>
               <a:t>:</a:t>
             </a:r>
-            <a:endParaRPr lang="en-GB" dirty="0" smtClean="0"/>
           </a:p>
           <a:p>
             <a:pPr marL="400050" lvl="1" indent="0">
@@ -10511,11 +10889,11 @@
   <p:clrMapOvr>
     <a:masterClrMapping/>
   </p:clrMapOvr>
-  <mc:AlternateContent xmlns:mc="http://schemas.openxmlformats.org/markup-compatibility/2006">
-    <mc:Choice xmlns:p14="http://schemas.microsoft.com/office/powerpoint/2010/main" Requires="p14">
+  <mc:AlternateContent xmlns:mc="http://schemas.openxmlformats.org/markup-compatibility/2006" xmlns:p14="http://schemas.microsoft.com/office/powerpoint/2010/main">
+    <mc:Choice Requires="p14">
       <p:transition spd="slow" p14:dur="2000"/>
     </mc:Choice>
-    <mc:Fallback>
+    <mc:Fallback xmlns="">
       <p:transition xmlns:p14="http://schemas.microsoft.com/office/powerpoint/2010/main" spd="slow"/>
     </mc:Fallback>
   </mc:AlternateContent>
@@ -10985,11 +11363,11 @@
   <p:clrMapOvr>
     <a:masterClrMapping/>
   </p:clrMapOvr>
-  <mc:AlternateContent xmlns:mc="http://schemas.openxmlformats.org/markup-compatibility/2006">
-    <mc:Choice xmlns:p14="http://schemas.microsoft.com/office/powerpoint/2010/main" Requires="p14">
+  <mc:AlternateContent xmlns:mc="http://schemas.openxmlformats.org/markup-compatibility/2006" xmlns:p14="http://schemas.microsoft.com/office/powerpoint/2010/main">
+    <mc:Choice Requires="p14">
       <p:transition spd="slow" p14:dur="2000"/>
     </mc:Choice>
-    <mc:Fallback>
+    <mc:Fallback xmlns="">
       <p:transition xmlns:p14="http://schemas.microsoft.com/office/powerpoint/2010/main" spd="slow"/>
     </mc:Fallback>
   </mc:AlternateContent>
@@ -11321,4 +11699,324 @@
   </a:objectDefaults>
   <a:extraClrSchemeLst/>
 </a:theme>
+</file>
+
+<file path=ppt/theme/theme2.xml><?xml version="1.0" encoding="utf-8"?>
+<a:theme xmlns:a="http://schemas.openxmlformats.org/drawingml/2006/main" name="Office Theme">
+  <a:themeElements>
+    <a:clrScheme name="Office">
+      <a:dk1>
+        <a:sysClr val="windowText" lastClr="000000"/>
+      </a:dk1>
+      <a:lt1>
+        <a:sysClr val="window" lastClr="FFFFFF"/>
+      </a:lt1>
+      <a:dk2>
+        <a:srgbClr val="1F497D"/>
+      </a:dk2>
+      <a:lt2>
+        <a:srgbClr val="EEECE1"/>
+      </a:lt2>
+      <a:accent1>
+        <a:srgbClr val="4F81BD"/>
+      </a:accent1>
+      <a:accent2>
+        <a:srgbClr val="C0504D"/>
+      </a:accent2>
+      <a:accent3>
+        <a:srgbClr val="9BBB59"/>
+      </a:accent3>
+      <a:accent4>
+        <a:srgbClr val="8064A2"/>
+      </a:accent4>
+      <a:accent5>
+        <a:srgbClr val="4BACC6"/>
+      </a:accent5>
+      <a:accent6>
+        <a:srgbClr val="F79646"/>
+      </a:accent6>
+      <a:hlink>
+        <a:srgbClr val="0000FF"/>
+      </a:hlink>
+      <a:folHlink>
+        <a:srgbClr val="800080"/>
+      </a:folHlink>
+    </a:clrScheme>
+    <a:fontScheme name="Office">
+      <a:majorFont>
+        <a:latin typeface="Calibri"/>
+        <a:ea typeface=""/>
+        <a:cs typeface=""/>
+        <a:font script="Jpan" typeface="ＭＳ Ｐゴシック"/>
+        <a:font script="Hang" typeface="맑은 고딕"/>
+        <a:font script="Hans" typeface="宋体"/>
+        <a:font script="Hant" typeface="新細明體"/>
+        <a:font script="Arab" typeface="Times New Roman"/>
+        <a:font script="Hebr" typeface="Times New Roman"/>
+        <a:font script="Thai" typeface="Angsana New"/>
+        <a:font script="Ethi" typeface="Nyala"/>
+        <a:font script="Beng" typeface="Vrinda"/>
+        <a:font script="Gujr" typeface="Shruti"/>
+        <a:font script="Khmr" typeface="MoolBoran"/>
+        <a:font script="Knda" typeface="Tunga"/>
+        <a:font script="Guru" typeface="Raavi"/>
+        <a:font script="Cans" typeface="Euphemia"/>
+        <a:font script="Cher" typeface="Plantagenet Cherokee"/>
+        <a:font script="Yiii" typeface="Microsoft Yi Baiti"/>
+        <a:font script="Tibt" typeface="Microsoft Himalaya"/>
+        <a:font script="Thaa" typeface="MV Boli"/>
+        <a:font script="Deva" typeface="Mangal"/>
+        <a:font script="Telu" typeface="Gautami"/>
+        <a:font script="Taml" typeface="Latha"/>
+        <a:font script="Syrc" typeface="Estrangelo Edessa"/>
+        <a:font script="Orya" typeface="Kalinga"/>
+        <a:font script="Mlym" typeface="Kartika"/>
+        <a:font script="Laoo" typeface="DokChampa"/>
+        <a:font script="Sinh" typeface="Iskoola Pota"/>
+        <a:font script="Mong" typeface="Mongolian Baiti"/>
+        <a:font script="Viet" typeface="Times New Roman"/>
+        <a:font script="Uigh" typeface="Microsoft Uighur"/>
+        <a:font script="Geor" typeface="Sylfaen"/>
+      </a:majorFont>
+      <a:minorFont>
+        <a:latin typeface="Calibri"/>
+        <a:ea typeface=""/>
+        <a:cs typeface=""/>
+        <a:font script="Jpan" typeface="ＭＳ Ｐゴシック"/>
+        <a:font script="Hang" typeface="맑은 고딕"/>
+        <a:font script="Hans" typeface="宋体"/>
+        <a:font script="Hant" typeface="新細明體"/>
+        <a:font script="Arab" typeface="Arial"/>
+        <a:font script="Hebr" typeface="Arial"/>
+        <a:font script="Thai" typeface="Cordia New"/>
+        <a:font script="Ethi" typeface="Nyala"/>
+        <a:font script="Beng" typeface="Vrinda"/>
+        <a:font script="Gujr" typeface="Shruti"/>
+        <a:font script="Khmr" typeface="DaunPenh"/>
+        <a:font script="Knda" typeface="Tunga"/>
+        <a:font script="Guru" typeface="Raavi"/>
+        <a:font script="Cans" typeface="Euphemia"/>
+        <a:font script="Cher" typeface="Plantagenet Cherokee"/>
+        <a:font script="Yiii" typeface="Microsoft Yi Baiti"/>
+        <a:font script="Tibt" typeface="Microsoft Himalaya"/>
+        <a:font script="Thaa" typeface="MV Boli"/>
+        <a:font script="Deva" typeface="Mangal"/>
+        <a:font script="Telu" typeface="Gautami"/>
+        <a:font script="Taml" typeface="Latha"/>
+        <a:font script="Syrc" typeface="Estrangelo Edessa"/>
+        <a:font script="Orya" typeface="Kalinga"/>
+        <a:font script="Mlym" typeface="Kartika"/>
+        <a:font script="Laoo" typeface="DokChampa"/>
+        <a:font script="Sinh" typeface="Iskoola Pota"/>
+        <a:font script="Mong" typeface="Mongolian Baiti"/>
+        <a:font script="Viet" typeface="Arial"/>
+        <a:font script="Uigh" typeface="Microsoft Uighur"/>
+        <a:font script="Geor" typeface="Sylfaen"/>
+      </a:minorFont>
+    </a:fontScheme>
+    <a:fmtScheme name="Office">
+      <a:fillStyleLst>
+        <a:solidFill>
+          <a:schemeClr val="phClr"/>
+        </a:solidFill>
+        <a:gradFill rotWithShape="1">
+          <a:gsLst>
+            <a:gs pos="0">
+              <a:schemeClr val="phClr">
+                <a:tint val="50000"/>
+                <a:satMod val="300000"/>
+              </a:schemeClr>
+            </a:gs>
+            <a:gs pos="35000">
+              <a:schemeClr val="phClr">
+                <a:tint val="37000"/>
+                <a:satMod val="300000"/>
+              </a:schemeClr>
+            </a:gs>
+            <a:gs pos="100000">
+              <a:schemeClr val="phClr">
+                <a:tint val="15000"/>
+                <a:satMod val="350000"/>
+              </a:schemeClr>
+            </a:gs>
+          </a:gsLst>
+          <a:lin ang="16200000" scaled="1"/>
+        </a:gradFill>
+        <a:gradFill rotWithShape="1">
+          <a:gsLst>
+            <a:gs pos="0">
+              <a:schemeClr val="phClr">
+                <a:tint val="100000"/>
+                <a:shade val="100000"/>
+                <a:satMod val="130000"/>
+              </a:schemeClr>
+            </a:gs>
+            <a:gs pos="100000">
+              <a:schemeClr val="phClr">
+                <a:tint val="50000"/>
+                <a:shade val="100000"/>
+                <a:satMod val="350000"/>
+              </a:schemeClr>
+            </a:gs>
+          </a:gsLst>
+          <a:lin ang="16200000" scaled="0"/>
+        </a:gradFill>
+      </a:fillStyleLst>
+      <a:lnStyleLst>
+        <a:ln w="9525" cap="flat" cmpd="sng" algn="ctr">
+          <a:solidFill>
+            <a:schemeClr val="phClr">
+              <a:shade val="95000"/>
+              <a:satMod val="105000"/>
+            </a:schemeClr>
+          </a:solidFill>
+          <a:prstDash val="solid"/>
+        </a:ln>
+        <a:ln w="25400" cap="flat" cmpd="sng" algn="ctr">
+          <a:solidFill>
+            <a:schemeClr val="phClr"/>
+          </a:solidFill>
+          <a:prstDash val="solid"/>
+        </a:ln>
+        <a:ln w="38100" cap="flat" cmpd="sng" algn="ctr">
+          <a:solidFill>
+            <a:schemeClr val="phClr"/>
+          </a:solidFill>
+          <a:prstDash val="solid"/>
+        </a:ln>
+      </a:lnStyleLst>
+      <a:effectStyleLst>
+        <a:effectStyle>
+          <a:effectLst>
+            <a:outerShdw blurRad="40000" dist="20000" dir="5400000" rotWithShape="0">
+              <a:srgbClr val="000000">
+                <a:alpha val="38000"/>
+              </a:srgbClr>
+            </a:outerShdw>
+          </a:effectLst>
+        </a:effectStyle>
+        <a:effectStyle>
+          <a:effectLst>
+            <a:outerShdw blurRad="40000" dist="23000" dir="5400000" rotWithShape="0">
+              <a:srgbClr val="000000">
+                <a:alpha val="35000"/>
+              </a:srgbClr>
+            </a:outerShdw>
+          </a:effectLst>
+        </a:effectStyle>
+        <a:effectStyle>
+          <a:effectLst>
+            <a:outerShdw blurRad="40000" dist="23000" dir="5400000" rotWithShape="0">
+              <a:srgbClr val="000000">
+                <a:alpha val="35000"/>
+              </a:srgbClr>
+            </a:outerShdw>
+          </a:effectLst>
+          <a:scene3d>
+            <a:camera prst="orthographicFront">
+              <a:rot lat="0" lon="0" rev="0"/>
+            </a:camera>
+            <a:lightRig rig="threePt" dir="t">
+              <a:rot lat="0" lon="0" rev="1200000"/>
+            </a:lightRig>
+          </a:scene3d>
+          <a:sp3d>
+            <a:bevelT w="63500" h="25400"/>
+          </a:sp3d>
+        </a:effectStyle>
+      </a:effectStyleLst>
+      <a:bgFillStyleLst>
+        <a:solidFill>
+          <a:schemeClr val="phClr"/>
+        </a:solidFill>
+        <a:gradFill rotWithShape="1">
+          <a:gsLst>
+            <a:gs pos="0">
+              <a:schemeClr val="phClr">
+                <a:tint val="40000"/>
+                <a:satMod val="350000"/>
+              </a:schemeClr>
+            </a:gs>
+            <a:gs pos="40000">
+              <a:schemeClr val="phClr">
+                <a:tint val="45000"/>
+                <a:shade val="99000"/>
+                <a:satMod val="350000"/>
+              </a:schemeClr>
+            </a:gs>
+            <a:gs pos="100000">
+              <a:schemeClr val="phClr">
+                <a:shade val="20000"/>
+                <a:satMod val="255000"/>
+              </a:schemeClr>
+            </a:gs>
+          </a:gsLst>
+          <a:path path="circle">
+            <a:fillToRect l="50000" t="-80000" r="50000" b="180000"/>
+          </a:path>
+        </a:gradFill>
+        <a:gradFill rotWithShape="1">
+          <a:gsLst>
+            <a:gs pos="0">
+              <a:schemeClr val="phClr">
+                <a:tint val="80000"/>
+                <a:satMod val="300000"/>
+              </a:schemeClr>
+            </a:gs>
+            <a:gs pos="100000">
+              <a:schemeClr val="phClr">
+                <a:shade val="30000"/>
+                <a:satMod val="200000"/>
+              </a:schemeClr>
+            </a:gs>
+          </a:gsLst>
+          <a:path path="circle">
+            <a:fillToRect l="50000" t="50000" r="50000" b="50000"/>
+          </a:path>
+        </a:gradFill>
+      </a:bgFillStyleLst>
+    </a:fmtScheme>
+  </a:themeElements>
+  <a:objectDefaults>
+    <a:spDef>
+      <a:spPr/>
+      <a:bodyPr/>
+      <a:lstStyle/>
+      <a:style>
+        <a:lnRef idx="1">
+          <a:schemeClr val="accent1"/>
+        </a:lnRef>
+        <a:fillRef idx="3">
+          <a:schemeClr val="accent1"/>
+        </a:fillRef>
+        <a:effectRef idx="2">
+          <a:schemeClr val="accent1"/>
+        </a:effectRef>
+        <a:fontRef idx="minor">
+          <a:schemeClr val="lt1"/>
+        </a:fontRef>
+      </a:style>
+    </a:spDef>
+    <a:lnDef>
+      <a:spPr/>
+      <a:bodyPr/>
+      <a:lstStyle/>
+      <a:style>
+        <a:lnRef idx="2">
+          <a:schemeClr val="accent1"/>
+        </a:lnRef>
+        <a:fillRef idx="0">
+          <a:schemeClr val="accent1"/>
+        </a:fillRef>
+        <a:effectRef idx="1">
+          <a:schemeClr val="accent1"/>
+        </a:effectRef>
+        <a:fontRef idx="minor">
+          <a:schemeClr val="tx1"/>
+        </a:fontRef>
+      </a:style>
+    </a:lnDef>
+  </a:objectDefaults>
+  <a:extraClrSchemeLst/>
+</a:theme>
 </file>
</xml_diff>

<commit_message>
Updated Exercise 2 to reflect latest modifications to code.
</commit_message>
<xml_diff>
--- a/slides/advanced_part2.pptx
+++ b/slides/advanced_part2.pptx
@@ -213,7 +213,7 @@
           <a:p>
             <a:fld id="{7FB74D45-CC88-7D46-9D48-9989C6A85D58}" type="datetimeFigureOut">
               <a:rPr lang="en-US" smtClean="0"/>
-              <a:t>06/05/15</a:t>
+              <a:t>10/05/15</a:t>
             </a:fld>
             <a:endParaRPr lang="en-US"/>
           </a:p>
@@ -576,6 +576,98 @@
 </p:notes>
 </file>
 
+<file path=ppt/notesSlides/notesSlide2.xml><?xml version="1.0" encoding="utf-8"?>
+<p:notes xmlns:a="http://schemas.openxmlformats.org/drawingml/2006/main" xmlns:r="http://schemas.openxmlformats.org/officeDocument/2006/relationships" xmlns:p="http://schemas.openxmlformats.org/presentationml/2006/main">
+  <p:cSld>
+    <p:spTree>
+      <p:nvGrpSpPr>
+        <p:cNvPr id="1" name=""/>
+        <p:cNvGrpSpPr/>
+        <p:nvPr/>
+      </p:nvGrpSpPr>
+      <p:grpSpPr>
+        <a:xfrm>
+          <a:off x="0" y="0"/>
+          <a:ext cx="0" cy="0"/>
+          <a:chOff x="0" y="0"/>
+          <a:chExt cx="0" cy="0"/>
+        </a:xfrm>
+      </p:grpSpPr>
+      <p:sp>
+        <p:nvSpPr>
+          <p:cNvPr id="2" name="Slide Image Placeholder 1"/>
+          <p:cNvSpPr>
+            <a:spLocks noGrp="1" noRot="1" noChangeAspect="1"/>
+          </p:cNvSpPr>
+          <p:nvPr>
+            <p:ph type="sldImg"/>
+          </p:nvPr>
+        </p:nvSpPr>
+        <p:spPr/>
+      </p:sp>
+      <p:sp>
+        <p:nvSpPr>
+          <p:cNvPr id="3" name="Notes Placeholder 2"/>
+          <p:cNvSpPr>
+            <a:spLocks noGrp="1"/>
+          </p:cNvSpPr>
+          <p:nvPr>
+            <p:ph type="body" idx="1"/>
+          </p:nvPr>
+        </p:nvSpPr>
+        <p:spPr/>
+        <p:txBody>
+          <a:bodyPr/>
+          <a:lstStyle/>
+          <a:p>
+            <a:r>
+              <a:rPr lang="en-GB" dirty="0" err="1" smtClean="0"/>
+              <a:t>ifdefs</a:t>
+            </a:r>
+            <a:r>
+              <a:rPr lang="en-GB" baseline="0" dirty="0" smtClean="0"/>
+              <a:t> for toggling functionality</a:t>
+            </a:r>
+            <a:endParaRPr lang="en-GB" dirty="0"/>
+          </a:p>
+        </p:txBody>
+      </p:sp>
+      <p:sp>
+        <p:nvSpPr>
+          <p:cNvPr id="4" name="Slide Number Placeholder 3"/>
+          <p:cNvSpPr>
+            <a:spLocks noGrp="1"/>
+          </p:cNvSpPr>
+          <p:nvPr>
+            <p:ph type="sldNum" sz="quarter" idx="10"/>
+          </p:nvPr>
+        </p:nvSpPr>
+        <p:spPr/>
+        <p:txBody>
+          <a:bodyPr/>
+          <a:lstStyle/>
+          <a:p>
+            <a:fld id="{E0B00886-CC17-8E42-AE02-995FCC132C1C}" type="slidenum">
+              <a:rPr lang="en-US" smtClean="0"/>
+              <a:t>20</a:t>
+            </a:fld>
+            <a:endParaRPr lang="en-US"/>
+          </a:p>
+        </p:txBody>
+      </p:sp>
+    </p:spTree>
+    <p:extLst>
+      <p:ext uri="{BB962C8B-B14F-4D97-AF65-F5344CB8AC3E}">
+        <p14:creationId xmlns:p14="http://schemas.microsoft.com/office/powerpoint/2010/main" val="2018077648"/>
+      </p:ext>
+    </p:extLst>
+  </p:cSld>
+  <p:clrMapOvr>
+    <a:masterClrMapping/>
+  </p:clrMapOvr>
+</p:notes>
+</file>
+
 <file path=ppt/slideLayouts/slideLayout1.xml><?xml version="1.0" encoding="utf-8"?>
 <p:sldLayout xmlns:a="http://schemas.openxmlformats.org/drawingml/2006/main" xmlns:r="http://schemas.openxmlformats.org/officeDocument/2006/relationships" xmlns:p="http://schemas.openxmlformats.org/presentationml/2006/main" type="title" preserve="1">
   <p:cSld name="Title Slide">
@@ -757,7 +849,7 @@
           <a:p>
             <a:fld id="{D735EA19-98D7-5F47-83EC-D97C4239F8D5}" type="datetimeFigureOut">
               <a:rPr lang="en-US" smtClean="0"/>
-              <a:t>06/05/15</a:t>
+              <a:t>10/05/15</a:t>
             </a:fld>
             <a:endParaRPr lang="en-GB"/>
           </a:p>
@@ -927,7 +1019,7 @@
           <a:p>
             <a:fld id="{D735EA19-98D7-5F47-83EC-D97C4239F8D5}" type="datetimeFigureOut">
               <a:rPr lang="en-US" smtClean="0"/>
-              <a:t>06/05/15</a:t>
+              <a:t>10/05/15</a:t>
             </a:fld>
             <a:endParaRPr lang="en-GB"/>
           </a:p>
@@ -1107,7 +1199,7 @@
           <a:p>
             <a:fld id="{D735EA19-98D7-5F47-83EC-D97C4239F8D5}" type="datetimeFigureOut">
               <a:rPr lang="en-US" smtClean="0"/>
-              <a:t>06/05/15</a:t>
+              <a:t>10/05/15</a:t>
             </a:fld>
             <a:endParaRPr lang="en-GB"/>
           </a:p>
@@ -1277,7 +1369,7 @@
           <a:p>
             <a:fld id="{D735EA19-98D7-5F47-83EC-D97C4239F8D5}" type="datetimeFigureOut">
               <a:rPr lang="en-US" smtClean="0"/>
-              <a:t>06/05/15</a:t>
+              <a:t>10/05/15</a:t>
             </a:fld>
             <a:endParaRPr lang="en-GB"/>
           </a:p>
@@ -1523,7 +1615,7 @@
           <a:p>
             <a:fld id="{D735EA19-98D7-5F47-83EC-D97C4239F8D5}" type="datetimeFigureOut">
               <a:rPr lang="en-US" smtClean="0"/>
-              <a:t>06/05/15</a:t>
+              <a:t>10/05/15</a:t>
             </a:fld>
             <a:endParaRPr lang="en-GB"/>
           </a:p>
@@ -1811,7 +1903,7 @@
           <a:p>
             <a:fld id="{D735EA19-98D7-5F47-83EC-D97C4239F8D5}" type="datetimeFigureOut">
               <a:rPr lang="en-US" smtClean="0"/>
-              <a:t>06/05/15</a:t>
+              <a:t>10/05/15</a:t>
             </a:fld>
             <a:endParaRPr lang="en-GB"/>
           </a:p>
@@ -2233,7 +2325,7 @@
           <a:p>
             <a:fld id="{D735EA19-98D7-5F47-83EC-D97C4239F8D5}" type="datetimeFigureOut">
               <a:rPr lang="en-US" smtClean="0"/>
-              <a:t>06/05/15</a:t>
+              <a:t>10/05/15</a:t>
             </a:fld>
             <a:endParaRPr lang="en-GB"/>
           </a:p>
@@ -2351,7 +2443,7 @@
           <a:p>
             <a:fld id="{D735EA19-98D7-5F47-83EC-D97C4239F8D5}" type="datetimeFigureOut">
               <a:rPr lang="en-US" smtClean="0"/>
-              <a:t>06/05/15</a:t>
+              <a:t>10/05/15</a:t>
             </a:fld>
             <a:endParaRPr lang="en-GB"/>
           </a:p>
@@ -2446,7 +2538,7 @@
           <a:p>
             <a:fld id="{D735EA19-98D7-5F47-83EC-D97C4239F8D5}" type="datetimeFigureOut">
               <a:rPr lang="en-US" smtClean="0"/>
-              <a:t>06/05/15</a:t>
+              <a:t>10/05/15</a:t>
             </a:fld>
             <a:endParaRPr lang="en-GB"/>
           </a:p>
@@ -2723,7 +2815,7 @@
           <a:p>
             <a:fld id="{D735EA19-98D7-5F47-83EC-D97C4239F8D5}" type="datetimeFigureOut">
               <a:rPr lang="en-US" smtClean="0"/>
-              <a:t>06/05/15</a:t>
+              <a:t>10/05/15</a:t>
             </a:fld>
             <a:endParaRPr lang="en-GB"/>
           </a:p>
@@ -2976,7 +3068,7 @@
           <a:p>
             <a:fld id="{D735EA19-98D7-5F47-83EC-D97C4239F8D5}" type="datetimeFigureOut">
               <a:rPr lang="en-US" smtClean="0"/>
-              <a:t>06/05/15</a:t>
+              <a:t>10/05/15</a:t>
             </a:fld>
             <a:endParaRPr lang="en-GB"/>
           </a:p>
@@ -3189,7 +3281,7 @@
           <a:p>
             <a:fld id="{D735EA19-98D7-5F47-83EC-D97C4239F8D5}" type="datetimeFigureOut">
               <a:rPr lang="en-US" smtClean="0"/>
-              <a:t>06/05/15</a:t>
+              <a:t>10/05/15</a:t>
             </a:fld>
             <a:endParaRPr lang="en-GB"/>
           </a:p>
@@ -3581,22 +3673,14 @@
           <a:p>
             <a:r>
               <a:rPr lang="en-GB" dirty="0" smtClean="0"/>
-              <a:t>Advanced OpenCL </a:t>
-            </a:r>
-            <a:r>
-              <a:rPr lang="en-GB" dirty="0" smtClean="0"/>
-              <a:t>Topics:</a:t>
+              <a:t>Advanced OpenCL Topics:</a:t>
             </a:r>
             <a:br>
               <a:rPr lang="en-GB" dirty="0" smtClean="0"/>
             </a:br>
             <a:r>
               <a:rPr lang="en-GB" dirty="0" smtClean="0"/>
-              <a:t>Kernel </a:t>
-            </a:r>
-            <a:r>
-              <a:rPr lang="en-GB" dirty="0" smtClean="0"/>
-              <a:t>Compilation</a:t>
+              <a:t>Kernel Compilation</a:t>
             </a:r>
             <a:endParaRPr lang="en-GB" dirty="0"/>
           </a:p>
@@ -8972,11 +9056,7 @@
           <a:p>
             <a:r>
               <a:rPr lang="en-GB" dirty="0" smtClean="0"/>
-              <a:t>The example is a simple </a:t>
-            </a:r>
-            <a:r>
-              <a:rPr lang="en-GB" dirty="0" smtClean="0"/>
-              <a:t>"</a:t>
+              <a:t>The example is a simple "</a:t>
             </a:r>
             <a:r>
               <a:rPr lang="en-GB" dirty="0" err="1" smtClean="0"/>
@@ -8984,11 +9064,7 @@
             </a:r>
             <a:r>
               <a:rPr lang="en-GB" dirty="0" smtClean="0"/>
-              <a:t>" </a:t>
-            </a:r>
-            <a:r>
-              <a:rPr lang="en-GB" dirty="0" smtClean="0"/>
-              <a:t>code</a:t>
+              <a:t>" code</a:t>
             </a:r>
           </a:p>
           <a:p>
@@ -9016,7 +9092,15 @@
           <a:p>
             <a:r>
               <a:rPr lang="en-GB" dirty="0" smtClean="0"/>
-              <a:t>A fully working (naïve) implementation of this code is provided as a starting point</a:t>
+              <a:t>A fully </a:t>
+            </a:r>
+            <a:r>
+              <a:rPr lang="en-GB" dirty="0" smtClean="0"/>
+              <a:t>working </a:t>
+            </a:r>
+            <a:r>
+              <a:rPr lang="en-GB" dirty="0" smtClean="0"/>
+              <a:t>implementation of this code is provided as a starting point</a:t>
             </a:r>
             <a:endParaRPr lang="en-GB" dirty="0"/>
           </a:p>
@@ -9115,7 +9199,7 @@
         </p:spPr>
         <p:txBody>
           <a:bodyPr>
-            <a:normAutofit fontScale="62500" lnSpcReduction="20000"/>
+            <a:normAutofit fontScale="47500" lnSpcReduction="20000"/>
           </a:bodyPr>
           <a:lstStyle/>
           <a:p>
@@ -9148,7 +9232,15 @@
             </a:pPr>
             <a:r>
               <a:rPr lang="en-GB" dirty="0" smtClean="0"/>
-              <a:t>Disclaimer: This won’t help for every parameter</a:t>
+              <a:t>Disclaimer: This </a:t>
+            </a:r>
+            <a:r>
+              <a:rPr lang="en-GB" dirty="0" smtClean="0"/>
+              <a:t>might not help </a:t>
+            </a:r>
+            <a:r>
+              <a:rPr lang="en-GB" dirty="0" smtClean="0"/>
+              <a:t>for every parameter</a:t>
             </a:r>
           </a:p>
           <a:p>
@@ -9163,7 +9255,15 @@
             </a:r>
             <a:r>
               <a:rPr lang="en-GB" dirty="0" smtClean="0"/>
-              <a:t>: This won’t help on every device – try it on a few!</a:t>
+              <a:t>: This </a:t>
+            </a:r>
+            <a:r>
+              <a:rPr lang="en-GB" dirty="0" smtClean="0"/>
+              <a:t>might not help </a:t>
+            </a:r>
+            <a:r>
+              <a:rPr lang="en-GB" dirty="0" smtClean="0"/>
+              <a:t>on every device – try it on a few!</a:t>
             </a:r>
           </a:p>
           <a:p>
@@ -9209,48 +9309,8 @@
               </a:lnSpc>
             </a:pPr>
             <a:r>
-              <a:rPr lang="en-GB" dirty="0"/>
-              <a:t>Add a command-line argument (e.g. </a:t>
-            </a:r>
-            <a:r>
-              <a:rPr lang="en-GB" b="1" dirty="0">
-                <a:solidFill>
-                  <a:srgbClr val="3366FF"/>
-                </a:solidFill>
-                <a:latin typeface="Courier New"/>
-                <a:cs typeface="Courier New"/>
-              </a:rPr>
-              <a:t>--unroll</a:t>
-            </a:r>
-            <a:r>
-              <a:rPr lang="en-GB" dirty="0"/>
-              <a:t>) to dynamically control the amount of unrolling inside the kernel (replacing the static </a:t>
-            </a:r>
-            <a:r>
-              <a:rPr lang="en-GB" b="1" dirty="0">
-                <a:solidFill>
-                  <a:srgbClr val="3366FF"/>
-                </a:solidFill>
-                <a:latin typeface="Courier New"/>
-                <a:cs typeface="Courier New"/>
-              </a:rPr>
-              <a:t>UNROLL_FACTOR</a:t>
-            </a:r>
-            <a:r>
-              <a:rPr lang="en-GB" dirty="0">
-                <a:solidFill>
-                  <a:srgbClr val="3366FF"/>
-                </a:solidFill>
-              </a:rPr>
-              <a:t> </a:t>
-            </a:r>
-            <a:r>
-              <a:rPr lang="en-GB" dirty="0"/>
-              <a:t>definition</a:t>
-            </a:r>
-            <a:r>
               <a:rPr lang="en-GB" dirty="0" smtClean="0"/>
-              <a:t>)</a:t>
+              <a:t>Make the work-group size inside the kernel a compile-time constant, and change the local memory allocation to only use as much as is needed</a:t>
             </a:r>
           </a:p>
           <a:p>
@@ -9261,18 +9321,79 @@
             </a:pPr>
             <a:r>
               <a:rPr lang="en-GB" dirty="0" smtClean="0"/>
-              <a:t>Get the compiler to generate the assembly code and look through this, correlating it to your source code</a:t>
-            </a:r>
-            <a:endParaRPr lang="en-GB" dirty="0"/>
-          </a:p>
-          <a:p>
-            <a:pPr marL="0" indent="0">
+              <a:t>Modify </a:t>
+            </a:r>
+            <a:r>
+              <a:rPr lang="en-GB" dirty="0"/>
+              <a:t>the kernel to allow the runtime to toggle whether or not local memory is used at all, which could </a:t>
+            </a:r>
+            <a:r>
+              <a:rPr lang="en-GB" dirty="0" smtClean="0"/>
+              <a:t>improve performance portability on devices without physical local memory</a:t>
+            </a:r>
+          </a:p>
+          <a:p>
+            <a:pPr>
               <a:lnSpc>
                 <a:spcPct val="120000"/>
               </a:lnSpc>
-              <a:buNone/>
-            </a:pPr>
-            <a:endParaRPr lang="en-GB" dirty="0" smtClean="0"/>
+            </a:pPr>
+            <a:r>
+              <a:rPr lang="en-GB" dirty="0" smtClean="0"/>
+              <a:t>Add </a:t>
+            </a:r>
+            <a:r>
+              <a:rPr lang="en-GB" dirty="0" smtClean="0"/>
+              <a:t>a command-line argument (e.g. </a:t>
+            </a:r>
+            <a:r>
+              <a:rPr lang="en-GB" b="1" dirty="0" smtClean="0">
+                <a:solidFill>
+                  <a:srgbClr val="3366FF"/>
+                </a:solidFill>
+                <a:latin typeface="Courier New"/>
+                <a:cs typeface="Courier New"/>
+              </a:rPr>
+              <a:t>--unroll</a:t>
+            </a:r>
+            <a:r>
+              <a:rPr lang="en-GB" dirty="0" smtClean="0"/>
+              <a:t>) to dynamically control the amount of unrolling inside the kernel (replacing the static </a:t>
+            </a:r>
+            <a:r>
+              <a:rPr lang="en-GB" b="1" dirty="0" smtClean="0">
+                <a:solidFill>
+                  <a:srgbClr val="3366FF"/>
+                </a:solidFill>
+                <a:latin typeface="Courier New"/>
+                <a:cs typeface="Courier New"/>
+              </a:rPr>
+              <a:t>UNROLL_FACTOR</a:t>
+            </a:r>
+            <a:r>
+              <a:rPr lang="en-GB" dirty="0" smtClean="0">
+                <a:solidFill>
+                  <a:srgbClr val="3366FF"/>
+                </a:solidFill>
+              </a:rPr>
+              <a:t> </a:t>
+            </a:r>
+            <a:r>
+              <a:rPr lang="en-GB" dirty="0" smtClean="0"/>
+              <a:t>definition)</a:t>
+            </a:r>
+          </a:p>
+          <a:p>
+            <a:pPr>
+              <a:lnSpc>
+                <a:spcPct val="120000"/>
+              </a:lnSpc>
+            </a:pPr>
+            <a:r>
+              <a:rPr lang="en-GB" dirty="0" smtClean="0"/>
+              <a:t>Get the compiler to generate the assembly code and look through this, correlating it to your source code</a:t>
+            </a:r>
+            <a:endParaRPr lang="en-GB" dirty="0"/>
           </a:p>
         </p:txBody>
       </p:sp>

</xml_diff>

<commit_message>
Added reqd_work_group_size to NBody solution.
</commit_message>
<xml_diff>
--- a/slides/advanced_part2.pptx
+++ b/slides/advanced_part2.pptx
@@ -16,8 +16,8 @@
     <p:sldId id="262" r:id="rId7"/>
     <p:sldId id="263" r:id="rId8"/>
     <p:sldId id="264" r:id="rId9"/>
-    <p:sldId id="265" r:id="rId10"/>
-    <p:sldId id="266" r:id="rId11"/>
+    <p:sldId id="266" r:id="rId10"/>
+    <p:sldId id="265" r:id="rId11"/>
     <p:sldId id="267" r:id="rId12"/>
     <p:sldId id="269" r:id="rId13"/>
     <p:sldId id="268" r:id="rId14"/>
@@ -527,6 +527,370 @@
           <a:p>
             <a:r>
               <a:rPr lang="en-GB" dirty="0" smtClean="0"/>
+              <a:t>OpenCL</a:t>
+            </a:r>
+            <a:r>
+              <a:rPr lang="en-GB" baseline="0" dirty="0" smtClean="0"/>
+              <a:t> kernels may contain IP</a:t>
+            </a:r>
+            <a:endParaRPr lang="en-GB" dirty="0"/>
+          </a:p>
+        </p:txBody>
+      </p:sp>
+      <p:sp>
+        <p:nvSpPr>
+          <p:cNvPr id="4" name="Slide Number Placeholder 3"/>
+          <p:cNvSpPr>
+            <a:spLocks noGrp="1"/>
+          </p:cNvSpPr>
+          <p:nvPr>
+            <p:ph type="sldNum" sz="quarter" idx="10"/>
+          </p:nvPr>
+        </p:nvSpPr>
+        <p:spPr/>
+        <p:txBody>
+          <a:bodyPr/>
+          <a:lstStyle/>
+          <a:p>
+            <a:fld id="{E0B00886-CC17-8E42-AE02-995FCC132C1C}" type="slidenum">
+              <a:rPr lang="en-US" smtClean="0"/>
+              <a:t>2</a:t>
+            </a:fld>
+            <a:endParaRPr lang="en-US"/>
+          </a:p>
+        </p:txBody>
+      </p:sp>
+    </p:spTree>
+    <p:extLst>
+      <p:ext uri="{BB962C8B-B14F-4D97-AF65-F5344CB8AC3E}">
+        <p14:creationId xmlns:p14="http://schemas.microsoft.com/office/powerpoint/2010/main" val="2531658645"/>
+      </p:ext>
+    </p:extLst>
+  </p:cSld>
+  <p:clrMapOvr>
+    <a:masterClrMapping/>
+  </p:clrMapOvr>
+</p:notes>
+</file>
+
+<file path=ppt/notesSlides/notesSlide2.xml><?xml version="1.0" encoding="utf-8"?>
+<p:notes xmlns:a="http://schemas.openxmlformats.org/drawingml/2006/main" xmlns:r="http://schemas.openxmlformats.org/officeDocument/2006/relationships" xmlns:p="http://schemas.openxmlformats.org/presentationml/2006/main">
+  <p:cSld>
+    <p:spTree>
+      <p:nvGrpSpPr>
+        <p:cNvPr id="1" name=""/>
+        <p:cNvGrpSpPr/>
+        <p:nvPr/>
+      </p:nvGrpSpPr>
+      <p:grpSpPr>
+        <a:xfrm>
+          <a:off x="0" y="0"/>
+          <a:ext cx="0" cy="0"/>
+          <a:chOff x="0" y="0"/>
+          <a:chExt cx="0" cy="0"/>
+        </a:xfrm>
+      </p:grpSpPr>
+      <p:sp>
+        <p:nvSpPr>
+          <p:cNvPr id="2" name="Slide Image Placeholder 1"/>
+          <p:cNvSpPr>
+            <a:spLocks noGrp="1" noRot="1" noChangeAspect="1"/>
+          </p:cNvSpPr>
+          <p:nvPr>
+            <p:ph type="sldImg"/>
+          </p:nvPr>
+        </p:nvSpPr>
+        <p:spPr/>
+      </p:sp>
+      <p:sp>
+        <p:nvSpPr>
+          <p:cNvPr id="3" name="Notes Placeholder 2"/>
+          <p:cNvSpPr>
+            <a:spLocks noGrp="1"/>
+          </p:cNvSpPr>
+          <p:nvPr>
+            <p:ph type="body" idx="1"/>
+          </p:nvPr>
+        </p:nvSpPr>
+        <p:spPr/>
+        <p:txBody>
+          <a:bodyPr/>
+          <a:lstStyle/>
+          <a:p>
+            <a:r>
+              <a:rPr lang="en-GB" dirty="0" smtClean="0"/>
+              <a:t>Kernels</a:t>
+            </a:r>
+            <a:r>
+              <a:rPr lang="en-GB" baseline="0" dirty="0" smtClean="0"/>
+              <a:t> bundled into binary, no need to ship extra files, set paths </a:t>
+            </a:r>
+            <a:r>
+              <a:rPr lang="en-GB" baseline="0" dirty="0" err="1" smtClean="0"/>
+              <a:t>etc</a:t>
+            </a:r>
+            <a:endParaRPr lang="en-GB" dirty="0"/>
+          </a:p>
+        </p:txBody>
+      </p:sp>
+      <p:sp>
+        <p:nvSpPr>
+          <p:cNvPr id="4" name="Slide Number Placeholder 3"/>
+          <p:cNvSpPr>
+            <a:spLocks noGrp="1"/>
+          </p:cNvSpPr>
+          <p:nvPr>
+            <p:ph type="sldNum" sz="quarter" idx="10"/>
+          </p:nvPr>
+        </p:nvSpPr>
+        <p:spPr/>
+        <p:txBody>
+          <a:bodyPr/>
+          <a:lstStyle/>
+          <a:p>
+            <a:fld id="{E0B00886-CC17-8E42-AE02-995FCC132C1C}" type="slidenum">
+              <a:rPr lang="en-US" smtClean="0"/>
+              <a:t>8</a:t>
+            </a:fld>
+            <a:endParaRPr lang="en-US"/>
+          </a:p>
+        </p:txBody>
+      </p:sp>
+    </p:spTree>
+    <p:extLst>
+      <p:ext uri="{BB962C8B-B14F-4D97-AF65-F5344CB8AC3E}">
+        <p14:creationId xmlns:p14="http://schemas.microsoft.com/office/powerpoint/2010/main" val="2816232595"/>
+      </p:ext>
+    </p:extLst>
+  </p:cSld>
+  <p:clrMapOvr>
+    <a:masterClrMapping/>
+  </p:clrMapOvr>
+</p:notes>
+</file>
+
+<file path=ppt/notesSlides/notesSlide3.xml><?xml version="1.0" encoding="utf-8"?>
+<p:notes xmlns:a="http://schemas.openxmlformats.org/drawingml/2006/main" xmlns:r="http://schemas.openxmlformats.org/officeDocument/2006/relationships" xmlns:p="http://schemas.openxmlformats.org/presentationml/2006/main">
+  <p:cSld>
+    <p:spTree>
+      <p:nvGrpSpPr>
+        <p:cNvPr id="1" name=""/>
+        <p:cNvGrpSpPr/>
+        <p:nvPr/>
+      </p:nvGrpSpPr>
+      <p:grpSpPr>
+        <a:xfrm>
+          <a:off x="0" y="0"/>
+          <a:ext cx="0" cy="0"/>
+          <a:chOff x="0" y="0"/>
+          <a:chExt cx="0" cy="0"/>
+        </a:xfrm>
+      </p:grpSpPr>
+      <p:sp>
+        <p:nvSpPr>
+          <p:cNvPr id="2" name="Slide Image Placeholder 1"/>
+          <p:cNvSpPr>
+            <a:spLocks noGrp="1" noRot="1" noChangeAspect="1"/>
+          </p:cNvSpPr>
+          <p:nvPr>
+            <p:ph type="sldImg"/>
+          </p:nvPr>
+        </p:nvSpPr>
+        <p:spPr/>
+      </p:sp>
+      <p:sp>
+        <p:nvSpPr>
+          <p:cNvPr id="3" name="Notes Placeholder 2"/>
+          <p:cNvSpPr>
+            <a:spLocks noGrp="1"/>
+          </p:cNvSpPr>
+          <p:nvPr>
+            <p:ph type="body" idx="1"/>
+          </p:nvPr>
+        </p:nvSpPr>
+        <p:spPr/>
+        <p:txBody>
+          <a:bodyPr/>
+          <a:lstStyle/>
+          <a:p>
+            <a:endParaRPr lang="en-GB" dirty="0"/>
+          </a:p>
+        </p:txBody>
+      </p:sp>
+      <p:sp>
+        <p:nvSpPr>
+          <p:cNvPr id="4" name="Slide Number Placeholder 3"/>
+          <p:cNvSpPr>
+            <a:spLocks noGrp="1"/>
+          </p:cNvSpPr>
+          <p:nvPr>
+            <p:ph type="sldNum" sz="quarter" idx="10"/>
+          </p:nvPr>
+        </p:nvSpPr>
+        <p:spPr/>
+        <p:txBody>
+          <a:bodyPr/>
+          <a:lstStyle/>
+          <a:p>
+            <a:fld id="{E0B00886-CC17-8E42-AE02-995FCC132C1C}" type="slidenum">
+              <a:rPr lang="en-US" smtClean="0"/>
+              <a:t>12</a:t>
+            </a:fld>
+            <a:endParaRPr lang="en-US"/>
+          </a:p>
+        </p:txBody>
+      </p:sp>
+    </p:spTree>
+    <p:extLst>
+      <p:ext uri="{BB962C8B-B14F-4D97-AF65-F5344CB8AC3E}">
+        <p14:creationId xmlns:p14="http://schemas.microsoft.com/office/powerpoint/2010/main" val="1354698458"/>
+      </p:ext>
+    </p:extLst>
+  </p:cSld>
+  <p:clrMapOvr>
+    <a:masterClrMapping/>
+  </p:clrMapOvr>
+</p:notes>
+</file>
+
+<file path=ppt/notesSlides/notesSlide4.xml><?xml version="1.0" encoding="utf-8"?>
+<p:notes xmlns:a="http://schemas.openxmlformats.org/drawingml/2006/main" xmlns:r="http://schemas.openxmlformats.org/officeDocument/2006/relationships" xmlns:p="http://schemas.openxmlformats.org/presentationml/2006/main">
+  <p:cSld>
+    <p:spTree>
+      <p:nvGrpSpPr>
+        <p:cNvPr id="1" name=""/>
+        <p:cNvGrpSpPr/>
+        <p:nvPr/>
+      </p:nvGrpSpPr>
+      <p:grpSpPr>
+        <a:xfrm>
+          <a:off x="0" y="0"/>
+          <a:ext cx="0" cy="0"/>
+          <a:chOff x="0" y="0"/>
+          <a:chExt cx="0" cy="0"/>
+        </a:xfrm>
+      </p:grpSpPr>
+      <p:sp>
+        <p:nvSpPr>
+          <p:cNvPr id="2" name="Slide Image Placeholder 1"/>
+          <p:cNvSpPr>
+            <a:spLocks noGrp="1" noRot="1" noChangeAspect="1"/>
+          </p:cNvSpPr>
+          <p:nvPr>
+            <p:ph type="sldImg"/>
+          </p:nvPr>
+        </p:nvSpPr>
+        <p:spPr/>
+      </p:sp>
+      <p:sp>
+        <p:nvSpPr>
+          <p:cNvPr id="3" name="Notes Placeholder 2"/>
+          <p:cNvSpPr>
+            <a:spLocks noGrp="1"/>
+          </p:cNvSpPr>
+          <p:nvPr>
+            <p:ph type="body" idx="1"/>
+          </p:nvPr>
+        </p:nvSpPr>
+        <p:spPr/>
+        <p:txBody>
+          <a:bodyPr/>
+          <a:lstStyle/>
+          <a:p>
+            <a:r>
+              <a:rPr lang="en-GB" dirty="0" smtClean="0"/>
+              <a:t>e.g. Image processing framework, allow third-parties</a:t>
+            </a:r>
+            <a:r>
+              <a:rPr lang="en-GB" baseline="0" dirty="0" smtClean="0"/>
+              <a:t> to drop additional filter kernels into directory and automatically insert them into pipeline</a:t>
+            </a:r>
+            <a:endParaRPr lang="en-GB" dirty="0"/>
+          </a:p>
+        </p:txBody>
+      </p:sp>
+      <p:sp>
+        <p:nvSpPr>
+          <p:cNvPr id="4" name="Slide Number Placeholder 3"/>
+          <p:cNvSpPr>
+            <a:spLocks noGrp="1"/>
+          </p:cNvSpPr>
+          <p:nvPr>
+            <p:ph type="sldNum" sz="quarter" idx="10"/>
+          </p:nvPr>
+        </p:nvSpPr>
+        <p:spPr/>
+        <p:txBody>
+          <a:bodyPr/>
+          <a:lstStyle/>
+          <a:p>
+            <a:fld id="{E0B00886-CC17-8E42-AE02-995FCC132C1C}" type="slidenum">
+              <a:rPr lang="en-US" smtClean="0"/>
+              <a:t>13</a:t>
+            </a:fld>
+            <a:endParaRPr lang="en-US"/>
+          </a:p>
+        </p:txBody>
+      </p:sp>
+    </p:spTree>
+    <p:extLst>
+      <p:ext uri="{BB962C8B-B14F-4D97-AF65-F5344CB8AC3E}">
+        <p14:creationId xmlns:p14="http://schemas.microsoft.com/office/powerpoint/2010/main" val="1015348040"/>
+      </p:ext>
+    </p:extLst>
+  </p:cSld>
+  <p:clrMapOvr>
+    <a:masterClrMapping/>
+  </p:clrMapOvr>
+</p:notes>
+</file>
+
+<file path=ppt/notesSlides/notesSlide5.xml><?xml version="1.0" encoding="utf-8"?>
+<p:notes xmlns:a="http://schemas.openxmlformats.org/drawingml/2006/main" xmlns:r="http://schemas.openxmlformats.org/officeDocument/2006/relationships" xmlns:p="http://schemas.openxmlformats.org/presentationml/2006/main">
+  <p:cSld>
+    <p:spTree>
+      <p:nvGrpSpPr>
+        <p:cNvPr id="1" name=""/>
+        <p:cNvGrpSpPr/>
+        <p:nvPr/>
+      </p:nvGrpSpPr>
+      <p:grpSpPr>
+        <a:xfrm>
+          <a:off x="0" y="0"/>
+          <a:ext cx="0" cy="0"/>
+          <a:chOff x="0" y="0"/>
+          <a:chExt cx="0" cy="0"/>
+        </a:xfrm>
+      </p:grpSpPr>
+      <p:sp>
+        <p:nvSpPr>
+          <p:cNvPr id="2" name="Slide Image Placeholder 1"/>
+          <p:cNvSpPr>
+            <a:spLocks noGrp="1" noRot="1" noChangeAspect="1"/>
+          </p:cNvSpPr>
+          <p:nvPr>
+            <p:ph type="sldImg"/>
+          </p:nvPr>
+        </p:nvSpPr>
+        <p:spPr/>
+      </p:sp>
+      <p:sp>
+        <p:nvSpPr>
+          <p:cNvPr id="3" name="Notes Placeholder 2"/>
+          <p:cNvSpPr>
+            <a:spLocks noGrp="1"/>
+          </p:cNvSpPr>
+          <p:nvPr>
+            <p:ph type="body" idx="1"/>
+          </p:nvPr>
+        </p:nvSpPr>
+        <p:spPr/>
+        <p:txBody>
+          <a:bodyPr/>
+          <a:lstStyle/>
+          <a:p>
+            <a:r>
+              <a:rPr lang="en-GB" dirty="0" smtClean="0"/>
               <a:t>Hints</a:t>
             </a:r>
             <a:r>
@@ -576,7 +940,7 @@
 </p:notes>
 </file>
 
-<file path=ppt/notesSlides/notesSlide2.xml><?xml version="1.0" encoding="utf-8"?>
+<file path=ppt/notesSlides/notesSlide6.xml><?xml version="1.0" encoding="utf-8"?>
 <p:notes xmlns:a="http://schemas.openxmlformats.org/drawingml/2006/main" xmlns:r="http://schemas.openxmlformats.org/officeDocument/2006/relationships" xmlns:p="http://schemas.openxmlformats.org/presentationml/2006/main">
   <p:cSld>
     <p:spTree>
@@ -3783,770 +4147,34 @@
       </p:sp>
       <p:sp>
         <p:nvSpPr>
-          <p:cNvPr id="3" name="Text Placeholder 2"/>
-          <p:cNvSpPr>
-            <a:spLocks noGrp="1"/>
-          </p:cNvSpPr>
-          <p:nvPr>
-            <p:ph type="body" idx="1"/>
+          <p:cNvPr id="3" name="Content Placeholder 2"/>
+          <p:cNvSpPr>
+            <a:spLocks noGrp="1"/>
+          </p:cNvSpPr>
+          <p:nvPr>
+            <p:ph idx="1"/>
           </p:nvPr>
         </p:nvSpPr>
         <p:spPr/>
         <p:txBody>
-          <a:bodyPr/>
-          <a:lstStyle/>
-          <a:p>
-            <a:r>
-              <a:rPr lang="en-GB" dirty="0" smtClean="0"/>
-              <a:t>Before </a:t>
-            </a:r>
-            <a:r>
-              <a:rPr lang="en-GB" dirty="0" err="1" smtClean="0"/>
-              <a:t>stringification</a:t>
-            </a:r>
-            <a:r>
-              <a:rPr lang="en-GB" dirty="0" smtClean="0"/>
-              <a:t>:</a:t>
-            </a:r>
-            <a:endParaRPr lang="en-GB" dirty="0"/>
-          </a:p>
-        </p:txBody>
-      </p:sp>
-      <p:sp>
-        <p:nvSpPr>
-          <p:cNvPr id="4" name="Content Placeholder 3"/>
-          <p:cNvSpPr>
-            <a:spLocks noGrp="1"/>
-          </p:cNvSpPr>
-          <p:nvPr>
-            <p:ph sz="half" idx="2"/>
-          </p:nvPr>
-        </p:nvSpPr>
-        <p:spPr/>
-        <p:txBody>
           <a:bodyPr>
-            <a:normAutofit/>
+            <a:normAutofit fontScale="70000" lnSpcReduction="20000"/>
           </a:bodyPr>
           <a:lstStyle/>
           <a:p>
+            <a:r>
+              <a:rPr lang="en-US" sz="3400" dirty="0" smtClean="0">
+                <a:latin typeface="Trebuchet MS"/>
+                <a:cs typeface="Trebuchet MS"/>
+              </a:rPr>
+              <a:t>This script makes use of SED to escape special characters and wrap lines in quotation marks</a:t>
+            </a:r>
+          </a:p>
+          <a:p>
             <a:pPr marL="0" indent="0">
               <a:buNone/>
             </a:pPr>
-            <a:r>
-              <a:rPr lang="en-GB" sz="2000" b="1" dirty="0">
-                <a:solidFill>
-                  <a:srgbClr val="3366FF"/>
-                </a:solidFill>
-                <a:latin typeface="Courier New"/>
-                <a:cs typeface="Courier New"/>
-              </a:rPr>
-              <a:t>kernel void </a:t>
-            </a:r>
-            <a:r>
-              <a:rPr lang="en-GB" sz="2000" b="1" dirty="0" err="1" smtClean="0">
-                <a:solidFill>
-                  <a:srgbClr val="3366FF"/>
-                </a:solidFill>
-                <a:latin typeface="Courier New"/>
-                <a:cs typeface="Courier New"/>
-              </a:rPr>
-              <a:t>vecadd</a:t>
-            </a:r>
-            <a:r>
-              <a:rPr lang="en-GB" sz="2000" b="1" dirty="0" smtClean="0">
-                <a:solidFill>
-                  <a:srgbClr val="3366FF"/>
-                </a:solidFill>
-                <a:latin typeface="Courier New"/>
-                <a:cs typeface="Courier New"/>
-              </a:rPr>
-              <a:t>(</a:t>
-            </a:r>
-          </a:p>
-          <a:p>
-            <a:pPr marL="0" indent="0">
-              <a:buNone/>
-            </a:pPr>
-            <a:r>
-              <a:rPr lang="en-GB" sz="2000" b="1" dirty="0" smtClean="0">
-                <a:solidFill>
-                  <a:srgbClr val="3366FF"/>
-                </a:solidFill>
-                <a:latin typeface="Courier New"/>
-                <a:cs typeface="Courier New"/>
-              </a:rPr>
-              <a:t>  global </a:t>
-            </a:r>
-            <a:r>
-              <a:rPr lang="en-GB" sz="2000" b="1" dirty="0">
-                <a:solidFill>
-                  <a:srgbClr val="3366FF"/>
-                </a:solidFill>
-                <a:latin typeface="Courier New"/>
-                <a:cs typeface="Courier New"/>
-              </a:rPr>
-              <a:t>float *a</a:t>
-            </a:r>
-            <a:r>
-              <a:rPr lang="en-GB" sz="2000" b="1" dirty="0" smtClean="0">
-                <a:solidFill>
-                  <a:srgbClr val="3366FF"/>
-                </a:solidFill>
-                <a:latin typeface="Courier New"/>
-                <a:cs typeface="Courier New"/>
-              </a:rPr>
-              <a:t>,</a:t>
-            </a:r>
-          </a:p>
-          <a:p>
-            <a:pPr marL="0" indent="0">
-              <a:buNone/>
-            </a:pPr>
-            <a:r>
-              <a:rPr lang="en-GB" sz="2000" b="1" dirty="0">
-                <a:solidFill>
-                  <a:srgbClr val="3366FF"/>
-                </a:solidFill>
-                <a:latin typeface="Courier New"/>
-                <a:cs typeface="Courier New"/>
-              </a:rPr>
-              <a:t> </a:t>
-            </a:r>
-            <a:r>
-              <a:rPr lang="en-GB" sz="2000" b="1" dirty="0" smtClean="0">
-                <a:solidFill>
-                  <a:srgbClr val="3366FF"/>
-                </a:solidFill>
-                <a:latin typeface="Courier New"/>
-                <a:cs typeface="Courier New"/>
-              </a:rPr>
-              <a:t> global </a:t>
-            </a:r>
-            <a:r>
-              <a:rPr lang="en-GB" sz="2000" b="1" dirty="0">
-                <a:solidFill>
-                  <a:srgbClr val="3366FF"/>
-                </a:solidFill>
-                <a:latin typeface="Courier New"/>
-                <a:cs typeface="Courier New"/>
-              </a:rPr>
-              <a:t>float *b</a:t>
-            </a:r>
-            <a:r>
-              <a:rPr lang="en-GB" sz="2000" b="1" dirty="0" smtClean="0">
-                <a:solidFill>
-                  <a:srgbClr val="3366FF"/>
-                </a:solidFill>
-                <a:latin typeface="Courier New"/>
-                <a:cs typeface="Courier New"/>
-              </a:rPr>
-              <a:t>,</a:t>
-            </a:r>
-          </a:p>
-          <a:p>
-            <a:pPr marL="0" indent="0">
-              <a:buNone/>
-            </a:pPr>
-            <a:r>
-              <a:rPr lang="en-GB" sz="2000" b="1" dirty="0">
-                <a:solidFill>
-                  <a:srgbClr val="3366FF"/>
-                </a:solidFill>
-                <a:latin typeface="Courier New"/>
-                <a:cs typeface="Courier New"/>
-              </a:rPr>
-              <a:t> </a:t>
-            </a:r>
-            <a:r>
-              <a:rPr lang="en-GB" sz="2000" b="1" dirty="0" smtClean="0">
-                <a:solidFill>
-                  <a:srgbClr val="3366FF"/>
-                </a:solidFill>
-                <a:latin typeface="Courier New"/>
-                <a:cs typeface="Courier New"/>
-              </a:rPr>
-              <a:t> global </a:t>
-            </a:r>
-            <a:r>
-              <a:rPr lang="en-GB" sz="2000" b="1" dirty="0">
-                <a:solidFill>
-                  <a:srgbClr val="3366FF"/>
-                </a:solidFill>
-                <a:latin typeface="Courier New"/>
-                <a:cs typeface="Courier New"/>
-              </a:rPr>
-              <a:t>float *c)</a:t>
-            </a:r>
-          </a:p>
-          <a:p>
-            <a:pPr marL="0" indent="0">
-              <a:buNone/>
-            </a:pPr>
-            <a:r>
-              <a:rPr lang="en-GB" sz="2000" b="1" dirty="0">
-                <a:solidFill>
-                  <a:srgbClr val="3366FF"/>
-                </a:solidFill>
-                <a:latin typeface="Courier New"/>
-                <a:cs typeface="Courier New"/>
-              </a:rPr>
-              <a:t>{</a:t>
-            </a:r>
-          </a:p>
-          <a:p>
-            <a:pPr marL="0" indent="0">
-              <a:buNone/>
-            </a:pPr>
-            <a:r>
-              <a:rPr lang="en-GB" sz="2000" b="1" dirty="0">
-                <a:solidFill>
-                  <a:srgbClr val="3366FF"/>
-                </a:solidFill>
-                <a:latin typeface="Courier New"/>
-                <a:cs typeface="Courier New"/>
-              </a:rPr>
-              <a:t>  </a:t>
-            </a:r>
-            <a:r>
-              <a:rPr lang="en-GB" sz="2000" b="1" dirty="0" err="1">
-                <a:solidFill>
-                  <a:srgbClr val="3366FF"/>
-                </a:solidFill>
-                <a:latin typeface="Courier New"/>
-                <a:cs typeface="Courier New"/>
-              </a:rPr>
-              <a:t>int</a:t>
-            </a:r>
-            <a:r>
-              <a:rPr lang="en-GB" sz="2000" b="1" dirty="0">
-                <a:solidFill>
-                  <a:srgbClr val="3366FF"/>
-                </a:solidFill>
-                <a:latin typeface="Courier New"/>
-                <a:cs typeface="Courier New"/>
-              </a:rPr>
-              <a:t> </a:t>
-            </a:r>
-            <a:r>
-              <a:rPr lang="en-GB" sz="2000" b="1" dirty="0" err="1">
-                <a:solidFill>
-                  <a:srgbClr val="3366FF"/>
-                </a:solidFill>
-                <a:latin typeface="Courier New"/>
-                <a:cs typeface="Courier New"/>
-              </a:rPr>
-              <a:t>i</a:t>
-            </a:r>
-            <a:r>
-              <a:rPr lang="en-GB" sz="2000" b="1" dirty="0">
-                <a:solidFill>
-                  <a:srgbClr val="3366FF"/>
-                </a:solidFill>
-                <a:latin typeface="Courier New"/>
-                <a:cs typeface="Courier New"/>
-              </a:rPr>
-              <a:t> </a:t>
-            </a:r>
-            <a:r>
-              <a:rPr lang="en-GB" sz="2000" b="1" dirty="0" smtClean="0">
-                <a:solidFill>
-                  <a:srgbClr val="3366FF"/>
-                </a:solidFill>
-                <a:latin typeface="Courier New"/>
-                <a:cs typeface="Courier New"/>
-              </a:rPr>
-              <a:t>=</a:t>
-            </a:r>
-          </a:p>
-          <a:p>
-            <a:pPr marL="0" indent="0">
-              <a:buNone/>
-            </a:pPr>
-            <a:r>
-              <a:rPr lang="en-GB" sz="2000" b="1" dirty="0">
-                <a:solidFill>
-                  <a:srgbClr val="3366FF"/>
-                </a:solidFill>
-                <a:latin typeface="Courier New"/>
-                <a:cs typeface="Courier New"/>
-              </a:rPr>
-              <a:t> </a:t>
-            </a:r>
-            <a:r>
-              <a:rPr lang="en-GB" sz="2000" b="1" dirty="0" smtClean="0">
-                <a:solidFill>
-                  <a:srgbClr val="3366FF"/>
-                </a:solidFill>
-                <a:latin typeface="Courier New"/>
-                <a:cs typeface="Courier New"/>
-              </a:rPr>
-              <a:t>   </a:t>
-            </a:r>
-            <a:r>
-              <a:rPr lang="en-GB" sz="2000" b="1" dirty="0" err="1" smtClean="0">
-                <a:solidFill>
-                  <a:srgbClr val="3366FF"/>
-                </a:solidFill>
-                <a:latin typeface="Courier New"/>
-                <a:cs typeface="Courier New"/>
-              </a:rPr>
-              <a:t>get_global_id</a:t>
-            </a:r>
-            <a:r>
-              <a:rPr lang="en-GB" sz="2000" b="1" dirty="0">
-                <a:solidFill>
-                  <a:srgbClr val="3366FF"/>
-                </a:solidFill>
-                <a:latin typeface="Courier New"/>
-                <a:cs typeface="Courier New"/>
-              </a:rPr>
-              <a:t>(0);</a:t>
-            </a:r>
-          </a:p>
-          <a:p>
-            <a:pPr marL="0" indent="0">
-              <a:buNone/>
-            </a:pPr>
-            <a:r>
-              <a:rPr lang="en-GB" sz="2000" b="1" dirty="0">
-                <a:solidFill>
-                  <a:srgbClr val="3366FF"/>
-                </a:solidFill>
-                <a:latin typeface="Courier New"/>
-                <a:cs typeface="Courier New"/>
-              </a:rPr>
-              <a:t>  c[</a:t>
-            </a:r>
-            <a:r>
-              <a:rPr lang="en-GB" sz="2000" b="1" dirty="0" err="1">
-                <a:solidFill>
-                  <a:srgbClr val="3366FF"/>
-                </a:solidFill>
-                <a:latin typeface="Courier New"/>
-                <a:cs typeface="Courier New"/>
-              </a:rPr>
-              <a:t>i</a:t>
-            </a:r>
-            <a:r>
-              <a:rPr lang="en-GB" sz="2000" b="1" dirty="0">
-                <a:solidFill>
-                  <a:srgbClr val="3366FF"/>
-                </a:solidFill>
-                <a:latin typeface="Courier New"/>
-                <a:cs typeface="Courier New"/>
-              </a:rPr>
-              <a:t>] = a[</a:t>
-            </a:r>
-            <a:r>
-              <a:rPr lang="en-GB" sz="2000" b="1" dirty="0" err="1">
-                <a:solidFill>
-                  <a:srgbClr val="3366FF"/>
-                </a:solidFill>
-                <a:latin typeface="Courier New"/>
-                <a:cs typeface="Courier New"/>
-              </a:rPr>
-              <a:t>i</a:t>
-            </a:r>
-            <a:r>
-              <a:rPr lang="en-GB" sz="2000" b="1" dirty="0">
-                <a:solidFill>
-                  <a:srgbClr val="3366FF"/>
-                </a:solidFill>
-                <a:latin typeface="Courier New"/>
-                <a:cs typeface="Courier New"/>
-              </a:rPr>
-              <a:t>] + b[</a:t>
-            </a:r>
-            <a:r>
-              <a:rPr lang="en-GB" sz="2000" b="1" dirty="0" err="1">
-                <a:solidFill>
-                  <a:srgbClr val="3366FF"/>
-                </a:solidFill>
-                <a:latin typeface="Courier New"/>
-                <a:cs typeface="Courier New"/>
-              </a:rPr>
-              <a:t>i</a:t>
-            </a:r>
-            <a:r>
-              <a:rPr lang="en-GB" sz="2000" b="1" dirty="0">
-                <a:solidFill>
-                  <a:srgbClr val="3366FF"/>
-                </a:solidFill>
-                <a:latin typeface="Courier New"/>
-                <a:cs typeface="Courier New"/>
-              </a:rPr>
-              <a:t>];</a:t>
-            </a:r>
-          </a:p>
-          <a:p>
-            <a:pPr marL="0" indent="0">
-              <a:buNone/>
-            </a:pPr>
-            <a:r>
-              <a:rPr lang="en-GB" sz="2000" b="1" dirty="0" smtClean="0">
-                <a:solidFill>
-                  <a:srgbClr val="3366FF"/>
-                </a:solidFill>
-                <a:latin typeface="Courier New"/>
-                <a:cs typeface="Courier New"/>
-              </a:rPr>
-              <a:t>}</a:t>
-            </a:r>
-          </a:p>
-        </p:txBody>
-      </p:sp>
-      <p:sp>
-        <p:nvSpPr>
-          <p:cNvPr id="5" name="Text Placeholder 4"/>
-          <p:cNvSpPr>
-            <a:spLocks noGrp="1"/>
-          </p:cNvSpPr>
-          <p:nvPr>
-            <p:ph type="body" sz="quarter" idx="3"/>
-          </p:nvPr>
-        </p:nvSpPr>
-        <p:spPr/>
-        <p:txBody>
-          <a:bodyPr/>
-          <a:lstStyle/>
-          <a:p>
-            <a:r>
-              <a:rPr lang="en-GB" dirty="0" smtClean="0"/>
-              <a:t>After </a:t>
-            </a:r>
-            <a:r>
-              <a:rPr lang="en-GB" dirty="0" err="1" smtClean="0"/>
-              <a:t>stringification</a:t>
-            </a:r>
-            <a:r>
-              <a:rPr lang="en-GB" dirty="0" smtClean="0"/>
-              <a:t>:</a:t>
-            </a:r>
-            <a:endParaRPr lang="en-GB" dirty="0"/>
-          </a:p>
-        </p:txBody>
-      </p:sp>
-      <p:sp>
-        <p:nvSpPr>
-          <p:cNvPr id="6" name="Content Placeholder 5"/>
-          <p:cNvSpPr>
-            <a:spLocks noGrp="1"/>
-          </p:cNvSpPr>
-          <p:nvPr>
-            <p:ph sz="quarter" idx="4"/>
-          </p:nvPr>
-        </p:nvSpPr>
-        <p:spPr/>
-        <p:txBody>
-          <a:bodyPr>
-            <a:normAutofit fontScale="85000" lnSpcReduction="10000"/>
-          </a:bodyPr>
-          <a:lstStyle/>
-          <a:p>
-            <a:pPr marL="0" indent="0">
-              <a:buNone/>
-            </a:pPr>
-            <a:r>
-              <a:rPr lang="en-GB" b="1" dirty="0" err="1">
-                <a:solidFill>
-                  <a:srgbClr val="3366FF"/>
-                </a:solidFill>
-                <a:latin typeface="Courier New"/>
-                <a:cs typeface="Courier New"/>
-              </a:rPr>
-              <a:t>const</a:t>
-            </a:r>
-            <a:r>
-              <a:rPr lang="en-GB" b="1" dirty="0">
-                <a:solidFill>
-                  <a:srgbClr val="3366FF"/>
-                </a:solidFill>
-                <a:latin typeface="Courier New"/>
-                <a:cs typeface="Courier New"/>
-              </a:rPr>
-              <a:t> char *</a:t>
-            </a:r>
-            <a:r>
-              <a:rPr lang="en-GB" b="1" dirty="0" err="1">
-                <a:solidFill>
-                  <a:srgbClr val="3366FF"/>
-                </a:solidFill>
-                <a:latin typeface="Courier New"/>
-                <a:cs typeface="Courier New"/>
-              </a:rPr>
-              <a:t>vecadd_ocl</a:t>
-            </a:r>
-            <a:r>
-              <a:rPr lang="en-GB" b="1" dirty="0">
-                <a:solidFill>
-                  <a:srgbClr val="3366FF"/>
-                </a:solidFill>
-                <a:latin typeface="Courier New"/>
-                <a:cs typeface="Courier New"/>
-              </a:rPr>
-              <a:t> =</a:t>
-            </a:r>
-          </a:p>
-          <a:p>
-            <a:pPr marL="0" indent="0">
-              <a:buNone/>
-            </a:pPr>
-            <a:r>
-              <a:rPr lang="en-GB" b="1" dirty="0" smtClean="0">
-                <a:solidFill>
-                  <a:srgbClr val="3366FF"/>
-                </a:solidFill>
-                <a:latin typeface="Courier New"/>
-                <a:cs typeface="Courier New"/>
-              </a:rPr>
-              <a:t>"</a:t>
-            </a:r>
-            <a:r>
-              <a:rPr lang="en-GB" b="1" dirty="0">
-                <a:solidFill>
-                  <a:srgbClr val="3366FF"/>
-                </a:solidFill>
-                <a:latin typeface="Courier New"/>
-                <a:cs typeface="Courier New"/>
-              </a:rPr>
-              <a:t>kernel void </a:t>
-            </a:r>
-            <a:r>
-              <a:rPr lang="en-GB" b="1" dirty="0" err="1">
-                <a:solidFill>
-                  <a:srgbClr val="3366FF"/>
-                </a:solidFill>
-                <a:latin typeface="Courier New"/>
-                <a:cs typeface="Courier New"/>
-              </a:rPr>
-              <a:t>vecadd</a:t>
-            </a:r>
-            <a:r>
-              <a:rPr lang="en-GB" b="1" dirty="0">
-                <a:solidFill>
-                  <a:srgbClr val="3366FF"/>
-                </a:solidFill>
-                <a:latin typeface="Courier New"/>
-                <a:cs typeface="Courier New"/>
-              </a:rPr>
-              <a:t>(\n"</a:t>
-            </a:r>
-          </a:p>
-          <a:p>
-            <a:pPr marL="0" indent="0">
-              <a:buNone/>
-            </a:pPr>
-            <a:r>
-              <a:rPr lang="en-GB" b="1" dirty="0">
-                <a:solidFill>
-                  <a:srgbClr val="3366FF"/>
-                </a:solidFill>
-                <a:latin typeface="Courier New"/>
-                <a:cs typeface="Courier New"/>
-              </a:rPr>
-              <a:t>"  </a:t>
-            </a:r>
-            <a:r>
-              <a:rPr lang="en-GB" b="1" dirty="0" smtClean="0">
-                <a:solidFill>
-                  <a:srgbClr val="3366FF"/>
-                </a:solidFill>
-                <a:latin typeface="Courier New"/>
-                <a:cs typeface="Courier New"/>
-              </a:rPr>
-              <a:t>global </a:t>
-            </a:r>
-            <a:r>
-              <a:rPr lang="en-GB" b="1" dirty="0">
-                <a:solidFill>
-                  <a:srgbClr val="3366FF"/>
-                </a:solidFill>
-                <a:latin typeface="Courier New"/>
-                <a:cs typeface="Courier New"/>
-              </a:rPr>
-              <a:t>float *a,\n"</a:t>
-            </a:r>
-          </a:p>
-          <a:p>
-            <a:pPr marL="0" indent="0">
-              <a:buNone/>
-            </a:pPr>
-            <a:r>
-              <a:rPr lang="en-GB" b="1" dirty="0">
-                <a:solidFill>
-                  <a:srgbClr val="3366FF"/>
-                </a:solidFill>
-                <a:latin typeface="Courier New"/>
-                <a:cs typeface="Courier New"/>
-              </a:rPr>
-              <a:t>"  </a:t>
-            </a:r>
-            <a:r>
-              <a:rPr lang="en-GB" b="1" dirty="0" smtClean="0">
-                <a:solidFill>
-                  <a:srgbClr val="3366FF"/>
-                </a:solidFill>
-                <a:latin typeface="Courier New"/>
-                <a:cs typeface="Courier New"/>
-              </a:rPr>
-              <a:t>global </a:t>
-            </a:r>
-            <a:r>
-              <a:rPr lang="en-GB" b="1" dirty="0">
-                <a:solidFill>
-                  <a:srgbClr val="3366FF"/>
-                </a:solidFill>
-                <a:latin typeface="Courier New"/>
-                <a:cs typeface="Courier New"/>
-              </a:rPr>
-              <a:t>float *b,\n"</a:t>
-            </a:r>
-          </a:p>
-          <a:p>
-            <a:pPr marL="0" indent="0">
-              <a:buNone/>
-            </a:pPr>
-            <a:r>
-              <a:rPr lang="en-GB" b="1" dirty="0">
-                <a:solidFill>
-                  <a:srgbClr val="3366FF"/>
-                </a:solidFill>
-                <a:latin typeface="Courier New"/>
-                <a:cs typeface="Courier New"/>
-              </a:rPr>
-              <a:t>"  </a:t>
-            </a:r>
-            <a:r>
-              <a:rPr lang="en-GB" b="1" dirty="0" smtClean="0">
-                <a:solidFill>
-                  <a:srgbClr val="3366FF"/>
-                </a:solidFill>
-                <a:latin typeface="Courier New"/>
-                <a:cs typeface="Courier New"/>
-              </a:rPr>
-              <a:t>global </a:t>
-            </a:r>
-            <a:r>
-              <a:rPr lang="en-GB" b="1" dirty="0">
-                <a:solidFill>
-                  <a:srgbClr val="3366FF"/>
-                </a:solidFill>
-                <a:latin typeface="Courier New"/>
-                <a:cs typeface="Courier New"/>
-              </a:rPr>
-              <a:t>float *c)\</a:t>
-            </a:r>
-            <a:r>
-              <a:rPr lang="en-GB" b="1" dirty="0" smtClean="0">
-                <a:solidFill>
-                  <a:srgbClr val="3366FF"/>
-                </a:solidFill>
-                <a:latin typeface="Courier New"/>
-                <a:cs typeface="Courier New"/>
-              </a:rPr>
-              <a:t>n</a:t>
-            </a:r>
-            <a:r>
-              <a:rPr lang="en-GB" b="1" dirty="0">
-                <a:solidFill>
-                  <a:srgbClr val="3366FF"/>
-                </a:solidFill>
-                <a:latin typeface="Courier New"/>
-                <a:cs typeface="Courier New"/>
-              </a:rPr>
-              <a:t>"</a:t>
-            </a:r>
-          </a:p>
-          <a:p>
-            <a:pPr marL="0" indent="0">
-              <a:buNone/>
-            </a:pPr>
-            <a:r>
-              <a:rPr lang="en-GB" b="1" dirty="0">
-                <a:solidFill>
-                  <a:srgbClr val="3366FF"/>
-                </a:solidFill>
-                <a:latin typeface="Courier New"/>
-                <a:cs typeface="Courier New"/>
-              </a:rPr>
-              <a:t>"{\n"</a:t>
-            </a:r>
-          </a:p>
-          <a:p>
-            <a:pPr marL="0" indent="0">
-              <a:buNone/>
-            </a:pPr>
-            <a:r>
-              <a:rPr lang="en-GB" b="1" dirty="0">
-                <a:solidFill>
-                  <a:srgbClr val="3366FF"/>
-                </a:solidFill>
-                <a:latin typeface="Courier New"/>
-                <a:cs typeface="Courier New"/>
-              </a:rPr>
-              <a:t>"</a:t>
-            </a:r>
-            <a:r>
-              <a:rPr lang="sv-SE" b="1" dirty="0" smtClean="0">
-                <a:solidFill>
-                  <a:srgbClr val="3366FF"/>
-                </a:solidFill>
-                <a:latin typeface="Courier New"/>
-                <a:cs typeface="Courier New"/>
-              </a:rPr>
-              <a:t>  </a:t>
-            </a:r>
-            <a:r>
-              <a:rPr lang="sv-SE" b="1" dirty="0" err="1" smtClean="0">
-                <a:solidFill>
-                  <a:srgbClr val="3366FF"/>
-                </a:solidFill>
-                <a:latin typeface="Courier New"/>
-                <a:cs typeface="Courier New"/>
-              </a:rPr>
-              <a:t>int</a:t>
-            </a:r>
-            <a:r>
-              <a:rPr lang="sv-SE" b="1" dirty="0" smtClean="0">
-                <a:solidFill>
-                  <a:srgbClr val="3366FF"/>
-                </a:solidFill>
-                <a:latin typeface="Courier New"/>
-                <a:cs typeface="Courier New"/>
-              </a:rPr>
-              <a:t> </a:t>
-            </a:r>
-            <a:r>
-              <a:rPr lang="sv-SE" b="1" dirty="0">
-                <a:solidFill>
-                  <a:srgbClr val="3366FF"/>
-                </a:solidFill>
-                <a:latin typeface="Courier New"/>
-                <a:cs typeface="Courier New"/>
-              </a:rPr>
-              <a:t>i =\</a:t>
-            </a:r>
-            <a:r>
-              <a:rPr lang="sv-SE" b="1" dirty="0" smtClean="0">
-                <a:solidFill>
-                  <a:srgbClr val="3366FF"/>
-                </a:solidFill>
-                <a:latin typeface="Courier New"/>
-                <a:cs typeface="Courier New"/>
-              </a:rPr>
-              <a:t>n</a:t>
-            </a:r>
-            <a:r>
-              <a:rPr lang="en-GB" b="1" dirty="0">
-                <a:solidFill>
-                  <a:srgbClr val="3366FF"/>
-                </a:solidFill>
-                <a:latin typeface="Courier New"/>
-                <a:cs typeface="Courier New"/>
-              </a:rPr>
-              <a:t>"</a:t>
-            </a:r>
-            <a:endParaRPr lang="sv-SE" b="1" dirty="0">
+            <a:endParaRPr lang="en-US" b="1" dirty="0" smtClean="0">
               <a:solidFill>
                 <a:srgbClr val="3366FF"/>
               </a:solidFill>
@@ -4555,70 +4183,35 @@
             </a:endParaRPr>
           </a:p>
           <a:p>
-            <a:pPr marL="0" indent="0">
-              <a:buNone/>
-            </a:pPr>
-            <a:r>
-              <a:rPr lang="en-GB" b="1" dirty="0">
-                <a:solidFill>
-                  <a:srgbClr val="3366FF"/>
-                </a:solidFill>
-                <a:latin typeface="Courier New"/>
-                <a:cs typeface="Courier New"/>
-              </a:rPr>
-              <a:t>"</a:t>
-            </a:r>
-            <a:r>
-              <a:rPr lang="sv-SE" b="1" dirty="0" smtClean="0">
-                <a:solidFill>
-                  <a:srgbClr val="3366FF"/>
-                </a:solidFill>
-                <a:latin typeface="Courier New"/>
-                <a:cs typeface="Courier New"/>
-              </a:rPr>
-              <a:t>    </a:t>
-            </a:r>
-            <a:r>
-              <a:rPr lang="sv-SE" b="1" dirty="0" err="1" smtClean="0">
-                <a:solidFill>
-                  <a:srgbClr val="3366FF"/>
-                </a:solidFill>
-                <a:latin typeface="Courier New"/>
-                <a:cs typeface="Courier New"/>
-              </a:rPr>
-              <a:t>get_global_id</a:t>
-            </a:r>
-            <a:r>
-              <a:rPr lang="sv-SE" b="1" dirty="0">
-                <a:solidFill>
-                  <a:srgbClr val="3366FF"/>
-                </a:solidFill>
-                <a:latin typeface="Courier New"/>
-                <a:cs typeface="Courier New"/>
-              </a:rPr>
-              <a:t>(0);\</a:t>
-            </a:r>
-            <a:r>
-              <a:rPr lang="sv-SE" b="1" dirty="0" smtClean="0">
-                <a:solidFill>
-                  <a:srgbClr val="3366FF"/>
-                </a:solidFill>
-                <a:latin typeface="Courier New"/>
-                <a:cs typeface="Courier New"/>
-              </a:rPr>
-              <a:t>n</a:t>
-            </a:r>
-            <a:r>
-              <a:rPr lang="en-GB" b="1" dirty="0">
-                <a:solidFill>
-                  <a:srgbClr val="3366FF"/>
-                </a:solidFill>
-                <a:latin typeface="Courier New"/>
-                <a:cs typeface="Courier New"/>
-              </a:rPr>
-              <a:t>"</a:t>
-            </a:r>
-            <a:endParaRPr lang="sv-SE" b="1" dirty="0">
+            <a:pPr marL="400050" lvl="1" indent="0">
+              <a:buNone/>
+            </a:pPr>
+            <a:r>
+              <a:rPr lang="en-US" b="1" dirty="0" smtClean="0">
+                <a:solidFill>
+                  <a:srgbClr val="3366FF"/>
+                </a:solidFill>
+                <a:latin typeface="Courier New"/>
+                <a:cs typeface="Courier New"/>
+              </a:rPr>
+              <a:t>#</a:t>
+            </a:r>
+            <a:r>
+              <a:rPr lang="en-US" b="1" dirty="0">
+                <a:solidFill>
+                  <a:srgbClr val="3366FF"/>
+                </a:solidFill>
+                <a:latin typeface="Courier New"/>
+                <a:cs typeface="Courier New"/>
+              </a:rPr>
+              <a:t>!/bin/bash</a:t>
+            </a:r>
+          </a:p>
+          <a:p>
+            <a:pPr marL="400050" lvl="1" indent="0">
+              <a:buNone/>
+            </a:pPr>
+            <a:endParaRPr lang="en-US" b="1" dirty="0">
               <a:solidFill>
                 <a:srgbClr val="3366FF"/>
               </a:solidFill>
@@ -4627,70 +4220,80 @@
             </a:endParaRPr>
           </a:p>
           <a:p>
-            <a:pPr marL="0" indent="0">
-              <a:buNone/>
-            </a:pPr>
-            <a:r>
-              <a:rPr lang="en-GB" b="1" dirty="0">
-                <a:solidFill>
-                  <a:srgbClr val="3366FF"/>
-                </a:solidFill>
-                <a:latin typeface="Courier New"/>
-                <a:cs typeface="Courier New"/>
-              </a:rPr>
-              <a:t>"</a:t>
-            </a:r>
-            <a:r>
-              <a:rPr lang="sv-SE" b="1" dirty="0" smtClean="0">
-                <a:solidFill>
-                  <a:srgbClr val="3366FF"/>
-                </a:solidFill>
-                <a:latin typeface="Courier New"/>
-                <a:cs typeface="Courier New"/>
-              </a:rPr>
-              <a:t>  c</a:t>
-            </a:r>
-            <a:r>
-              <a:rPr lang="sv-SE" b="1" dirty="0">
-                <a:solidFill>
-                  <a:srgbClr val="3366FF"/>
-                </a:solidFill>
-                <a:latin typeface="Courier New"/>
-                <a:cs typeface="Courier New"/>
-              </a:rPr>
-              <a:t>[i] = a[i] + b[i];\n"</a:t>
-            </a:r>
-          </a:p>
-          <a:p>
-            <a:pPr marL="0" indent="0">
-              <a:buNone/>
-            </a:pPr>
-            <a:r>
-              <a:rPr lang="sv-SE" b="1" dirty="0">
-                <a:solidFill>
-                  <a:srgbClr val="3366FF"/>
-                </a:solidFill>
-                <a:latin typeface="Courier New"/>
-                <a:cs typeface="Courier New"/>
-              </a:rPr>
-              <a:t>"}\n"</a:t>
-            </a:r>
-          </a:p>
-          <a:p>
-            <a:pPr marL="0" indent="0">
-              <a:buNone/>
-            </a:pPr>
-            <a:r>
-              <a:rPr lang="sv-SE" b="1" dirty="0">
-                <a:solidFill>
-                  <a:srgbClr val="3366FF"/>
-                </a:solidFill>
-                <a:latin typeface="Courier New"/>
-                <a:cs typeface="Courier New"/>
-              </a:rPr>
-              <a:t>;</a:t>
-            </a:r>
-            <a:endParaRPr lang="en-GB" b="1" dirty="0">
+            <a:pPr marL="400050" lvl="1" indent="0">
+              <a:buNone/>
+            </a:pPr>
+            <a:r>
+              <a:rPr lang="en-US" b="1" dirty="0">
+                <a:solidFill>
+                  <a:srgbClr val="3366FF"/>
+                </a:solidFill>
+                <a:latin typeface="Courier New"/>
+                <a:cs typeface="Courier New"/>
+              </a:rPr>
+              <a:t>IN=$1</a:t>
+            </a:r>
+          </a:p>
+          <a:p>
+            <a:pPr marL="400050" lvl="1" indent="0">
+              <a:buNone/>
+            </a:pPr>
+            <a:r>
+              <a:rPr lang="en-US" b="1" dirty="0">
+                <a:solidFill>
+                  <a:srgbClr val="3366FF"/>
+                </a:solidFill>
+                <a:latin typeface="Courier New"/>
+                <a:cs typeface="Courier New"/>
+              </a:rPr>
+              <a:t>NAME=${</a:t>
+            </a:r>
+            <a:r>
+              <a:rPr lang="en-US" b="1" dirty="0" err="1">
+                <a:solidFill>
+                  <a:srgbClr val="3366FF"/>
+                </a:solidFill>
+                <a:latin typeface="Courier New"/>
+                <a:cs typeface="Courier New"/>
+              </a:rPr>
+              <a:t>IN%.cl</a:t>
+            </a:r>
+            <a:r>
+              <a:rPr lang="en-US" b="1" dirty="0">
+                <a:solidFill>
+                  <a:srgbClr val="3366FF"/>
+                </a:solidFill>
+                <a:latin typeface="Courier New"/>
+                <a:cs typeface="Courier New"/>
+              </a:rPr>
+              <a:t>}</a:t>
+            </a:r>
+          </a:p>
+          <a:p>
+            <a:pPr marL="400050" lvl="1" indent="0">
+              <a:buNone/>
+            </a:pPr>
+            <a:r>
+              <a:rPr lang="en-US" b="1" dirty="0">
+                <a:solidFill>
+                  <a:srgbClr val="3366FF"/>
+                </a:solidFill>
+                <a:latin typeface="Courier New"/>
+                <a:cs typeface="Courier New"/>
+              </a:rPr>
+              <a:t>OUT=$</a:t>
+            </a:r>
+            <a:r>
+              <a:rPr lang="en-US" b="1" dirty="0" err="1">
+                <a:solidFill>
+                  <a:srgbClr val="3366FF"/>
+                </a:solidFill>
+                <a:latin typeface="Courier New"/>
+                <a:cs typeface="Courier New"/>
+              </a:rPr>
+              <a:t>NAME.h</a:t>
+            </a:r>
+            <a:endParaRPr lang="en-US" b="1" dirty="0">
               <a:solidFill>
                 <a:srgbClr val="3366FF"/>
               </a:solidFill>
@@ -4698,12 +4301,256 @@
               <a:cs typeface="Courier New"/>
             </a:endParaRPr>
           </a:p>
+          <a:p>
+            <a:pPr marL="400050" lvl="1" indent="0">
+              <a:buNone/>
+            </a:pPr>
+            <a:endParaRPr lang="en-US" b="1" dirty="0" smtClean="0">
+              <a:solidFill>
+                <a:srgbClr val="3366FF"/>
+              </a:solidFill>
+              <a:latin typeface="Courier New"/>
+              <a:cs typeface="Courier New"/>
+            </a:endParaRPr>
+          </a:p>
+          <a:p>
+            <a:pPr marL="400050" lvl="1" indent="0">
+              <a:buNone/>
+            </a:pPr>
+            <a:r>
+              <a:rPr lang="en-US" b="1" dirty="0" smtClean="0">
+                <a:solidFill>
+                  <a:srgbClr val="3366FF"/>
+                </a:solidFill>
+                <a:latin typeface="Courier New"/>
+                <a:cs typeface="Courier New"/>
+              </a:rPr>
+              <a:t>echo </a:t>
+            </a:r>
+            <a:r>
+              <a:rPr lang="en-US" b="1" dirty="0">
+                <a:solidFill>
+                  <a:srgbClr val="3366FF"/>
+                </a:solidFill>
+                <a:latin typeface="Courier New"/>
+                <a:cs typeface="Courier New"/>
+              </a:rPr>
+              <a:t>"</a:t>
+            </a:r>
+            <a:r>
+              <a:rPr lang="en-US" b="1" dirty="0" err="1">
+                <a:solidFill>
+                  <a:srgbClr val="3366FF"/>
+                </a:solidFill>
+                <a:latin typeface="Courier New"/>
+                <a:cs typeface="Courier New"/>
+              </a:rPr>
+              <a:t>const</a:t>
+            </a:r>
+            <a:r>
+              <a:rPr lang="en-US" b="1" dirty="0">
+                <a:solidFill>
+                  <a:srgbClr val="3366FF"/>
+                </a:solidFill>
+                <a:latin typeface="Courier New"/>
+                <a:cs typeface="Courier New"/>
+              </a:rPr>
+              <a:t> char *"$</a:t>
+            </a:r>
+            <a:r>
+              <a:rPr lang="en-US" b="1" dirty="0" smtClean="0">
+                <a:solidFill>
+                  <a:srgbClr val="3366FF"/>
+                </a:solidFill>
+                <a:latin typeface="Courier New"/>
+                <a:cs typeface="Courier New"/>
+              </a:rPr>
+              <a:t>NAME"_</a:t>
+            </a:r>
+            <a:r>
+              <a:rPr lang="en-US" b="1" dirty="0" err="1" smtClean="0">
+                <a:solidFill>
+                  <a:srgbClr val="3366FF"/>
+                </a:solidFill>
+                <a:latin typeface="Courier New"/>
+                <a:cs typeface="Courier New"/>
+              </a:rPr>
+              <a:t>ocl</a:t>
+            </a:r>
+            <a:r>
+              <a:rPr lang="en-US" b="1" dirty="0" smtClean="0">
+                <a:solidFill>
+                  <a:srgbClr val="3366FF"/>
+                </a:solidFill>
+                <a:latin typeface="Courier New"/>
+                <a:cs typeface="Courier New"/>
+              </a:rPr>
+              <a:t> </a:t>
+            </a:r>
+            <a:r>
+              <a:rPr lang="en-US" b="1" dirty="0">
+                <a:solidFill>
+                  <a:srgbClr val="3366FF"/>
+                </a:solidFill>
+                <a:latin typeface="Courier New"/>
+                <a:cs typeface="Courier New"/>
+              </a:rPr>
+              <a:t>=" &gt;$OUT</a:t>
+            </a:r>
+          </a:p>
+          <a:p>
+            <a:pPr marL="400050" lvl="1" indent="0">
+              <a:buNone/>
+            </a:pPr>
+            <a:r>
+              <a:rPr lang="en-US" b="1" dirty="0" err="1">
+                <a:solidFill>
+                  <a:srgbClr val="3366FF"/>
+                </a:solidFill>
+                <a:latin typeface="Courier New"/>
+                <a:cs typeface="Courier New"/>
+              </a:rPr>
+              <a:t>sed</a:t>
+            </a:r>
+            <a:r>
+              <a:rPr lang="en-US" b="1" dirty="0">
+                <a:solidFill>
+                  <a:srgbClr val="3366FF"/>
+                </a:solidFill>
+                <a:latin typeface="Courier New"/>
+                <a:cs typeface="Courier New"/>
+              </a:rPr>
+              <a:t> -e 's/\\/\\\\/</a:t>
+            </a:r>
+            <a:r>
+              <a:rPr lang="en-US" b="1" dirty="0" err="1">
+                <a:solidFill>
+                  <a:srgbClr val="3366FF"/>
+                </a:solidFill>
+                <a:latin typeface="Courier New"/>
+                <a:cs typeface="Courier New"/>
+              </a:rPr>
+              <a:t>g;s</a:t>
+            </a:r>
+            <a:r>
+              <a:rPr lang="en-US" b="1" dirty="0">
+                <a:solidFill>
+                  <a:srgbClr val="3366FF"/>
+                </a:solidFill>
+                <a:latin typeface="Courier New"/>
+                <a:cs typeface="Courier New"/>
+              </a:rPr>
+              <a:t>/"/\\"/</a:t>
+            </a:r>
+            <a:r>
+              <a:rPr lang="en-US" b="1" dirty="0" err="1">
+                <a:solidFill>
+                  <a:srgbClr val="3366FF"/>
+                </a:solidFill>
+                <a:latin typeface="Courier New"/>
+                <a:cs typeface="Courier New"/>
+              </a:rPr>
+              <a:t>g</a:t>
+            </a:r>
+            <a:r>
+              <a:rPr lang="en-US" b="1" dirty="0" err="1" smtClean="0">
+                <a:solidFill>
+                  <a:srgbClr val="3366FF"/>
+                </a:solidFill>
+                <a:latin typeface="Courier New"/>
+                <a:cs typeface="Courier New"/>
+              </a:rPr>
+              <a:t>;s</a:t>
+            </a:r>
+            <a:r>
+              <a:rPr lang="en-US" b="1" dirty="0" smtClean="0">
+                <a:solidFill>
+                  <a:srgbClr val="3366FF"/>
+                </a:solidFill>
+                <a:latin typeface="Courier New"/>
+                <a:cs typeface="Courier New"/>
+              </a:rPr>
+              <a:t>/^/"/;s/$/\\n"/' \</a:t>
+            </a:r>
+          </a:p>
+          <a:p>
+            <a:pPr marL="400050" lvl="1" indent="0">
+              <a:buNone/>
+            </a:pPr>
+            <a:r>
+              <a:rPr lang="en-US" b="1" dirty="0">
+                <a:solidFill>
+                  <a:srgbClr val="3366FF"/>
+                </a:solidFill>
+                <a:latin typeface="Courier New"/>
+                <a:cs typeface="Courier New"/>
+              </a:rPr>
+              <a:t> </a:t>
+            </a:r>
+            <a:r>
+              <a:rPr lang="en-US" b="1" dirty="0" smtClean="0">
+                <a:solidFill>
+                  <a:srgbClr val="3366FF"/>
+                </a:solidFill>
+                <a:latin typeface="Courier New"/>
+                <a:cs typeface="Courier New"/>
+              </a:rPr>
+              <a:t> $IN &gt;&gt;$OUT</a:t>
+            </a:r>
+          </a:p>
+          <a:p>
+            <a:pPr marL="400050" lvl="1" indent="0">
+              <a:buNone/>
+            </a:pPr>
+            <a:r>
+              <a:rPr lang="en-US" b="1" dirty="0" smtClean="0">
+                <a:solidFill>
+                  <a:srgbClr val="3366FF"/>
+                </a:solidFill>
+                <a:latin typeface="Courier New"/>
+                <a:cs typeface="Courier New"/>
+              </a:rPr>
+              <a:t>echo </a:t>
+            </a:r>
+            <a:r>
+              <a:rPr lang="en-US" b="1" dirty="0">
+                <a:solidFill>
+                  <a:srgbClr val="3366FF"/>
+                </a:solidFill>
+                <a:latin typeface="Courier New"/>
+                <a:cs typeface="Courier New"/>
+              </a:rPr>
+              <a:t>";" &gt;&gt;$</a:t>
+            </a:r>
+            <a:r>
+              <a:rPr lang="en-US" b="1" dirty="0" smtClean="0">
+                <a:solidFill>
+                  <a:srgbClr val="3366FF"/>
+                </a:solidFill>
+                <a:latin typeface="Courier New"/>
+                <a:cs typeface="Courier New"/>
+              </a:rPr>
+              <a:t>OUT</a:t>
+            </a:r>
+          </a:p>
+          <a:p>
+            <a:pPr marL="0" indent="0">
+              <a:buNone/>
+            </a:pPr>
+            <a:endParaRPr lang="en-US" b="1" dirty="0" smtClean="0">
+              <a:solidFill>
+                <a:srgbClr val="3366FF"/>
+              </a:solidFill>
+              <a:latin typeface="Courier New"/>
+              <a:cs typeface="Courier New"/>
+            </a:endParaRPr>
+          </a:p>
         </p:txBody>
       </p:sp>
     </p:spTree>
     <p:extLst>
       <p:ext uri="{BB962C8B-B14F-4D97-AF65-F5344CB8AC3E}">
-        <p14:creationId xmlns:p14="http://schemas.microsoft.com/office/powerpoint/2010/main" val="1917558613"/>
+        <p14:creationId xmlns:p14="http://schemas.microsoft.com/office/powerpoint/2010/main" val="2900228134"/>
       </p:ext>
     </p:extLst>
   </p:cSld>
@@ -5388,7 +5235,7 @@
         <p:spPr/>
         <p:txBody>
           <a:bodyPr>
-            <a:normAutofit/>
+            <a:normAutofit fontScale="92500" lnSpcReduction="10000"/>
           </a:bodyPr>
           <a:lstStyle/>
           <a:p>
@@ -5470,8 +5317,19 @@
           <a:p>
             <a:r>
               <a:rPr lang="en-GB" dirty="0" smtClean="0"/>
-              <a:t>This enables the creation of libraries of compiled OpenCL functions, that can be linked to multiple program objects</a:t>
-            </a:r>
+              <a:t>This enables the creation of libraries of compiled OpenCL functions, that can be linked to multiple program </a:t>
+            </a:r>
+            <a:r>
+              <a:rPr lang="en-GB" dirty="0" smtClean="0"/>
+              <a:t>objects</a:t>
+            </a:r>
+          </a:p>
+          <a:p>
+            <a:r>
+              <a:rPr lang="en-GB" dirty="0" smtClean="0"/>
+              <a:t>Can improve program build times, by allowing code shared across multiple programs to be extracted into a common library</a:t>
+            </a:r>
+            <a:endParaRPr lang="en-GB" dirty="0" smtClean="0"/>
           </a:p>
         </p:txBody>
       </p:sp>
@@ -6104,7 +5962,11 @@
             </a:pPr>
             <a:r>
               <a:rPr lang="en-GB" dirty="0" smtClean="0"/>
-              <a:t>For example, NVIDIA provide </a:t>
+              <a:t>For example, NVIDIA </a:t>
+            </a:r>
+            <a:r>
+              <a:rPr lang="en-GB" dirty="0" smtClean="0"/>
+              <a:t>provide the </a:t>
             </a:r>
             <a:r>
               <a:rPr lang="en-GB" b="1" dirty="0" smtClean="0">
@@ -6138,7 +6000,19 @@
             </a:r>
             <a:r>
               <a:rPr lang="en-GB" dirty="0" smtClean="0"/>
-              <a:t> to control which GPU architecture to target, and </a:t>
+              <a:t> </a:t>
+            </a:r>
+            <a:r>
+              <a:rPr lang="en-GB" dirty="0" smtClean="0"/>
+              <a:t>flag to specify which </a:t>
+            </a:r>
+            <a:r>
+              <a:rPr lang="en-GB" dirty="0" smtClean="0"/>
+              <a:t>GPU architecture </a:t>
+            </a:r>
+            <a:r>
+              <a:rPr lang="en-GB" dirty="0" smtClean="0"/>
+              <a:t>should be targeted, and </a:t>
             </a:r>
             <a:r>
               <a:rPr lang="en-GB" b="1" dirty="0" smtClean="0">
@@ -6331,7 +6205,7 @@
         <p:spPr/>
         <p:txBody>
           <a:bodyPr>
-            <a:normAutofit fontScale="92500" lnSpcReduction="10000"/>
+            <a:normAutofit fontScale="92500" lnSpcReduction="20000"/>
           </a:bodyPr>
           <a:lstStyle/>
           <a:p>
@@ -6342,7 +6216,11 @@
             </a:pPr>
             <a:r>
               <a:rPr lang="en-GB" dirty="0" smtClean="0"/>
-              <a:t>Can specify the </a:t>
+              <a:t>Can </a:t>
+            </a:r>
+            <a:r>
+              <a:rPr lang="en-GB" dirty="0" smtClean="0"/>
+              <a:t>use the </a:t>
             </a:r>
             <a:r>
               <a:rPr lang="en-GB" b="1" dirty="0" err="1" smtClean="0">
@@ -6364,8 +6242,84 @@
             </a:r>
             <a:r>
               <a:rPr lang="en-GB" dirty="0" smtClean="0"/>
-              <a:t>attribute to hint to the compiler what you’re going to launch it with </a:t>
-            </a:r>
+              <a:t>attribute to </a:t>
+            </a:r>
+            <a:r>
+              <a:rPr lang="en-GB" dirty="0" smtClean="0"/>
+              <a:t>inform the </a:t>
+            </a:r>
+            <a:r>
+              <a:rPr lang="en-GB" dirty="0" smtClean="0"/>
+              <a:t>compiler what </a:t>
+            </a:r>
+            <a:r>
+              <a:rPr lang="en-GB" dirty="0" smtClean="0"/>
+              <a:t>work-group size you’re </a:t>
+            </a:r>
+            <a:r>
+              <a:rPr lang="en-GB" dirty="0" smtClean="0"/>
+              <a:t>going to </a:t>
+            </a:r>
+            <a:r>
+              <a:rPr lang="en-GB" smtClean="0"/>
+              <a:t>launch </a:t>
+            </a:r>
+            <a:r>
+              <a:rPr lang="en-GB" smtClean="0"/>
+              <a:t>kernels</a:t>
+            </a:r>
+            <a:r>
+              <a:rPr lang="en-GB" smtClean="0"/>
+              <a:t> </a:t>
+            </a:r>
+            <a:r>
+              <a:rPr lang="en-GB" dirty="0" smtClean="0"/>
+              <a:t>with:</a:t>
+            </a:r>
+          </a:p>
+          <a:p>
+            <a:pPr lvl="1">
+              <a:lnSpc>
+                <a:spcPct val="120000"/>
+              </a:lnSpc>
+            </a:pPr>
+            <a:r>
+              <a:rPr lang="en-GB" b="1" dirty="0" smtClean="0">
+                <a:solidFill>
+                  <a:srgbClr val="3366FF"/>
+                </a:solidFill>
+                <a:latin typeface="Courier New"/>
+                <a:cs typeface="Courier New"/>
+              </a:rPr>
+              <a:t>__attribute__((</a:t>
+            </a:r>
+            <a:r>
+              <a:rPr lang="en-GB" b="1" dirty="0" err="1" smtClean="0">
+                <a:solidFill>
+                  <a:srgbClr val="3366FF"/>
+                </a:solidFill>
+                <a:latin typeface="Courier New"/>
+                <a:cs typeface="Courier New"/>
+              </a:rPr>
+              <a:t>reqd_work_group_size</a:t>
+            </a:r>
+            <a:r>
+              <a:rPr lang="en-GB" b="1" dirty="0" smtClean="0">
+                <a:solidFill>
+                  <a:srgbClr val="3366FF"/>
+                </a:solidFill>
+                <a:latin typeface="Courier New"/>
+                <a:cs typeface="Courier New"/>
+              </a:rPr>
+              <a:t>(x, y, z)))</a:t>
+            </a:r>
+            <a:endParaRPr lang="en-GB" b="1" dirty="0" smtClean="0">
+              <a:solidFill>
+                <a:srgbClr val="3366FF"/>
+              </a:solidFill>
+              <a:latin typeface="Courier New"/>
+              <a:cs typeface="Courier New"/>
+            </a:endParaRPr>
           </a:p>
           <a:p>
             <a:pPr>
@@ -6411,22 +6365,25 @@
             </a:r>
             <a:r>
               <a:rPr lang="en-GB" dirty="0" smtClean="0"/>
-              <a:t>keywords for the inputs where appropriate to make sure the compiler can optimise memory accesses (</a:t>
-            </a:r>
-            <a:r>
-              <a:rPr lang="en-GB" b="1" dirty="0" smtClean="0">
-                <a:solidFill>
-                  <a:srgbClr val="3366FF"/>
-                </a:solidFill>
-                <a:latin typeface="Courier New"/>
-                <a:cs typeface="Courier New"/>
-              </a:rPr>
-              <a:t>-cl-strict-aliasing</a:t>
-            </a:r>
-            <a:r>
-              <a:rPr lang="en-GB" dirty="0" smtClean="0"/>
-              <a:t> in 1.0/1.1 as well)</a:t>
-            </a:r>
+              <a:t>keywords for </a:t>
+            </a:r>
+            <a:r>
+              <a:rPr lang="en-GB" dirty="0" smtClean="0"/>
+              <a:t>kernel arguments</a:t>
+            </a:r>
+            <a:r>
+              <a:rPr lang="en-GB" dirty="0" smtClean="0"/>
+              <a:t> </a:t>
+            </a:r>
+            <a:r>
+              <a:rPr lang="en-GB" dirty="0" smtClean="0"/>
+              <a:t>where appropriate to make sure the compiler can optimise </a:t>
+            </a:r>
+            <a:r>
+              <a:rPr lang="en-GB" dirty="0" smtClean="0"/>
+              <a:t>memory accesses</a:t>
+            </a:r>
+            <a:endParaRPr lang="en-GB" dirty="0" smtClean="0"/>
           </a:p>
         </p:txBody>
       </p:sp>
@@ -10777,17 +10734,47 @@
           <a:p>
             <a:r>
               <a:rPr lang="en-GB" dirty="0" smtClean="0"/>
-              <a:t>Not yet supported by all vendors, but SPIR-V is now core in </a:t>
-            </a:r>
-            <a:r>
-              <a:rPr lang="en-GB" dirty="0" err="1" smtClean="0"/>
-              <a:t>OpenCL</a:t>
-            </a:r>
-            <a:r>
-              <a:rPr lang="en-GB" dirty="0" smtClean="0"/>
-              <a:t> 2.1</a:t>
+              <a:t>Not yet supported by all vendors, but SPIR-V is now </a:t>
+            </a:r>
+            <a:r>
+              <a:rPr lang="en-GB" dirty="0" smtClean="0"/>
+              <a:t>core* </a:t>
+            </a:r>
+            <a:r>
+              <a:rPr lang="en-GB" dirty="0" smtClean="0"/>
+              <a:t>in OpenCL 2.1</a:t>
             </a:r>
             <a:endParaRPr lang="en-GB" dirty="0"/>
+          </a:p>
+        </p:txBody>
+      </p:sp>
+      <p:sp>
+        <p:nvSpPr>
+          <p:cNvPr id="4" name="TextBox 3"/>
+          <p:cNvSpPr txBox="1"/>
+          <p:nvPr/>
+        </p:nvSpPr>
+        <p:spPr>
+          <a:xfrm>
+            <a:off x="1986597" y="6413164"/>
+            <a:ext cx="5180237" cy="307777"/>
+          </a:xfrm>
+          <a:prstGeom prst="rect">
+            <a:avLst/>
+          </a:prstGeom>
+          <a:noFill/>
+        </p:spPr>
+        <p:txBody>
+          <a:bodyPr wrap="square" rtlCol="0">
+            <a:spAutoFit/>
+          </a:bodyPr>
+          <a:lstStyle/>
+          <a:p>
+            <a:r>
+              <a:rPr lang="en-GB" sz="1400" dirty="0" smtClean="0"/>
+              <a:t>*Almost: Only one platform has been sanctioned to use a different IL</a:t>
+            </a:r>
+            <a:endParaRPr lang="en-GB" sz="1400" dirty="0"/>
           </a:p>
         </p:txBody>
       </p:sp>
@@ -11092,34 +11079,770 @@
       </p:sp>
       <p:sp>
         <p:nvSpPr>
-          <p:cNvPr id="3" name="Content Placeholder 2"/>
-          <p:cNvSpPr>
-            <a:spLocks noGrp="1"/>
-          </p:cNvSpPr>
-          <p:nvPr>
-            <p:ph idx="1"/>
+          <p:cNvPr id="3" name="Text Placeholder 2"/>
+          <p:cNvSpPr>
+            <a:spLocks noGrp="1"/>
+          </p:cNvSpPr>
+          <p:nvPr>
+            <p:ph type="body" idx="1"/>
           </p:nvPr>
         </p:nvSpPr>
         <p:spPr/>
         <p:txBody>
+          <a:bodyPr/>
+          <a:lstStyle/>
+          <a:p>
+            <a:r>
+              <a:rPr lang="en-GB" dirty="0" smtClean="0"/>
+              <a:t>Before </a:t>
+            </a:r>
+            <a:r>
+              <a:rPr lang="en-GB" dirty="0" err="1" smtClean="0"/>
+              <a:t>stringification</a:t>
+            </a:r>
+            <a:r>
+              <a:rPr lang="en-GB" dirty="0" smtClean="0"/>
+              <a:t>:</a:t>
+            </a:r>
+            <a:endParaRPr lang="en-GB" dirty="0"/>
+          </a:p>
+        </p:txBody>
+      </p:sp>
+      <p:sp>
+        <p:nvSpPr>
+          <p:cNvPr id="4" name="Content Placeholder 3"/>
+          <p:cNvSpPr>
+            <a:spLocks noGrp="1"/>
+          </p:cNvSpPr>
+          <p:nvPr>
+            <p:ph sz="half" idx="2"/>
+          </p:nvPr>
+        </p:nvSpPr>
+        <p:spPr/>
+        <p:txBody>
           <a:bodyPr>
-            <a:normAutofit fontScale="70000" lnSpcReduction="20000"/>
+            <a:normAutofit/>
           </a:bodyPr>
           <a:lstStyle/>
           <a:p>
-            <a:r>
-              <a:rPr lang="en-US" sz="3400" dirty="0" smtClean="0">
-                <a:latin typeface="Trebuchet MS"/>
-                <a:cs typeface="Trebuchet MS"/>
-              </a:rPr>
-              <a:t>This script makes use of SED to escape special characters and wrap lines in quotation marks</a:t>
-            </a:r>
-          </a:p>
-          <a:p>
             <a:pPr marL="0" indent="0">
               <a:buNone/>
             </a:pPr>
-            <a:endParaRPr lang="en-US" b="1" dirty="0" smtClean="0">
+            <a:r>
+              <a:rPr lang="en-GB" sz="2000" b="1" dirty="0">
+                <a:solidFill>
+                  <a:srgbClr val="3366FF"/>
+                </a:solidFill>
+                <a:latin typeface="Courier New"/>
+                <a:cs typeface="Courier New"/>
+              </a:rPr>
+              <a:t>kernel void </a:t>
+            </a:r>
+            <a:r>
+              <a:rPr lang="en-GB" sz="2000" b="1" dirty="0" err="1" smtClean="0">
+                <a:solidFill>
+                  <a:srgbClr val="3366FF"/>
+                </a:solidFill>
+                <a:latin typeface="Courier New"/>
+                <a:cs typeface="Courier New"/>
+              </a:rPr>
+              <a:t>vecadd</a:t>
+            </a:r>
+            <a:r>
+              <a:rPr lang="en-GB" sz="2000" b="1" dirty="0" smtClean="0">
+                <a:solidFill>
+                  <a:srgbClr val="3366FF"/>
+                </a:solidFill>
+                <a:latin typeface="Courier New"/>
+                <a:cs typeface="Courier New"/>
+              </a:rPr>
+              <a:t>(</a:t>
+            </a:r>
+          </a:p>
+          <a:p>
+            <a:pPr marL="0" indent="0">
+              <a:buNone/>
+            </a:pPr>
+            <a:r>
+              <a:rPr lang="en-GB" sz="2000" b="1" dirty="0" smtClean="0">
+                <a:solidFill>
+                  <a:srgbClr val="3366FF"/>
+                </a:solidFill>
+                <a:latin typeface="Courier New"/>
+                <a:cs typeface="Courier New"/>
+              </a:rPr>
+              <a:t>  global </a:t>
+            </a:r>
+            <a:r>
+              <a:rPr lang="en-GB" sz="2000" b="1" dirty="0">
+                <a:solidFill>
+                  <a:srgbClr val="3366FF"/>
+                </a:solidFill>
+                <a:latin typeface="Courier New"/>
+                <a:cs typeface="Courier New"/>
+              </a:rPr>
+              <a:t>float *a</a:t>
+            </a:r>
+            <a:r>
+              <a:rPr lang="en-GB" sz="2000" b="1" dirty="0" smtClean="0">
+                <a:solidFill>
+                  <a:srgbClr val="3366FF"/>
+                </a:solidFill>
+                <a:latin typeface="Courier New"/>
+                <a:cs typeface="Courier New"/>
+              </a:rPr>
+              <a:t>,</a:t>
+            </a:r>
+          </a:p>
+          <a:p>
+            <a:pPr marL="0" indent="0">
+              <a:buNone/>
+            </a:pPr>
+            <a:r>
+              <a:rPr lang="en-GB" sz="2000" b="1" dirty="0">
+                <a:solidFill>
+                  <a:srgbClr val="3366FF"/>
+                </a:solidFill>
+                <a:latin typeface="Courier New"/>
+                <a:cs typeface="Courier New"/>
+              </a:rPr>
+              <a:t> </a:t>
+            </a:r>
+            <a:r>
+              <a:rPr lang="en-GB" sz="2000" b="1" dirty="0" smtClean="0">
+                <a:solidFill>
+                  <a:srgbClr val="3366FF"/>
+                </a:solidFill>
+                <a:latin typeface="Courier New"/>
+                <a:cs typeface="Courier New"/>
+              </a:rPr>
+              <a:t> global </a:t>
+            </a:r>
+            <a:r>
+              <a:rPr lang="en-GB" sz="2000" b="1" dirty="0">
+                <a:solidFill>
+                  <a:srgbClr val="3366FF"/>
+                </a:solidFill>
+                <a:latin typeface="Courier New"/>
+                <a:cs typeface="Courier New"/>
+              </a:rPr>
+              <a:t>float *b</a:t>
+            </a:r>
+            <a:r>
+              <a:rPr lang="en-GB" sz="2000" b="1" dirty="0" smtClean="0">
+                <a:solidFill>
+                  <a:srgbClr val="3366FF"/>
+                </a:solidFill>
+                <a:latin typeface="Courier New"/>
+                <a:cs typeface="Courier New"/>
+              </a:rPr>
+              <a:t>,</a:t>
+            </a:r>
+          </a:p>
+          <a:p>
+            <a:pPr marL="0" indent="0">
+              <a:buNone/>
+            </a:pPr>
+            <a:r>
+              <a:rPr lang="en-GB" sz="2000" b="1" dirty="0">
+                <a:solidFill>
+                  <a:srgbClr val="3366FF"/>
+                </a:solidFill>
+                <a:latin typeface="Courier New"/>
+                <a:cs typeface="Courier New"/>
+              </a:rPr>
+              <a:t> </a:t>
+            </a:r>
+            <a:r>
+              <a:rPr lang="en-GB" sz="2000" b="1" dirty="0" smtClean="0">
+                <a:solidFill>
+                  <a:srgbClr val="3366FF"/>
+                </a:solidFill>
+                <a:latin typeface="Courier New"/>
+                <a:cs typeface="Courier New"/>
+              </a:rPr>
+              <a:t> global </a:t>
+            </a:r>
+            <a:r>
+              <a:rPr lang="en-GB" sz="2000" b="1" dirty="0">
+                <a:solidFill>
+                  <a:srgbClr val="3366FF"/>
+                </a:solidFill>
+                <a:latin typeface="Courier New"/>
+                <a:cs typeface="Courier New"/>
+              </a:rPr>
+              <a:t>float *c)</a:t>
+            </a:r>
+          </a:p>
+          <a:p>
+            <a:pPr marL="0" indent="0">
+              <a:buNone/>
+            </a:pPr>
+            <a:r>
+              <a:rPr lang="en-GB" sz="2000" b="1" dirty="0">
+                <a:solidFill>
+                  <a:srgbClr val="3366FF"/>
+                </a:solidFill>
+                <a:latin typeface="Courier New"/>
+                <a:cs typeface="Courier New"/>
+              </a:rPr>
+              <a:t>{</a:t>
+            </a:r>
+          </a:p>
+          <a:p>
+            <a:pPr marL="0" indent="0">
+              <a:buNone/>
+            </a:pPr>
+            <a:r>
+              <a:rPr lang="en-GB" sz="2000" b="1" dirty="0">
+                <a:solidFill>
+                  <a:srgbClr val="3366FF"/>
+                </a:solidFill>
+                <a:latin typeface="Courier New"/>
+                <a:cs typeface="Courier New"/>
+              </a:rPr>
+              <a:t>  </a:t>
+            </a:r>
+            <a:r>
+              <a:rPr lang="en-GB" sz="2000" b="1" dirty="0" err="1">
+                <a:solidFill>
+                  <a:srgbClr val="3366FF"/>
+                </a:solidFill>
+                <a:latin typeface="Courier New"/>
+                <a:cs typeface="Courier New"/>
+              </a:rPr>
+              <a:t>int</a:t>
+            </a:r>
+            <a:r>
+              <a:rPr lang="en-GB" sz="2000" b="1" dirty="0">
+                <a:solidFill>
+                  <a:srgbClr val="3366FF"/>
+                </a:solidFill>
+                <a:latin typeface="Courier New"/>
+                <a:cs typeface="Courier New"/>
+              </a:rPr>
+              <a:t> </a:t>
+            </a:r>
+            <a:r>
+              <a:rPr lang="en-GB" sz="2000" b="1" dirty="0" err="1">
+                <a:solidFill>
+                  <a:srgbClr val="3366FF"/>
+                </a:solidFill>
+                <a:latin typeface="Courier New"/>
+                <a:cs typeface="Courier New"/>
+              </a:rPr>
+              <a:t>i</a:t>
+            </a:r>
+            <a:r>
+              <a:rPr lang="en-GB" sz="2000" b="1" dirty="0">
+                <a:solidFill>
+                  <a:srgbClr val="3366FF"/>
+                </a:solidFill>
+                <a:latin typeface="Courier New"/>
+                <a:cs typeface="Courier New"/>
+              </a:rPr>
+              <a:t> </a:t>
+            </a:r>
+            <a:r>
+              <a:rPr lang="en-GB" sz="2000" b="1" dirty="0" smtClean="0">
+                <a:solidFill>
+                  <a:srgbClr val="3366FF"/>
+                </a:solidFill>
+                <a:latin typeface="Courier New"/>
+                <a:cs typeface="Courier New"/>
+              </a:rPr>
+              <a:t>=</a:t>
+            </a:r>
+          </a:p>
+          <a:p>
+            <a:pPr marL="0" indent="0">
+              <a:buNone/>
+            </a:pPr>
+            <a:r>
+              <a:rPr lang="en-GB" sz="2000" b="1" dirty="0">
+                <a:solidFill>
+                  <a:srgbClr val="3366FF"/>
+                </a:solidFill>
+                <a:latin typeface="Courier New"/>
+                <a:cs typeface="Courier New"/>
+              </a:rPr>
+              <a:t> </a:t>
+            </a:r>
+            <a:r>
+              <a:rPr lang="en-GB" sz="2000" b="1" dirty="0" smtClean="0">
+                <a:solidFill>
+                  <a:srgbClr val="3366FF"/>
+                </a:solidFill>
+                <a:latin typeface="Courier New"/>
+                <a:cs typeface="Courier New"/>
+              </a:rPr>
+              <a:t>   </a:t>
+            </a:r>
+            <a:r>
+              <a:rPr lang="en-GB" sz="2000" b="1" dirty="0" err="1" smtClean="0">
+                <a:solidFill>
+                  <a:srgbClr val="3366FF"/>
+                </a:solidFill>
+                <a:latin typeface="Courier New"/>
+                <a:cs typeface="Courier New"/>
+              </a:rPr>
+              <a:t>get_global_id</a:t>
+            </a:r>
+            <a:r>
+              <a:rPr lang="en-GB" sz="2000" b="1" dirty="0">
+                <a:solidFill>
+                  <a:srgbClr val="3366FF"/>
+                </a:solidFill>
+                <a:latin typeface="Courier New"/>
+                <a:cs typeface="Courier New"/>
+              </a:rPr>
+              <a:t>(0);</a:t>
+            </a:r>
+          </a:p>
+          <a:p>
+            <a:pPr marL="0" indent="0">
+              <a:buNone/>
+            </a:pPr>
+            <a:r>
+              <a:rPr lang="en-GB" sz="2000" b="1" dirty="0">
+                <a:solidFill>
+                  <a:srgbClr val="3366FF"/>
+                </a:solidFill>
+                <a:latin typeface="Courier New"/>
+                <a:cs typeface="Courier New"/>
+              </a:rPr>
+              <a:t>  c[</a:t>
+            </a:r>
+            <a:r>
+              <a:rPr lang="en-GB" sz="2000" b="1" dirty="0" err="1">
+                <a:solidFill>
+                  <a:srgbClr val="3366FF"/>
+                </a:solidFill>
+                <a:latin typeface="Courier New"/>
+                <a:cs typeface="Courier New"/>
+              </a:rPr>
+              <a:t>i</a:t>
+            </a:r>
+            <a:r>
+              <a:rPr lang="en-GB" sz="2000" b="1" dirty="0">
+                <a:solidFill>
+                  <a:srgbClr val="3366FF"/>
+                </a:solidFill>
+                <a:latin typeface="Courier New"/>
+                <a:cs typeface="Courier New"/>
+              </a:rPr>
+              <a:t>] = a[</a:t>
+            </a:r>
+            <a:r>
+              <a:rPr lang="en-GB" sz="2000" b="1" dirty="0" err="1">
+                <a:solidFill>
+                  <a:srgbClr val="3366FF"/>
+                </a:solidFill>
+                <a:latin typeface="Courier New"/>
+                <a:cs typeface="Courier New"/>
+              </a:rPr>
+              <a:t>i</a:t>
+            </a:r>
+            <a:r>
+              <a:rPr lang="en-GB" sz="2000" b="1" dirty="0">
+                <a:solidFill>
+                  <a:srgbClr val="3366FF"/>
+                </a:solidFill>
+                <a:latin typeface="Courier New"/>
+                <a:cs typeface="Courier New"/>
+              </a:rPr>
+              <a:t>] + b[</a:t>
+            </a:r>
+            <a:r>
+              <a:rPr lang="en-GB" sz="2000" b="1" dirty="0" err="1">
+                <a:solidFill>
+                  <a:srgbClr val="3366FF"/>
+                </a:solidFill>
+                <a:latin typeface="Courier New"/>
+                <a:cs typeface="Courier New"/>
+              </a:rPr>
+              <a:t>i</a:t>
+            </a:r>
+            <a:r>
+              <a:rPr lang="en-GB" sz="2000" b="1" dirty="0">
+                <a:solidFill>
+                  <a:srgbClr val="3366FF"/>
+                </a:solidFill>
+                <a:latin typeface="Courier New"/>
+                <a:cs typeface="Courier New"/>
+              </a:rPr>
+              <a:t>];</a:t>
+            </a:r>
+          </a:p>
+          <a:p>
+            <a:pPr marL="0" indent="0">
+              <a:buNone/>
+            </a:pPr>
+            <a:r>
+              <a:rPr lang="en-GB" sz="2000" b="1" dirty="0" smtClean="0">
+                <a:solidFill>
+                  <a:srgbClr val="3366FF"/>
+                </a:solidFill>
+                <a:latin typeface="Courier New"/>
+                <a:cs typeface="Courier New"/>
+              </a:rPr>
+              <a:t>}</a:t>
+            </a:r>
+          </a:p>
+        </p:txBody>
+      </p:sp>
+      <p:sp>
+        <p:nvSpPr>
+          <p:cNvPr id="5" name="Text Placeholder 4"/>
+          <p:cNvSpPr>
+            <a:spLocks noGrp="1"/>
+          </p:cNvSpPr>
+          <p:nvPr>
+            <p:ph type="body" sz="quarter" idx="3"/>
+          </p:nvPr>
+        </p:nvSpPr>
+        <p:spPr/>
+        <p:txBody>
+          <a:bodyPr/>
+          <a:lstStyle/>
+          <a:p>
+            <a:r>
+              <a:rPr lang="en-GB" dirty="0" smtClean="0"/>
+              <a:t>After </a:t>
+            </a:r>
+            <a:r>
+              <a:rPr lang="en-GB" dirty="0" err="1" smtClean="0"/>
+              <a:t>stringification</a:t>
+            </a:r>
+            <a:r>
+              <a:rPr lang="en-GB" dirty="0" smtClean="0"/>
+              <a:t>:</a:t>
+            </a:r>
+            <a:endParaRPr lang="en-GB" dirty="0"/>
+          </a:p>
+        </p:txBody>
+      </p:sp>
+      <p:sp>
+        <p:nvSpPr>
+          <p:cNvPr id="6" name="Content Placeholder 5"/>
+          <p:cNvSpPr>
+            <a:spLocks noGrp="1"/>
+          </p:cNvSpPr>
+          <p:nvPr>
+            <p:ph sz="quarter" idx="4"/>
+          </p:nvPr>
+        </p:nvSpPr>
+        <p:spPr/>
+        <p:txBody>
+          <a:bodyPr>
+            <a:normAutofit fontScale="85000" lnSpcReduction="10000"/>
+          </a:bodyPr>
+          <a:lstStyle/>
+          <a:p>
+            <a:pPr marL="0" indent="0">
+              <a:buNone/>
+            </a:pPr>
+            <a:r>
+              <a:rPr lang="en-GB" b="1" dirty="0" err="1">
+                <a:solidFill>
+                  <a:srgbClr val="3366FF"/>
+                </a:solidFill>
+                <a:latin typeface="Courier New"/>
+                <a:cs typeface="Courier New"/>
+              </a:rPr>
+              <a:t>const</a:t>
+            </a:r>
+            <a:r>
+              <a:rPr lang="en-GB" b="1" dirty="0">
+                <a:solidFill>
+                  <a:srgbClr val="3366FF"/>
+                </a:solidFill>
+                <a:latin typeface="Courier New"/>
+                <a:cs typeface="Courier New"/>
+              </a:rPr>
+              <a:t> char *</a:t>
+            </a:r>
+            <a:r>
+              <a:rPr lang="en-GB" b="1" dirty="0" err="1">
+                <a:solidFill>
+                  <a:srgbClr val="3366FF"/>
+                </a:solidFill>
+                <a:latin typeface="Courier New"/>
+                <a:cs typeface="Courier New"/>
+              </a:rPr>
+              <a:t>vecadd_ocl</a:t>
+            </a:r>
+            <a:r>
+              <a:rPr lang="en-GB" b="1" dirty="0">
+                <a:solidFill>
+                  <a:srgbClr val="3366FF"/>
+                </a:solidFill>
+                <a:latin typeface="Courier New"/>
+                <a:cs typeface="Courier New"/>
+              </a:rPr>
+              <a:t> =</a:t>
+            </a:r>
+          </a:p>
+          <a:p>
+            <a:pPr marL="0" indent="0">
+              <a:buNone/>
+            </a:pPr>
+            <a:r>
+              <a:rPr lang="en-GB" b="1" dirty="0" smtClean="0">
+                <a:solidFill>
+                  <a:srgbClr val="3366FF"/>
+                </a:solidFill>
+                <a:latin typeface="Courier New"/>
+                <a:cs typeface="Courier New"/>
+              </a:rPr>
+              <a:t>"</a:t>
+            </a:r>
+            <a:r>
+              <a:rPr lang="en-GB" b="1" dirty="0">
+                <a:solidFill>
+                  <a:srgbClr val="3366FF"/>
+                </a:solidFill>
+                <a:latin typeface="Courier New"/>
+                <a:cs typeface="Courier New"/>
+              </a:rPr>
+              <a:t>kernel void </a:t>
+            </a:r>
+            <a:r>
+              <a:rPr lang="en-GB" b="1" dirty="0" err="1">
+                <a:solidFill>
+                  <a:srgbClr val="3366FF"/>
+                </a:solidFill>
+                <a:latin typeface="Courier New"/>
+                <a:cs typeface="Courier New"/>
+              </a:rPr>
+              <a:t>vecadd</a:t>
+            </a:r>
+            <a:r>
+              <a:rPr lang="en-GB" b="1" dirty="0">
+                <a:solidFill>
+                  <a:srgbClr val="3366FF"/>
+                </a:solidFill>
+                <a:latin typeface="Courier New"/>
+                <a:cs typeface="Courier New"/>
+              </a:rPr>
+              <a:t>(\n"</a:t>
+            </a:r>
+          </a:p>
+          <a:p>
+            <a:pPr marL="0" indent="0">
+              <a:buNone/>
+            </a:pPr>
+            <a:r>
+              <a:rPr lang="en-GB" b="1" dirty="0">
+                <a:solidFill>
+                  <a:srgbClr val="3366FF"/>
+                </a:solidFill>
+                <a:latin typeface="Courier New"/>
+                <a:cs typeface="Courier New"/>
+              </a:rPr>
+              <a:t>"  </a:t>
+            </a:r>
+            <a:r>
+              <a:rPr lang="en-GB" b="1" dirty="0" smtClean="0">
+                <a:solidFill>
+                  <a:srgbClr val="3366FF"/>
+                </a:solidFill>
+                <a:latin typeface="Courier New"/>
+                <a:cs typeface="Courier New"/>
+              </a:rPr>
+              <a:t>global </a:t>
+            </a:r>
+            <a:r>
+              <a:rPr lang="en-GB" b="1" dirty="0">
+                <a:solidFill>
+                  <a:srgbClr val="3366FF"/>
+                </a:solidFill>
+                <a:latin typeface="Courier New"/>
+                <a:cs typeface="Courier New"/>
+              </a:rPr>
+              <a:t>float *a,\n"</a:t>
+            </a:r>
+          </a:p>
+          <a:p>
+            <a:pPr marL="0" indent="0">
+              <a:buNone/>
+            </a:pPr>
+            <a:r>
+              <a:rPr lang="en-GB" b="1" dirty="0">
+                <a:solidFill>
+                  <a:srgbClr val="3366FF"/>
+                </a:solidFill>
+                <a:latin typeface="Courier New"/>
+                <a:cs typeface="Courier New"/>
+              </a:rPr>
+              <a:t>"  </a:t>
+            </a:r>
+            <a:r>
+              <a:rPr lang="en-GB" b="1" dirty="0" smtClean="0">
+                <a:solidFill>
+                  <a:srgbClr val="3366FF"/>
+                </a:solidFill>
+                <a:latin typeface="Courier New"/>
+                <a:cs typeface="Courier New"/>
+              </a:rPr>
+              <a:t>global </a:t>
+            </a:r>
+            <a:r>
+              <a:rPr lang="en-GB" b="1" dirty="0">
+                <a:solidFill>
+                  <a:srgbClr val="3366FF"/>
+                </a:solidFill>
+                <a:latin typeface="Courier New"/>
+                <a:cs typeface="Courier New"/>
+              </a:rPr>
+              <a:t>float *b,\n"</a:t>
+            </a:r>
+          </a:p>
+          <a:p>
+            <a:pPr marL="0" indent="0">
+              <a:buNone/>
+            </a:pPr>
+            <a:r>
+              <a:rPr lang="en-GB" b="1" dirty="0">
+                <a:solidFill>
+                  <a:srgbClr val="3366FF"/>
+                </a:solidFill>
+                <a:latin typeface="Courier New"/>
+                <a:cs typeface="Courier New"/>
+              </a:rPr>
+              <a:t>"  </a:t>
+            </a:r>
+            <a:r>
+              <a:rPr lang="en-GB" b="1" dirty="0" smtClean="0">
+                <a:solidFill>
+                  <a:srgbClr val="3366FF"/>
+                </a:solidFill>
+                <a:latin typeface="Courier New"/>
+                <a:cs typeface="Courier New"/>
+              </a:rPr>
+              <a:t>global </a:t>
+            </a:r>
+            <a:r>
+              <a:rPr lang="en-GB" b="1" dirty="0">
+                <a:solidFill>
+                  <a:srgbClr val="3366FF"/>
+                </a:solidFill>
+                <a:latin typeface="Courier New"/>
+                <a:cs typeface="Courier New"/>
+              </a:rPr>
+              <a:t>float *c)\</a:t>
+            </a:r>
+            <a:r>
+              <a:rPr lang="en-GB" b="1" dirty="0" smtClean="0">
+                <a:solidFill>
+                  <a:srgbClr val="3366FF"/>
+                </a:solidFill>
+                <a:latin typeface="Courier New"/>
+                <a:cs typeface="Courier New"/>
+              </a:rPr>
+              <a:t>n</a:t>
+            </a:r>
+            <a:r>
+              <a:rPr lang="en-GB" b="1" dirty="0">
+                <a:solidFill>
+                  <a:srgbClr val="3366FF"/>
+                </a:solidFill>
+                <a:latin typeface="Courier New"/>
+                <a:cs typeface="Courier New"/>
+              </a:rPr>
+              <a:t>"</a:t>
+            </a:r>
+          </a:p>
+          <a:p>
+            <a:pPr marL="0" indent="0">
+              <a:buNone/>
+            </a:pPr>
+            <a:r>
+              <a:rPr lang="en-GB" b="1" dirty="0">
+                <a:solidFill>
+                  <a:srgbClr val="3366FF"/>
+                </a:solidFill>
+                <a:latin typeface="Courier New"/>
+                <a:cs typeface="Courier New"/>
+              </a:rPr>
+              <a:t>"{\n"</a:t>
+            </a:r>
+          </a:p>
+          <a:p>
+            <a:pPr marL="0" indent="0">
+              <a:buNone/>
+            </a:pPr>
+            <a:r>
+              <a:rPr lang="en-GB" b="1" dirty="0">
+                <a:solidFill>
+                  <a:srgbClr val="3366FF"/>
+                </a:solidFill>
+                <a:latin typeface="Courier New"/>
+                <a:cs typeface="Courier New"/>
+              </a:rPr>
+              <a:t>"</a:t>
+            </a:r>
+            <a:r>
+              <a:rPr lang="sv-SE" b="1" dirty="0" smtClean="0">
+                <a:solidFill>
+                  <a:srgbClr val="3366FF"/>
+                </a:solidFill>
+                <a:latin typeface="Courier New"/>
+                <a:cs typeface="Courier New"/>
+              </a:rPr>
+              <a:t>  </a:t>
+            </a:r>
+            <a:r>
+              <a:rPr lang="sv-SE" b="1" dirty="0" err="1" smtClean="0">
+                <a:solidFill>
+                  <a:srgbClr val="3366FF"/>
+                </a:solidFill>
+                <a:latin typeface="Courier New"/>
+                <a:cs typeface="Courier New"/>
+              </a:rPr>
+              <a:t>int</a:t>
+            </a:r>
+            <a:r>
+              <a:rPr lang="sv-SE" b="1" dirty="0" smtClean="0">
+                <a:solidFill>
+                  <a:srgbClr val="3366FF"/>
+                </a:solidFill>
+                <a:latin typeface="Courier New"/>
+                <a:cs typeface="Courier New"/>
+              </a:rPr>
+              <a:t> </a:t>
+            </a:r>
+            <a:r>
+              <a:rPr lang="sv-SE" b="1" dirty="0">
+                <a:solidFill>
+                  <a:srgbClr val="3366FF"/>
+                </a:solidFill>
+                <a:latin typeface="Courier New"/>
+                <a:cs typeface="Courier New"/>
+              </a:rPr>
+              <a:t>i =\</a:t>
+            </a:r>
+            <a:r>
+              <a:rPr lang="sv-SE" b="1" dirty="0" smtClean="0">
+                <a:solidFill>
+                  <a:srgbClr val="3366FF"/>
+                </a:solidFill>
+                <a:latin typeface="Courier New"/>
+                <a:cs typeface="Courier New"/>
+              </a:rPr>
+              <a:t>n</a:t>
+            </a:r>
+            <a:r>
+              <a:rPr lang="en-GB" b="1" dirty="0">
+                <a:solidFill>
+                  <a:srgbClr val="3366FF"/>
+                </a:solidFill>
+                <a:latin typeface="Courier New"/>
+                <a:cs typeface="Courier New"/>
+              </a:rPr>
+              <a:t>"</a:t>
+            </a:r>
+            <a:endParaRPr lang="sv-SE" b="1" dirty="0">
               <a:solidFill>
                 <a:srgbClr val="3366FF"/>
               </a:solidFill>
@@ -11128,35 +11851,70 @@
             </a:endParaRPr>
           </a:p>
           <a:p>
-            <a:pPr marL="400050" lvl="1" indent="0">
-              <a:buNone/>
-            </a:pPr>
-            <a:r>
-              <a:rPr lang="en-US" b="1" dirty="0" smtClean="0">
-                <a:solidFill>
-                  <a:srgbClr val="3366FF"/>
-                </a:solidFill>
-                <a:latin typeface="Courier New"/>
-                <a:cs typeface="Courier New"/>
-              </a:rPr>
-              <a:t>#</a:t>
-            </a:r>
-            <a:r>
-              <a:rPr lang="en-US" b="1" dirty="0">
-                <a:solidFill>
-                  <a:srgbClr val="3366FF"/>
-                </a:solidFill>
-                <a:latin typeface="Courier New"/>
-                <a:cs typeface="Courier New"/>
-              </a:rPr>
-              <a:t>!/bin/bash</a:t>
-            </a:r>
-          </a:p>
-          <a:p>
-            <a:pPr marL="400050" lvl="1" indent="0">
-              <a:buNone/>
-            </a:pPr>
-            <a:endParaRPr lang="en-US" b="1" dirty="0">
+            <a:pPr marL="0" indent="0">
+              <a:buNone/>
+            </a:pPr>
+            <a:r>
+              <a:rPr lang="en-GB" b="1" dirty="0">
+                <a:solidFill>
+                  <a:srgbClr val="3366FF"/>
+                </a:solidFill>
+                <a:latin typeface="Courier New"/>
+                <a:cs typeface="Courier New"/>
+              </a:rPr>
+              <a:t>"</a:t>
+            </a:r>
+            <a:r>
+              <a:rPr lang="sv-SE" b="1" dirty="0" smtClean="0">
+                <a:solidFill>
+                  <a:srgbClr val="3366FF"/>
+                </a:solidFill>
+                <a:latin typeface="Courier New"/>
+                <a:cs typeface="Courier New"/>
+              </a:rPr>
+              <a:t>    </a:t>
+            </a:r>
+            <a:r>
+              <a:rPr lang="sv-SE" b="1" dirty="0" err="1" smtClean="0">
+                <a:solidFill>
+                  <a:srgbClr val="3366FF"/>
+                </a:solidFill>
+                <a:latin typeface="Courier New"/>
+                <a:cs typeface="Courier New"/>
+              </a:rPr>
+              <a:t>get_global_id</a:t>
+            </a:r>
+            <a:r>
+              <a:rPr lang="sv-SE" b="1" dirty="0">
+                <a:solidFill>
+                  <a:srgbClr val="3366FF"/>
+                </a:solidFill>
+                <a:latin typeface="Courier New"/>
+                <a:cs typeface="Courier New"/>
+              </a:rPr>
+              <a:t>(0);\</a:t>
+            </a:r>
+            <a:r>
+              <a:rPr lang="sv-SE" b="1" dirty="0" smtClean="0">
+                <a:solidFill>
+                  <a:srgbClr val="3366FF"/>
+                </a:solidFill>
+                <a:latin typeface="Courier New"/>
+                <a:cs typeface="Courier New"/>
+              </a:rPr>
+              <a:t>n</a:t>
+            </a:r>
+            <a:r>
+              <a:rPr lang="en-GB" b="1" dirty="0">
+                <a:solidFill>
+                  <a:srgbClr val="3366FF"/>
+                </a:solidFill>
+                <a:latin typeface="Courier New"/>
+                <a:cs typeface="Courier New"/>
+              </a:rPr>
+              <a:t>"</a:t>
+            </a:r>
+            <a:endParaRPr lang="sv-SE" b="1" dirty="0">
               <a:solidFill>
                 <a:srgbClr val="3366FF"/>
               </a:solidFill>
@@ -11165,80 +11923,70 @@
             </a:endParaRPr>
           </a:p>
           <a:p>
-            <a:pPr marL="400050" lvl="1" indent="0">
-              <a:buNone/>
-            </a:pPr>
-            <a:r>
-              <a:rPr lang="en-US" b="1" dirty="0">
-                <a:solidFill>
-                  <a:srgbClr val="3366FF"/>
-                </a:solidFill>
-                <a:latin typeface="Courier New"/>
-                <a:cs typeface="Courier New"/>
-              </a:rPr>
-              <a:t>IN=$1</a:t>
-            </a:r>
-          </a:p>
-          <a:p>
-            <a:pPr marL="400050" lvl="1" indent="0">
-              <a:buNone/>
-            </a:pPr>
-            <a:r>
-              <a:rPr lang="en-US" b="1" dirty="0">
-                <a:solidFill>
-                  <a:srgbClr val="3366FF"/>
-                </a:solidFill>
-                <a:latin typeface="Courier New"/>
-                <a:cs typeface="Courier New"/>
-              </a:rPr>
-              <a:t>NAME=${</a:t>
-            </a:r>
-            <a:r>
-              <a:rPr lang="en-US" b="1" dirty="0" err="1">
-                <a:solidFill>
-                  <a:srgbClr val="3366FF"/>
-                </a:solidFill>
-                <a:latin typeface="Courier New"/>
-                <a:cs typeface="Courier New"/>
-              </a:rPr>
-              <a:t>IN%.cl</a:t>
-            </a:r>
-            <a:r>
-              <a:rPr lang="en-US" b="1" dirty="0">
-                <a:solidFill>
-                  <a:srgbClr val="3366FF"/>
-                </a:solidFill>
-                <a:latin typeface="Courier New"/>
-                <a:cs typeface="Courier New"/>
-              </a:rPr>
-              <a:t>}</a:t>
-            </a:r>
-          </a:p>
-          <a:p>
-            <a:pPr marL="400050" lvl="1" indent="0">
-              <a:buNone/>
-            </a:pPr>
-            <a:r>
-              <a:rPr lang="en-US" b="1" dirty="0">
-                <a:solidFill>
-                  <a:srgbClr val="3366FF"/>
-                </a:solidFill>
-                <a:latin typeface="Courier New"/>
-                <a:cs typeface="Courier New"/>
-              </a:rPr>
-              <a:t>OUT=$</a:t>
-            </a:r>
-            <a:r>
-              <a:rPr lang="en-US" b="1" dirty="0" err="1">
-                <a:solidFill>
-                  <a:srgbClr val="3366FF"/>
-                </a:solidFill>
-                <a:latin typeface="Courier New"/>
-                <a:cs typeface="Courier New"/>
-              </a:rPr>
-              <a:t>NAME.h</a:t>
-            </a:r>
-            <a:endParaRPr lang="en-US" b="1" dirty="0">
+            <a:pPr marL="0" indent="0">
+              <a:buNone/>
+            </a:pPr>
+            <a:r>
+              <a:rPr lang="en-GB" b="1" dirty="0">
+                <a:solidFill>
+                  <a:srgbClr val="3366FF"/>
+                </a:solidFill>
+                <a:latin typeface="Courier New"/>
+                <a:cs typeface="Courier New"/>
+              </a:rPr>
+              <a:t>"</a:t>
+            </a:r>
+            <a:r>
+              <a:rPr lang="sv-SE" b="1" dirty="0" smtClean="0">
+                <a:solidFill>
+                  <a:srgbClr val="3366FF"/>
+                </a:solidFill>
+                <a:latin typeface="Courier New"/>
+                <a:cs typeface="Courier New"/>
+              </a:rPr>
+              <a:t>  c</a:t>
+            </a:r>
+            <a:r>
+              <a:rPr lang="sv-SE" b="1" dirty="0">
+                <a:solidFill>
+                  <a:srgbClr val="3366FF"/>
+                </a:solidFill>
+                <a:latin typeface="Courier New"/>
+                <a:cs typeface="Courier New"/>
+              </a:rPr>
+              <a:t>[i] = a[i] + b[i];\n"</a:t>
+            </a:r>
+          </a:p>
+          <a:p>
+            <a:pPr marL="0" indent="0">
+              <a:buNone/>
+            </a:pPr>
+            <a:r>
+              <a:rPr lang="sv-SE" b="1" dirty="0">
+                <a:solidFill>
+                  <a:srgbClr val="3366FF"/>
+                </a:solidFill>
+                <a:latin typeface="Courier New"/>
+                <a:cs typeface="Courier New"/>
+              </a:rPr>
+              <a:t>"}\n"</a:t>
+            </a:r>
+          </a:p>
+          <a:p>
+            <a:pPr marL="0" indent="0">
+              <a:buNone/>
+            </a:pPr>
+            <a:r>
+              <a:rPr lang="sv-SE" b="1" dirty="0">
+                <a:solidFill>
+                  <a:srgbClr val="3366FF"/>
+                </a:solidFill>
+                <a:latin typeface="Courier New"/>
+                <a:cs typeface="Courier New"/>
+              </a:rPr>
+              <a:t>;</a:t>
+            </a:r>
+            <a:endParaRPr lang="en-GB" b="1" dirty="0">
               <a:solidFill>
                 <a:srgbClr val="3366FF"/>
               </a:solidFill>
@@ -11246,256 +11994,12 @@
               <a:cs typeface="Courier New"/>
             </a:endParaRPr>
           </a:p>
-          <a:p>
-            <a:pPr marL="400050" lvl="1" indent="0">
-              <a:buNone/>
-            </a:pPr>
-            <a:endParaRPr lang="en-US" b="1" dirty="0" smtClean="0">
-              <a:solidFill>
-                <a:srgbClr val="3366FF"/>
-              </a:solidFill>
-              <a:latin typeface="Courier New"/>
-              <a:cs typeface="Courier New"/>
-            </a:endParaRPr>
-          </a:p>
-          <a:p>
-            <a:pPr marL="400050" lvl="1" indent="0">
-              <a:buNone/>
-            </a:pPr>
-            <a:r>
-              <a:rPr lang="en-US" b="1" dirty="0" smtClean="0">
-                <a:solidFill>
-                  <a:srgbClr val="3366FF"/>
-                </a:solidFill>
-                <a:latin typeface="Courier New"/>
-                <a:cs typeface="Courier New"/>
-              </a:rPr>
-              <a:t>echo </a:t>
-            </a:r>
-            <a:r>
-              <a:rPr lang="en-US" b="1" dirty="0">
-                <a:solidFill>
-                  <a:srgbClr val="3366FF"/>
-                </a:solidFill>
-                <a:latin typeface="Courier New"/>
-                <a:cs typeface="Courier New"/>
-              </a:rPr>
-              <a:t>"</a:t>
-            </a:r>
-            <a:r>
-              <a:rPr lang="en-US" b="1" dirty="0" err="1">
-                <a:solidFill>
-                  <a:srgbClr val="3366FF"/>
-                </a:solidFill>
-                <a:latin typeface="Courier New"/>
-                <a:cs typeface="Courier New"/>
-              </a:rPr>
-              <a:t>const</a:t>
-            </a:r>
-            <a:r>
-              <a:rPr lang="en-US" b="1" dirty="0">
-                <a:solidFill>
-                  <a:srgbClr val="3366FF"/>
-                </a:solidFill>
-                <a:latin typeface="Courier New"/>
-                <a:cs typeface="Courier New"/>
-              </a:rPr>
-              <a:t> char *"$</a:t>
-            </a:r>
-            <a:r>
-              <a:rPr lang="en-US" b="1" dirty="0" smtClean="0">
-                <a:solidFill>
-                  <a:srgbClr val="3366FF"/>
-                </a:solidFill>
-                <a:latin typeface="Courier New"/>
-                <a:cs typeface="Courier New"/>
-              </a:rPr>
-              <a:t>NAME"_</a:t>
-            </a:r>
-            <a:r>
-              <a:rPr lang="en-US" b="1" dirty="0" err="1" smtClean="0">
-                <a:solidFill>
-                  <a:srgbClr val="3366FF"/>
-                </a:solidFill>
-                <a:latin typeface="Courier New"/>
-                <a:cs typeface="Courier New"/>
-              </a:rPr>
-              <a:t>ocl</a:t>
-            </a:r>
-            <a:r>
-              <a:rPr lang="en-US" b="1" dirty="0" smtClean="0">
-                <a:solidFill>
-                  <a:srgbClr val="3366FF"/>
-                </a:solidFill>
-                <a:latin typeface="Courier New"/>
-                <a:cs typeface="Courier New"/>
-              </a:rPr>
-              <a:t> </a:t>
-            </a:r>
-            <a:r>
-              <a:rPr lang="en-US" b="1" dirty="0">
-                <a:solidFill>
-                  <a:srgbClr val="3366FF"/>
-                </a:solidFill>
-                <a:latin typeface="Courier New"/>
-                <a:cs typeface="Courier New"/>
-              </a:rPr>
-              <a:t>=" &gt;$OUT</a:t>
-            </a:r>
-          </a:p>
-          <a:p>
-            <a:pPr marL="400050" lvl="1" indent="0">
-              <a:buNone/>
-            </a:pPr>
-            <a:r>
-              <a:rPr lang="en-US" b="1" dirty="0" err="1">
-                <a:solidFill>
-                  <a:srgbClr val="3366FF"/>
-                </a:solidFill>
-                <a:latin typeface="Courier New"/>
-                <a:cs typeface="Courier New"/>
-              </a:rPr>
-              <a:t>sed</a:t>
-            </a:r>
-            <a:r>
-              <a:rPr lang="en-US" b="1" dirty="0">
-                <a:solidFill>
-                  <a:srgbClr val="3366FF"/>
-                </a:solidFill>
-                <a:latin typeface="Courier New"/>
-                <a:cs typeface="Courier New"/>
-              </a:rPr>
-              <a:t> -e 's/\\/\\\\/</a:t>
-            </a:r>
-            <a:r>
-              <a:rPr lang="en-US" b="1" dirty="0" err="1">
-                <a:solidFill>
-                  <a:srgbClr val="3366FF"/>
-                </a:solidFill>
-                <a:latin typeface="Courier New"/>
-                <a:cs typeface="Courier New"/>
-              </a:rPr>
-              <a:t>g;s</a:t>
-            </a:r>
-            <a:r>
-              <a:rPr lang="en-US" b="1" dirty="0">
-                <a:solidFill>
-                  <a:srgbClr val="3366FF"/>
-                </a:solidFill>
-                <a:latin typeface="Courier New"/>
-                <a:cs typeface="Courier New"/>
-              </a:rPr>
-              <a:t>/"/\\"/</a:t>
-            </a:r>
-            <a:r>
-              <a:rPr lang="en-US" b="1" dirty="0" err="1">
-                <a:solidFill>
-                  <a:srgbClr val="3366FF"/>
-                </a:solidFill>
-                <a:latin typeface="Courier New"/>
-                <a:cs typeface="Courier New"/>
-              </a:rPr>
-              <a:t>g</a:t>
-            </a:r>
-            <a:r>
-              <a:rPr lang="en-US" b="1" dirty="0" err="1" smtClean="0">
-                <a:solidFill>
-                  <a:srgbClr val="3366FF"/>
-                </a:solidFill>
-                <a:latin typeface="Courier New"/>
-                <a:cs typeface="Courier New"/>
-              </a:rPr>
-              <a:t>;s</a:t>
-            </a:r>
-            <a:r>
-              <a:rPr lang="en-US" b="1" dirty="0" smtClean="0">
-                <a:solidFill>
-                  <a:srgbClr val="3366FF"/>
-                </a:solidFill>
-                <a:latin typeface="Courier New"/>
-                <a:cs typeface="Courier New"/>
-              </a:rPr>
-              <a:t>/^/"/;s/$/\\n"/' \</a:t>
-            </a:r>
-          </a:p>
-          <a:p>
-            <a:pPr marL="400050" lvl="1" indent="0">
-              <a:buNone/>
-            </a:pPr>
-            <a:r>
-              <a:rPr lang="en-US" b="1" dirty="0">
-                <a:solidFill>
-                  <a:srgbClr val="3366FF"/>
-                </a:solidFill>
-                <a:latin typeface="Courier New"/>
-                <a:cs typeface="Courier New"/>
-              </a:rPr>
-              <a:t> </a:t>
-            </a:r>
-            <a:r>
-              <a:rPr lang="en-US" b="1" dirty="0" smtClean="0">
-                <a:solidFill>
-                  <a:srgbClr val="3366FF"/>
-                </a:solidFill>
-                <a:latin typeface="Courier New"/>
-                <a:cs typeface="Courier New"/>
-              </a:rPr>
-              <a:t> $IN &gt;&gt;$OUT</a:t>
-            </a:r>
-          </a:p>
-          <a:p>
-            <a:pPr marL="400050" lvl="1" indent="0">
-              <a:buNone/>
-            </a:pPr>
-            <a:r>
-              <a:rPr lang="en-US" b="1" dirty="0" smtClean="0">
-                <a:solidFill>
-                  <a:srgbClr val="3366FF"/>
-                </a:solidFill>
-                <a:latin typeface="Courier New"/>
-                <a:cs typeface="Courier New"/>
-              </a:rPr>
-              <a:t>echo </a:t>
-            </a:r>
-            <a:r>
-              <a:rPr lang="en-US" b="1" dirty="0">
-                <a:solidFill>
-                  <a:srgbClr val="3366FF"/>
-                </a:solidFill>
-                <a:latin typeface="Courier New"/>
-                <a:cs typeface="Courier New"/>
-              </a:rPr>
-              <a:t>";" &gt;&gt;$</a:t>
-            </a:r>
-            <a:r>
-              <a:rPr lang="en-US" b="1" dirty="0" smtClean="0">
-                <a:solidFill>
-                  <a:srgbClr val="3366FF"/>
-                </a:solidFill>
-                <a:latin typeface="Courier New"/>
-                <a:cs typeface="Courier New"/>
-              </a:rPr>
-              <a:t>OUT</a:t>
-            </a:r>
-          </a:p>
-          <a:p>
-            <a:pPr marL="0" indent="0">
-              <a:buNone/>
-            </a:pPr>
-            <a:endParaRPr lang="en-US" b="1" dirty="0" smtClean="0">
-              <a:solidFill>
-                <a:srgbClr val="3366FF"/>
-              </a:solidFill>
-              <a:latin typeface="Courier New"/>
-              <a:cs typeface="Courier New"/>
-            </a:endParaRPr>
-          </a:p>
         </p:txBody>
       </p:sp>
     </p:spTree>
     <p:extLst>
       <p:ext uri="{BB962C8B-B14F-4D97-AF65-F5344CB8AC3E}">
-        <p14:creationId xmlns:p14="http://schemas.microsoft.com/office/powerpoint/2010/main" val="2900228134"/>
+        <p14:creationId xmlns:p14="http://schemas.microsoft.com/office/powerpoint/2010/main" val="1917558613"/>
       </p:ext>
     </p:extLst>
   </p:cSld>

</xml_diff>

<commit_message>
Minor tweaks to Part2 slides.
</commit_message>
<xml_diff>
--- a/slides/advanced_part2.pptx
+++ b/slides/advanced_part2.pptx
@@ -895,8 +895,27 @@
             </a:r>
             <a:r>
               <a:rPr lang="en-GB" baseline="0" dirty="0" smtClean="0"/>
-              <a:t> to compiler to make it go faster. </a:t>
-            </a:r>
+              <a:t> to compiler to make it </a:t>
+            </a:r>
+            <a:r>
+              <a:rPr lang="en-GB" baseline="0" dirty="0" smtClean="0"/>
+              <a:t>potentially enable more optimizations.</a:t>
+            </a:r>
+          </a:p>
+          <a:p>
+            <a:r>
+              <a:rPr lang="en-GB" baseline="0" dirty="0" err="1" smtClean="0"/>
+              <a:t>reqd_work_group_size</a:t>
+            </a:r>
+            <a:r>
+              <a:rPr lang="en-GB" baseline="0" dirty="0" smtClean="0"/>
+              <a:t> requires that we know WGSIZE at compile-time, but can use meta</a:t>
+            </a:r>
+            <a:r>
+              <a:rPr lang="en-GB" baseline="0" smtClean="0"/>
+              <a:t>-programming</a:t>
+            </a:r>
+            <a:endParaRPr lang="en-GB" baseline="0" dirty="0" smtClean="0"/>
           </a:p>
           <a:p>
             <a:endParaRPr lang="en-GB" dirty="0"/>
@@ -6185,8 +6204,12 @@
           <a:lstStyle/>
           <a:p>
             <a:r>
-              <a:rPr lang="en-GB" dirty="0" smtClean="0"/>
-              <a:t>Compilation hints</a:t>
+              <a:rPr lang="en-GB" smtClean="0"/>
+              <a:t>Other compilation </a:t>
+            </a:r>
+            <a:r>
+              <a:rPr lang="en-GB" dirty="0" smtClean="0"/>
+              <a:t>hints</a:t>
             </a:r>
             <a:endParaRPr lang="en-GB" dirty="0"/>
           </a:p>
@@ -6205,7 +6228,7 @@
         <p:spPr/>
         <p:txBody>
           <a:bodyPr>
-            <a:normAutofit fontScale="92500" lnSpcReduction="20000"/>
+            <a:normAutofit fontScale="92500"/>
           </a:bodyPr>
           <a:lstStyle/>
           <a:p>
@@ -6220,29 +6243,11 @@
             </a:r>
             <a:r>
               <a:rPr lang="en-GB" dirty="0" smtClean="0"/>
-              <a:t>use the </a:t>
-            </a:r>
-            <a:r>
-              <a:rPr lang="en-GB" b="1" dirty="0" err="1" smtClean="0">
-                <a:solidFill>
-                  <a:srgbClr val="3366FF"/>
-                </a:solidFill>
-                <a:latin typeface="Courier New"/>
-                <a:cs typeface="Courier New"/>
-              </a:rPr>
-              <a:t>reqd_work_group_size</a:t>
-            </a:r>
-            <a:r>
-              <a:rPr lang="en-GB" dirty="0" smtClean="0">
-                <a:solidFill>
-                  <a:srgbClr val="3366FF"/>
-                </a:solidFill>
-              </a:rPr>
-              <a:t> </a:t>
-            </a:r>
-            <a:r>
-              <a:rPr lang="en-GB" dirty="0" smtClean="0"/>
-              <a:t>attribute to </a:t>
+              <a:t>use an attribute </a:t>
+            </a:r>
+            <a:r>
+              <a:rPr lang="en-GB" dirty="0" smtClean="0"/>
+              <a:t>to </a:t>
             </a:r>
             <a:r>
               <a:rPr lang="en-GB" dirty="0" smtClean="0"/>
@@ -6250,41 +6255,34 @@
             </a:r>
             <a:r>
               <a:rPr lang="en-GB" dirty="0" smtClean="0"/>
-              <a:t>compiler what </a:t>
-            </a:r>
-            <a:r>
-              <a:rPr lang="en-GB" dirty="0" smtClean="0"/>
-              <a:t>work-group size you’re </a:t>
-            </a:r>
-            <a:r>
-              <a:rPr lang="en-GB" dirty="0" smtClean="0"/>
-              <a:t>going to </a:t>
-            </a:r>
-            <a:r>
-              <a:rPr lang="en-GB" smtClean="0"/>
+              <a:t>compiler </a:t>
+            </a:r>
+            <a:r>
+              <a:rPr lang="en-GB" dirty="0" smtClean="0"/>
+              <a:t>of the work-group size that you intend to </a:t>
+            </a:r>
+            <a:r>
+              <a:rPr lang="en-GB" dirty="0" smtClean="0"/>
               <a:t>launch </a:t>
             </a:r>
             <a:r>
-              <a:rPr lang="en-GB" smtClean="0"/>
+              <a:rPr lang="en-GB" dirty="0" smtClean="0"/>
               <a:t>kernels</a:t>
             </a:r>
             <a:r>
-              <a:rPr lang="en-GB" smtClean="0"/>
-              <a:t> </a:t>
-            </a:r>
-            <a:r>
-              <a:rPr lang="en-GB" dirty="0" smtClean="0"/>
-              <a:t>with:</a:t>
-            </a:r>
-          </a:p>
-          <a:p>
-            <a:pPr lvl="1">
+              <a:rPr lang="en-GB" dirty="0" smtClean="0"/>
+              <a:t> with:</a:t>
+            </a:r>
+          </a:p>
+          <a:p>
+            <a:pPr marL="457200" lvl="1" indent="0">
               <a:lnSpc>
                 <a:spcPct val="120000"/>
               </a:lnSpc>
-            </a:pPr>
-            <a:r>
-              <a:rPr lang="en-GB" b="1" dirty="0" smtClean="0">
+              <a:buNone/>
+            </a:pPr>
+            <a:r>
+              <a:rPr lang="en-GB" sz="2200" b="1" dirty="0" smtClean="0">
                 <a:solidFill>
                   <a:srgbClr val="3366FF"/>
                 </a:solidFill>
@@ -6294,7 +6292,7 @@
               <a:t>__attribute__((</a:t>
             </a:r>
             <a:r>
-              <a:rPr lang="en-GB" b="1" dirty="0" err="1" smtClean="0">
+              <a:rPr lang="en-GB" sz="2200" b="1" dirty="0" err="1" smtClean="0">
                 <a:solidFill>
                   <a:srgbClr val="3366FF"/>
                 </a:solidFill>
@@ -6304,7 +6302,7 @@
               <a:t>reqd_work_group_size</a:t>
             </a:r>
             <a:r>
-              <a:rPr lang="en-GB" b="1" dirty="0" smtClean="0">
+              <a:rPr lang="en-GB" sz="2200" b="1" dirty="0" smtClean="0">
                 <a:solidFill>
                   <a:srgbClr val="3366FF"/>
                 </a:solidFill>
@@ -6313,7 +6311,7 @@
               </a:rPr>
               <a:t>(x, y, z)))</a:t>
             </a:r>
-            <a:endParaRPr lang="en-GB" b="1" dirty="0" smtClean="0">
+            <a:endParaRPr lang="en-GB" sz="2200" b="1" dirty="0" smtClean="0">
               <a:solidFill>
                 <a:srgbClr val="3366FF"/>
               </a:solidFill>

</xml_diff>

<commit_message>
Removed loop unrolling extra exercise from slides.
</commit_message>
<xml_diff>
--- a/slides/advanced_part2.pptx
+++ b/slides/advanced_part2.pptx
@@ -895,11 +895,7 @@
             </a:r>
             <a:r>
               <a:rPr lang="en-GB" baseline="0" dirty="0" smtClean="0"/>
-              <a:t> to compiler to make it </a:t>
-            </a:r>
-            <a:r>
-              <a:rPr lang="en-GB" baseline="0" dirty="0" smtClean="0"/>
-              <a:t>potentially enable more optimizations.</a:t>
+              <a:t> to compiler to make it potentially enable more optimizations.</a:t>
             </a:r>
           </a:p>
           <a:p>
@@ -5336,11 +5332,7 @@
           <a:p>
             <a:r>
               <a:rPr lang="en-GB" dirty="0" smtClean="0"/>
-              <a:t>This enables the creation of libraries of compiled OpenCL functions, that can be linked to multiple program </a:t>
-            </a:r>
-            <a:r>
-              <a:rPr lang="en-GB" dirty="0" smtClean="0"/>
-              <a:t>objects</a:t>
+              <a:t>This enables the creation of libraries of compiled OpenCL functions, that can be linked to multiple program objects</a:t>
             </a:r>
           </a:p>
           <a:p>
@@ -5348,7 +5340,6 @@
               <a:rPr lang="en-GB" dirty="0" smtClean="0"/>
               <a:t>Can improve program build times, by allowing code shared across multiple programs to be extracted into a common library</a:t>
             </a:r>
-            <a:endParaRPr lang="en-GB" dirty="0" smtClean="0"/>
           </a:p>
         </p:txBody>
       </p:sp>
@@ -5981,57 +5972,41 @@
             </a:pPr>
             <a:r>
               <a:rPr lang="en-GB" dirty="0" smtClean="0"/>
-              <a:t>For example, NVIDIA </a:t>
+              <a:t>For example, NVIDIA provide the </a:t>
+            </a:r>
+            <a:r>
+              <a:rPr lang="en-GB" b="1" dirty="0" smtClean="0">
+                <a:solidFill>
+                  <a:srgbClr val="3366FF"/>
+                </a:solidFill>
+                <a:latin typeface="Courier New"/>
+                <a:cs typeface="Courier New"/>
+              </a:rPr>
+              <a:t>–cl-</a:t>
+            </a:r>
+            <a:r>
+              <a:rPr lang="en-GB" b="1" dirty="0" err="1" smtClean="0">
+                <a:solidFill>
+                  <a:srgbClr val="3366FF"/>
+                </a:solidFill>
+                <a:latin typeface="Courier New"/>
+                <a:cs typeface="Courier New"/>
+              </a:rPr>
+              <a:t>nv</a:t>
+            </a:r>
+            <a:r>
+              <a:rPr lang="en-GB" b="1" dirty="0" smtClean="0">
+                <a:solidFill>
+                  <a:srgbClr val="3366FF"/>
+                </a:solidFill>
+                <a:latin typeface="Courier New"/>
+                <a:cs typeface="Courier New"/>
+              </a:rPr>
+              <a:t>-arch</a:t>
             </a:r>
             <a:r>
               <a:rPr lang="en-GB" dirty="0" smtClean="0"/>
-              <a:t>provide the </a:t>
-            </a:r>
-            <a:r>
-              <a:rPr lang="en-GB" b="1" dirty="0" smtClean="0">
-                <a:solidFill>
-                  <a:srgbClr val="3366FF"/>
-                </a:solidFill>
-                <a:latin typeface="Courier New"/>
-                <a:cs typeface="Courier New"/>
-              </a:rPr>
-              <a:t>–cl-</a:t>
-            </a:r>
-            <a:r>
-              <a:rPr lang="en-GB" b="1" dirty="0" err="1" smtClean="0">
-                <a:solidFill>
-                  <a:srgbClr val="3366FF"/>
-                </a:solidFill>
-                <a:latin typeface="Courier New"/>
-                <a:cs typeface="Courier New"/>
-              </a:rPr>
-              <a:t>nv</a:t>
-            </a:r>
-            <a:r>
-              <a:rPr lang="en-GB" b="1" dirty="0" smtClean="0">
-                <a:solidFill>
-                  <a:srgbClr val="3366FF"/>
-                </a:solidFill>
-                <a:latin typeface="Courier New"/>
-                <a:cs typeface="Courier New"/>
-              </a:rPr>
-              <a:t>-arch</a:t>
-            </a:r>
-            <a:r>
-              <a:rPr lang="en-GB" dirty="0" smtClean="0"/>
-              <a:t> </a:t>
-            </a:r>
-            <a:r>
-              <a:rPr lang="en-GB" dirty="0" smtClean="0"/>
-              <a:t>flag to specify which </a:t>
-            </a:r>
-            <a:r>
-              <a:rPr lang="en-GB" dirty="0" smtClean="0"/>
-              <a:t>GPU architecture </a:t>
-            </a:r>
-            <a:r>
-              <a:rPr lang="en-GB" dirty="0" smtClean="0"/>
-              <a:t>should be targeted, and </a:t>
+              <a:t> flag to specify which GPU architecture should be targeted, and </a:t>
             </a:r>
             <a:r>
               <a:rPr lang="en-GB" b="1" dirty="0" smtClean="0">
@@ -6239,39 +6214,7 @@
             </a:pPr>
             <a:r>
               <a:rPr lang="en-GB" dirty="0" smtClean="0"/>
-              <a:t>Can </a:t>
-            </a:r>
-            <a:r>
-              <a:rPr lang="en-GB" dirty="0" smtClean="0"/>
-              <a:t>use an attribute </a:t>
-            </a:r>
-            <a:r>
-              <a:rPr lang="en-GB" dirty="0" smtClean="0"/>
-              <a:t>to </a:t>
-            </a:r>
-            <a:r>
-              <a:rPr lang="en-GB" dirty="0" smtClean="0"/>
-              <a:t>inform the </a:t>
-            </a:r>
-            <a:r>
-              <a:rPr lang="en-GB" dirty="0" smtClean="0"/>
-              <a:t>compiler </a:t>
-            </a:r>
-            <a:r>
-              <a:rPr lang="en-GB" dirty="0" smtClean="0"/>
-              <a:t>of the work-group size that you intend to </a:t>
-            </a:r>
-            <a:r>
-              <a:rPr lang="en-GB" dirty="0" smtClean="0"/>
-              <a:t>launch </a:t>
-            </a:r>
-            <a:r>
-              <a:rPr lang="en-GB" dirty="0" smtClean="0"/>
-              <a:t>kernels</a:t>
-            </a:r>
-            <a:r>
-              <a:rPr lang="en-GB" dirty="0" smtClean="0"/>
-              <a:t> with:</a:t>
+              <a:t>Can use an attribute to inform the compiler of the work-group size that you intend to launch kernels with:</a:t>
             </a:r>
           </a:p>
           <a:p>
@@ -6311,13 +6254,6 @@
               </a:rPr>
               <a:t>(x, y, z)))</a:t>
             </a:r>
-            <a:endParaRPr lang="en-GB" sz="2200" b="1" dirty="0" smtClean="0">
-              <a:solidFill>
-                <a:srgbClr val="3366FF"/>
-              </a:solidFill>
-              <a:latin typeface="Courier New"/>
-              <a:cs typeface="Courier New"/>
-            </a:endParaRPr>
           </a:p>
           <a:p>
             <a:pPr>
@@ -6363,25 +6299,8 @@
             </a:r>
             <a:r>
               <a:rPr lang="en-GB" dirty="0" smtClean="0"/>
-              <a:t>keywords for </a:t>
-            </a:r>
-            <a:r>
-              <a:rPr lang="en-GB" dirty="0" smtClean="0"/>
-              <a:t>kernel arguments</a:t>
-            </a:r>
-            <a:r>
-              <a:rPr lang="en-GB" dirty="0" smtClean="0"/>
-              <a:t> </a:t>
-            </a:r>
-            <a:r>
-              <a:rPr lang="en-GB" dirty="0" smtClean="0"/>
-              <a:t>where appropriate to make sure the compiler can optimise </a:t>
-            </a:r>
-            <a:r>
-              <a:rPr lang="en-GB" dirty="0" smtClean="0"/>
-              <a:t>memory accesses</a:t>
-            </a:r>
-            <a:endParaRPr lang="en-GB" dirty="0" smtClean="0"/>
+              <a:t>keywords for kernel arguments where appropriate to make sure the compiler can optimise memory accesses</a:t>
+            </a:r>
           </a:p>
         </p:txBody>
       </p:sp>
@@ -9047,15 +8966,7 @@
           <a:p>
             <a:r>
               <a:rPr lang="en-GB" dirty="0" smtClean="0"/>
-              <a:t>A fully </a:t>
-            </a:r>
-            <a:r>
-              <a:rPr lang="en-GB" dirty="0" smtClean="0"/>
-              <a:t>working </a:t>
-            </a:r>
-            <a:r>
-              <a:rPr lang="en-GB" dirty="0" smtClean="0"/>
-              <a:t>implementation of this code is provided as a starting point</a:t>
+              <a:t>A fully working implementation of this code is provided as a starting point</a:t>
             </a:r>
             <a:endParaRPr lang="en-GB" dirty="0"/>
           </a:p>
@@ -9154,7 +9065,7 @@
         </p:spPr>
         <p:txBody>
           <a:bodyPr>
-            <a:normAutofit fontScale="47500" lnSpcReduction="20000"/>
+            <a:normAutofit fontScale="55000" lnSpcReduction="20000"/>
           </a:bodyPr>
           <a:lstStyle/>
           <a:p>
@@ -9187,15 +9098,7 @@
             </a:pPr>
             <a:r>
               <a:rPr lang="en-GB" dirty="0" smtClean="0"/>
-              <a:t>Disclaimer: This </a:t>
-            </a:r>
-            <a:r>
-              <a:rPr lang="en-GB" dirty="0" smtClean="0"/>
-              <a:t>might not help </a:t>
-            </a:r>
-            <a:r>
-              <a:rPr lang="en-GB" dirty="0" smtClean="0"/>
-              <a:t>for every parameter</a:t>
+              <a:t>Disclaimer: This might not help for every parameter</a:t>
             </a:r>
           </a:p>
           <a:p>
@@ -9210,15 +9113,7 @@
             </a:r>
             <a:r>
               <a:rPr lang="en-GB" dirty="0" smtClean="0"/>
-              <a:t>: This </a:t>
-            </a:r>
-            <a:r>
-              <a:rPr lang="en-GB" dirty="0" smtClean="0"/>
-              <a:t>might not help </a:t>
-            </a:r>
-            <a:r>
-              <a:rPr lang="en-GB" dirty="0" smtClean="0"/>
-              <a:t>on every device – try it on a few!</a:t>
+              <a:t>: This might not help on every device – try it on a few!</a:t>
             </a:r>
           </a:p>
           <a:p>
@@ -9294,59 +9189,12 @@
               </a:lnSpc>
             </a:pPr>
             <a:r>
+              <a:rPr lang="en-GB" smtClean="0"/>
+              <a:t>Get </a:t>
+            </a:r>
+            <a:r>
               <a:rPr lang="en-GB" dirty="0" smtClean="0"/>
-              <a:t>Add </a:t>
-            </a:r>
-            <a:r>
-              <a:rPr lang="en-GB" dirty="0" smtClean="0"/>
-              <a:t>a command-line argument (e.g. </a:t>
-            </a:r>
-            <a:r>
-              <a:rPr lang="en-GB" b="1" dirty="0" smtClean="0">
-                <a:solidFill>
-                  <a:srgbClr val="3366FF"/>
-                </a:solidFill>
-                <a:latin typeface="Courier New"/>
-                <a:cs typeface="Courier New"/>
-              </a:rPr>
-              <a:t>--unroll</a:t>
-            </a:r>
-            <a:r>
-              <a:rPr lang="en-GB" dirty="0" smtClean="0"/>
-              <a:t>) to dynamically control the amount of unrolling inside the kernel (replacing the static </a:t>
-            </a:r>
-            <a:r>
-              <a:rPr lang="en-GB" b="1" dirty="0" smtClean="0">
-                <a:solidFill>
-                  <a:srgbClr val="3366FF"/>
-                </a:solidFill>
-                <a:latin typeface="Courier New"/>
-                <a:cs typeface="Courier New"/>
-              </a:rPr>
-              <a:t>UNROLL_FACTOR</a:t>
-            </a:r>
-            <a:r>
-              <a:rPr lang="en-GB" dirty="0" smtClean="0">
-                <a:solidFill>
-                  <a:srgbClr val="3366FF"/>
-                </a:solidFill>
-              </a:rPr>
-              <a:t> </a:t>
-            </a:r>
-            <a:r>
-              <a:rPr lang="en-GB" dirty="0" smtClean="0"/>
-              <a:t>definition)</a:t>
-            </a:r>
-          </a:p>
-          <a:p>
-            <a:pPr>
-              <a:lnSpc>
-                <a:spcPct val="120000"/>
-              </a:lnSpc>
-            </a:pPr>
-            <a:r>
-              <a:rPr lang="en-GB" dirty="0" smtClean="0"/>
-              <a:t>Get the compiler to generate the assembly code and look through this, correlating it to your source code</a:t>
+              <a:t>the compiler to generate the assembly code and look through this, correlating it to your source code</a:t>
             </a:r>
             <a:endParaRPr lang="en-GB" dirty="0"/>
           </a:p>
@@ -10732,15 +10580,7 @@
           <a:p>
             <a:r>
               <a:rPr lang="en-GB" dirty="0" smtClean="0"/>
-              <a:t>Not yet supported by all vendors, but SPIR-V is now </a:t>
-            </a:r>
-            <a:r>
-              <a:rPr lang="en-GB" dirty="0" smtClean="0"/>
-              <a:t>core* </a:t>
-            </a:r>
-            <a:r>
-              <a:rPr lang="en-GB" dirty="0" smtClean="0"/>
-              <a:t>in OpenCL 2.1</a:t>
+              <a:t>Not yet supported by all vendors, but SPIR-V is now core* in OpenCL 2.1</a:t>
             </a:r>
             <a:endParaRPr lang="en-GB" dirty="0"/>
           </a:p>

</xml_diff>

<commit_message>
Very minor tweak to clarify metaprogramming example.
</commit_message>
<xml_diff>
--- a/slides/advanced_part2.pptx
+++ b/slides/advanced_part2.pptx
@@ -5338,7 +5338,15 @@
           <a:p>
             <a:r>
               <a:rPr lang="en-GB" dirty="0" smtClean="0"/>
-              <a:t>Can improve program build times, by allowing code shared across multiple programs to be extracted into a common library</a:t>
+              <a:t>Can improve program build times, by allowing </a:t>
+            </a:r>
+            <a:r>
+              <a:rPr lang="en-GB" dirty="0" smtClean="0"/>
+              <a:t>code shared </a:t>
+            </a:r>
+            <a:r>
+              <a:rPr lang="en-GB" dirty="0" smtClean="0"/>
+              <a:t>across multiple programs to be extracted into a common library</a:t>
             </a:r>
           </a:p>
         </p:txBody>
@@ -7735,7 +7743,27 @@
                 <a:latin typeface="Courier New"/>
                 <a:cs typeface="Courier New"/>
               </a:rPr>
-              <a:t>       &lt;&lt; factor; </a:t>
+              <a:t>       &lt;&lt; </a:t>
+            </a:r>
+            <a:r>
+              <a:rPr lang="en-GB" b="1" dirty="0" err="1" smtClean="0">
+                <a:solidFill>
+                  <a:srgbClr val="3366FF"/>
+                </a:solidFill>
+                <a:latin typeface="Courier New"/>
+                <a:cs typeface="Courier New"/>
+              </a:rPr>
+              <a:t>userFactor</a:t>
+            </a:r>
+            <a:r>
+              <a:rPr lang="en-GB" b="1" dirty="0" smtClean="0">
+                <a:solidFill>
+                  <a:srgbClr val="3366FF"/>
+                </a:solidFill>
+                <a:latin typeface="Courier New"/>
+                <a:cs typeface="Courier New"/>
+              </a:rPr>
+              <a:t>; </a:t>
             </a:r>
             <a:r>
               <a:rPr lang="en-GB" b="1" dirty="0" err="1" smtClean="0">
@@ -8892,7 +8920,9 @@
         </p:nvSpPr>
         <p:spPr/>
         <p:txBody>
-          <a:bodyPr/>
+          <a:bodyPr>
+            <a:normAutofit/>
+          </a:bodyPr>
           <a:lstStyle/>
           <a:p>
             <a:r>
@@ -8905,7 +8935,11 @@
             </a:r>
             <a:r>
               <a:rPr lang="en-GB" dirty="0" smtClean="0"/>
-              <a:t>: optimisations</a:t>
+              <a:t>: </a:t>
+            </a:r>
+            <a:r>
+              <a:rPr lang="en-GB" dirty="0" smtClean="0"/>
+              <a:t>kernel compilation</a:t>
             </a:r>
             <a:endParaRPr lang="en-GB" dirty="0"/>
           </a:p>
@@ -9041,7 +9075,11 @@
             </a:r>
             <a:r>
               <a:rPr lang="en-GB" dirty="0" smtClean="0"/>
-              <a:t>: optimisations</a:t>
+              <a:t>: </a:t>
+            </a:r>
+            <a:r>
+              <a:rPr lang="en-GB" dirty="0" smtClean="0"/>
+              <a:t>kernel compilation</a:t>
             </a:r>
             <a:endParaRPr lang="en-GB" dirty="0"/>
           </a:p>
@@ -9189,12 +9227,8 @@
               </a:lnSpc>
             </a:pPr>
             <a:r>
-              <a:rPr lang="en-GB" smtClean="0"/>
-              <a:t>Get </a:t>
-            </a:r>
-            <a:r>
               <a:rPr lang="en-GB" dirty="0" smtClean="0"/>
-              <a:t>the compiler to generate the assembly code and look through this, correlating it to your source code</a:t>
+              <a:t>Get the compiler to generate the assembly code and look through this, correlating it to your source code</a:t>
             </a:r>
             <a:endParaRPr lang="en-GB" dirty="0"/>
           </a:p>

</xml_diff>

<commit_message>
Add note about --noverify to slides
</commit_message>
<xml_diff>
--- a/slides/advanced_part2.pptx
+++ b/slides/advanced_part2.pptx
@@ -213,7 +213,7 @@
           <a:p>
             <a:fld id="{7FB74D45-CC88-7D46-9D48-9989C6A85D58}" type="datetimeFigureOut">
               <a:rPr lang="en-US" smtClean="0"/>
-              <a:t>07/04/16</a:t>
+              <a:t>08/04/16</a:t>
             </a:fld>
             <a:endParaRPr lang="en-US"/>
           </a:p>
@@ -1228,7 +1228,7 @@
           <a:p>
             <a:fld id="{D735EA19-98D7-5F47-83EC-D97C4239F8D5}" type="datetimeFigureOut">
               <a:rPr lang="en-US" smtClean="0"/>
-              <a:t>07/04/16</a:t>
+              <a:t>08/04/16</a:t>
             </a:fld>
             <a:endParaRPr lang="en-GB"/>
           </a:p>
@@ -1398,7 +1398,7 @@
           <a:p>
             <a:fld id="{D735EA19-98D7-5F47-83EC-D97C4239F8D5}" type="datetimeFigureOut">
               <a:rPr lang="en-US" smtClean="0"/>
-              <a:t>07/04/16</a:t>
+              <a:t>08/04/16</a:t>
             </a:fld>
             <a:endParaRPr lang="en-GB"/>
           </a:p>
@@ -1578,7 +1578,7 @@
           <a:p>
             <a:fld id="{D735EA19-98D7-5F47-83EC-D97C4239F8D5}" type="datetimeFigureOut">
               <a:rPr lang="en-US" smtClean="0"/>
-              <a:t>07/04/16</a:t>
+              <a:t>08/04/16</a:t>
             </a:fld>
             <a:endParaRPr lang="en-GB"/>
           </a:p>
@@ -1748,7 +1748,7 @@
           <a:p>
             <a:fld id="{D735EA19-98D7-5F47-83EC-D97C4239F8D5}" type="datetimeFigureOut">
               <a:rPr lang="en-US" smtClean="0"/>
-              <a:t>07/04/16</a:t>
+              <a:t>08/04/16</a:t>
             </a:fld>
             <a:endParaRPr lang="en-GB"/>
           </a:p>
@@ -1994,7 +1994,7 @@
           <a:p>
             <a:fld id="{D735EA19-98D7-5F47-83EC-D97C4239F8D5}" type="datetimeFigureOut">
               <a:rPr lang="en-US" smtClean="0"/>
-              <a:t>07/04/16</a:t>
+              <a:t>08/04/16</a:t>
             </a:fld>
             <a:endParaRPr lang="en-GB"/>
           </a:p>
@@ -2282,7 +2282,7 @@
           <a:p>
             <a:fld id="{D735EA19-98D7-5F47-83EC-D97C4239F8D5}" type="datetimeFigureOut">
               <a:rPr lang="en-US" smtClean="0"/>
-              <a:t>07/04/16</a:t>
+              <a:t>08/04/16</a:t>
             </a:fld>
             <a:endParaRPr lang="en-GB"/>
           </a:p>
@@ -2704,7 +2704,7 @@
           <a:p>
             <a:fld id="{D735EA19-98D7-5F47-83EC-D97C4239F8D5}" type="datetimeFigureOut">
               <a:rPr lang="en-US" smtClean="0"/>
-              <a:t>07/04/16</a:t>
+              <a:t>08/04/16</a:t>
             </a:fld>
             <a:endParaRPr lang="en-GB"/>
           </a:p>
@@ -2822,7 +2822,7 @@
           <a:p>
             <a:fld id="{D735EA19-98D7-5F47-83EC-D97C4239F8D5}" type="datetimeFigureOut">
               <a:rPr lang="en-US" smtClean="0"/>
-              <a:t>07/04/16</a:t>
+              <a:t>08/04/16</a:t>
             </a:fld>
             <a:endParaRPr lang="en-GB"/>
           </a:p>
@@ -2917,7 +2917,7 @@
           <a:p>
             <a:fld id="{D735EA19-98D7-5F47-83EC-D97C4239F8D5}" type="datetimeFigureOut">
               <a:rPr lang="en-US" smtClean="0"/>
-              <a:t>07/04/16</a:t>
+              <a:t>08/04/16</a:t>
             </a:fld>
             <a:endParaRPr lang="en-GB"/>
           </a:p>
@@ -3194,7 +3194,7 @@
           <a:p>
             <a:fld id="{D735EA19-98D7-5F47-83EC-D97C4239F8D5}" type="datetimeFigureOut">
               <a:rPr lang="en-US" smtClean="0"/>
-              <a:t>07/04/16</a:t>
+              <a:t>08/04/16</a:t>
             </a:fld>
             <a:endParaRPr lang="en-GB"/>
           </a:p>
@@ -3447,7 +3447,7 @@
           <a:p>
             <a:fld id="{D735EA19-98D7-5F47-83EC-D97C4239F8D5}" type="datetimeFigureOut">
               <a:rPr lang="en-US" smtClean="0"/>
-              <a:t>07/04/16</a:t>
+              <a:t>08/04/16</a:t>
             </a:fld>
             <a:endParaRPr lang="en-GB"/>
           </a:p>
@@ -3660,7 +3660,7 @@
           <a:p>
             <a:fld id="{D735EA19-98D7-5F47-83EC-D97C4239F8D5}" type="datetimeFigureOut">
               <a:rPr lang="en-US" smtClean="0"/>
-              <a:t>07/04/16</a:t>
+              <a:t>08/04/16</a:t>
             </a:fld>
             <a:endParaRPr lang="en-GB"/>
           </a:p>
@@ -4155,11 +4155,7 @@
           <a:p>
             <a:r>
               <a:rPr lang="en-GB" dirty="0" smtClean="0"/>
-              <a:t>Portable </a:t>
-            </a:r>
-            <a:r>
-              <a:rPr lang="en-GB" dirty="0" smtClean="0"/>
-              <a:t>Binaries</a:t>
+              <a:t>Portable Binaries</a:t>
             </a:r>
             <a:endParaRPr lang="en-GB" dirty="0"/>
           </a:p>
@@ -4244,11 +4240,7 @@
           <a:p>
             <a:r>
               <a:rPr lang="en-GB" dirty="0" smtClean="0"/>
-              <a:t>Not yet supported by all vendors, but SPIR-V is now </a:t>
-            </a:r>
-            <a:r>
-              <a:rPr lang="en-GB" dirty="0" smtClean="0"/>
-              <a:t>core from OpenCL 2.1 onwards</a:t>
+              <a:t>Not yet supported by all vendors, but SPIR-V is now core from OpenCL 2.1 onwards</a:t>
             </a:r>
           </a:p>
           <a:p>
@@ -4401,15 +4393,7 @@
           <a:p>
             <a:r>
               <a:rPr lang="en-GB" dirty="0" smtClean="0"/>
-              <a:t>It c</a:t>
-            </a:r>
-            <a:r>
-              <a:rPr lang="en-GB" dirty="0" smtClean="0"/>
-              <a:t>an </a:t>
-            </a:r>
-            <a:r>
-              <a:rPr lang="en-GB" dirty="0" smtClean="0"/>
-              <a:t>be useful to inspect compiler output to see if the compiler is doing what you think it’s doing</a:t>
+              <a:t>It can be useful to inspect compiler output to see if the compiler is doing what you think it’s doing</a:t>
             </a:r>
           </a:p>
           <a:p>
@@ -6143,15 +6127,7 @@
           <a:p>
             <a:r>
               <a:rPr lang="en-GB" dirty="0" smtClean="0"/>
-              <a:t>We can exploit </a:t>
-            </a:r>
-            <a:r>
-              <a:rPr lang="en-GB" dirty="0" smtClean="0"/>
-              <a:t>runtime compilation </a:t>
-            </a:r>
-            <a:r>
-              <a:rPr lang="en-GB" dirty="0" smtClean="0"/>
-              <a:t>to embed values that are only known at runtime into kernels as compile-time constants</a:t>
+              <a:t>We can exploit runtime compilation to embed values that are only known at runtime into kernels as compile-time constants</a:t>
             </a:r>
           </a:p>
           <a:p>
@@ -9044,11 +9020,7 @@
           <a:p>
             <a:r>
               <a:rPr lang="en-GB" dirty="0" smtClean="0"/>
-              <a:t>Exercise: </a:t>
-            </a:r>
-            <a:r>
-              <a:rPr lang="en-GB" dirty="0" smtClean="0"/>
-              <a:t>kernel compilation</a:t>
+              <a:t>Exercise: kernel compilation</a:t>
             </a:r>
             <a:endParaRPr lang="en-GB" dirty="0"/>
           </a:p>
@@ -9105,22 +9077,23 @@
             </a:pPr>
             <a:r>
               <a:rPr lang="en-GB" dirty="0" smtClean="0"/>
-              <a:t>Disclaimer: This might not help for every parameter</a:t>
-            </a:r>
-          </a:p>
-          <a:p>
-            <a:pPr lvl="1">
-              <a:lnSpc>
-                <a:spcPct val="120000"/>
-              </a:lnSpc>
-            </a:pPr>
-            <a:r>
-              <a:rPr lang="en-GB" dirty="0"/>
-              <a:t>Disclaimer</a:t>
+              <a:t>Disclaimer: This might not help for every </a:t>
             </a:r>
             <a:r>
               <a:rPr lang="en-GB" dirty="0" smtClean="0"/>
-              <a:t>: This might not help on every device – try it on a few!</a:t>
+              <a:t>parameter or on </a:t>
+            </a:r>
+            <a:r>
+              <a:rPr lang="en-GB" dirty="0" smtClean="0"/>
+              <a:t>every device – try it </a:t>
+            </a:r>
+            <a:r>
+              <a:rPr lang="en-GB" dirty="0" smtClean="0"/>
+              <a:t>with a </a:t>
+            </a:r>
+            <a:r>
+              <a:rPr lang="en-GB" dirty="0" smtClean="0"/>
+              <a:t>few!</a:t>
             </a:r>
           </a:p>
           <a:p>
@@ -9137,6 +9110,52 @@
               <a:rPr lang="en-GB" dirty="0" smtClean="0"/>
               <a:t>provided</a:t>
             </a:r>
+          </a:p>
+          <a:p>
+            <a:pPr>
+              <a:lnSpc>
+                <a:spcPct val="120000"/>
+              </a:lnSpc>
+            </a:pPr>
+            <a:r>
+              <a:rPr lang="en-GB" dirty="0" smtClean="0"/>
+              <a:t>Tip: If verification is too slow, use </a:t>
+            </a:r>
+            <a:r>
+              <a:rPr lang="en-GB" b="1" dirty="0" smtClean="0">
+                <a:solidFill>
+                  <a:srgbClr val="3366FF"/>
+                </a:solidFill>
+                <a:latin typeface="Courier New"/>
+                <a:cs typeface="Courier New"/>
+              </a:rPr>
+              <a:t>--</a:t>
+            </a:r>
+            <a:r>
+              <a:rPr lang="en-GB" b="1" dirty="0" err="1" smtClean="0">
+                <a:solidFill>
+                  <a:srgbClr val="3366FF"/>
+                </a:solidFill>
+                <a:latin typeface="Courier New"/>
+                <a:cs typeface="Courier New"/>
+              </a:rPr>
+              <a:t>noverify</a:t>
+            </a:r>
+            <a:r>
+              <a:rPr lang="en-GB" dirty="0" smtClean="0"/>
+              <a:t> flag or set </a:t>
+            </a:r>
+            <a:r>
+              <a:rPr lang="en-GB" b="1" dirty="0" smtClean="0">
+                <a:solidFill>
+                  <a:srgbClr val="3366FF"/>
+                </a:solidFill>
+                <a:latin typeface="Courier New"/>
+                <a:cs typeface="Courier New"/>
+              </a:rPr>
+              <a:t>verify = false</a:t>
+            </a:r>
+            <a:endParaRPr lang="en-GB" dirty="0"/>
           </a:p>
           <a:p>
             <a:pPr marL="0" indent="0">
@@ -10757,15 +10776,7 @@
             </a:r>
             <a:r>
               <a:rPr lang="en-GB" dirty="0" smtClean="0"/>
-              <a:t> compilation </a:t>
-            </a:r>
-            <a:r>
-              <a:rPr lang="en-GB" dirty="0" smtClean="0"/>
-              <a:t>in order to achieve </a:t>
-            </a:r>
-            <a:r>
-              <a:rPr lang="en-GB" dirty="0" smtClean="0"/>
-              <a:t>portability</a:t>
+              <a:t> compilation in order to achieve portability</a:t>
             </a:r>
           </a:p>
           <a:p>
@@ -10774,7 +10785,6 @@
               <a:rPr lang="en-GB" dirty="0" smtClean="0"/>
               <a:t>Also called runtime or JIT compilation</a:t>
             </a:r>
-            <a:endParaRPr lang="en-GB" dirty="0" smtClean="0"/>
           </a:p>
           <a:p>
             <a:r>

</xml_diff>

<commit_message>
Added bilateral results slide
Added a final slide on the results of each bilateral optimisation
(meta, opt, images).

Other minor improvements.
</commit_message>
<xml_diff>
--- a/slides/advanced_part2.pptx
+++ b/slides/advanced_part2.pptx
@@ -5,7 +5,7 @@
     <p:sldMasterId id="2147483648" r:id="rId1"/>
   </p:sldMasterIdLst>
   <p:notesMasterIdLst>
-    <p:notesMasterId r:id="rId24"/>
+    <p:notesMasterId r:id="rId25"/>
   </p:notesMasterIdLst>
   <p:sldIdLst>
     <p:sldId id="257" r:id="rId2"/>
@@ -30,6 +30,7 @@
     <p:sldId id="275" r:id="rId21"/>
     <p:sldId id="279" r:id="rId22"/>
     <p:sldId id="277" r:id="rId23"/>
+    <p:sldId id="280" r:id="rId24"/>
   </p:sldIdLst>
   <p:sldSz cx="9144000" cy="6858000" type="screen4x3"/>
   <p:notesSz cx="6858000" cy="9144000"/>
@@ -213,7 +214,7 @@
           <a:p>
             <a:fld id="{7FB74D45-CC88-7D46-9D48-9989C6A85D58}" type="datetimeFigureOut">
               <a:rPr lang="en-US" smtClean="0"/>
-              <a:t>08/04/16</a:t>
+              <a:t>14/04/16</a:t>
             </a:fld>
             <a:endParaRPr lang="en-US"/>
           </a:p>
@@ -1228,7 +1229,7 @@
           <a:p>
             <a:fld id="{D735EA19-98D7-5F47-83EC-D97C4239F8D5}" type="datetimeFigureOut">
               <a:rPr lang="en-US" smtClean="0"/>
-              <a:t>08/04/16</a:t>
+              <a:t>14/04/16</a:t>
             </a:fld>
             <a:endParaRPr lang="en-GB"/>
           </a:p>
@@ -1398,7 +1399,7 @@
           <a:p>
             <a:fld id="{D735EA19-98D7-5F47-83EC-D97C4239F8D5}" type="datetimeFigureOut">
               <a:rPr lang="en-US" smtClean="0"/>
-              <a:t>08/04/16</a:t>
+              <a:t>14/04/16</a:t>
             </a:fld>
             <a:endParaRPr lang="en-GB"/>
           </a:p>
@@ -1578,7 +1579,7 @@
           <a:p>
             <a:fld id="{D735EA19-98D7-5F47-83EC-D97C4239F8D5}" type="datetimeFigureOut">
               <a:rPr lang="en-US" smtClean="0"/>
-              <a:t>08/04/16</a:t>
+              <a:t>14/04/16</a:t>
             </a:fld>
             <a:endParaRPr lang="en-GB"/>
           </a:p>
@@ -1748,7 +1749,7 @@
           <a:p>
             <a:fld id="{D735EA19-98D7-5F47-83EC-D97C4239F8D5}" type="datetimeFigureOut">
               <a:rPr lang="en-US" smtClean="0"/>
-              <a:t>08/04/16</a:t>
+              <a:t>14/04/16</a:t>
             </a:fld>
             <a:endParaRPr lang="en-GB"/>
           </a:p>
@@ -1994,7 +1995,7 @@
           <a:p>
             <a:fld id="{D735EA19-98D7-5F47-83EC-D97C4239F8D5}" type="datetimeFigureOut">
               <a:rPr lang="en-US" smtClean="0"/>
-              <a:t>08/04/16</a:t>
+              <a:t>14/04/16</a:t>
             </a:fld>
             <a:endParaRPr lang="en-GB"/>
           </a:p>
@@ -2282,7 +2283,7 @@
           <a:p>
             <a:fld id="{D735EA19-98D7-5F47-83EC-D97C4239F8D5}" type="datetimeFigureOut">
               <a:rPr lang="en-US" smtClean="0"/>
-              <a:t>08/04/16</a:t>
+              <a:t>14/04/16</a:t>
             </a:fld>
             <a:endParaRPr lang="en-GB"/>
           </a:p>
@@ -2704,7 +2705,7 @@
           <a:p>
             <a:fld id="{D735EA19-98D7-5F47-83EC-D97C4239F8D5}" type="datetimeFigureOut">
               <a:rPr lang="en-US" smtClean="0"/>
-              <a:t>08/04/16</a:t>
+              <a:t>14/04/16</a:t>
             </a:fld>
             <a:endParaRPr lang="en-GB"/>
           </a:p>
@@ -2822,7 +2823,7 @@
           <a:p>
             <a:fld id="{D735EA19-98D7-5F47-83EC-D97C4239F8D5}" type="datetimeFigureOut">
               <a:rPr lang="en-US" smtClean="0"/>
-              <a:t>08/04/16</a:t>
+              <a:t>14/04/16</a:t>
             </a:fld>
             <a:endParaRPr lang="en-GB"/>
           </a:p>
@@ -2917,7 +2918,7 @@
           <a:p>
             <a:fld id="{D735EA19-98D7-5F47-83EC-D97C4239F8D5}" type="datetimeFigureOut">
               <a:rPr lang="en-US" smtClean="0"/>
-              <a:t>08/04/16</a:t>
+              <a:t>14/04/16</a:t>
             </a:fld>
             <a:endParaRPr lang="en-GB"/>
           </a:p>
@@ -3194,7 +3195,7 @@
           <a:p>
             <a:fld id="{D735EA19-98D7-5F47-83EC-D97C4239F8D5}" type="datetimeFigureOut">
               <a:rPr lang="en-US" smtClean="0"/>
-              <a:t>08/04/16</a:t>
+              <a:t>14/04/16</a:t>
             </a:fld>
             <a:endParaRPr lang="en-GB"/>
           </a:p>
@@ -3447,7 +3448,7 @@
           <a:p>
             <a:fld id="{D735EA19-98D7-5F47-83EC-D97C4239F8D5}" type="datetimeFigureOut">
               <a:rPr lang="en-US" smtClean="0"/>
-              <a:t>08/04/16</a:t>
+              <a:t>14/04/16</a:t>
             </a:fld>
             <a:endParaRPr lang="en-GB"/>
           </a:p>
@@ -3660,7 +3661,7 @@
           <a:p>
             <a:fld id="{D735EA19-98D7-5F47-83EC-D97C4239F8D5}" type="datetimeFigureOut">
               <a:rPr lang="en-US" smtClean="0"/>
-              <a:t>08/04/16</a:t>
+              <a:t>14/04/16</a:t>
             </a:fld>
             <a:endParaRPr lang="en-GB"/>
           </a:p>
@@ -8812,10 +8813,15 @@
             <p:ph idx="1"/>
           </p:nvPr>
         </p:nvSpPr>
-        <p:spPr/>
+        <p:spPr>
+          <a:xfrm>
+            <a:off x="457200" y="1600200"/>
+            <a:ext cx="8229600" cy="5257800"/>
+          </a:xfrm>
+        </p:spPr>
         <p:txBody>
           <a:bodyPr>
-            <a:normAutofit fontScale="85000" lnSpcReduction="20000"/>
+            <a:normAutofit fontScale="85000" lnSpcReduction="10000"/>
           </a:bodyPr>
           <a:lstStyle/>
           <a:p>
@@ -8896,7 +8902,15 @@
             </a:r>
             <a:r>
               <a:rPr lang="en-GB" dirty="0" smtClean="0"/>
-              <a:t> Requires SDL2 library</a:t>
+              <a:t> Requires </a:t>
+            </a:r>
+            <a:r>
+              <a:rPr lang="en-GB" dirty="0" smtClean="0"/>
+              <a:t>the SDL2 </a:t>
+            </a:r>
+            <a:r>
+              <a:rPr lang="en-GB" dirty="0" smtClean="0"/>
+              <a:t>library</a:t>
             </a:r>
           </a:p>
           <a:p>
@@ -8942,8 +8956,32 @@
             <a:pPr lvl="1"/>
             <a:r>
               <a:rPr lang="en-GB" dirty="0" smtClean="0"/>
-              <a:t>OS X: Download and install SDL2 development framework</a:t>
-            </a:r>
+              <a:t>OS X: Download and install SDL2 development </a:t>
+            </a:r>
+            <a:r>
+              <a:rPr lang="en-GB" dirty="0" smtClean="0"/>
+              <a:t>framework</a:t>
+            </a:r>
+          </a:p>
+          <a:p>
+            <a:pPr lvl="2"/>
+            <a:r>
+              <a:rPr lang="en-GB" dirty="0">
+                <a:hlinkClick r:id="rId2"/>
+              </a:rPr>
+              <a:t>https://www.libsdl.org/download-2.0.</a:t>
+            </a:r>
+            <a:r>
+              <a:rPr lang="en-GB" dirty="0" smtClean="0">
+                <a:hlinkClick r:id="rId2"/>
+              </a:rPr>
+              <a:t>php</a:t>
+            </a:r>
+            <a:r>
+              <a:rPr lang="en-GB" dirty="0" smtClean="0"/>
+              <a:t> </a:t>
+            </a:r>
+            <a:endParaRPr lang="en-GB" dirty="0" smtClean="0"/>
           </a:p>
           <a:p>
             <a:pPr lvl="1"/>
@@ -9038,8 +9076,8 @@
         </p:nvSpPr>
         <p:spPr>
           <a:xfrm>
-            <a:off x="457200" y="1628800"/>
-            <a:ext cx="8229600" cy="4781128"/>
+            <a:off x="457200" y="1417638"/>
+            <a:ext cx="8229600" cy="5440362"/>
           </a:xfrm>
         </p:spPr>
         <p:txBody>
@@ -9055,8 +9093,17 @@
             </a:pPr>
             <a:r>
               <a:rPr lang="en-GB" dirty="0" smtClean="0"/>
-              <a:t>Experiment with some OpenCL compiler options to improve performance</a:t>
-            </a:r>
+              <a:t>Find the starting code in e.g. ~/</a:t>
+            </a:r>
+            <a:r>
+              <a:rPr lang="en-GB" dirty="0" smtClean="0"/>
+              <a:t>IWOCL2016</a:t>
+            </a:r>
+            <a:r>
+              <a:rPr lang="en-GB" dirty="0"/>
+              <a:t>/solutions/Bilateral</a:t>
+            </a:r>
+            <a:endParaRPr lang="en-GB" dirty="0" smtClean="0"/>
           </a:p>
           <a:p>
             <a:pPr>
@@ -9066,6 +9113,21 @@
             </a:pPr>
             <a:r>
               <a:rPr lang="en-GB" dirty="0" smtClean="0"/>
+              <a:t>Experiment </a:t>
+            </a:r>
+            <a:r>
+              <a:rPr lang="en-GB" dirty="0" smtClean="0"/>
+              <a:t>with some OpenCL compiler options to improve performance</a:t>
+            </a:r>
+          </a:p>
+          <a:p>
+            <a:pPr>
+              <a:lnSpc>
+                <a:spcPct val="120000"/>
+              </a:lnSpc>
+            </a:pPr>
+            <a:r>
+              <a:rPr lang="en-GB" dirty="0" smtClean="0"/>
               <a:t>Try embedding some simulation parameters into the kernel as compile-time constants using OpenCL build options</a:t>
             </a:r>
           </a:p>
@@ -9077,23 +9139,7 @@
             </a:pPr>
             <a:r>
               <a:rPr lang="en-GB" dirty="0" smtClean="0"/>
-              <a:t>Disclaimer: This might not help for every </a:t>
-            </a:r>
-            <a:r>
-              <a:rPr lang="en-GB" dirty="0" smtClean="0"/>
-              <a:t>parameter or on </a:t>
-            </a:r>
-            <a:r>
-              <a:rPr lang="en-GB" dirty="0" smtClean="0"/>
-              <a:t>every device – try it </a:t>
-            </a:r>
-            <a:r>
-              <a:rPr lang="en-GB" dirty="0" smtClean="0"/>
-              <a:t>with a </a:t>
-            </a:r>
-            <a:r>
-              <a:rPr lang="en-GB" dirty="0" smtClean="0"/>
-              <a:t>few!</a:t>
+              <a:t>Disclaimer: This might not help for every parameter or on every device – try it with a few!</a:t>
             </a:r>
           </a:p>
           <a:p>
@@ -9239,6 +9285,253 @@
       </p:par>
     </p:tnLst>
   </p:timing>
+</p:sld>
+</file>
+
+<file path=ppt/slides/slide23.xml><?xml version="1.0" encoding="utf-8"?>
+<p:sld xmlns:a="http://schemas.openxmlformats.org/drawingml/2006/main" xmlns:r="http://schemas.openxmlformats.org/officeDocument/2006/relationships" xmlns:p="http://schemas.openxmlformats.org/presentationml/2006/main">
+  <p:cSld>
+    <p:spTree>
+      <p:nvGrpSpPr>
+        <p:cNvPr id="1" name=""/>
+        <p:cNvGrpSpPr/>
+        <p:nvPr/>
+      </p:nvGrpSpPr>
+      <p:grpSpPr>
+        <a:xfrm>
+          <a:off x="0" y="0"/>
+          <a:ext cx="0" cy="0"/>
+          <a:chOff x="0" y="0"/>
+          <a:chExt cx="0" cy="0"/>
+        </a:xfrm>
+      </p:grpSpPr>
+      <p:sp>
+        <p:nvSpPr>
+          <p:cNvPr id="2" name="Title 1"/>
+          <p:cNvSpPr>
+            <a:spLocks noGrp="1"/>
+          </p:cNvSpPr>
+          <p:nvPr>
+            <p:ph type="title"/>
+          </p:nvPr>
+        </p:nvSpPr>
+        <p:spPr/>
+        <p:txBody>
+          <a:bodyPr/>
+          <a:lstStyle/>
+          <a:p>
+            <a:r>
+              <a:rPr lang="en-GB" dirty="0"/>
+              <a:t>Exercise: kernel compilation</a:t>
+            </a:r>
+          </a:p>
+        </p:txBody>
+      </p:sp>
+      <p:sp>
+        <p:nvSpPr>
+          <p:cNvPr id="3" name="Content Placeholder 2"/>
+          <p:cNvSpPr>
+            <a:spLocks noGrp="1"/>
+          </p:cNvSpPr>
+          <p:nvPr>
+            <p:ph idx="1"/>
+          </p:nvPr>
+        </p:nvSpPr>
+        <p:spPr>
+          <a:xfrm>
+            <a:off x="457200" y="1417638"/>
+            <a:ext cx="8229600" cy="5440362"/>
+          </a:xfrm>
+        </p:spPr>
+        <p:txBody>
+          <a:bodyPr>
+            <a:normAutofit fontScale="77500" lnSpcReduction="20000"/>
+          </a:bodyPr>
+          <a:lstStyle/>
+          <a:p>
+            <a:pPr marL="0" indent="0">
+              <a:buNone/>
+            </a:pPr>
+            <a:r>
+              <a:rPr lang="en-GB" dirty="0" smtClean="0"/>
+              <a:t>Results from 3 different versions (meta programming, optimised and images) </a:t>
+            </a:r>
+            <a:r>
+              <a:rPr lang="en-GB" smtClean="0"/>
+              <a:t>on an Nvidia</a:t>
+            </a:r>
+            <a:r>
+              <a:rPr lang="en-GB" dirty="0" smtClean="0"/>
+              <a:t> K40:</a:t>
+            </a:r>
+          </a:p>
+          <a:p>
+            <a:pPr marL="0" indent="0">
+              <a:buNone/>
+            </a:pPr>
+            <a:endParaRPr lang="en-GB" dirty="0" smtClean="0"/>
+          </a:p>
+          <a:p>
+            <a:pPr marL="0" indent="0">
+              <a:buNone/>
+            </a:pPr>
+            <a:r>
+              <a:rPr lang="en-GB" dirty="0"/>
+              <a:t>Running reference...</a:t>
+            </a:r>
+          </a:p>
+          <a:p>
+            <a:pPr marL="0" indent="0">
+              <a:buNone/>
+            </a:pPr>
+            <a:r>
+              <a:rPr lang="en-GB" dirty="0"/>
+              <a:t>Reference took 7784.3ms (1 frame)</a:t>
+            </a:r>
+          </a:p>
+          <a:p>
+            <a:pPr marL="0" indent="0">
+              <a:buNone/>
+            </a:pPr>
+            <a:endParaRPr lang="en-GB" dirty="0" smtClean="0"/>
+          </a:p>
+          <a:p>
+            <a:pPr marL="0" indent="0">
+              <a:buNone/>
+            </a:pPr>
+            <a:r>
+              <a:rPr lang="en-GB" dirty="0"/>
+              <a:t>~/IWOCL2016/solutions/Bilateral$ </a:t>
+            </a:r>
+            <a:r>
+              <a:rPr lang="en-GB" b="1" dirty="0"/>
+              <a:t>./</a:t>
+            </a:r>
+            <a:r>
+              <a:rPr lang="en-GB" b="1" dirty="0" err="1"/>
+              <a:t>bilateral_meta</a:t>
+            </a:r>
+            <a:r>
+              <a:rPr lang="en-GB" b="1" dirty="0"/>
+              <a:t> </a:t>
+            </a:r>
+          </a:p>
+          <a:p>
+            <a:pPr marL="0" indent="0">
+              <a:buNone/>
+            </a:pPr>
+            <a:r>
+              <a:rPr lang="en-GB" dirty="0" smtClean="0"/>
+              <a:t>OpenCL </a:t>
+            </a:r>
+            <a:r>
+              <a:rPr lang="en-GB" dirty="0"/>
+              <a:t>took 357.9ms (11.2ms / frame</a:t>
+            </a:r>
+            <a:r>
+              <a:rPr lang="en-GB" dirty="0" smtClean="0"/>
+              <a:t>)</a:t>
+            </a:r>
+            <a:endParaRPr lang="en-GB" dirty="0"/>
+          </a:p>
+          <a:p>
+            <a:pPr marL="0" indent="0">
+              <a:buNone/>
+            </a:pPr>
+            <a:endParaRPr lang="en-GB" dirty="0"/>
+          </a:p>
+          <a:p>
+            <a:pPr marL="0" indent="0">
+              <a:buNone/>
+            </a:pPr>
+            <a:r>
+              <a:rPr lang="en-GB" dirty="0"/>
+              <a:t>~/IWOCL2016/solutions/Bilateral$ </a:t>
+            </a:r>
+            <a:r>
+              <a:rPr lang="en-GB" b="1" dirty="0"/>
+              <a:t>./</a:t>
+            </a:r>
+            <a:r>
+              <a:rPr lang="en-GB" b="1" dirty="0" err="1"/>
+              <a:t>bilateral_opt</a:t>
+            </a:r>
+            <a:endParaRPr lang="en-GB" b="1" dirty="0"/>
+          </a:p>
+          <a:p>
+            <a:pPr marL="0" indent="0">
+              <a:buNone/>
+            </a:pPr>
+            <a:r>
+              <a:rPr lang="en-GB" dirty="0" smtClean="0"/>
+              <a:t>OpenCL </a:t>
+            </a:r>
+            <a:r>
+              <a:rPr lang="en-GB" dirty="0"/>
+              <a:t>took 74.0ms (2.3ms / frame</a:t>
+            </a:r>
+            <a:r>
+              <a:rPr lang="en-GB" dirty="0" smtClean="0"/>
+              <a:t>)</a:t>
+            </a:r>
+          </a:p>
+          <a:p>
+            <a:pPr marL="0" indent="0">
+              <a:buNone/>
+            </a:pPr>
+            <a:endParaRPr lang="en-GB" dirty="0"/>
+          </a:p>
+          <a:p>
+            <a:pPr marL="0" indent="0">
+              <a:buNone/>
+            </a:pPr>
+            <a:r>
+              <a:rPr lang="en-GB" dirty="0"/>
+              <a:t>~/IWOCL2016/solutions/Bilateral$ </a:t>
+            </a:r>
+            <a:r>
+              <a:rPr lang="en-GB" b="1" dirty="0"/>
+              <a:t>./</a:t>
+            </a:r>
+            <a:r>
+              <a:rPr lang="en-GB" b="1" dirty="0" err="1"/>
+              <a:t>bilateral_images</a:t>
+            </a:r>
+            <a:r>
+              <a:rPr lang="en-GB" b="1" dirty="0"/>
+              <a:t> </a:t>
+            </a:r>
+          </a:p>
+          <a:p>
+            <a:pPr marL="0" indent="0">
+              <a:buNone/>
+            </a:pPr>
+            <a:r>
+              <a:rPr lang="en-GB" dirty="0" smtClean="0"/>
+              <a:t>OpenCL </a:t>
+            </a:r>
+            <a:r>
+              <a:rPr lang="en-GB" dirty="0"/>
+              <a:t>took 41.8ms (1.3ms / frame</a:t>
+            </a:r>
+            <a:r>
+              <a:rPr lang="en-GB" dirty="0" smtClean="0"/>
+              <a:t>)</a:t>
+            </a:r>
+            <a:endParaRPr lang="en-GB" dirty="0"/>
+          </a:p>
+        </p:txBody>
+      </p:sp>
+    </p:spTree>
+    <p:extLst>
+      <p:ext uri="{BB962C8B-B14F-4D97-AF65-F5344CB8AC3E}">
+        <p14:creationId xmlns:p14="http://schemas.microsoft.com/office/powerpoint/2010/main" val="3584939095"/>
+      </p:ext>
+    </p:extLst>
+  </p:cSld>
+  <p:clrMapOvr>
+    <a:masterClrMapping/>
+  </p:clrMapOvr>
 </p:sld>
 </file>
 

</xml_diff>

<commit_message>
Part 2 results trimming
Changed exercise results slide to only show metaprogramming benefit,
not results for the next exercise too (images etc)
</commit_message>
<xml_diff>
--- a/slides/advanced_part2.pptx
+++ b/slides/advanced_part2.pptx
@@ -8902,15 +8902,7 @@
             </a:r>
             <a:r>
               <a:rPr lang="en-GB" dirty="0" smtClean="0"/>
-              <a:t> Requires </a:t>
-            </a:r>
-            <a:r>
-              <a:rPr lang="en-GB" dirty="0" smtClean="0"/>
-              <a:t>the SDL2 </a:t>
-            </a:r>
-            <a:r>
-              <a:rPr lang="en-GB" dirty="0" smtClean="0"/>
-              <a:t>library</a:t>
+              <a:t> Requires the SDL2 library</a:t>
             </a:r>
           </a:p>
           <a:p>
@@ -8956,11 +8948,7 @@
             <a:pPr lvl="1"/>
             <a:r>
               <a:rPr lang="en-GB" dirty="0" smtClean="0"/>
-              <a:t>OS X: Download and install SDL2 development </a:t>
-            </a:r>
-            <a:r>
-              <a:rPr lang="en-GB" dirty="0" smtClean="0"/>
-              <a:t>framework</a:t>
+              <a:t>OS X: Download and install SDL2 development framework</a:t>
             </a:r>
           </a:p>
           <a:p>
@@ -8981,7 +8969,6 @@
               <a:rPr lang="en-GB" dirty="0" smtClean="0"/>
               <a:t> </a:t>
             </a:r>
-            <a:endParaRPr lang="en-GB" dirty="0" smtClean="0"/>
           </a:p>
           <a:p>
             <a:pPr lvl="1"/>
@@ -9093,11 +9080,7 @@
             </a:pPr>
             <a:r>
               <a:rPr lang="en-GB" dirty="0" smtClean="0"/>
-              <a:t>Find the starting code in e.g. ~/</a:t>
-            </a:r>
-            <a:r>
-              <a:rPr lang="en-GB" dirty="0" smtClean="0"/>
-              <a:t>IWOCL2016</a:t>
+              <a:t>Find the starting code in e.g. ~/IWOCL2016</a:t>
             </a:r>
             <a:r>
               <a:rPr lang="en-GB" dirty="0"/>
@@ -9113,11 +9096,7 @@
             </a:pPr>
             <a:r>
               <a:rPr lang="en-GB" dirty="0" smtClean="0"/>
-              <a:t>Experiment </a:t>
-            </a:r>
-            <a:r>
-              <a:rPr lang="en-GB" dirty="0" smtClean="0"/>
-              <a:t>with some OpenCL compiler options to improve performance</a:t>
+              <a:t>Experiment with some OpenCL compiler options to improve performance</a:t>
             </a:r>
           </a:p>
           <a:p>
@@ -9345,7 +9324,7 @@
         </p:spPr>
         <p:txBody>
           <a:bodyPr>
-            <a:normAutofit fontScale="77500" lnSpcReduction="20000"/>
+            <a:normAutofit fontScale="92500" lnSpcReduction="20000"/>
           </a:bodyPr>
           <a:lstStyle/>
           <a:p>
@@ -9354,11 +9333,19 @@
             </a:pPr>
             <a:r>
               <a:rPr lang="en-GB" dirty="0" smtClean="0"/>
-              <a:t>Results from 3 different versions (meta programming, optimised and images) </a:t>
-            </a:r>
-            <a:r>
-              <a:rPr lang="en-GB" smtClean="0"/>
-              <a:t>on an Nvidia</a:t>
+              <a:t>Results from </a:t>
+            </a:r>
+            <a:r>
+              <a:rPr lang="en-GB" dirty="0" smtClean="0"/>
+              <a:t>meta programming version </a:t>
+            </a:r>
+            <a:r>
+              <a:rPr lang="en-GB" dirty="0" smtClean="0"/>
+              <a:t>on an </a:t>
+            </a:r>
+            <a:r>
+              <a:rPr lang="en-GB" dirty="0" err="1" smtClean="0"/>
+              <a:t>Nvidia</a:t>
             </a:r>
             <a:r>
               <a:rPr lang="en-GB" dirty="0" smtClean="0"/>
@@ -9386,8 +9373,45 @@
             </a:pPr>
             <a:r>
               <a:rPr lang="en-GB" dirty="0"/>
-              <a:t>Reference took 7784.3ms (1 frame)</a:t>
-            </a:r>
+              <a:t>Reference took 7784.3ms (1 frame</a:t>
+            </a:r>
+            <a:r>
+              <a:rPr lang="en-GB" dirty="0" smtClean="0"/>
+              <a:t>)</a:t>
+            </a:r>
+          </a:p>
+          <a:p>
+            <a:pPr marL="0" indent="0">
+              <a:buNone/>
+            </a:pPr>
+            <a:endParaRPr lang="en-GB" dirty="0"/>
+          </a:p>
+          <a:p>
+            <a:pPr marL="0" indent="0">
+              <a:buNone/>
+            </a:pPr>
+            <a:r>
+              <a:rPr lang="en-GB" dirty="0"/>
+              <a:t>~/IWOCL2016/exercises/Bilateral$ </a:t>
+            </a:r>
+            <a:r>
+              <a:rPr lang="en-GB" b="1" dirty="0"/>
+              <a:t>./bilateral </a:t>
+            </a:r>
+          </a:p>
+          <a:p>
+            <a:pPr marL="0" indent="0">
+              <a:buNone/>
+            </a:pPr>
+            <a:r>
+              <a:rPr lang="en-GB" dirty="0" smtClean="0"/>
+              <a:t>OpenCL </a:t>
+            </a:r>
+            <a:r>
+              <a:rPr lang="en-GB" dirty="0"/>
+              <a:t>took 428.1ms (13.4ms / frame)</a:t>
+            </a:r>
+            <a:endParaRPr lang="en-GB" dirty="0"/>
           </a:p>
           <a:p>
             <a:pPr marL="0" indent="0">
@@ -9427,92 +9451,6 @@
             <a:r>
               <a:rPr lang="en-GB" dirty="0"/>
               <a:t>took 357.9ms (11.2ms / frame</a:t>
-            </a:r>
-            <a:r>
-              <a:rPr lang="en-GB" dirty="0" smtClean="0"/>
-              <a:t>)</a:t>
-            </a:r>
-            <a:endParaRPr lang="en-GB" dirty="0"/>
-          </a:p>
-          <a:p>
-            <a:pPr marL="0" indent="0">
-              <a:buNone/>
-            </a:pPr>
-            <a:endParaRPr lang="en-GB" dirty="0"/>
-          </a:p>
-          <a:p>
-            <a:pPr marL="0" indent="0">
-              <a:buNone/>
-            </a:pPr>
-            <a:r>
-              <a:rPr lang="en-GB" dirty="0"/>
-              <a:t>~/IWOCL2016/solutions/Bilateral$ </a:t>
-            </a:r>
-            <a:r>
-              <a:rPr lang="en-GB" b="1" dirty="0"/>
-              <a:t>./</a:t>
-            </a:r>
-            <a:r>
-              <a:rPr lang="en-GB" b="1" dirty="0" err="1"/>
-              <a:t>bilateral_opt</a:t>
-            </a:r>
-            <a:endParaRPr lang="en-GB" b="1" dirty="0"/>
-          </a:p>
-          <a:p>
-            <a:pPr marL="0" indent="0">
-              <a:buNone/>
-            </a:pPr>
-            <a:r>
-              <a:rPr lang="en-GB" dirty="0" smtClean="0"/>
-              <a:t>OpenCL </a:t>
-            </a:r>
-            <a:r>
-              <a:rPr lang="en-GB" dirty="0"/>
-              <a:t>took 74.0ms (2.3ms / frame</a:t>
-            </a:r>
-            <a:r>
-              <a:rPr lang="en-GB" dirty="0" smtClean="0"/>
-              <a:t>)</a:t>
-            </a:r>
-          </a:p>
-          <a:p>
-            <a:pPr marL="0" indent="0">
-              <a:buNone/>
-            </a:pPr>
-            <a:endParaRPr lang="en-GB" dirty="0"/>
-          </a:p>
-          <a:p>
-            <a:pPr marL="0" indent="0">
-              <a:buNone/>
-            </a:pPr>
-            <a:r>
-              <a:rPr lang="en-GB" dirty="0"/>
-              <a:t>~/IWOCL2016/solutions/Bilateral$ </a:t>
-            </a:r>
-            <a:r>
-              <a:rPr lang="en-GB" b="1" dirty="0"/>
-              <a:t>./</a:t>
-            </a:r>
-            <a:r>
-              <a:rPr lang="en-GB" b="1" dirty="0" err="1"/>
-              <a:t>bilateral_images</a:t>
-            </a:r>
-            <a:r>
-              <a:rPr lang="en-GB" b="1" dirty="0"/>
-              <a:t> </a:t>
-            </a:r>
-          </a:p>
-          <a:p>
-            <a:pPr marL="0" indent="0">
-              <a:buNone/>
-            </a:pPr>
-            <a:r>
-              <a:rPr lang="en-GB" dirty="0" smtClean="0"/>
-              <a:t>OpenCL </a:t>
-            </a:r>
-            <a:r>
-              <a:rPr lang="en-GB" dirty="0"/>
-              <a:t>took 41.8ms (1.3ms / frame</a:t>
             </a:r>
             <a:r>
               <a:rPr lang="en-GB" dirty="0" smtClean="0"/>

</xml_diff>

<commit_message>
Syntax highlighting for shell scripts
</commit_message>
<xml_diff>
--- a/slides/advanced_part2.pptx
+++ b/slides/advanced_part2.pptx
@@ -4678,84 +4678,80 @@
             </a:pPr>
             <a:r>
               <a:rPr lang="en-GB" b="1" dirty="0" err="1">
+                <a:latin typeface="Courier New"/>
+                <a:cs typeface="Courier New"/>
+              </a:rPr>
+              <a:t>p</a:t>
+            </a:r>
+            <a:r>
+              <a:rPr lang="en-GB" b="1" dirty="0" err="1" smtClean="0">
+                <a:latin typeface="Courier New"/>
+                <a:cs typeface="Courier New"/>
+              </a:rPr>
+              <a:t>rogram.</a:t>
+            </a:r>
+            <a:r>
+              <a:rPr lang="en-GB" b="1" dirty="0" err="1" smtClean="0">
                 <a:solidFill>
                   <a:srgbClr val="3366FF"/>
                 </a:solidFill>
                 <a:latin typeface="Courier New"/>
                 <a:cs typeface="Courier New"/>
               </a:rPr>
-              <a:t>p</a:t>
-            </a:r>
-            <a:r>
-              <a:rPr lang="en-GB" b="1" dirty="0" err="1" smtClean="0">
+              <a:t>getInfo</a:t>
+            </a:r>
+            <a:r>
+              <a:rPr lang="en-GB" b="1" dirty="0">
+                <a:latin typeface="Courier New"/>
+                <a:cs typeface="Courier New"/>
+              </a:rPr>
+              <a:t>&lt;</a:t>
+            </a:r>
+            <a:r>
+              <a:rPr lang="en-GB" b="1" dirty="0" smtClean="0">
+                <a:latin typeface="Courier New"/>
+                <a:cs typeface="Courier New"/>
+              </a:rPr>
+              <a:t>CL_PROGRAM_NUM_KERNELS&gt;();</a:t>
+            </a:r>
+          </a:p>
+          <a:p>
+            <a:pPr marL="400050" lvl="1" indent="0">
+              <a:buNone/>
+            </a:pPr>
+            <a:r>
+              <a:rPr lang="en-GB" b="1" dirty="0" err="1">
+                <a:latin typeface="Courier New"/>
+                <a:cs typeface="Courier New"/>
+              </a:rPr>
+              <a:t>program.</a:t>
+            </a:r>
+            <a:r>
+              <a:rPr lang="en-GB" b="1" dirty="0" err="1">
                 <a:solidFill>
                   <a:srgbClr val="3366FF"/>
                 </a:solidFill>
                 <a:latin typeface="Courier New"/>
                 <a:cs typeface="Courier New"/>
               </a:rPr>
-              <a:t>rogram.getInfo</a:t>
+              <a:t>getInfo</a:t>
+            </a:r>
+            <a:r>
+              <a:rPr lang="en-GB" b="1" dirty="0" smtClean="0">
+                <a:latin typeface="Courier New"/>
+                <a:cs typeface="Courier New"/>
+              </a:rPr>
+              <a:t>&lt;CL_PROGRAM_KERNEL_NAMES&gt;(</a:t>
             </a:r>
             <a:r>
               <a:rPr lang="en-GB" b="1" dirty="0">
-                <a:solidFill>
-                  <a:srgbClr val="3366FF"/>
-                </a:solidFill>
-                <a:latin typeface="Courier New"/>
-                <a:cs typeface="Courier New"/>
-              </a:rPr>
-              <a:t>&lt;</a:t>
+                <a:latin typeface="Courier New"/>
+                <a:cs typeface="Courier New"/>
+              </a:rPr>
+              <a:t>)</a:t>
             </a:r>
             <a:r>
               <a:rPr lang="en-GB" b="1" dirty="0" smtClean="0">
-                <a:solidFill>
-                  <a:srgbClr val="3366FF"/>
-                </a:solidFill>
-                <a:latin typeface="Courier New"/>
-                <a:cs typeface="Courier New"/>
-              </a:rPr>
-              <a:t>CL_PROGRAM_NUM_KERNELS&gt;();</a:t>
-            </a:r>
-          </a:p>
-          <a:p>
-            <a:pPr marL="400050" lvl="1" indent="0">
-              <a:buNone/>
-            </a:pPr>
-            <a:r>
-              <a:rPr lang="en-GB" b="1" dirty="0" err="1">
-                <a:solidFill>
-                  <a:srgbClr val="3366FF"/>
-                </a:solidFill>
-                <a:latin typeface="Courier New"/>
-                <a:cs typeface="Courier New"/>
-              </a:rPr>
-              <a:t>program.getInfo</a:t>
-            </a:r>
-            <a:r>
-              <a:rPr lang="en-GB" b="1" dirty="0" smtClean="0">
-                <a:solidFill>
-                  <a:srgbClr val="3366FF"/>
-                </a:solidFill>
-                <a:latin typeface="Courier New"/>
-                <a:cs typeface="Courier New"/>
-              </a:rPr>
-              <a:t>&lt;CL_PROGRAM_KERNEL_NAMES&gt;(</a:t>
-            </a:r>
-            <a:r>
-              <a:rPr lang="en-GB" b="1" dirty="0">
-                <a:solidFill>
-                  <a:srgbClr val="3366FF"/>
-                </a:solidFill>
-                <a:latin typeface="Courier New"/>
-                <a:cs typeface="Courier New"/>
-              </a:rPr>
-              <a:t>)</a:t>
-            </a:r>
-            <a:r>
-              <a:rPr lang="en-GB" b="1" dirty="0" smtClean="0">
-                <a:solidFill>
-                  <a:srgbClr val="3366FF"/>
-                </a:solidFill>
                 <a:latin typeface="Courier New"/>
                 <a:cs typeface="Courier New"/>
               </a:rPr>
@@ -4782,68 +4778,70 @@
             </a:pPr>
             <a:r>
               <a:rPr lang="en-GB" b="1" dirty="0" err="1">
+                <a:latin typeface="Courier New"/>
+                <a:cs typeface="Courier New"/>
+              </a:rPr>
+              <a:t>k</a:t>
+            </a:r>
+            <a:r>
+              <a:rPr lang="en-GB" b="1" dirty="0" err="1" smtClean="0">
+                <a:latin typeface="Courier New"/>
+                <a:cs typeface="Courier New"/>
+              </a:rPr>
+              <a:t>ernel.</a:t>
+            </a:r>
+            <a:r>
+              <a:rPr lang="en-GB" b="1" dirty="0" err="1" smtClean="0">
                 <a:solidFill>
                   <a:srgbClr val="3366FF"/>
                 </a:solidFill>
                 <a:latin typeface="Courier New"/>
                 <a:cs typeface="Courier New"/>
               </a:rPr>
+              <a:t>getInfo</a:t>
+            </a:r>
+            <a:r>
+              <a:rPr lang="en-GB" b="1" dirty="0" smtClean="0">
+                <a:latin typeface="Courier New"/>
+                <a:cs typeface="Courier New"/>
+              </a:rPr>
+              <a:t>&lt;CL_KERNEL_NUM_ARGS&gt;();</a:t>
+            </a:r>
+          </a:p>
+          <a:p>
+            <a:pPr marL="400050" lvl="1" indent="0">
+              <a:buNone/>
+            </a:pPr>
+            <a:r>
+              <a:rPr lang="en-GB" b="1" dirty="0" err="1">
+                <a:latin typeface="Courier New"/>
+                <a:cs typeface="Courier New"/>
+              </a:rPr>
               <a:t>k</a:t>
             </a:r>
             <a:r>
               <a:rPr lang="en-GB" b="1" dirty="0" err="1" smtClean="0">
+                <a:latin typeface="Courier New"/>
+                <a:cs typeface="Courier New"/>
+              </a:rPr>
+              <a:t>ernel.</a:t>
+            </a:r>
+            <a:r>
+              <a:rPr lang="en-GB" b="1" dirty="0" err="1" smtClean="0">
                 <a:solidFill>
                   <a:srgbClr val="3366FF"/>
                 </a:solidFill>
                 <a:latin typeface="Courier New"/>
                 <a:cs typeface="Courier New"/>
               </a:rPr>
-              <a:t>ernel.getInfo</a:t>
+              <a:t>getArgInfo</a:t>
             </a:r>
             <a:r>
               <a:rPr lang="en-GB" b="1" dirty="0" smtClean="0">
-                <a:solidFill>
-                  <a:srgbClr val="3366FF"/>
-                </a:solidFill>
-                <a:latin typeface="Courier New"/>
-                <a:cs typeface="Courier New"/>
-              </a:rPr>
-              <a:t>&lt;CL_KERNEL_NUM_ARGS&gt;();</a:t>
-            </a:r>
-          </a:p>
-          <a:p>
-            <a:pPr marL="400050" lvl="1" indent="0">
-              <a:buNone/>
-            </a:pPr>
-            <a:r>
-              <a:rPr lang="en-GB" b="1" dirty="0" err="1">
-                <a:solidFill>
-                  <a:srgbClr val="3366FF"/>
-                </a:solidFill>
-                <a:latin typeface="Courier New"/>
-                <a:cs typeface="Courier New"/>
-              </a:rPr>
-              <a:t>k</a:t>
-            </a:r>
-            <a:r>
-              <a:rPr lang="en-GB" b="1" dirty="0" err="1" smtClean="0">
-                <a:solidFill>
-                  <a:srgbClr val="3366FF"/>
-                </a:solidFill>
-                <a:latin typeface="Courier New"/>
-                <a:cs typeface="Courier New"/>
-              </a:rPr>
-              <a:t>ernel.getArgInfo</a:t>
-            </a:r>
-            <a:r>
-              <a:rPr lang="en-GB" b="1" dirty="0" smtClean="0">
-                <a:solidFill>
-                  <a:srgbClr val="3366FF"/>
-                </a:solidFill>
-                <a:latin typeface="Courier New"/>
-                <a:cs typeface="Courier New"/>
-              </a:rPr>
-              <a:t>&lt;CL_KERNEL_ARG*&gt;();</a:t>
+                <a:latin typeface="Courier New"/>
+                <a:cs typeface="Courier New"/>
+              </a:rPr>
+              <a:t>&lt;CL_KERNEL_ARG_*&gt;();</a:t>
             </a:r>
           </a:p>
           <a:p>
@@ -5010,64 +5008,59 @@
             </a:pPr>
             <a:r>
               <a:rPr lang="en-GB" b="1" dirty="0" err="1" smtClean="0">
+                <a:latin typeface="Courier New"/>
+                <a:cs typeface="Courier New"/>
+              </a:rPr>
+              <a:t>program.</a:t>
+            </a:r>
+            <a:r>
+              <a:rPr lang="en-GB" b="1" dirty="0" err="1" smtClean="0">
                 <a:solidFill>
                   <a:srgbClr val="3366FF"/>
                 </a:solidFill>
                 <a:latin typeface="Courier New"/>
                 <a:cs typeface="Courier New"/>
               </a:rPr>
-              <a:t>program.compile</a:t>
+              <a:t>compile</a:t>
             </a:r>
             <a:r>
               <a:rPr lang="en-GB" b="1" dirty="0" smtClean="0">
+                <a:latin typeface="Courier New"/>
+                <a:cs typeface="Courier New"/>
+              </a:rPr>
+              <a:t>()</a:t>
+            </a:r>
+          </a:p>
+          <a:p>
+            <a:pPr marL="400050" lvl="1" indent="0">
+              <a:buNone/>
+            </a:pPr>
+            <a:r>
+              <a:rPr lang="en-GB" b="1" dirty="0">
+                <a:latin typeface="Courier New"/>
+                <a:cs typeface="Courier New"/>
+              </a:rPr>
+              <a:t>c</a:t>
+            </a:r>
+            <a:r>
+              <a:rPr lang="en-GB" b="1" dirty="0" smtClean="0">
+                <a:latin typeface="Courier New"/>
+                <a:cs typeface="Courier New"/>
+              </a:rPr>
+              <a:t>l::Program::</a:t>
+            </a:r>
+            <a:r>
+              <a:rPr lang="en-GB" b="1" dirty="0" err="1" smtClean="0">
                 <a:solidFill>
                   <a:srgbClr val="3366FF"/>
                 </a:solidFill>
                 <a:latin typeface="Courier New"/>
                 <a:cs typeface="Courier New"/>
               </a:rPr>
-              <a:t>()</a:t>
-            </a:r>
-          </a:p>
-          <a:p>
-            <a:pPr marL="400050" lvl="1" indent="0">
-              <a:buNone/>
-            </a:pPr>
-            <a:r>
-              <a:rPr lang="en-GB" b="1" dirty="0">
-                <a:solidFill>
-                  <a:srgbClr val="3366FF"/>
-                </a:solidFill>
-                <a:latin typeface="Courier New"/>
-                <a:cs typeface="Courier New"/>
-              </a:rPr>
-              <a:t>c</a:t>
+              <a:t>linkProgram</a:t>
             </a:r>
             <a:r>
               <a:rPr lang="en-GB" b="1" dirty="0" smtClean="0">
-                <a:solidFill>
-                  <a:srgbClr val="3366FF"/>
-                </a:solidFill>
-                <a:latin typeface="Courier New"/>
-                <a:cs typeface="Courier New"/>
-              </a:rPr>
-              <a:t>l::Program::</a:t>
-            </a:r>
-            <a:r>
-              <a:rPr lang="en-GB" b="1" dirty="0" err="1" smtClean="0">
-                <a:solidFill>
-                  <a:srgbClr val="3366FF"/>
-                </a:solidFill>
-                <a:latin typeface="Courier New"/>
-                <a:cs typeface="Courier New"/>
-              </a:rPr>
-              <a:t>linkProgram</a:t>
-            </a:r>
-            <a:r>
-              <a:rPr lang="en-GB" b="1" dirty="0" smtClean="0">
-                <a:solidFill>
-                  <a:srgbClr val="3366FF"/>
-                </a:solidFill>
                 <a:latin typeface="Courier New"/>
                 <a:cs typeface="Courier New"/>
               </a:rPr>
@@ -8322,7 +8315,7 @@
             <a:r>
               <a:rPr lang="en-GB" b="1" dirty="0" err="1" smtClean="0">
                 <a:solidFill>
-                  <a:srgbClr val="3366FF"/>
+                  <a:schemeClr val="accent3"/>
                 </a:solidFill>
                 <a:latin typeface="Courier New"/>
                 <a:cs typeface="Courier New"/>
@@ -8332,27 +8325,28 @@
             <a:r>
               <a:rPr lang="en-GB" b="1" dirty="0" smtClean="0">
                 <a:solidFill>
-                  <a:srgbClr val="3366FF"/>
-                </a:solidFill>
-                <a:latin typeface="Courier New"/>
-                <a:cs typeface="Courier New"/>
-              </a:rPr>
-              <a:t>: </a:t>
+                  <a:schemeClr val="accent3"/>
+                </a:solidFill>
+                <a:latin typeface="Courier New"/>
+                <a:cs typeface="Courier New"/>
+              </a:rPr>
+              <a:t>:</a:t>
+            </a:r>
+            <a:r>
+              <a:rPr lang="en-GB" b="1" dirty="0" smtClean="0">
+                <a:latin typeface="Courier New"/>
+                <a:cs typeface="Courier New"/>
+              </a:rPr>
+              <a:t> </a:t>
             </a:r>
             <a:r>
               <a:rPr lang="en-GB" b="1" dirty="0" err="1" smtClean="0">
-                <a:solidFill>
-                  <a:srgbClr val="3366FF"/>
-                </a:solidFill>
                 <a:latin typeface="Courier New"/>
                 <a:cs typeface="Courier New"/>
               </a:rPr>
               <a:t>foo.cl</a:t>
             </a:r>
             <a:endParaRPr lang="en-GB" b="1" dirty="0" smtClean="0">
-              <a:solidFill>
-                <a:srgbClr val="3366FF"/>
-              </a:solidFill>
               <a:latin typeface="Courier New"/>
               <a:cs typeface="Courier New"/>
             </a:endParaRPr>
@@ -8362,59 +8356,34 @@
               <a:buNone/>
             </a:pPr>
             <a:r>
-              <a:rPr lang="en-GB" b="1" dirty="0">
-                <a:solidFill>
-                  <a:srgbClr val="3366FF"/>
-                </a:solidFill>
+              <a:rPr lang="en-GB" b="1" dirty="0" smtClean="0">
+                <a:latin typeface="Courier New"/>
+                <a:cs typeface="Courier New"/>
+              </a:rPr>
+              <a:t>    ./</a:t>
+            </a:r>
+            <a:r>
+              <a:rPr lang="en-GB" b="1" dirty="0" err="1" smtClean="0">
+                <a:latin typeface="Courier New"/>
+                <a:cs typeface="Courier New"/>
+              </a:rPr>
+              <a:t>stringify_ocl</a:t>
+            </a:r>
+            <a:r>
+              <a:rPr lang="en-GB" b="1" dirty="0" smtClean="0">
                 <a:latin typeface="Courier New"/>
                 <a:cs typeface="Courier New"/>
               </a:rPr>
               <a:t> </a:t>
             </a:r>
             <a:r>
-              <a:rPr lang="en-GB" b="1" dirty="0" smtClean="0">
-                <a:solidFill>
-                  <a:srgbClr val="3366FF"/>
-                </a:solidFill>
-                <a:latin typeface="Courier New"/>
-                <a:cs typeface="Courier New"/>
-              </a:rPr>
-              <a:t>   ./</a:t>
-            </a:r>
-            <a:r>
               <a:rPr lang="en-GB" b="1" dirty="0" err="1" smtClean="0">
-                <a:solidFill>
-                  <a:srgbClr val="3366FF"/>
-                </a:solidFill>
-                <a:latin typeface="Courier New"/>
-                <a:cs typeface="Courier New"/>
-              </a:rPr>
-              <a:t>stringify_ocl</a:t>
-            </a:r>
-            <a:r>
-              <a:rPr lang="en-GB" b="1" dirty="0" smtClean="0">
-                <a:solidFill>
-                  <a:srgbClr val="3366FF"/>
-                </a:solidFill>
-                <a:latin typeface="Courier New"/>
-                <a:cs typeface="Courier New"/>
-              </a:rPr>
-              <a:t> </a:t>
-            </a:r>
-            <a:r>
-              <a:rPr lang="en-GB" b="1" dirty="0" err="1" smtClean="0">
-                <a:solidFill>
-                  <a:srgbClr val="3366FF"/>
-                </a:solidFill>
                 <a:latin typeface="Courier New"/>
                 <a:cs typeface="Courier New"/>
               </a:rPr>
               <a:t>foo.cl</a:t>
             </a:r>
             <a:endParaRPr lang="en-GB" b="1" dirty="0" smtClean="0">
-              <a:solidFill>
-                <a:srgbClr val="3366FF"/>
-              </a:solidFill>
               <a:latin typeface="Courier New"/>
               <a:cs typeface="Courier New"/>
             </a:endParaRPr>
@@ -10729,7 +10698,7 @@
             <a:r>
               <a:rPr lang="en-US" b="1" dirty="0" smtClean="0">
                 <a:solidFill>
-                  <a:srgbClr val="3366FF"/>
+                  <a:srgbClr val="008000"/>
                 </a:solidFill>
                 <a:latin typeface="Courier New"/>
                 <a:cs typeface="Courier New"/>
@@ -10739,7 +10708,7 @@
             <a:r>
               <a:rPr lang="en-US" b="1" dirty="0">
                 <a:solidFill>
-                  <a:srgbClr val="3366FF"/>
+                  <a:srgbClr val="008000"/>
                 </a:solidFill>
                 <a:latin typeface="Courier New"/>
                 <a:cs typeface="Courier New"/>
@@ -10752,9 +10721,6 @@
               <a:buNone/>
             </a:pPr>
             <a:endParaRPr lang="en-US" b="1" dirty="0">
-              <a:solidFill>
-                <a:srgbClr val="3366FF"/>
-              </a:solidFill>
               <a:latin typeface="Courier New"/>
               <a:cs typeface="Courier New"/>
             </a:endParaRPr>
@@ -10765,9 +10731,6 @@
             </a:pPr>
             <a:r>
               <a:rPr lang="en-US" b="1" dirty="0">
-                <a:solidFill>
-                  <a:srgbClr val="3366FF"/>
-                </a:solidFill>
                 <a:latin typeface="Courier New"/>
                 <a:cs typeface="Courier New"/>
               </a:rPr>
@@ -10780,9 +10743,6 @@
             </a:pPr>
             <a:r>
               <a:rPr lang="en-US" b="1" dirty="0">
-                <a:solidFill>
-                  <a:srgbClr val="3366FF"/>
-                </a:solidFill>
                 <a:latin typeface="Courier New"/>
                 <a:cs typeface="Courier New"/>
               </a:rPr>
@@ -10790,19 +10750,30 @@
             </a:r>
             <a:r>
               <a:rPr lang="en-US" b="1" dirty="0" err="1">
-                <a:solidFill>
-                  <a:srgbClr val="3366FF"/>
-                </a:solidFill>
-                <a:latin typeface="Courier New"/>
-                <a:cs typeface="Courier New"/>
-              </a:rPr>
-              <a:t>IN%.cl</a:t>
+                <a:latin typeface="Courier New"/>
+                <a:cs typeface="Courier New"/>
+              </a:rPr>
+              <a:t>IN</a:t>
+            </a:r>
+            <a:r>
+              <a:rPr lang="en-US" b="1" dirty="0" err="1">
+                <a:solidFill>
+                  <a:schemeClr val="accent2"/>
+                </a:solidFill>
+                <a:latin typeface="Courier New"/>
+                <a:cs typeface="Courier New"/>
+              </a:rPr>
+              <a:t>%</a:t>
+            </a:r>
+            <a:r>
+              <a:rPr lang="en-US" b="1" dirty="0" err="1">
+                <a:latin typeface="Courier New"/>
+                <a:cs typeface="Courier New"/>
+              </a:rPr>
+              <a:t>.cl</a:t>
             </a:r>
             <a:r>
               <a:rPr lang="en-US" b="1" dirty="0">
-                <a:solidFill>
-                  <a:srgbClr val="3366FF"/>
-                </a:solidFill>
                 <a:latin typeface="Courier New"/>
                 <a:cs typeface="Courier New"/>
               </a:rPr>
@@ -10815,9 +10786,6 @@
             </a:pPr>
             <a:r>
               <a:rPr lang="en-US" b="1" dirty="0">
-                <a:solidFill>
-                  <a:srgbClr val="3366FF"/>
-                </a:solidFill>
                 <a:latin typeface="Courier New"/>
                 <a:cs typeface="Courier New"/>
               </a:rPr>
@@ -10825,18 +10793,12 @@
             </a:r>
             <a:r>
               <a:rPr lang="en-US" b="1" dirty="0" err="1">
-                <a:solidFill>
-                  <a:srgbClr val="3366FF"/>
-                </a:solidFill>
                 <a:latin typeface="Courier New"/>
                 <a:cs typeface="Courier New"/>
               </a:rPr>
               <a:t>NAME.h</a:t>
             </a:r>
             <a:endParaRPr lang="en-US" b="1" dirty="0">
-              <a:solidFill>
-                <a:srgbClr val="3366FF"/>
-              </a:solidFill>
               <a:latin typeface="Courier New"/>
               <a:cs typeface="Courier New"/>
             </a:endParaRPr>
@@ -10846,9 +10808,6 @@
               <a:buNone/>
             </a:pPr>
             <a:endParaRPr lang="en-US" b="1" dirty="0" smtClean="0">
-              <a:solidFill>
-                <a:srgbClr val="3366FF"/>
-              </a:solidFill>
               <a:latin typeface="Courier New"/>
               <a:cs typeface="Courier New"/>
             </a:endParaRPr>
@@ -10865,208 +10824,310 @@
                 <a:latin typeface="Courier New"/>
                 <a:cs typeface="Courier New"/>
               </a:rPr>
-              <a:t>echo </a:t>
+              <a:t>echo</a:t>
+            </a:r>
+            <a:r>
+              <a:rPr lang="en-US" b="1" dirty="0" smtClean="0">
+                <a:latin typeface="Courier New"/>
+                <a:cs typeface="Courier New"/>
+              </a:rPr>
+              <a:t> </a:t>
             </a:r>
             <a:r>
               <a:rPr lang="en-US" b="1" dirty="0">
                 <a:solidFill>
+                  <a:schemeClr val="accent5"/>
+                </a:solidFill>
+                <a:latin typeface="Courier New"/>
+                <a:cs typeface="Courier New"/>
+              </a:rPr>
+              <a:t>"</a:t>
+            </a:r>
+            <a:r>
+              <a:rPr lang="en-US" b="1" dirty="0" err="1">
+                <a:solidFill>
+                  <a:schemeClr val="accent5"/>
+                </a:solidFill>
+                <a:latin typeface="Courier New"/>
+                <a:cs typeface="Courier New"/>
+              </a:rPr>
+              <a:t>const</a:t>
+            </a:r>
+            <a:r>
+              <a:rPr lang="en-US" b="1" dirty="0">
+                <a:solidFill>
+                  <a:schemeClr val="accent5"/>
+                </a:solidFill>
+                <a:latin typeface="Courier New"/>
+                <a:cs typeface="Courier New"/>
+              </a:rPr>
+              <a:t> char *"</a:t>
+            </a:r>
+            <a:r>
+              <a:rPr lang="en-US" b="1" dirty="0">
+                <a:latin typeface="Courier New"/>
+                <a:cs typeface="Courier New"/>
+              </a:rPr>
+              <a:t>$</a:t>
+            </a:r>
+            <a:r>
+              <a:rPr lang="en-US" b="1" dirty="0" smtClean="0">
+                <a:latin typeface="Courier New"/>
+                <a:cs typeface="Courier New"/>
+              </a:rPr>
+              <a:t>NAME</a:t>
+            </a:r>
+            <a:r>
+              <a:rPr lang="en-US" b="1" dirty="0" smtClean="0">
+                <a:solidFill>
+                  <a:schemeClr val="accent5"/>
+                </a:solidFill>
+                <a:latin typeface="Courier New"/>
+                <a:cs typeface="Courier New"/>
+              </a:rPr>
+              <a:t>"_</a:t>
+            </a:r>
+            <a:r>
+              <a:rPr lang="en-US" b="1" dirty="0" err="1" smtClean="0">
+                <a:solidFill>
+                  <a:schemeClr val="accent5"/>
+                </a:solidFill>
+                <a:latin typeface="Courier New"/>
+                <a:cs typeface="Courier New"/>
+              </a:rPr>
+              <a:t>ocl</a:t>
+            </a:r>
+            <a:r>
+              <a:rPr lang="en-US" b="1" dirty="0" smtClean="0">
+                <a:solidFill>
+                  <a:schemeClr val="accent5"/>
+                </a:solidFill>
+                <a:latin typeface="Courier New"/>
+                <a:cs typeface="Courier New"/>
+              </a:rPr>
+              <a:t> </a:t>
+            </a:r>
+            <a:r>
+              <a:rPr lang="en-US" b="1" dirty="0">
+                <a:solidFill>
+                  <a:schemeClr val="accent5"/>
+                </a:solidFill>
+                <a:latin typeface="Courier New"/>
+                <a:cs typeface="Courier New"/>
+              </a:rPr>
+              <a:t>="</a:t>
+            </a:r>
+            <a:r>
+              <a:rPr lang="en-US" b="1" dirty="0">
+                <a:latin typeface="Courier New"/>
+                <a:cs typeface="Courier New"/>
+              </a:rPr>
+              <a:t> </a:t>
+            </a:r>
+            <a:r>
+              <a:rPr lang="en-US" b="1" dirty="0" smtClean="0">
+                <a:solidFill>
+                  <a:srgbClr val="C0504D"/>
+                </a:solidFill>
+                <a:latin typeface="Courier New"/>
+                <a:cs typeface="Courier New"/>
+              </a:rPr>
+              <a:t>&gt;</a:t>
+            </a:r>
+            <a:r>
+              <a:rPr lang="en-US" b="1" dirty="0" smtClean="0">
+                <a:latin typeface="Courier New"/>
+                <a:cs typeface="Courier New"/>
+              </a:rPr>
+              <a:t>$</a:t>
+            </a:r>
+            <a:r>
+              <a:rPr lang="en-US" b="1" dirty="0">
+                <a:latin typeface="Courier New"/>
+                <a:cs typeface="Courier New"/>
+              </a:rPr>
+              <a:t>OUT</a:t>
+            </a:r>
+          </a:p>
+          <a:p>
+            <a:pPr marL="400050" lvl="1" indent="0">
+              <a:buNone/>
+            </a:pPr>
+            <a:r>
+              <a:rPr lang="en-US" b="1" dirty="0" err="1">
+                <a:latin typeface="Courier New"/>
+                <a:cs typeface="Courier New"/>
+              </a:rPr>
+              <a:t>sed</a:t>
+            </a:r>
+            <a:r>
+              <a:rPr lang="en-US" b="1" dirty="0">
+                <a:latin typeface="Courier New"/>
+                <a:cs typeface="Courier New"/>
+              </a:rPr>
+              <a:t> -e </a:t>
+            </a:r>
+            <a:r>
+              <a:rPr lang="en-US" b="1" dirty="0">
+                <a:solidFill>
+                  <a:schemeClr val="accent5"/>
+                </a:solidFill>
+                <a:latin typeface="Courier New"/>
+                <a:cs typeface="Courier New"/>
+              </a:rPr>
+              <a:t>'s/\\/\\\\/</a:t>
+            </a:r>
+            <a:r>
+              <a:rPr lang="en-US" b="1" dirty="0" err="1">
+                <a:solidFill>
+                  <a:schemeClr val="accent5"/>
+                </a:solidFill>
+                <a:latin typeface="Courier New"/>
+                <a:cs typeface="Courier New"/>
+              </a:rPr>
+              <a:t>g;s</a:t>
+            </a:r>
+            <a:r>
+              <a:rPr lang="en-US" b="1" dirty="0">
+                <a:solidFill>
+                  <a:schemeClr val="accent5"/>
+                </a:solidFill>
+                <a:latin typeface="Courier New"/>
+                <a:cs typeface="Courier New"/>
+              </a:rPr>
+              <a:t>/"/\\"/</a:t>
+            </a:r>
+            <a:r>
+              <a:rPr lang="en-US" b="1" dirty="0" err="1">
+                <a:solidFill>
+                  <a:schemeClr val="accent5"/>
+                </a:solidFill>
+                <a:latin typeface="Courier New"/>
+                <a:cs typeface="Courier New"/>
+              </a:rPr>
+              <a:t>g</a:t>
+            </a:r>
+            <a:r>
+              <a:rPr lang="en-US" b="1" dirty="0" err="1" smtClean="0">
+                <a:solidFill>
+                  <a:schemeClr val="accent5"/>
+                </a:solidFill>
+                <a:latin typeface="Courier New"/>
+                <a:cs typeface="Courier New"/>
+              </a:rPr>
+              <a:t>;s</a:t>
+            </a:r>
+            <a:r>
+              <a:rPr lang="en-US" b="1" dirty="0" smtClean="0">
+                <a:solidFill>
+                  <a:schemeClr val="accent5"/>
+                </a:solidFill>
+                <a:latin typeface="Courier New"/>
+                <a:cs typeface="Courier New"/>
+              </a:rPr>
+              <a:t>/^/"/;s/$/\\n"/'</a:t>
+            </a:r>
+            <a:r>
+              <a:rPr lang="en-US" b="1" dirty="0" smtClean="0">
+                <a:latin typeface="Courier New"/>
+                <a:cs typeface="Courier New"/>
+              </a:rPr>
+              <a:t> \</a:t>
+            </a:r>
+          </a:p>
+          <a:p>
+            <a:pPr marL="400050" lvl="1" indent="0">
+              <a:buNone/>
+            </a:pPr>
+            <a:r>
+              <a:rPr lang="en-US" b="1" dirty="0">
+                <a:latin typeface="Courier New"/>
+                <a:cs typeface="Courier New"/>
+              </a:rPr>
+              <a:t> </a:t>
+            </a:r>
+            <a:r>
+              <a:rPr lang="en-US" b="1" dirty="0" smtClean="0">
+                <a:latin typeface="Courier New"/>
+                <a:cs typeface="Courier New"/>
+              </a:rPr>
+              <a:t> $IN </a:t>
+            </a:r>
+            <a:r>
+              <a:rPr lang="en-US" b="1" dirty="0" smtClean="0">
+                <a:solidFill>
+                  <a:schemeClr val="accent2"/>
+                </a:solidFill>
+                <a:latin typeface="Courier New"/>
+                <a:cs typeface="Courier New"/>
+              </a:rPr>
+              <a:t>&gt;&gt;</a:t>
+            </a:r>
+            <a:r>
+              <a:rPr lang="en-US" b="1" dirty="0" smtClean="0">
+                <a:latin typeface="Courier New"/>
+                <a:cs typeface="Courier New"/>
+              </a:rPr>
+              <a:t>$OUT</a:t>
+            </a:r>
+          </a:p>
+          <a:p>
+            <a:pPr marL="400050" lvl="1" indent="0">
+              <a:buNone/>
+            </a:pPr>
+            <a:r>
+              <a:rPr lang="en-US" b="1" dirty="0" smtClean="0">
+                <a:solidFill>
                   <a:srgbClr val="3366FF"/>
                 </a:solidFill>
                 <a:latin typeface="Courier New"/>
                 <a:cs typeface="Courier New"/>
               </a:rPr>
-              <a:t>"</a:t>
-            </a:r>
-            <a:r>
-              <a:rPr lang="en-US" b="1" dirty="0" err="1">
-                <a:solidFill>
-                  <a:srgbClr val="3366FF"/>
-                </a:solidFill>
-                <a:latin typeface="Courier New"/>
-                <a:cs typeface="Courier New"/>
-              </a:rPr>
-              <a:t>const</a:t>
+              <a:t>echo</a:t>
+            </a:r>
+            <a:r>
+              <a:rPr lang="en-US" b="1" dirty="0" smtClean="0">
+                <a:latin typeface="Courier New"/>
+                <a:cs typeface="Courier New"/>
+              </a:rPr>
+              <a:t> </a:t>
             </a:r>
             <a:r>
               <a:rPr lang="en-US" b="1" dirty="0">
                 <a:solidFill>
-                  <a:srgbClr val="3366FF"/>
-                </a:solidFill>
-                <a:latin typeface="Courier New"/>
-                <a:cs typeface="Courier New"/>
-              </a:rPr>
-              <a:t> char *"$</a:t>
+                  <a:schemeClr val="accent5"/>
+                </a:solidFill>
+                <a:latin typeface="Courier New"/>
+                <a:cs typeface="Courier New"/>
+              </a:rPr>
+              <a:t>";"</a:t>
+            </a:r>
+            <a:r>
+              <a:rPr lang="en-US" b="1" dirty="0">
+                <a:latin typeface="Courier New"/>
+                <a:cs typeface="Courier New"/>
+              </a:rPr>
+              <a:t> </a:t>
+            </a:r>
+            <a:r>
+              <a:rPr lang="en-US" b="1" dirty="0">
+                <a:solidFill>
+                  <a:schemeClr val="accent2"/>
+                </a:solidFill>
+                <a:latin typeface="Courier New"/>
+                <a:cs typeface="Courier New"/>
+              </a:rPr>
+              <a:t>&gt;&gt;</a:t>
+            </a:r>
+            <a:r>
+              <a:rPr lang="en-US" b="1" dirty="0">
+                <a:latin typeface="Courier New"/>
+                <a:cs typeface="Courier New"/>
+              </a:rPr>
+              <a:t>$</a:t>
             </a:r>
             <a:r>
               <a:rPr lang="en-US" b="1" dirty="0" smtClean="0">
-                <a:solidFill>
-                  <a:srgbClr val="3366FF"/>
-                </a:solidFill>
-                <a:latin typeface="Courier New"/>
-                <a:cs typeface="Courier New"/>
-              </a:rPr>
-              <a:t>NAME"_</a:t>
-            </a:r>
-            <a:r>
-              <a:rPr lang="en-US" b="1" dirty="0" err="1" smtClean="0">
-                <a:solidFill>
-                  <a:srgbClr val="3366FF"/>
-                </a:solidFill>
-                <a:latin typeface="Courier New"/>
-                <a:cs typeface="Courier New"/>
-              </a:rPr>
-              <a:t>ocl</a:t>
-            </a:r>
-            <a:r>
-              <a:rPr lang="en-US" b="1" dirty="0" smtClean="0">
-                <a:solidFill>
-                  <a:srgbClr val="3366FF"/>
-                </a:solidFill>
-                <a:latin typeface="Courier New"/>
-                <a:cs typeface="Courier New"/>
-              </a:rPr>
-              <a:t> </a:t>
-            </a:r>
-            <a:r>
-              <a:rPr lang="en-US" b="1" dirty="0">
-                <a:solidFill>
-                  <a:srgbClr val="3366FF"/>
-                </a:solidFill>
-                <a:latin typeface="Courier New"/>
-                <a:cs typeface="Courier New"/>
-              </a:rPr>
-              <a:t>=" &gt;$OUT</a:t>
-            </a:r>
-          </a:p>
-          <a:p>
-            <a:pPr marL="400050" lvl="1" indent="0">
-              <a:buNone/>
-            </a:pPr>
-            <a:r>
-              <a:rPr lang="en-US" b="1" dirty="0" err="1">
-                <a:solidFill>
-                  <a:srgbClr val="3366FF"/>
-                </a:solidFill>
-                <a:latin typeface="Courier New"/>
-                <a:cs typeface="Courier New"/>
-              </a:rPr>
-              <a:t>sed</a:t>
-            </a:r>
-            <a:r>
-              <a:rPr lang="en-US" b="1" dirty="0">
-                <a:solidFill>
-                  <a:srgbClr val="3366FF"/>
-                </a:solidFill>
-                <a:latin typeface="Courier New"/>
-                <a:cs typeface="Courier New"/>
-              </a:rPr>
-              <a:t> -e 's/\\/\\\\/</a:t>
-            </a:r>
-            <a:r>
-              <a:rPr lang="en-US" b="1" dirty="0" err="1">
-                <a:solidFill>
-                  <a:srgbClr val="3366FF"/>
-                </a:solidFill>
-                <a:latin typeface="Courier New"/>
-                <a:cs typeface="Courier New"/>
-              </a:rPr>
-              <a:t>g;s</a:t>
-            </a:r>
-            <a:r>
-              <a:rPr lang="en-US" b="1" dirty="0">
-                <a:solidFill>
-                  <a:srgbClr val="3366FF"/>
-                </a:solidFill>
-                <a:latin typeface="Courier New"/>
-                <a:cs typeface="Courier New"/>
-              </a:rPr>
-              <a:t>/"/\\"/</a:t>
-            </a:r>
-            <a:r>
-              <a:rPr lang="en-US" b="1" dirty="0" err="1">
-                <a:solidFill>
-                  <a:srgbClr val="3366FF"/>
-                </a:solidFill>
-                <a:latin typeface="Courier New"/>
-                <a:cs typeface="Courier New"/>
-              </a:rPr>
-              <a:t>g</a:t>
-            </a:r>
-            <a:r>
-              <a:rPr lang="en-US" b="1" dirty="0" err="1" smtClean="0">
-                <a:solidFill>
-                  <a:srgbClr val="3366FF"/>
-                </a:solidFill>
-                <a:latin typeface="Courier New"/>
-                <a:cs typeface="Courier New"/>
-              </a:rPr>
-              <a:t>;s</a:t>
-            </a:r>
-            <a:r>
-              <a:rPr lang="en-US" b="1" dirty="0" smtClean="0">
-                <a:solidFill>
-                  <a:srgbClr val="3366FF"/>
-                </a:solidFill>
-                <a:latin typeface="Courier New"/>
-                <a:cs typeface="Courier New"/>
-              </a:rPr>
-              <a:t>/^/"/;s/$/\\n"/' \</a:t>
-            </a:r>
-          </a:p>
-          <a:p>
-            <a:pPr marL="400050" lvl="1" indent="0">
-              <a:buNone/>
-            </a:pPr>
-            <a:r>
-              <a:rPr lang="en-US" b="1" dirty="0">
-                <a:solidFill>
-                  <a:srgbClr val="3366FF"/>
-                </a:solidFill>
-                <a:latin typeface="Courier New"/>
-                <a:cs typeface="Courier New"/>
-              </a:rPr>
-              <a:t> </a:t>
-            </a:r>
-            <a:r>
-              <a:rPr lang="en-US" b="1" dirty="0" smtClean="0">
-                <a:solidFill>
-                  <a:srgbClr val="3366FF"/>
-                </a:solidFill>
-                <a:latin typeface="Courier New"/>
-                <a:cs typeface="Courier New"/>
-              </a:rPr>
-              <a:t> $IN &gt;&gt;$OUT</a:t>
-            </a:r>
-          </a:p>
-          <a:p>
-            <a:pPr marL="400050" lvl="1" indent="0">
-              <a:buNone/>
-            </a:pPr>
-            <a:r>
-              <a:rPr lang="en-US" b="1" dirty="0" smtClean="0">
-                <a:solidFill>
-                  <a:srgbClr val="3366FF"/>
-                </a:solidFill>
-                <a:latin typeface="Courier New"/>
-                <a:cs typeface="Courier New"/>
-              </a:rPr>
-              <a:t>echo </a:t>
-            </a:r>
-            <a:r>
-              <a:rPr lang="en-US" b="1" dirty="0">
-                <a:solidFill>
-                  <a:srgbClr val="3366FF"/>
-                </a:solidFill>
-                <a:latin typeface="Courier New"/>
-                <a:cs typeface="Courier New"/>
-              </a:rPr>
-              <a:t>";" &gt;&gt;$</a:t>
-            </a:r>
-            <a:r>
-              <a:rPr lang="en-US" b="1" dirty="0" smtClean="0">
-                <a:solidFill>
-                  <a:srgbClr val="3366FF"/>
-                </a:solidFill>
                 <a:latin typeface="Courier New"/>
                 <a:cs typeface="Courier New"/>
               </a:rPr>

</xml_diff>

<commit_message>
Add slide about specialization constants in OpenCL 2.2
</commit_message>
<xml_diff>
--- a/slides/advanced_part2.pptx
+++ b/slides/advanced_part2.pptx
@@ -5,7 +5,7 @@
     <p:sldMasterId id="2147483648" r:id="rId1"/>
   </p:sldMasterIdLst>
   <p:notesMasterIdLst>
-    <p:notesMasterId r:id="rId25"/>
+    <p:notesMasterId r:id="rId26"/>
   </p:notesMasterIdLst>
   <p:sldIdLst>
     <p:sldId id="257" r:id="rId2"/>
@@ -28,9 +28,10 @@
     <p:sldId id="273" r:id="rId19"/>
     <p:sldId id="274" r:id="rId20"/>
     <p:sldId id="275" r:id="rId21"/>
-    <p:sldId id="279" r:id="rId22"/>
-    <p:sldId id="277" r:id="rId23"/>
-    <p:sldId id="280" r:id="rId24"/>
+    <p:sldId id="281" r:id="rId22"/>
+    <p:sldId id="279" r:id="rId23"/>
+    <p:sldId id="277" r:id="rId24"/>
+    <p:sldId id="280" r:id="rId25"/>
   </p:sldIdLst>
   <p:sldSz cx="9144000" cy="6858000" type="screen4x3"/>
   <p:notesSz cx="6858000" cy="9144000"/>
@@ -214,7 +215,7 @@
           <a:p>
             <a:fld id="{7FB74D45-CC88-7D46-9D48-9989C6A85D58}" type="datetimeFigureOut">
               <a:rPr lang="en-US" smtClean="0"/>
-              <a:t>19/04/16</a:t>
+              <a:t>22/07/16</a:t>
             </a:fld>
             <a:endParaRPr lang="en-US"/>
           </a:p>
@@ -1048,6 +1049,106 @@
 </p:notes>
 </file>
 
+<file path=ppt/notesSlides/notesSlide7.xml><?xml version="1.0" encoding="utf-8"?>
+<p:notes xmlns:a="http://schemas.openxmlformats.org/drawingml/2006/main" xmlns:r="http://schemas.openxmlformats.org/officeDocument/2006/relationships" xmlns:p="http://schemas.openxmlformats.org/presentationml/2006/main">
+  <p:cSld>
+    <p:spTree>
+      <p:nvGrpSpPr>
+        <p:cNvPr id="1" name=""/>
+        <p:cNvGrpSpPr/>
+        <p:nvPr/>
+      </p:nvGrpSpPr>
+      <p:grpSpPr>
+        <a:xfrm>
+          <a:off x="0" y="0"/>
+          <a:ext cx="0" cy="0"/>
+          <a:chOff x="0" y="0"/>
+          <a:chExt cx="0" cy="0"/>
+        </a:xfrm>
+      </p:grpSpPr>
+      <p:sp>
+        <p:nvSpPr>
+          <p:cNvPr id="2" name="Slide Image Placeholder 1"/>
+          <p:cNvSpPr>
+            <a:spLocks noGrp="1" noRot="1" noChangeAspect="1"/>
+          </p:cNvSpPr>
+          <p:nvPr>
+            <p:ph type="sldImg"/>
+          </p:nvPr>
+        </p:nvSpPr>
+        <p:spPr/>
+      </p:sp>
+      <p:sp>
+        <p:nvSpPr>
+          <p:cNvPr id="3" name="Notes Placeholder 2"/>
+          <p:cNvSpPr>
+            <a:spLocks noGrp="1"/>
+          </p:cNvSpPr>
+          <p:nvPr>
+            <p:ph type="body" idx="1"/>
+          </p:nvPr>
+        </p:nvSpPr>
+        <p:spPr/>
+        <p:txBody>
+          <a:bodyPr/>
+          <a:lstStyle/>
+          <a:p>
+            <a:r>
+              <a:rPr lang="en-GB" dirty="0" smtClean="0"/>
+              <a:t>Runtime</a:t>
+            </a:r>
+            <a:r>
+              <a:rPr lang="en-GB" baseline="0" dirty="0" smtClean="0"/>
+              <a:t> can perform constant folding, constant propagation </a:t>
+            </a:r>
+            <a:r>
+              <a:rPr lang="en-GB" baseline="0" dirty="0" err="1" smtClean="0"/>
+              <a:t>etc</a:t>
+            </a:r>
+            <a:r>
+              <a:rPr lang="en-GB" baseline="0" dirty="0" smtClean="0"/>
+              <a:t> before finalizing to native ISA</a:t>
+            </a:r>
+            <a:endParaRPr lang="en-GB" dirty="0"/>
+          </a:p>
+        </p:txBody>
+      </p:sp>
+      <p:sp>
+        <p:nvSpPr>
+          <p:cNvPr id="4" name="Slide Number Placeholder 3"/>
+          <p:cNvSpPr>
+            <a:spLocks noGrp="1"/>
+          </p:cNvSpPr>
+          <p:nvPr>
+            <p:ph type="sldNum" sz="quarter" idx="10"/>
+          </p:nvPr>
+        </p:nvSpPr>
+        <p:spPr/>
+        <p:txBody>
+          <a:bodyPr/>
+          <a:lstStyle/>
+          <a:p>
+            <a:fld id="{E0B00886-CC17-8E42-AE02-995FCC132C1C}" type="slidenum">
+              <a:rPr lang="en-US" smtClean="0"/>
+              <a:t>21</a:t>
+            </a:fld>
+            <a:endParaRPr lang="en-US"/>
+          </a:p>
+        </p:txBody>
+      </p:sp>
+    </p:spTree>
+    <p:extLst>
+      <p:ext uri="{BB962C8B-B14F-4D97-AF65-F5344CB8AC3E}">
+        <p14:creationId xmlns:p14="http://schemas.microsoft.com/office/powerpoint/2010/main" val="2018077648"/>
+      </p:ext>
+    </p:extLst>
+  </p:cSld>
+  <p:clrMapOvr>
+    <a:masterClrMapping/>
+  </p:clrMapOvr>
+</p:notes>
+</file>
+
 <file path=ppt/slideLayouts/slideLayout1.xml><?xml version="1.0" encoding="utf-8"?>
 <p:sldLayout xmlns:a="http://schemas.openxmlformats.org/drawingml/2006/main" xmlns:r="http://schemas.openxmlformats.org/officeDocument/2006/relationships" xmlns:p="http://schemas.openxmlformats.org/presentationml/2006/main" type="title" preserve="1">
   <p:cSld name="Title Slide">
@@ -1229,7 +1330,7 @@
           <a:p>
             <a:fld id="{D735EA19-98D7-5F47-83EC-D97C4239F8D5}" type="datetimeFigureOut">
               <a:rPr lang="en-US" smtClean="0"/>
-              <a:t>19/04/16</a:t>
+              <a:t>22/07/16</a:t>
             </a:fld>
             <a:endParaRPr lang="en-GB"/>
           </a:p>
@@ -1399,7 +1500,7 @@
           <a:p>
             <a:fld id="{D735EA19-98D7-5F47-83EC-D97C4239F8D5}" type="datetimeFigureOut">
               <a:rPr lang="en-US" smtClean="0"/>
-              <a:t>19/04/16</a:t>
+              <a:t>22/07/16</a:t>
             </a:fld>
             <a:endParaRPr lang="en-GB"/>
           </a:p>
@@ -1579,7 +1680,7 @@
           <a:p>
             <a:fld id="{D735EA19-98D7-5F47-83EC-D97C4239F8D5}" type="datetimeFigureOut">
               <a:rPr lang="en-US" smtClean="0"/>
-              <a:t>19/04/16</a:t>
+              <a:t>22/07/16</a:t>
             </a:fld>
             <a:endParaRPr lang="en-GB"/>
           </a:p>
@@ -1749,7 +1850,7 @@
           <a:p>
             <a:fld id="{D735EA19-98D7-5F47-83EC-D97C4239F8D5}" type="datetimeFigureOut">
               <a:rPr lang="en-US" smtClean="0"/>
-              <a:t>19/04/16</a:t>
+              <a:t>22/07/16</a:t>
             </a:fld>
             <a:endParaRPr lang="en-GB"/>
           </a:p>
@@ -1995,7 +2096,7 @@
           <a:p>
             <a:fld id="{D735EA19-98D7-5F47-83EC-D97C4239F8D5}" type="datetimeFigureOut">
               <a:rPr lang="en-US" smtClean="0"/>
-              <a:t>19/04/16</a:t>
+              <a:t>22/07/16</a:t>
             </a:fld>
             <a:endParaRPr lang="en-GB"/>
           </a:p>
@@ -2283,7 +2384,7 @@
           <a:p>
             <a:fld id="{D735EA19-98D7-5F47-83EC-D97C4239F8D5}" type="datetimeFigureOut">
               <a:rPr lang="en-US" smtClean="0"/>
-              <a:t>19/04/16</a:t>
+              <a:t>22/07/16</a:t>
             </a:fld>
             <a:endParaRPr lang="en-GB"/>
           </a:p>
@@ -2705,7 +2806,7 @@
           <a:p>
             <a:fld id="{D735EA19-98D7-5F47-83EC-D97C4239F8D5}" type="datetimeFigureOut">
               <a:rPr lang="en-US" smtClean="0"/>
-              <a:t>19/04/16</a:t>
+              <a:t>22/07/16</a:t>
             </a:fld>
             <a:endParaRPr lang="en-GB"/>
           </a:p>
@@ -2823,7 +2924,7 @@
           <a:p>
             <a:fld id="{D735EA19-98D7-5F47-83EC-D97C4239F8D5}" type="datetimeFigureOut">
               <a:rPr lang="en-US" smtClean="0"/>
-              <a:t>19/04/16</a:t>
+              <a:t>22/07/16</a:t>
             </a:fld>
             <a:endParaRPr lang="en-GB"/>
           </a:p>
@@ -2918,7 +3019,7 @@
           <a:p>
             <a:fld id="{D735EA19-98D7-5F47-83EC-D97C4239F8D5}" type="datetimeFigureOut">
               <a:rPr lang="en-US" smtClean="0"/>
-              <a:t>19/04/16</a:t>
+              <a:t>22/07/16</a:t>
             </a:fld>
             <a:endParaRPr lang="en-GB"/>
           </a:p>
@@ -3195,7 +3296,7 @@
           <a:p>
             <a:fld id="{D735EA19-98D7-5F47-83EC-D97C4239F8D5}" type="datetimeFigureOut">
               <a:rPr lang="en-US" smtClean="0"/>
-              <a:t>19/04/16</a:t>
+              <a:t>22/07/16</a:t>
             </a:fld>
             <a:endParaRPr lang="en-GB"/>
           </a:p>
@@ -3448,7 +3549,7 @@
           <a:p>
             <a:fld id="{D735EA19-98D7-5F47-83EC-D97C4239F8D5}" type="datetimeFigureOut">
               <a:rPr lang="en-US" smtClean="0"/>
-              <a:t>19/04/16</a:t>
+              <a:t>22/07/16</a:t>
             </a:fld>
             <a:endParaRPr lang="en-GB"/>
           </a:p>
@@ -3661,7 +3762,7 @@
           <a:p>
             <a:fld id="{D735EA19-98D7-5F47-83EC-D97C4239F8D5}" type="datetimeFigureOut">
               <a:rPr lang="en-US" smtClean="0"/>
-              <a:t>19/04/16</a:t>
+              <a:t>22/07/16</a:t>
             </a:fld>
             <a:endParaRPr lang="en-GB"/>
           </a:p>
@@ -8208,7 +8309,7 @@
 </file>
 
 <file path=ppt/slides/slide2.xml><?xml version="1.0" encoding="utf-8"?>
-<p:sld xmlns:a="http://schemas.openxmlformats.org/drawingml/2006/main" xmlns:r="http://schemas.openxmlformats.org/officeDocument/2006/relationships" xmlns:p="http://schemas.openxmlformats.org/presentationml/2006/main">
+<p:sld xmlns:a="http://schemas.openxmlformats.org/drawingml/2006/main" xmlns:r="http://schemas.openxmlformats.org/officeDocument/2006/relationships" xmlns:p="http://schemas.openxmlformats.org/presentationml/2006/main" show="0">
   <p:cSld>
     <p:spTree>
       <p:nvGrpSpPr>
@@ -8400,11 +8501,11 @@
   <p:clrMapOvr>
     <a:masterClrMapping/>
   </p:clrMapOvr>
-  <mc:AlternateContent xmlns:mc="http://schemas.openxmlformats.org/markup-compatibility/2006" xmlns:p14="http://schemas.microsoft.com/office/powerpoint/2010/main">
-    <mc:Choice Requires="p14">
+  <mc:AlternateContent xmlns:mc="http://schemas.openxmlformats.org/markup-compatibility/2006">
+    <mc:Choice xmlns:p14="http://schemas.microsoft.com/office/powerpoint/2010/main" Requires="p14">
       <p:transition spd="slow" p14:dur="2000"/>
     </mc:Choice>
-    <mc:Fallback xmlns="">
+    <mc:Fallback>
       <p:transition xmlns:p14="http://schemas.microsoft.com/office/powerpoint/2010/main" spd="slow"/>
     </mc:Fallback>
   </mc:AlternateContent>
@@ -8476,7 +8577,7 @@
         </p:spPr>
         <p:txBody>
           <a:bodyPr>
-            <a:normAutofit fontScale="77500" lnSpcReduction="20000"/>
+            <a:normAutofit fontScale="85000" lnSpcReduction="10000"/>
           </a:bodyPr>
           <a:lstStyle/>
           <a:p>
@@ -8629,22 +8730,19 @@
                 <a:latin typeface="Trebuchet MS"/>
                 <a:cs typeface="Trebuchet MS"/>
               </a:rPr>
-              <a:t>Toggling use of local memory</a:t>
-            </a:r>
-          </a:p>
-          <a:p>
-            <a:pPr>
-              <a:lnSpc>
-                <a:spcPct val="110000"/>
-              </a:lnSpc>
-            </a:pPr>
+              <a:t>Toggling use of local </a:t>
+            </a:r>
             <a:r>
               <a:rPr lang="en-GB" dirty="0" smtClean="0">
                 <a:latin typeface="Trebuchet MS"/>
                 <a:cs typeface="Trebuchet MS"/>
               </a:rPr>
-              <a:t>All of this requires that we are compiling our OpenCL sources at runtime – this doesn’t work if we are precompiling our kernels or using SPIR</a:t>
-            </a:r>
+              <a:t>memory</a:t>
+            </a:r>
+            <a:endParaRPr lang="en-GB" dirty="0" smtClean="0">
+              <a:latin typeface="Trebuchet MS"/>
+              <a:cs typeface="Trebuchet MS"/>
+            </a:endParaRPr>
           </a:p>
         </p:txBody>
       </p:sp>
@@ -8697,14 +8795,12 @@
         </p:nvSpPr>
         <p:spPr/>
         <p:txBody>
-          <a:bodyPr>
-            <a:normAutofit/>
-          </a:bodyPr>
+          <a:bodyPr/>
           <a:lstStyle/>
           <a:p>
             <a:r>
-              <a:rPr lang="en-GB" dirty="0" smtClean="0"/>
-              <a:t>Exercise: kernel compilation</a:t>
+              <a:rPr lang="en-GB" dirty="0" err="1" smtClean="0"/>
+              <a:t>Metaprogramming</a:t>
             </a:r>
             <a:endParaRPr lang="en-GB" dirty="0"/>
           </a:p>
@@ -8722,8 +8818,8 @@
         </p:nvSpPr>
         <p:spPr>
           <a:xfrm>
-            <a:off x="457200" y="1600200"/>
-            <a:ext cx="8229600" cy="5257800"/>
+            <a:off x="457200" y="1600201"/>
+            <a:ext cx="8229600" cy="2863866"/>
           </a:xfrm>
         </p:spPr>
         <p:txBody>
@@ -8732,161 +8828,705 @@
           </a:bodyPr>
           <a:lstStyle/>
           <a:p>
-            <a:r>
-              <a:rPr lang="en-GB" dirty="0" smtClean="0"/>
-              <a:t>The example is a simple bilateral filter</a:t>
-            </a:r>
-          </a:p>
-          <a:p>
-            <a:pPr lvl="1"/>
-            <a:r>
-              <a:rPr lang="en-GB" dirty="0" smtClean="0"/>
-              <a:t>Edge-preserving smoothing/noise reduction filter</a:t>
-            </a:r>
-          </a:p>
-          <a:p>
-            <a:pPr lvl="1"/>
-            <a:r>
-              <a:rPr lang="en-GB" dirty="0" smtClean="0"/>
-              <a:t>Each pixel in output is some function of its neighbouring pixels in input</a:t>
-            </a:r>
-          </a:p>
-          <a:p>
-            <a:pPr lvl="1"/>
-            <a:r>
-              <a:rPr lang="en-GB" dirty="0" smtClean="0"/>
-              <a:t>Uses </a:t>
-            </a:r>
-            <a:r>
-              <a:rPr lang="en-GB" dirty="0" err="1" smtClean="0">
-                <a:latin typeface="Courier New"/>
-                <a:cs typeface="Courier New"/>
-              </a:rPr>
-              <a:t>sqrt</a:t>
-            </a:r>
-            <a:r>
-              <a:rPr lang="en-GB" dirty="0" smtClean="0"/>
+            <a:pPr>
+              <a:lnSpc>
+                <a:spcPct val="110000"/>
+              </a:lnSpc>
+            </a:pPr>
+            <a:r>
+              <a:rPr lang="en-GB" dirty="0" smtClean="0">
+                <a:latin typeface="Trebuchet MS"/>
+                <a:cs typeface="Trebuchet MS"/>
+              </a:rPr>
+              <a:t>All </a:t>
+            </a:r>
+            <a:r>
+              <a:rPr lang="en-GB" dirty="0" smtClean="0">
+                <a:latin typeface="Trebuchet MS"/>
+                <a:cs typeface="Trebuchet MS"/>
+              </a:rPr>
+              <a:t>of this requires that we are compiling our OpenCL sources at runtime – this doesn’t work if we are precompiling our kernels or using </a:t>
+            </a:r>
+            <a:r>
+              <a:rPr lang="en-GB" dirty="0" smtClean="0">
+                <a:latin typeface="Trebuchet MS"/>
+                <a:cs typeface="Trebuchet MS"/>
+              </a:rPr>
+              <a:t>SPIR</a:t>
+            </a:r>
+          </a:p>
+          <a:p>
+            <a:pPr>
+              <a:lnSpc>
+                <a:spcPct val="110000"/>
+              </a:lnSpc>
+            </a:pPr>
+            <a:r>
+              <a:rPr lang="en-GB" dirty="0" smtClean="0">
+                <a:latin typeface="Trebuchet MS"/>
+                <a:cs typeface="Trebuchet MS"/>
+              </a:rPr>
+              <a:t>OpenCL 2.2 and SPIR-V provide the concept of </a:t>
+            </a:r>
+            <a:r>
+              <a:rPr lang="en-GB" i="1" dirty="0" smtClean="0">
+                <a:latin typeface="Trebuchet MS"/>
+                <a:cs typeface="Trebuchet MS"/>
+              </a:rPr>
+              <a:t>specialization constants</a:t>
+            </a:r>
+            <a:r>
+              <a:rPr lang="en-GB" dirty="0" smtClean="0">
+                <a:latin typeface="Trebuchet MS"/>
+                <a:cs typeface="Trebuchet MS"/>
+              </a:rPr>
+              <a:t>, which allow symbolic values to set at runtime</a:t>
+            </a:r>
+          </a:p>
+        </p:txBody>
+      </p:sp>
+      <p:sp>
+        <p:nvSpPr>
+          <p:cNvPr id="4" name="Content Placeholder 5"/>
+          <p:cNvSpPr txBox="1">
+            <a:spLocks/>
+          </p:cNvSpPr>
+          <p:nvPr/>
+        </p:nvSpPr>
+        <p:spPr>
+          <a:xfrm>
+            <a:off x="985283" y="4363467"/>
+            <a:ext cx="7199996" cy="2478637"/>
+          </a:xfrm>
+          <a:prstGeom prst="rect">
+            <a:avLst/>
+          </a:prstGeom>
+        </p:spPr>
+        <p:txBody>
+          <a:bodyPr>
+            <a:normAutofit fontScale="40000" lnSpcReduction="20000"/>
+          </a:bodyPr>
+          <a:lstStyle>
+            <a:lvl1pPr marL="342900" indent="-342900" algn="l" defTabSz="457200" rtl="0" eaLnBrk="1" latinLnBrk="0" hangingPunct="1">
+              <a:spcBef>
+                <a:spcPct val="20000"/>
+              </a:spcBef>
+              <a:buFont typeface="Arial"/>
+              <a:buChar char="•"/>
+              <a:defRPr sz="3200" kern="1200">
+                <a:solidFill>
+                  <a:schemeClr val="tx1"/>
+                </a:solidFill>
+                <a:latin typeface="+mn-lt"/>
+                <a:ea typeface="+mn-ea"/>
+                <a:cs typeface="+mn-cs"/>
+              </a:defRPr>
+            </a:lvl1pPr>
+            <a:lvl2pPr marL="742950" indent="-285750" algn="l" defTabSz="457200" rtl="0" eaLnBrk="1" latinLnBrk="0" hangingPunct="1">
+              <a:spcBef>
+                <a:spcPct val="20000"/>
+              </a:spcBef>
+              <a:buFont typeface="Arial"/>
+              <a:buChar char="–"/>
+              <a:defRPr sz="2800" kern="1200">
+                <a:solidFill>
+                  <a:schemeClr val="tx1"/>
+                </a:solidFill>
+                <a:latin typeface="+mn-lt"/>
+                <a:ea typeface="+mn-ea"/>
+                <a:cs typeface="+mn-cs"/>
+              </a:defRPr>
+            </a:lvl2pPr>
+            <a:lvl3pPr marL="1143000" indent="-228600" algn="l" defTabSz="457200" rtl="0" eaLnBrk="1" latinLnBrk="0" hangingPunct="1">
+              <a:spcBef>
+                <a:spcPct val="20000"/>
+              </a:spcBef>
+              <a:buFont typeface="Arial"/>
+              <a:buChar char="•"/>
+              <a:defRPr sz="2400" kern="1200">
+                <a:solidFill>
+                  <a:schemeClr val="tx1"/>
+                </a:solidFill>
+                <a:latin typeface="+mn-lt"/>
+                <a:ea typeface="+mn-ea"/>
+                <a:cs typeface="+mn-cs"/>
+              </a:defRPr>
+            </a:lvl3pPr>
+            <a:lvl4pPr marL="1600200" indent="-228600" algn="l" defTabSz="457200" rtl="0" eaLnBrk="1" latinLnBrk="0" hangingPunct="1">
+              <a:spcBef>
+                <a:spcPct val="20000"/>
+              </a:spcBef>
+              <a:buFont typeface="Arial"/>
+              <a:buChar char="–"/>
+              <a:defRPr sz="2000" kern="1200">
+                <a:solidFill>
+                  <a:schemeClr val="tx1"/>
+                </a:solidFill>
+                <a:latin typeface="+mn-lt"/>
+                <a:ea typeface="+mn-ea"/>
+                <a:cs typeface="+mn-cs"/>
+              </a:defRPr>
+            </a:lvl4pPr>
+            <a:lvl5pPr marL="2057400" indent="-228600" algn="l" defTabSz="457200" rtl="0" eaLnBrk="1" latinLnBrk="0" hangingPunct="1">
+              <a:spcBef>
+                <a:spcPct val="20000"/>
+              </a:spcBef>
+              <a:buFont typeface="Arial"/>
+              <a:buChar char="»"/>
+              <a:defRPr sz="2000" kern="1200">
+                <a:solidFill>
+                  <a:schemeClr val="tx1"/>
+                </a:solidFill>
+                <a:latin typeface="+mn-lt"/>
+                <a:ea typeface="+mn-ea"/>
+                <a:cs typeface="+mn-cs"/>
+              </a:defRPr>
+            </a:lvl5pPr>
+            <a:lvl6pPr marL="2514600" indent="-228600" algn="l" defTabSz="457200" rtl="0" eaLnBrk="1" latinLnBrk="0" hangingPunct="1">
+              <a:spcBef>
+                <a:spcPct val="20000"/>
+              </a:spcBef>
+              <a:buFont typeface="Arial"/>
+              <a:buChar char="•"/>
+              <a:defRPr sz="2000" kern="1200">
+                <a:solidFill>
+                  <a:schemeClr val="tx1"/>
+                </a:solidFill>
+                <a:latin typeface="+mn-lt"/>
+                <a:ea typeface="+mn-ea"/>
+                <a:cs typeface="+mn-cs"/>
+              </a:defRPr>
+            </a:lvl6pPr>
+            <a:lvl7pPr marL="2971800" indent="-228600" algn="l" defTabSz="457200" rtl="0" eaLnBrk="1" latinLnBrk="0" hangingPunct="1">
+              <a:spcBef>
+                <a:spcPct val="20000"/>
+              </a:spcBef>
+              <a:buFont typeface="Arial"/>
+              <a:buChar char="•"/>
+              <a:defRPr sz="2000" kern="1200">
+                <a:solidFill>
+                  <a:schemeClr val="tx1"/>
+                </a:solidFill>
+                <a:latin typeface="+mn-lt"/>
+                <a:ea typeface="+mn-ea"/>
+                <a:cs typeface="+mn-cs"/>
+              </a:defRPr>
+            </a:lvl7pPr>
+            <a:lvl8pPr marL="3429000" indent="-228600" algn="l" defTabSz="457200" rtl="0" eaLnBrk="1" latinLnBrk="0" hangingPunct="1">
+              <a:spcBef>
+                <a:spcPct val="20000"/>
+              </a:spcBef>
+              <a:buFont typeface="Arial"/>
+              <a:buChar char="•"/>
+              <a:defRPr sz="2000" kern="1200">
+                <a:solidFill>
+                  <a:schemeClr val="tx1"/>
+                </a:solidFill>
+                <a:latin typeface="+mn-lt"/>
+                <a:ea typeface="+mn-ea"/>
+                <a:cs typeface="+mn-cs"/>
+              </a:defRPr>
+            </a:lvl8pPr>
+            <a:lvl9pPr marL="3886200" indent="-228600" algn="l" defTabSz="457200" rtl="0" eaLnBrk="1" latinLnBrk="0" hangingPunct="1">
+              <a:spcBef>
+                <a:spcPct val="20000"/>
+              </a:spcBef>
+              <a:buFont typeface="Arial"/>
+              <a:buChar char="•"/>
+              <a:defRPr sz="2000" kern="1200">
+                <a:solidFill>
+                  <a:schemeClr val="tx1"/>
+                </a:solidFill>
+                <a:latin typeface="+mn-lt"/>
+                <a:ea typeface="+mn-ea"/>
+                <a:cs typeface="+mn-cs"/>
+              </a:defRPr>
+            </a:lvl9pPr>
+          </a:lstStyle>
+          <a:p>
+            <a:pPr marL="0" indent="0">
+              <a:buNone/>
+            </a:pPr>
+            <a:r>
+              <a:rPr lang="en-GB" b="1" dirty="0" smtClean="0">
+                <a:solidFill>
+                  <a:srgbClr val="008000"/>
+                </a:solidFill>
+                <a:latin typeface="Courier New"/>
+                <a:cs typeface="Courier New"/>
+              </a:rPr>
+              <a:t>// OpenCL C++ (</a:t>
+            </a:r>
+            <a:r>
+              <a:rPr lang="en-GB" b="1" dirty="0">
+                <a:solidFill>
+                  <a:srgbClr val="008000"/>
+                </a:solidFill>
+                <a:latin typeface="Courier New"/>
+                <a:cs typeface="Courier New"/>
+              </a:rPr>
+              <a:t>provisional</a:t>
+            </a:r>
+            <a:r>
+              <a:rPr lang="en-GB" b="1" dirty="0" smtClean="0">
+                <a:solidFill>
+                  <a:srgbClr val="008000"/>
+                </a:solidFill>
+                <a:latin typeface="Courier New"/>
+                <a:cs typeface="Courier New"/>
+              </a:rPr>
+              <a:t>)</a:t>
+            </a:r>
+            <a:r>
+              <a:rPr lang="en-GB" b="1" dirty="0">
+                <a:solidFill>
+                  <a:srgbClr val="008000"/>
+                </a:solidFill>
+                <a:latin typeface="Courier New"/>
+                <a:cs typeface="Courier New"/>
+              </a:rPr>
+              <a:t> </a:t>
+            </a:r>
+            <a:r>
+              <a:rPr lang="en-GB" b="1" dirty="0" smtClean="0">
+                <a:solidFill>
+                  <a:srgbClr val="008000"/>
+                </a:solidFill>
+                <a:latin typeface="Courier New"/>
+                <a:cs typeface="Courier New"/>
+              </a:rPr>
+              <a:t>kernel code</a:t>
+            </a:r>
+          </a:p>
+          <a:p>
+            <a:pPr marL="0" indent="0">
+              <a:buNone/>
+            </a:pPr>
+            <a:r>
+              <a:rPr lang="en-GB" b="1" dirty="0" smtClean="0">
+                <a:solidFill>
+                  <a:srgbClr val="008000"/>
+                </a:solidFill>
+                <a:latin typeface="Courier New"/>
+                <a:cs typeface="Courier New"/>
+              </a:rPr>
+              <a:t>// Create specialization constant with ID 1 and default value of 3.f</a:t>
+            </a:r>
+          </a:p>
+          <a:p>
+            <a:pPr marL="0" indent="0">
+              <a:buNone/>
+            </a:pPr>
+            <a:r>
+              <a:rPr lang="en-GB" b="1" dirty="0" smtClean="0">
+                <a:latin typeface="Courier New"/>
+                <a:cs typeface="Courier New"/>
+              </a:rPr>
+              <a:t>cl::</a:t>
+            </a:r>
+            <a:r>
+              <a:rPr lang="en-GB" b="1" dirty="0" err="1" smtClean="0">
+                <a:latin typeface="Courier New"/>
+                <a:cs typeface="Courier New"/>
+              </a:rPr>
+              <a:t>spec_constant</a:t>
+            </a:r>
+            <a:r>
+              <a:rPr lang="en-GB" b="1" dirty="0" smtClean="0">
+                <a:latin typeface="Courier New"/>
+                <a:cs typeface="Courier New"/>
+              </a:rPr>
+              <a:t>&lt;</a:t>
+            </a:r>
+            <a:r>
+              <a:rPr lang="en-GB" b="1" i="1" dirty="0" smtClean="0">
+                <a:solidFill>
+                  <a:srgbClr val="3366FF"/>
+                </a:solidFill>
+                <a:latin typeface="Courier New"/>
+                <a:cs typeface="Courier New"/>
+              </a:rPr>
+              <a:t>float</a:t>
+            </a:r>
+            <a:r>
+              <a:rPr lang="en-GB" b="1" dirty="0" smtClean="0">
+                <a:latin typeface="Courier New"/>
+                <a:cs typeface="Courier New"/>
+              </a:rPr>
               <a:t>, </a:t>
             </a:r>
             <a:r>
-              <a:rPr lang="en-GB" dirty="0" err="1" smtClean="0">
-                <a:latin typeface="Courier New"/>
-                <a:cs typeface="Courier New"/>
-              </a:rPr>
-              <a:t>exp</a:t>
-            </a:r>
-            <a:r>
-              <a:rPr lang="en-GB" dirty="0" smtClean="0"/>
-              <a:t> and </a:t>
-            </a:r>
-            <a:r>
-              <a:rPr lang="en-GB" dirty="0" smtClean="0">
-                <a:latin typeface="Courier New"/>
-                <a:cs typeface="Courier New"/>
-              </a:rPr>
-              <a:t>distance</a:t>
-            </a:r>
-            <a:r>
-              <a:rPr lang="en-GB" dirty="0" smtClean="0"/>
+              <a:rPr lang="en-GB" b="1" dirty="0" smtClean="0">
+                <a:solidFill>
+                  <a:srgbClr val="FF00FF"/>
+                </a:solidFill>
+                <a:latin typeface="Courier New"/>
+                <a:cs typeface="Courier New"/>
+              </a:rPr>
+              <a:t>1</a:t>
+            </a:r>
+            <a:r>
+              <a:rPr lang="en-GB" b="1" dirty="0" smtClean="0">
+                <a:latin typeface="Courier New"/>
+                <a:cs typeface="Courier New"/>
+              </a:rPr>
+              <a:t>&gt; factor = {</a:t>
+            </a:r>
+            <a:r>
+              <a:rPr lang="en-GB" b="1" dirty="0">
+                <a:solidFill>
+                  <a:srgbClr val="FF00FF"/>
+                </a:solidFill>
+                <a:latin typeface="Courier New"/>
+                <a:cs typeface="Courier New"/>
+              </a:rPr>
+              <a:t>3</a:t>
+            </a:r>
+            <a:r>
+              <a:rPr lang="en-GB" b="1" dirty="0" smtClean="0">
+                <a:solidFill>
+                  <a:srgbClr val="FF00FF"/>
+                </a:solidFill>
+                <a:latin typeface="Courier New"/>
+                <a:cs typeface="Courier New"/>
+              </a:rPr>
+              <a:t>.f</a:t>
+            </a:r>
+            <a:r>
+              <a:rPr lang="en-GB" b="1" dirty="0" smtClean="0">
+                <a:latin typeface="Courier New"/>
+                <a:cs typeface="Courier New"/>
+              </a:rPr>
+              <a:t>};</a:t>
+            </a:r>
+          </a:p>
+          <a:p>
+            <a:pPr marL="0" indent="0">
+              <a:buFont typeface="Arial"/>
+              <a:buNone/>
+            </a:pPr>
+            <a:r>
+              <a:rPr lang="en-GB" b="1" dirty="0" smtClean="0">
+                <a:latin typeface="Courier New"/>
+                <a:cs typeface="Courier New"/>
+              </a:rPr>
+              <a:t>data[</a:t>
+            </a:r>
+            <a:r>
+              <a:rPr lang="en-GB" b="1" dirty="0" err="1" smtClean="0">
+                <a:latin typeface="Courier New"/>
+                <a:cs typeface="Courier New"/>
+              </a:rPr>
+              <a:t>i</a:t>
+            </a:r>
+            <a:r>
+              <a:rPr lang="en-GB" b="1" dirty="0" smtClean="0">
+                <a:latin typeface="Courier New"/>
+                <a:cs typeface="Courier New"/>
+              </a:rPr>
+              <a:t>] *= </a:t>
+            </a:r>
+            <a:r>
+              <a:rPr lang="en-GB" b="1" dirty="0" err="1" smtClean="0">
+                <a:latin typeface="Courier New"/>
+                <a:cs typeface="Courier New"/>
+              </a:rPr>
+              <a:t>factor.</a:t>
+            </a:r>
+            <a:r>
+              <a:rPr lang="en-GB" b="1" dirty="0" err="1" smtClean="0">
+                <a:solidFill>
+                  <a:srgbClr val="3366FF"/>
+                </a:solidFill>
+                <a:latin typeface="Courier New"/>
+                <a:cs typeface="Courier New"/>
+              </a:rPr>
+              <a:t>get</a:t>
+            </a:r>
+            <a:r>
+              <a:rPr lang="en-GB" b="1" dirty="0" smtClean="0">
+                <a:latin typeface="Courier New"/>
+                <a:cs typeface="Courier New"/>
+              </a:rPr>
+              <a:t>();</a:t>
+            </a:r>
+          </a:p>
+          <a:p>
+            <a:pPr marL="0" indent="0">
+              <a:buFont typeface="Arial"/>
+              <a:buNone/>
+            </a:pPr>
+            <a:endParaRPr lang="en-GB" b="1" dirty="0" smtClean="0">
+              <a:latin typeface="Courier New"/>
+              <a:cs typeface="Courier New"/>
+            </a:endParaRPr>
+          </a:p>
+          <a:p>
+            <a:pPr marL="0" indent="0">
+              <a:buNone/>
+            </a:pPr>
+            <a:r>
+              <a:rPr lang="en-GB" b="1" dirty="0">
+                <a:solidFill>
+                  <a:srgbClr val="008000"/>
+                </a:solidFill>
+                <a:latin typeface="Courier New"/>
+                <a:cs typeface="Courier New"/>
+              </a:rPr>
+              <a:t>// </a:t>
+            </a:r>
+            <a:r>
+              <a:rPr lang="en-GB" b="1" dirty="0" smtClean="0">
+                <a:solidFill>
+                  <a:srgbClr val="008000"/>
+                </a:solidFill>
+                <a:latin typeface="Courier New"/>
+                <a:cs typeface="Courier New"/>
+              </a:rPr>
+              <a:t>Host code</a:t>
+            </a:r>
+          </a:p>
+          <a:p>
+            <a:pPr marL="0" indent="0">
+              <a:buFont typeface="Arial"/>
+              <a:buNone/>
+            </a:pPr>
+            <a:r>
+              <a:rPr lang="en-GB" b="1" dirty="0" smtClean="0">
+                <a:solidFill>
+                  <a:srgbClr val="008000"/>
+                </a:solidFill>
+                <a:latin typeface="Courier New"/>
+                <a:cs typeface="Courier New"/>
+              </a:rPr>
+              <a:t>// Set value of specialization constant and then build program</a:t>
+            </a:r>
+          </a:p>
+          <a:p>
+            <a:pPr marL="0" indent="0">
+              <a:buNone/>
+            </a:pPr>
+            <a:r>
+              <a:rPr lang="en-GB" b="1" i="1" dirty="0" err="1" smtClean="0">
+                <a:solidFill>
+                  <a:srgbClr val="3366FF"/>
+                </a:solidFill>
+                <a:latin typeface="Courier New"/>
+                <a:cs typeface="Courier New"/>
+              </a:rPr>
+              <a:t>cl_uint</a:t>
+            </a:r>
+            <a:r>
+              <a:rPr lang="en-GB" b="1" dirty="0" smtClean="0">
+                <a:latin typeface="Courier New"/>
+                <a:cs typeface="Courier New"/>
+              </a:rPr>
               <a:t> </a:t>
             </a:r>
             <a:r>
-              <a:rPr lang="en-GB" dirty="0" err="1" smtClean="0"/>
-              <a:t>builtins</a:t>
-            </a:r>
-            <a:endParaRPr lang="en-GB" dirty="0" smtClean="0"/>
-          </a:p>
-          <a:p>
-            <a:r>
-              <a:rPr lang="en-GB" dirty="0" smtClean="0"/>
-              <a:t>A fully working implementation of this code is provided as a starting point</a:t>
-            </a:r>
-          </a:p>
-          <a:p>
-            <a:r>
-              <a:rPr lang="en-GB" b="1" dirty="0" smtClean="0"/>
-              <a:t>NOTE:</a:t>
-            </a:r>
-            <a:r>
-              <a:rPr lang="en-GB" dirty="0" smtClean="0"/>
-              <a:t> Requires the SDL2 library</a:t>
-            </a:r>
-          </a:p>
-          <a:p>
-            <a:pPr lvl="1"/>
-            <a:r>
-              <a:rPr lang="en-GB" dirty="0" smtClean="0"/>
-              <a:t>Linux: </a:t>
-            </a:r>
-            <a:r>
-              <a:rPr lang="en-GB" dirty="0" smtClean="0">
-                <a:latin typeface="Courier New"/>
-                <a:cs typeface="Courier New"/>
-              </a:rPr>
-              <a:t>yum install SDL2-devel</a:t>
-            </a:r>
-            <a:r>
-              <a:rPr lang="en-GB" dirty="0" smtClean="0"/>
-              <a:t> or </a:t>
-            </a:r>
-            <a:r>
-              <a:rPr lang="en-GB" dirty="0" smtClean="0">
-                <a:latin typeface="Courier New"/>
-                <a:cs typeface="Courier New"/>
-              </a:rPr>
-              <a:t>apt-get install libsdl2</a:t>
-            </a:r>
-            <a:r>
-              <a:rPr lang="en-GB" dirty="0">
-                <a:latin typeface="Courier New"/>
-                <a:cs typeface="Courier New"/>
-              </a:rPr>
-              <a:t>-</a:t>
-            </a:r>
-            <a:r>
-              <a:rPr lang="en-GB" dirty="0" smtClean="0">
-                <a:latin typeface="Courier New"/>
-                <a:cs typeface="Courier New"/>
-              </a:rPr>
-              <a:t>dev</a:t>
-            </a:r>
-          </a:p>
-          <a:p>
-            <a:pPr lvl="1"/>
-            <a:r>
-              <a:rPr lang="en-GB" dirty="0" smtClean="0"/>
-              <a:t>OS X: Download and install SDL2 development framework</a:t>
-            </a:r>
-          </a:p>
-          <a:p>
-            <a:pPr lvl="2"/>
-            <a:r>
-              <a:rPr lang="en-GB" dirty="0">
-                <a:hlinkClick r:id="rId2"/>
-              </a:rPr>
-              <a:t>https://www.libsdl.org/download-2.0.</a:t>
-            </a:r>
-            <a:r>
-              <a:rPr lang="en-GB" dirty="0" smtClean="0">
-                <a:hlinkClick r:id="rId2"/>
-              </a:rPr>
-              <a:t>php</a:t>
-            </a:r>
-            <a:r>
-              <a:rPr lang="en-GB" dirty="0" smtClean="0"/>
+              <a:rPr lang="en-GB" b="1" dirty="0" err="1" smtClean="0">
+                <a:latin typeface="Courier New"/>
+                <a:cs typeface="Courier New"/>
+              </a:rPr>
+              <a:t>spec_id</a:t>
+            </a:r>
+            <a:r>
+              <a:rPr lang="en-GB" b="1" dirty="0" smtClean="0">
+                <a:latin typeface="Courier New"/>
+                <a:cs typeface="Courier New"/>
+              </a:rPr>
+              <a:t> = </a:t>
+            </a:r>
+            <a:r>
+              <a:rPr lang="en-GB" b="1" dirty="0">
+                <a:solidFill>
+                  <a:srgbClr val="FF00FF"/>
+                </a:solidFill>
+                <a:latin typeface="Courier New"/>
+                <a:cs typeface="Courier New"/>
+              </a:rPr>
+              <a:t>1</a:t>
+            </a:r>
+            <a:r>
+              <a:rPr lang="en-GB" b="1" dirty="0" smtClean="0">
+                <a:latin typeface="Courier New"/>
+                <a:cs typeface="Courier New"/>
+              </a:rPr>
+              <a:t>;</a:t>
+            </a:r>
+          </a:p>
+          <a:p>
+            <a:pPr marL="0" indent="0">
+              <a:buFont typeface="Arial"/>
+              <a:buNone/>
+            </a:pPr>
+            <a:r>
+              <a:rPr lang="en-GB" b="1" dirty="0" err="1" smtClean="0">
+                <a:solidFill>
+                  <a:srgbClr val="3366FF"/>
+                </a:solidFill>
+                <a:latin typeface="Courier New"/>
+                <a:cs typeface="Courier New"/>
+              </a:rPr>
+              <a:t>clSetProgramSpecializationConstant</a:t>
+            </a:r>
+            <a:r>
+              <a:rPr lang="en-GB" b="1" dirty="0" smtClean="0">
+                <a:latin typeface="Courier New"/>
+                <a:cs typeface="Courier New"/>
+              </a:rPr>
+              <a:t>(program, </a:t>
+            </a:r>
+            <a:r>
+              <a:rPr lang="en-GB" b="1" dirty="0" err="1" smtClean="0">
+                <a:latin typeface="Courier New"/>
+                <a:cs typeface="Courier New"/>
+              </a:rPr>
+              <a:t>spec_id</a:t>
+            </a:r>
+            <a:r>
+              <a:rPr lang="en-GB" b="1" dirty="0" smtClean="0">
+                <a:latin typeface="Courier New"/>
+                <a:cs typeface="Courier New"/>
+              </a:rPr>
+              <a:t>, </a:t>
+            </a:r>
+          </a:p>
+          <a:p>
+            <a:pPr marL="0" indent="0">
+              <a:buFont typeface="Arial"/>
+              <a:buNone/>
+            </a:pPr>
+            <a:r>
+              <a:rPr lang="en-GB" b="1" i="1" dirty="0">
+                <a:solidFill>
+                  <a:srgbClr val="3366FF"/>
+                </a:solidFill>
+                <a:latin typeface="Courier New"/>
+                <a:cs typeface="Courier New"/>
+              </a:rPr>
               <a:t> </a:t>
             </a:r>
-          </a:p>
-          <a:p>
-            <a:pPr lvl="1"/>
-            <a:r>
-              <a:rPr lang="en-GB" dirty="0"/>
-              <a:t>Windows: SDL2 libraries/headers provided with </a:t>
-            </a:r>
-            <a:r>
-              <a:rPr lang="en-GB" dirty="0" smtClean="0"/>
-              <a:t>exercises</a:t>
-            </a:r>
+            <a:r>
+              <a:rPr lang="en-GB" b="1" i="1" dirty="0" smtClean="0">
+                <a:solidFill>
+                  <a:srgbClr val="3366FF"/>
+                </a:solidFill>
+                <a:latin typeface="Courier New"/>
+                <a:cs typeface="Courier New"/>
+              </a:rPr>
+              <a:t>                                  </a:t>
+            </a:r>
+            <a:r>
+              <a:rPr lang="en-GB" b="1" i="1" dirty="0" err="1" smtClean="0">
+                <a:solidFill>
+                  <a:srgbClr val="3366FF"/>
+                </a:solidFill>
+                <a:latin typeface="Courier New"/>
+                <a:cs typeface="Courier New"/>
+              </a:rPr>
+              <a:t>sizeof</a:t>
+            </a:r>
+            <a:r>
+              <a:rPr lang="en-GB" b="1" dirty="0" smtClean="0">
+                <a:latin typeface="Courier New"/>
+                <a:cs typeface="Courier New"/>
+              </a:rPr>
+              <a:t>(</a:t>
+            </a:r>
+            <a:r>
+              <a:rPr lang="en-GB" b="1" i="1" dirty="0" smtClean="0">
+                <a:solidFill>
+                  <a:srgbClr val="3366FF"/>
+                </a:solidFill>
+                <a:latin typeface="Courier New"/>
+                <a:cs typeface="Courier New"/>
+              </a:rPr>
+              <a:t>float</a:t>
+            </a:r>
+            <a:r>
+              <a:rPr lang="en-GB" b="1" dirty="0" smtClean="0">
+                <a:latin typeface="Courier New"/>
+                <a:cs typeface="Courier New"/>
+              </a:rPr>
+              <a:t>), &amp;</a:t>
+            </a:r>
+            <a:r>
+              <a:rPr lang="en-GB" b="1" dirty="0" err="1" smtClean="0">
+                <a:latin typeface="Courier New"/>
+                <a:cs typeface="Courier New"/>
+              </a:rPr>
+              <a:t>userFactor</a:t>
+            </a:r>
+            <a:r>
+              <a:rPr lang="en-GB" b="1" dirty="0" smtClean="0">
+                <a:latin typeface="Courier New"/>
+                <a:cs typeface="Courier New"/>
+              </a:rPr>
+              <a:t>);</a:t>
+            </a:r>
+          </a:p>
+          <a:p>
+            <a:pPr marL="0" indent="0">
+              <a:buNone/>
+            </a:pPr>
+            <a:r>
+              <a:rPr lang="en-GB" b="1" dirty="0" err="1" smtClean="0">
+                <a:solidFill>
+                  <a:srgbClr val="3366FF"/>
+                </a:solidFill>
+                <a:latin typeface="Courier New"/>
+                <a:cs typeface="Courier New"/>
+              </a:rPr>
+              <a:t>clBuildProgram</a:t>
+            </a:r>
+            <a:r>
+              <a:rPr lang="en-GB" b="1" dirty="0" smtClean="0">
+                <a:latin typeface="Courier New"/>
+                <a:cs typeface="Courier New"/>
+              </a:rPr>
+              <a:t>(program, </a:t>
+            </a:r>
+            <a:r>
+              <a:rPr lang="en-GB" b="1" dirty="0">
+                <a:solidFill>
+                  <a:srgbClr val="FF00FF"/>
+                </a:solidFill>
+                <a:latin typeface="Courier New"/>
+                <a:cs typeface="Courier New"/>
+              </a:rPr>
+              <a:t>1</a:t>
+            </a:r>
+            <a:r>
+              <a:rPr lang="en-GB" b="1" dirty="0" smtClean="0">
+                <a:latin typeface="Courier New"/>
+                <a:cs typeface="Courier New"/>
+              </a:rPr>
+              <a:t>, &amp;device, </a:t>
+            </a:r>
+            <a:r>
+              <a:rPr lang="en-GB" b="1" dirty="0" smtClean="0">
+                <a:solidFill>
+                  <a:srgbClr val="4BACC6"/>
+                </a:solidFill>
+                <a:latin typeface="Courier New"/>
+                <a:cs typeface="Courier New"/>
+              </a:rPr>
+              <a:t>""</a:t>
+            </a:r>
+            <a:r>
+              <a:rPr lang="en-GB" b="1" dirty="0" smtClean="0">
+                <a:latin typeface="Courier New"/>
+                <a:cs typeface="Courier New"/>
+              </a:rPr>
+              <a:t>, NULL, NULL);</a:t>
+            </a:r>
+          </a:p>
+          <a:p>
+            <a:pPr marL="0" indent="0">
+              <a:buFont typeface="Arial"/>
+              <a:buNone/>
+            </a:pPr>
             <a:endParaRPr lang="en-GB" dirty="0"/>
           </a:p>
         </p:txBody>
@@ -8894,7 +9534,7 @@
     </p:spTree>
     <p:extLst>
       <p:ext uri="{BB962C8B-B14F-4D97-AF65-F5344CB8AC3E}">
-        <p14:creationId xmlns:p14="http://schemas.microsoft.com/office/powerpoint/2010/main" val="175238421"/>
+        <p14:creationId xmlns:p14="http://schemas.microsoft.com/office/powerpoint/2010/main" val="4235864006"/>
       </p:ext>
     </p:extLst>
   </p:cSld>
@@ -8904,9 +9544,510 @@
   <p:timing>
     <p:tnLst>
       <p:par>
-        <p:cTn xmlns:p14="http://schemas.microsoft.com/office/powerpoint/2010/main" id="1" dur="indefinite" restart="never" nodeType="tmRoot"/>
+        <p:cTn xmlns:p14="http://schemas.microsoft.com/office/powerpoint/2010/main" id="1" dur="indefinite" restart="never" nodeType="tmRoot">
+          <p:childTnLst>
+            <p:seq concurrent="1" nextAc="seek">
+              <p:cTn id="2" dur="indefinite" nodeType="mainSeq">
+                <p:childTnLst>
+                  <p:par>
+                    <p:cTn id="3" fill="hold">
+                      <p:stCondLst>
+                        <p:cond delay="indefinite"/>
+                        <p:cond evt="onBegin" delay="0">
+                          <p:tn val="2"/>
+                        </p:cond>
+                      </p:stCondLst>
+                      <p:childTnLst>
+                        <p:par>
+                          <p:cTn id="4" fill="hold">
+                            <p:stCondLst>
+                              <p:cond delay="0"/>
+                            </p:stCondLst>
+                            <p:childTnLst>
+                              <p:par>
+                                <p:cTn id="5" presetID="1" presetClass="entr" presetSubtype="0" fill="hold" grpId="0" nodeType="withEffect">
+                                  <p:stCondLst>
+                                    <p:cond delay="0"/>
+                                  </p:stCondLst>
+                                  <p:childTnLst>
+                                    <p:set>
+                                      <p:cBhvr>
+                                        <p:cTn id="6" dur="1" fill="hold">
+                                          <p:stCondLst>
+                                            <p:cond delay="0"/>
+                                          </p:stCondLst>
+                                        </p:cTn>
+                                        <p:tgtEl>
+                                          <p:spTgt spid="4">
+                                            <p:txEl>
+                                              <p:pRg st="0" end="0"/>
+                                            </p:txEl>
+                                          </p:spTgt>
+                                        </p:tgtEl>
+                                        <p:attrNameLst>
+                                          <p:attrName>style.visibility</p:attrName>
+                                        </p:attrNameLst>
+                                      </p:cBhvr>
+                                      <p:to>
+                                        <p:strVal val="visible"/>
+                                      </p:to>
+                                    </p:set>
+                                  </p:childTnLst>
+                                </p:cTn>
+                              </p:par>
+                            </p:childTnLst>
+                          </p:cTn>
+                        </p:par>
+                      </p:childTnLst>
+                    </p:cTn>
+                  </p:par>
+                  <p:par>
+                    <p:cTn id="7" fill="hold">
+                      <p:stCondLst>
+                        <p:cond delay="indefinite"/>
+                      </p:stCondLst>
+                      <p:childTnLst>
+                        <p:par>
+                          <p:cTn id="8" fill="hold">
+                            <p:stCondLst>
+                              <p:cond delay="0"/>
+                            </p:stCondLst>
+                            <p:childTnLst>
+                              <p:par>
+                                <p:cTn id="9" presetID="1" presetClass="entr" presetSubtype="0" fill="hold" grpId="0" nodeType="clickEffect">
+                                  <p:stCondLst>
+                                    <p:cond delay="0"/>
+                                  </p:stCondLst>
+                                  <p:childTnLst>
+                                    <p:set>
+                                      <p:cBhvr>
+                                        <p:cTn id="10" dur="1" fill="hold">
+                                          <p:stCondLst>
+                                            <p:cond delay="0"/>
+                                          </p:stCondLst>
+                                        </p:cTn>
+                                        <p:tgtEl>
+                                          <p:spTgt spid="4">
+                                            <p:txEl>
+                                              <p:pRg st="1" end="1"/>
+                                            </p:txEl>
+                                          </p:spTgt>
+                                        </p:tgtEl>
+                                        <p:attrNameLst>
+                                          <p:attrName>style.visibility</p:attrName>
+                                        </p:attrNameLst>
+                                      </p:cBhvr>
+                                      <p:to>
+                                        <p:strVal val="visible"/>
+                                      </p:to>
+                                    </p:set>
+                                  </p:childTnLst>
+                                </p:cTn>
+                              </p:par>
+                            </p:childTnLst>
+                          </p:cTn>
+                        </p:par>
+                      </p:childTnLst>
+                    </p:cTn>
+                  </p:par>
+                  <p:par>
+                    <p:cTn id="11" fill="hold">
+                      <p:stCondLst>
+                        <p:cond delay="indefinite"/>
+                      </p:stCondLst>
+                      <p:childTnLst>
+                        <p:par>
+                          <p:cTn id="12" fill="hold">
+                            <p:stCondLst>
+                              <p:cond delay="0"/>
+                            </p:stCondLst>
+                            <p:childTnLst>
+                              <p:par>
+                                <p:cTn id="13" presetID="1" presetClass="entr" presetSubtype="0" fill="hold" grpId="0" nodeType="clickEffect">
+                                  <p:stCondLst>
+                                    <p:cond delay="0"/>
+                                  </p:stCondLst>
+                                  <p:childTnLst>
+                                    <p:set>
+                                      <p:cBhvr>
+                                        <p:cTn id="14" dur="1" fill="hold">
+                                          <p:stCondLst>
+                                            <p:cond delay="0"/>
+                                          </p:stCondLst>
+                                        </p:cTn>
+                                        <p:tgtEl>
+                                          <p:spTgt spid="4">
+                                            <p:txEl>
+                                              <p:pRg st="2" end="2"/>
+                                            </p:txEl>
+                                          </p:spTgt>
+                                        </p:tgtEl>
+                                        <p:attrNameLst>
+                                          <p:attrName>style.visibility</p:attrName>
+                                        </p:attrNameLst>
+                                      </p:cBhvr>
+                                      <p:to>
+                                        <p:strVal val="visible"/>
+                                      </p:to>
+                                    </p:set>
+                                  </p:childTnLst>
+                                </p:cTn>
+                              </p:par>
+                              <p:par>
+                                <p:cTn id="15" presetID="1" presetClass="entr" presetSubtype="0" fill="hold" grpId="0" nodeType="withEffect">
+                                  <p:stCondLst>
+                                    <p:cond delay="0"/>
+                                  </p:stCondLst>
+                                  <p:childTnLst>
+                                    <p:set>
+                                      <p:cBhvr>
+                                        <p:cTn id="16" dur="1" fill="hold">
+                                          <p:stCondLst>
+                                            <p:cond delay="0"/>
+                                          </p:stCondLst>
+                                        </p:cTn>
+                                        <p:tgtEl>
+                                          <p:spTgt spid="4">
+                                            <p:txEl>
+                                              <p:pRg st="3" end="3"/>
+                                            </p:txEl>
+                                          </p:spTgt>
+                                        </p:tgtEl>
+                                        <p:attrNameLst>
+                                          <p:attrName>style.visibility</p:attrName>
+                                        </p:attrNameLst>
+                                      </p:cBhvr>
+                                      <p:to>
+                                        <p:strVal val="visible"/>
+                                      </p:to>
+                                    </p:set>
+                                  </p:childTnLst>
+                                </p:cTn>
+                              </p:par>
+                            </p:childTnLst>
+                          </p:cTn>
+                        </p:par>
+                      </p:childTnLst>
+                    </p:cTn>
+                  </p:par>
+                  <p:par>
+                    <p:cTn id="17" fill="hold">
+                      <p:stCondLst>
+                        <p:cond delay="indefinite"/>
+                      </p:stCondLst>
+                      <p:childTnLst>
+                        <p:par>
+                          <p:cTn id="18" fill="hold">
+                            <p:stCondLst>
+                              <p:cond delay="0"/>
+                            </p:stCondLst>
+                            <p:childTnLst>
+                              <p:par>
+                                <p:cTn id="19" presetID="1" presetClass="entr" presetSubtype="0" fill="hold" grpId="0" nodeType="clickEffect">
+                                  <p:stCondLst>
+                                    <p:cond delay="0"/>
+                                  </p:stCondLst>
+                                  <p:childTnLst>
+                                    <p:set>
+                                      <p:cBhvr>
+                                        <p:cTn id="20" dur="1" fill="hold">
+                                          <p:stCondLst>
+                                            <p:cond delay="0"/>
+                                          </p:stCondLst>
+                                        </p:cTn>
+                                        <p:tgtEl>
+                                          <p:spTgt spid="4">
+                                            <p:txEl>
+                                              <p:pRg st="5" end="5"/>
+                                            </p:txEl>
+                                          </p:spTgt>
+                                        </p:tgtEl>
+                                        <p:attrNameLst>
+                                          <p:attrName>style.visibility</p:attrName>
+                                        </p:attrNameLst>
+                                      </p:cBhvr>
+                                      <p:to>
+                                        <p:strVal val="visible"/>
+                                      </p:to>
+                                    </p:set>
+                                  </p:childTnLst>
+                                </p:cTn>
+                              </p:par>
+                            </p:childTnLst>
+                          </p:cTn>
+                        </p:par>
+                      </p:childTnLst>
+                    </p:cTn>
+                  </p:par>
+                  <p:par>
+                    <p:cTn id="21" fill="hold">
+                      <p:stCondLst>
+                        <p:cond delay="indefinite"/>
+                      </p:stCondLst>
+                      <p:childTnLst>
+                        <p:par>
+                          <p:cTn id="22" fill="hold">
+                            <p:stCondLst>
+                              <p:cond delay="0"/>
+                            </p:stCondLst>
+                            <p:childTnLst>
+                              <p:par>
+                                <p:cTn id="23" presetID="1" presetClass="entr" presetSubtype="0" fill="hold" grpId="0" nodeType="clickEffect">
+                                  <p:stCondLst>
+                                    <p:cond delay="0"/>
+                                  </p:stCondLst>
+                                  <p:childTnLst>
+                                    <p:set>
+                                      <p:cBhvr>
+                                        <p:cTn id="24" dur="1" fill="hold">
+                                          <p:stCondLst>
+                                            <p:cond delay="0"/>
+                                          </p:stCondLst>
+                                        </p:cTn>
+                                        <p:tgtEl>
+                                          <p:spTgt spid="4">
+                                            <p:txEl>
+                                              <p:pRg st="6" end="6"/>
+                                            </p:txEl>
+                                          </p:spTgt>
+                                        </p:tgtEl>
+                                        <p:attrNameLst>
+                                          <p:attrName>style.visibility</p:attrName>
+                                        </p:attrNameLst>
+                                      </p:cBhvr>
+                                      <p:to>
+                                        <p:strVal val="visible"/>
+                                      </p:to>
+                                    </p:set>
+                                  </p:childTnLst>
+                                </p:cTn>
+                              </p:par>
+                            </p:childTnLst>
+                          </p:cTn>
+                        </p:par>
+                      </p:childTnLst>
+                    </p:cTn>
+                  </p:par>
+                  <p:par>
+                    <p:cTn id="25" fill="hold">
+                      <p:stCondLst>
+                        <p:cond delay="indefinite"/>
+                      </p:stCondLst>
+                      <p:childTnLst>
+                        <p:par>
+                          <p:cTn id="26" fill="hold">
+                            <p:stCondLst>
+                              <p:cond delay="0"/>
+                            </p:stCondLst>
+                            <p:childTnLst>
+                              <p:par>
+                                <p:cTn id="27" presetID="1" presetClass="entr" presetSubtype="0" fill="hold" grpId="0" nodeType="clickEffect">
+                                  <p:stCondLst>
+                                    <p:cond delay="0"/>
+                                  </p:stCondLst>
+                                  <p:childTnLst>
+                                    <p:set>
+                                      <p:cBhvr>
+                                        <p:cTn id="28" dur="1" fill="hold">
+                                          <p:stCondLst>
+                                            <p:cond delay="0"/>
+                                          </p:stCondLst>
+                                        </p:cTn>
+                                        <p:tgtEl>
+                                          <p:spTgt spid="4">
+                                            <p:txEl>
+                                              <p:pRg st="7" end="7"/>
+                                            </p:txEl>
+                                          </p:spTgt>
+                                        </p:tgtEl>
+                                        <p:attrNameLst>
+                                          <p:attrName>style.visibility</p:attrName>
+                                        </p:attrNameLst>
+                                      </p:cBhvr>
+                                      <p:to>
+                                        <p:strVal val="visible"/>
+                                      </p:to>
+                                    </p:set>
+                                  </p:childTnLst>
+                                </p:cTn>
+                              </p:par>
+                            </p:childTnLst>
+                          </p:cTn>
+                        </p:par>
+                      </p:childTnLst>
+                    </p:cTn>
+                  </p:par>
+                  <p:par>
+                    <p:cTn id="29" fill="hold">
+                      <p:stCondLst>
+                        <p:cond delay="indefinite"/>
+                      </p:stCondLst>
+                      <p:childTnLst>
+                        <p:par>
+                          <p:cTn id="30" fill="hold">
+                            <p:stCondLst>
+                              <p:cond delay="0"/>
+                            </p:stCondLst>
+                            <p:childTnLst>
+                              <p:par>
+                                <p:cTn id="31" presetID="1" presetClass="entr" presetSubtype="0" fill="hold" grpId="0" nodeType="clickEffect">
+                                  <p:stCondLst>
+                                    <p:cond delay="0"/>
+                                  </p:stCondLst>
+                                  <p:childTnLst>
+                                    <p:set>
+                                      <p:cBhvr>
+                                        <p:cTn id="32" dur="1" fill="hold">
+                                          <p:stCondLst>
+                                            <p:cond delay="0"/>
+                                          </p:stCondLst>
+                                        </p:cTn>
+                                        <p:tgtEl>
+                                          <p:spTgt spid="4">
+                                            <p:txEl>
+                                              <p:pRg st="8" end="8"/>
+                                            </p:txEl>
+                                          </p:spTgt>
+                                        </p:tgtEl>
+                                        <p:attrNameLst>
+                                          <p:attrName>style.visibility</p:attrName>
+                                        </p:attrNameLst>
+                                      </p:cBhvr>
+                                      <p:to>
+                                        <p:strVal val="visible"/>
+                                      </p:to>
+                                    </p:set>
+                                  </p:childTnLst>
+                                </p:cTn>
+                              </p:par>
+                            </p:childTnLst>
+                          </p:cTn>
+                        </p:par>
+                      </p:childTnLst>
+                    </p:cTn>
+                  </p:par>
+                  <p:par>
+                    <p:cTn id="33" fill="hold">
+                      <p:stCondLst>
+                        <p:cond delay="indefinite"/>
+                      </p:stCondLst>
+                      <p:childTnLst>
+                        <p:par>
+                          <p:cTn id="34" fill="hold">
+                            <p:stCondLst>
+                              <p:cond delay="0"/>
+                            </p:stCondLst>
+                            <p:childTnLst>
+                              <p:par>
+                                <p:cTn id="35" presetID="1" presetClass="entr" presetSubtype="0" fill="hold" grpId="0" nodeType="clickEffect">
+                                  <p:stCondLst>
+                                    <p:cond delay="0"/>
+                                  </p:stCondLst>
+                                  <p:childTnLst>
+                                    <p:set>
+                                      <p:cBhvr>
+                                        <p:cTn id="36" dur="1" fill="hold">
+                                          <p:stCondLst>
+                                            <p:cond delay="0"/>
+                                          </p:stCondLst>
+                                        </p:cTn>
+                                        <p:tgtEl>
+                                          <p:spTgt spid="4">
+                                            <p:txEl>
+                                              <p:pRg st="9" end="9"/>
+                                            </p:txEl>
+                                          </p:spTgt>
+                                        </p:tgtEl>
+                                        <p:attrNameLst>
+                                          <p:attrName>style.visibility</p:attrName>
+                                        </p:attrNameLst>
+                                      </p:cBhvr>
+                                      <p:to>
+                                        <p:strVal val="visible"/>
+                                      </p:to>
+                                    </p:set>
+                                  </p:childTnLst>
+                                </p:cTn>
+                              </p:par>
+                            </p:childTnLst>
+                          </p:cTn>
+                        </p:par>
+                      </p:childTnLst>
+                    </p:cTn>
+                  </p:par>
+                  <p:par>
+                    <p:cTn id="37" fill="hold">
+                      <p:stCondLst>
+                        <p:cond delay="indefinite"/>
+                      </p:stCondLst>
+                      <p:childTnLst>
+                        <p:par>
+                          <p:cTn id="38" fill="hold">
+                            <p:stCondLst>
+                              <p:cond delay="0"/>
+                            </p:stCondLst>
+                            <p:childTnLst>
+                              <p:par>
+                                <p:cTn id="39" presetID="1" presetClass="entr" presetSubtype="0" fill="hold" grpId="0" nodeType="clickEffect">
+                                  <p:stCondLst>
+                                    <p:cond delay="0"/>
+                                  </p:stCondLst>
+                                  <p:childTnLst>
+                                    <p:set>
+                                      <p:cBhvr>
+                                        <p:cTn id="40" dur="1" fill="hold">
+                                          <p:stCondLst>
+                                            <p:cond delay="0"/>
+                                          </p:stCondLst>
+                                        </p:cTn>
+                                        <p:tgtEl>
+                                          <p:spTgt spid="4">
+                                            <p:txEl>
+                                              <p:pRg st="10" end="10"/>
+                                            </p:txEl>
+                                          </p:spTgt>
+                                        </p:tgtEl>
+                                        <p:attrNameLst>
+                                          <p:attrName>style.visibility</p:attrName>
+                                        </p:attrNameLst>
+                                      </p:cBhvr>
+                                      <p:to>
+                                        <p:strVal val="visible"/>
+                                      </p:to>
+                                    </p:set>
+                                  </p:childTnLst>
+                                </p:cTn>
+                              </p:par>
+                            </p:childTnLst>
+                          </p:cTn>
+                        </p:par>
+                      </p:childTnLst>
+                    </p:cTn>
+                  </p:par>
+                </p:childTnLst>
+              </p:cTn>
+              <p:prevCondLst>
+                <p:cond evt="onPrev" delay="0">
+                  <p:tgtEl>
+                    <p:sldTgt/>
+                  </p:tgtEl>
+                </p:cond>
+              </p:prevCondLst>
+              <p:nextCondLst>
+                <p:cond evt="onNext" delay="0">
+                  <p:tgtEl>
+                    <p:sldTgt/>
+                  </p:tgtEl>
+                </p:cond>
+              </p:nextCondLst>
+            </p:seq>
+          </p:childTnLst>
+        </p:cTn>
       </p:par>
     </p:tnLst>
+    <p:bldLst>
+      <p:bldP spid="4" grpId="0" build="p"/>
+    </p:bldLst>
   </p:timing>
 </p:sld>
 </file>
@@ -8938,12 +10079,7 @@
             <p:ph type="title"/>
           </p:nvPr>
         </p:nvSpPr>
-        <p:spPr>
-          <a:xfrm>
-            <a:off x="0" y="274638"/>
-            <a:ext cx="9144000" cy="1143000"/>
-          </a:xfrm>
-        </p:spPr>
+        <p:spPr/>
         <p:txBody>
           <a:bodyPr>
             <a:normAutofit/>
@@ -8970,185 +10106,170 @@
         </p:nvSpPr>
         <p:spPr>
           <a:xfrm>
-            <a:off x="457200" y="1417638"/>
-            <a:ext cx="8229600" cy="5440362"/>
+            <a:off x="457200" y="1600200"/>
+            <a:ext cx="8229600" cy="5257800"/>
           </a:xfrm>
         </p:spPr>
         <p:txBody>
           <a:bodyPr>
-            <a:normAutofit fontScale="55000" lnSpcReduction="20000"/>
+            <a:normAutofit fontScale="85000" lnSpcReduction="10000"/>
           </a:bodyPr>
           <a:lstStyle/>
           <a:p>
-            <a:pPr>
-              <a:lnSpc>
-                <a:spcPct val="120000"/>
-              </a:lnSpc>
-            </a:pPr>
             <a:r>
               <a:rPr lang="en-GB" dirty="0" smtClean="0"/>
-              <a:t>Find the starting code in e.g. ~/IWOCL2016</a:t>
-            </a:r>
+              <a:t>The example is a simple bilateral filter</a:t>
+            </a:r>
+          </a:p>
+          <a:p>
+            <a:pPr lvl="1"/>
+            <a:r>
+              <a:rPr lang="en-GB" dirty="0" smtClean="0"/>
+              <a:t>Edge-preserving smoothing/noise reduction filter</a:t>
+            </a:r>
+          </a:p>
+          <a:p>
+            <a:pPr lvl="1"/>
+            <a:r>
+              <a:rPr lang="en-GB" dirty="0" smtClean="0"/>
+              <a:t>Each pixel in output is some function of its neighbouring pixels in input</a:t>
+            </a:r>
+          </a:p>
+          <a:p>
+            <a:pPr lvl="1"/>
+            <a:r>
+              <a:rPr lang="en-GB" dirty="0" smtClean="0"/>
+              <a:t>Uses </a:t>
+            </a:r>
+            <a:r>
+              <a:rPr lang="en-GB" dirty="0" err="1" smtClean="0">
+                <a:latin typeface="Courier New"/>
+                <a:cs typeface="Courier New"/>
+              </a:rPr>
+              <a:t>sqrt</a:t>
+            </a:r>
+            <a:r>
+              <a:rPr lang="en-GB" dirty="0" smtClean="0"/>
+              <a:t>, </a:t>
+            </a:r>
+            <a:r>
+              <a:rPr lang="en-GB" dirty="0" err="1" smtClean="0">
+                <a:latin typeface="Courier New"/>
+                <a:cs typeface="Courier New"/>
+              </a:rPr>
+              <a:t>exp</a:t>
+            </a:r>
+            <a:r>
+              <a:rPr lang="en-GB" dirty="0" smtClean="0"/>
+              <a:t> and </a:t>
+            </a:r>
+            <a:r>
+              <a:rPr lang="en-GB" dirty="0" smtClean="0">
+                <a:latin typeface="Courier New"/>
+                <a:cs typeface="Courier New"/>
+              </a:rPr>
+              <a:t>distance</a:t>
+            </a:r>
+            <a:r>
+              <a:rPr lang="en-GB" dirty="0" smtClean="0"/>
+              <a:t> </a:t>
+            </a:r>
+            <a:r>
+              <a:rPr lang="en-GB" dirty="0" err="1" smtClean="0"/>
+              <a:t>builtins</a:t>
+            </a:r>
+            <a:endParaRPr lang="en-GB" dirty="0" smtClean="0"/>
+          </a:p>
+          <a:p>
+            <a:r>
+              <a:rPr lang="en-GB" dirty="0" smtClean="0"/>
+              <a:t>A fully working implementation of this code is provided as a starting point</a:t>
+            </a:r>
+          </a:p>
+          <a:p>
+            <a:r>
+              <a:rPr lang="en-GB" b="1" dirty="0" smtClean="0"/>
+              <a:t>NOTE:</a:t>
+            </a:r>
+            <a:r>
+              <a:rPr lang="en-GB" dirty="0" smtClean="0"/>
+              <a:t> Requires the SDL2 library</a:t>
+            </a:r>
+          </a:p>
+          <a:p>
+            <a:pPr lvl="1"/>
+            <a:r>
+              <a:rPr lang="en-GB" dirty="0" smtClean="0"/>
+              <a:t>Linux: </a:t>
+            </a:r>
+            <a:r>
+              <a:rPr lang="en-GB" dirty="0" smtClean="0">
+                <a:latin typeface="Courier New"/>
+                <a:cs typeface="Courier New"/>
+              </a:rPr>
+              <a:t>yum install SDL2-devel</a:t>
+            </a:r>
+            <a:r>
+              <a:rPr lang="en-GB" dirty="0" smtClean="0"/>
+              <a:t> or </a:t>
+            </a:r>
+            <a:r>
+              <a:rPr lang="en-GB" dirty="0" smtClean="0">
+                <a:latin typeface="Courier New"/>
+                <a:cs typeface="Courier New"/>
+              </a:rPr>
+              <a:t>apt-get install libsdl2</a:t>
+            </a:r>
+            <a:r>
+              <a:rPr lang="en-GB" dirty="0">
+                <a:latin typeface="Courier New"/>
+                <a:cs typeface="Courier New"/>
+              </a:rPr>
+              <a:t>-</a:t>
+            </a:r>
+            <a:r>
+              <a:rPr lang="en-GB" dirty="0" smtClean="0">
+                <a:latin typeface="Courier New"/>
+                <a:cs typeface="Courier New"/>
+              </a:rPr>
+              <a:t>dev</a:t>
+            </a:r>
+          </a:p>
+          <a:p>
+            <a:pPr lvl="1"/>
+            <a:r>
+              <a:rPr lang="en-GB" dirty="0" smtClean="0"/>
+              <a:t>OS X: Download and install SDL2 development framework</a:t>
+            </a:r>
+          </a:p>
+          <a:p>
+            <a:pPr lvl="2"/>
+            <a:r>
+              <a:rPr lang="en-GB" dirty="0">
+                <a:hlinkClick r:id="rId2"/>
+              </a:rPr>
+              <a:t>https://www.libsdl.org/download-2.0.</a:t>
+            </a:r>
+            <a:r>
+              <a:rPr lang="en-GB" dirty="0" smtClean="0">
+                <a:hlinkClick r:id="rId2"/>
+              </a:rPr>
+              <a:t>php</a:t>
+            </a:r>
+            <a:r>
+              <a:rPr lang="en-GB" dirty="0" smtClean="0"/>
+              <a:t> </a:t>
+            </a:r>
+          </a:p>
+          <a:p>
+            <a:pPr lvl="1"/>
             <a:r>
               <a:rPr lang="en-GB" dirty="0"/>
-              <a:t>/solutions/Bilateral</a:t>
-            </a:r>
-            <a:endParaRPr lang="en-GB" dirty="0" smtClean="0"/>
-          </a:p>
-          <a:p>
-            <a:pPr>
-              <a:lnSpc>
-                <a:spcPct val="120000"/>
-              </a:lnSpc>
-            </a:pPr>
+              <a:t>Windows: SDL2 libraries/headers provided with </a:t>
+            </a:r>
             <a:r>
               <a:rPr lang="en-GB" dirty="0" smtClean="0"/>
-              <a:t>Experiment with some OpenCL compiler options to improve performance</a:t>
-            </a:r>
-          </a:p>
-          <a:p>
-            <a:pPr>
-              <a:lnSpc>
-                <a:spcPct val="120000"/>
-              </a:lnSpc>
-            </a:pPr>
-            <a:r>
-              <a:rPr lang="en-GB" dirty="0" smtClean="0"/>
-              <a:t>Try embedding some simulation parameters into the kernel as compile-time constants using OpenCL build options</a:t>
-            </a:r>
-          </a:p>
-          <a:p>
-            <a:pPr lvl="1">
-              <a:lnSpc>
-                <a:spcPct val="120000"/>
-              </a:lnSpc>
-            </a:pPr>
-            <a:r>
-              <a:rPr lang="en-GB" dirty="0" smtClean="0"/>
-              <a:t>Disclaimer: This might not help for every parameter or on every device – try it with a few!</a:t>
-            </a:r>
-          </a:p>
-          <a:p>
-            <a:pPr>
-              <a:lnSpc>
-                <a:spcPct val="120000"/>
-              </a:lnSpc>
-            </a:pPr>
-            <a:r>
-              <a:rPr lang="en-GB" dirty="0"/>
-              <a:t>An example solution will be </a:t>
-            </a:r>
-            <a:r>
-              <a:rPr lang="en-GB" dirty="0" smtClean="0"/>
-              <a:t>provided</a:t>
-            </a:r>
-          </a:p>
-          <a:p>
-            <a:pPr>
-              <a:lnSpc>
-                <a:spcPct val="120000"/>
-              </a:lnSpc>
-            </a:pPr>
-            <a:r>
-              <a:rPr lang="en-GB" dirty="0" smtClean="0"/>
-              <a:t>Tip: If verification is too slow, use </a:t>
-            </a:r>
-            <a:r>
-              <a:rPr lang="en-GB" b="1" dirty="0" smtClean="0">
-                <a:solidFill>
-                  <a:srgbClr val="3366FF"/>
-                </a:solidFill>
-                <a:latin typeface="Courier New"/>
-                <a:cs typeface="Courier New"/>
-              </a:rPr>
-              <a:t>--</a:t>
-            </a:r>
-            <a:r>
-              <a:rPr lang="en-GB" b="1" dirty="0" err="1" smtClean="0">
-                <a:solidFill>
-                  <a:srgbClr val="3366FF"/>
-                </a:solidFill>
-                <a:latin typeface="Courier New"/>
-                <a:cs typeface="Courier New"/>
-              </a:rPr>
-              <a:t>noverify</a:t>
-            </a:r>
-            <a:r>
-              <a:rPr lang="en-GB" dirty="0" smtClean="0"/>
-              <a:t> flag or set </a:t>
-            </a:r>
-            <a:r>
-              <a:rPr lang="en-GB" b="1" dirty="0" smtClean="0">
-                <a:solidFill>
-                  <a:srgbClr val="3366FF"/>
-                </a:solidFill>
-                <a:latin typeface="Courier New"/>
-                <a:cs typeface="Courier New"/>
-              </a:rPr>
-              <a:t>verify = false</a:t>
-            </a:r>
-            <a:endParaRPr lang="en-GB" dirty="0"/>
-          </a:p>
-          <a:p>
-            <a:pPr marL="0" indent="0">
-              <a:lnSpc>
-                <a:spcPct val="120000"/>
-              </a:lnSpc>
-              <a:buNone/>
-            </a:pPr>
-            <a:endParaRPr lang="en-GB" dirty="0" smtClean="0"/>
-          </a:p>
-          <a:p>
-            <a:pPr marL="0" indent="0">
-              <a:lnSpc>
-                <a:spcPct val="120000"/>
-              </a:lnSpc>
-              <a:buNone/>
-            </a:pPr>
-            <a:r>
-              <a:rPr lang="en-GB" b="1" dirty="0" smtClean="0"/>
-              <a:t>Extras:</a:t>
-            </a:r>
-          </a:p>
-          <a:p>
-            <a:pPr>
-              <a:lnSpc>
-                <a:spcPct val="120000"/>
-              </a:lnSpc>
-            </a:pPr>
-            <a:r>
-              <a:rPr lang="en-GB" dirty="0" smtClean="0"/>
-              <a:t>Make the work-group size inside the kernel a compile-time constant, and change the local memory allocation to only use as much as is needed</a:t>
-            </a:r>
-          </a:p>
-          <a:p>
-            <a:pPr>
-              <a:lnSpc>
-                <a:spcPct val="120000"/>
-              </a:lnSpc>
-            </a:pPr>
-            <a:r>
-              <a:rPr lang="en-GB" dirty="0" smtClean="0"/>
-              <a:t>Modify </a:t>
-            </a:r>
-            <a:r>
-              <a:rPr lang="en-GB" dirty="0"/>
-              <a:t>the kernel to allow the runtime to toggle whether or not local memory is used at all, which could </a:t>
-            </a:r>
-            <a:r>
-              <a:rPr lang="en-GB" dirty="0" smtClean="0"/>
-              <a:t>improve performance portability on devices without physical local memory</a:t>
-            </a:r>
-          </a:p>
-          <a:p>
-            <a:pPr>
-              <a:lnSpc>
-                <a:spcPct val="120000"/>
-              </a:lnSpc>
-            </a:pPr>
-            <a:r>
-              <a:rPr lang="en-GB" dirty="0" smtClean="0"/>
-              <a:t>Get the compiler to generate the assembly code and look through this, correlating it to your source code</a:t>
+              <a:t>exercises</a:t>
             </a:r>
             <a:endParaRPr lang="en-GB" dirty="0"/>
           </a:p>
@@ -9157,7 +10278,7 @@
     </p:spTree>
     <p:extLst>
       <p:ext uri="{BB962C8B-B14F-4D97-AF65-F5344CB8AC3E}">
-        <p14:creationId xmlns:p14="http://schemas.microsoft.com/office/powerpoint/2010/main" val="359158878"/>
+        <p14:creationId xmlns:p14="http://schemas.microsoft.com/office/powerpoint/2010/main" val="175238421"/>
       </p:ext>
     </p:extLst>
   </p:cSld>
@@ -9201,15 +10322,23 @@
             <p:ph type="title"/>
           </p:nvPr>
         </p:nvSpPr>
-        <p:spPr/>
+        <p:spPr>
+          <a:xfrm>
+            <a:off x="0" y="274638"/>
+            <a:ext cx="9144000" cy="1143000"/>
+          </a:xfrm>
+        </p:spPr>
         <p:txBody>
-          <a:bodyPr/>
+          <a:bodyPr>
+            <a:normAutofit/>
+          </a:bodyPr>
           <a:lstStyle/>
           <a:p>
             <a:r>
-              <a:rPr lang="en-GB" dirty="0"/>
+              <a:rPr lang="en-GB" dirty="0" smtClean="0"/>
               <a:t>Exercise: kernel compilation</a:t>
             </a:r>
+            <a:endParaRPr lang="en-GB" dirty="0"/>
           </a:p>
         </p:txBody>
       </p:sp>
@@ -9231,205 +10360,205 @@
         </p:spPr>
         <p:txBody>
           <a:bodyPr>
-            <a:normAutofit/>
+            <a:normAutofit fontScale="55000" lnSpcReduction="20000"/>
           </a:bodyPr>
           <a:lstStyle/>
           <a:p>
+            <a:pPr>
+              <a:lnSpc>
+                <a:spcPct val="120000"/>
+              </a:lnSpc>
+            </a:pPr>
+            <a:r>
+              <a:rPr lang="en-GB" dirty="0" smtClean="0"/>
+              <a:t>Find the starting code in e.g. ~/IWOCL2016</a:t>
+            </a:r>
+            <a:r>
+              <a:rPr lang="en-GB" dirty="0"/>
+              <a:t>/solutions/Bilateral</a:t>
+            </a:r>
+            <a:endParaRPr lang="en-GB" dirty="0" smtClean="0"/>
+          </a:p>
+          <a:p>
+            <a:pPr>
+              <a:lnSpc>
+                <a:spcPct val="120000"/>
+              </a:lnSpc>
+            </a:pPr>
+            <a:r>
+              <a:rPr lang="en-GB" dirty="0" smtClean="0"/>
+              <a:t>Experiment with some OpenCL compiler options to improve performance</a:t>
+            </a:r>
+          </a:p>
+          <a:p>
+            <a:pPr>
+              <a:lnSpc>
+                <a:spcPct val="120000"/>
+              </a:lnSpc>
+            </a:pPr>
+            <a:r>
+              <a:rPr lang="en-GB" dirty="0" smtClean="0"/>
+              <a:t>Try embedding some simulation parameters into the kernel as compile-time constants using OpenCL build options</a:t>
+            </a:r>
+          </a:p>
+          <a:p>
+            <a:pPr lvl="1">
+              <a:lnSpc>
+                <a:spcPct val="120000"/>
+              </a:lnSpc>
+            </a:pPr>
+            <a:r>
+              <a:rPr lang="en-GB" dirty="0" smtClean="0"/>
+              <a:t>Disclaimer: This might not help for every parameter or on every device – try it with a few!</a:t>
+            </a:r>
+          </a:p>
+          <a:p>
+            <a:pPr>
+              <a:lnSpc>
+                <a:spcPct val="120000"/>
+              </a:lnSpc>
+            </a:pPr>
+            <a:r>
+              <a:rPr lang="en-GB" dirty="0"/>
+              <a:t>An example solution will be </a:t>
+            </a:r>
+            <a:r>
+              <a:rPr lang="en-GB" dirty="0" smtClean="0"/>
+              <a:t>provided</a:t>
+            </a:r>
+          </a:p>
+          <a:p>
+            <a:pPr>
+              <a:lnSpc>
+                <a:spcPct val="120000"/>
+              </a:lnSpc>
+            </a:pPr>
+            <a:r>
+              <a:rPr lang="en-GB" dirty="0" smtClean="0"/>
+              <a:t>Tip: If verification is too slow, use </a:t>
+            </a:r>
+            <a:r>
+              <a:rPr lang="en-GB" b="1" dirty="0" smtClean="0">
+                <a:solidFill>
+                  <a:srgbClr val="3366FF"/>
+                </a:solidFill>
+                <a:latin typeface="Courier New"/>
+                <a:cs typeface="Courier New"/>
+              </a:rPr>
+              <a:t>--</a:t>
+            </a:r>
+            <a:r>
+              <a:rPr lang="en-GB" b="1" dirty="0" err="1" smtClean="0">
+                <a:solidFill>
+                  <a:srgbClr val="3366FF"/>
+                </a:solidFill>
+                <a:latin typeface="Courier New"/>
+                <a:cs typeface="Courier New"/>
+              </a:rPr>
+              <a:t>noverify</a:t>
+            </a:r>
+            <a:r>
+              <a:rPr lang="en-GB" dirty="0" smtClean="0"/>
+              <a:t> flag or set </a:t>
+            </a:r>
+            <a:r>
+              <a:rPr lang="en-GB" b="1" dirty="0" smtClean="0">
+                <a:solidFill>
+                  <a:srgbClr val="3366FF"/>
+                </a:solidFill>
+                <a:latin typeface="Courier New"/>
+                <a:cs typeface="Courier New"/>
+              </a:rPr>
+              <a:t>verify = false</a:t>
+            </a:r>
+            <a:endParaRPr lang="en-GB" dirty="0"/>
+          </a:p>
+          <a:p>
             <a:pPr marL="0" indent="0">
-              <a:buNone/>
+              <a:lnSpc>
+                <a:spcPct val="120000"/>
+              </a:lnSpc>
+              <a:buNone/>
+            </a:pPr>
+            <a:endParaRPr lang="en-GB" dirty="0" smtClean="0"/>
+          </a:p>
+          <a:p>
+            <a:pPr marL="0" indent="0">
+              <a:lnSpc>
+                <a:spcPct val="120000"/>
+              </a:lnSpc>
+              <a:buNone/>
+            </a:pPr>
+            <a:r>
+              <a:rPr lang="en-GB" b="1" dirty="0" smtClean="0"/>
+              <a:t>Extras:</a:t>
+            </a:r>
+          </a:p>
+          <a:p>
+            <a:pPr>
+              <a:lnSpc>
+                <a:spcPct val="120000"/>
+              </a:lnSpc>
             </a:pPr>
             <a:r>
               <a:rPr lang="en-GB" dirty="0" smtClean="0"/>
-              <a:t>Results from meta programming version on an </a:t>
-            </a:r>
-            <a:r>
-              <a:rPr lang="en-GB" dirty="0" err="1" smtClean="0"/>
-              <a:t>Nvidia</a:t>
-            </a:r>
+              <a:t>Make the work-group size inside the kernel a compile-time constant, and change the local memory allocation to only use as much as is needed</a:t>
+            </a:r>
+          </a:p>
+          <a:p>
+            <a:pPr>
+              <a:lnSpc>
+                <a:spcPct val="120000"/>
+              </a:lnSpc>
+            </a:pPr>
             <a:r>
               <a:rPr lang="en-GB" dirty="0" smtClean="0"/>
-              <a:t> K40:</a:t>
-            </a:r>
-          </a:p>
-          <a:p>
-            <a:pPr marL="0" indent="0">
-              <a:buNone/>
-            </a:pPr>
-            <a:endParaRPr lang="en-GB" dirty="0" smtClean="0"/>
-          </a:p>
-          <a:p>
-            <a:pPr marL="0" indent="0">
-              <a:buNone/>
-            </a:pPr>
-            <a:r>
-              <a:rPr lang="en-GB" sz="2000" dirty="0" smtClean="0">
-                <a:latin typeface="Courier New"/>
-                <a:cs typeface="Courier New"/>
-              </a:rPr>
-              <a:t>Running </a:t>
-            </a:r>
-            <a:r>
-              <a:rPr lang="en-GB" sz="2000" dirty="0">
-                <a:latin typeface="Courier New"/>
-                <a:cs typeface="Courier New"/>
-              </a:rPr>
-              <a:t>reference...</a:t>
-            </a:r>
-          </a:p>
-          <a:p>
-            <a:pPr marL="0" indent="0">
-              <a:buNone/>
-            </a:pPr>
-            <a:r>
-              <a:rPr lang="en-GB" sz="2000" dirty="0">
-                <a:latin typeface="Courier New"/>
-                <a:cs typeface="Courier New"/>
-              </a:rPr>
-              <a:t>Reference took 7784.3ms (1 frame</a:t>
-            </a:r>
-            <a:r>
-              <a:rPr lang="en-GB" sz="2000" dirty="0" smtClean="0">
-                <a:latin typeface="Courier New"/>
-                <a:cs typeface="Courier New"/>
-              </a:rPr>
-              <a:t>)</a:t>
-            </a:r>
-          </a:p>
-          <a:p>
-            <a:pPr marL="0" indent="0">
-              <a:buNone/>
-            </a:pPr>
-            <a:endParaRPr lang="en-GB" sz="2000" dirty="0">
-              <a:latin typeface="Courier New"/>
-              <a:cs typeface="Courier New"/>
-            </a:endParaRPr>
-          </a:p>
-          <a:p>
-            <a:pPr marL="0" indent="0">
-              <a:buNone/>
-            </a:pPr>
-            <a:r>
-              <a:rPr lang="en-GB" sz="2000" dirty="0">
-                <a:latin typeface="Courier New"/>
-                <a:cs typeface="Courier New"/>
-              </a:rPr>
-              <a:t>~/IWOCL2016/exercises/Bilateral$ </a:t>
-            </a:r>
-            <a:r>
-              <a:rPr lang="en-GB" sz="2000" b="1" dirty="0">
-                <a:latin typeface="Courier New"/>
-                <a:cs typeface="Courier New"/>
-              </a:rPr>
-              <a:t>./bilateral </a:t>
-            </a:r>
-          </a:p>
-          <a:p>
-            <a:pPr marL="0" indent="0">
-              <a:buNone/>
-            </a:pPr>
-            <a:r>
-              <a:rPr lang="en-GB" sz="2000" dirty="0" smtClean="0">
-                <a:latin typeface="Courier New"/>
-                <a:cs typeface="Courier New"/>
-              </a:rPr>
-              <a:t>OpenCL </a:t>
-            </a:r>
-            <a:r>
-              <a:rPr lang="en-GB" sz="2000" dirty="0">
-                <a:latin typeface="Courier New"/>
-                <a:cs typeface="Courier New"/>
-              </a:rPr>
-              <a:t>took 428.1ms (13.4ms / frame)</a:t>
-            </a:r>
-          </a:p>
-          <a:p>
-            <a:pPr marL="0" indent="0">
-              <a:buNone/>
-            </a:pPr>
-            <a:endParaRPr lang="en-GB" sz="2000" dirty="0" smtClean="0">
-              <a:latin typeface="Courier New"/>
-              <a:cs typeface="Courier New"/>
-            </a:endParaRPr>
-          </a:p>
-          <a:p>
-            <a:pPr marL="0" indent="0">
-              <a:buNone/>
-            </a:pPr>
-            <a:r>
-              <a:rPr lang="en-GB" sz="2000" dirty="0">
-                <a:latin typeface="Courier New"/>
-                <a:cs typeface="Courier New"/>
-              </a:rPr>
-              <a:t>~/IWOCL2016/solutions/Bilateral$ </a:t>
-            </a:r>
-            <a:r>
-              <a:rPr lang="en-GB" sz="2000" b="1" dirty="0">
-                <a:latin typeface="Courier New"/>
-                <a:cs typeface="Courier New"/>
-              </a:rPr>
-              <a:t>./</a:t>
-            </a:r>
-            <a:r>
-              <a:rPr lang="en-GB" sz="2000" b="1" dirty="0" err="1">
-                <a:latin typeface="Courier New"/>
-                <a:cs typeface="Courier New"/>
-              </a:rPr>
-              <a:t>bilateral_meta</a:t>
-            </a:r>
-            <a:r>
-              <a:rPr lang="en-GB" sz="2000" b="1" dirty="0">
-                <a:latin typeface="Courier New"/>
-                <a:cs typeface="Courier New"/>
-              </a:rPr>
-              <a:t> </a:t>
-            </a:r>
-          </a:p>
-          <a:p>
-            <a:pPr marL="0" indent="0">
-              <a:buNone/>
-            </a:pPr>
-            <a:r>
-              <a:rPr lang="en-GB" sz="2000" dirty="0" smtClean="0">
-                <a:latin typeface="Courier New"/>
-                <a:cs typeface="Courier New"/>
-              </a:rPr>
-              <a:t>OpenCL </a:t>
-            </a:r>
-            <a:r>
-              <a:rPr lang="en-GB" sz="2000" dirty="0">
-                <a:latin typeface="Courier New"/>
-                <a:cs typeface="Courier New"/>
-              </a:rPr>
-              <a:t>took 357.9ms (11.2ms / frame</a:t>
-            </a:r>
-            <a:r>
-              <a:rPr lang="en-GB" sz="2000" dirty="0" smtClean="0">
-                <a:latin typeface="Courier New"/>
-                <a:cs typeface="Courier New"/>
-              </a:rPr>
-              <a:t>)</a:t>
-            </a:r>
-            <a:endParaRPr lang="en-GB" dirty="0">
-              <a:latin typeface="Courier New"/>
-              <a:cs typeface="Courier New"/>
-            </a:endParaRPr>
+              <a:t>Modify </a:t>
+            </a:r>
+            <a:r>
+              <a:rPr lang="en-GB" dirty="0"/>
+              <a:t>the kernel to allow the runtime to toggle whether or not local memory is used at all, which could </a:t>
+            </a:r>
+            <a:r>
+              <a:rPr lang="en-GB" dirty="0" smtClean="0"/>
+              <a:t>improve performance portability on devices without physical local memory</a:t>
+            </a:r>
+          </a:p>
+          <a:p>
+            <a:pPr>
+              <a:lnSpc>
+                <a:spcPct val="120000"/>
+              </a:lnSpc>
+            </a:pPr>
+            <a:r>
+              <a:rPr lang="en-GB" dirty="0" smtClean="0"/>
+              <a:t>Get the compiler to generate the assembly code and look through this, correlating it to your source code</a:t>
+            </a:r>
+            <a:endParaRPr lang="en-GB" dirty="0"/>
           </a:p>
         </p:txBody>
       </p:sp>
     </p:spTree>
     <p:extLst>
       <p:ext uri="{BB962C8B-B14F-4D97-AF65-F5344CB8AC3E}">
-        <p14:creationId xmlns:p14="http://schemas.microsoft.com/office/powerpoint/2010/main" val="3584939095"/>
+        <p14:creationId xmlns:p14="http://schemas.microsoft.com/office/powerpoint/2010/main" val="359158878"/>
       </p:ext>
     </p:extLst>
   </p:cSld>
   <p:clrMapOvr>
     <a:masterClrMapping/>
   </p:clrMapOvr>
+  <p:timing>
+    <p:tnLst>
+      <p:par>
+        <p:cTn xmlns:p14="http://schemas.microsoft.com/office/powerpoint/2010/main" id="1" dur="indefinite" restart="never" nodeType="tmRoot"/>
+      </p:par>
+    </p:tnLst>
+  </p:timing>
 </p:sld>
 </file>
 
-<file path=ppt/slides/slide3.xml><?xml version="1.0" encoding="utf-8"?>
+<file path=ppt/slides/slide24.xml><?xml version="1.0" encoding="utf-8"?>
 <p:sld xmlns:a="http://schemas.openxmlformats.org/drawingml/2006/main" xmlns:r="http://schemas.openxmlformats.org/officeDocument/2006/relationships" xmlns:p="http://schemas.openxmlformats.org/presentationml/2006/main">
   <p:cSld>
     <p:spTree>
@@ -9462,59 +10591,28 @@
           <a:lstStyle/>
           <a:p>
             <a:r>
-              <a:rPr lang="en-GB" dirty="0" err="1" smtClean="0"/>
-              <a:t>Stringifying</a:t>
-            </a:r>
-            <a:r>
-              <a:rPr lang="en-GB" dirty="0" smtClean="0"/>
-              <a:t> Kernel Source</a:t>
-            </a:r>
-            <a:endParaRPr lang="en-GB" dirty="0"/>
+              <a:rPr lang="en-GB" dirty="0"/>
+              <a:t>Exercise: kernel compilation</a:t>
+            </a:r>
           </a:p>
         </p:txBody>
       </p:sp>
       <p:sp>
         <p:nvSpPr>
-          <p:cNvPr id="3" name="Text Placeholder 2"/>
+          <p:cNvPr id="3" name="Content Placeholder 2"/>
           <p:cNvSpPr>
             <a:spLocks noGrp="1"/>
           </p:cNvSpPr>
           <p:nvPr>
-            <p:ph type="body" idx="1"/>
+            <p:ph idx="1"/>
           </p:nvPr>
         </p:nvSpPr>
-        <p:spPr/>
-        <p:txBody>
-          <a:bodyPr/>
-          <a:lstStyle/>
-          <a:p>
-            <a:r>
-              <a:rPr lang="en-GB" dirty="0" smtClean="0"/>
-              <a:t>Before </a:t>
-            </a:r>
-            <a:r>
-              <a:rPr lang="en-GB" dirty="0" err="1" smtClean="0"/>
-              <a:t>stringification</a:t>
-            </a:r>
-            <a:r>
-              <a:rPr lang="en-GB" dirty="0" smtClean="0"/>
-              <a:t>:</a:t>
-            </a:r>
-            <a:endParaRPr lang="en-GB" dirty="0"/>
-          </a:p>
-        </p:txBody>
-      </p:sp>
-      <p:sp>
-        <p:nvSpPr>
-          <p:cNvPr id="4" name="Content Placeholder 3"/>
-          <p:cNvSpPr>
-            <a:spLocks noGrp="1"/>
-          </p:cNvSpPr>
-          <p:nvPr>
-            <p:ph sz="half" idx="2"/>
-          </p:nvPr>
-        </p:nvSpPr>
-        <p:spPr/>
+        <p:spPr>
+          <a:xfrm>
+            <a:off x="457200" y="1417638"/>
+            <a:ext cx="8229600" cy="5440362"/>
+          </a:xfrm>
+        </p:spPr>
         <p:txBody>
           <a:bodyPr>
             <a:normAutofit/>
@@ -9525,168 +10623,41 @@
               <a:buNone/>
             </a:pPr>
             <a:r>
-              <a:rPr lang="en-GB" sz="2000" b="1" dirty="0">
-                <a:solidFill>
-                  <a:schemeClr val="accent2"/>
-                </a:solidFill>
-                <a:latin typeface="Courier New"/>
-                <a:cs typeface="Courier New"/>
-              </a:rPr>
-              <a:t>kernel</a:t>
-            </a:r>
-            <a:r>
-              <a:rPr lang="en-GB" sz="2000" b="1" dirty="0">
-                <a:latin typeface="Courier New"/>
-                <a:cs typeface="Courier New"/>
-              </a:rPr>
-              <a:t> </a:t>
-            </a:r>
-            <a:r>
-              <a:rPr lang="en-GB" sz="2000" b="1" i="1" dirty="0">
-                <a:solidFill>
-                  <a:srgbClr val="3366FF"/>
-                </a:solidFill>
-                <a:latin typeface="Courier New"/>
-                <a:cs typeface="Courier New"/>
-              </a:rPr>
-              <a:t>void</a:t>
-            </a:r>
-            <a:r>
-              <a:rPr lang="en-GB" sz="2000" b="1" dirty="0">
-                <a:latin typeface="Courier New"/>
-                <a:cs typeface="Courier New"/>
-              </a:rPr>
-              <a:t> </a:t>
-            </a:r>
-            <a:r>
-              <a:rPr lang="en-GB" sz="2000" b="1" dirty="0" err="1" smtClean="0">
-                <a:solidFill>
-                  <a:schemeClr val="accent3"/>
-                </a:solidFill>
-                <a:latin typeface="Courier New"/>
-                <a:cs typeface="Courier New"/>
-              </a:rPr>
-              <a:t>vecadd</a:t>
-            </a:r>
-            <a:r>
-              <a:rPr lang="en-GB" sz="2000" b="1" dirty="0" smtClean="0">
-                <a:latin typeface="Courier New"/>
-                <a:cs typeface="Courier New"/>
-              </a:rPr>
-              <a:t>(</a:t>
+              <a:rPr lang="en-GB" dirty="0" smtClean="0"/>
+              <a:t>Results from meta programming version on an </a:t>
+            </a:r>
+            <a:r>
+              <a:rPr lang="en-GB" dirty="0" err="1" smtClean="0"/>
+              <a:t>Nvidia</a:t>
+            </a:r>
+            <a:r>
+              <a:rPr lang="en-GB" dirty="0" smtClean="0"/>
+              <a:t> K40:</a:t>
             </a:r>
           </a:p>
           <a:p>
             <a:pPr marL="0" indent="0">
               <a:buNone/>
             </a:pPr>
-            <a:r>
-              <a:rPr lang="en-GB" sz="2000" b="1" dirty="0" smtClean="0">
-                <a:latin typeface="Courier New"/>
-                <a:cs typeface="Courier New"/>
-              </a:rPr>
-              <a:t>  </a:t>
-            </a:r>
-            <a:r>
-              <a:rPr lang="en-GB" sz="2000" b="1" dirty="0" smtClean="0">
-                <a:solidFill>
-                  <a:srgbClr val="C0504D"/>
-                </a:solidFill>
-                <a:latin typeface="Courier New"/>
-                <a:cs typeface="Courier New"/>
-              </a:rPr>
-              <a:t>global</a:t>
-            </a:r>
-            <a:r>
-              <a:rPr lang="en-GB" sz="2000" b="1" dirty="0" smtClean="0">
-                <a:latin typeface="Courier New"/>
-                <a:cs typeface="Courier New"/>
-              </a:rPr>
-              <a:t> </a:t>
-            </a:r>
-            <a:r>
-              <a:rPr lang="en-GB" sz="2000" b="1" i="1" dirty="0">
-                <a:solidFill>
-                  <a:srgbClr val="3366FF"/>
-                </a:solidFill>
-                <a:latin typeface="Courier New"/>
-                <a:cs typeface="Courier New"/>
-              </a:rPr>
-              <a:t>float</a:t>
-            </a:r>
-            <a:r>
-              <a:rPr lang="en-GB" sz="2000" b="1" dirty="0">
-                <a:latin typeface="Courier New"/>
-                <a:cs typeface="Courier New"/>
-              </a:rPr>
-              <a:t> *a</a:t>
-            </a:r>
-            <a:r>
-              <a:rPr lang="en-GB" sz="2000" b="1" dirty="0" smtClean="0">
-                <a:latin typeface="Courier New"/>
-                <a:cs typeface="Courier New"/>
-              </a:rPr>
-              <a:t>,</a:t>
-            </a:r>
+            <a:endParaRPr lang="en-GB" dirty="0" smtClean="0"/>
           </a:p>
           <a:p>
             <a:pPr marL="0" indent="0">
               <a:buNone/>
             </a:pPr>
             <a:r>
-              <a:rPr lang="en-GB" sz="2000" b="1" dirty="0">
-                <a:latin typeface="Courier New"/>
-                <a:cs typeface="Courier New"/>
-              </a:rPr>
-              <a:t> </a:t>
-            </a:r>
-            <a:r>
-              <a:rPr lang="en-GB" sz="2000" b="1" dirty="0" smtClean="0">
-                <a:latin typeface="Courier New"/>
-                <a:cs typeface="Courier New"/>
-              </a:rPr>
-              <a:t> </a:t>
-            </a:r>
-            <a:r>
-              <a:rPr lang="en-GB" sz="2000" b="1" dirty="0" smtClean="0">
-                <a:solidFill>
-                  <a:srgbClr val="C0504D"/>
-                </a:solidFill>
-                <a:latin typeface="Courier New"/>
-                <a:cs typeface="Courier New"/>
-              </a:rPr>
-              <a:t>global</a:t>
-            </a:r>
-            <a:r>
-              <a:rPr lang="en-GB" sz="2000" b="1" dirty="0" smtClean="0">
-                <a:latin typeface="Courier New"/>
-                <a:cs typeface="Courier New"/>
-              </a:rPr>
-              <a:t> </a:t>
-            </a:r>
-            <a:r>
-              <a:rPr lang="en-GB" sz="2000" b="1" i="1" dirty="0">
-                <a:solidFill>
-                  <a:srgbClr val="3366FF"/>
-                </a:solidFill>
-                <a:latin typeface="Courier New"/>
-                <a:cs typeface="Courier New"/>
-              </a:rPr>
-              <a:t>float</a:t>
-            </a:r>
-            <a:r>
-              <a:rPr lang="en-GB" sz="2000" b="1" dirty="0">
-                <a:latin typeface="Courier New"/>
-                <a:cs typeface="Courier New"/>
-              </a:rPr>
-              <a:t> *b</a:t>
-            </a:r>
-            <a:r>
-              <a:rPr lang="en-GB" sz="2000" b="1" dirty="0" smtClean="0">
-                <a:latin typeface="Courier New"/>
-                <a:cs typeface="Courier New"/>
-              </a:rPr>
-              <a:t>,</a:t>
+              <a:rPr lang="en-GB" sz="2000" dirty="0" smtClean="0">
+                <a:latin typeface="Courier New"/>
+                <a:cs typeface="Courier New"/>
+              </a:rPr>
+              <a:t>Running </a:t>
+            </a:r>
+            <a:r>
+              <a:rPr lang="en-GB" sz="2000" dirty="0">
+                <a:latin typeface="Courier New"/>
+                <a:cs typeface="Courier New"/>
+              </a:rPr>
+              <a:t>reference...</a:t>
             </a:r>
           </a:p>
           <a:p>
@@ -9694,700 +10665,25 @@
               <a:buNone/>
             </a:pPr>
             <a:r>
-              <a:rPr lang="en-GB" sz="2000" b="1" dirty="0">
-                <a:latin typeface="Courier New"/>
-                <a:cs typeface="Courier New"/>
-              </a:rPr>
-              <a:t> </a:t>
-            </a:r>
-            <a:r>
-              <a:rPr lang="en-GB" sz="2000" b="1" dirty="0" smtClean="0">
-                <a:latin typeface="Courier New"/>
-                <a:cs typeface="Courier New"/>
-              </a:rPr>
-              <a:t> </a:t>
-            </a:r>
-            <a:r>
-              <a:rPr lang="en-GB" sz="2000" b="1" dirty="0" smtClean="0">
-                <a:solidFill>
-                  <a:srgbClr val="C0504D"/>
-                </a:solidFill>
-                <a:latin typeface="Courier New"/>
-                <a:cs typeface="Courier New"/>
-              </a:rPr>
-              <a:t>global</a:t>
-            </a:r>
-            <a:r>
-              <a:rPr lang="en-GB" sz="2000" b="1" dirty="0" smtClean="0">
-                <a:latin typeface="Courier New"/>
-                <a:cs typeface="Courier New"/>
-              </a:rPr>
-              <a:t> </a:t>
-            </a:r>
-            <a:r>
-              <a:rPr lang="en-GB" sz="2000" b="1" i="1" dirty="0">
-                <a:solidFill>
-                  <a:srgbClr val="3366FF"/>
-                </a:solidFill>
-                <a:latin typeface="Courier New"/>
-                <a:cs typeface="Courier New"/>
-              </a:rPr>
-              <a:t>float</a:t>
-            </a:r>
-            <a:r>
-              <a:rPr lang="en-GB" sz="2000" b="1" dirty="0">
-                <a:latin typeface="Courier New"/>
-                <a:cs typeface="Courier New"/>
-              </a:rPr>
-              <a:t> *c)</a:t>
+              <a:rPr lang="en-GB" sz="2000" dirty="0">
+                <a:latin typeface="Courier New"/>
+                <a:cs typeface="Courier New"/>
+              </a:rPr>
+              <a:t>Reference took 7784.3ms (1 frame</a:t>
+            </a:r>
+            <a:r>
+              <a:rPr lang="en-GB" sz="2000" dirty="0" smtClean="0">
+                <a:latin typeface="Courier New"/>
+                <a:cs typeface="Courier New"/>
+              </a:rPr>
+              <a:t>)</a:t>
             </a:r>
           </a:p>
           <a:p>
             <a:pPr marL="0" indent="0">
               <a:buNone/>
             </a:pPr>
-            <a:r>
-              <a:rPr lang="en-GB" sz="2000" b="1" dirty="0">
-                <a:latin typeface="Courier New"/>
-                <a:cs typeface="Courier New"/>
-              </a:rPr>
-              <a:t>{</a:t>
-            </a:r>
-          </a:p>
-          <a:p>
-            <a:pPr marL="0" indent="0">
-              <a:buNone/>
-            </a:pPr>
-            <a:r>
-              <a:rPr lang="en-GB" sz="2000" b="1" dirty="0">
-                <a:latin typeface="Courier New"/>
-                <a:cs typeface="Courier New"/>
-              </a:rPr>
-              <a:t>  </a:t>
-            </a:r>
-            <a:r>
-              <a:rPr lang="en-GB" sz="2000" b="1" i="1" dirty="0" err="1" smtClean="0">
-                <a:solidFill>
-                  <a:srgbClr val="3366FF"/>
-                </a:solidFill>
-                <a:latin typeface="Courier New"/>
-                <a:cs typeface="Courier New"/>
-              </a:rPr>
-              <a:t>int</a:t>
-            </a:r>
-            <a:r>
-              <a:rPr lang="en-GB" sz="2000" b="1" dirty="0" smtClean="0">
-                <a:latin typeface="Courier New"/>
-                <a:cs typeface="Courier New"/>
-              </a:rPr>
-              <a:t> </a:t>
-            </a:r>
-            <a:r>
-              <a:rPr lang="en-GB" sz="2000" b="1" dirty="0" err="1">
-                <a:latin typeface="Courier New"/>
-                <a:cs typeface="Courier New"/>
-              </a:rPr>
-              <a:t>i</a:t>
-            </a:r>
-            <a:r>
-              <a:rPr lang="en-GB" sz="2000" b="1" dirty="0">
-                <a:latin typeface="Courier New"/>
-                <a:cs typeface="Courier New"/>
-              </a:rPr>
-              <a:t> </a:t>
-            </a:r>
-            <a:r>
-              <a:rPr lang="en-GB" sz="2000" b="1" dirty="0" smtClean="0">
-                <a:latin typeface="Courier New"/>
-                <a:cs typeface="Courier New"/>
-              </a:rPr>
-              <a:t>=</a:t>
-            </a:r>
-          </a:p>
-          <a:p>
-            <a:pPr marL="0" indent="0">
-              <a:buNone/>
-            </a:pPr>
-            <a:r>
-              <a:rPr lang="en-GB" sz="2000" b="1" dirty="0">
-                <a:latin typeface="Courier New"/>
-                <a:cs typeface="Courier New"/>
-              </a:rPr>
-              <a:t> </a:t>
-            </a:r>
-            <a:r>
-              <a:rPr lang="en-GB" sz="2000" b="1" dirty="0" smtClean="0">
-                <a:latin typeface="Courier New"/>
-                <a:cs typeface="Courier New"/>
-              </a:rPr>
-              <a:t>   </a:t>
-            </a:r>
-            <a:r>
-              <a:rPr lang="en-GB" sz="2000" b="1" dirty="0" err="1" smtClean="0">
-                <a:solidFill>
-                  <a:srgbClr val="3366FF"/>
-                </a:solidFill>
-                <a:latin typeface="Courier New"/>
-                <a:cs typeface="Courier New"/>
-              </a:rPr>
-              <a:t>get_global_id</a:t>
-            </a:r>
-            <a:r>
-              <a:rPr lang="en-GB" sz="2000" b="1" dirty="0">
-                <a:latin typeface="Courier New"/>
-                <a:cs typeface="Courier New"/>
-              </a:rPr>
-              <a:t>(</a:t>
-            </a:r>
-            <a:r>
-              <a:rPr lang="en-GB" sz="2000" b="1" dirty="0">
-                <a:solidFill>
-                  <a:srgbClr val="FF00FF"/>
-                </a:solidFill>
-                <a:latin typeface="Courier New"/>
-                <a:cs typeface="Courier New"/>
-              </a:rPr>
-              <a:t>0</a:t>
-            </a:r>
-            <a:r>
-              <a:rPr lang="en-GB" sz="2000" b="1" dirty="0">
-                <a:latin typeface="Courier New"/>
-                <a:cs typeface="Courier New"/>
-              </a:rPr>
-              <a:t>);</a:t>
-            </a:r>
-          </a:p>
-          <a:p>
-            <a:pPr marL="0" indent="0">
-              <a:buNone/>
-            </a:pPr>
-            <a:r>
-              <a:rPr lang="en-GB" sz="2000" b="1" dirty="0">
-                <a:latin typeface="Courier New"/>
-                <a:cs typeface="Courier New"/>
-              </a:rPr>
-              <a:t>  c[</a:t>
-            </a:r>
-            <a:r>
-              <a:rPr lang="en-GB" sz="2000" b="1" dirty="0" err="1">
-                <a:latin typeface="Courier New"/>
-                <a:cs typeface="Courier New"/>
-              </a:rPr>
-              <a:t>i</a:t>
-            </a:r>
-            <a:r>
-              <a:rPr lang="en-GB" sz="2000" b="1" dirty="0">
-                <a:latin typeface="Courier New"/>
-                <a:cs typeface="Courier New"/>
-              </a:rPr>
-              <a:t>] = a[</a:t>
-            </a:r>
-            <a:r>
-              <a:rPr lang="en-GB" sz="2000" b="1" dirty="0" err="1">
-                <a:latin typeface="Courier New"/>
-                <a:cs typeface="Courier New"/>
-              </a:rPr>
-              <a:t>i</a:t>
-            </a:r>
-            <a:r>
-              <a:rPr lang="en-GB" sz="2000" b="1" dirty="0">
-                <a:latin typeface="Courier New"/>
-                <a:cs typeface="Courier New"/>
-              </a:rPr>
-              <a:t>] + b[</a:t>
-            </a:r>
-            <a:r>
-              <a:rPr lang="en-GB" sz="2000" b="1" dirty="0" err="1">
-                <a:latin typeface="Courier New"/>
-                <a:cs typeface="Courier New"/>
-              </a:rPr>
-              <a:t>i</a:t>
-            </a:r>
-            <a:r>
-              <a:rPr lang="en-GB" sz="2000" b="1" dirty="0">
-                <a:latin typeface="Courier New"/>
-                <a:cs typeface="Courier New"/>
-              </a:rPr>
-              <a:t>];</a:t>
-            </a:r>
-          </a:p>
-          <a:p>
-            <a:pPr marL="0" indent="0">
-              <a:buNone/>
-            </a:pPr>
-            <a:r>
-              <a:rPr lang="en-GB" sz="2000" b="1" dirty="0" smtClean="0">
-                <a:latin typeface="Courier New"/>
-                <a:cs typeface="Courier New"/>
-              </a:rPr>
-              <a:t>}</a:t>
-            </a:r>
-          </a:p>
-        </p:txBody>
-      </p:sp>
-      <p:sp>
-        <p:nvSpPr>
-          <p:cNvPr id="5" name="Text Placeholder 4"/>
-          <p:cNvSpPr>
-            <a:spLocks noGrp="1"/>
-          </p:cNvSpPr>
-          <p:nvPr>
-            <p:ph type="body" sz="quarter" idx="3"/>
-          </p:nvPr>
-        </p:nvSpPr>
-        <p:spPr/>
-        <p:txBody>
-          <a:bodyPr/>
-          <a:lstStyle/>
-          <a:p>
-            <a:r>
-              <a:rPr lang="en-GB" dirty="0" smtClean="0"/>
-              <a:t>After </a:t>
-            </a:r>
-            <a:r>
-              <a:rPr lang="en-GB" dirty="0" err="1" smtClean="0"/>
-              <a:t>stringification</a:t>
-            </a:r>
-            <a:r>
-              <a:rPr lang="en-GB" dirty="0" smtClean="0"/>
-              <a:t>:</a:t>
-            </a:r>
-            <a:endParaRPr lang="en-GB" dirty="0"/>
-          </a:p>
-        </p:txBody>
-      </p:sp>
-      <p:sp>
-        <p:nvSpPr>
-          <p:cNvPr id="6" name="Content Placeholder 5"/>
-          <p:cNvSpPr>
-            <a:spLocks noGrp="1"/>
-          </p:cNvSpPr>
-          <p:nvPr>
-            <p:ph sz="quarter" idx="4"/>
-          </p:nvPr>
-        </p:nvSpPr>
-        <p:spPr/>
-        <p:txBody>
-          <a:bodyPr>
-            <a:normAutofit fontScale="85000" lnSpcReduction="10000"/>
-          </a:bodyPr>
-          <a:lstStyle/>
-          <a:p>
-            <a:pPr marL="0" indent="0">
-              <a:buNone/>
-            </a:pPr>
-            <a:r>
-              <a:rPr lang="en-GB" b="1" dirty="0" err="1">
-                <a:solidFill>
-                  <a:schemeClr val="accent2"/>
-                </a:solidFill>
-                <a:latin typeface="Courier New"/>
-                <a:cs typeface="Courier New"/>
-              </a:rPr>
-              <a:t>const</a:t>
-            </a:r>
-            <a:r>
-              <a:rPr lang="en-GB" b="1" dirty="0">
-                <a:latin typeface="Courier New"/>
-                <a:cs typeface="Courier New"/>
-              </a:rPr>
-              <a:t> </a:t>
-            </a:r>
-            <a:r>
-              <a:rPr lang="en-GB" b="1" i="1" dirty="0">
-                <a:solidFill>
-                  <a:srgbClr val="3366FF"/>
-                </a:solidFill>
-                <a:latin typeface="Courier New"/>
-                <a:cs typeface="Courier New"/>
-              </a:rPr>
-              <a:t>char</a:t>
-            </a:r>
-            <a:r>
-              <a:rPr lang="en-GB" b="1" dirty="0">
-                <a:latin typeface="Courier New"/>
-                <a:cs typeface="Courier New"/>
-              </a:rPr>
-              <a:t> *</a:t>
-            </a:r>
-            <a:r>
-              <a:rPr lang="en-GB" b="1" dirty="0" err="1">
-                <a:latin typeface="Courier New"/>
-                <a:cs typeface="Courier New"/>
-              </a:rPr>
-              <a:t>vecadd_ocl</a:t>
-            </a:r>
-            <a:r>
-              <a:rPr lang="en-GB" b="1" dirty="0">
-                <a:latin typeface="Courier New"/>
-                <a:cs typeface="Courier New"/>
-              </a:rPr>
-              <a:t> =</a:t>
-            </a:r>
-          </a:p>
-          <a:p>
-            <a:pPr marL="0" indent="0">
-              <a:buNone/>
-            </a:pPr>
-            <a:r>
-              <a:rPr lang="en-GB" b="1" dirty="0" smtClean="0">
-                <a:solidFill>
-                  <a:schemeClr val="accent5"/>
-                </a:solidFill>
-                <a:latin typeface="Courier New"/>
-                <a:cs typeface="Courier New"/>
-              </a:rPr>
-              <a:t>"</a:t>
-            </a:r>
-            <a:r>
-              <a:rPr lang="en-GB" b="1" dirty="0">
-                <a:solidFill>
-                  <a:schemeClr val="accent5"/>
-                </a:solidFill>
-                <a:latin typeface="Courier New"/>
-                <a:cs typeface="Courier New"/>
-              </a:rPr>
-              <a:t>kernel void </a:t>
-            </a:r>
-            <a:r>
-              <a:rPr lang="en-GB" b="1" dirty="0" err="1">
-                <a:solidFill>
-                  <a:schemeClr val="accent5"/>
-                </a:solidFill>
-                <a:latin typeface="Courier New"/>
-                <a:cs typeface="Courier New"/>
-              </a:rPr>
-              <a:t>vecadd</a:t>
-            </a:r>
-            <a:r>
-              <a:rPr lang="en-GB" b="1" dirty="0">
-                <a:solidFill>
-                  <a:schemeClr val="accent5"/>
-                </a:solidFill>
-                <a:latin typeface="Courier New"/>
-                <a:cs typeface="Courier New"/>
-              </a:rPr>
-              <a:t>(</a:t>
-            </a:r>
-            <a:r>
-              <a:rPr lang="en-GB" b="1" dirty="0">
-                <a:solidFill>
-                  <a:schemeClr val="tx2"/>
-                </a:solidFill>
-                <a:latin typeface="Courier New"/>
-                <a:cs typeface="Courier New"/>
-              </a:rPr>
-              <a:t>\n</a:t>
-            </a:r>
-            <a:r>
-              <a:rPr lang="en-GB" b="1" dirty="0">
-                <a:solidFill>
-                  <a:schemeClr val="accent5"/>
-                </a:solidFill>
-                <a:latin typeface="Courier New"/>
-                <a:cs typeface="Courier New"/>
-              </a:rPr>
-              <a:t>"</a:t>
-            </a:r>
-          </a:p>
-          <a:p>
-            <a:pPr marL="0" indent="0">
-              <a:buNone/>
-            </a:pPr>
-            <a:r>
-              <a:rPr lang="en-GB" b="1" dirty="0">
-                <a:solidFill>
-                  <a:schemeClr val="accent5"/>
-                </a:solidFill>
-                <a:latin typeface="Courier New"/>
-                <a:cs typeface="Courier New"/>
-              </a:rPr>
-              <a:t>"  </a:t>
-            </a:r>
-            <a:r>
-              <a:rPr lang="en-GB" b="1" dirty="0" smtClean="0">
-                <a:solidFill>
-                  <a:schemeClr val="accent5"/>
-                </a:solidFill>
-                <a:latin typeface="Courier New"/>
-                <a:cs typeface="Courier New"/>
-              </a:rPr>
-              <a:t>global </a:t>
-            </a:r>
-            <a:r>
-              <a:rPr lang="en-GB" b="1" dirty="0">
-                <a:solidFill>
-                  <a:schemeClr val="accent5"/>
-                </a:solidFill>
-                <a:latin typeface="Courier New"/>
-                <a:cs typeface="Courier New"/>
-              </a:rPr>
-              <a:t>float *a,</a:t>
-            </a:r>
-            <a:r>
-              <a:rPr lang="en-GB" b="1" dirty="0">
-                <a:solidFill>
-                  <a:schemeClr val="tx2"/>
-                </a:solidFill>
-                <a:latin typeface="Courier New"/>
-                <a:cs typeface="Courier New"/>
-              </a:rPr>
-              <a:t>\n</a:t>
-            </a:r>
-            <a:r>
-              <a:rPr lang="en-GB" b="1" dirty="0">
-                <a:solidFill>
-                  <a:schemeClr val="accent5"/>
-                </a:solidFill>
-                <a:latin typeface="Courier New"/>
-                <a:cs typeface="Courier New"/>
-              </a:rPr>
-              <a:t>"</a:t>
-            </a:r>
-          </a:p>
-          <a:p>
-            <a:pPr marL="0" indent="0">
-              <a:buNone/>
-            </a:pPr>
-            <a:r>
-              <a:rPr lang="en-GB" b="1" dirty="0">
-                <a:solidFill>
-                  <a:schemeClr val="accent5"/>
-                </a:solidFill>
-                <a:latin typeface="Courier New"/>
-                <a:cs typeface="Courier New"/>
-              </a:rPr>
-              <a:t>"  </a:t>
-            </a:r>
-            <a:r>
-              <a:rPr lang="en-GB" b="1" dirty="0" smtClean="0">
-                <a:solidFill>
-                  <a:schemeClr val="accent5"/>
-                </a:solidFill>
-                <a:latin typeface="Courier New"/>
-                <a:cs typeface="Courier New"/>
-              </a:rPr>
-              <a:t>global </a:t>
-            </a:r>
-            <a:r>
-              <a:rPr lang="en-GB" b="1" dirty="0">
-                <a:solidFill>
-                  <a:schemeClr val="accent5"/>
-                </a:solidFill>
-                <a:latin typeface="Courier New"/>
-                <a:cs typeface="Courier New"/>
-              </a:rPr>
-              <a:t>float *b,</a:t>
-            </a:r>
-            <a:r>
-              <a:rPr lang="en-GB" b="1" dirty="0">
-                <a:solidFill>
-                  <a:schemeClr val="tx2"/>
-                </a:solidFill>
-                <a:latin typeface="Courier New"/>
-                <a:cs typeface="Courier New"/>
-              </a:rPr>
-              <a:t>\n</a:t>
-            </a:r>
-            <a:r>
-              <a:rPr lang="en-GB" b="1" dirty="0">
-                <a:solidFill>
-                  <a:schemeClr val="accent5"/>
-                </a:solidFill>
-                <a:latin typeface="Courier New"/>
-                <a:cs typeface="Courier New"/>
-              </a:rPr>
-              <a:t>"</a:t>
-            </a:r>
-          </a:p>
-          <a:p>
-            <a:pPr marL="0" indent="0">
-              <a:buNone/>
-            </a:pPr>
-            <a:r>
-              <a:rPr lang="en-GB" b="1" dirty="0">
-                <a:solidFill>
-                  <a:schemeClr val="accent5"/>
-                </a:solidFill>
-                <a:latin typeface="Courier New"/>
-                <a:cs typeface="Courier New"/>
-              </a:rPr>
-              <a:t>"  </a:t>
-            </a:r>
-            <a:r>
-              <a:rPr lang="en-GB" b="1" dirty="0" smtClean="0">
-                <a:solidFill>
-                  <a:schemeClr val="accent5"/>
-                </a:solidFill>
-                <a:latin typeface="Courier New"/>
-                <a:cs typeface="Courier New"/>
-              </a:rPr>
-              <a:t>global </a:t>
-            </a:r>
-            <a:r>
-              <a:rPr lang="en-GB" b="1" dirty="0">
-                <a:solidFill>
-                  <a:schemeClr val="accent5"/>
-                </a:solidFill>
-                <a:latin typeface="Courier New"/>
-                <a:cs typeface="Courier New"/>
-              </a:rPr>
-              <a:t>float *c)</a:t>
-            </a:r>
-            <a:r>
-              <a:rPr lang="en-GB" b="1" dirty="0">
-                <a:solidFill>
-                  <a:schemeClr val="tx2"/>
-                </a:solidFill>
-                <a:latin typeface="Courier New"/>
-                <a:cs typeface="Courier New"/>
-              </a:rPr>
-              <a:t>\</a:t>
-            </a:r>
-            <a:r>
-              <a:rPr lang="en-GB" b="1" dirty="0" smtClean="0">
-                <a:solidFill>
-                  <a:schemeClr val="tx2"/>
-                </a:solidFill>
-                <a:latin typeface="Courier New"/>
-                <a:cs typeface="Courier New"/>
-              </a:rPr>
-              <a:t>n</a:t>
-            </a:r>
-            <a:r>
-              <a:rPr lang="en-GB" b="1" dirty="0">
-                <a:solidFill>
-                  <a:schemeClr val="accent5"/>
-                </a:solidFill>
-                <a:latin typeface="Courier New"/>
-                <a:cs typeface="Courier New"/>
-              </a:rPr>
-              <a:t>"</a:t>
-            </a:r>
-          </a:p>
-          <a:p>
-            <a:pPr marL="0" indent="0">
-              <a:buNone/>
-            </a:pPr>
-            <a:r>
-              <a:rPr lang="en-GB" b="1" dirty="0">
-                <a:solidFill>
-                  <a:schemeClr val="accent5"/>
-                </a:solidFill>
-                <a:latin typeface="Courier New"/>
-                <a:cs typeface="Courier New"/>
-              </a:rPr>
-              <a:t>"{</a:t>
-            </a:r>
-            <a:r>
-              <a:rPr lang="en-GB" b="1" dirty="0">
-                <a:solidFill>
-                  <a:schemeClr val="tx2"/>
-                </a:solidFill>
-                <a:latin typeface="Courier New"/>
-                <a:cs typeface="Courier New"/>
-              </a:rPr>
-              <a:t>\n</a:t>
-            </a:r>
-            <a:r>
-              <a:rPr lang="en-GB" b="1" dirty="0">
-                <a:solidFill>
-                  <a:schemeClr val="accent5"/>
-                </a:solidFill>
-                <a:latin typeface="Courier New"/>
-                <a:cs typeface="Courier New"/>
-              </a:rPr>
-              <a:t>"</a:t>
-            </a:r>
-          </a:p>
-          <a:p>
-            <a:pPr marL="0" indent="0">
-              <a:buNone/>
-            </a:pPr>
-            <a:r>
-              <a:rPr lang="en-GB" b="1" dirty="0">
-                <a:solidFill>
-                  <a:schemeClr val="accent5"/>
-                </a:solidFill>
-                <a:latin typeface="Courier New"/>
-                <a:cs typeface="Courier New"/>
-              </a:rPr>
-              <a:t>"</a:t>
-            </a:r>
-            <a:r>
-              <a:rPr lang="sv-SE" b="1" dirty="0" smtClean="0">
-                <a:solidFill>
-                  <a:schemeClr val="accent5"/>
-                </a:solidFill>
-                <a:latin typeface="Courier New"/>
-                <a:cs typeface="Courier New"/>
-              </a:rPr>
-              <a:t>  </a:t>
-            </a:r>
-            <a:r>
-              <a:rPr lang="sv-SE" b="1" dirty="0" err="1" smtClean="0">
-                <a:solidFill>
-                  <a:schemeClr val="accent5"/>
-                </a:solidFill>
-                <a:latin typeface="Courier New"/>
-                <a:cs typeface="Courier New"/>
-              </a:rPr>
-              <a:t>int</a:t>
-            </a:r>
-            <a:r>
-              <a:rPr lang="sv-SE" b="1" dirty="0" smtClean="0">
-                <a:solidFill>
-                  <a:schemeClr val="accent5"/>
-                </a:solidFill>
-                <a:latin typeface="Courier New"/>
-                <a:cs typeface="Courier New"/>
-              </a:rPr>
-              <a:t> </a:t>
-            </a:r>
-            <a:r>
-              <a:rPr lang="sv-SE" b="1" dirty="0">
-                <a:solidFill>
-                  <a:schemeClr val="accent5"/>
-                </a:solidFill>
-                <a:latin typeface="Courier New"/>
-                <a:cs typeface="Courier New"/>
-              </a:rPr>
-              <a:t>i =</a:t>
-            </a:r>
-            <a:r>
-              <a:rPr lang="sv-SE" b="1" dirty="0">
-                <a:solidFill>
-                  <a:schemeClr val="tx2"/>
-                </a:solidFill>
-                <a:latin typeface="Courier New"/>
-                <a:cs typeface="Courier New"/>
-              </a:rPr>
-              <a:t>\</a:t>
-            </a:r>
-            <a:r>
-              <a:rPr lang="sv-SE" b="1" dirty="0" smtClean="0">
-                <a:solidFill>
-                  <a:schemeClr val="tx2"/>
-                </a:solidFill>
-                <a:latin typeface="Courier New"/>
-                <a:cs typeface="Courier New"/>
-              </a:rPr>
-              <a:t>n</a:t>
-            </a:r>
-            <a:r>
-              <a:rPr lang="en-GB" b="1" dirty="0">
-                <a:solidFill>
-                  <a:schemeClr val="accent5"/>
-                </a:solidFill>
-                <a:latin typeface="Courier New"/>
-                <a:cs typeface="Courier New"/>
-              </a:rPr>
-              <a:t>"</a:t>
-            </a:r>
-            <a:endParaRPr lang="sv-SE" b="1" dirty="0">
-              <a:solidFill>
-                <a:schemeClr val="accent5"/>
-              </a:solidFill>
+            <a:endParaRPr lang="en-GB" sz="2000" dirty="0">
               <a:latin typeface="Courier New"/>
               <a:cs typeface="Courier New"/>
             </a:endParaRPr>
@@ -10397,79 +10693,44 @@
               <a:buNone/>
             </a:pPr>
             <a:r>
-              <a:rPr lang="en-GB" b="1" dirty="0">
-                <a:solidFill>
-                  <a:schemeClr val="accent5"/>
-                </a:solidFill>
-                <a:latin typeface="Courier New"/>
-                <a:cs typeface="Courier New"/>
-              </a:rPr>
-              <a:t>"</a:t>
-            </a:r>
-            <a:r>
-              <a:rPr lang="sv-SE" b="1" dirty="0" smtClean="0">
-                <a:solidFill>
-                  <a:schemeClr val="accent5"/>
-                </a:solidFill>
-                <a:latin typeface="Courier New"/>
-                <a:cs typeface="Courier New"/>
-              </a:rPr>
-              <a:t>    </a:t>
-            </a:r>
-            <a:r>
-              <a:rPr lang="sv-SE" b="1" dirty="0" err="1" smtClean="0">
-                <a:solidFill>
-                  <a:schemeClr val="accent5"/>
-                </a:solidFill>
-                <a:latin typeface="Courier New"/>
-                <a:cs typeface="Courier New"/>
-              </a:rPr>
-              <a:t>get_global_id</a:t>
-            </a:r>
-            <a:r>
-              <a:rPr lang="sv-SE" b="1" dirty="0">
-                <a:solidFill>
-                  <a:schemeClr val="accent5"/>
-                </a:solidFill>
-                <a:latin typeface="Courier New"/>
-                <a:cs typeface="Courier New"/>
-              </a:rPr>
-              <a:t>(0);</a:t>
-            </a:r>
-            <a:r>
-              <a:rPr lang="sv-SE" b="1" dirty="0">
-                <a:solidFill>
-                  <a:schemeClr val="tx2"/>
-                </a:solidFill>
-                <a:latin typeface="Courier New"/>
-                <a:cs typeface="Courier New"/>
-              </a:rPr>
-              <a:t>\</a:t>
-            </a:r>
-            <a:r>
-              <a:rPr lang="sv-SE" b="1" dirty="0" smtClean="0">
-                <a:solidFill>
-                  <a:schemeClr val="tx2"/>
-                </a:solidFill>
-                <a:latin typeface="Courier New"/>
-                <a:cs typeface="Courier New"/>
-              </a:rPr>
-              <a:t>n</a:t>
-            </a:r>
-            <a:r>
-              <a:rPr lang="en-GB" b="1" dirty="0">
-                <a:solidFill>
-                  <a:schemeClr val="accent5"/>
-                </a:solidFill>
-                <a:latin typeface="Courier New"/>
-                <a:cs typeface="Courier New"/>
-              </a:rPr>
-              <a:t>"</a:t>
-            </a:r>
-            <a:endParaRPr lang="sv-SE" b="1" dirty="0">
-              <a:solidFill>
-                <a:schemeClr val="accent5"/>
-              </a:solidFill>
+              <a:rPr lang="en-GB" sz="2000" dirty="0">
+                <a:latin typeface="Courier New"/>
+                <a:cs typeface="Courier New"/>
+              </a:rPr>
+              <a:t>~/IWOCL2016/exercises/Bilateral$ </a:t>
+            </a:r>
+            <a:r>
+              <a:rPr lang="en-GB" sz="2000" b="1" dirty="0">
+                <a:latin typeface="Courier New"/>
+                <a:cs typeface="Courier New"/>
+              </a:rPr>
+              <a:t>./bilateral </a:t>
+            </a:r>
+          </a:p>
+          <a:p>
+            <a:pPr marL="0" indent="0">
+              <a:buNone/>
+            </a:pPr>
+            <a:r>
+              <a:rPr lang="en-GB" sz="2000" dirty="0" smtClean="0">
+                <a:latin typeface="Courier New"/>
+                <a:cs typeface="Courier New"/>
+              </a:rPr>
+              <a:t>OpenCL </a:t>
+            </a:r>
+            <a:r>
+              <a:rPr lang="en-GB" sz="2000" dirty="0">
+                <a:latin typeface="Courier New"/>
+                <a:cs typeface="Courier New"/>
+              </a:rPr>
+              <a:t>took 428.1ms (13.4ms / frame)</a:t>
+            </a:r>
+          </a:p>
+          <a:p>
+            <a:pPr marL="0" indent="0">
+              <a:buNone/>
+            </a:pPr>
+            <a:endParaRPr lang="en-GB" sz="2000" dirty="0" smtClean="0">
               <a:latin typeface="Courier New"/>
               <a:cs typeface="Courier New"/>
             </a:endParaRPr>
@@ -10479,54 +10740,32 @@
               <a:buNone/>
             </a:pPr>
             <a:r>
-              <a:rPr lang="en-GB" b="1" dirty="0">
-                <a:solidFill>
-                  <a:schemeClr val="accent5"/>
-                </a:solidFill>
-                <a:latin typeface="Courier New"/>
-                <a:cs typeface="Courier New"/>
-              </a:rPr>
-              <a:t>"</a:t>
-            </a:r>
-            <a:r>
-              <a:rPr lang="sv-SE" b="1" dirty="0" smtClean="0">
-                <a:solidFill>
-                  <a:schemeClr val="accent5"/>
-                </a:solidFill>
-                <a:latin typeface="Courier New"/>
-                <a:cs typeface="Courier New"/>
-              </a:rPr>
-              <a:t>  c</a:t>
-            </a:r>
-            <a:r>
-              <a:rPr lang="sv-SE" b="1" dirty="0">
-                <a:solidFill>
-                  <a:schemeClr val="accent5"/>
-                </a:solidFill>
-                <a:latin typeface="Courier New"/>
-                <a:cs typeface="Courier New"/>
-              </a:rPr>
-              <a:t>[i] = a[i] + b[i];</a:t>
-            </a:r>
-            <a:r>
-              <a:rPr lang="sv-SE" b="1" dirty="0">
-                <a:solidFill>
-                  <a:schemeClr val="tx2"/>
-                </a:solidFill>
-                <a:latin typeface="Courier New"/>
-                <a:cs typeface="Courier New"/>
-              </a:rPr>
-              <a:t>\n</a:t>
-            </a:r>
-            <a:r>
-              <a:rPr lang="sv-SE" b="1" dirty="0">
-                <a:solidFill>
-                  <a:schemeClr val="accent5"/>
-                </a:solidFill>
-                <a:latin typeface="Courier New"/>
-                <a:cs typeface="Courier New"/>
-              </a:rPr>
-              <a:t>"</a:t>
+              <a:rPr lang="en-GB" sz="2000" dirty="0">
+                <a:latin typeface="Courier New"/>
+                <a:cs typeface="Courier New"/>
+              </a:rPr>
+              <a:t>~/IWOCL2016/solutions/Bilateral$ </a:t>
+            </a:r>
+            <a:r>
+              <a:rPr lang="en-GB" sz="2000" b="1" dirty="0">
+                <a:latin typeface="Courier New"/>
+                <a:cs typeface="Courier New"/>
+              </a:rPr>
+              <a:t>./</a:t>
+            </a:r>
+            <a:r>
+              <a:rPr lang="en-GB" sz="2000" b="1" dirty="0" err="1">
+                <a:latin typeface="Courier New"/>
+                <a:cs typeface="Courier New"/>
+              </a:rPr>
+              <a:t>bilateral_meta</a:t>
+            </a:r>
+            <a:r>
+              <a:rPr lang="en-GB" sz="2000" b="1" dirty="0">
+                <a:latin typeface="Courier New"/>
+                <a:cs typeface="Courier New"/>
+              </a:rPr>
+              <a:t> </a:t>
             </a:r>
           </a:p>
           <a:p>
@@ -10534,48 +10773,27 @@
               <a:buNone/>
             </a:pPr>
             <a:r>
-              <a:rPr lang="sv-SE" b="1" dirty="0">
-                <a:solidFill>
-                  <a:schemeClr val="accent5"/>
-                </a:solidFill>
-                <a:latin typeface="Courier New"/>
-                <a:cs typeface="Courier New"/>
-              </a:rPr>
-              <a:t>"}</a:t>
-            </a:r>
-            <a:r>
-              <a:rPr lang="sv-SE" b="1" dirty="0">
-                <a:solidFill>
-                  <a:schemeClr val="tx2"/>
-                </a:solidFill>
-                <a:latin typeface="Courier New"/>
-                <a:cs typeface="Courier New"/>
-              </a:rPr>
-              <a:t>\n</a:t>
-            </a:r>
-            <a:r>
-              <a:rPr lang="sv-SE" b="1" dirty="0">
-                <a:solidFill>
-                  <a:schemeClr val="accent5"/>
-                </a:solidFill>
-                <a:latin typeface="Courier New"/>
-                <a:cs typeface="Courier New"/>
-              </a:rPr>
-              <a:t>"</a:t>
-            </a:r>
-          </a:p>
-          <a:p>
-            <a:pPr marL="0" indent="0">
-              <a:buNone/>
-            </a:pPr>
-            <a:r>
-              <a:rPr lang="sv-SE" b="1" dirty="0">
-                <a:latin typeface="Courier New"/>
-                <a:cs typeface="Courier New"/>
-              </a:rPr>
-              <a:t>;</a:t>
-            </a:r>
-            <a:endParaRPr lang="en-GB" b="1" dirty="0">
+              <a:rPr lang="en-GB" sz="2000" dirty="0" smtClean="0">
+                <a:latin typeface="Courier New"/>
+                <a:cs typeface="Courier New"/>
+              </a:rPr>
+              <a:t>OpenCL </a:t>
+            </a:r>
+            <a:r>
+              <a:rPr lang="en-GB" sz="2000" dirty="0">
+                <a:latin typeface="Courier New"/>
+                <a:cs typeface="Courier New"/>
+              </a:rPr>
+              <a:t>took 357.9ms (11.2ms / frame</a:t>
+            </a:r>
+            <a:r>
+              <a:rPr lang="en-GB" sz="2000" dirty="0" smtClean="0">
+                <a:latin typeface="Courier New"/>
+                <a:cs typeface="Courier New"/>
+              </a:rPr>
+              <a:t>)</a:t>
+            </a:r>
+            <a:endParaRPr lang="en-GB" dirty="0">
               <a:latin typeface="Courier New"/>
               <a:cs typeface="Courier New"/>
             </a:endParaRPr>
@@ -10585,33 +10803,18 @@
     </p:spTree>
     <p:extLst>
       <p:ext uri="{BB962C8B-B14F-4D97-AF65-F5344CB8AC3E}">
-        <p14:creationId xmlns:p14="http://schemas.microsoft.com/office/powerpoint/2010/main" val="1917558613"/>
+        <p14:creationId xmlns:p14="http://schemas.microsoft.com/office/powerpoint/2010/main" val="3584939095"/>
       </p:ext>
     </p:extLst>
   </p:cSld>
   <p:clrMapOvr>
     <a:masterClrMapping/>
   </p:clrMapOvr>
-  <mc:AlternateContent xmlns:mc="http://schemas.openxmlformats.org/markup-compatibility/2006" xmlns:p14="http://schemas.microsoft.com/office/powerpoint/2010/main">
-    <mc:Choice Requires="p14">
-      <p:transition spd="slow" p14:dur="2000"/>
-    </mc:Choice>
-    <mc:Fallback xmlns="">
-      <p:transition xmlns:p14="http://schemas.microsoft.com/office/powerpoint/2010/main" spd="slow"/>
-    </mc:Fallback>
-  </mc:AlternateContent>
-  <p:timing>
-    <p:tnLst>
-      <p:par>
-        <p:cTn xmlns:p14="http://schemas.microsoft.com/office/powerpoint/2010/main" id="1" dur="indefinite" restart="never" nodeType="tmRoot"/>
-      </p:par>
-    </p:tnLst>
-  </p:timing>
 </p:sld>
 </file>
 
-<file path=ppt/slides/slide4.xml><?xml version="1.0" encoding="utf-8"?>
-<p:sld xmlns:a="http://schemas.openxmlformats.org/drawingml/2006/main" xmlns:r="http://schemas.openxmlformats.org/officeDocument/2006/relationships" xmlns:p="http://schemas.openxmlformats.org/presentationml/2006/main">
+<file path=ppt/slides/slide3.xml><?xml version="1.0" encoding="utf-8"?>
+<p:sld xmlns:a="http://schemas.openxmlformats.org/drawingml/2006/main" xmlns:r="http://schemas.openxmlformats.org/officeDocument/2006/relationships" xmlns:p="http://schemas.openxmlformats.org/presentationml/2006/main" show="0">
   <p:cSld>
     <p:spTree>
       <p:nvGrpSpPr>
@@ -10656,6 +10859,1187 @@
       </p:sp>
       <p:sp>
         <p:nvSpPr>
+          <p:cNvPr id="3" name="Text Placeholder 2"/>
+          <p:cNvSpPr>
+            <a:spLocks noGrp="1"/>
+          </p:cNvSpPr>
+          <p:nvPr>
+            <p:ph type="body" idx="1"/>
+          </p:nvPr>
+        </p:nvSpPr>
+        <p:spPr/>
+        <p:txBody>
+          <a:bodyPr/>
+          <a:lstStyle/>
+          <a:p>
+            <a:r>
+              <a:rPr lang="en-GB" dirty="0" smtClean="0"/>
+              <a:t>Before </a:t>
+            </a:r>
+            <a:r>
+              <a:rPr lang="en-GB" dirty="0" err="1" smtClean="0"/>
+              <a:t>stringification</a:t>
+            </a:r>
+            <a:r>
+              <a:rPr lang="en-GB" dirty="0" smtClean="0"/>
+              <a:t>:</a:t>
+            </a:r>
+            <a:endParaRPr lang="en-GB" dirty="0"/>
+          </a:p>
+        </p:txBody>
+      </p:sp>
+      <p:sp>
+        <p:nvSpPr>
+          <p:cNvPr id="4" name="Content Placeholder 3"/>
+          <p:cNvSpPr>
+            <a:spLocks noGrp="1"/>
+          </p:cNvSpPr>
+          <p:nvPr>
+            <p:ph sz="half" idx="2"/>
+          </p:nvPr>
+        </p:nvSpPr>
+        <p:spPr/>
+        <p:txBody>
+          <a:bodyPr>
+            <a:normAutofit/>
+          </a:bodyPr>
+          <a:lstStyle/>
+          <a:p>
+            <a:pPr marL="0" indent="0">
+              <a:buNone/>
+            </a:pPr>
+            <a:r>
+              <a:rPr lang="en-GB" sz="2000" b="1" dirty="0">
+                <a:solidFill>
+                  <a:schemeClr val="accent2"/>
+                </a:solidFill>
+                <a:latin typeface="Courier New"/>
+                <a:cs typeface="Courier New"/>
+              </a:rPr>
+              <a:t>kernel</a:t>
+            </a:r>
+            <a:r>
+              <a:rPr lang="en-GB" sz="2000" b="1" dirty="0">
+                <a:latin typeface="Courier New"/>
+                <a:cs typeface="Courier New"/>
+              </a:rPr>
+              <a:t> </a:t>
+            </a:r>
+            <a:r>
+              <a:rPr lang="en-GB" sz="2000" b="1" i="1" dirty="0">
+                <a:solidFill>
+                  <a:srgbClr val="3366FF"/>
+                </a:solidFill>
+                <a:latin typeface="Courier New"/>
+                <a:cs typeface="Courier New"/>
+              </a:rPr>
+              <a:t>void</a:t>
+            </a:r>
+            <a:r>
+              <a:rPr lang="en-GB" sz="2000" b="1" dirty="0">
+                <a:latin typeface="Courier New"/>
+                <a:cs typeface="Courier New"/>
+              </a:rPr>
+              <a:t> </a:t>
+            </a:r>
+            <a:r>
+              <a:rPr lang="en-GB" sz="2000" b="1" dirty="0" err="1" smtClean="0">
+                <a:solidFill>
+                  <a:schemeClr val="accent3"/>
+                </a:solidFill>
+                <a:latin typeface="Courier New"/>
+                <a:cs typeface="Courier New"/>
+              </a:rPr>
+              <a:t>vecadd</a:t>
+            </a:r>
+            <a:r>
+              <a:rPr lang="en-GB" sz="2000" b="1" dirty="0" smtClean="0">
+                <a:latin typeface="Courier New"/>
+                <a:cs typeface="Courier New"/>
+              </a:rPr>
+              <a:t>(</a:t>
+            </a:r>
+          </a:p>
+          <a:p>
+            <a:pPr marL="0" indent="0">
+              <a:buNone/>
+            </a:pPr>
+            <a:r>
+              <a:rPr lang="en-GB" sz="2000" b="1" dirty="0" smtClean="0">
+                <a:latin typeface="Courier New"/>
+                <a:cs typeface="Courier New"/>
+              </a:rPr>
+              <a:t>  </a:t>
+            </a:r>
+            <a:r>
+              <a:rPr lang="en-GB" sz="2000" b="1" dirty="0" smtClean="0">
+                <a:solidFill>
+                  <a:srgbClr val="C0504D"/>
+                </a:solidFill>
+                <a:latin typeface="Courier New"/>
+                <a:cs typeface="Courier New"/>
+              </a:rPr>
+              <a:t>global</a:t>
+            </a:r>
+            <a:r>
+              <a:rPr lang="en-GB" sz="2000" b="1" dirty="0" smtClean="0">
+                <a:latin typeface="Courier New"/>
+                <a:cs typeface="Courier New"/>
+              </a:rPr>
+              <a:t> </a:t>
+            </a:r>
+            <a:r>
+              <a:rPr lang="en-GB" sz="2000" b="1" i="1" dirty="0">
+                <a:solidFill>
+                  <a:srgbClr val="3366FF"/>
+                </a:solidFill>
+                <a:latin typeface="Courier New"/>
+                <a:cs typeface="Courier New"/>
+              </a:rPr>
+              <a:t>float</a:t>
+            </a:r>
+            <a:r>
+              <a:rPr lang="en-GB" sz="2000" b="1" dirty="0">
+                <a:latin typeface="Courier New"/>
+                <a:cs typeface="Courier New"/>
+              </a:rPr>
+              <a:t> *a</a:t>
+            </a:r>
+            <a:r>
+              <a:rPr lang="en-GB" sz="2000" b="1" dirty="0" smtClean="0">
+                <a:latin typeface="Courier New"/>
+                <a:cs typeface="Courier New"/>
+              </a:rPr>
+              <a:t>,</a:t>
+            </a:r>
+          </a:p>
+          <a:p>
+            <a:pPr marL="0" indent="0">
+              <a:buNone/>
+            </a:pPr>
+            <a:r>
+              <a:rPr lang="en-GB" sz="2000" b="1" dirty="0">
+                <a:latin typeface="Courier New"/>
+                <a:cs typeface="Courier New"/>
+              </a:rPr>
+              <a:t> </a:t>
+            </a:r>
+            <a:r>
+              <a:rPr lang="en-GB" sz="2000" b="1" dirty="0" smtClean="0">
+                <a:latin typeface="Courier New"/>
+                <a:cs typeface="Courier New"/>
+              </a:rPr>
+              <a:t> </a:t>
+            </a:r>
+            <a:r>
+              <a:rPr lang="en-GB" sz="2000" b="1" dirty="0" smtClean="0">
+                <a:solidFill>
+                  <a:srgbClr val="C0504D"/>
+                </a:solidFill>
+                <a:latin typeface="Courier New"/>
+                <a:cs typeface="Courier New"/>
+              </a:rPr>
+              <a:t>global</a:t>
+            </a:r>
+            <a:r>
+              <a:rPr lang="en-GB" sz="2000" b="1" dirty="0" smtClean="0">
+                <a:latin typeface="Courier New"/>
+                <a:cs typeface="Courier New"/>
+              </a:rPr>
+              <a:t> </a:t>
+            </a:r>
+            <a:r>
+              <a:rPr lang="en-GB" sz="2000" b="1" i="1" dirty="0">
+                <a:solidFill>
+                  <a:srgbClr val="3366FF"/>
+                </a:solidFill>
+                <a:latin typeface="Courier New"/>
+                <a:cs typeface="Courier New"/>
+              </a:rPr>
+              <a:t>float</a:t>
+            </a:r>
+            <a:r>
+              <a:rPr lang="en-GB" sz="2000" b="1" dirty="0">
+                <a:latin typeface="Courier New"/>
+                <a:cs typeface="Courier New"/>
+              </a:rPr>
+              <a:t> *b</a:t>
+            </a:r>
+            <a:r>
+              <a:rPr lang="en-GB" sz="2000" b="1" dirty="0" smtClean="0">
+                <a:latin typeface="Courier New"/>
+                <a:cs typeface="Courier New"/>
+              </a:rPr>
+              <a:t>,</a:t>
+            </a:r>
+          </a:p>
+          <a:p>
+            <a:pPr marL="0" indent="0">
+              <a:buNone/>
+            </a:pPr>
+            <a:r>
+              <a:rPr lang="en-GB" sz="2000" b="1" dirty="0">
+                <a:latin typeface="Courier New"/>
+                <a:cs typeface="Courier New"/>
+              </a:rPr>
+              <a:t> </a:t>
+            </a:r>
+            <a:r>
+              <a:rPr lang="en-GB" sz="2000" b="1" dirty="0" smtClean="0">
+                <a:latin typeface="Courier New"/>
+                <a:cs typeface="Courier New"/>
+              </a:rPr>
+              <a:t> </a:t>
+            </a:r>
+            <a:r>
+              <a:rPr lang="en-GB" sz="2000" b="1" dirty="0" smtClean="0">
+                <a:solidFill>
+                  <a:srgbClr val="C0504D"/>
+                </a:solidFill>
+                <a:latin typeface="Courier New"/>
+                <a:cs typeface="Courier New"/>
+              </a:rPr>
+              <a:t>global</a:t>
+            </a:r>
+            <a:r>
+              <a:rPr lang="en-GB" sz="2000" b="1" dirty="0" smtClean="0">
+                <a:latin typeface="Courier New"/>
+                <a:cs typeface="Courier New"/>
+              </a:rPr>
+              <a:t> </a:t>
+            </a:r>
+            <a:r>
+              <a:rPr lang="en-GB" sz="2000" b="1" i="1" dirty="0">
+                <a:solidFill>
+                  <a:srgbClr val="3366FF"/>
+                </a:solidFill>
+                <a:latin typeface="Courier New"/>
+                <a:cs typeface="Courier New"/>
+              </a:rPr>
+              <a:t>float</a:t>
+            </a:r>
+            <a:r>
+              <a:rPr lang="en-GB" sz="2000" b="1" dirty="0">
+                <a:latin typeface="Courier New"/>
+                <a:cs typeface="Courier New"/>
+              </a:rPr>
+              <a:t> *c)</a:t>
+            </a:r>
+          </a:p>
+          <a:p>
+            <a:pPr marL="0" indent="0">
+              <a:buNone/>
+            </a:pPr>
+            <a:r>
+              <a:rPr lang="en-GB" sz="2000" b="1" dirty="0">
+                <a:latin typeface="Courier New"/>
+                <a:cs typeface="Courier New"/>
+              </a:rPr>
+              <a:t>{</a:t>
+            </a:r>
+          </a:p>
+          <a:p>
+            <a:pPr marL="0" indent="0">
+              <a:buNone/>
+            </a:pPr>
+            <a:r>
+              <a:rPr lang="en-GB" sz="2000" b="1" dirty="0">
+                <a:latin typeface="Courier New"/>
+                <a:cs typeface="Courier New"/>
+              </a:rPr>
+              <a:t>  </a:t>
+            </a:r>
+            <a:r>
+              <a:rPr lang="en-GB" sz="2000" b="1" i="1" dirty="0" err="1" smtClean="0">
+                <a:solidFill>
+                  <a:srgbClr val="3366FF"/>
+                </a:solidFill>
+                <a:latin typeface="Courier New"/>
+                <a:cs typeface="Courier New"/>
+              </a:rPr>
+              <a:t>int</a:t>
+            </a:r>
+            <a:r>
+              <a:rPr lang="en-GB" sz="2000" b="1" dirty="0" smtClean="0">
+                <a:latin typeface="Courier New"/>
+                <a:cs typeface="Courier New"/>
+              </a:rPr>
+              <a:t> </a:t>
+            </a:r>
+            <a:r>
+              <a:rPr lang="en-GB" sz="2000" b="1" dirty="0" err="1">
+                <a:latin typeface="Courier New"/>
+                <a:cs typeface="Courier New"/>
+              </a:rPr>
+              <a:t>i</a:t>
+            </a:r>
+            <a:r>
+              <a:rPr lang="en-GB" sz="2000" b="1" dirty="0">
+                <a:latin typeface="Courier New"/>
+                <a:cs typeface="Courier New"/>
+              </a:rPr>
+              <a:t> </a:t>
+            </a:r>
+            <a:r>
+              <a:rPr lang="en-GB" sz="2000" b="1" dirty="0" smtClean="0">
+                <a:latin typeface="Courier New"/>
+                <a:cs typeface="Courier New"/>
+              </a:rPr>
+              <a:t>=</a:t>
+            </a:r>
+          </a:p>
+          <a:p>
+            <a:pPr marL="0" indent="0">
+              <a:buNone/>
+            </a:pPr>
+            <a:r>
+              <a:rPr lang="en-GB" sz="2000" b="1" dirty="0">
+                <a:latin typeface="Courier New"/>
+                <a:cs typeface="Courier New"/>
+              </a:rPr>
+              <a:t> </a:t>
+            </a:r>
+            <a:r>
+              <a:rPr lang="en-GB" sz="2000" b="1" dirty="0" smtClean="0">
+                <a:latin typeface="Courier New"/>
+                <a:cs typeface="Courier New"/>
+              </a:rPr>
+              <a:t>   </a:t>
+            </a:r>
+            <a:r>
+              <a:rPr lang="en-GB" sz="2000" b="1" dirty="0" err="1" smtClean="0">
+                <a:solidFill>
+                  <a:srgbClr val="3366FF"/>
+                </a:solidFill>
+                <a:latin typeface="Courier New"/>
+                <a:cs typeface="Courier New"/>
+              </a:rPr>
+              <a:t>get_global_id</a:t>
+            </a:r>
+            <a:r>
+              <a:rPr lang="en-GB" sz="2000" b="1" dirty="0">
+                <a:latin typeface="Courier New"/>
+                <a:cs typeface="Courier New"/>
+              </a:rPr>
+              <a:t>(</a:t>
+            </a:r>
+            <a:r>
+              <a:rPr lang="en-GB" sz="2000" b="1" dirty="0">
+                <a:solidFill>
+                  <a:srgbClr val="FF00FF"/>
+                </a:solidFill>
+                <a:latin typeface="Courier New"/>
+                <a:cs typeface="Courier New"/>
+              </a:rPr>
+              <a:t>0</a:t>
+            </a:r>
+            <a:r>
+              <a:rPr lang="en-GB" sz="2000" b="1" dirty="0">
+                <a:latin typeface="Courier New"/>
+                <a:cs typeface="Courier New"/>
+              </a:rPr>
+              <a:t>);</a:t>
+            </a:r>
+          </a:p>
+          <a:p>
+            <a:pPr marL="0" indent="0">
+              <a:buNone/>
+            </a:pPr>
+            <a:r>
+              <a:rPr lang="en-GB" sz="2000" b="1" dirty="0">
+                <a:latin typeface="Courier New"/>
+                <a:cs typeface="Courier New"/>
+              </a:rPr>
+              <a:t>  c[</a:t>
+            </a:r>
+            <a:r>
+              <a:rPr lang="en-GB" sz="2000" b="1" dirty="0" err="1">
+                <a:latin typeface="Courier New"/>
+                <a:cs typeface="Courier New"/>
+              </a:rPr>
+              <a:t>i</a:t>
+            </a:r>
+            <a:r>
+              <a:rPr lang="en-GB" sz="2000" b="1" dirty="0">
+                <a:latin typeface="Courier New"/>
+                <a:cs typeface="Courier New"/>
+              </a:rPr>
+              <a:t>] = a[</a:t>
+            </a:r>
+            <a:r>
+              <a:rPr lang="en-GB" sz="2000" b="1" dirty="0" err="1">
+                <a:latin typeface="Courier New"/>
+                <a:cs typeface="Courier New"/>
+              </a:rPr>
+              <a:t>i</a:t>
+            </a:r>
+            <a:r>
+              <a:rPr lang="en-GB" sz="2000" b="1" dirty="0">
+                <a:latin typeface="Courier New"/>
+                <a:cs typeface="Courier New"/>
+              </a:rPr>
+              <a:t>] + b[</a:t>
+            </a:r>
+            <a:r>
+              <a:rPr lang="en-GB" sz="2000" b="1" dirty="0" err="1">
+                <a:latin typeface="Courier New"/>
+                <a:cs typeface="Courier New"/>
+              </a:rPr>
+              <a:t>i</a:t>
+            </a:r>
+            <a:r>
+              <a:rPr lang="en-GB" sz="2000" b="1" dirty="0">
+                <a:latin typeface="Courier New"/>
+                <a:cs typeface="Courier New"/>
+              </a:rPr>
+              <a:t>];</a:t>
+            </a:r>
+          </a:p>
+          <a:p>
+            <a:pPr marL="0" indent="0">
+              <a:buNone/>
+            </a:pPr>
+            <a:r>
+              <a:rPr lang="en-GB" sz="2000" b="1" dirty="0" smtClean="0">
+                <a:latin typeface="Courier New"/>
+                <a:cs typeface="Courier New"/>
+              </a:rPr>
+              <a:t>}</a:t>
+            </a:r>
+          </a:p>
+        </p:txBody>
+      </p:sp>
+      <p:sp>
+        <p:nvSpPr>
+          <p:cNvPr id="5" name="Text Placeholder 4"/>
+          <p:cNvSpPr>
+            <a:spLocks noGrp="1"/>
+          </p:cNvSpPr>
+          <p:nvPr>
+            <p:ph type="body" sz="quarter" idx="3"/>
+          </p:nvPr>
+        </p:nvSpPr>
+        <p:spPr/>
+        <p:txBody>
+          <a:bodyPr/>
+          <a:lstStyle/>
+          <a:p>
+            <a:r>
+              <a:rPr lang="en-GB" dirty="0" smtClean="0"/>
+              <a:t>After </a:t>
+            </a:r>
+            <a:r>
+              <a:rPr lang="en-GB" dirty="0" err="1" smtClean="0"/>
+              <a:t>stringification</a:t>
+            </a:r>
+            <a:r>
+              <a:rPr lang="en-GB" dirty="0" smtClean="0"/>
+              <a:t>:</a:t>
+            </a:r>
+            <a:endParaRPr lang="en-GB" dirty="0"/>
+          </a:p>
+        </p:txBody>
+      </p:sp>
+      <p:sp>
+        <p:nvSpPr>
+          <p:cNvPr id="6" name="Content Placeholder 5"/>
+          <p:cNvSpPr>
+            <a:spLocks noGrp="1"/>
+          </p:cNvSpPr>
+          <p:nvPr>
+            <p:ph sz="quarter" idx="4"/>
+          </p:nvPr>
+        </p:nvSpPr>
+        <p:spPr/>
+        <p:txBody>
+          <a:bodyPr>
+            <a:normAutofit fontScale="85000" lnSpcReduction="10000"/>
+          </a:bodyPr>
+          <a:lstStyle/>
+          <a:p>
+            <a:pPr marL="0" indent="0">
+              <a:buNone/>
+            </a:pPr>
+            <a:r>
+              <a:rPr lang="en-GB" b="1" dirty="0" err="1">
+                <a:solidFill>
+                  <a:schemeClr val="accent2"/>
+                </a:solidFill>
+                <a:latin typeface="Courier New"/>
+                <a:cs typeface="Courier New"/>
+              </a:rPr>
+              <a:t>const</a:t>
+            </a:r>
+            <a:r>
+              <a:rPr lang="en-GB" b="1" dirty="0">
+                <a:latin typeface="Courier New"/>
+                <a:cs typeface="Courier New"/>
+              </a:rPr>
+              <a:t> </a:t>
+            </a:r>
+            <a:r>
+              <a:rPr lang="en-GB" b="1" i="1" dirty="0">
+                <a:solidFill>
+                  <a:srgbClr val="3366FF"/>
+                </a:solidFill>
+                <a:latin typeface="Courier New"/>
+                <a:cs typeface="Courier New"/>
+              </a:rPr>
+              <a:t>char</a:t>
+            </a:r>
+            <a:r>
+              <a:rPr lang="en-GB" b="1" dirty="0">
+                <a:latin typeface="Courier New"/>
+                <a:cs typeface="Courier New"/>
+              </a:rPr>
+              <a:t> *</a:t>
+            </a:r>
+            <a:r>
+              <a:rPr lang="en-GB" b="1" dirty="0" err="1">
+                <a:latin typeface="Courier New"/>
+                <a:cs typeface="Courier New"/>
+              </a:rPr>
+              <a:t>vecadd_ocl</a:t>
+            </a:r>
+            <a:r>
+              <a:rPr lang="en-GB" b="1" dirty="0">
+                <a:latin typeface="Courier New"/>
+                <a:cs typeface="Courier New"/>
+              </a:rPr>
+              <a:t> =</a:t>
+            </a:r>
+          </a:p>
+          <a:p>
+            <a:pPr marL="0" indent="0">
+              <a:buNone/>
+            </a:pPr>
+            <a:r>
+              <a:rPr lang="en-GB" b="1" dirty="0" smtClean="0">
+                <a:solidFill>
+                  <a:schemeClr val="accent5"/>
+                </a:solidFill>
+                <a:latin typeface="Courier New"/>
+                <a:cs typeface="Courier New"/>
+              </a:rPr>
+              <a:t>"</a:t>
+            </a:r>
+            <a:r>
+              <a:rPr lang="en-GB" b="1" dirty="0">
+                <a:solidFill>
+                  <a:schemeClr val="accent5"/>
+                </a:solidFill>
+                <a:latin typeface="Courier New"/>
+                <a:cs typeface="Courier New"/>
+              </a:rPr>
+              <a:t>kernel void </a:t>
+            </a:r>
+            <a:r>
+              <a:rPr lang="en-GB" b="1" dirty="0" err="1">
+                <a:solidFill>
+                  <a:schemeClr val="accent5"/>
+                </a:solidFill>
+                <a:latin typeface="Courier New"/>
+                <a:cs typeface="Courier New"/>
+              </a:rPr>
+              <a:t>vecadd</a:t>
+            </a:r>
+            <a:r>
+              <a:rPr lang="en-GB" b="1" dirty="0">
+                <a:solidFill>
+                  <a:schemeClr val="accent5"/>
+                </a:solidFill>
+                <a:latin typeface="Courier New"/>
+                <a:cs typeface="Courier New"/>
+              </a:rPr>
+              <a:t>(</a:t>
+            </a:r>
+            <a:r>
+              <a:rPr lang="en-GB" b="1" dirty="0">
+                <a:solidFill>
+                  <a:schemeClr val="tx2"/>
+                </a:solidFill>
+                <a:latin typeface="Courier New"/>
+                <a:cs typeface="Courier New"/>
+              </a:rPr>
+              <a:t>\n</a:t>
+            </a:r>
+            <a:r>
+              <a:rPr lang="en-GB" b="1" dirty="0">
+                <a:solidFill>
+                  <a:schemeClr val="accent5"/>
+                </a:solidFill>
+                <a:latin typeface="Courier New"/>
+                <a:cs typeface="Courier New"/>
+              </a:rPr>
+              <a:t>"</a:t>
+            </a:r>
+          </a:p>
+          <a:p>
+            <a:pPr marL="0" indent="0">
+              <a:buNone/>
+            </a:pPr>
+            <a:r>
+              <a:rPr lang="en-GB" b="1" dirty="0">
+                <a:solidFill>
+                  <a:schemeClr val="accent5"/>
+                </a:solidFill>
+                <a:latin typeface="Courier New"/>
+                <a:cs typeface="Courier New"/>
+              </a:rPr>
+              <a:t>"  </a:t>
+            </a:r>
+            <a:r>
+              <a:rPr lang="en-GB" b="1" dirty="0" smtClean="0">
+                <a:solidFill>
+                  <a:schemeClr val="accent5"/>
+                </a:solidFill>
+                <a:latin typeface="Courier New"/>
+                <a:cs typeface="Courier New"/>
+              </a:rPr>
+              <a:t>global </a:t>
+            </a:r>
+            <a:r>
+              <a:rPr lang="en-GB" b="1" dirty="0">
+                <a:solidFill>
+                  <a:schemeClr val="accent5"/>
+                </a:solidFill>
+                <a:latin typeface="Courier New"/>
+                <a:cs typeface="Courier New"/>
+              </a:rPr>
+              <a:t>float *a,</a:t>
+            </a:r>
+            <a:r>
+              <a:rPr lang="en-GB" b="1" dirty="0">
+                <a:solidFill>
+                  <a:schemeClr val="tx2"/>
+                </a:solidFill>
+                <a:latin typeface="Courier New"/>
+                <a:cs typeface="Courier New"/>
+              </a:rPr>
+              <a:t>\n</a:t>
+            </a:r>
+            <a:r>
+              <a:rPr lang="en-GB" b="1" dirty="0">
+                <a:solidFill>
+                  <a:schemeClr val="accent5"/>
+                </a:solidFill>
+                <a:latin typeface="Courier New"/>
+                <a:cs typeface="Courier New"/>
+              </a:rPr>
+              <a:t>"</a:t>
+            </a:r>
+          </a:p>
+          <a:p>
+            <a:pPr marL="0" indent="0">
+              <a:buNone/>
+            </a:pPr>
+            <a:r>
+              <a:rPr lang="en-GB" b="1" dirty="0">
+                <a:solidFill>
+                  <a:schemeClr val="accent5"/>
+                </a:solidFill>
+                <a:latin typeface="Courier New"/>
+                <a:cs typeface="Courier New"/>
+              </a:rPr>
+              <a:t>"  </a:t>
+            </a:r>
+            <a:r>
+              <a:rPr lang="en-GB" b="1" dirty="0" smtClean="0">
+                <a:solidFill>
+                  <a:schemeClr val="accent5"/>
+                </a:solidFill>
+                <a:latin typeface="Courier New"/>
+                <a:cs typeface="Courier New"/>
+              </a:rPr>
+              <a:t>global </a:t>
+            </a:r>
+            <a:r>
+              <a:rPr lang="en-GB" b="1" dirty="0">
+                <a:solidFill>
+                  <a:schemeClr val="accent5"/>
+                </a:solidFill>
+                <a:latin typeface="Courier New"/>
+                <a:cs typeface="Courier New"/>
+              </a:rPr>
+              <a:t>float *b,</a:t>
+            </a:r>
+            <a:r>
+              <a:rPr lang="en-GB" b="1" dirty="0">
+                <a:solidFill>
+                  <a:schemeClr val="tx2"/>
+                </a:solidFill>
+                <a:latin typeface="Courier New"/>
+                <a:cs typeface="Courier New"/>
+              </a:rPr>
+              <a:t>\n</a:t>
+            </a:r>
+            <a:r>
+              <a:rPr lang="en-GB" b="1" dirty="0">
+                <a:solidFill>
+                  <a:schemeClr val="accent5"/>
+                </a:solidFill>
+                <a:latin typeface="Courier New"/>
+                <a:cs typeface="Courier New"/>
+              </a:rPr>
+              <a:t>"</a:t>
+            </a:r>
+          </a:p>
+          <a:p>
+            <a:pPr marL="0" indent="0">
+              <a:buNone/>
+            </a:pPr>
+            <a:r>
+              <a:rPr lang="en-GB" b="1" dirty="0">
+                <a:solidFill>
+                  <a:schemeClr val="accent5"/>
+                </a:solidFill>
+                <a:latin typeface="Courier New"/>
+                <a:cs typeface="Courier New"/>
+              </a:rPr>
+              <a:t>"  </a:t>
+            </a:r>
+            <a:r>
+              <a:rPr lang="en-GB" b="1" dirty="0" smtClean="0">
+                <a:solidFill>
+                  <a:schemeClr val="accent5"/>
+                </a:solidFill>
+                <a:latin typeface="Courier New"/>
+                <a:cs typeface="Courier New"/>
+              </a:rPr>
+              <a:t>global </a:t>
+            </a:r>
+            <a:r>
+              <a:rPr lang="en-GB" b="1" dirty="0">
+                <a:solidFill>
+                  <a:schemeClr val="accent5"/>
+                </a:solidFill>
+                <a:latin typeface="Courier New"/>
+                <a:cs typeface="Courier New"/>
+              </a:rPr>
+              <a:t>float *c)</a:t>
+            </a:r>
+            <a:r>
+              <a:rPr lang="en-GB" b="1" dirty="0">
+                <a:solidFill>
+                  <a:schemeClr val="tx2"/>
+                </a:solidFill>
+                <a:latin typeface="Courier New"/>
+                <a:cs typeface="Courier New"/>
+              </a:rPr>
+              <a:t>\</a:t>
+            </a:r>
+            <a:r>
+              <a:rPr lang="en-GB" b="1" dirty="0" smtClean="0">
+                <a:solidFill>
+                  <a:schemeClr val="tx2"/>
+                </a:solidFill>
+                <a:latin typeface="Courier New"/>
+                <a:cs typeface="Courier New"/>
+              </a:rPr>
+              <a:t>n</a:t>
+            </a:r>
+            <a:r>
+              <a:rPr lang="en-GB" b="1" dirty="0">
+                <a:solidFill>
+                  <a:schemeClr val="accent5"/>
+                </a:solidFill>
+                <a:latin typeface="Courier New"/>
+                <a:cs typeface="Courier New"/>
+              </a:rPr>
+              <a:t>"</a:t>
+            </a:r>
+          </a:p>
+          <a:p>
+            <a:pPr marL="0" indent="0">
+              <a:buNone/>
+            </a:pPr>
+            <a:r>
+              <a:rPr lang="en-GB" b="1" dirty="0">
+                <a:solidFill>
+                  <a:schemeClr val="accent5"/>
+                </a:solidFill>
+                <a:latin typeface="Courier New"/>
+                <a:cs typeface="Courier New"/>
+              </a:rPr>
+              <a:t>"{</a:t>
+            </a:r>
+            <a:r>
+              <a:rPr lang="en-GB" b="1" dirty="0">
+                <a:solidFill>
+                  <a:schemeClr val="tx2"/>
+                </a:solidFill>
+                <a:latin typeface="Courier New"/>
+                <a:cs typeface="Courier New"/>
+              </a:rPr>
+              <a:t>\n</a:t>
+            </a:r>
+            <a:r>
+              <a:rPr lang="en-GB" b="1" dirty="0">
+                <a:solidFill>
+                  <a:schemeClr val="accent5"/>
+                </a:solidFill>
+                <a:latin typeface="Courier New"/>
+                <a:cs typeface="Courier New"/>
+              </a:rPr>
+              <a:t>"</a:t>
+            </a:r>
+          </a:p>
+          <a:p>
+            <a:pPr marL="0" indent="0">
+              <a:buNone/>
+            </a:pPr>
+            <a:r>
+              <a:rPr lang="en-GB" b="1" dirty="0">
+                <a:solidFill>
+                  <a:schemeClr val="accent5"/>
+                </a:solidFill>
+                <a:latin typeface="Courier New"/>
+                <a:cs typeface="Courier New"/>
+              </a:rPr>
+              <a:t>"</a:t>
+            </a:r>
+            <a:r>
+              <a:rPr lang="sv-SE" b="1" dirty="0" smtClean="0">
+                <a:solidFill>
+                  <a:schemeClr val="accent5"/>
+                </a:solidFill>
+                <a:latin typeface="Courier New"/>
+                <a:cs typeface="Courier New"/>
+              </a:rPr>
+              <a:t>  </a:t>
+            </a:r>
+            <a:r>
+              <a:rPr lang="sv-SE" b="1" dirty="0" err="1" smtClean="0">
+                <a:solidFill>
+                  <a:schemeClr val="accent5"/>
+                </a:solidFill>
+                <a:latin typeface="Courier New"/>
+                <a:cs typeface="Courier New"/>
+              </a:rPr>
+              <a:t>int</a:t>
+            </a:r>
+            <a:r>
+              <a:rPr lang="sv-SE" b="1" dirty="0" smtClean="0">
+                <a:solidFill>
+                  <a:schemeClr val="accent5"/>
+                </a:solidFill>
+                <a:latin typeface="Courier New"/>
+                <a:cs typeface="Courier New"/>
+              </a:rPr>
+              <a:t> </a:t>
+            </a:r>
+            <a:r>
+              <a:rPr lang="sv-SE" b="1" dirty="0">
+                <a:solidFill>
+                  <a:schemeClr val="accent5"/>
+                </a:solidFill>
+                <a:latin typeface="Courier New"/>
+                <a:cs typeface="Courier New"/>
+              </a:rPr>
+              <a:t>i =</a:t>
+            </a:r>
+            <a:r>
+              <a:rPr lang="sv-SE" b="1" dirty="0">
+                <a:solidFill>
+                  <a:schemeClr val="tx2"/>
+                </a:solidFill>
+                <a:latin typeface="Courier New"/>
+                <a:cs typeface="Courier New"/>
+              </a:rPr>
+              <a:t>\</a:t>
+            </a:r>
+            <a:r>
+              <a:rPr lang="sv-SE" b="1" dirty="0" smtClean="0">
+                <a:solidFill>
+                  <a:schemeClr val="tx2"/>
+                </a:solidFill>
+                <a:latin typeface="Courier New"/>
+                <a:cs typeface="Courier New"/>
+              </a:rPr>
+              <a:t>n</a:t>
+            </a:r>
+            <a:r>
+              <a:rPr lang="en-GB" b="1" dirty="0">
+                <a:solidFill>
+                  <a:schemeClr val="accent5"/>
+                </a:solidFill>
+                <a:latin typeface="Courier New"/>
+                <a:cs typeface="Courier New"/>
+              </a:rPr>
+              <a:t>"</a:t>
+            </a:r>
+            <a:endParaRPr lang="sv-SE" b="1" dirty="0">
+              <a:solidFill>
+                <a:schemeClr val="accent5"/>
+              </a:solidFill>
+              <a:latin typeface="Courier New"/>
+              <a:cs typeface="Courier New"/>
+            </a:endParaRPr>
+          </a:p>
+          <a:p>
+            <a:pPr marL="0" indent="0">
+              <a:buNone/>
+            </a:pPr>
+            <a:r>
+              <a:rPr lang="en-GB" b="1" dirty="0">
+                <a:solidFill>
+                  <a:schemeClr val="accent5"/>
+                </a:solidFill>
+                <a:latin typeface="Courier New"/>
+                <a:cs typeface="Courier New"/>
+              </a:rPr>
+              <a:t>"</a:t>
+            </a:r>
+            <a:r>
+              <a:rPr lang="sv-SE" b="1" dirty="0" smtClean="0">
+                <a:solidFill>
+                  <a:schemeClr val="accent5"/>
+                </a:solidFill>
+                <a:latin typeface="Courier New"/>
+                <a:cs typeface="Courier New"/>
+              </a:rPr>
+              <a:t>    </a:t>
+            </a:r>
+            <a:r>
+              <a:rPr lang="sv-SE" b="1" dirty="0" err="1" smtClean="0">
+                <a:solidFill>
+                  <a:schemeClr val="accent5"/>
+                </a:solidFill>
+                <a:latin typeface="Courier New"/>
+                <a:cs typeface="Courier New"/>
+              </a:rPr>
+              <a:t>get_global_id</a:t>
+            </a:r>
+            <a:r>
+              <a:rPr lang="sv-SE" b="1" dirty="0">
+                <a:solidFill>
+                  <a:schemeClr val="accent5"/>
+                </a:solidFill>
+                <a:latin typeface="Courier New"/>
+                <a:cs typeface="Courier New"/>
+              </a:rPr>
+              <a:t>(0);</a:t>
+            </a:r>
+            <a:r>
+              <a:rPr lang="sv-SE" b="1" dirty="0">
+                <a:solidFill>
+                  <a:schemeClr val="tx2"/>
+                </a:solidFill>
+                <a:latin typeface="Courier New"/>
+                <a:cs typeface="Courier New"/>
+              </a:rPr>
+              <a:t>\</a:t>
+            </a:r>
+            <a:r>
+              <a:rPr lang="sv-SE" b="1" dirty="0" smtClean="0">
+                <a:solidFill>
+                  <a:schemeClr val="tx2"/>
+                </a:solidFill>
+                <a:latin typeface="Courier New"/>
+                <a:cs typeface="Courier New"/>
+              </a:rPr>
+              <a:t>n</a:t>
+            </a:r>
+            <a:r>
+              <a:rPr lang="en-GB" b="1" dirty="0">
+                <a:solidFill>
+                  <a:schemeClr val="accent5"/>
+                </a:solidFill>
+                <a:latin typeface="Courier New"/>
+                <a:cs typeface="Courier New"/>
+              </a:rPr>
+              <a:t>"</a:t>
+            </a:r>
+            <a:endParaRPr lang="sv-SE" b="1" dirty="0">
+              <a:solidFill>
+                <a:schemeClr val="accent5"/>
+              </a:solidFill>
+              <a:latin typeface="Courier New"/>
+              <a:cs typeface="Courier New"/>
+            </a:endParaRPr>
+          </a:p>
+          <a:p>
+            <a:pPr marL="0" indent="0">
+              <a:buNone/>
+            </a:pPr>
+            <a:r>
+              <a:rPr lang="en-GB" b="1" dirty="0">
+                <a:solidFill>
+                  <a:schemeClr val="accent5"/>
+                </a:solidFill>
+                <a:latin typeface="Courier New"/>
+                <a:cs typeface="Courier New"/>
+              </a:rPr>
+              <a:t>"</a:t>
+            </a:r>
+            <a:r>
+              <a:rPr lang="sv-SE" b="1" dirty="0" smtClean="0">
+                <a:solidFill>
+                  <a:schemeClr val="accent5"/>
+                </a:solidFill>
+                <a:latin typeface="Courier New"/>
+                <a:cs typeface="Courier New"/>
+              </a:rPr>
+              <a:t>  c</a:t>
+            </a:r>
+            <a:r>
+              <a:rPr lang="sv-SE" b="1" dirty="0">
+                <a:solidFill>
+                  <a:schemeClr val="accent5"/>
+                </a:solidFill>
+                <a:latin typeface="Courier New"/>
+                <a:cs typeface="Courier New"/>
+              </a:rPr>
+              <a:t>[i] = a[i] + b[i];</a:t>
+            </a:r>
+            <a:r>
+              <a:rPr lang="sv-SE" b="1" dirty="0">
+                <a:solidFill>
+                  <a:schemeClr val="tx2"/>
+                </a:solidFill>
+                <a:latin typeface="Courier New"/>
+                <a:cs typeface="Courier New"/>
+              </a:rPr>
+              <a:t>\n</a:t>
+            </a:r>
+            <a:r>
+              <a:rPr lang="sv-SE" b="1" dirty="0">
+                <a:solidFill>
+                  <a:schemeClr val="accent5"/>
+                </a:solidFill>
+                <a:latin typeface="Courier New"/>
+                <a:cs typeface="Courier New"/>
+              </a:rPr>
+              <a:t>"</a:t>
+            </a:r>
+          </a:p>
+          <a:p>
+            <a:pPr marL="0" indent="0">
+              <a:buNone/>
+            </a:pPr>
+            <a:r>
+              <a:rPr lang="sv-SE" b="1" dirty="0">
+                <a:solidFill>
+                  <a:schemeClr val="accent5"/>
+                </a:solidFill>
+                <a:latin typeface="Courier New"/>
+                <a:cs typeface="Courier New"/>
+              </a:rPr>
+              <a:t>"}</a:t>
+            </a:r>
+            <a:r>
+              <a:rPr lang="sv-SE" b="1" dirty="0">
+                <a:solidFill>
+                  <a:schemeClr val="tx2"/>
+                </a:solidFill>
+                <a:latin typeface="Courier New"/>
+                <a:cs typeface="Courier New"/>
+              </a:rPr>
+              <a:t>\n</a:t>
+            </a:r>
+            <a:r>
+              <a:rPr lang="sv-SE" b="1" dirty="0">
+                <a:solidFill>
+                  <a:schemeClr val="accent5"/>
+                </a:solidFill>
+                <a:latin typeface="Courier New"/>
+                <a:cs typeface="Courier New"/>
+              </a:rPr>
+              <a:t>"</a:t>
+            </a:r>
+          </a:p>
+          <a:p>
+            <a:pPr marL="0" indent="0">
+              <a:buNone/>
+            </a:pPr>
+            <a:r>
+              <a:rPr lang="sv-SE" b="1" dirty="0">
+                <a:latin typeface="Courier New"/>
+                <a:cs typeface="Courier New"/>
+              </a:rPr>
+              <a:t>;</a:t>
+            </a:r>
+            <a:endParaRPr lang="en-GB" b="1" dirty="0">
+              <a:latin typeface="Courier New"/>
+              <a:cs typeface="Courier New"/>
+            </a:endParaRPr>
+          </a:p>
+        </p:txBody>
+      </p:sp>
+    </p:spTree>
+    <p:extLst>
+      <p:ext uri="{BB962C8B-B14F-4D97-AF65-F5344CB8AC3E}">
+        <p14:creationId xmlns:p14="http://schemas.microsoft.com/office/powerpoint/2010/main" val="1917558613"/>
+      </p:ext>
+    </p:extLst>
+  </p:cSld>
+  <p:clrMapOvr>
+    <a:masterClrMapping/>
+  </p:clrMapOvr>
+  <mc:AlternateContent xmlns:mc="http://schemas.openxmlformats.org/markup-compatibility/2006">
+    <mc:Choice xmlns:p14="http://schemas.microsoft.com/office/powerpoint/2010/main" Requires="p14">
+      <p:transition spd="slow" p14:dur="2000"/>
+    </mc:Choice>
+    <mc:Fallback>
+      <p:transition xmlns:p14="http://schemas.microsoft.com/office/powerpoint/2010/main" spd="slow"/>
+    </mc:Fallback>
+  </mc:AlternateContent>
+  <p:timing>
+    <p:tnLst>
+      <p:par>
+        <p:cTn xmlns:p14="http://schemas.microsoft.com/office/powerpoint/2010/main" id="1" dur="indefinite" restart="never" nodeType="tmRoot"/>
+      </p:par>
+    </p:tnLst>
+  </p:timing>
+</p:sld>
+</file>
+
+<file path=ppt/slides/slide4.xml><?xml version="1.0" encoding="utf-8"?>
+<p:sld xmlns:a="http://schemas.openxmlformats.org/drawingml/2006/main" xmlns:r="http://schemas.openxmlformats.org/officeDocument/2006/relationships" xmlns:p="http://schemas.openxmlformats.org/presentationml/2006/main" show="0">
+  <p:cSld>
+    <p:spTree>
+      <p:nvGrpSpPr>
+        <p:cNvPr id="1" name=""/>
+        <p:cNvGrpSpPr/>
+        <p:nvPr/>
+      </p:nvGrpSpPr>
+      <p:grpSpPr>
+        <a:xfrm>
+          <a:off x="0" y="0"/>
+          <a:ext cx="0" cy="0"/>
+          <a:chOff x="0" y="0"/>
+          <a:chExt cx="0" cy="0"/>
+        </a:xfrm>
+      </p:grpSpPr>
+      <p:sp>
+        <p:nvSpPr>
+          <p:cNvPr id="2" name="Title 1"/>
+          <p:cNvSpPr>
+            <a:spLocks noGrp="1"/>
+          </p:cNvSpPr>
+          <p:nvPr>
+            <p:ph type="title"/>
+          </p:nvPr>
+        </p:nvSpPr>
+        <p:spPr/>
+        <p:txBody>
+          <a:bodyPr/>
+          <a:lstStyle/>
+          <a:p>
+            <a:r>
+              <a:rPr lang="en-GB" dirty="0" err="1" smtClean="0"/>
+              <a:t>Stringifying</a:t>
+            </a:r>
+            <a:r>
+              <a:rPr lang="en-GB" dirty="0" smtClean="0"/>
+              <a:t> Kernel Source</a:t>
+            </a:r>
+            <a:endParaRPr lang="en-GB" dirty="0"/>
+          </a:p>
+        </p:txBody>
+      </p:sp>
+      <p:sp>
+        <p:nvSpPr>
           <p:cNvPr id="3" name="Content Placeholder 2"/>
           <p:cNvSpPr>
             <a:spLocks noGrp="1"/>
@@ -11158,11 +12542,11 @@
   <p:clrMapOvr>
     <a:masterClrMapping/>
   </p:clrMapOvr>
-  <mc:AlternateContent xmlns:mc="http://schemas.openxmlformats.org/markup-compatibility/2006" xmlns:p14="http://schemas.microsoft.com/office/powerpoint/2010/main">
-    <mc:Choice Requires="p14">
+  <mc:AlternateContent xmlns:mc="http://schemas.openxmlformats.org/markup-compatibility/2006">
+    <mc:Choice xmlns:p14="http://schemas.microsoft.com/office/powerpoint/2010/main" Requires="p14">
       <p:transition spd="slow" p14:dur="2000"/>
     </mc:Choice>
-    <mc:Fallback xmlns="">
+    <mc:Fallback>
       <p:transition xmlns:p14="http://schemas.microsoft.com/office/powerpoint/2010/main" spd="slow"/>
     </mc:Fallback>
   </mc:AlternateContent>

</xml_diff>

<commit_message>
Re-add Bilateral optimisation exercise
Also update Bilateral example results
</commit_message>
<xml_diff>
--- a/slides/advanced_part2.pptx
+++ b/slides/advanced_part2.pptx
@@ -31,7 +31,7 @@
     <p:sldId id="281" r:id="rId22"/>
     <p:sldId id="279" r:id="rId23"/>
     <p:sldId id="277" r:id="rId24"/>
-    <p:sldId id="280" r:id="rId25"/>
+    <p:sldId id="282" r:id="rId25"/>
   </p:sldIdLst>
   <p:sldSz cx="9144000" cy="6858000" type="screen4x3"/>
   <p:notesSz cx="6858000" cy="9144000"/>
@@ -8501,11 +8501,11 @@
   <p:clrMapOvr>
     <a:masterClrMapping/>
   </p:clrMapOvr>
-  <mc:AlternateContent xmlns:mc="http://schemas.openxmlformats.org/markup-compatibility/2006">
-    <mc:Choice xmlns:p14="http://schemas.microsoft.com/office/powerpoint/2010/main" Requires="p14">
+  <mc:AlternateContent xmlns:mc="http://schemas.openxmlformats.org/markup-compatibility/2006" xmlns:p14="http://schemas.microsoft.com/office/powerpoint/2010/main">
+    <mc:Choice Requires="p14">
       <p:transition spd="slow" p14:dur="2000"/>
     </mc:Choice>
-    <mc:Fallback>
+    <mc:Fallback xmlns="">
       <p:transition xmlns:p14="http://schemas.microsoft.com/office/powerpoint/2010/main" spd="slow"/>
     </mc:Fallback>
   </mc:AlternateContent>
@@ -8730,19 +8730,8 @@
                 <a:latin typeface="Trebuchet MS"/>
                 <a:cs typeface="Trebuchet MS"/>
               </a:rPr>
-              <a:t>Toggling use of local </a:t>
-            </a:r>
-            <a:r>
-              <a:rPr lang="en-GB" dirty="0" smtClean="0">
-                <a:latin typeface="Trebuchet MS"/>
-                <a:cs typeface="Trebuchet MS"/>
-              </a:rPr>
-              <a:t>memory</a:t>
-            </a:r>
-            <a:endParaRPr lang="en-GB" dirty="0" smtClean="0">
-              <a:latin typeface="Trebuchet MS"/>
-              <a:cs typeface="Trebuchet MS"/>
-            </a:endParaRPr>
+              <a:t>Toggling use of local memory</a:t>
+            </a:r>
           </a:p>
         </p:txBody>
       </p:sp>
@@ -8838,21 +8827,7 @@
                 <a:latin typeface="Trebuchet MS"/>
                 <a:cs typeface="Trebuchet MS"/>
               </a:rPr>
-              <a:t>All </a:t>
-            </a:r>
-            <a:r>
-              <a:rPr lang="en-GB" dirty="0" smtClean="0">
-                <a:latin typeface="Trebuchet MS"/>
-                <a:cs typeface="Trebuchet MS"/>
-              </a:rPr>
-              <a:t>of this requires that we are compiling our OpenCL sources at runtime – this doesn’t work if we are precompiling our kernels or using </a:t>
-            </a:r>
-            <a:r>
-              <a:rPr lang="en-GB" dirty="0" smtClean="0">
-                <a:latin typeface="Trebuchet MS"/>
-                <a:cs typeface="Trebuchet MS"/>
-              </a:rPr>
-              <a:t>SPIR</a:t>
+              <a:t>All of this requires that we are compiling our OpenCL sources at runtime – this doesn’t work if we are precompiling our kernels or using SPIR</a:t>
             </a:r>
           </a:p>
           <a:p>
@@ -10592,8 +10567,13 @@
           <a:p>
             <a:r>
               <a:rPr lang="en-GB" dirty="0"/>
-              <a:t>Exercise: kernel compilation</a:t>
-            </a:r>
+              <a:t>Exercise: </a:t>
+            </a:r>
+            <a:r>
+              <a:rPr lang="en-GB" dirty="0" smtClean="0"/>
+              <a:t>kernel compilation</a:t>
+            </a:r>
+            <a:endParaRPr lang="en-GB" dirty="0"/>
           </a:p>
         </p:txBody>
       </p:sp>
@@ -10623,42 +10603,86 @@
               <a:buNone/>
             </a:pPr>
             <a:r>
-              <a:rPr lang="en-GB" dirty="0" smtClean="0"/>
-              <a:t>Results from meta programming version on an </a:t>
-            </a:r>
-            <a:r>
-              <a:rPr lang="en-GB" dirty="0" err="1" smtClean="0"/>
-              <a:t>Nvidia</a:t>
-            </a:r>
-            <a:r>
-              <a:rPr lang="en-GB" dirty="0" smtClean="0"/>
-              <a:t> K40:</a:t>
+              <a:rPr lang="en-GB" sz="2800" dirty="0" smtClean="0"/>
+              <a:t>Results from </a:t>
+            </a:r>
+            <a:r>
+              <a:rPr lang="en-GB" sz="2800" dirty="0" smtClean="0"/>
+              <a:t>2 </a:t>
+            </a:r>
+            <a:r>
+              <a:rPr lang="en-GB" sz="2800" dirty="0" smtClean="0"/>
+              <a:t>different versions </a:t>
+            </a:r>
+            <a:r>
+              <a:rPr lang="en-GB" sz="2800" dirty="0" smtClean="0"/>
+              <a:t>(original and meta programming) </a:t>
+            </a:r>
+            <a:r>
+              <a:rPr lang="en-GB" sz="2800" dirty="0" smtClean="0"/>
+              <a:t>on an </a:t>
+            </a:r>
+            <a:r>
+              <a:rPr lang="en-GB" sz="2800" dirty="0" smtClean="0"/>
+              <a:t>NVIDIA K40</a:t>
+            </a:r>
+            <a:r>
+              <a:rPr lang="en-GB" sz="2800" dirty="0" smtClean="0"/>
+              <a:t>:</a:t>
             </a:r>
           </a:p>
           <a:p>
             <a:pPr marL="0" indent="0">
               <a:buNone/>
             </a:pPr>
-            <a:endParaRPr lang="en-GB" dirty="0" smtClean="0"/>
+            <a:endParaRPr lang="en-GB" sz="2000" dirty="0" smtClean="0">
+              <a:latin typeface="Courier New"/>
+              <a:cs typeface="Courier New"/>
+            </a:endParaRPr>
           </a:p>
           <a:p>
             <a:pPr marL="0" indent="0">
               <a:buNone/>
             </a:pPr>
             <a:r>
+              <a:rPr lang="en-GB" sz="2000" dirty="0">
+                <a:latin typeface="Courier New"/>
+                <a:cs typeface="Courier New"/>
+              </a:rPr>
+              <a:t>~/IWOCL2016</a:t>
+            </a:r>
+            <a:r>
               <a:rPr lang="en-GB" sz="2000" dirty="0" smtClean="0">
                 <a:latin typeface="Courier New"/>
                 <a:cs typeface="Courier New"/>
               </a:rPr>
-              <a:t>Running </a:t>
+              <a:t>/exercises/</a:t>
             </a:r>
             <a:r>
               <a:rPr lang="en-GB" sz="2000" dirty="0">
                 <a:latin typeface="Courier New"/>
                 <a:cs typeface="Courier New"/>
               </a:rPr>
-              <a:t>reference...</a:t>
-            </a:r>
+              <a:t>Bilateral$ </a:t>
+            </a:r>
+            <a:r>
+              <a:rPr lang="en-GB" sz="2000" b="1" dirty="0">
+                <a:latin typeface="Courier New"/>
+                <a:cs typeface="Courier New"/>
+              </a:rPr>
+              <a:t>./</a:t>
+            </a:r>
+            <a:r>
+              <a:rPr lang="en-GB" sz="2000" b="1" dirty="0" smtClean="0">
+                <a:latin typeface="Courier New"/>
+                <a:cs typeface="Courier New"/>
+              </a:rPr>
+              <a:t>bilateral </a:t>
+            </a:r>
+            <a:endParaRPr lang="en-GB" sz="2000" b="1" dirty="0">
+              <a:latin typeface="Courier New"/>
+              <a:cs typeface="Courier New"/>
+            </a:endParaRPr>
           </a:p>
           <a:p>
             <a:pPr marL="0" indent="0">
@@ -10669,141 +10693,129 @@
                 <a:latin typeface="Courier New"/>
                 <a:cs typeface="Courier New"/>
               </a:rPr>
-              <a:t>Reference took 7784.3ms (1 frame</a:t>
+              <a:t>OpenCL took </a:t>
             </a:r>
             <a:r>
               <a:rPr lang="en-GB" sz="2000" dirty="0" smtClean="0">
                 <a:latin typeface="Courier New"/>
                 <a:cs typeface="Courier New"/>
               </a:rPr>
+              <a:t>425.2ms (</a:t>
+            </a:r>
+            <a:r>
+              <a:rPr lang="en-GB" sz="2000" b="1" dirty="0" smtClean="0">
+                <a:latin typeface="Courier New"/>
+                <a:cs typeface="Courier New"/>
+              </a:rPr>
+              <a:t>13.3ms</a:t>
+            </a:r>
+            <a:r>
+              <a:rPr lang="en-GB" sz="2000" dirty="0" smtClean="0">
+                <a:latin typeface="Courier New"/>
+                <a:cs typeface="Courier New"/>
+              </a:rPr>
+              <a:t> / frame)</a:t>
+            </a:r>
+          </a:p>
+          <a:p>
+            <a:pPr marL="0" indent="0">
+              <a:buNone/>
+            </a:pPr>
+            <a:endParaRPr lang="en-GB" sz="2000" dirty="0" smtClean="0">
+              <a:latin typeface="Courier New"/>
+              <a:cs typeface="Courier New"/>
+            </a:endParaRPr>
+          </a:p>
+          <a:p>
+            <a:pPr marL="0" indent="0">
+              <a:buNone/>
+            </a:pPr>
+            <a:r>
+              <a:rPr lang="en-GB" sz="2000" dirty="0" smtClean="0">
+                <a:latin typeface="Courier New"/>
+                <a:cs typeface="Courier New"/>
+              </a:rPr>
+              <a:t>~</a:t>
+            </a:r>
+            <a:r>
+              <a:rPr lang="en-GB" sz="2000" dirty="0">
+                <a:latin typeface="Courier New"/>
+                <a:cs typeface="Courier New"/>
+              </a:rPr>
+              <a:t>/IWOCL2016/solutions/Bilateral$ </a:t>
+            </a:r>
+            <a:r>
+              <a:rPr lang="en-GB" sz="2000" b="1" dirty="0">
+                <a:latin typeface="Courier New"/>
+                <a:cs typeface="Courier New"/>
+              </a:rPr>
+              <a:t>./</a:t>
+            </a:r>
+            <a:r>
+              <a:rPr lang="en-GB" sz="2000" b="1" dirty="0" err="1">
+                <a:latin typeface="Courier New"/>
+                <a:cs typeface="Courier New"/>
+              </a:rPr>
+              <a:t>bilateral_meta</a:t>
+            </a:r>
+            <a:r>
+              <a:rPr lang="en-GB" sz="2000" b="1" dirty="0">
+                <a:latin typeface="Courier New"/>
+                <a:cs typeface="Courier New"/>
+              </a:rPr>
+              <a:t> </a:t>
+            </a:r>
+          </a:p>
+          <a:p>
+            <a:pPr marL="0" indent="0">
+              <a:buNone/>
+            </a:pPr>
+            <a:r>
+              <a:rPr lang="en-GB" sz="2000" dirty="0" smtClean="0">
+                <a:latin typeface="Courier New"/>
+                <a:cs typeface="Courier New"/>
+              </a:rPr>
+              <a:t>OpenCL </a:t>
+            </a:r>
+            <a:r>
+              <a:rPr lang="en-GB" sz="2000" dirty="0">
+                <a:latin typeface="Courier New"/>
+                <a:cs typeface="Courier New"/>
+              </a:rPr>
+              <a:t>took 357.9ms (</a:t>
+            </a:r>
+            <a:r>
+              <a:rPr lang="en-GB" sz="2000" b="1" dirty="0">
+                <a:latin typeface="Courier New"/>
+                <a:cs typeface="Courier New"/>
+              </a:rPr>
+              <a:t>11.2ms</a:t>
+            </a:r>
+            <a:r>
+              <a:rPr lang="en-GB" sz="2000" dirty="0">
+                <a:latin typeface="Courier New"/>
+                <a:cs typeface="Courier New"/>
+              </a:rPr>
+              <a:t> / frame</a:t>
+            </a:r>
+            <a:r>
+              <a:rPr lang="en-GB" sz="2000" dirty="0" smtClean="0">
+                <a:latin typeface="Courier New"/>
+                <a:cs typeface="Courier New"/>
+              </a:rPr>
               <a:t>)</a:t>
             </a:r>
-          </a:p>
-          <a:p>
-            <a:pPr marL="0" indent="0">
-              <a:buNone/>
-            </a:pPr>
             <a:endParaRPr lang="en-GB" sz="2000" dirty="0">
               <a:latin typeface="Courier New"/>
               <a:cs typeface="Courier New"/>
             </a:endParaRPr>
           </a:p>
-          <a:p>
-            <a:pPr marL="0" indent="0">
-              <a:buNone/>
-            </a:pPr>
-            <a:r>
-              <a:rPr lang="en-GB" sz="2000" dirty="0">
-                <a:latin typeface="Courier New"/>
-                <a:cs typeface="Courier New"/>
-              </a:rPr>
-              <a:t>~/IWOCL2016/exercises/Bilateral$ </a:t>
-            </a:r>
-            <a:r>
-              <a:rPr lang="en-GB" sz="2000" b="1" dirty="0">
-                <a:latin typeface="Courier New"/>
-                <a:cs typeface="Courier New"/>
-              </a:rPr>
-              <a:t>./bilateral </a:t>
-            </a:r>
-          </a:p>
-          <a:p>
-            <a:pPr marL="0" indent="0">
-              <a:buNone/>
-            </a:pPr>
-            <a:r>
-              <a:rPr lang="en-GB" sz="2000" dirty="0" smtClean="0">
-                <a:latin typeface="Courier New"/>
-                <a:cs typeface="Courier New"/>
-              </a:rPr>
-              <a:t>OpenCL </a:t>
-            </a:r>
-            <a:r>
-              <a:rPr lang="en-GB" sz="2000" dirty="0">
-                <a:latin typeface="Courier New"/>
-                <a:cs typeface="Courier New"/>
-              </a:rPr>
-              <a:t>took 428.1ms (13.4ms / frame)</a:t>
-            </a:r>
-          </a:p>
-          <a:p>
-            <a:pPr marL="0" indent="0">
-              <a:buNone/>
-            </a:pPr>
-            <a:endParaRPr lang="en-GB" sz="2000" dirty="0" smtClean="0">
-              <a:latin typeface="Courier New"/>
-              <a:cs typeface="Courier New"/>
-            </a:endParaRPr>
-          </a:p>
-          <a:p>
-            <a:pPr marL="0" indent="0">
-              <a:buNone/>
-            </a:pPr>
-            <a:r>
-              <a:rPr lang="en-GB" sz="2000" dirty="0">
-                <a:latin typeface="Courier New"/>
-                <a:cs typeface="Courier New"/>
-              </a:rPr>
-              <a:t>~/IWOCL2016/solutions/Bilateral$ </a:t>
-            </a:r>
-            <a:r>
-              <a:rPr lang="en-GB" sz="2000" b="1" dirty="0">
-                <a:latin typeface="Courier New"/>
-                <a:cs typeface="Courier New"/>
-              </a:rPr>
-              <a:t>./</a:t>
-            </a:r>
-            <a:r>
-              <a:rPr lang="en-GB" sz="2000" b="1" dirty="0" err="1">
-                <a:latin typeface="Courier New"/>
-                <a:cs typeface="Courier New"/>
-              </a:rPr>
-              <a:t>bilateral_meta</a:t>
-            </a:r>
-            <a:r>
-              <a:rPr lang="en-GB" sz="2000" b="1" dirty="0">
-                <a:latin typeface="Courier New"/>
-                <a:cs typeface="Courier New"/>
-              </a:rPr>
-              <a:t> </a:t>
-            </a:r>
-          </a:p>
-          <a:p>
-            <a:pPr marL="0" indent="0">
-              <a:buNone/>
-            </a:pPr>
-            <a:r>
-              <a:rPr lang="en-GB" sz="2000" dirty="0" smtClean="0">
-                <a:latin typeface="Courier New"/>
-                <a:cs typeface="Courier New"/>
-              </a:rPr>
-              <a:t>OpenCL </a:t>
-            </a:r>
-            <a:r>
-              <a:rPr lang="en-GB" sz="2000" dirty="0">
-                <a:latin typeface="Courier New"/>
-                <a:cs typeface="Courier New"/>
-              </a:rPr>
-              <a:t>took 357.9ms (11.2ms / frame</a:t>
-            </a:r>
-            <a:r>
-              <a:rPr lang="en-GB" sz="2000" dirty="0" smtClean="0">
-                <a:latin typeface="Courier New"/>
-                <a:cs typeface="Courier New"/>
-              </a:rPr>
-              <a:t>)</a:t>
-            </a:r>
-            <a:endParaRPr lang="en-GB" dirty="0">
-              <a:latin typeface="Courier New"/>
-              <a:cs typeface="Courier New"/>
-            </a:endParaRPr>
-          </a:p>
         </p:txBody>
       </p:sp>
     </p:spTree>
     <p:extLst>
       <p:ext uri="{BB962C8B-B14F-4D97-AF65-F5344CB8AC3E}">
-        <p14:creationId xmlns:p14="http://schemas.microsoft.com/office/powerpoint/2010/main" val="3584939095"/>
+        <p14:creationId xmlns:p14="http://schemas.microsoft.com/office/powerpoint/2010/main" val="4218318277"/>
       </p:ext>
     </p:extLst>
   </p:cSld>
@@ -11976,11 +11988,11 @@
   <p:clrMapOvr>
     <a:masterClrMapping/>
   </p:clrMapOvr>
-  <mc:AlternateContent xmlns:mc="http://schemas.openxmlformats.org/markup-compatibility/2006">
-    <mc:Choice xmlns:p14="http://schemas.microsoft.com/office/powerpoint/2010/main" Requires="p14">
+  <mc:AlternateContent xmlns:mc="http://schemas.openxmlformats.org/markup-compatibility/2006" xmlns:p14="http://schemas.microsoft.com/office/powerpoint/2010/main">
+    <mc:Choice Requires="p14">
       <p:transition spd="slow" p14:dur="2000"/>
     </mc:Choice>
-    <mc:Fallback>
+    <mc:Fallback xmlns="">
       <p:transition xmlns:p14="http://schemas.microsoft.com/office/powerpoint/2010/main" spd="slow"/>
     </mc:Fallback>
   </mc:AlternateContent>
@@ -12542,11 +12554,11 @@
   <p:clrMapOvr>
     <a:masterClrMapping/>
   </p:clrMapOvr>
-  <mc:AlternateContent xmlns:mc="http://schemas.openxmlformats.org/markup-compatibility/2006">
-    <mc:Choice xmlns:p14="http://schemas.microsoft.com/office/powerpoint/2010/main" Requires="p14">
+  <mc:AlternateContent xmlns:mc="http://schemas.openxmlformats.org/markup-compatibility/2006" xmlns:p14="http://schemas.microsoft.com/office/powerpoint/2010/main">
+    <mc:Choice Requires="p14">
       <p:transition spd="slow" p14:dur="2000"/>
     </mc:Choice>
-    <mc:Fallback>
+    <mc:Fallback xmlns="">
       <p:transition xmlns:p14="http://schemas.microsoft.com/office/powerpoint/2010/main" spd="slow"/>
     </mc:Fallback>
   </mc:AlternateContent>

</xml_diff>

<commit_message>
Add SPIR-V overview slide to Part2
</commit_message>
<xml_diff>
--- a/slides/advanced_part2.pptx
+++ b/slides/advanced_part2.pptx
@@ -5,7 +5,7 @@
     <p:sldMasterId id="2147483648" r:id="rId1"/>
   </p:sldMasterIdLst>
   <p:notesMasterIdLst>
-    <p:notesMasterId r:id="rId26"/>
+    <p:notesMasterId r:id="rId27"/>
   </p:notesMasterIdLst>
   <p:sldIdLst>
     <p:sldId id="257" r:id="rId2"/>
@@ -18,20 +18,21 @@
     <p:sldId id="261" r:id="rId9"/>
     <p:sldId id="262" r:id="rId10"/>
     <p:sldId id="263" r:id="rId11"/>
-    <p:sldId id="267" r:id="rId12"/>
-    <p:sldId id="269" r:id="rId13"/>
-    <p:sldId id="268" r:id="rId14"/>
-    <p:sldId id="270" r:id="rId15"/>
-    <p:sldId id="271" r:id="rId16"/>
-    <p:sldId id="272" r:id="rId17"/>
-    <p:sldId id="278" r:id="rId18"/>
-    <p:sldId id="273" r:id="rId19"/>
-    <p:sldId id="274" r:id="rId20"/>
-    <p:sldId id="275" r:id="rId21"/>
-    <p:sldId id="281" r:id="rId22"/>
-    <p:sldId id="279" r:id="rId23"/>
-    <p:sldId id="277" r:id="rId24"/>
-    <p:sldId id="282" r:id="rId25"/>
+    <p:sldId id="283" r:id="rId12"/>
+    <p:sldId id="267" r:id="rId13"/>
+    <p:sldId id="269" r:id="rId14"/>
+    <p:sldId id="268" r:id="rId15"/>
+    <p:sldId id="270" r:id="rId16"/>
+    <p:sldId id="271" r:id="rId17"/>
+    <p:sldId id="272" r:id="rId18"/>
+    <p:sldId id="278" r:id="rId19"/>
+    <p:sldId id="273" r:id="rId20"/>
+    <p:sldId id="274" r:id="rId21"/>
+    <p:sldId id="275" r:id="rId22"/>
+    <p:sldId id="281" r:id="rId23"/>
+    <p:sldId id="279" r:id="rId24"/>
+    <p:sldId id="277" r:id="rId25"/>
+    <p:sldId id="282" r:id="rId26"/>
   </p:sldIdLst>
   <p:sldSz cx="9144000" cy="6858000" type="screen4x3"/>
   <p:notesSz cx="6858000" cy="9144000"/>
@@ -215,7 +216,7 @@
           <a:p>
             <a:fld id="{7FB74D45-CC88-7D46-9D48-9989C6A85D58}" type="datetimeFigureOut">
               <a:rPr lang="en-US" smtClean="0"/>
-              <a:t>25/07/16</a:t>
+              <a:t>12/05/17</a:t>
             </a:fld>
             <a:endParaRPr lang="en-US"/>
           </a:p>
@@ -715,7 +716,31 @@
           <a:bodyPr/>
           <a:lstStyle/>
           <a:p>
-            <a:endParaRPr lang="en-GB" dirty="0"/>
+            <a:r>
+              <a:rPr lang="en-GB" dirty="0" smtClean="0"/>
+              <a:t>Core in </a:t>
+            </a:r>
+            <a:r>
+              <a:rPr lang="en-GB" dirty="0" err="1" smtClean="0"/>
+              <a:t>Vulkan</a:t>
+            </a:r>
+            <a:r>
+              <a:rPr lang="en-GB" dirty="0" smtClean="0"/>
+              <a:t> from 1.0</a:t>
+            </a:r>
+          </a:p>
+          <a:p>
+            <a:r>
+              <a:rPr lang="en-GB" dirty="0" smtClean="0"/>
+              <a:t>Core</a:t>
+            </a:r>
+            <a:r>
+              <a:rPr lang="en-GB" baseline="0" dirty="0" smtClean="0"/>
+              <a:t> in OpenCL 2.1</a:t>
+            </a:r>
+          </a:p>
+          <a:p>
+            <a:endParaRPr lang="en-GB" baseline="0" dirty="0" smtClean="0"/>
           </a:p>
         </p:txBody>
       </p:sp>
@@ -736,7 +761,7 @@
           <a:p>
             <a:fld id="{E0B00886-CC17-8E42-AE02-995FCC132C1C}" type="slidenum">
               <a:rPr lang="en-US" smtClean="0"/>
-              <a:t>12</a:t>
+              <a:t>11</a:t>
             </a:fld>
             <a:endParaRPr lang="en-US"/>
           </a:p>
@@ -745,7 +770,7 @@
     </p:spTree>
     <p:extLst>
       <p:ext uri="{BB962C8B-B14F-4D97-AF65-F5344CB8AC3E}">
-        <p14:creationId xmlns:p14="http://schemas.microsoft.com/office/powerpoint/2010/main" val="1354698458"/>
+        <p14:creationId xmlns:p14="http://schemas.microsoft.com/office/powerpoint/2010/main" val="1400531646"/>
       </p:ext>
     </p:extLst>
   </p:cSld>
@@ -799,14 +824,6 @@
           <a:bodyPr/>
           <a:lstStyle/>
           <a:p>
-            <a:r>
-              <a:rPr lang="en-GB" dirty="0" smtClean="0"/>
-              <a:t>e.g. Image processing framework, allow third-parties</a:t>
-            </a:r>
-            <a:r>
-              <a:rPr lang="en-GB" baseline="0" dirty="0" smtClean="0"/>
-              <a:t> to drop additional filter kernels into directory and automatically insert them into pipeline</a:t>
-            </a:r>
             <a:endParaRPr lang="en-GB" dirty="0"/>
           </a:p>
         </p:txBody>
@@ -837,7 +854,7 @@
     </p:spTree>
     <p:extLst>
       <p:ext uri="{BB962C8B-B14F-4D97-AF65-F5344CB8AC3E}">
-        <p14:creationId xmlns:p14="http://schemas.microsoft.com/office/powerpoint/2010/main" val="1015348040"/>
+        <p14:creationId xmlns:p14="http://schemas.microsoft.com/office/powerpoint/2010/main" val="1354698458"/>
       </p:ext>
     </p:extLst>
   </p:cSld>
@@ -893,29 +910,12 @@
           <a:p>
             <a:r>
               <a:rPr lang="en-GB" dirty="0" smtClean="0"/>
-              <a:t>Hints</a:t>
+              <a:t>e.g. Image processing framework, allow third-parties</a:t>
             </a:r>
             <a:r>
               <a:rPr lang="en-GB" baseline="0" dirty="0" smtClean="0"/>
-              <a:t> to compiler to make it potentially enable more optimizations.</a:t>
-            </a:r>
-          </a:p>
-          <a:p>
-            <a:r>
-              <a:rPr lang="en-GB" baseline="0" dirty="0" err="1" smtClean="0"/>
-              <a:t>reqd_work_group_size</a:t>
-            </a:r>
-            <a:r>
-              <a:rPr lang="en-GB" baseline="0" dirty="0" smtClean="0"/>
-              <a:t> requires that we know WGSIZE at compile-time, but can use meta</a:t>
-            </a:r>
-            <a:r>
-              <a:rPr lang="en-GB" baseline="0" smtClean="0"/>
-              <a:t>-programming</a:t>
-            </a:r>
-            <a:endParaRPr lang="en-GB" baseline="0" dirty="0" smtClean="0"/>
-          </a:p>
-          <a:p>
+              <a:t> to drop additional filter kernels into directory and automatically insert them into pipeline</a:t>
+            </a:r>
             <a:endParaRPr lang="en-GB" dirty="0"/>
           </a:p>
         </p:txBody>
@@ -935,19 +935,18 @@
           <a:bodyPr/>
           <a:lstStyle/>
           <a:p>
-            <a:fld id="{9B3F2D69-97A9-4C41-91BD-6A22F8270148}" type="slidenum">
-              <a:rPr lang="en-GB" smtClean="0"/>
-              <a:pPr/>
-              <a:t>17</a:t>
+            <a:fld id="{E0B00886-CC17-8E42-AE02-995FCC132C1C}" type="slidenum">
+              <a:rPr lang="en-US" smtClean="0"/>
+              <a:t>14</a:t>
             </a:fld>
-            <a:endParaRPr lang="en-GB"/>
+            <a:endParaRPr lang="en-US"/>
           </a:p>
         </p:txBody>
       </p:sp>
     </p:spTree>
     <p:extLst>
       <p:ext uri="{BB962C8B-B14F-4D97-AF65-F5344CB8AC3E}">
-        <p14:creationId xmlns:p14="http://schemas.microsoft.com/office/powerpoint/2010/main" val="393086129"/>
+        <p14:creationId xmlns:p14="http://schemas.microsoft.com/office/powerpoint/2010/main" val="1015348040"/>
       </p:ext>
     </p:extLst>
   </p:cSld>
@@ -1002,13 +1001,30 @@
           <a:lstStyle/>
           <a:p>
             <a:r>
-              <a:rPr lang="en-GB" dirty="0" err="1" smtClean="0"/>
-              <a:t>ifdefs</a:t>
+              <a:rPr lang="en-GB" dirty="0" smtClean="0"/>
+              <a:t>Hints</a:t>
             </a:r>
             <a:r>
               <a:rPr lang="en-GB" baseline="0" dirty="0" smtClean="0"/>
-              <a:t> for toggling functionality</a:t>
-            </a:r>
+              <a:t> to compiler to make it potentially enable more optimizations.</a:t>
+            </a:r>
+          </a:p>
+          <a:p>
+            <a:r>
+              <a:rPr lang="en-GB" baseline="0" dirty="0" err="1" smtClean="0"/>
+              <a:t>reqd_work_group_size</a:t>
+            </a:r>
+            <a:r>
+              <a:rPr lang="en-GB" baseline="0" dirty="0" smtClean="0"/>
+              <a:t> requires that we know WGSIZE at compile-time, but can use meta</a:t>
+            </a:r>
+            <a:r>
+              <a:rPr lang="en-GB" baseline="0" smtClean="0"/>
+              <a:t>-programming</a:t>
+            </a:r>
+            <a:endParaRPr lang="en-GB" baseline="0" dirty="0" smtClean="0"/>
+          </a:p>
+          <a:p>
             <a:endParaRPr lang="en-GB" dirty="0"/>
           </a:p>
         </p:txBody>
@@ -1028,18 +1044,19 @@
           <a:bodyPr/>
           <a:lstStyle/>
           <a:p>
-            <a:fld id="{E0B00886-CC17-8E42-AE02-995FCC132C1C}" type="slidenum">
-              <a:rPr lang="en-US" smtClean="0"/>
-              <a:t>20</a:t>
+            <a:fld id="{9B3F2D69-97A9-4C41-91BD-6A22F8270148}" type="slidenum">
+              <a:rPr lang="en-GB" smtClean="0"/>
+              <a:pPr/>
+              <a:t>18</a:t>
             </a:fld>
-            <a:endParaRPr lang="en-US"/>
+            <a:endParaRPr lang="en-GB"/>
           </a:p>
         </p:txBody>
       </p:sp>
     </p:spTree>
     <p:extLst>
       <p:ext uri="{BB962C8B-B14F-4D97-AF65-F5344CB8AC3E}">
-        <p14:creationId xmlns:p14="http://schemas.microsoft.com/office/powerpoint/2010/main" val="2018077648"/>
+        <p14:creationId xmlns:p14="http://schemas.microsoft.com/office/powerpoint/2010/main" val="393086129"/>
       </p:ext>
     </p:extLst>
   </p:cSld>
@@ -1094,20 +1111,12 @@
           <a:lstStyle/>
           <a:p>
             <a:r>
-              <a:rPr lang="en-GB" dirty="0" smtClean="0"/>
-              <a:t>Runtime</a:t>
+              <a:rPr lang="en-GB" dirty="0" err="1" smtClean="0"/>
+              <a:t>ifdefs</a:t>
             </a:r>
             <a:r>
               <a:rPr lang="en-GB" baseline="0" dirty="0" smtClean="0"/>
-              <a:t> can perform constant folding, constant propagation </a:t>
-            </a:r>
-            <a:r>
-              <a:rPr lang="en-GB" baseline="0" dirty="0" err="1" smtClean="0"/>
-              <a:t>etc</a:t>
-            </a:r>
-            <a:r>
-              <a:rPr lang="en-GB" baseline="0" dirty="0" smtClean="0"/>
-              <a:t> before finalizing to native ISA</a:t>
+              <a:t> for toggling functionality</a:t>
             </a:r>
             <a:endParaRPr lang="en-GB" dirty="0"/>
           </a:p>
@@ -1131,6 +1140,106 @@
             <a:fld id="{E0B00886-CC17-8E42-AE02-995FCC132C1C}" type="slidenum">
               <a:rPr lang="en-US" smtClean="0"/>
               <a:t>21</a:t>
+            </a:fld>
+            <a:endParaRPr lang="en-US"/>
+          </a:p>
+        </p:txBody>
+      </p:sp>
+    </p:spTree>
+    <p:extLst>
+      <p:ext uri="{BB962C8B-B14F-4D97-AF65-F5344CB8AC3E}">
+        <p14:creationId xmlns:p14="http://schemas.microsoft.com/office/powerpoint/2010/main" val="2018077648"/>
+      </p:ext>
+    </p:extLst>
+  </p:cSld>
+  <p:clrMapOvr>
+    <a:masterClrMapping/>
+  </p:clrMapOvr>
+</p:notes>
+</file>
+
+<file path=ppt/notesSlides/notesSlide8.xml><?xml version="1.0" encoding="utf-8"?>
+<p:notes xmlns:a="http://schemas.openxmlformats.org/drawingml/2006/main" xmlns:r="http://schemas.openxmlformats.org/officeDocument/2006/relationships" xmlns:p="http://schemas.openxmlformats.org/presentationml/2006/main">
+  <p:cSld>
+    <p:spTree>
+      <p:nvGrpSpPr>
+        <p:cNvPr id="1" name=""/>
+        <p:cNvGrpSpPr/>
+        <p:nvPr/>
+      </p:nvGrpSpPr>
+      <p:grpSpPr>
+        <a:xfrm>
+          <a:off x="0" y="0"/>
+          <a:ext cx="0" cy="0"/>
+          <a:chOff x="0" y="0"/>
+          <a:chExt cx="0" cy="0"/>
+        </a:xfrm>
+      </p:grpSpPr>
+      <p:sp>
+        <p:nvSpPr>
+          <p:cNvPr id="2" name="Slide Image Placeholder 1"/>
+          <p:cNvSpPr>
+            <a:spLocks noGrp="1" noRot="1" noChangeAspect="1"/>
+          </p:cNvSpPr>
+          <p:nvPr>
+            <p:ph type="sldImg"/>
+          </p:nvPr>
+        </p:nvSpPr>
+        <p:spPr/>
+      </p:sp>
+      <p:sp>
+        <p:nvSpPr>
+          <p:cNvPr id="3" name="Notes Placeholder 2"/>
+          <p:cNvSpPr>
+            <a:spLocks noGrp="1"/>
+          </p:cNvSpPr>
+          <p:nvPr>
+            <p:ph type="body" idx="1"/>
+          </p:nvPr>
+        </p:nvSpPr>
+        <p:spPr/>
+        <p:txBody>
+          <a:bodyPr/>
+          <a:lstStyle/>
+          <a:p>
+            <a:r>
+              <a:rPr lang="en-GB" dirty="0" smtClean="0"/>
+              <a:t>Runtime</a:t>
+            </a:r>
+            <a:r>
+              <a:rPr lang="en-GB" baseline="0" dirty="0" smtClean="0"/>
+              <a:t> can perform constant folding, constant propagation </a:t>
+            </a:r>
+            <a:r>
+              <a:rPr lang="en-GB" baseline="0" dirty="0" err="1" smtClean="0"/>
+              <a:t>etc</a:t>
+            </a:r>
+            <a:r>
+              <a:rPr lang="en-GB" baseline="0" dirty="0" smtClean="0"/>
+              <a:t> before finalizing to native ISA</a:t>
+            </a:r>
+            <a:endParaRPr lang="en-GB" dirty="0"/>
+          </a:p>
+        </p:txBody>
+      </p:sp>
+      <p:sp>
+        <p:nvSpPr>
+          <p:cNvPr id="4" name="Slide Number Placeholder 3"/>
+          <p:cNvSpPr>
+            <a:spLocks noGrp="1"/>
+          </p:cNvSpPr>
+          <p:nvPr>
+            <p:ph type="sldNum" sz="quarter" idx="10"/>
+          </p:nvPr>
+        </p:nvSpPr>
+        <p:spPr/>
+        <p:txBody>
+          <a:bodyPr/>
+          <a:lstStyle/>
+          <a:p>
+            <a:fld id="{E0B00886-CC17-8E42-AE02-995FCC132C1C}" type="slidenum">
+              <a:rPr lang="en-US" smtClean="0"/>
+              <a:t>22</a:t>
             </a:fld>
             <a:endParaRPr lang="en-US"/>
           </a:p>
@@ -1330,7 +1439,7 @@
           <a:p>
             <a:fld id="{D735EA19-98D7-5F47-83EC-D97C4239F8D5}" type="datetimeFigureOut">
               <a:rPr lang="en-US" smtClean="0"/>
-              <a:t>25/07/16</a:t>
+              <a:t>12/05/17</a:t>
             </a:fld>
             <a:endParaRPr lang="en-GB"/>
           </a:p>
@@ -1500,7 +1609,7 @@
           <a:p>
             <a:fld id="{D735EA19-98D7-5F47-83EC-D97C4239F8D5}" type="datetimeFigureOut">
               <a:rPr lang="en-US" smtClean="0"/>
-              <a:t>25/07/16</a:t>
+              <a:t>12/05/17</a:t>
             </a:fld>
             <a:endParaRPr lang="en-GB"/>
           </a:p>
@@ -1680,7 +1789,7 @@
           <a:p>
             <a:fld id="{D735EA19-98D7-5F47-83EC-D97C4239F8D5}" type="datetimeFigureOut">
               <a:rPr lang="en-US" smtClean="0"/>
-              <a:t>25/07/16</a:t>
+              <a:t>12/05/17</a:t>
             </a:fld>
             <a:endParaRPr lang="en-GB"/>
           </a:p>
@@ -1850,7 +1959,7 @@
           <a:p>
             <a:fld id="{D735EA19-98D7-5F47-83EC-D97C4239F8D5}" type="datetimeFigureOut">
               <a:rPr lang="en-US" smtClean="0"/>
-              <a:t>25/07/16</a:t>
+              <a:t>12/05/17</a:t>
             </a:fld>
             <a:endParaRPr lang="en-GB"/>
           </a:p>
@@ -2096,7 +2205,7 @@
           <a:p>
             <a:fld id="{D735EA19-98D7-5F47-83EC-D97C4239F8D5}" type="datetimeFigureOut">
               <a:rPr lang="en-US" smtClean="0"/>
-              <a:t>25/07/16</a:t>
+              <a:t>12/05/17</a:t>
             </a:fld>
             <a:endParaRPr lang="en-GB"/>
           </a:p>
@@ -2384,7 +2493,7 @@
           <a:p>
             <a:fld id="{D735EA19-98D7-5F47-83EC-D97C4239F8D5}" type="datetimeFigureOut">
               <a:rPr lang="en-US" smtClean="0"/>
-              <a:t>25/07/16</a:t>
+              <a:t>12/05/17</a:t>
             </a:fld>
             <a:endParaRPr lang="en-GB"/>
           </a:p>
@@ -2806,7 +2915,7 @@
           <a:p>
             <a:fld id="{D735EA19-98D7-5F47-83EC-D97C4239F8D5}" type="datetimeFigureOut">
               <a:rPr lang="en-US" smtClean="0"/>
-              <a:t>25/07/16</a:t>
+              <a:t>12/05/17</a:t>
             </a:fld>
             <a:endParaRPr lang="en-GB"/>
           </a:p>
@@ -2924,7 +3033,7 @@
           <a:p>
             <a:fld id="{D735EA19-98D7-5F47-83EC-D97C4239F8D5}" type="datetimeFigureOut">
               <a:rPr lang="en-US" smtClean="0"/>
-              <a:t>25/07/16</a:t>
+              <a:t>12/05/17</a:t>
             </a:fld>
             <a:endParaRPr lang="en-GB"/>
           </a:p>
@@ -3019,7 +3128,7 @@
           <a:p>
             <a:fld id="{D735EA19-98D7-5F47-83EC-D97C4239F8D5}" type="datetimeFigureOut">
               <a:rPr lang="en-US" smtClean="0"/>
-              <a:t>25/07/16</a:t>
+              <a:t>12/05/17</a:t>
             </a:fld>
             <a:endParaRPr lang="en-GB"/>
           </a:p>
@@ -3296,7 +3405,7 @@
           <a:p>
             <a:fld id="{D735EA19-98D7-5F47-83EC-D97C4239F8D5}" type="datetimeFigureOut">
               <a:rPr lang="en-US" smtClean="0"/>
-              <a:t>25/07/16</a:t>
+              <a:t>12/05/17</a:t>
             </a:fld>
             <a:endParaRPr lang="en-GB"/>
           </a:p>
@@ -3549,7 +3658,7 @@
           <a:p>
             <a:fld id="{D735EA19-98D7-5F47-83EC-D97C4239F8D5}" type="datetimeFigureOut">
               <a:rPr lang="en-US" smtClean="0"/>
-              <a:t>25/07/16</a:t>
+              <a:t>12/05/17</a:t>
             </a:fld>
             <a:endParaRPr lang="en-GB"/>
           </a:p>
@@ -3762,7 +3871,7 @@
           <a:p>
             <a:fld id="{D735EA19-98D7-5F47-83EC-D97C4239F8D5}" type="datetimeFigureOut">
               <a:rPr lang="en-US" smtClean="0"/>
-              <a:t>25/07/16</a:t>
+              <a:t>12/05/17</a:t>
             </a:fld>
             <a:endParaRPr lang="en-GB"/>
           </a:p>
@@ -4379,7 +4488,7 @@
       </p:sp>
       <p:pic>
         <p:nvPicPr>
-          <p:cNvPr id="5" name="Picture 2"/>
+          <p:cNvPr id="6" name="Picture 2"/>
           <p:cNvPicPr>
             <a:picLocks noChangeAspect="1" noChangeArrowheads="1"/>
           </p:cNvPicPr>
@@ -4400,7 +4509,7 @@
         </p:blipFill>
         <p:spPr bwMode="auto">
           <a:xfrm>
-            <a:off x="6240797" y="341830"/>
+            <a:off x="6529976" y="341830"/>
             <a:ext cx="2259248" cy="1129624"/>
           </a:xfrm>
           <a:prstGeom prst="rect">
@@ -4470,7 +4579,7 @@
           <a:p>
             <a:r>
               <a:rPr lang="en-GB" dirty="0" smtClean="0"/>
-              <a:t>Generating Assembly Code</a:t>
+              <a:t>SPIR-V Overview</a:t>
             </a:r>
             <a:endParaRPr lang="en-GB" dirty="0"/>
           </a:p>
@@ -4489,123 +4598,228 @@
         <p:spPr/>
         <p:txBody>
           <a:bodyPr>
-            <a:normAutofit fontScale="92500" lnSpcReduction="10000"/>
+            <a:normAutofit fontScale="85000" lnSpcReduction="20000"/>
           </a:bodyPr>
           <a:lstStyle/>
           <a:p>
+            <a:pPr>
+              <a:spcAft>
+                <a:spcPts val="600"/>
+              </a:spcAft>
+            </a:pPr>
             <a:r>
               <a:rPr lang="en-GB" dirty="0" smtClean="0"/>
-              <a:t>It can be useful to inspect compiler output to see if the compiler is doing what you think it’s doing</a:t>
-            </a:r>
-          </a:p>
-          <a:p>
+              <a:t>Cross-vendor intermediate language</a:t>
+            </a:r>
+          </a:p>
+          <a:p>
+            <a:pPr>
+              <a:spcAft>
+                <a:spcPts val="600"/>
+              </a:spcAft>
+            </a:pPr>
             <a:r>
               <a:rPr lang="en-GB" dirty="0" smtClean="0"/>
-              <a:t>On NVIDIA platforms the ‘binary’ retrieved is actually PTX, their abstract assembly language</a:t>
-            </a:r>
-          </a:p>
-          <a:p>
+              <a:t>Supported as core by both OpenCL and </a:t>
+            </a:r>
+            <a:r>
+              <a:rPr lang="en-GB" dirty="0" err="1" smtClean="0"/>
+              <a:t>Vulkan</a:t>
+            </a:r>
             <a:r>
               <a:rPr lang="en-GB" dirty="0" smtClean="0"/>
-              <a:t>On AMD platforms you can add </a:t>
+              <a:t> APIs</a:t>
+            </a:r>
+          </a:p>
+          <a:p>
+            <a:pPr lvl="1">
+              <a:spcAft>
+                <a:spcPts val="600"/>
+              </a:spcAft>
+            </a:pPr>
+            <a:r>
+              <a:rPr lang="en-GB" sz="2400" dirty="0" smtClean="0"/>
+              <a:t>Two different ‘</a:t>
+            </a:r>
+            <a:r>
+              <a:rPr lang="en-GB" sz="2400" dirty="0" err="1" smtClean="0"/>
+              <a:t>flavors</a:t>
+            </a:r>
+            <a:r>
+              <a:rPr lang="en-GB" sz="2400" dirty="0" smtClean="0"/>
+              <a:t>’ of SPIR-V </a:t>
+            </a:r>
+          </a:p>
+          <a:p>
+            <a:pPr lvl="1">
+              <a:spcAft>
+                <a:spcPts val="600"/>
+              </a:spcAft>
+            </a:pPr>
+            <a:r>
+              <a:rPr lang="en-GB" sz="2400" dirty="0" smtClean="0"/>
+              <a:t>Environment specifications describe which features supported by each</a:t>
+            </a:r>
+          </a:p>
+          <a:p>
+            <a:pPr>
+              <a:spcAft>
+                <a:spcPts val="600"/>
+              </a:spcAft>
+            </a:pPr>
+            <a:r>
+              <a:rPr lang="en-GB" dirty="0" smtClean="0"/>
+              <a:t>Clean-sheet design, no dependency on LLVM</a:t>
+            </a:r>
+          </a:p>
+          <a:p>
+            <a:pPr lvl="1">
+              <a:spcAft>
+                <a:spcPts val="600"/>
+              </a:spcAft>
+            </a:pPr>
+            <a:r>
+              <a:rPr lang="en-GB" sz="2400" dirty="0" smtClean="0"/>
+              <a:t>Open-source tools* provided for SPIR-V&lt;-&gt;LLVM translation</a:t>
+            </a:r>
+          </a:p>
+          <a:p>
+            <a:pPr>
+              <a:spcAft>
+                <a:spcPts val="600"/>
+              </a:spcAft>
+            </a:pPr>
+            <a:r>
+              <a:rPr lang="en-GB" dirty="0" smtClean="0"/>
+              <a:t>Enables alternative kernel programming languages</a:t>
+            </a:r>
+          </a:p>
+          <a:p>
+            <a:pPr lvl="1">
+              <a:spcAft>
+                <a:spcPts val="600"/>
+              </a:spcAft>
+            </a:pPr>
+            <a:r>
+              <a:rPr lang="en-GB" sz="2400" dirty="0" smtClean="0"/>
+              <a:t>OpenCL 2.2 introduces C++ kernel language using SPIR-V 1.2</a:t>
+            </a:r>
+          </a:p>
+          <a:p>
+            <a:pPr>
+              <a:spcAft>
+                <a:spcPts val="600"/>
+              </a:spcAft>
+            </a:pPr>
+            <a:r>
+              <a:rPr lang="en-GB" dirty="0" smtClean="0"/>
+              <a:t>Offline compilation workflow</a:t>
+            </a:r>
+          </a:p>
+          <a:p>
+            <a:pPr lvl="1">
+              <a:spcAft>
+                <a:spcPts val="600"/>
+              </a:spcAft>
+            </a:pPr>
+            <a:r>
+              <a:rPr lang="en-GB" sz="2400" dirty="0" smtClean="0"/>
+              <a:t>Lowered to native ISA at runtime</a:t>
+            </a:r>
+          </a:p>
+        </p:txBody>
+      </p:sp>
+      <p:pic>
+        <p:nvPicPr>
+          <p:cNvPr id="5" name="Picture 2"/>
+          <p:cNvPicPr>
+            <a:picLocks noChangeAspect="1" noChangeArrowheads="1"/>
+          </p:cNvPicPr>
+          <p:nvPr/>
+        </p:nvPicPr>
+        <p:blipFill>
+          <a:blip r:embed="rId3">
+            <a:extLst>
+              <a:ext uri="{28A0092B-C50C-407E-A947-70E740481C1C}">
+                <a14:useLocalDpi xmlns:a14="http://schemas.microsoft.com/office/drawing/2010/main" val="0"/>
+              </a:ext>
+            </a:extLst>
+          </a:blip>
+          <a:srcRect/>
+          <a:stretch>
+            <a:fillRect/>
+          </a:stretch>
+        </p:blipFill>
+        <p:spPr bwMode="auto">
+          <a:xfrm>
+            <a:off x="6529976" y="341830"/>
+            <a:ext cx="2259248" cy="1129624"/>
+          </a:xfrm>
+          <a:prstGeom prst="rect">
+            <a:avLst/>
+          </a:prstGeom>
+          <a:solidFill>
+            <a:schemeClr val="bg1"/>
+          </a:solidFill>
+          <a:ln>
+            <a:noFill/>
+          </a:ln>
+          <a:effectLst/>
+          <a:extLst/>
+        </p:spPr>
+      </p:pic>
+      <p:sp>
+        <p:nvSpPr>
+          <p:cNvPr id="6" name="TextBox 5"/>
+          <p:cNvSpPr txBox="1"/>
+          <p:nvPr/>
+        </p:nvSpPr>
+        <p:spPr>
+          <a:xfrm>
+            <a:off x="457200" y="6341673"/>
+            <a:ext cx="2800767" cy="369332"/>
+          </a:xfrm>
+          <a:prstGeom prst="rect">
+            <a:avLst/>
+          </a:prstGeom>
+          <a:noFill/>
+        </p:spPr>
+        <p:txBody>
+          <a:bodyPr wrap="none" rtlCol="0">
+            <a:spAutoFit/>
+          </a:bodyPr>
+          <a:lstStyle/>
+          <a:p>
+            <a:r>
+              <a:rPr lang="en-GB" dirty="0"/>
+              <a:t>*</a:t>
             </a:r>
             <a:r>
               <a:rPr lang="en-GB" b="1" dirty="0" smtClean="0">
-                <a:solidFill>
-                  <a:srgbClr val="3366FF"/>
-                </a:solidFill>
-                <a:latin typeface="Courier New"/>
-                <a:cs typeface="Courier New"/>
-              </a:rPr>
-              <a:t>–save-temps</a:t>
-            </a:r>
-            <a:r>
-              <a:rPr lang="en-GB" dirty="0" smtClean="0"/>
-              <a:t> to the build options to generate </a:t>
-            </a:r>
-            <a:r>
-              <a:rPr lang="en-GB" b="1" dirty="0" smtClean="0">
-                <a:solidFill>
-                  <a:srgbClr val="3366FF"/>
-                </a:solidFill>
-                <a:latin typeface="Courier New"/>
-                <a:cs typeface="Courier New"/>
-              </a:rPr>
-              <a:t>.</a:t>
-            </a:r>
-            <a:r>
-              <a:rPr lang="en-GB" b="1" dirty="0" err="1" smtClean="0">
-                <a:solidFill>
-                  <a:srgbClr val="3366FF"/>
-                </a:solidFill>
-                <a:latin typeface="Courier New"/>
-                <a:cs typeface="Courier New"/>
-              </a:rPr>
-              <a:t>il</a:t>
-            </a:r>
-            <a:r>
-              <a:rPr lang="en-GB" b="1" dirty="0" smtClean="0">
-                <a:solidFill>
-                  <a:srgbClr val="3366FF"/>
-                </a:solidFill>
-              </a:rPr>
-              <a:t> </a:t>
-            </a:r>
-            <a:r>
-              <a:rPr lang="en-GB" dirty="0" smtClean="0"/>
-              <a:t>and </a:t>
-            </a:r>
-            <a:r>
-              <a:rPr lang="en-GB" b="1" dirty="0" smtClean="0">
-                <a:solidFill>
-                  <a:srgbClr val="3366FF"/>
-                </a:solidFill>
-                <a:latin typeface="Courier New"/>
-                <a:cs typeface="Courier New"/>
-              </a:rPr>
-              <a:t>.</a:t>
-            </a:r>
-            <a:r>
-              <a:rPr lang="en-GB" b="1" dirty="0" err="1" smtClean="0">
-                <a:solidFill>
-                  <a:srgbClr val="3366FF"/>
-                </a:solidFill>
-                <a:latin typeface="Courier New"/>
-                <a:cs typeface="Courier New"/>
-              </a:rPr>
-              <a:t>isa</a:t>
-            </a:r>
-            <a:r>
-              <a:rPr lang="en-GB" dirty="0" smtClean="0"/>
-              <a:t> files containing the intermediate representation and native assembly code</a:t>
-            </a:r>
-          </a:p>
-          <a:p>
-            <a:r>
-              <a:rPr lang="en-GB" dirty="0" smtClean="0"/>
-              <a:t>Other vendors may provide an offline compiler which can generate LLVM/SPIR or assembly</a:t>
-            </a:r>
-            <a:endParaRPr lang="en-GB" dirty="0"/>
+                <a:hlinkClick r:id="rId4"/>
+              </a:rPr>
+              <a:t>http</a:t>
+            </a:r>
+            <a:r>
+              <a:rPr lang="en-GB" b="1" dirty="0">
+                <a:hlinkClick r:id="rId4"/>
+              </a:rPr>
+              <a:t>://github.khronos.org</a:t>
+            </a:r>
+            <a:endParaRPr lang="en-GB" b="1" dirty="0"/>
           </a:p>
         </p:txBody>
       </p:sp>
     </p:spTree>
     <p:extLst>
       <p:ext uri="{BB962C8B-B14F-4D97-AF65-F5344CB8AC3E}">
-        <p14:creationId xmlns:p14="http://schemas.microsoft.com/office/powerpoint/2010/main" val="1647771582"/>
+        <p14:creationId xmlns:p14="http://schemas.microsoft.com/office/powerpoint/2010/main" val="2526003912"/>
       </p:ext>
     </p:extLst>
   </p:cSld>
   <p:clrMapOvr>
     <a:masterClrMapping/>
   </p:clrMapOvr>
-  <p:timing>
-    <p:tnLst>
-      <p:par>
-        <p:cTn xmlns:p14="http://schemas.microsoft.com/office/powerpoint/2010/main" id="1" dur="indefinite" restart="never" nodeType="tmRoot"/>
-      </p:par>
-    </p:tnLst>
-  </p:timing>
 </p:sld>
 </file>
 
@@ -4643,7 +4857,7 @@
           <a:p>
             <a:r>
               <a:rPr lang="en-GB" dirty="0" smtClean="0"/>
-              <a:t>Kernel Introspection</a:t>
+              <a:t>Generating Assembly Code</a:t>
             </a:r>
             <a:endParaRPr lang="en-GB" dirty="0"/>
           </a:p>
@@ -4662,25 +4876,101 @@
         <p:spPr/>
         <p:txBody>
           <a:bodyPr>
-            <a:normAutofit/>
+            <a:normAutofit fontScale="92500" lnSpcReduction="10000"/>
           </a:bodyPr>
           <a:lstStyle/>
           <a:p>
             <a:r>
               <a:rPr lang="en-GB" dirty="0" smtClean="0"/>
-              <a:t>This provides a mechanism for automatically discovering and using new kernels, without having to write any new host code</a:t>
+              <a:t>It can be useful to inspect compiler output to see if the compiler is doing what you think it’s doing</a:t>
             </a:r>
           </a:p>
           <a:p>
             <a:r>
               <a:rPr lang="en-GB" dirty="0" smtClean="0"/>
-              <a:t>Can make it much easier to add new kernels to an existing application</a:t>
+              <a:t>On NVIDIA platforms the ‘binary’ retrieved is actually PTX, their abstract assembly language</a:t>
             </a:r>
           </a:p>
           <a:p>
             <a:r>
               <a:rPr lang="en-GB" dirty="0" smtClean="0"/>
-              <a:t>Provides a means for libraries and frameworks to accept additional kernels from third parties</a:t>
+              <a:t>On AMD platforms you can add </a:t>
+            </a:r>
+            <a:r>
+              <a:rPr lang="en-GB" b="1" dirty="0" smtClean="0">
+                <a:solidFill>
+                  <a:srgbClr val="3366FF"/>
+                </a:solidFill>
+                <a:latin typeface="Courier New"/>
+                <a:cs typeface="Courier New"/>
+              </a:rPr>
+              <a:t>–save-temps</a:t>
+            </a:r>
+            <a:r>
+              <a:rPr lang="en-GB" dirty="0" smtClean="0"/>
+              <a:t> to the build options to generate </a:t>
+            </a:r>
+            <a:r>
+              <a:rPr lang="en-GB" b="1" dirty="0" smtClean="0">
+                <a:solidFill>
+                  <a:srgbClr val="3366FF"/>
+                </a:solidFill>
+                <a:latin typeface="Courier New"/>
+                <a:cs typeface="Courier New"/>
+              </a:rPr>
+              <a:t>.</a:t>
+            </a:r>
+            <a:r>
+              <a:rPr lang="en-GB" b="1" dirty="0" err="1" smtClean="0">
+                <a:solidFill>
+                  <a:srgbClr val="3366FF"/>
+                </a:solidFill>
+                <a:latin typeface="Courier New"/>
+                <a:cs typeface="Courier New"/>
+              </a:rPr>
+              <a:t>il</a:t>
+            </a:r>
+            <a:r>
+              <a:rPr lang="en-GB" b="1" dirty="0" smtClean="0">
+                <a:solidFill>
+                  <a:srgbClr val="3366FF"/>
+                </a:solidFill>
+              </a:rPr>
+              <a:t> </a:t>
+            </a:r>
+            <a:r>
+              <a:rPr lang="en-GB" dirty="0" smtClean="0"/>
+              <a:t>and </a:t>
+            </a:r>
+            <a:r>
+              <a:rPr lang="en-GB" b="1" dirty="0" smtClean="0">
+                <a:solidFill>
+                  <a:srgbClr val="3366FF"/>
+                </a:solidFill>
+                <a:latin typeface="Courier New"/>
+                <a:cs typeface="Courier New"/>
+              </a:rPr>
+              <a:t>.</a:t>
+            </a:r>
+            <a:r>
+              <a:rPr lang="en-GB" b="1" dirty="0" err="1" smtClean="0">
+                <a:solidFill>
+                  <a:srgbClr val="3366FF"/>
+                </a:solidFill>
+                <a:latin typeface="Courier New"/>
+                <a:cs typeface="Courier New"/>
+              </a:rPr>
+              <a:t>isa</a:t>
+            </a:r>
+            <a:r>
+              <a:rPr lang="en-GB" dirty="0" smtClean="0"/>
+              <a:t> files containing the intermediate representation and native assembly code</a:t>
+            </a:r>
+          </a:p>
+          <a:p>
+            <a:r>
+              <a:rPr lang="en-GB" dirty="0" smtClean="0"/>
+              <a:t>Other vendors may provide an offline compiler which can generate LLVM/SPIR or assembly</a:t>
             </a:r>
             <a:endParaRPr lang="en-GB" dirty="0"/>
           </a:p>
@@ -4689,7 +4979,7 @@
     </p:spTree>
     <p:extLst>
       <p:ext uri="{BB962C8B-B14F-4D97-AF65-F5344CB8AC3E}">
-        <p14:creationId xmlns:p14="http://schemas.microsoft.com/office/powerpoint/2010/main" val="1504436268"/>
+        <p14:creationId xmlns:p14="http://schemas.microsoft.com/office/powerpoint/2010/main" val="1647771582"/>
       </p:ext>
     </p:extLst>
   </p:cSld>
@@ -4756,273 +5046,37 @@
             <p:ph idx="1"/>
           </p:nvPr>
         </p:nvSpPr>
-        <p:spPr>
-          <a:xfrm>
-            <a:off x="457200" y="1600200"/>
-            <a:ext cx="8686800" cy="4525963"/>
-          </a:xfrm>
-        </p:spPr>
+        <p:spPr/>
         <p:txBody>
           <a:bodyPr>
-            <a:normAutofit fontScale="85000" lnSpcReduction="10000"/>
+            <a:normAutofit/>
           </a:bodyPr>
           <a:lstStyle/>
           <a:p>
             <a:r>
               <a:rPr lang="en-GB" dirty="0" smtClean="0"/>
-              <a:t>We can query a program object for the names of all the kernels that it contains:</a:t>
-            </a:r>
-          </a:p>
-          <a:p>
-            <a:pPr marL="400050" lvl="1" indent="0">
-              <a:buNone/>
-            </a:pPr>
-            <a:r>
-              <a:rPr lang="en-GB" b="1" dirty="0" err="1">
-                <a:latin typeface="Courier New"/>
-                <a:cs typeface="Courier New"/>
-              </a:rPr>
-              <a:t>p</a:t>
-            </a:r>
-            <a:r>
-              <a:rPr lang="en-GB" b="1" dirty="0" err="1" smtClean="0">
-                <a:latin typeface="Courier New"/>
-                <a:cs typeface="Courier New"/>
-              </a:rPr>
-              <a:t>rogram.</a:t>
-            </a:r>
-            <a:r>
-              <a:rPr lang="en-GB" b="1" dirty="0" err="1" smtClean="0">
-                <a:solidFill>
-                  <a:srgbClr val="3366FF"/>
-                </a:solidFill>
-                <a:latin typeface="Courier New"/>
-                <a:cs typeface="Courier New"/>
-              </a:rPr>
-              <a:t>getInfo</a:t>
-            </a:r>
-            <a:r>
-              <a:rPr lang="en-GB" b="1" dirty="0">
-                <a:latin typeface="Courier New"/>
-                <a:cs typeface="Courier New"/>
-              </a:rPr>
-              <a:t>&lt;</a:t>
-            </a:r>
-            <a:r>
-              <a:rPr lang="en-GB" b="1" dirty="0" smtClean="0">
-                <a:latin typeface="Courier New"/>
-                <a:cs typeface="Courier New"/>
-              </a:rPr>
-              <a:t>CL_PROGRAM_NUM_KERNELS&gt;();</a:t>
-            </a:r>
-          </a:p>
-          <a:p>
-            <a:pPr marL="400050" lvl="1" indent="0">
-              <a:buNone/>
-            </a:pPr>
-            <a:r>
-              <a:rPr lang="en-GB" b="1" dirty="0" err="1">
-                <a:latin typeface="Courier New"/>
-                <a:cs typeface="Courier New"/>
-              </a:rPr>
-              <a:t>program.</a:t>
-            </a:r>
-            <a:r>
-              <a:rPr lang="en-GB" b="1" dirty="0" err="1">
-                <a:solidFill>
-                  <a:srgbClr val="3366FF"/>
-                </a:solidFill>
-                <a:latin typeface="Courier New"/>
-                <a:cs typeface="Courier New"/>
-              </a:rPr>
-              <a:t>getInfo</a:t>
-            </a:r>
-            <a:r>
-              <a:rPr lang="en-GB" b="1" dirty="0" smtClean="0">
-                <a:latin typeface="Courier New"/>
-                <a:cs typeface="Courier New"/>
-              </a:rPr>
-              <a:t>&lt;CL_PROGRAM_KERNEL_NAMES&gt;(</a:t>
-            </a:r>
-            <a:r>
-              <a:rPr lang="en-GB" b="1" dirty="0">
-                <a:latin typeface="Courier New"/>
-                <a:cs typeface="Courier New"/>
-              </a:rPr>
-              <a:t>)</a:t>
-            </a:r>
-            <a:r>
-              <a:rPr lang="en-GB" b="1" dirty="0" smtClean="0">
-                <a:latin typeface="Courier New"/>
-                <a:cs typeface="Courier New"/>
-              </a:rPr>
-              <a:t>;</a:t>
+              <a:t>This provides a mechanism for automatically discovering and using new kernels, without having to write any new host code</a:t>
             </a:r>
           </a:p>
           <a:p>
             <a:r>
               <a:rPr lang="en-GB" dirty="0" smtClean="0"/>
-              <a:t>We can also query information about kernel arguments (</a:t>
-            </a:r>
-            <a:r>
-              <a:rPr lang="en-GB" dirty="0" err="1" smtClean="0"/>
-              <a:t>OpenCL</a:t>
-            </a:r>
+              <a:t>Can make it much easier to add new kernels to an existing application</a:t>
+            </a:r>
+          </a:p>
+          <a:p>
             <a:r>
               <a:rPr lang="en-GB" dirty="0" smtClean="0"/>
-              <a:t> 1.2):</a:t>
-            </a:r>
-          </a:p>
-          <a:p>
-            <a:pPr marL="400050" lvl="1" indent="0">
-              <a:buNone/>
-            </a:pPr>
-            <a:r>
-              <a:rPr lang="en-GB" b="1" dirty="0" err="1">
-                <a:latin typeface="Courier New"/>
-                <a:cs typeface="Courier New"/>
-              </a:rPr>
-              <a:t>k</a:t>
-            </a:r>
-            <a:r>
-              <a:rPr lang="en-GB" b="1" dirty="0" err="1" smtClean="0">
-                <a:latin typeface="Courier New"/>
-                <a:cs typeface="Courier New"/>
-              </a:rPr>
-              <a:t>ernel.</a:t>
-            </a:r>
-            <a:r>
-              <a:rPr lang="en-GB" b="1" dirty="0" err="1" smtClean="0">
-                <a:solidFill>
-                  <a:srgbClr val="3366FF"/>
-                </a:solidFill>
-                <a:latin typeface="Courier New"/>
-                <a:cs typeface="Courier New"/>
-              </a:rPr>
-              <a:t>getInfo</a:t>
-            </a:r>
-            <a:r>
-              <a:rPr lang="en-GB" b="1" dirty="0" smtClean="0">
-                <a:latin typeface="Courier New"/>
-                <a:cs typeface="Courier New"/>
-              </a:rPr>
-              <a:t>&lt;CL_KERNEL_NUM_ARGS&gt;();</a:t>
-            </a:r>
-          </a:p>
-          <a:p>
-            <a:pPr marL="400050" lvl="1" indent="0">
-              <a:buNone/>
-            </a:pPr>
-            <a:r>
-              <a:rPr lang="en-GB" b="1" dirty="0" err="1">
-                <a:latin typeface="Courier New"/>
-                <a:cs typeface="Courier New"/>
-              </a:rPr>
-              <a:t>k</a:t>
-            </a:r>
-            <a:r>
-              <a:rPr lang="en-GB" b="1" dirty="0" err="1" smtClean="0">
-                <a:latin typeface="Courier New"/>
-                <a:cs typeface="Courier New"/>
-              </a:rPr>
-              <a:t>ernel.</a:t>
-            </a:r>
-            <a:r>
-              <a:rPr lang="en-GB" b="1" dirty="0" err="1" smtClean="0">
-                <a:solidFill>
-                  <a:srgbClr val="3366FF"/>
-                </a:solidFill>
-                <a:latin typeface="Courier New"/>
-                <a:cs typeface="Courier New"/>
-              </a:rPr>
-              <a:t>getArgInfo</a:t>
-            </a:r>
-            <a:r>
-              <a:rPr lang="en-GB" b="1" dirty="0" smtClean="0">
-                <a:latin typeface="Courier New"/>
-                <a:cs typeface="Courier New"/>
-              </a:rPr>
-              <a:t>&lt;CL_KERNEL_ARG_*&gt;();</a:t>
-            </a:r>
-          </a:p>
-          <a:p>
-            <a:pPr marL="0" indent="0">
-              <a:buNone/>
-            </a:pPr>
-            <a:r>
-              <a:rPr lang="en-GB" dirty="0" smtClean="0">
-                <a:latin typeface="Trebuchet MS"/>
-                <a:cs typeface="Trebuchet MS"/>
-              </a:rPr>
-              <a:t>	(the program should be compiled using the</a:t>
-            </a:r>
-          </a:p>
-          <a:p>
-            <a:pPr marL="0" indent="0">
-              <a:buNone/>
-            </a:pPr>
-            <a:r>
-              <a:rPr lang="en-GB" b="1" dirty="0" smtClean="0">
-                <a:solidFill>
-                  <a:srgbClr val="3366FF"/>
-                </a:solidFill>
-                <a:latin typeface="Courier New"/>
-                <a:cs typeface="Courier New"/>
-              </a:rPr>
-              <a:t>	-cl-kernel-</a:t>
-            </a:r>
-            <a:r>
-              <a:rPr lang="en-GB" b="1" dirty="0" err="1" smtClean="0">
-                <a:solidFill>
-                  <a:srgbClr val="3366FF"/>
-                </a:solidFill>
-                <a:latin typeface="Courier New"/>
-                <a:cs typeface="Courier New"/>
-              </a:rPr>
-              <a:t>arg</a:t>
-            </a:r>
-            <a:r>
-              <a:rPr lang="en-GB" b="1" dirty="0" smtClean="0">
-                <a:solidFill>
-                  <a:srgbClr val="3366FF"/>
-                </a:solidFill>
-                <a:latin typeface="Courier New"/>
-                <a:cs typeface="Courier New"/>
-              </a:rPr>
-              <a:t>-info </a:t>
-            </a:r>
-            <a:r>
-              <a:rPr lang="en-GB" dirty="0" smtClean="0">
-                <a:solidFill>
-                  <a:srgbClr val="000000"/>
-                </a:solidFill>
-                <a:latin typeface="Trebuchet MS"/>
-                <a:cs typeface="Trebuchet MS"/>
-              </a:rPr>
-              <a:t>option</a:t>
-            </a:r>
-            <a:r>
-              <a:rPr lang="en-GB" dirty="0" smtClean="0">
-                <a:solidFill>
-                  <a:srgbClr val="000000"/>
-                </a:solidFill>
-                <a:cs typeface="Courier New"/>
-              </a:rPr>
-              <a:t>)</a:t>
-            </a:r>
-            <a:endParaRPr lang="en-GB" dirty="0">
-              <a:solidFill>
-                <a:srgbClr val="3366FF"/>
-              </a:solidFill>
-              <a:cs typeface="Courier New"/>
-            </a:endParaRPr>
+              <a:t>Provides a means for libraries and frameworks to accept additional kernels from third parties</a:t>
+            </a:r>
+            <a:endParaRPr lang="en-GB" dirty="0"/>
           </a:p>
         </p:txBody>
       </p:sp>
     </p:spTree>
     <p:extLst>
       <p:ext uri="{BB962C8B-B14F-4D97-AF65-F5344CB8AC3E}">
-        <p14:creationId xmlns:p14="http://schemas.microsoft.com/office/powerpoint/2010/main" val="3954401298"/>
+        <p14:creationId xmlns:p14="http://schemas.microsoft.com/office/powerpoint/2010/main" val="1504436268"/>
       </p:ext>
     </p:extLst>
   </p:cSld>
@@ -5068,6 +5122,339 @@
         </p:nvSpPr>
         <p:spPr/>
         <p:txBody>
+          <a:bodyPr/>
+          <a:lstStyle/>
+          <a:p>
+            <a:r>
+              <a:rPr lang="en-GB" dirty="0" smtClean="0"/>
+              <a:t>Kernel Introspection</a:t>
+            </a:r>
+            <a:endParaRPr lang="en-GB" dirty="0"/>
+          </a:p>
+        </p:txBody>
+      </p:sp>
+      <p:sp>
+        <p:nvSpPr>
+          <p:cNvPr id="3" name="Content Placeholder 2"/>
+          <p:cNvSpPr>
+            <a:spLocks noGrp="1"/>
+          </p:cNvSpPr>
+          <p:nvPr>
+            <p:ph idx="1"/>
+          </p:nvPr>
+        </p:nvSpPr>
+        <p:spPr>
+          <a:xfrm>
+            <a:off x="457200" y="1600200"/>
+            <a:ext cx="8686800" cy="4525963"/>
+          </a:xfrm>
+        </p:spPr>
+        <p:txBody>
+          <a:bodyPr>
+            <a:normAutofit fontScale="85000" lnSpcReduction="10000"/>
+          </a:bodyPr>
+          <a:lstStyle/>
+          <a:p>
+            <a:r>
+              <a:rPr lang="en-GB" dirty="0" smtClean="0"/>
+              <a:t>We can query a program object for the names of all the kernels that it contains:</a:t>
+            </a:r>
+          </a:p>
+          <a:p>
+            <a:pPr marL="400050" lvl="1" indent="0">
+              <a:buNone/>
+            </a:pPr>
+            <a:r>
+              <a:rPr lang="en-GB" b="1" dirty="0" err="1">
+                <a:latin typeface="Courier New"/>
+                <a:cs typeface="Courier New"/>
+              </a:rPr>
+              <a:t>p</a:t>
+            </a:r>
+            <a:r>
+              <a:rPr lang="en-GB" b="1" dirty="0" err="1" smtClean="0">
+                <a:latin typeface="Courier New"/>
+                <a:cs typeface="Courier New"/>
+              </a:rPr>
+              <a:t>rogram.</a:t>
+            </a:r>
+            <a:r>
+              <a:rPr lang="en-GB" b="1" dirty="0" err="1" smtClean="0">
+                <a:solidFill>
+                  <a:srgbClr val="3366FF"/>
+                </a:solidFill>
+                <a:latin typeface="Courier New"/>
+                <a:cs typeface="Courier New"/>
+              </a:rPr>
+              <a:t>getInfo</a:t>
+            </a:r>
+            <a:r>
+              <a:rPr lang="en-GB" b="1" dirty="0">
+                <a:latin typeface="Courier New"/>
+                <a:cs typeface="Courier New"/>
+              </a:rPr>
+              <a:t>&lt;</a:t>
+            </a:r>
+            <a:r>
+              <a:rPr lang="en-GB" b="1" dirty="0" smtClean="0">
+                <a:latin typeface="Courier New"/>
+                <a:cs typeface="Courier New"/>
+              </a:rPr>
+              <a:t>CL_PROGRAM_NUM_KERNELS&gt;();</a:t>
+            </a:r>
+          </a:p>
+          <a:p>
+            <a:pPr marL="400050" lvl="1" indent="0">
+              <a:buNone/>
+            </a:pPr>
+            <a:r>
+              <a:rPr lang="en-GB" b="1" dirty="0" err="1">
+                <a:latin typeface="Courier New"/>
+                <a:cs typeface="Courier New"/>
+              </a:rPr>
+              <a:t>program.</a:t>
+            </a:r>
+            <a:r>
+              <a:rPr lang="en-GB" b="1" dirty="0" err="1">
+                <a:solidFill>
+                  <a:srgbClr val="3366FF"/>
+                </a:solidFill>
+                <a:latin typeface="Courier New"/>
+                <a:cs typeface="Courier New"/>
+              </a:rPr>
+              <a:t>getInfo</a:t>
+            </a:r>
+            <a:r>
+              <a:rPr lang="en-GB" b="1" dirty="0" smtClean="0">
+                <a:latin typeface="Courier New"/>
+                <a:cs typeface="Courier New"/>
+              </a:rPr>
+              <a:t>&lt;CL_PROGRAM_KERNEL_NAMES&gt;(</a:t>
+            </a:r>
+            <a:r>
+              <a:rPr lang="en-GB" b="1" dirty="0">
+                <a:latin typeface="Courier New"/>
+                <a:cs typeface="Courier New"/>
+              </a:rPr>
+              <a:t>)</a:t>
+            </a:r>
+            <a:r>
+              <a:rPr lang="en-GB" b="1" dirty="0" smtClean="0">
+                <a:latin typeface="Courier New"/>
+                <a:cs typeface="Courier New"/>
+              </a:rPr>
+              <a:t>;</a:t>
+            </a:r>
+          </a:p>
+          <a:p>
+            <a:r>
+              <a:rPr lang="en-GB" dirty="0" smtClean="0"/>
+              <a:t>We can also query information about kernel arguments (</a:t>
+            </a:r>
+            <a:r>
+              <a:rPr lang="en-GB" dirty="0" err="1" smtClean="0"/>
+              <a:t>OpenCL</a:t>
+            </a:r>
+            <a:r>
+              <a:rPr lang="en-GB" dirty="0" smtClean="0"/>
+              <a:t> 1.2):</a:t>
+            </a:r>
+          </a:p>
+          <a:p>
+            <a:pPr marL="400050" lvl="1" indent="0">
+              <a:buNone/>
+            </a:pPr>
+            <a:r>
+              <a:rPr lang="en-GB" b="1" dirty="0" err="1">
+                <a:latin typeface="Courier New"/>
+                <a:cs typeface="Courier New"/>
+              </a:rPr>
+              <a:t>k</a:t>
+            </a:r>
+            <a:r>
+              <a:rPr lang="en-GB" b="1" dirty="0" err="1" smtClean="0">
+                <a:latin typeface="Courier New"/>
+                <a:cs typeface="Courier New"/>
+              </a:rPr>
+              <a:t>ernel.</a:t>
+            </a:r>
+            <a:r>
+              <a:rPr lang="en-GB" b="1" dirty="0" err="1" smtClean="0">
+                <a:solidFill>
+                  <a:srgbClr val="3366FF"/>
+                </a:solidFill>
+                <a:latin typeface="Courier New"/>
+                <a:cs typeface="Courier New"/>
+              </a:rPr>
+              <a:t>getInfo</a:t>
+            </a:r>
+            <a:r>
+              <a:rPr lang="en-GB" b="1" dirty="0" smtClean="0">
+                <a:latin typeface="Courier New"/>
+                <a:cs typeface="Courier New"/>
+              </a:rPr>
+              <a:t>&lt;CL_KERNEL_NUM_ARGS&gt;();</a:t>
+            </a:r>
+          </a:p>
+          <a:p>
+            <a:pPr marL="400050" lvl="1" indent="0">
+              <a:buNone/>
+            </a:pPr>
+            <a:r>
+              <a:rPr lang="en-GB" b="1" dirty="0" err="1">
+                <a:latin typeface="Courier New"/>
+                <a:cs typeface="Courier New"/>
+              </a:rPr>
+              <a:t>k</a:t>
+            </a:r>
+            <a:r>
+              <a:rPr lang="en-GB" b="1" dirty="0" err="1" smtClean="0">
+                <a:latin typeface="Courier New"/>
+                <a:cs typeface="Courier New"/>
+              </a:rPr>
+              <a:t>ernel.</a:t>
+            </a:r>
+            <a:r>
+              <a:rPr lang="en-GB" b="1" dirty="0" err="1" smtClean="0">
+                <a:solidFill>
+                  <a:srgbClr val="3366FF"/>
+                </a:solidFill>
+                <a:latin typeface="Courier New"/>
+                <a:cs typeface="Courier New"/>
+              </a:rPr>
+              <a:t>getArgInfo</a:t>
+            </a:r>
+            <a:r>
+              <a:rPr lang="en-GB" b="1" dirty="0" smtClean="0">
+                <a:latin typeface="Courier New"/>
+                <a:cs typeface="Courier New"/>
+              </a:rPr>
+              <a:t>&lt;CL_KERNEL_ARG_*&gt;();</a:t>
+            </a:r>
+          </a:p>
+          <a:p>
+            <a:pPr marL="0" indent="0">
+              <a:buNone/>
+            </a:pPr>
+            <a:r>
+              <a:rPr lang="en-GB" dirty="0" smtClean="0">
+                <a:latin typeface="Trebuchet MS"/>
+                <a:cs typeface="Trebuchet MS"/>
+              </a:rPr>
+              <a:t>	(the program should be compiled using the</a:t>
+            </a:r>
+          </a:p>
+          <a:p>
+            <a:pPr marL="0" indent="0">
+              <a:buNone/>
+            </a:pPr>
+            <a:r>
+              <a:rPr lang="en-GB" b="1" dirty="0" smtClean="0">
+                <a:solidFill>
+                  <a:srgbClr val="3366FF"/>
+                </a:solidFill>
+                <a:latin typeface="Courier New"/>
+                <a:cs typeface="Courier New"/>
+              </a:rPr>
+              <a:t>	-cl-kernel-</a:t>
+            </a:r>
+            <a:r>
+              <a:rPr lang="en-GB" b="1" dirty="0" err="1" smtClean="0">
+                <a:solidFill>
+                  <a:srgbClr val="3366FF"/>
+                </a:solidFill>
+                <a:latin typeface="Courier New"/>
+                <a:cs typeface="Courier New"/>
+              </a:rPr>
+              <a:t>arg</a:t>
+            </a:r>
+            <a:r>
+              <a:rPr lang="en-GB" b="1" dirty="0" smtClean="0">
+                <a:solidFill>
+                  <a:srgbClr val="3366FF"/>
+                </a:solidFill>
+                <a:latin typeface="Courier New"/>
+                <a:cs typeface="Courier New"/>
+              </a:rPr>
+              <a:t>-info </a:t>
+            </a:r>
+            <a:r>
+              <a:rPr lang="en-GB" dirty="0" smtClean="0">
+                <a:solidFill>
+                  <a:srgbClr val="000000"/>
+                </a:solidFill>
+                <a:latin typeface="Trebuchet MS"/>
+                <a:cs typeface="Trebuchet MS"/>
+              </a:rPr>
+              <a:t>option</a:t>
+            </a:r>
+            <a:r>
+              <a:rPr lang="en-GB" dirty="0" smtClean="0">
+                <a:solidFill>
+                  <a:srgbClr val="000000"/>
+                </a:solidFill>
+                <a:cs typeface="Courier New"/>
+              </a:rPr>
+              <a:t>)</a:t>
+            </a:r>
+            <a:endParaRPr lang="en-GB" dirty="0">
+              <a:solidFill>
+                <a:srgbClr val="3366FF"/>
+              </a:solidFill>
+              <a:cs typeface="Courier New"/>
+            </a:endParaRPr>
+          </a:p>
+        </p:txBody>
+      </p:sp>
+    </p:spTree>
+    <p:extLst>
+      <p:ext uri="{BB962C8B-B14F-4D97-AF65-F5344CB8AC3E}">
+        <p14:creationId xmlns:p14="http://schemas.microsoft.com/office/powerpoint/2010/main" val="3954401298"/>
+      </p:ext>
+    </p:extLst>
+  </p:cSld>
+  <p:clrMapOvr>
+    <a:masterClrMapping/>
+  </p:clrMapOvr>
+  <p:timing>
+    <p:tnLst>
+      <p:par>
+        <p:cTn xmlns:p14="http://schemas.microsoft.com/office/powerpoint/2010/main" id="1" dur="indefinite" restart="never" nodeType="tmRoot"/>
+      </p:par>
+    </p:tnLst>
+  </p:timing>
+</p:sld>
+</file>
+
+<file path=ppt/slides/slide15.xml><?xml version="1.0" encoding="utf-8"?>
+<p:sld xmlns:a="http://schemas.openxmlformats.org/drawingml/2006/main" xmlns:r="http://schemas.openxmlformats.org/officeDocument/2006/relationships" xmlns:p="http://schemas.openxmlformats.org/presentationml/2006/main">
+  <p:cSld>
+    <p:spTree>
+      <p:nvGrpSpPr>
+        <p:cNvPr id="1" name=""/>
+        <p:cNvGrpSpPr/>
+        <p:nvPr/>
+      </p:nvGrpSpPr>
+      <p:grpSpPr>
+        <a:xfrm>
+          <a:off x="0" y="0"/>
+          <a:ext cx="0" cy="0"/>
+          <a:chOff x="0" y="0"/>
+          <a:chExt cx="0" cy="0"/>
+        </a:xfrm>
+      </p:grpSpPr>
+      <p:sp>
+        <p:nvSpPr>
+          <p:cNvPr id="2" name="Title 1"/>
+          <p:cNvSpPr>
+            <a:spLocks noGrp="1"/>
+          </p:cNvSpPr>
+          <p:nvPr>
+            <p:ph type="title"/>
+          </p:nvPr>
+        </p:nvSpPr>
+        <p:spPr/>
+        <p:txBody>
           <a:bodyPr>
             <a:normAutofit/>
           </a:bodyPr>
@@ -5202,7 +5589,7 @@
 </p:sld>
 </file>
 
-<file path=ppt/slides/slide15.xml><?xml version="1.0" encoding="utf-8"?>
+<file path=ppt/slides/slide16.xml><?xml version="1.0" encoding="utf-8"?>
 <p:sld xmlns:a="http://schemas.openxmlformats.org/drawingml/2006/main" xmlns:r="http://schemas.openxmlformats.org/officeDocument/2006/relationships" xmlns:p="http://schemas.openxmlformats.org/presentationml/2006/main">
   <p:cSld>
     <p:spTree>
@@ -5733,260 +6120,6 @@
 </p:sld>
 </file>
 
-<file path=ppt/slides/slide16.xml><?xml version="1.0" encoding="utf-8"?>
-<p:sld xmlns:a="http://schemas.openxmlformats.org/drawingml/2006/main" xmlns:r="http://schemas.openxmlformats.org/officeDocument/2006/relationships" xmlns:p="http://schemas.openxmlformats.org/presentationml/2006/main">
-  <p:cSld>
-    <p:spTree>
-      <p:nvGrpSpPr>
-        <p:cNvPr id="1" name=""/>
-        <p:cNvGrpSpPr/>
-        <p:nvPr/>
-      </p:nvGrpSpPr>
-      <p:grpSpPr>
-        <a:xfrm>
-          <a:off x="0" y="0"/>
-          <a:ext cx="0" cy="0"/>
-          <a:chOff x="0" y="0"/>
-          <a:chExt cx="0" cy="0"/>
-        </a:xfrm>
-      </p:grpSpPr>
-      <p:sp>
-        <p:nvSpPr>
-          <p:cNvPr id="2" name="Title 1"/>
-          <p:cNvSpPr>
-            <a:spLocks noGrp="1"/>
-          </p:cNvSpPr>
-          <p:nvPr>
-            <p:ph type="title"/>
-          </p:nvPr>
-        </p:nvSpPr>
-        <p:spPr/>
-        <p:txBody>
-          <a:bodyPr/>
-          <a:lstStyle/>
-          <a:p>
-            <a:r>
-              <a:rPr lang="en-GB" dirty="0" smtClean="0"/>
-              <a:t>Compiler Flags</a:t>
-            </a:r>
-            <a:endParaRPr lang="en-GB" dirty="0"/>
-          </a:p>
-        </p:txBody>
-      </p:sp>
-      <p:sp>
-        <p:nvSpPr>
-          <p:cNvPr id="3" name="Content Placeholder 2"/>
-          <p:cNvSpPr>
-            <a:spLocks noGrp="1"/>
-          </p:cNvSpPr>
-          <p:nvPr>
-            <p:ph idx="1"/>
-          </p:nvPr>
-        </p:nvSpPr>
-        <p:spPr>
-          <a:xfrm>
-            <a:off x="457200" y="1600200"/>
-            <a:ext cx="8229600" cy="5069160"/>
-          </a:xfrm>
-        </p:spPr>
-        <p:txBody>
-          <a:bodyPr>
-            <a:normAutofit fontScale="85000" lnSpcReduction="20000"/>
-          </a:bodyPr>
-          <a:lstStyle/>
-          <a:p>
-            <a:pPr>
-              <a:lnSpc>
-                <a:spcPct val="110000"/>
-              </a:lnSpc>
-            </a:pPr>
-            <a:r>
-              <a:rPr lang="en-GB" dirty="0" smtClean="0"/>
-              <a:t>Vendors may expose additional flags to give further control over program compilation, but these will not be portable between different OpenCL platforms</a:t>
-            </a:r>
-          </a:p>
-          <a:p>
-            <a:pPr>
-              <a:lnSpc>
-                <a:spcPct val="110000"/>
-              </a:lnSpc>
-            </a:pPr>
-            <a:r>
-              <a:rPr lang="en-GB" dirty="0" smtClean="0"/>
-              <a:t>For example, NVIDIA provide the </a:t>
-            </a:r>
-            <a:r>
-              <a:rPr lang="en-GB" b="1" dirty="0" smtClean="0">
-                <a:solidFill>
-                  <a:srgbClr val="3366FF"/>
-                </a:solidFill>
-                <a:latin typeface="Courier New"/>
-                <a:cs typeface="Courier New"/>
-              </a:rPr>
-              <a:t>–cl-</a:t>
-            </a:r>
-            <a:r>
-              <a:rPr lang="en-GB" b="1" dirty="0" err="1" smtClean="0">
-                <a:solidFill>
-                  <a:srgbClr val="3366FF"/>
-                </a:solidFill>
-                <a:latin typeface="Courier New"/>
-                <a:cs typeface="Courier New"/>
-              </a:rPr>
-              <a:t>nv</a:t>
-            </a:r>
-            <a:r>
-              <a:rPr lang="en-GB" b="1" dirty="0" smtClean="0">
-                <a:solidFill>
-                  <a:srgbClr val="3366FF"/>
-                </a:solidFill>
-                <a:latin typeface="Courier New"/>
-                <a:cs typeface="Courier New"/>
-              </a:rPr>
-              <a:t>-arch</a:t>
-            </a:r>
-            <a:r>
-              <a:rPr lang="en-GB" dirty="0" smtClean="0"/>
-              <a:t> flag to specify which GPU architecture should be targeted, and </a:t>
-            </a:r>
-            <a:r>
-              <a:rPr lang="en-GB" b="1" dirty="0" smtClean="0">
-                <a:solidFill>
-                  <a:srgbClr val="3366FF"/>
-                </a:solidFill>
-                <a:latin typeface="Courier New"/>
-                <a:cs typeface="Courier New"/>
-              </a:rPr>
-              <a:t>–cl-</a:t>
-            </a:r>
-            <a:r>
-              <a:rPr lang="en-GB" b="1" dirty="0" err="1" smtClean="0">
-                <a:solidFill>
-                  <a:srgbClr val="3366FF"/>
-                </a:solidFill>
-                <a:latin typeface="Courier New"/>
-                <a:cs typeface="Courier New"/>
-              </a:rPr>
-              <a:t>nv</a:t>
-            </a:r>
-            <a:r>
-              <a:rPr lang="en-GB" b="1" dirty="0" smtClean="0">
-                <a:solidFill>
-                  <a:srgbClr val="3366FF"/>
-                </a:solidFill>
-                <a:latin typeface="Courier New"/>
-                <a:cs typeface="Courier New"/>
-              </a:rPr>
-              <a:t>-</a:t>
-            </a:r>
-            <a:r>
-              <a:rPr lang="en-GB" b="1" dirty="0" err="1" smtClean="0">
-                <a:solidFill>
-                  <a:srgbClr val="3366FF"/>
-                </a:solidFill>
-                <a:latin typeface="Courier New"/>
-                <a:cs typeface="Courier New"/>
-              </a:rPr>
-              <a:t>maxrregcount</a:t>
-            </a:r>
-            <a:r>
-              <a:rPr lang="en-GB" dirty="0" smtClean="0">
-                <a:latin typeface="Courier New"/>
-                <a:cs typeface="Courier New"/>
-              </a:rPr>
-              <a:t> </a:t>
-            </a:r>
-            <a:r>
-              <a:rPr lang="en-GB" dirty="0" smtClean="0"/>
-              <a:t>to limit the number of registers used</a:t>
-            </a:r>
-          </a:p>
-          <a:p>
-            <a:pPr>
-              <a:lnSpc>
-                <a:spcPct val="110000"/>
-              </a:lnSpc>
-            </a:pPr>
-            <a:r>
-              <a:rPr lang="en-GB" dirty="0" smtClean="0"/>
-              <a:t>Some vendors support </a:t>
-            </a:r>
-            <a:r>
-              <a:rPr lang="en-GB" b="1" dirty="0" smtClean="0">
-                <a:solidFill>
-                  <a:srgbClr val="3366FF"/>
-                </a:solidFill>
-                <a:latin typeface="Courier New"/>
-                <a:cs typeface="Courier New"/>
-              </a:rPr>
-              <a:t>–O</a:t>
-            </a:r>
-            <a:r>
-              <a:rPr lang="en-GB" b="1" i="1" dirty="0" smtClean="0">
-                <a:solidFill>
-                  <a:srgbClr val="3366FF"/>
-                </a:solidFill>
-                <a:latin typeface="Courier New"/>
-                <a:cs typeface="Courier New"/>
-              </a:rPr>
-              <a:t>n</a:t>
-            </a:r>
-            <a:r>
-              <a:rPr lang="en-GB" dirty="0" smtClean="0"/>
-              <a:t> </a:t>
-            </a:r>
-            <a:r>
-              <a:rPr lang="en-GB" dirty="0"/>
-              <a:t>f</a:t>
-            </a:r>
-            <a:r>
-              <a:rPr lang="en-GB" dirty="0" smtClean="0"/>
-              <a:t>lags to control the optimization level </a:t>
-            </a:r>
-          </a:p>
-          <a:p>
-            <a:pPr>
-              <a:lnSpc>
-                <a:spcPct val="110000"/>
-              </a:lnSpc>
-            </a:pPr>
-            <a:r>
-              <a:rPr lang="en-GB" dirty="0" smtClean="0"/>
-              <a:t>AMD allow additional build options to be dynamically added using an environment variable: </a:t>
-            </a:r>
-            <a:r>
-              <a:rPr lang="en-GB" b="1" dirty="0">
-                <a:solidFill>
-                  <a:srgbClr val="3366FF"/>
-                </a:solidFill>
-                <a:latin typeface="Courier New"/>
-                <a:cs typeface="Courier New"/>
-              </a:rPr>
-              <a:t>AMD_OCL_BUILD_OPTIONS_APPEND</a:t>
-            </a:r>
-          </a:p>
-        </p:txBody>
-      </p:sp>
-    </p:spTree>
-    <p:extLst>
-      <p:ext uri="{BB962C8B-B14F-4D97-AF65-F5344CB8AC3E}">
-        <p14:creationId xmlns:p14="http://schemas.microsoft.com/office/powerpoint/2010/main" val="803196001"/>
-      </p:ext>
-    </p:extLst>
-  </p:cSld>
-  <p:clrMapOvr>
-    <a:masterClrMapping/>
-  </p:clrMapOvr>
-  <p:timing>
-    <p:tnLst>
-      <p:par>
-        <p:cTn xmlns:p14="http://schemas.microsoft.com/office/powerpoint/2010/main" id="1" dur="indefinite" restart="never" nodeType="tmRoot"/>
-      </p:par>
-    </p:tnLst>
-  </p:timing>
-</p:sld>
-</file>
-
 <file path=ppt/slides/slide17.xml><?xml version="1.0" encoding="utf-8"?>
 <p:sld xmlns:a="http://schemas.openxmlformats.org/drawingml/2006/main" xmlns:r="http://schemas.openxmlformats.org/officeDocument/2006/relationships" xmlns:p="http://schemas.openxmlformats.org/presentationml/2006/main">
   <p:cSld>
@@ -6006,7 +6139,7 @@
       </p:grpSpPr>
       <p:sp>
         <p:nvSpPr>
-          <p:cNvPr id="4" name="Title 3"/>
+          <p:cNvPr id="2" name="Title 1"/>
           <p:cNvSpPr>
             <a:spLocks noGrp="1"/>
           </p:cNvSpPr>
@@ -6020,12 +6153,8 @@
           <a:lstStyle/>
           <a:p>
             <a:r>
-              <a:rPr lang="en-GB" smtClean="0"/>
-              <a:t>Other compilation </a:t>
-            </a:r>
-            <a:r>
               <a:rPr lang="en-GB" dirty="0" smtClean="0"/>
-              <a:t>hints</a:t>
+              <a:t>Compiler Flags</a:t>
             </a:r>
             <a:endParaRPr lang="en-GB" dirty="0"/>
           </a:p>
@@ -6033,7 +6162,7 @@
       </p:sp>
       <p:sp>
         <p:nvSpPr>
-          <p:cNvPr id="5" name="Content Placeholder 4"/>
+          <p:cNvPr id="3" name="Content Placeholder 2"/>
           <p:cNvSpPr>
             <a:spLocks noGrp="1"/>
           </p:cNvSpPr>
@@ -6041,70 +6170,47 @@
             <p:ph idx="1"/>
           </p:nvPr>
         </p:nvSpPr>
-        <p:spPr/>
+        <p:spPr>
+          <a:xfrm>
+            <a:off x="457200" y="1600200"/>
+            <a:ext cx="8229600" cy="5069160"/>
+          </a:xfrm>
+        </p:spPr>
         <p:txBody>
           <a:bodyPr>
-            <a:normAutofit fontScale="92500"/>
+            <a:normAutofit fontScale="85000" lnSpcReduction="20000"/>
           </a:bodyPr>
           <a:lstStyle/>
           <a:p>
             <a:pPr>
               <a:lnSpc>
-                <a:spcPct val="120000"/>
+                <a:spcPct val="110000"/>
               </a:lnSpc>
             </a:pPr>
             <a:r>
               <a:rPr lang="en-GB" dirty="0" smtClean="0"/>
-              <a:t>Can use an attribute to inform the compiler of the work-group size that you intend to launch kernels with:</a:t>
-            </a:r>
-          </a:p>
-          <a:p>
-            <a:pPr marL="457200" lvl="1" indent="0">
-              <a:lnSpc>
-                <a:spcPct val="120000"/>
-              </a:lnSpc>
-              <a:buNone/>
-            </a:pPr>
-            <a:r>
-              <a:rPr lang="en-GB" sz="2200" b="1" dirty="0" smtClean="0">
-                <a:solidFill>
-                  <a:srgbClr val="3366FF"/>
-                </a:solidFill>
-                <a:latin typeface="Courier New"/>
-                <a:cs typeface="Courier New"/>
-              </a:rPr>
-              <a:t>__attribute__((</a:t>
-            </a:r>
-            <a:r>
-              <a:rPr lang="en-GB" sz="2200" b="1" dirty="0" err="1" smtClean="0">
-                <a:solidFill>
-                  <a:srgbClr val="3366FF"/>
-                </a:solidFill>
-                <a:latin typeface="Courier New"/>
-                <a:cs typeface="Courier New"/>
-              </a:rPr>
-              <a:t>reqd_work_group_size</a:t>
-            </a:r>
-            <a:r>
-              <a:rPr lang="en-GB" sz="2200" b="1" dirty="0" smtClean="0">
-                <a:solidFill>
-                  <a:srgbClr val="3366FF"/>
-                </a:solidFill>
-                <a:latin typeface="Courier New"/>
-                <a:cs typeface="Courier New"/>
-              </a:rPr>
-              <a:t>(x, y, z)))</a:t>
+              <a:t>Vendors may expose additional flags to give further control over program compilation, but these will not be portable between different OpenCL platforms</a:t>
             </a:r>
           </a:p>
           <a:p>
             <a:pPr>
               <a:lnSpc>
-                <a:spcPct val="120000"/>
+                <a:spcPct val="110000"/>
               </a:lnSpc>
             </a:pPr>
             <a:r>
               <a:rPr lang="en-GB" dirty="0" smtClean="0"/>
-              <a:t>As with C/C++, use the </a:t>
+              <a:t>For example, NVIDIA provide the </a:t>
+            </a:r>
+            <a:r>
+              <a:rPr lang="en-GB" b="1" dirty="0" smtClean="0">
+                <a:solidFill>
+                  <a:srgbClr val="3366FF"/>
+                </a:solidFill>
+                <a:latin typeface="Courier New"/>
+                <a:cs typeface="Courier New"/>
+              </a:rPr>
+              <a:t>–cl-</a:t>
             </a:r>
             <a:r>
               <a:rPr lang="en-GB" b="1" dirty="0" err="1" smtClean="0">
@@ -6114,11 +6220,21 @@
                 <a:latin typeface="Courier New"/>
                 <a:cs typeface="Courier New"/>
               </a:rPr>
-              <a:t>const</a:t>
+              <a:t>nv</a:t>
+            </a:r>
+            <a:r>
+              <a:rPr lang="en-GB" b="1" dirty="0" smtClean="0">
+                <a:solidFill>
+                  <a:srgbClr val="3366FF"/>
+                </a:solidFill>
+                <a:latin typeface="Courier New"/>
+                <a:cs typeface="Courier New"/>
+              </a:rPr>
+              <a:t>-arch</a:t>
             </a:r>
             <a:r>
               <a:rPr lang="en-GB" dirty="0" smtClean="0"/>
-              <a:t>/</a:t>
+              <a:t> flag to specify which GPU architecture should be targeted, and </a:t>
             </a:r>
             <a:r>
               <a:rPr lang="en-GB" b="1" dirty="0" smtClean="0">
@@ -6128,19 +6244,112 @@
                 <a:latin typeface="Courier New"/>
                 <a:cs typeface="Courier New"/>
               </a:rPr>
-              <a:t>restrict</a:t>
+              <a:t>–cl-</a:t>
+            </a:r>
+            <a:r>
+              <a:rPr lang="en-GB" b="1" dirty="0" err="1" smtClean="0">
+                <a:solidFill>
+                  <a:srgbClr val="3366FF"/>
+                </a:solidFill>
+                <a:latin typeface="Courier New"/>
+                <a:cs typeface="Courier New"/>
+              </a:rPr>
+              <a:t>nv</a:t>
+            </a:r>
+            <a:r>
+              <a:rPr lang="en-GB" b="1" dirty="0" smtClean="0">
+                <a:solidFill>
+                  <a:srgbClr val="3366FF"/>
+                </a:solidFill>
+                <a:latin typeface="Courier New"/>
+                <a:cs typeface="Courier New"/>
+              </a:rPr>
+              <a:t>-</a:t>
+            </a:r>
+            <a:r>
+              <a:rPr lang="en-GB" b="1" dirty="0" err="1" smtClean="0">
+                <a:solidFill>
+                  <a:srgbClr val="3366FF"/>
+                </a:solidFill>
+                <a:latin typeface="Courier New"/>
+                <a:cs typeface="Courier New"/>
+              </a:rPr>
+              <a:t>maxrregcount</a:t>
             </a:r>
             <a:r>
               <a:rPr lang="en-GB" dirty="0" smtClean="0">
+                <a:latin typeface="Courier New"/>
+                <a:cs typeface="Courier New"/>
+              </a:rPr>
+              <a:t> </a:t>
+            </a:r>
+            <a:r>
+              <a:rPr lang="en-GB" dirty="0" smtClean="0"/>
+              <a:t>to limit the number of registers used</a:t>
+            </a:r>
+          </a:p>
+          <a:p>
+            <a:pPr>
+              <a:lnSpc>
+                <a:spcPct val="110000"/>
+              </a:lnSpc>
+            </a:pPr>
+            <a:r>
+              <a:rPr lang="en-GB" dirty="0" smtClean="0"/>
+              <a:t>Some vendors support </a:t>
+            </a:r>
+            <a:r>
+              <a:rPr lang="en-GB" b="1" dirty="0" smtClean="0">
                 <a:solidFill>
                   <a:srgbClr val="3366FF"/>
                 </a:solidFill>
-              </a:rPr>
+                <a:latin typeface="Courier New"/>
+                <a:cs typeface="Courier New"/>
+              </a:rPr>
+              <a:t>–O</a:t>
+            </a:r>
+            <a:r>
+              <a:rPr lang="en-GB" b="1" i="1" dirty="0" smtClean="0">
+                <a:solidFill>
+                  <a:srgbClr val="3366FF"/>
+                </a:solidFill>
+                <a:latin typeface="Courier New"/>
+                <a:cs typeface="Courier New"/>
+              </a:rPr>
+              <a:t>n</a:t>
+            </a:r>
+            <a:r>
+              <a:rPr lang="en-GB" dirty="0" smtClean="0"/>
               <a:t> </a:t>
             </a:r>
             <a:r>
+              <a:rPr lang="en-GB" dirty="0"/>
+              <a:t>f</a:t>
+            </a:r>
+            <a:r>
               <a:rPr lang="en-GB" dirty="0" smtClean="0"/>
-              <a:t>keywords for kernel arguments where appropriate to make sure the compiler can optimise memory accesses</a:t>
+              <a:t>lags to control the optimization level </a:t>
+            </a:r>
+          </a:p>
+          <a:p>
+            <a:pPr>
+              <a:lnSpc>
+                <a:spcPct val="110000"/>
+              </a:lnSpc>
+            </a:pPr>
+            <a:r>
+              <a:rPr lang="en-GB" dirty="0" smtClean="0"/>
+              <a:t>AMD allow additional build options to be dynamically added using an environment variable: </a:t>
+            </a:r>
+            <a:r>
+              <a:rPr lang="en-GB" b="1" dirty="0">
+                <a:solidFill>
+                  <a:srgbClr val="3366FF"/>
+                </a:solidFill>
+                <a:latin typeface="Courier New"/>
+                <a:cs typeface="Courier New"/>
+              </a:rPr>
+              <a:t>AMD_OCL_BUILD_OPTIONS_APPEND</a:t>
             </a:r>
           </a:p>
         </p:txBody>
@@ -6148,7 +6357,7 @@
     </p:spTree>
     <p:extLst>
       <p:ext uri="{BB962C8B-B14F-4D97-AF65-F5344CB8AC3E}">
-        <p14:creationId xmlns:p14="http://schemas.microsoft.com/office/powerpoint/2010/main" val="1138100201"/>
+        <p14:creationId xmlns:p14="http://schemas.microsoft.com/office/powerpoint/2010/main" val="803196001"/>
       </p:ext>
     </p:extLst>
   </p:cSld>
@@ -6184,6 +6393,184 @@
       </p:grpSpPr>
       <p:sp>
         <p:nvSpPr>
+          <p:cNvPr id="4" name="Title 3"/>
+          <p:cNvSpPr>
+            <a:spLocks noGrp="1"/>
+          </p:cNvSpPr>
+          <p:nvPr>
+            <p:ph type="title"/>
+          </p:nvPr>
+        </p:nvSpPr>
+        <p:spPr/>
+        <p:txBody>
+          <a:bodyPr/>
+          <a:lstStyle/>
+          <a:p>
+            <a:r>
+              <a:rPr lang="en-GB" smtClean="0"/>
+              <a:t>Other compilation </a:t>
+            </a:r>
+            <a:r>
+              <a:rPr lang="en-GB" dirty="0" smtClean="0"/>
+              <a:t>hints</a:t>
+            </a:r>
+            <a:endParaRPr lang="en-GB" dirty="0"/>
+          </a:p>
+        </p:txBody>
+      </p:sp>
+      <p:sp>
+        <p:nvSpPr>
+          <p:cNvPr id="5" name="Content Placeholder 4"/>
+          <p:cNvSpPr>
+            <a:spLocks noGrp="1"/>
+          </p:cNvSpPr>
+          <p:nvPr>
+            <p:ph idx="1"/>
+          </p:nvPr>
+        </p:nvSpPr>
+        <p:spPr/>
+        <p:txBody>
+          <a:bodyPr>
+            <a:normAutofit fontScale="92500"/>
+          </a:bodyPr>
+          <a:lstStyle/>
+          <a:p>
+            <a:pPr>
+              <a:lnSpc>
+                <a:spcPct val="120000"/>
+              </a:lnSpc>
+            </a:pPr>
+            <a:r>
+              <a:rPr lang="en-GB" dirty="0" smtClean="0"/>
+              <a:t>Can use an attribute to inform the compiler of the work-group size that you intend to launch kernels with:</a:t>
+            </a:r>
+          </a:p>
+          <a:p>
+            <a:pPr marL="457200" lvl="1" indent="0">
+              <a:lnSpc>
+                <a:spcPct val="120000"/>
+              </a:lnSpc>
+              <a:buNone/>
+            </a:pPr>
+            <a:r>
+              <a:rPr lang="en-GB" sz="2200" b="1" dirty="0" smtClean="0">
+                <a:solidFill>
+                  <a:srgbClr val="3366FF"/>
+                </a:solidFill>
+                <a:latin typeface="Courier New"/>
+                <a:cs typeface="Courier New"/>
+              </a:rPr>
+              <a:t>__attribute__((</a:t>
+            </a:r>
+            <a:r>
+              <a:rPr lang="en-GB" sz="2200" b="1" dirty="0" err="1" smtClean="0">
+                <a:solidFill>
+                  <a:srgbClr val="3366FF"/>
+                </a:solidFill>
+                <a:latin typeface="Courier New"/>
+                <a:cs typeface="Courier New"/>
+              </a:rPr>
+              <a:t>reqd_work_group_size</a:t>
+            </a:r>
+            <a:r>
+              <a:rPr lang="en-GB" sz="2200" b="1" dirty="0" smtClean="0">
+                <a:solidFill>
+                  <a:srgbClr val="3366FF"/>
+                </a:solidFill>
+                <a:latin typeface="Courier New"/>
+                <a:cs typeface="Courier New"/>
+              </a:rPr>
+              <a:t>(x, y, z)))</a:t>
+            </a:r>
+          </a:p>
+          <a:p>
+            <a:pPr>
+              <a:lnSpc>
+                <a:spcPct val="120000"/>
+              </a:lnSpc>
+            </a:pPr>
+            <a:r>
+              <a:rPr lang="en-GB" dirty="0" smtClean="0"/>
+              <a:t>As with C/C++, use the </a:t>
+            </a:r>
+            <a:r>
+              <a:rPr lang="en-GB" b="1" dirty="0" err="1" smtClean="0">
+                <a:solidFill>
+                  <a:srgbClr val="3366FF"/>
+                </a:solidFill>
+                <a:latin typeface="Courier New"/>
+                <a:cs typeface="Courier New"/>
+              </a:rPr>
+              <a:t>const</a:t>
+            </a:r>
+            <a:r>
+              <a:rPr lang="en-GB" dirty="0" smtClean="0"/>
+              <a:t>/</a:t>
+            </a:r>
+            <a:r>
+              <a:rPr lang="en-GB" b="1" dirty="0" smtClean="0">
+                <a:solidFill>
+                  <a:srgbClr val="3366FF"/>
+                </a:solidFill>
+                <a:latin typeface="Courier New"/>
+                <a:cs typeface="Courier New"/>
+              </a:rPr>
+              <a:t>restrict</a:t>
+            </a:r>
+            <a:r>
+              <a:rPr lang="en-GB" dirty="0" smtClean="0">
+                <a:solidFill>
+                  <a:srgbClr val="3366FF"/>
+                </a:solidFill>
+              </a:rPr>
+              <a:t> </a:t>
+            </a:r>
+            <a:r>
+              <a:rPr lang="en-GB" dirty="0" smtClean="0"/>
+              <a:t>keywords for kernel arguments where appropriate to make sure the compiler can optimise memory accesses</a:t>
+            </a:r>
+          </a:p>
+        </p:txBody>
+      </p:sp>
+    </p:spTree>
+    <p:extLst>
+      <p:ext uri="{BB962C8B-B14F-4D97-AF65-F5344CB8AC3E}">
+        <p14:creationId xmlns:p14="http://schemas.microsoft.com/office/powerpoint/2010/main" val="1138100201"/>
+      </p:ext>
+    </p:extLst>
+  </p:cSld>
+  <p:clrMapOvr>
+    <a:masterClrMapping/>
+  </p:clrMapOvr>
+  <p:timing>
+    <p:tnLst>
+      <p:par>
+        <p:cTn xmlns:p14="http://schemas.microsoft.com/office/powerpoint/2010/main" id="1" dur="indefinite" restart="never" nodeType="tmRoot"/>
+      </p:par>
+    </p:tnLst>
+  </p:timing>
+</p:sld>
+</file>
+
+<file path=ppt/slides/slide19.xml><?xml version="1.0" encoding="utf-8"?>
+<p:sld xmlns:a="http://schemas.openxmlformats.org/drawingml/2006/main" xmlns:r="http://schemas.openxmlformats.org/officeDocument/2006/relationships" xmlns:p="http://schemas.openxmlformats.org/presentationml/2006/main">
+  <p:cSld>
+    <p:spTree>
+      <p:nvGrpSpPr>
+        <p:cNvPr id="1" name=""/>
+        <p:cNvGrpSpPr/>
+        <p:nvPr/>
+      </p:nvGrpSpPr>
+      <p:grpSpPr>
+        <a:xfrm>
+          <a:off x="0" y="0"/>
+          <a:ext cx="0" cy="0"/>
+          <a:chOff x="0" y="0"/>
+          <a:chExt cx="0" cy="0"/>
+        </a:xfrm>
+      </p:grpSpPr>
+      <p:sp>
+        <p:nvSpPr>
           <p:cNvPr id="2" name="Title 1"/>
           <p:cNvSpPr>
             <a:spLocks noGrp="1"/>
@@ -6349,7 +6736,218 @@
 </p:sld>
 </file>
 
-<file path=ppt/slides/slide19.xml><?xml version="1.0" encoding="utf-8"?>
+<file path=ppt/slides/slide2.xml><?xml version="1.0" encoding="utf-8"?>
+<p:sld xmlns:a="http://schemas.openxmlformats.org/drawingml/2006/main" xmlns:r="http://schemas.openxmlformats.org/officeDocument/2006/relationships" xmlns:p="http://schemas.openxmlformats.org/presentationml/2006/main" show="0">
+  <p:cSld>
+    <p:spTree>
+      <p:nvGrpSpPr>
+        <p:cNvPr id="1" name=""/>
+        <p:cNvGrpSpPr/>
+        <p:nvPr/>
+      </p:nvGrpSpPr>
+      <p:grpSpPr>
+        <a:xfrm>
+          <a:off x="0" y="0"/>
+          <a:ext cx="0" cy="0"/>
+          <a:chOff x="0" y="0"/>
+          <a:chExt cx="0" cy="0"/>
+        </a:xfrm>
+      </p:grpSpPr>
+      <p:sp>
+        <p:nvSpPr>
+          <p:cNvPr id="2" name="Title 1"/>
+          <p:cNvSpPr>
+            <a:spLocks noGrp="1"/>
+          </p:cNvSpPr>
+          <p:nvPr>
+            <p:ph type="title"/>
+          </p:nvPr>
+        </p:nvSpPr>
+        <p:spPr/>
+        <p:txBody>
+          <a:bodyPr/>
+          <a:lstStyle/>
+          <a:p>
+            <a:r>
+              <a:rPr lang="en-GB" dirty="0" err="1"/>
+              <a:t>Stringifying</a:t>
+            </a:r>
+            <a:r>
+              <a:rPr lang="en-GB" dirty="0"/>
+              <a:t> Kernel Source</a:t>
+            </a:r>
+          </a:p>
+        </p:txBody>
+      </p:sp>
+      <p:sp>
+        <p:nvSpPr>
+          <p:cNvPr id="3" name="Content Placeholder 2"/>
+          <p:cNvSpPr>
+            <a:spLocks noGrp="1"/>
+          </p:cNvSpPr>
+          <p:nvPr>
+            <p:ph idx="1"/>
+          </p:nvPr>
+        </p:nvSpPr>
+        <p:spPr/>
+        <p:txBody>
+          <a:bodyPr>
+            <a:normAutofit lnSpcReduction="10000"/>
+          </a:bodyPr>
+          <a:lstStyle/>
+          <a:p>
+            <a:r>
+              <a:rPr lang="en-GB" dirty="0"/>
+              <a:t>We usually </a:t>
+            </a:r>
+            <a:r>
+              <a:rPr lang="en-GB" dirty="0" smtClean="0"/>
+              <a:t>load our OpenCL </a:t>
+            </a:r>
+            <a:r>
+              <a:rPr lang="en-GB" dirty="0"/>
+              <a:t>kernel source </a:t>
+            </a:r>
+            <a:r>
+              <a:rPr lang="en-GB" dirty="0" smtClean="0"/>
+              <a:t>code from </a:t>
+            </a:r>
+            <a:r>
+              <a:rPr lang="en-GB" dirty="0"/>
+              <a:t>file(s) at runtime</a:t>
+            </a:r>
+          </a:p>
+          <a:p>
+            <a:r>
+              <a:rPr lang="en-GB" dirty="0" smtClean="0"/>
+              <a:t>We can make things easier by using a script to convert OpenCL source files into string literals defined inside header files</a:t>
+            </a:r>
+          </a:p>
+          <a:p>
+            <a:r>
+              <a:rPr lang="en-GB" dirty="0" smtClean="0"/>
+              <a:t>This script then becomes part of the build process in the </a:t>
+            </a:r>
+            <a:r>
+              <a:rPr lang="en-GB" dirty="0" err="1" smtClean="0"/>
+              <a:t>Makefile</a:t>
+            </a:r>
+            <a:r>
+              <a:rPr lang="en-GB" dirty="0" smtClean="0"/>
+              <a:t>:</a:t>
+            </a:r>
+          </a:p>
+          <a:p>
+            <a:pPr marL="400050" lvl="1" indent="0">
+              <a:buNone/>
+            </a:pPr>
+            <a:r>
+              <a:rPr lang="en-GB" b="1" dirty="0" err="1" smtClean="0">
+                <a:solidFill>
+                  <a:schemeClr val="accent3"/>
+                </a:solidFill>
+                <a:latin typeface="Courier New"/>
+                <a:cs typeface="Courier New"/>
+              </a:rPr>
+              <a:t>foo.h</a:t>
+            </a:r>
+            <a:r>
+              <a:rPr lang="en-GB" b="1" dirty="0" smtClean="0">
+                <a:solidFill>
+                  <a:schemeClr val="accent3"/>
+                </a:solidFill>
+                <a:latin typeface="Courier New"/>
+                <a:cs typeface="Courier New"/>
+              </a:rPr>
+              <a:t>:</a:t>
+            </a:r>
+            <a:r>
+              <a:rPr lang="en-GB" b="1" dirty="0" smtClean="0">
+                <a:latin typeface="Courier New"/>
+                <a:cs typeface="Courier New"/>
+              </a:rPr>
+              <a:t> </a:t>
+            </a:r>
+            <a:r>
+              <a:rPr lang="en-GB" b="1" dirty="0" err="1" smtClean="0">
+                <a:latin typeface="Courier New"/>
+                <a:cs typeface="Courier New"/>
+              </a:rPr>
+              <a:t>foo.cl</a:t>
+            </a:r>
+            <a:endParaRPr lang="en-GB" b="1" dirty="0" smtClean="0">
+              <a:latin typeface="Courier New"/>
+              <a:cs typeface="Courier New"/>
+            </a:endParaRPr>
+          </a:p>
+          <a:p>
+            <a:pPr marL="400050" lvl="1" indent="0">
+              <a:buNone/>
+            </a:pPr>
+            <a:r>
+              <a:rPr lang="en-GB" b="1" dirty="0" smtClean="0">
+                <a:latin typeface="Courier New"/>
+                <a:cs typeface="Courier New"/>
+              </a:rPr>
+              <a:t>    ./</a:t>
+            </a:r>
+            <a:r>
+              <a:rPr lang="en-GB" b="1" dirty="0" err="1" smtClean="0">
+                <a:latin typeface="Courier New"/>
+                <a:cs typeface="Courier New"/>
+              </a:rPr>
+              <a:t>stringify_ocl</a:t>
+            </a:r>
+            <a:r>
+              <a:rPr lang="en-GB" b="1" dirty="0" smtClean="0">
+                <a:latin typeface="Courier New"/>
+                <a:cs typeface="Courier New"/>
+              </a:rPr>
+              <a:t> </a:t>
+            </a:r>
+            <a:r>
+              <a:rPr lang="en-GB" b="1" dirty="0" err="1" smtClean="0">
+                <a:latin typeface="Courier New"/>
+                <a:cs typeface="Courier New"/>
+              </a:rPr>
+              <a:t>foo.cl</a:t>
+            </a:r>
+            <a:endParaRPr lang="en-GB" b="1" dirty="0" smtClean="0">
+              <a:latin typeface="Courier New"/>
+              <a:cs typeface="Courier New"/>
+            </a:endParaRPr>
+          </a:p>
+        </p:txBody>
+      </p:sp>
+    </p:spTree>
+    <p:extLst>
+      <p:ext uri="{BB962C8B-B14F-4D97-AF65-F5344CB8AC3E}">
+        <p14:creationId xmlns:p14="http://schemas.microsoft.com/office/powerpoint/2010/main" val="1274509593"/>
+      </p:ext>
+    </p:extLst>
+  </p:cSld>
+  <p:clrMapOvr>
+    <a:masterClrMapping/>
+  </p:clrMapOvr>
+  <mc:AlternateContent xmlns:mc="http://schemas.openxmlformats.org/markup-compatibility/2006" xmlns:p14="http://schemas.microsoft.com/office/powerpoint/2010/main">
+    <mc:Choice Requires="p14">
+      <p:transition spd="slow" p14:dur="2000"/>
+    </mc:Choice>
+    <mc:Fallback xmlns="">
+      <p:transition xmlns:p14="http://schemas.microsoft.com/office/powerpoint/2010/main" spd="slow"/>
+    </mc:Fallback>
+  </mc:AlternateContent>
+  <p:timing>
+    <p:tnLst>
+      <p:par>
+        <p:cTn xmlns:p14="http://schemas.microsoft.com/office/powerpoint/2010/main" id="1" dur="indefinite" restart="never" nodeType="tmRoot"/>
+      </p:par>
+    </p:tnLst>
+  </p:timing>
+</p:sld>
+</file>
+
+<file path=ppt/slides/slide20.xml><?xml version="1.0" encoding="utf-8"?>
 <p:sld xmlns:a="http://schemas.openxmlformats.org/drawingml/2006/main" xmlns:r="http://schemas.openxmlformats.org/officeDocument/2006/relationships" xmlns:p="http://schemas.openxmlformats.org/presentationml/2006/main">
   <p:cSld>
     <p:spTree>
@@ -8310,218 +8908,7 @@
 </p:sld>
 </file>
 
-<file path=ppt/slides/slide2.xml><?xml version="1.0" encoding="utf-8"?>
-<p:sld xmlns:a="http://schemas.openxmlformats.org/drawingml/2006/main" xmlns:r="http://schemas.openxmlformats.org/officeDocument/2006/relationships" xmlns:p="http://schemas.openxmlformats.org/presentationml/2006/main" show="0">
-  <p:cSld>
-    <p:spTree>
-      <p:nvGrpSpPr>
-        <p:cNvPr id="1" name=""/>
-        <p:cNvGrpSpPr/>
-        <p:nvPr/>
-      </p:nvGrpSpPr>
-      <p:grpSpPr>
-        <a:xfrm>
-          <a:off x="0" y="0"/>
-          <a:ext cx="0" cy="0"/>
-          <a:chOff x="0" y="0"/>
-          <a:chExt cx="0" cy="0"/>
-        </a:xfrm>
-      </p:grpSpPr>
-      <p:sp>
-        <p:nvSpPr>
-          <p:cNvPr id="2" name="Title 1"/>
-          <p:cNvSpPr>
-            <a:spLocks noGrp="1"/>
-          </p:cNvSpPr>
-          <p:nvPr>
-            <p:ph type="title"/>
-          </p:nvPr>
-        </p:nvSpPr>
-        <p:spPr/>
-        <p:txBody>
-          <a:bodyPr/>
-          <a:lstStyle/>
-          <a:p>
-            <a:r>
-              <a:rPr lang="en-GB" dirty="0" err="1"/>
-              <a:t>Stringifying</a:t>
-            </a:r>
-            <a:r>
-              <a:rPr lang="en-GB" dirty="0"/>
-              <a:t> Kernel Source</a:t>
-            </a:r>
-          </a:p>
-        </p:txBody>
-      </p:sp>
-      <p:sp>
-        <p:nvSpPr>
-          <p:cNvPr id="3" name="Content Placeholder 2"/>
-          <p:cNvSpPr>
-            <a:spLocks noGrp="1"/>
-          </p:cNvSpPr>
-          <p:nvPr>
-            <p:ph idx="1"/>
-          </p:nvPr>
-        </p:nvSpPr>
-        <p:spPr/>
-        <p:txBody>
-          <a:bodyPr>
-            <a:normAutofit lnSpcReduction="10000"/>
-          </a:bodyPr>
-          <a:lstStyle/>
-          <a:p>
-            <a:r>
-              <a:rPr lang="en-GB" dirty="0"/>
-              <a:t>We usually </a:t>
-            </a:r>
-            <a:r>
-              <a:rPr lang="en-GB" dirty="0" smtClean="0"/>
-              <a:t>load our OpenCL </a:t>
-            </a:r>
-            <a:r>
-              <a:rPr lang="en-GB" dirty="0"/>
-              <a:t>kernel source </a:t>
-            </a:r>
-            <a:r>
-              <a:rPr lang="en-GB" dirty="0" smtClean="0"/>
-              <a:t>code from </a:t>
-            </a:r>
-            <a:r>
-              <a:rPr lang="en-GB" dirty="0"/>
-              <a:t>file(s) at runtime</a:t>
-            </a:r>
-          </a:p>
-          <a:p>
-            <a:r>
-              <a:rPr lang="en-GB" dirty="0" smtClean="0"/>
-              <a:t>We can make things easier by using a script to convert OpenCL source files into string literals defined inside header files</a:t>
-            </a:r>
-          </a:p>
-          <a:p>
-            <a:r>
-              <a:rPr lang="en-GB" dirty="0" smtClean="0"/>
-              <a:t>This script then becomes part of the build process in the </a:t>
-            </a:r>
-            <a:r>
-              <a:rPr lang="en-GB" dirty="0" err="1" smtClean="0"/>
-              <a:t>Makefile</a:t>
-            </a:r>
-            <a:r>
-              <a:rPr lang="en-GB" dirty="0" smtClean="0"/>
-              <a:t>:</a:t>
-            </a:r>
-          </a:p>
-          <a:p>
-            <a:pPr marL="400050" lvl="1" indent="0">
-              <a:buNone/>
-            </a:pPr>
-            <a:r>
-              <a:rPr lang="en-GB" b="1" dirty="0" err="1" smtClean="0">
-                <a:solidFill>
-                  <a:schemeClr val="accent3"/>
-                </a:solidFill>
-                <a:latin typeface="Courier New"/>
-                <a:cs typeface="Courier New"/>
-              </a:rPr>
-              <a:t>foo.h</a:t>
-            </a:r>
-            <a:r>
-              <a:rPr lang="en-GB" b="1" dirty="0" smtClean="0">
-                <a:solidFill>
-                  <a:schemeClr val="accent3"/>
-                </a:solidFill>
-                <a:latin typeface="Courier New"/>
-                <a:cs typeface="Courier New"/>
-              </a:rPr>
-              <a:t>:</a:t>
-            </a:r>
-            <a:r>
-              <a:rPr lang="en-GB" b="1" dirty="0" smtClean="0">
-                <a:latin typeface="Courier New"/>
-                <a:cs typeface="Courier New"/>
-              </a:rPr>
-              <a:t> </a:t>
-            </a:r>
-            <a:r>
-              <a:rPr lang="en-GB" b="1" dirty="0" err="1" smtClean="0">
-                <a:latin typeface="Courier New"/>
-                <a:cs typeface="Courier New"/>
-              </a:rPr>
-              <a:t>foo.cl</a:t>
-            </a:r>
-            <a:endParaRPr lang="en-GB" b="1" dirty="0" smtClean="0">
-              <a:latin typeface="Courier New"/>
-              <a:cs typeface="Courier New"/>
-            </a:endParaRPr>
-          </a:p>
-          <a:p>
-            <a:pPr marL="400050" lvl="1" indent="0">
-              <a:buNone/>
-            </a:pPr>
-            <a:r>
-              <a:rPr lang="en-GB" b="1" dirty="0" smtClean="0">
-                <a:latin typeface="Courier New"/>
-                <a:cs typeface="Courier New"/>
-              </a:rPr>
-              <a:t>    ./</a:t>
-            </a:r>
-            <a:r>
-              <a:rPr lang="en-GB" b="1" dirty="0" err="1" smtClean="0">
-                <a:latin typeface="Courier New"/>
-                <a:cs typeface="Courier New"/>
-              </a:rPr>
-              <a:t>stringify_ocl</a:t>
-            </a:r>
-            <a:r>
-              <a:rPr lang="en-GB" b="1" dirty="0" smtClean="0">
-                <a:latin typeface="Courier New"/>
-                <a:cs typeface="Courier New"/>
-              </a:rPr>
-              <a:t> </a:t>
-            </a:r>
-            <a:r>
-              <a:rPr lang="en-GB" b="1" dirty="0" err="1" smtClean="0">
-                <a:latin typeface="Courier New"/>
-                <a:cs typeface="Courier New"/>
-              </a:rPr>
-              <a:t>foo.cl</a:t>
-            </a:r>
-            <a:endParaRPr lang="en-GB" b="1" dirty="0" smtClean="0">
-              <a:latin typeface="Courier New"/>
-              <a:cs typeface="Courier New"/>
-            </a:endParaRPr>
-          </a:p>
-        </p:txBody>
-      </p:sp>
-    </p:spTree>
-    <p:extLst>
-      <p:ext uri="{BB962C8B-B14F-4D97-AF65-F5344CB8AC3E}">
-        <p14:creationId xmlns:p14="http://schemas.microsoft.com/office/powerpoint/2010/main" val="1274509593"/>
-      </p:ext>
-    </p:extLst>
-  </p:cSld>
-  <p:clrMapOvr>
-    <a:masterClrMapping/>
-  </p:clrMapOvr>
-  <mc:AlternateContent xmlns:mc="http://schemas.openxmlformats.org/markup-compatibility/2006" xmlns:p14="http://schemas.microsoft.com/office/powerpoint/2010/main">
-    <mc:Choice Requires="p14">
-      <p:transition spd="slow" p14:dur="2000"/>
-    </mc:Choice>
-    <mc:Fallback xmlns="">
-      <p:transition xmlns:p14="http://schemas.microsoft.com/office/powerpoint/2010/main" spd="slow"/>
-    </mc:Fallback>
-  </mc:AlternateContent>
-  <p:timing>
-    <p:tnLst>
-      <p:par>
-        <p:cTn xmlns:p14="http://schemas.microsoft.com/office/powerpoint/2010/main" id="1" dur="indefinite" restart="never" nodeType="tmRoot"/>
-      </p:par>
-    </p:tnLst>
-  </p:timing>
-</p:sld>
-</file>
-
-<file path=ppt/slides/slide20.xml><?xml version="1.0" encoding="utf-8"?>
+<file path=ppt/slides/slide21.xml><?xml version="1.0" encoding="utf-8"?>
 <p:sld xmlns:a="http://schemas.openxmlformats.org/drawingml/2006/main" xmlns:r="http://schemas.openxmlformats.org/officeDocument/2006/relationships" xmlns:p="http://schemas.openxmlformats.org/presentationml/2006/main">
   <p:cSld>
     <p:spTree>
@@ -8757,7 +9144,7 @@
 </p:sld>
 </file>
 
-<file path=ppt/slides/slide21.xml><?xml version="1.0" encoding="utf-8"?>
+<file path=ppt/slides/slide22.xml><?xml version="1.0" encoding="utf-8"?>
 <p:sld xmlns:a="http://schemas.openxmlformats.org/drawingml/2006/main" xmlns:r="http://schemas.openxmlformats.org/officeDocument/2006/relationships" xmlns:p="http://schemas.openxmlformats.org/presentationml/2006/main">
   <p:cSld>
     <p:spTree>
@@ -9032,17 +9419,17 @@
                 <a:latin typeface="Courier New"/>
                 <a:cs typeface="Courier New"/>
               </a:rPr>
-              <a:t>// OpenCL C++ (</a:t>
-            </a:r>
-            <a:r>
-              <a:rPr lang="en-GB" b="1" dirty="0">
+              <a:t>// OpenCL C++ </a:t>
+            </a:r>
+            <a:r>
+              <a:rPr lang="en-GB" b="1" dirty="0" smtClean="0">
                 <a:solidFill>
                   <a:srgbClr val="008000"/>
                 </a:solidFill>
                 <a:latin typeface="Courier New"/>
                 <a:cs typeface="Courier New"/>
               </a:rPr>
-              <a:t>provisional</a:t>
+              <a:t>kernel </a:t>
             </a:r>
             <a:r>
               <a:rPr lang="en-GB" b="1" dirty="0" smtClean="0">
@@ -9052,27 +9439,7 @@
                 <a:latin typeface="Courier New"/>
                 <a:cs typeface="Courier New"/>
               </a:rPr>
-              <a:t>)</a:t>
-            </a:r>
-            <a:r>
-              <a:rPr lang="en-GB" b="1" dirty="0">
-                <a:solidFill>
-                  <a:srgbClr val="008000"/>
-                </a:solidFill>
-                <a:latin typeface="Courier New"/>
-                <a:cs typeface="Courier New"/>
-              </a:rPr>
-              <a:t> </a:t>
-            </a:r>
-            <a:r>
-              <a:rPr lang="en-GB" b="1" dirty="0" smtClean="0">
-                <a:solidFill>
-                  <a:srgbClr val="008000"/>
-                </a:solidFill>
-                <a:latin typeface="Courier New"/>
-                <a:cs typeface="Courier New"/>
-              </a:rPr>
-              <a:t>kernel code</a:t>
+              <a:t>code</a:t>
             </a:r>
           </a:p>
           <a:p>
@@ -9903,7 +10270,7 @@
 </p:sld>
 </file>
 
-<file path=ppt/slides/slide22.xml><?xml version="1.0" encoding="utf-8"?>
+<file path=ppt/slides/slide23.xml><?xml version="1.0" encoding="utf-8"?>
 <p:sld xmlns:a="http://schemas.openxmlformats.org/drawingml/2006/main" xmlns:r="http://schemas.openxmlformats.org/officeDocument/2006/relationships" xmlns:p="http://schemas.openxmlformats.org/presentationml/2006/main">
   <p:cSld>
     <p:spTree>
@@ -10146,7 +10513,7 @@
 </p:sld>
 </file>
 
-<file path=ppt/slides/slide23.xml><?xml version="1.0" encoding="utf-8"?>
+<file path=ppt/slides/slide24.xml><?xml version="1.0" encoding="utf-8"?>
 <p:sld xmlns:a="http://schemas.openxmlformats.org/drawingml/2006/main" xmlns:r="http://schemas.openxmlformats.org/officeDocument/2006/relationships" xmlns:p="http://schemas.openxmlformats.org/presentationml/2006/main">
   <p:cSld>
     <p:spTree>
@@ -10222,11 +10589,7 @@
             </a:pPr>
             <a:r>
               <a:rPr lang="en-GB" dirty="0" smtClean="0"/>
-              <a:t>Find the starting code in e.g. ~</a:t>
-            </a:r>
-            <a:r>
-              <a:rPr lang="en-GB" dirty="0" smtClean="0"/>
-              <a:t>/Advanced-Exercises/exercises/</a:t>
+              <a:t>Find the starting code in e.g. ~/Advanced-Exercises/exercises/</a:t>
             </a:r>
             <a:r>
               <a:rPr lang="en-GB" dirty="0"/>
@@ -10413,7 +10776,7 @@
 </p:sld>
 </file>
 
-<file path=ppt/slides/slide24.xml><?xml version="1.0" encoding="utf-8"?>
+<file path=ppt/slides/slide25.xml><?xml version="1.0" encoding="utf-8"?>
 <p:sld xmlns:a="http://schemas.openxmlformats.org/drawingml/2006/main" xmlns:r="http://schemas.openxmlformats.org/officeDocument/2006/relationships" xmlns:p="http://schemas.openxmlformats.org/presentationml/2006/main">
   <p:cSld>
     <p:spTree>

</xml_diff>

<commit_message>
Add SPIR-V ecosystem slide from Khronos presentation
</commit_message>
<xml_diff>
--- a/slides/advanced_part2.pptx
+++ b/slides/advanced_part2.pptx
@@ -5,7 +5,7 @@
     <p:sldMasterId id="2147483648" r:id="rId1"/>
   </p:sldMasterIdLst>
   <p:notesMasterIdLst>
-    <p:notesMasterId r:id="rId27"/>
+    <p:notesMasterId r:id="rId28"/>
   </p:notesMasterIdLst>
   <p:sldIdLst>
     <p:sldId id="257" r:id="rId2"/>
@@ -19,20 +19,21 @@
     <p:sldId id="262" r:id="rId10"/>
     <p:sldId id="263" r:id="rId11"/>
     <p:sldId id="283" r:id="rId12"/>
-    <p:sldId id="267" r:id="rId13"/>
-    <p:sldId id="269" r:id="rId14"/>
-    <p:sldId id="268" r:id="rId15"/>
-    <p:sldId id="270" r:id="rId16"/>
-    <p:sldId id="271" r:id="rId17"/>
-    <p:sldId id="272" r:id="rId18"/>
-    <p:sldId id="278" r:id="rId19"/>
-    <p:sldId id="273" r:id="rId20"/>
-    <p:sldId id="274" r:id="rId21"/>
-    <p:sldId id="275" r:id="rId22"/>
-    <p:sldId id="281" r:id="rId23"/>
-    <p:sldId id="279" r:id="rId24"/>
-    <p:sldId id="277" r:id="rId25"/>
-    <p:sldId id="282" r:id="rId26"/>
+    <p:sldId id="284" r:id="rId13"/>
+    <p:sldId id="267" r:id="rId14"/>
+    <p:sldId id="269" r:id="rId15"/>
+    <p:sldId id="268" r:id="rId16"/>
+    <p:sldId id="270" r:id="rId17"/>
+    <p:sldId id="271" r:id="rId18"/>
+    <p:sldId id="272" r:id="rId19"/>
+    <p:sldId id="278" r:id="rId20"/>
+    <p:sldId id="273" r:id="rId21"/>
+    <p:sldId id="274" r:id="rId22"/>
+    <p:sldId id="275" r:id="rId23"/>
+    <p:sldId id="281" r:id="rId24"/>
+    <p:sldId id="279" r:id="rId25"/>
+    <p:sldId id="277" r:id="rId26"/>
+    <p:sldId id="282" r:id="rId27"/>
   </p:sldIdLst>
   <p:sldSz cx="9144000" cy="6858000" type="screen4x3"/>
   <p:notesSz cx="6858000" cy="9144000"/>
@@ -580,6 +581,106 @@
 </p:notes>
 </file>
 
+<file path=ppt/notesSlides/notesSlide10.xml><?xml version="1.0" encoding="utf-8"?>
+<p:notes xmlns:a="http://schemas.openxmlformats.org/drawingml/2006/main" xmlns:r="http://schemas.openxmlformats.org/officeDocument/2006/relationships" xmlns:p="http://schemas.openxmlformats.org/presentationml/2006/main">
+  <p:cSld>
+    <p:spTree>
+      <p:nvGrpSpPr>
+        <p:cNvPr id="1" name=""/>
+        <p:cNvGrpSpPr/>
+        <p:nvPr/>
+      </p:nvGrpSpPr>
+      <p:grpSpPr>
+        <a:xfrm>
+          <a:off x="0" y="0"/>
+          <a:ext cx="0" cy="0"/>
+          <a:chOff x="0" y="0"/>
+          <a:chExt cx="0" cy="0"/>
+        </a:xfrm>
+      </p:grpSpPr>
+      <p:sp>
+        <p:nvSpPr>
+          <p:cNvPr id="2" name="Slide Image Placeholder 1"/>
+          <p:cNvSpPr>
+            <a:spLocks noGrp="1" noRot="1" noChangeAspect="1"/>
+          </p:cNvSpPr>
+          <p:nvPr>
+            <p:ph type="sldImg"/>
+          </p:nvPr>
+        </p:nvSpPr>
+        <p:spPr/>
+      </p:sp>
+      <p:sp>
+        <p:nvSpPr>
+          <p:cNvPr id="3" name="Notes Placeholder 2"/>
+          <p:cNvSpPr>
+            <a:spLocks noGrp="1"/>
+          </p:cNvSpPr>
+          <p:nvPr>
+            <p:ph type="body" idx="1"/>
+          </p:nvPr>
+        </p:nvSpPr>
+        <p:spPr/>
+        <p:txBody>
+          <a:bodyPr/>
+          <a:lstStyle/>
+          <a:p>
+            <a:r>
+              <a:rPr lang="en-GB" dirty="0" smtClean="0"/>
+              <a:t>Runtime</a:t>
+            </a:r>
+            <a:r>
+              <a:rPr lang="en-GB" baseline="0" dirty="0" smtClean="0"/>
+              <a:t> can perform constant folding, constant propagation </a:t>
+            </a:r>
+            <a:r>
+              <a:rPr lang="en-GB" baseline="0" dirty="0" err="1" smtClean="0"/>
+              <a:t>etc</a:t>
+            </a:r>
+            <a:r>
+              <a:rPr lang="en-GB" baseline="0" dirty="0" smtClean="0"/>
+              <a:t> before finalizing to native ISA</a:t>
+            </a:r>
+            <a:endParaRPr lang="en-GB" dirty="0"/>
+          </a:p>
+        </p:txBody>
+      </p:sp>
+      <p:sp>
+        <p:nvSpPr>
+          <p:cNvPr id="4" name="Slide Number Placeholder 3"/>
+          <p:cNvSpPr>
+            <a:spLocks noGrp="1"/>
+          </p:cNvSpPr>
+          <p:nvPr>
+            <p:ph type="sldNum" sz="quarter" idx="10"/>
+          </p:nvPr>
+        </p:nvSpPr>
+        <p:spPr/>
+        <p:txBody>
+          <a:bodyPr/>
+          <a:lstStyle/>
+          <a:p>
+            <a:fld id="{E0B00886-CC17-8E42-AE02-995FCC132C1C}" type="slidenum">
+              <a:rPr lang="en-US" smtClean="0"/>
+              <a:t>23</a:t>
+            </a:fld>
+            <a:endParaRPr lang="en-US"/>
+          </a:p>
+        </p:txBody>
+      </p:sp>
+    </p:spTree>
+    <p:extLst>
+      <p:ext uri="{BB962C8B-B14F-4D97-AF65-F5344CB8AC3E}">
+        <p14:creationId xmlns:p14="http://schemas.microsoft.com/office/powerpoint/2010/main" val="2018077648"/>
+      </p:ext>
+    </p:extLst>
+  </p:cSld>
+  <p:clrMapOvr>
+    <a:masterClrMapping/>
+  </p:clrMapOvr>
+</p:notes>
+</file>
+
 <file path=ppt/notesSlides/notesSlide2.xml><?xml version="1.0" encoding="utf-8"?>
 <p:notes xmlns:a="http://schemas.openxmlformats.org/drawingml/2006/main" xmlns:r="http://schemas.openxmlformats.org/officeDocument/2006/relationships" xmlns:p="http://schemas.openxmlformats.org/presentationml/2006/main">
   <p:cSld>
@@ -716,31 +817,7 @@
           <a:bodyPr/>
           <a:lstStyle/>
           <a:p>
-            <a:r>
-              <a:rPr lang="en-GB" dirty="0" smtClean="0"/>
-              <a:t>Core in </a:t>
-            </a:r>
-            <a:r>
-              <a:rPr lang="en-GB" dirty="0" err="1" smtClean="0"/>
-              <a:t>Vulkan</a:t>
-            </a:r>
-            <a:r>
-              <a:rPr lang="en-GB" dirty="0" smtClean="0"/>
-              <a:t> from 1.0</a:t>
-            </a:r>
-          </a:p>
-          <a:p>
-            <a:r>
-              <a:rPr lang="en-GB" dirty="0" smtClean="0"/>
-              <a:t>Core</a:t>
-            </a:r>
-            <a:r>
-              <a:rPr lang="en-GB" baseline="0" dirty="0" smtClean="0"/>
-              <a:t> in OpenCL 2.1</a:t>
-            </a:r>
-          </a:p>
-          <a:p>
-            <a:endParaRPr lang="en-GB" baseline="0" dirty="0" smtClean="0"/>
+            <a:endParaRPr lang="en-GB" dirty="0"/>
           </a:p>
         </p:txBody>
       </p:sp>
@@ -761,7 +838,7 @@
           <a:p>
             <a:fld id="{E0B00886-CC17-8E42-AE02-995FCC132C1C}" type="slidenum">
               <a:rPr lang="en-US" smtClean="0"/>
-              <a:t>11</a:t>
+              <a:t>10</a:t>
             </a:fld>
             <a:endParaRPr lang="en-US"/>
           </a:p>
@@ -770,7 +847,7 @@
     </p:spTree>
     <p:extLst>
       <p:ext uri="{BB962C8B-B14F-4D97-AF65-F5344CB8AC3E}">
-        <p14:creationId xmlns:p14="http://schemas.microsoft.com/office/powerpoint/2010/main" val="1400531646"/>
+        <p14:creationId xmlns:p14="http://schemas.microsoft.com/office/powerpoint/2010/main" val="1781665713"/>
       </p:ext>
     </p:extLst>
   </p:cSld>
@@ -824,7 +901,42 @@
           <a:bodyPr/>
           <a:lstStyle/>
           <a:p>
-            <a:endParaRPr lang="en-GB" dirty="0"/>
+            <a:r>
+              <a:rPr lang="en-GB" dirty="0" smtClean="0"/>
+              <a:t>Core in </a:t>
+            </a:r>
+            <a:r>
+              <a:rPr lang="en-GB" dirty="0" err="1" smtClean="0"/>
+              <a:t>Vulkan</a:t>
+            </a:r>
+            <a:r>
+              <a:rPr lang="en-GB" dirty="0" smtClean="0"/>
+              <a:t> from 1.0</a:t>
+            </a:r>
+          </a:p>
+          <a:p>
+            <a:r>
+              <a:rPr lang="en-GB" dirty="0" smtClean="0"/>
+              <a:t>Core</a:t>
+            </a:r>
+            <a:r>
+              <a:rPr lang="en-GB" baseline="0" dirty="0" smtClean="0"/>
+              <a:t> in OpenCL </a:t>
+            </a:r>
+            <a:r>
+              <a:rPr lang="en-GB" baseline="0" dirty="0" smtClean="0"/>
+              <a:t>2.1</a:t>
+            </a:r>
+          </a:p>
+          <a:p>
+            <a:r>
+              <a:rPr lang="en-GB" baseline="0" dirty="0" smtClean="0"/>
+              <a:t>Intel shipping SPIR-V support</a:t>
+            </a:r>
+            <a:endParaRPr lang="en-GB" baseline="0" dirty="0" smtClean="0"/>
+          </a:p>
+          <a:p>
+            <a:endParaRPr lang="en-GB" baseline="0" dirty="0" smtClean="0"/>
           </a:p>
         </p:txBody>
       </p:sp>
@@ -845,7 +957,7 @@
           <a:p>
             <a:fld id="{E0B00886-CC17-8E42-AE02-995FCC132C1C}" type="slidenum">
               <a:rPr lang="en-US" smtClean="0"/>
-              <a:t>13</a:t>
+              <a:t>11</a:t>
             </a:fld>
             <a:endParaRPr lang="en-US"/>
           </a:p>
@@ -854,7 +966,7 @@
     </p:spTree>
     <p:extLst>
       <p:ext uri="{BB962C8B-B14F-4D97-AF65-F5344CB8AC3E}">
-        <p14:creationId xmlns:p14="http://schemas.microsoft.com/office/powerpoint/2010/main" val="1354698458"/>
+        <p14:creationId xmlns:p14="http://schemas.microsoft.com/office/powerpoint/2010/main" val="1400531646"/>
       </p:ext>
     </p:extLst>
   </p:cSld>
@@ -910,11 +1022,19 @@
           <a:p>
             <a:r>
               <a:rPr lang="en-GB" dirty="0" smtClean="0"/>
-              <a:t>e.g. Image processing framework, allow third-parties</a:t>
+              <a:t>OpenCL C++ frontend</a:t>
             </a:r>
             <a:r>
               <a:rPr lang="en-GB" baseline="0" dirty="0" smtClean="0"/>
-              <a:t> to drop additional filter kernels into directory and automatically insert them into pipeline</a:t>
+              <a:t> is now open source (</a:t>
+            </a:r>
+            <a:r>
+              <a:rPr lang="en-GB" baseline="0" dirty="0" err="1" smtClean="0"/>
+              <a:t>GitHub</a:t>
+            </a:r>
+            <a:r>
+              <a:rPr lang="en-GB" baseline="0" dirty="0" smtClean="0"/>
+              <a:t>)</a:t>
             </a:r>
             <a:endParaRPr lang="en-GB" dirty="0"/>
           </a:p>
@@ -937,7 +1057,7 @@
           <a:p>
             <a:fld id="{E0B00886-CC17-8E42-AE02-995FCC132C1C}" type="slidenum">
               <a:rPr lang="en-US" smtClean="0"/>
-              <a:t>14</a:t>
+              <a:t>12</a:t>
             </a:fld>
             <a:endParaRPr lang="en-US"/>
           </a:p>
@@ -946,7 +1066,7 @@
     </p:spTree>
     <p:extLst>
       <p:ext uri="{BB962C8B-B14F-4D97-AF65-F5344CB8AC3E}">
-        <p14:creationId xmlns:p14="http://schemas.microsoft.com/office/powerpoint/2010/main" val="1015348040"/>
+        <p14:creationId xmlns:p14="http://schemas.microsoft.com/office/powerpoint/2010/main" val="834073815"/>
       </p:ext>
     </p:extLst>
   </p:cSld>
@@ -1000,31 +1120,6 @@
           <a:bodyPr/>
           <a:lstStyle/>
           <a:p>
-            <a:r>
-              <a:rPr lang="en-GB" dirty="0" smtClean="0"/>
-              <a:t>Hints</a:t>
-            </a:r>
-            <a:r>
-              <a:rPr lang="en-GB" baseline="0" dirty="0" smtClean="0"/>
-              <a:t> to compiler to make it potentially enable more optimizations.</a:t>
-            </a:r>
-          </a:p>
-          <a:p>
-            <a:r>
-              <a:rPr lang="en-GB" baseline="0" dirty="0" err="1" smtClean="0"/>
-              <a:t>reqd_work_group_size</a:t>
-            </a:r>
-            <a:r>
-              <a:rPr lang="en-GB" baseline="0" dirty="0" smtClean="0"/>
-              <a:t> requires that we know WGSIZE at compile-time, but can use meta</a:t>
-            </a:r>
-            <a:r>
-              <a:rPr lang="en-GB" baseline="0" smtClean="0"/>
-              <a:t>-programming</a:t>
-            </a:r>
-            <a:endParaRPr lang="en-GB" baseline="0" dirty="0" smtClean="0"/>
-          </a:p>
-          <a:p>
             <a:endParaRPr lang="en-GB" dirty="0"/>
           </a:p>
         </p:txBody>
@@ -1044,19 +1139,18 @@
           <a:bodyPr/>
           <a:lstStyle/>
           <a:p>
-            <a:fld id="{9B3F2D69-97A9-4C41-91BD-6A22F8270148}" type="slidenum">
-              <a:rPr lang="en-GB" smtClean="0"/>
-              <a:pPr/>
-              <a:t>18</a:t>
+            <a:fld id="{E0B00886-CC17-8E42-AE02-995FCC132C1C}" type="slidenum">
+              <a:rPr lang="en-US" smtClean="0"/>
+              <a:t>14</a:t>
             </a:fld>
-            <a:endParaRPr lang="en-GB"/>
+            <a:endParaRPr lang="en-US"/>
           </a:p>
         </p:txBody>
       </p:sp>
     </p:spTree>
     <p:extLst>
       <p:ext uri="{BB962C8B-B14F-4D97-AF65-F5344CB8AC3E}">
-        <p14:creationId xmlns:p14="http://schemas.microsoft.com/office/powerpoint/2010/main" val="393086129"/>
+        <p14:creationId xmlns:p14="http://schemas.microsoft.com/office/powerpoint/2010/main" val="1354698458"/>
       </p:ext>
     </p:extLst>
   </p:cSld>
@@ -1111,12 +1205,12 @@
           <a:lstStyle/>
           <a:p>
             <a:r>
-              <a:rPr lang="en-GB" dirty="0" err="1" smtClean="0"/>
-              <a:t>ifdefs</a:t>
+              <a:rPr lang="en-GB" dirty="0" smtClean="0"/>
+              <a:t>e.g. Image processing framework, allow third-parties</a:t>
             </a:r>
             <a:r>
               <a:rPr lang="en-GB" baseline="0" dirty="0" smtClean="0"/>
-              <a:t> for toggling functionality</a:t>
+              <a:t> to drop additional filter kernels into directory and automatically insert them into pipeline</a:t>
             </a:r>
             <a:endParaRPr lang="en-GB" dirty="0"/>
           </a:p>
@@ -1139,7 +1233,7 @@
           <a:p>
             <a:fld id="{E0B00886-CC17-8E42-AE02-995FCC132C1C}" type="slidenum">
               <a:rPr lang="en-US" smtClean="0"/>
-              <a:t>21</a:t>
+              <a:t>15</a:t>
             </a:fld>
             <a:endParaRPr lang="en-US"/>
           </a:p>
@@ -1148,7 +1242,7 @@
     </p:spTree>
     <p:extLst>
       <p:ext uri="{BB962C8B-B14F-4D97-AF65-F5344CB8AC3E}">
-        <p14:creationId xmlns:p14="http://schemas.microsoft.com/office/powerpoint/2010/main" val="2018077648"/>
+        <p14:creationId xmlns:p14="http://schemas.microsoft.com/office/powerpoint/2010/main" val="1015348040"/>
       </p:ext>
     </p:extLst>
   </p:cSld>
@@ -1204,19 +1298,121 @@
           <a:p>
             <a:r>
               <a:rPr lang="en-GB" dirty="0" smtClean="0"/>
-              <a:t>Runtime</a:t>
+              <a:t>Hints</a:t>
             </a:r>
             <a:r>
               <a:rPr lang="en-GB" baseline="0" dirty="0" smtClean="0"/>
-              <a:t> can perform constant folding, constant propagation </a:t>
-            </a:r>
+              <a:t> to compiler to make it potentially enable more optimizations.</a:t>
+            </a:r>
+          </a:p>
+          <a:p>
             <a:r>
               <a:rPr lang="en-GB" baseline="0" dirty="0" err="1" smtClean="0"/>
-              <a:t>etc</a:t>
+              <a:t>reqd_work_group_size</a:t>
             </a:r>
             <a:r>
               <a:rPr lang="en-GB" baseline="0" dirty="0" smtClean="0"/>
-              <a:t> before finalizing to native ISA</a:t>
+              <a:t> requires that we know WGSIZE at compile-time, but can use meta</a:t>
+            </a:r>
+            <a:r>
+              <a:rPr lang="en-GB" baseline="0" smtClean="0"/>
+              <a:t>-programming</a:t>
+            </a:r>
+            <a:endParaRPr lang="en-GB" baseline="0" dirty="0" smtClean="0"/>
+          </a:p>
+          <a:p>
+            <a:endParaRPr lang="en-GB" dirty="0"/>
+          </a:p>
+        </p:txBody>
+      </p:sp>
+      <p:sp>
+        <p:nvSpPr>
+          <p:cNvPr id="4" name="Slide Number Placeholder 3"/>
+          <p:cNvSpPr>
+            <a:spLocks noGrp="1"/>
+          </p:cNvSpPr>
+          <p:nvPr>
+            <p:ph type="sldNum" sz="quarter" idx="10"/>
+          </p:nvPr>
+        </p:nvSpPr>
+        <p:spPr/>
+        <p:txBody>
+          <a:bodyPr/>
+          <a:lstStyle/>
+          <a:p>
+            <a:fld id="{9B3F2D69-97A9-4C41-91BD-6A22F8270148}" type="slidenum">
+              <a:rPr lang="en-GB" smtClean="0"/>
+              <a:pPr/>
+              <a:t>19</a:t>
+            </a:fld>
+            <a:endParaRPr lang="en-GB"/>
+          </a:p>
+        </p:txBody>
+      </p:sp>
+    </p:spTree>
+    <p:extLst>
+      <p:ext uri="{BB962C8B-B14F-4D97-AF65-F5344CB8AC3E}">
+        <p14:creationId xmlns:p14="http://schemas.microsoft.com/office/powerpoint/2010/main" val="393086129"/>
+      </p:ext>
+    </p:extLst>
+  </p:cSld>
+  <p:clrMapOvr>
+    <a:masterClrMapping/>
+  </p:clrMapOvr>
+</p:notes>
+</file>
+
+<file path=ppt/notesSlides/notesSlide9.xml><?xml version="1.0" encoding="utf-8"?>
+<p:notes xmlns:a="http://schemas.openxmlformats.org/drawingml/2006/main" xmlns:r="http://schemas.openxmlformats.org/officeDocument/2006/relationships" xmlns:p="http://schemas.openxmlformats.org/presentationml/2006/main">
+  <p:cSld>
+    <p:spTree>
+      <p:nvGrpSpPr>
+        <p:cNvPr id="1" name=""/>
+        <p:cNvGrpSpPr/>
+        <p:nvPr/>
+      </p:nvGrpSpPr>
+      <p:grpSpPr>
+        <a:xfrm>
+          <a:off x="0" y="0"/>
+          <a:ext cx="0" cy="0"/>
+          <a:chOff x="0" y="0"/>
+          <a:chExt cx="0" cy="0"/>
+        </a:xfrm>
+      </p:grpSpPr>
+      <p:sp>
+        <p:nvSpPr>
+          <p:cNvPr id="2" name="Slide Image Placeholder 1"/>
+          <p:cNvSpPr>
+            <a:spLocks noGrp="1" noRot="1" noChangeAspect="1"/>
+          </p:cNvSpPr>
+          <p:nvPr>
+            <p:ph type="sldImg"/>
+          </p:nvPr>
+        </p:nvSpPr>
+        <p:spPr/>
+      </p:sp>
+      <p:sp>
+        <p:nvSpPr>
+          <p:cNvPr id="3" name="Notes Placeholder 2"/>
+          <p:cNvSpPr>
+            <a:spLocks noGrp="1"/>
+          </p:cNvSpPr>
+          <p:nvPr>
+            <p:ph type="body" idx="1"/>
+          </p:nvPr>
+        </p:nvSpPr>
+        <p:spPr/>
+        <p:txBody>
+          <a:bodyPr/>
+          <a:lstStyle/>
+          <a:p>
+            <a:r>
+              <a:rPr lang="en-GB" dirty="0" err="1" smtClean="0"/>
+              <a:t>ifdefs</a:t>
+            </a:r>
+            <a:r>
+              <a:rPr lang="en-GB" baseline="0" dirty="0" smtClean="0"/>
+              <a:t> for toggling functionality</a:t>
             </a:r>
             <a:endParaRPr lang="en-GB" dirty="0"/>
           </a:p>
@@ -4495,7 +4691,7 @@
           <p:nvPr/>
         </p:nvPicPr>
         <p:blipFill>
-          <a:blip r:embed="rId2">
+          <a:blip r:embed="rId3">
             <a:extLst>
               <a:ext uri="{28A0092B-C50C-407E-A947-70E740481C1C}">
                 <a14:useLocalDpi xmlns:a14="http://schemas.microsoft.com/office/drawing/2010/main" val="0"/>
@@ -4852,125 +5048,113 @@
         </p:nvSpPr>
         <p:spPr/>
         <p:txBody>
-          <a:bodyPr/>
-          <a:lstStyle/>
-          <a:p>
-            <a:r>
-              <a:rPr lang="en-GB" dirty="0" smtClean="0"/>
-              <a:t>Generating Assembly Code</a:t>
-            </a:r>
-            <a:endParaRPr lang="en-GB" dirty="0"/>
-          </a:p>
-        </p:txBody>
-      </p:sp>
-      <p:sp>
-        <p:nvSpPr>
-          <p:cNvPr id="3" name="Content Placeholder 2"/>
-          <p:cNvSpPr>
-            <a:spLocks noGrp="1"/>
-          </p:cNvSpPr>
-          <p:nvPr>
-            <p:ph idx="1"/>
-          </p:nvPr>
-        </p:nvSpPr>
-        <p:spPr/>
-        <p:txBody>
           <a:bodyPr>
-            <a:normAutofit fontScale="92500" lnSpcReduction="10000"/>
+            <a:normAutofit/>
           </a:bodyPr>
           <a:lstStyle/>
           <a:p>
             <a:r>
               <a:rPr lang="en-GB" dirty="0" smtClean="0"/>
-              <a:t>It can be useful to inspect compiler output to see if the compiler is doing what you think it’s doing</a:t>
-            </a:r>
-          </a:p>
+              <a:t>SPIR-V Ecosystem</a:t>
+            </a:r>
+            <a:endParaRPr lang="en-GB" dirty="0"/>
+          </a:p>
+        </p:txBody>
+      </p:sp>
+      <p:pic>
+        <p:nvPicPr>
+          <p:cNvPr id="4" name="Content Placeholder 4" descr="spirv-ecosystem.pdf"/>
+          <p:cNvPicPr>
+            <a:picLocks noGrp="1" noChangeAspect="1"/>
+          </p:cNvPicPr>
+          <p:nvPr>
+            <p:ph idx="1"/>
+          </p:nvPr>
+        </p:nvPicPr>
+        <p:blipFill>
+          <a:blip r:embed="rId3">
+            <a:extLst>
+              <a:ext uri="{28A0092B-C50C-407E-A947-70E740481C1C}">
+                <a14:useLocalDpi xmlns:a14="http://schemas.microsoft.com/office/drawing/2010/main" val="0"/>
+              </a:ext>
+            </a:extLst>
+          </a:blip>
+          <a:srcRect l="-1140" r="-1140"/>
+          <a:stretch>
+            <a:fillRect/>
+          </a:stretch>
+        </p:blipFill>
+        <p:spPr>
+          <a:xfrm>
+            <a:off x="-74605" y="1295211"/>
+            <a:ext cx="9218605" cy="5069878"/>
+          </a:xfrm>
+        </p:spPr>
+      </p:pic>
+      <p:pic>
+        <p:nvPicPr>
+          <p:cNvPr id="5" name="Picture 2"/>
+          <p:cNvPicPr>
+            <a:picLocks noChangeAspect="1" noChangeArrowheads="1"/>
+          </p:cNvPicPr>
+          <p:nvPr/>
+        </p:nvPicPr>
+        <p:blipFill>
+          <a:blip r:embed="rId4">
+            <a:extLst>
+              <a:ext uri="{28A0092B-C50C-407E-A947-70E740481C1C}">
+                <a14:useLocalDpi xmlns:a14="http://schemas.microsoft.com/office/drawing/2010/main" val="0"/>
+              </a:ext>
+            </a:extLst>
+          </a:blip>
+          <a:srcRect/>
+          <a:stretch>
+            <a:fillRect/>
+          </a:stretch>
+        </p:blipFill>
+        <p:spPr bwMode="auto">
+          <a:xfrm>
+            <a:off x="6529976" y="341830"/>
+            <a:ext cx="2259248" cy="1129624"/>
+          </a:xfrm>
+          <a:prstGeom prst="rect">
+            <a:avLst/>
+          </a:prstGeom>
+          <a:solidFill>
+            <a:schemeClr val="bg1"/>
+          </a:solidFill>
+          <a:ln>
+            <a:noFill/>
+          </a:ln>
+          <a:effectLst/>
+          <a:extLst/>
+        </p:spPr>
+      </p:pic>
+      <p:sp>
+        <p:nvSpPr>
+          <p:cNvPr id="6" name="TextBox 5"/>
+          <p:cNvSpPr txBox="1"/>
+          <p:nvPr/>
+        </p:nvSpPr>
+        <p:spPr>
+          <a:xfrm>
+            <a:off x="2822726" y="6488668"/>
+            <a:ext cx="3482831" cy="369332"/>
+          </a:xfrm>
+          <a:prstGeom prst="rect">
+            <a:avLst/>
+          </a:prstGeom>
+          <a:noFill/>
+        </p:spPr>
+        <p:txBody>
+          <a:bodyPr wrap="square" rtlCol="0">
+            <a:spAutoFit/>
+          </a:bodyPr>
+          <a:lstStyle/>
           <a:p>
             <a:r>
               <a:rPr lang="en-GB" dirty="0" smtClean="0"/>
-              <a:t>On NVIDIA platforms the ‘binary’ retrieved is actually PTX, their abstract assembly language</a:t>
-            </a:r>
-          </a:p>
-          <a:p>
-            <a:r>
-              <a:rPr lang="en-GB" dirty="0" smtClean="0"/>
-              <a:t>On AMD platforms you can add </a:t>
-            </a:r>
-            <a:r>
-              <a:rPr lang="en-GB" b="1" dirty="0" smtClean="0">
-                <a:solidFill>
-                  <a:srgbClr val="3366FF"/>
-                </a:solidFill>
-                <a:latin typeface="Courier New"/>
-                <a:cs typeface="Courier New"/>
-              </a:rPr>
-              <a:t>–save-temps</a:t>
-            </a:r>
-            <a:r>
-              <a:rPr lang="en-GB" dirty="0" smtClean="0"/>
-              <a:t> to the build options to generate </a:t>
-            </a:r>
-            <a:r>
-              <a:rPr lang="en-GB" b="1" dirty="0" smtClean="0">
-                <a:solidFill>
-                  <a:srgbClr val="3366FF"/>
-                </a:solidFill>
-                <a:latin typeface="Courier New"/>
-                <a:cs typeface="Courier New"/>
-              </a:rPr>
-              <a:t>.</a:t>
-            </a:r>
-            <a:r>
-              <a:rPr lang="en-GB" b="1" dirty="0" err="1" smtClean="0">
-                <a:solidFill>
-                  <a:srgbClr val="3366FF"/>
-                </a:solidFill>
-                <a:latin typeface="Courier New"/>
-                <a:cs typeface="Courier New"/>
-              </a:rPr>
-              <a:t>il</a:t>
-            </a:r>
-            <a:r>
-              <a:rPr lang="en-GB" b="1" dirty="0" smtClean="0">
-                <a:solidFill>
-                  <a:srgbClr val="3366FF"/>
-                </a:solidFill>
-              </a:rPr>
-              <a:t> </a:t>
-            </a:r>
-            <a:r>
-              <a:rPr lang="en-GB" dirty="0" smtClean="0"/>
-              <a:t>and </a:t>
-            </a:r>
-            <a:r>
-              <a:rPr lang="en-GB" b="1" dirty="0" smtClean="0">
-                <a:solidFill>
-                  <a:srgbClr val="3366FF"/>
-                </a:solidFill>
-                <a:latin typeface="Courier New"/>
-                <a:cs typeface="Courier New"/>
-              </a:rPr>
-              <a:t>.</a:t>
-            </a:r>
-            <a:r>
-              <a:rPr lang="en-GB" b="1" dirty="0" err="1" smtClean="0">
-                <a:solidFill>
-                  <a:srgbClr val="3366FF"/>
-                </a:solidFill>
-                <a:latin typeface="Courier New"/>
-                <a:cs typeface="Courier New"/>
-              </a:rPr>
-              <a:t>isa</a:t>
-            </a:r>
-            <a:r>
-              <a:rPr lang="en-GB" dirty="0" smtClean="0"/>
-              <a:t> files containing the intermediate representation and native assembly code</a:t>
-            </a:r>
-          </a:p>
-          <a:p>
-            <a:r>
-              <a:rPr lang="en-GB" dirty="0" smtClean="0"/>
-              <a:t>Other vendors may provide an offline compiler which can generate LLVM/SPIR or assembly</a:t>
+              <a:t>(IWOCL 2015, Stanford University) </a:t>
             </a:r>
             <a:endParaRPr lang="en-GB" dirty="0"/>
           </a:p>
@@ -4979,20 +5163,13 @@
     </p:spTree>
     <p:extLst>
       <p:ext uri="{BB962C8B-B14F-4D97-AF65-F5344CB8AC3E}">
-        <p14:creationId xmlns:p14="http://schemas.microsoft.com/office/powerpoint/2010/main" val="1647771582"/>
+        <p14:creationId xmlns:p14="http://schemas.microsoft.com/office/powerpoint/2010/main" val="1850636444"/>
       </p:ext>
     </p:extLst>
   </p:cSld>
   <p:clrMapOvr>
     <a:masterClrMapping/>
   </p:clrMapOvr>
-  <p:timing>
-    <p:tnLst>
-      <p:par>
-        <p:cTn xmlns:p14="http://schemas.microsoft.com/office/powerpoint/2010/main" id="1" dur="indefinite" restart="never" nodeType="tmRoot"/>
-      </p:par>
-    </p:tnLst>
-  </p:timing>
 </p:sld>
 </file>
 
@@ -5030,7 +5207,7 @@
           <a:p>
             <a:r>
               <a:rPr lang="en-GB" dirty="0" smtClean="0"/>
-              <a:t>Kernel Introspection</a:t>
+              <a:t>Generating Assembly Code</a:t>
             </a:r>
             <a:endParaRPr lang="en-GB" dirty="0"/>
           </a:p>
@@ -5049,25 +5226,101 @@
         <p:spPr/>
         <p:txBody>
           <a:bodyPr>
-            <a:normAutofit/>
+            <a:normAutofit fontScale="92500" lnSpcReduction="10000"/>
           </a:bodyPr>
           <a:lstStyle/>
           <a:p>
             <a:r>
               <a:rPr lang="en-GB" dirty="0" smtClean="0"/>
-              <a:t>This provides a mechanism for automatically discovering and using new kernels, without having to write any new host code</a:t>
+              <a:t>It can be useful to inspect compiler output to see if the compiler is doing what you think it’s doing</a:t>
             </a:r>
           </a:p>
           <a:p>
             <a:r>
               <a:rPr lang="en-GB" dirty="0" smtClean="0"/>
-              <a:t>Can make it much easier to add new kernels to an existing application</a:t>
+              <a:t>On NVIDIA platforms the ‘binary’ retrieved is actually PTX, their abstract assembly language</a:t>
             </a:r>
           </a:p>
           <a:p>
             <a:r>
               <a:rPr lang="en-GB" dirty="0" smtClean="0"/>
-              <a:t>Provides a means for libraries and frameworks to accept additional kernels from third parties</a:t>
+              <a:t>On AMD platforms you can add </a:t>
+            </a:r>
+            <a:r>
+              <a:rPr lang="en-GB" b="1" dirty="0" smtClean="0">
+                <a:solidFill>
+                  <a:srgbClr val="3366FF"/>
+                </a:solidFill>
+                <a:latin typeface="Courier New"/>
+                <a:cs typeface="Courier New"/>
+              </a:rPr>
+              <a:t>–save-temps</a:t>
+            </a:r>
+            <a:r>
+              <a:rPr lang="en-GB" dirty="0" smtClean="0"/>
+              <a:t> to the build options to generate </a:t>
+            </a:r>
+            <a:r>
+              <a:rPr lang="en-GB" b="1" dirty="0" smtClean="0">
+                <a:solidFill>
+                  <a:srgbClr val="3366FF"/>
+                </a:solidFill>
+                <a:latin typeface="Courier New"/>
+                <a:cs typeface="Courier New"/>
+              </a:rPr>
+              <a:t>.</a:t>
+            </a:r>
+            <a:r>
+              <a:rPr lang="en-GB" b="1" dirty="0" err="1" smtClean="0">
+                <a:solidFill>
+                  <a:srgbClr val="3366FF"/>
+                </a:solidFill>
+                <a:latin typeface="Courier New"/>
+                <a:cs typeface="Courier New"/>
+              </a:rPr>
+              <a:t>il</a:t>
+            </a:r>
+            <a:r>
+              <a:rPr lang="en-GB" b="1" dirty="0" smtClean="0">
+                <a:solidFill>
+                  <a:srgbClr val="3366FF"/>
+                </a:solidFill>
+              </a:rPr>
+              <a:t> </a:t>
+            </a:r>
+            <a:r>
+              <a:rPr lang="en-GB" dirty="0" smtClean="0"/>
+              <a:t>and </a:t>
+            </a:r>
+            <a:r>
+              <a:rPr lang="en-GB" b="1" dirty="0" smtClean="0">
+                <a:solidFill>
+                  <a:srgbClr val="3366FF"/>
+                </a:solidFill>
+                <a:latin typeface="Courier New"/>
+                <a:cs typeface="Courier New"/>
+              </a:rPr>
+              <a:t>.</a:t>
+            </a:r>
+            <a:r>
+              <a:rPr lang="en-GB" b="1" dirty="0" err="1" smtClean="0">
+                <a:solidFill>
+                  <a:srgbClr val="3366FF"/>
+                </a:solidFill>
+                <a:latin typeface="Courier New"/>
+                <a:cs typeface="Courier New"/>
+              </a:rPr>
+              <a:t>isa</a:t>
+            </a:r>
+            <a:r>
+              <a:rPr lang="en-GB" dirty="0" smtClean="0"/>
+              <a:t> files containing the intermediate representation and native assembly code</a:t>
+            </a:r>
+          </a:p>
+          <a:p>
+            <a:r>
+              <a:rPr lang="en-GB" dirty="0" smtClean="0"/>
+              <a:t>Other vendors may provide an offline compiler which can generate LLVM/SPIR or assembly</a:t>
             </a:r>
             <a:endParaRPr lang="en-GB" dirty="0"/>
           </a:p>
@@ -5076,7 +5329,7 @@
     </p:spTree>
     <p:extLst>
       <p:ext uri="{BB962C8B-B14F-4D97-AF65-F5344CB8AC3E}">
-        <p14:creationId xmlns:p14="http://schemas.microsoft.com/office/powerpoint/2010/main" val="1504436268"/>
+        <p14:creationId xmlns:p14="http://schemas.microsoft.com/office/powerpoint/2010/main" val="1647771582"/>
       </p:ext>
     </p:extLst>
   </p:cSld>
@@ -5143,273 +5396,37 @@
             <p:ph idx="1"/>
           </p:nvPr>
         </p:nvSpPr>
-        <p:spPr>
-          <a:xfrm>
-            <a:off x="457200" y="1600200"/>
-            <a:ext cx="8686800" cy="4525963"/>
-          </a:xfrm>
-        </p:spPr>
+        <p:spPr/>
         <p:txBody>
           <a:bodyPr>
-            <a:normAutofit fontScale="85000" lnSpcReduction="10000"/>
+            <a:normAutofit/>
           </a:bodyPr>
           <a:lstStyle/>
           <a:p>
             <a:r>
               <a:rPr lang="en-GB" dirty="0" smtClean="0"/>
-              <a:t>We can query a program object for the names of all the kernels that it contains:</a:t>
-            </a:r>
-          </a:p>
-          <a:p>
-            <a:pPr marL="400050" lvl="1" indent="0">
-              <a:buNone/>
-            </a:pPr>
-            <a:r>
-              <a:rPr lang="en-GB" b="1" dirty="0" err="1">
-                <a:latin typeface="Courier New"/>
-                <a:cs typeface="Courier New"/>
-              </a:rPr>
-              <a:t>p</a:t>
-            </a:r>
-            <a:r>
-              <a:rPr lang="en-GB" b="1" dirty="0" err="1" smtClean="0">
-                <a:latin typeface="Courier New"/>
-                <a:cs typeface="Courier New"/>
-              </a:rPr>
-              <a:t>rogram.</a:t>
-            </a:r>
-            <a:r>
-              <a:rPr lang="en-GB" b="1" dirty="0" err="1" smtClean="0">
-                <a:solidFill>
-                  <a:srgbClr val="3366FF"/>
-                </a:solidFill>
-                <a:latin typeface="Courier New"/>
-                <a:cs typeface="Courier New"/>
-              </a:rPr>
-              <a:t>getInfo</a:t>
-            </a:r>
-            <a:r>
-              <a:rPr lang="en-GB" b="1" dirty="0">
-                <a:latin typeface="Courier New"/>
-                <a:cs typeface="Courier New"/>
-              </a:rPr>
-              <a:t>&lt;</a:t>
-            </a:r>
-            <a:r>
-              <a:rPr lang="en-GB" b="1" dirty="0" smtClean="0">
-                <a:latin typeface="Courier New"/>
-                <a:cs typeface="Courier New"/>
-              </a:rPr>
-              <a:t>CL_PROGRAM_NUM_KERNELS&gt;();</a:t>
-            </a:r>
-          </a:p>
-          <a:p>
-            <a:pPr marL="400050" lvl="1" indent="0">
-              <a:buNone/>
-            </a:pPr>
-            <a:r>
-              <a:rPr lang="en-GB" b="1" dirty="0" err="1">
-                <a:latin typeface="Courier New"/>
-                <a:cs typeface="Courier New"/>
-              </a:rPr>
-              <a:t>program.</a:t>
-            </a:r>
-            <a:r>
-              <a:rPr lang="en-GB" b="1" dirty="0" err="1">
-                <a:solidFill>
-                  <a:srgbClr val="3366FF"/>
-                </a:solidFill>
-                <a:latin typeface="Courier New"/>
-                <a:cs typeface="Courier New"/>
-              </a:rPr>
-              <a:t>getInfo</a:t>
-            </a:r>
-            <a:r>
-              <a:rPr lang="en-GB" b="1" dirty="0" smtClean="0">
-                <a:latin typeface="Courier New"/>
-                <a:cs typeface="Courier New"/>
-              </a:rPr>
-              <a:t>&lt;CL_PROGRAM_KERNEL_NAMES&gt;(</a:t>
-            </a:r>
-            <a:r>
-              <a:rPr lang="en-GB" b="1" dirty="0">
-                <a:latin typeface="Courier New"/>
-                <a:cs typeface="Courier New"/>
-              </a:rPr>
-              <a:t>)</a:t>
-            </a:r>
-            <a:r>
-              <a:rPr lang="en-GB" b="1" dirty="0" smtClean="0">
-                <a:latin typeface="Courier New"/>
-                <a:cs typeface="Courier New"/>
-              </a:rPr>
-              <a:t>;</a:t>
+              <a:t>This provides a mechanism for automatically discovering and using new kernels, without having to write any new host code</a:t>
             </a:r>
           </a:p>
           <a:p>
             <a:r>
               <a:rPr lang="en-GB" dirty="0" smtClean="0"/>
-              <a:t>We can also query information about kernel arguments (</a:t>
-            </a:r>
-            <a:r>
-              <a:rPr lang="en-GB" dirty="0" err="1" smtClean="0"/>
-              <a:t>OpenCL</a:t>
-            </a:r>
+              <a:t>Can make it much easier to add new kernels to an existing application</a:t>
+            </a:r>
+          </a:p>
+          <a:p>
             <a:r>
               <a:rPr lang="en-GB" dirty="0" smtClean="0"/>
-              <a:t> 1.2):</a:t>
-            </a:r>
-          </a:p>
-          <a:p>
-            <a:pPr marL="400050" lvl="1" indent="0">
-              <a:buNone/>
-            </a:pPr>
-            <a:r>
-              <a:rPr lang="en-GB" b="1" dirty="0" err="1">
-                <a:latin typeface="Courier New"/>
-                <a:cs typeface="Courier New"/>
-              </a:rPr>
-              <a:t>k</a:t>
-            </a:r>
-            <a:r>
-              <a:rPr lang="en-GB" b="1" dirty="0" err="1" smtClean="0">
-                <a:latin typeface="Courier New"/>
-                <a:cs typeface="Courier New"/>
-              </a:rPr>
-              <a:t>ernel.</a:t>
-            </a:r>
-            <a:r>
-              <a:rPr lang="en-GB" b="1" dirty="0" err="1" smtClean="0">
-                <a:solidFill>
-                  <a:srgbClr val="3366FF"/>
-                </a:solidFill>
-                <a:latin typeface="Courier New"/>
-                <a:cs typeface="Courier New"/>
-              </a:rPr>
-              <a:t>getInfo</a:t>
-            </a:r>
-            <a:r>
-              <a:rPr lang="en-GB" b="1" dirty="0" smtClean="0">
-                <a:latin typeface="Courier New"/>
-                <a:cs typeface="Courier New"/>
-              </a:rPr>
-              <a:t>&lt;CL_KERNEL_NUM_ARGS&gt;();</a:t>
-            </a:r>
-          </a:p>
-          <a:p>
-            <a:pPr marL="400050" lvl="1" indent="0">
-              <a:buNone/>
-            </a:pPr>
-            <a:r>
-              <a:rPr lang="en-GB" b="1" dirty="0" err="1">
-                <a:latin typeface="Courier New"/>
-                <a:cs typeface="Courier New"/>
-              </a:rPr>
-              <a:t>k</a:t>
-            </a:r>
-            <a:r>
-              <a:rPr lang="en-GB" b="1" dirty="0" err="1" smtClean="0">
-                <a:latin typeface="Courier New"/>
-                <a:cs typeface="Courier New"/>
-              </a:rPr>
-              <a:t>ernel.</a:t>
-            </a:r>
-            <a:r>
-              <a:rPr lang="en-GB" b="1" dirty="0" err="1" smtClean="0">
-                <a:solidFill>
-                  <a:srgbClr val="3366FF"/>
-                </a:solidFill>
-                <a:latin typeface="Courier New"/>
-                <a:cs typeface="Courier New"/>
-              </a:rPr>
-              <a:t>getArgInfo</a:t>
-            </a:r>
-            <a:r>
-              <a:rPr lang="en-GB" b="1" dirty="0" smtClean="0">
-                <a:latin typeface="Courier New"/>
-                <a:cs typeface="Courier New"/>
-              </a:rPr>
-              <a:t>&lt;CL_KERNEL_ARG_*&gt;();</a:t>
-            </a:r>
-          </a:p>
-          <a:p>
-            <a:pPr marL="0" indent="0">
-              <a:buNone/>
-            </a:pPr>
-            <a:r>
-              <a:rPr lang="en-GB" dirty="0" smtClean="0">
-                <a:latin typeface="Trebuchet MS"/>
-                <a:cs typeface="Trebuchet MS"/>
-              </a:rPr>
-              <a:t>	(the program should be compiled using the</a:t>
-            </a:r>
-          </a:p>
-          <a:p>
-            <a:pPr marL="0" indent="0">
-              <a:buNone/>
-            </a:pPr>
-            <a:r>
-              <a:rPr lang="en-GB" b="1" dirty="0" smtClean="0">
-                <a:solidFill>
-                  <a:srgbClr val="3366FF"/>
-                </a:solidFill>
-                <a:latin typeface="Courier New"/>
-                <a:cs typeface="Courier New"/>
-              </a:rPr>
-              <a:t>	-cl-kernel-</a:t>
-            </a:r>
-            <a:r>
-              <a:rPr lang="en-GB" b="1" dirty="0" err="1" smtClean="0">
-                <a:solidFill>
-                  <a:srgbClr val="3366FF"/>
-                </a:solidFill>
-                <a:latin typeface="Courier New"/>
-                <a:cs typeface="Courier New"/>
-              </a:rPr>
-              <a:t>arg</a:t>
-            </a:r>
-            <a:r>
-              <a:rPr lang="en-GB" b="1" dirty="0" smtClean="0">
-                <a:solidFill>
-                  <a:srgbClr val="3366FF"/>
-                </a:solidFill>
-                <a:latin typeface="Courier New"/>
-                <a:cs typeface="Courier New"/>
-              </a:rPr>
-              <a:t>-info </a:t>
-            </a:r>
-            <a:r>
-              <a:rPr lang="en-GB" dirty="0" smtClean="0">
-                <a:solidFill>
-                  <a:srgbClr val="000000"/>
-                </a:solidFill>
-                <a:latin typeface="Trebuchet MS"/>
-                <a:cs typeface="Trebuchet MS"/>
-              </a:rPr>
-              <a:t>option</a:t>
-            </a:r>
-            <a:r>
-              <a:rPr lang="en-GB" dirty="0" smtClean="0">
-                <a:solidFill>
-                  <a:srgbClr val="000000"/>
-                </a:solidFill>
-                <a:cs typeface="Courier New"/>
-              </a:rPr>
-              <a:t>)</a:t>
-            </a:r>
-            <a:endParaRPr lang="en-GB" dirty="0">
-              <a:solidFill>
-                <a:srgbClr val="3366FF"/>
-              </a:solidFill>
-              <a:cs typeface="Courier New"/>
-            </a:endParaRPr>
+              <a:t>Provides a means for libraries and frameworks to accept additional kernels from third parties</a:t>
+            </a:r>
+            <a:endParaRPr lang="en-GB" dirty="0"/>
           </a:p>
         </p:txBody>
       </p:sp>
     </p:spTree>
     <p:extLst>
       <p:ext uri="{BB962C8B-B14F-4D97-AF65-F5344CB8AC3E}">
-        <p14:creationId xmlns:p14="http://schemas.microsoft.com/office/powerpoint/2010/main" val="3954401298"/>
+        <p14:creationId xmlns:p14="http://schemas.microsoft.com/office/powerpoint/2010/main" val="1504436268"/>
       </p:ext>
     </p:extLst>
   </p:cSld>
@@ -5455,6 +5472,339 @@
         </p:nvSpPr>
         <p:spPr/>
         <p:txBody>
+          <a:bodyPr/>
+          <a:lstStyle/>
+          <a:p>
+            <a:r>
+              <a:rPr lang="en-GB" dirty="0" smtClean="0"/>
+              <a:t>Kernel Introspection</a:t>
+            </a:r>
+            <a:endParaRPr lang="en-GB" dirty="0"/>
+          </a:p>
+        </p:txBody>
+      </p:sp>
+      <p:sp>
+        <p:nvSpPr>
+          <p:cNvPr id="3" name="Content Placeholder 2"/>
+          <p:cNvSpPr>
+            <a:spLocks noGrp="1"/>
+          </p:cNvSpPr>
+          <p:nvPr>
+            <p:ph idx="1"/>
+          </p:nvPr>
+        </p:nvSpPr>
+        <p:spPr>
+          <a:xfrm>
+            <a:off x="457200" y="1600200"/>
+            <a:ext cx="8686800" cy="4525963"/>
+          </a:xfrm>
+        </p:spPr>
+        <p:txBody>
+          <a:bodyPr>
+            <a:normAutofit fontScale="85000" lnSpcReduction="10000"/>
+          </a:bodyPr>
+          <a:lstStyle/>
+          <a:p>
+            <a:r>
+              <a:rPr lang="en-GB" dirty="0" smtClean="0"/>
+              <a:t>We can query a program object for the names of all the kernels that it contains:</a:t>
+            </a:r>
+          </a:p>
+          <a:p>
+            <a:pPr marL="400050" lvl="1" indent="0">
+              <a:buNone/>
+            </a:pPr>
+            <a:r>
+              <a:rPr lang="en-GB" b="1" dirty="0" err="1">
+                <a:latin typeface="Courier New"/>
+                <a:cs typeface="Courier New"/>
+              </a:rPr>
+              <a:t>p</a:t>
+            </a:r>
+            <a:r>
+              <a:rPr lang="en-GB" b="1" dirty="0" err="1" smtClean="0">
+                <a:latin typeface="Courier New"/>
+                <a:cs typeface="Courier New"/>
+              </a:rPr>
+              <a:t>rogram.</a:t>
+            </a:r>
+            <a:r>
+              <a:rPr lang="en-GB" b="1" dirty="0" err="1" smtClean="0">
+                <a:solidFill>
+                  <a:srgbClr val="3366FF"/>
+                </a:solidFill>
+                <a:latin typeface="Courier New"/>
+                <a:cs typeface="Courier New"/>
+              </a:rPr>
+              <a:t>getInfo</a:t>
+            </a:r>
+            <a:r>
+              <a:rPr lang="en-GB" b="1" dirty="0">
+                <a:latin typeface="Courier New"/>
+                <a:cs typeface="Courier New"/>
+              </a:rPr>
+              <a:t>&lt;</a:t>
+            </a:r>
+            <a:r>
+              <a:rPr lang="en-GB" b="1" dirty="0" smtClean="0">
+                <a:latin typeface="Courier New"/>
+                <a:cs typeface="Courier New"/>
+              </a:rPr>
+              <a:t>CL_PROGRAM_NUM_KERNELS&gt;();</a:t>
+            </a:r>
+          </a:p>
+          <a:p>
+            <a:pPr marL="400050" lvl="1" indent="0">
+              <a:buNone/>
+            </a:pPr>
+            <a:r>
+              <a:rPr lang="en-GB" b="1" dirty="0" err="1">
+                <a:latin typeface="Courier New"/>
+                <a:cs typeface="Courier New"/>
+              </a:rPr>
+              <a:t>program.</a:t>
+            </a:r>
+            <a:r>
+              <a:rPr lang="en-GB" b="1" dirty="0" err="1">
+                <a:solidFill>
+                  <a:srgbClr val="3366FF"/>
+                </a:solidFill>
+                <a:latin typeface="Courier New"/>
+                <a:cs typeface="Courier New"/>
+              </a:rPr>
+              <a:t>getInfo</a:t>
+            </a:r>
+            <a:r>
+              <a:rPr lang="en-GB" b="1" dirty="0" smtClean="0">
+                <a:latin typeface="Courier New"/>
+                <a:cs typeface="Courier New"/>
+              </a:rPr>
+              <a:t>&lt;CL_PROGRAM_KERNEL_NAMES&gt;(</a:t>
+            </a:r>
+            <a:r>
+              <a:rPr lang="en-GB" b="1" dirty="0">
+                <a:latin typeface="Courier New"/>
+                <a:cs typeface="Courier New"/>
+              </a:rPr>
+              <a:t>)</a:t>
+            </a:r>
+            <a:r>
+              <a:rPr lang="en-GB" b="1" dirty="0" smtClean="0">
+                <a:latin typeface="Courier New"/>
+                <a:cs typeface="Courier New"/>
+              </a:rPr>
+              <a:t>;</a:t>
+            </a:r>
+          </a:p>
+          <a:p>
+            <a:r>
+              <a:rPr lang="en-GB" dirty="0" smtClean="0"/>
+              <a:t>We can also query information about kernel arguments (</a:t>
+            </a:r>
+            <a:r>
+              <a:rPr lang="en-GB" dirty="0" err="1" smtClean="0"/>
+              <a:t>OpenCL</a:t>
+            </a:r>
+            <a:r>
+              <a:rPr lang="en-GB" dirty="0" smtClean="0"/>
+              <a:t> 1.2):</a:t>
+            </a:r>
+          </a:p>
+          <a:p>
+            <a:pPr marL="400050" lvl="1" indent="0">
+              <a:buNone/>
+            </a:pPr>
+            <a:r>
+              <a:rPr lang="en-GB" b="1" dirty="0" err="1">
+                <a:latin typeface="Courier New"/>
+                <a:cs typeface="Courier New"/>
+              </a:rPr>
+              <a:t>k</a:t>
+            </a:r>
+            <a:r>
+              <a:rPr lang="en-GB" b="1" dirty="0" err="1" smtClean="0">
+                <a:latin typeface="Courier New"/>
+                <a:cs typeface="Courier New"/>
+              </a:rPr>
+              <a:t>ernel.</a:t>
+            </a:r>
+            <a:r>
+              <a:rPr lang="en-GB" b="1" dirty="0" err="1" smtClean="0">
+                <a:solidFill>
+                  <a:srgbClr val="3366FF"/>
+                </a:solidFill>
+                <a:latin typeface="Courier New"/>
+                <a:cs typeface="Courier New"/>
+              </a:rPr>
+              <a:t>getInfo</a:t>
+            </a:r>
+            <a:r>
+              <a:rPr lang="en-GB" b="1" dirty="0" smtClean="0">
+                <a:latin typeface="Courier New"/>
+                <a:cs typeface="Courier New"/>
+              </a:rPr>
+              <a:t>&lt;CL_KERNEL_NUM_ARGS&gt;();</a:t>
+            </a:r>
+          </a:p>
+          <a:p>
+            <a:pPr marL="400050" lvl="1" indent="0">
+              <a:buNone/>
+            </a:pPr>
+            <a:r>
+              <a:rPr lang="en-GB" b="1" dirty="0" err="1">
+                <a:latin typeface="Courier New"/>
+                <a:cs typeface="Courier New"/>
+              </a:rPr>
+              <a:t>k</a:t>
+            </a:r>
+            <a:r>
+              <a:rPr lang="en-GB" b="1" dirty="0" err="1" smtClean="0">
+                <a:latin typeface="Courier New"/>
+                <a:cs typeface="Courier New"/>
+              </a:rPr>
+              <a:t>ernel.</a:t>
+            </a:r>
+            <a:r>
+              <a:rPr lang="en-GB" b="1" dirty="0" err="1" smtClean="0">
+                <a:solidFill>
+                  <a:srgbClr val="3366FF"/>
+                </a:solidFill>
+                <a:latin typeface="Courier New"/>
+                <a:cs typeface="Courier New"/>
+              </a:rPr>
+              <a:t>getArgInfo</a:t>
+            </a:r>
+            <a:r>
+              <a:rPr lang="en-GB" b="1" dirty="0" smtClean="0">
+                <a:latin typeface="Courier New"/>
+                <a:cs typeface="Courier New"/>
+              </a:rPr>
+              <a:t>&lt;CL_KERNEL_ARG_*&gt;();</a:t>
+            </a:r>
+          </a:p>
+          <a:p>
+            <a:pPr marL="0" indent="0">
+              <a:buNone/>
+            </a:pPr>
+            <a:r>
+              <a:rPr lang="en-GB" dirty="0" smtClean="0">
+                <a:latin typeface="Trebuchet MS"/>
+                <a:cs typeface="Trebuchet MS"/>
+              </a:rPr>
+              <a:t>	(the program should be compiled using the</a:t>
+            </a:r>
+          </a:p>
+          <a:p>
+            <a:pPr marL="0" indent="0">
+              <a:buNone/>
+            </a:pPr>
+            <a:r>
+              <a:rPr lang="en-GB" b="1" dirty="0" smtClean="0">
+                <a:solidFill>
+                  <a:srgbClr val="3366FF"/>
+                </a:solidFill>
+                <a:latin typeface="Courier New"/>
+                <a:cs typeface="Courier New"/>
+              </a:rPr>
+              <a:t>	-cl-kernel-</a:t>
+            </a:r>
+            <a:r>
+              <a:rPr lang="en-GB" b="1" dirty="0" err="1" smtClean="0">
+                <a:solidFill>
+                  <a:srgbClr val="3366FF"/>
+                </a:solidFill>
+                <a:latin typeface="Courier New"/>
+                <a:cs typeface="Courier New"/>
+              </a:rPr>
+              <a:t>arg</a:t>
+            </a:r>
+            <a:r>
+              <a:rPr lang="en-GB" b="1" dirty="0" smtClean="0">
+                <a:solidFill>
+                  <a:srgbClr val="3366FF"/>
+                </a:solidFill>
+                <a:latin typeface="Courier New"/>
+                <a:cs typeface="Courier New"/>
+              </a:rPr>
+              <a:t>-info </a:t>
+            </a:r>
+            <a:r>
+              <a:rPr lang="en-GB" dirty="0" smtClean="0">
+                <a:solidFill>
+                  <a:srgbClr val="000000"/>
+                </a:solidFill>
+                <a:latin typeface="Trebuchet MS"/>
+                <a:cs typeface="Trebuchet MS"/>
+              </a:rPr>
+              <a:t>option</a:t>
+            </a:r>
+            <a:r>
+              <a:rPr lang="en-GB" dirty="0" smtClean="0">
+                <a:solidFill>
+                  <a:srgbClr val="000000"/>
+                </a:solidFill>
+                <a:cs typeface="Courier New"/>
+              </a:rPr>
+              <a:t>)</a:t>
+            </a:r>
+            <a:endParaRPr lang="en-GB" dirty="0">
+              <a:solidFill>
+                <a:srgbClr val="3366FF"/>
+              </a:solidFill>
+              <a:cs typeface="Courier New"/>
+            </a:endParaRPr>
+          </a:p>
+        </p:txBody>
+      </p:sp>
+    </p:spTree>
+    <p:extLst>
+      <p:ext uri="{BB962C8B-B14F-4D97-AF65-F5344CB8AC3E}">
+        <p14:creationId xmlns:p14="http://schemas.microsoft.com/office/powerpoint/2010/main" val="3954401298"/>
+      </p:ext>
+    </p:extLst>
+  </p:cSld>
+  <p:clrMapOvr>
+    <a:masterClrMapping/>
+  </p:clrMapOvr>
+  <p:timing>
+    <p:tnLst>
+      <p:par>
+        <p:cTn xmlns:p14="http://schemas.microsoft.com/office/powerpoint/2010/main" id="1" dur="indefinite" restart="never" nodeType="tmRoot"/>
+      </p:par>
+    </p:tnLst>
+  </p:timing>
+</p:sld>
+</file>
+
+<file path=ppt/slides/slide16.xml><?xml version="1.0" encoding="utf-8"?>
+<p:sld xmlns:a="http://schemas.openxmlformats.org/drawingml/2006/main" xmlns:r="http://schemas.openxmlformats.org/officeDocument/2006/relationships" xmlns:p="http://schemas.openxmlformats.org/presentationml/2006/main">
+  <p:cSld>
+    <p:spTree>
+      <p:nvGrpSpPr>
+        <p:cNvPr id="1" name=""/>
+        <p:cNvGrpSpPr/>
+        <p:nvPr/>
+      </p:nvGrpSpPr>
+      <p:grpSpPr>
+        <a:xfrm>
+          <a:off x="0" y="0"/>
+          <a:ext cx="0" cy="0"/>
+          <a:chOff x="0" y="0"/>
+          <a:chExt cx="0" cy="0"/>
+        </a:xfrm>
+      </p:grpSpPr>
+      <p:sp>
+        <p:nvSpPr>
+          <p:cNvPr id="2" name="Title 1"/>
+          <p:cNvSpPr>
+            <a:spLocks noGrp="1"/>
+          </p:cNvSpPr>
+          <p:nvPr>
+            <p:ph type="title"/>
+          </p:nvPr>
+        </p:nvSpPr>
+        <p:spPr/>
+        <p:txBody>
           <a:bodyPr>
             <a:normAutofit/>
           </a:bodyPr>
@@ -5589,7 +5939,7 @@
 </p:sld>
 </file>
 
-<file path=ppt/slides/slide16.xml><?xml version="1.0" encoding="utf-8"?>
+<file path=ppt/slides/slide17.xml><?xml version="1.0" encoding="utf-8"?>
 <p:sld xmlns:a="http://schemas.openxmlformats.org/drawingml/2006/main" xmlns:r="http://schemas.openxmlformats.org/officeDocument/2006/relationships" xmlns:p="http://schemas.openxmlformats.org/presentationml/2006/main">
   <p:cSld>
     <p:spTree>
@@ -6120,260 +6470,6 @@
 </p:sld>
 </file>
 
-<file path=ppt/slides/slide17.xml><?xml version="1.0" encoding="utf-8"?>
-<p:sld xmlns:a="http://schemas.openxmlformats.org/drawingml/2006/main" xmlns:r="http://schemas.openxmlformats.org/officeDocument/2006/relationships" xmlns:p="http://schemas.openxmlformats.org/presentationml/2006/main">
-  <p:cSld>
-    <p:spTree>
-      <p:nvGrpSpPr>
-        <p:cNvPr id="1" name=""/>
-        <p:cNvGrpSpPr/>
-        <p:nvPr/>
-      </p:nvGrpSpPr>
-      <p:grpSpPr>
-        <a:xfrm>
-          <a:off x="0" y="0"/>
-          <a:ext cx="0" cy="0"/>
-          <a:chOff x="0" y="0"/>
-          <a:chExt cx="0" cy="0"/>
-        </a:xfrm>
-      </p:grpSpPr>
-      <p:sp>
-        <p:nvSpPr>
-          <p:cNvPr id="2" name="Title 1"/>
-          <p:cNvSpPr>
-            <a:spLocks noGrp="1"/>
-          </p:cNvSpPr>
-          <p:nvPr>
-            <p:ph type="title"/>
-          </p:nvPr>
-        </p:nvSpPr>
-        <p:spPr/>
-        <p:txBody>
-          <a:bodyPr/>
-          <a:lstStyle/>
-          <a:p>
-            <a:r>
-              <a:rPr lang="en-GB" dirty="0" smtClean="0"/>
-              <a:t>Compiler Flags</a:t>
-            </a:r>
-            <a:endParaRPr lang="en-GB" dirty="0"/>
-          </a:p>
-        </p:txBody>
-      </p:sp>
-      <p:sp>
-        <p:nvSpPr>
-          <p:cNvPr id="3" name="Content Placeholder 2"/>
-          <p:cNvSpPr>
-            <a:spLocks noGrp="1"/>
-          </p:cNvSpPr>
-          <p:nvPr>
-            <p:ph idx="1"/>
-          </p:nvPr>
-        </p:nvSpPr>
-        <p:spPr>
-          <a:xfrm>
-            <a:off x="457200" y="1600200"/>
-            <a:ext cx="8229600" cy="5069160"/>
-          </a:xfrm>
-        </p:spPr>
-        <p:txBody>
-          <a:bodyPr>
-            <a:normAutofit fontScale="85000" lnSpcReduction="20000"/>
-          </a:bodyPr>
-          <a:lstStyle/>
-          <a:p>
-            <a:pPr>
-              <a:lnSpc>
-                <a:spcPct val="110000"/>
-              </a:lnSpc>
-            </a:pPr>
-            <a:r>
-              <a:rPr lang="en-GB" dirty="0" smtClean="0"/>
-              <a:t>Vendors may expose additional flags to give further control over program compilation, but these will not be portable between different OpenCL platforms</a:t>
-            </a:r>
-          </a:p>
-          <a:p>
-            <a:pPr>
-              <a:lnSpc>
-                <a:spcPct val="110000"/>
-              </a:lnSpc>
-            </a:pPr>
-            <a:r>
-              <a:rPr lang="en-GB" dirty="0" smtClean="0"/>
-              <a:t>For example, NVIDIA provide the </a:t>
-            </a:r>
-            <a:r>
-              <a:rPr lang="en-GB" b="1" dirty="0" smtClean="0">
-                <a:solidFill>
-                  <a:srgbClr val="3366FF"/>
-                </a:solidFill>
-                <a:latin typeface="Courier New"/>
-                <a:cs typeface="Courier New"/>
-              </a:rPr>
-              <a:t>–cl-</a:t>
-            </a:r>
-            <a:r>
-              <a:rPr lang="en-GB" b="1" dirty="0" err="1" smtClean="0">
-                <a:solidFill>
-                  <a:srgbClr val="3366FF"/>
-                </a:solidFill>
-                <a:latin typeface="Courier New"/>
-                <a:cs typeface="Courier New"/>
-              </a:rPr>
-              <a:t>nv</a:t>
-            </a:r>
-            <a:r>
-              <a:rPr lang="en-GB" b="1" dirty="0" smtClean="0">
-                <a:solidFill>
-                  <a:srgbClr val="3366FF"/>
-                </a:solidFill>
-                <a:latin typeface="Courier New"/>
-                <a:cs typeface="Courier New"/>
-              </a:rPr>
-              <a:t>-arch</a:t>
-            </a:r>
-            <a:r>
-              <a:rPr lang="en-GB" dirty="0" smtClean="0"/>
-              <a:t> flag to specify which GPU architecture should be targeted, and </a:t>
-            </a:r>
-            <a:r>
-              <a:rPr lang="en-GB" b="1" dirty="0" smtClean="0">
-                <a:solidFill>
-                  <a:srgbClr val="3366FF"/>
-                </a:solidFill>
-                <a:latin typeface="Courier New"/>
-                <a:cs typeface="Courier New"/>
-              </a:rPr>
-              <a:t>–cl-</a:t>
-            </a:r>
-            <a:r>
-              <a:rPr lang="en-GB" b="1" dirty="0" err="1" smtClean="0">
-                <a:solidFill>
-                  <a:srgbClr val="3366FF"/>
-                </a:solidFill>
-                <a:latin typeface="Courier New"/>
-                <a:cs typeface="Courier New"/>
-              </a:rPr>
-              <a:t>nv</a:t>
-            </a:r>
-            <a:r>
-              <a:rPr lang="en-GB" b="1" dirty="0" smtClean="0">
-                <a:solidFill>
-                  <a:srgbClr val="3366FF"/>
-                </a:solidFill>
-                <a:latin typeface="Courier New"/>
-                <a:cs typeface="Courier New"/>
-              </a:rPr>
-              <a:t>-</a:t>
-            </a:r>
-            <a:r>
-              <a:rPr lang="en-GB" b="1" dirty="0" err="1" smtClean="0">
-                <a:solidFill>
-                  <a:srgbClr val="3366FF"/>
-                </a:solidFill>
-                <a:latin typeface="Courier New"/>
-                <a:cs typeface="Courier New"/>
-              </a:rPr>
-              <a:t>maxrregcount</a:t>
-            </a:r>
-            <a:r>
-              <a:rPr lang="en-GB" dirty="0" smtClean="0">
-                <a:latin typeface="Courier New"/>
-                <a:cs typeface="Courier New"/>
-              </a:rPr>
-              <a:t> </a:t>
-            </a:r>
-            <a:r>
-              <a:rPr lang="en-GB" dirty="0" smtClean="0"/>
-              <a:t>to limit the number of registers used</a:t>
-            </a:r>
-          </a:p>
-          <a:p>
-            <a:pPr>
-              <a:lnSpc>
-                <a:spcPct val="110000"/>
-              </a:lnSpc>
-            </a:pPr>
-            <a:r>
-              <a:rPr lang="en-GB" dirty="0" smtClean="0"/>
-              <a:t>Some vendors support </a:t>
-            </a:r>
-            <a:r>
-              <a:rPr lang="en-GB" b="1" dirty="0" smtClean="0">
-                <a:solidFill>
-                  <a:srgbClr val="3366FF"/>
-                </a:solidFill>
-                <a:latin typeface="Courier New"/>
-                <a:cs typeface="Courier New"/>
-              </a:rPr>
-              <a:t>–O</a:t>
-            </a:r>
-            <a:r>
-              <a:rPr lang="en-GB" b="1" i="1" dirty="0" smtClean="0">
-                <a:solidFill>
-                  <a:srgbClr val="3366FF"/>
-                </a:solidFill>
-                <a:latin typeface="Courier New"/>
-                <a:cs typeface="Courier New"/>
-              </a:rPr>
-              <a:t>n</a:t>
-            </a:r>
-            <a:r>
-              <a:rPr lang="en-GB" dirty="0" smtClean="0"/>
-              <a:t> </a:t>
-            </a:r>
-            <a:r>
-              <a:rPr lang="en-GB" dirty="0"/>
-              <a:t>f</a:t>
-            </a:r>
-            <a:r>
-              <a:rPr lang="en-GB" dirty="0" smtClean="0"/>
-              <a:t>lags to control the optimization level </a:t>
-            </a:r>
-          </a:p>
-          <a:p>
-            <a:pPr>
-              <a:lnSpc>
-                <a:spcPct val="110000"/>
-              </a:lnSpc>
-            </a:pPr>
-            <a:r>
-              <a:rPr lang="en-GB" dirty="0" smtClean="0"/>
-              <a:t>AMD allow additional build options to be dynamically added using an environment variable: </a:t>
-            </a:r>
-            <a:r>
-              <a:rPr lang="en-GB" b="1" dirty="0">
-                <a:solidFill>
-                  <a:srgbClr val="3366FF"/>
-                </a:solidFill>
-                <a:latin typeface="Courier New"/>
-                <a:cs typeface="Courier New"/>
-              </a:rPr>
-              <a:t>AMD_OCL_BUILD_OPTIONS_APPEND</a:t>
-            </a:r>
-          </a:p>
-        </p:txBody>
-      </p:sp>
-    </p:spTree>
-    <p:extLst>
-      <p:ext uri="{BB962C8B-B14F-4D97-AF65-F5344CB8AC3E}">
-        <p14:creationId xmlns:p14="http://schemas.microsoft.com/office/powerpoint/2010/main" val="803196001"/>
-      </p:ext>
-    </p:extLst>
-  </p:cSld>
-  <p:clrMapOvr>
-    <a:masterClrMapping/>
-  </p:clrMapOvr>
-  <p:timing>
-    <p:tnLst>
-      <p:par>
-        <p:cTn xmlns:p14="http://schemas.microsoft.com/office/powerpoint/2010/main" id="1" dur="indefinite" restart="never" nodeType="tmRoot"/>
-      </p:par>
-    </p:tnLst>
-  </p:timing>
-</p:sld>
-</file>
-
 <file path=ppt/slides/slide18.xml><?xml version="1.0" encoding="utf-8"?>
 <p:sld xmlns:a="http://schemas.openxmlformats.org/drawingml/2006/main" xmlns:r="http://schemas.openxmlformats.org/officeDocument/2006/relationships" xmlns:p="http://schemas.openxmlformats.org/presentationml/2006/main">
   <p:cSld>
@@ -6393,7 +6489,7 @@
       </p:grpSpPr>
       <p:sp>
         <p:nvSpPr>
-          <p:cNvPr id="4" name="Title 3"/>
+          <p:cNvPr id="2" name="Title 1"/>
           <p:cNvSpPr>
             <a:spLocks noGrp="1"/>
           </p:cNvSpPr>
@@ -6407,12 +6503,8 @@
           <a:lstStyle/>
           <a:p>
             <a:r>
-              <a:rPr lang="en-GB" smtClean="0"/>
-              <a:t>Other compilation </a:t>
-            </a:r>
-            <a:r>
               <a:rPr lang="en-GB" dirty="0" smtClean="0"/>
-              <a:t>hints</a:t>
+              <a:t>Compiler Flags</a:t>
             </a:r>
             <a:endParaRPr lang="en-GB" dirty="0"/>
           </a:p>
@@ -6420,7 +6512,7 @@
       </p:sp>
       <p:sp>
         <p:nvSpPr>
-          <p:cNvPr id="5" name="Content Placeholder 4"/>
+          <p:cNvPr id="3" name="Content Placeholder 2"/>
           <p:cNvSpPr>
             <a:spLocks noGrp="1"/>
           </p:cNvSpPr>
@@ -6428,70 +6520,47 @@
             <p:ph idx="1"/>
           </p:nvPr>
         </p:nvSpPr>
-        <p:spPr/>
+        <p:spPr>
+          <a:xfrm>
+            <a:off x="457200" y="1600200"/>
+            <a:ext cx="8229600" cy="5069160"/>
+          </a:xfrm>
+        </p:spPr>
         <p:txBody>
           <a:bodyPr>
-            <a:normAutofit fontScale="92500"/>
+            <a:normAutofit fontScale="85000" lnSpcReduction="20000"/>
           </a:bodyPr>
           <a:lstStyle/>
           <a:p>
             <a:pPr>
               <a:lnSpc>
-                <a:spcPct val="120000"/>
+                <a:spcPct val="110000"/>
               </a:lnSpc>
             </a:pPr>
             <a:r>
               <a:rPr lang="en-GB" dirty="0" smtClean="0"/>
-              <a:t>Can use an attribute to inform the compiler of the work-group size that you intend to launch kernels with:</a:t>
-            </a:r>
-          </a:p>
-          <a:p>
-            <a:pPr marL="457200" lvl="1" indent="0">
-              <a:lnSpc>
-                <a:spcPct val="120000"/>
-              </a:lnSpc>
-              <a:buNone/>
-            </a:pPr>
-            <a:r>
-              <a:rPr lang="en-GB" sz="2200" b="1" dirty="0" smtClean="0">
-                <a:solidFill>
-                  <a:srgbClr val="3366FF"/>
-                </a:solidFill>
-                <a:latin typeface="Courier New"/>
-                <a:cs typeface="Courier New"/>
-              </a:rPr>
-              <a:t>__attribute__((</a:t>
-            </a:r>
-            <a:r>
-              <a:rPr lang="en-GB" sz="2200" b="1" dirty="0" err="1" smtClean="0">
-                <a:solidFill>
-                  <a:srgbClr val="3366FF"/>
-                </a:solidFill>
-                <a:latin typeface="Courier New"/>
-                <a:cs typeface="Courier New"/>
-              </a:rPr>
-              <a:t>reqd_work_group_size</a:t>
-            </a:r>
-            <a:r>
-              <a:rPr lang="en-GB" sz="2200" b="1" dirty="0" smtClean="0">
-                <a:solidFill>
-                  <a:srgbClr val="3366FF"/>
-                </a:solidFill>
-                <a:latin typeface="Courier New"/>
-                <a:cs typeface="Courier New"/>
-              </a:rPr>
-              <a:t>(x, y, z)))</a:t>
+              <a:t>Vendors may expose additional flags to give further control over program compilation, but these will not be portable between different OpenCL platforms</a:t>
             </a:r>
           </a:p>
           <a:p>
             <a:pPr>
               <a:lnSpc>
-                <a:spcPct val="120000"/>
+                <a:spcPct val="110000"/>
               </a:lnSpc>
             </a:pPr>
             <a:r>
               <a:rPr lang="en-GB" dirty="0" smtClean="0"/>
-              <a:t>As with C/C++, use the </a:t>
+              <a:t>For example, NVIDIA provide the </a:t>
+            </a:r>
+            <a:r>
+              <a:rPr lang="en-GB" b="1" dirty="0" smtClean="0">
+                <a:solidFill>
+                  <a:srgbClr val="3366FF"/>
+                </a:solidFill>
+                <a:latin typeface="Courier New"/>
+                <a:cs typeface="Courier New"/>
+              </a:rPr>
+              <a:t>–cl-</a:t>
             </a:r>
             <a:r>
               <a:rPr lang="en-GB" b="1" dirty="0" err="1" smtClean="0">
@@ -6501,11 +6570,21 @@
                 <a:latin typeface="Courier New"/>
                 <a:cs typeface="Courier New"/>
               </a:rPr>
-              <a:t>const</a:t>
+              <a:t>nv</a:t>
+            </a:r>
+            <a:r>
+              <a:rPr lang="en-GB" b="1" dirty="0" smtClean="0">
+                <a:solidFill>
+                  <a:srgbClr val="3366FF"/>
+                </a:solidFill>
+                <a:latin typeface="Courier New"/>
+                <a:cs typeface="Courier New"/>
+              </a:rPr>
+              <a:t>-arch</a:t>
             </a:r>
             <a:r>
               <a:rPr lang="en-GB" dirty="0" smtClean="0"/>
-              <a:t>/</a:t>
+              <a:t> flag to specify which GPU architecture should be targeted, and </a:t>
             </a:r>
             <a:r>
               <a:rPr lang="en-GB" b="1" dirty="0" smtClean="0">
@@ -6515,19 +6594,112 @@
                 <a:latin typeface="Courier New"/>
                 <a:cs typeface="Courier New"/>
               </a:rPr>
-              <a:t>restrict</a:t>
+              <a:t>–cl-</a:t>
+            </a:r>
+            <a:r>
+              <a:rPr lang="en-GB" b="1" dirty="0" err="1" smtClean="0">
+                <a:solidFill>
+                  <a:srgbClr val="3366FF"/>
+                </a:solidFill>
+                <a:latin typeface="Courier New"/>
+                <a:cs typeface="Courier New"/>
+              </a:rPr>
+              <a:t>nv</a:t>
+            </a:r>
+            <a:r>
+              <a:rPr lang="en-GB" b="1" dirty="0" smtClean="0">
+                <a:solidFill>
+                  <a:srgbClr val="3366FF"/>
+                </a:solidFill>
+                <a:latin typeface="Courier New"/>
+                <a:cs typeface="Courier New"/>
+              </a:rPr>
+              <a:t>-</a:t>
+            </a:r>
+            <a:r>
+              <a:rPr lang="en-GB" b="1" dirty="0" err="1" smtClean="0">
+                <a:solidFill>
+                  <a:srgbClr val="3366FF"/>
+                </a:solidFill>
+                <a:latin typeface="Courier New"/>
+                <a:cs typeface="Courier New"/>
+              </a:rPr>
+              <a:t>maxrregcount</a:t>
             </a:r>
             <a:r>
               <a:rPr lang="en-GB" dirty="0" smtClean="0">
+                <a:latin typeface="Courier New"/>
+                <a:cs typeface="Courier New"/>
+              </a:rPr>
+              <a:t> </a:t>
+            </a:r>
+            <a:r>
+              <a:rPr lang="en-GB" dirty="0" smtClean="0"/>
+              <a:t>to limit the number of registers used</a:t>
+            </a:r>
+          </a:p>
+          <a:p>
+            <a:pPr>
+              <a:lnSpc>
+                <a:spcPct val="110000"/>
+              </a:lnSpc>
+            </a:pPr>
+            <a:r>
+              <a:rPr lang="en-GB" dirty="0" smtClean="0"/>
+              <a:t>Some vendors support </a:t>
+            </a:r>
+            <a:r>
+              <a:rPr lang="en-GB" b="1" dirty="0" smtClean="0">
                 <a:solidFill>
                   <a:srgbClr val="3366FF"/>
                 </a:solidFill>
-              </a:rPr>
+                <a:latin typeface="Courier New"/>
+                <a:cs typeface="Courier New"/>
+              </a:rPr>
+              <a:t>–O</a:t>
+            </a:r>
+            <a:r>
+              <a:rPr lang="en-GB" b="1" i="1" dirty="0" smtClean="0">
+                <a:solidFill>
+                  <a:srgbClr val="3366FF"/>
+                </a:solidFill>
+                <a:latin typeface="Courier New"/>
+                <a:cs typeface="Courier New"/>
+              </a:rPr>
+              <a:t>n</a:t>
+            </a:r>
+            <a:r>
+              <a:rPr lang="en-GB" dirty="0" smtClean="0"/>
               <a:t> </a:t>
             </a:r>
             <a:r>
+              <a:rPr lang="en-GB" dirty="0"/>
+              <a:t>f</a:t>
+            </a:r>
+            <a:r>
               <a:rPr lang="en-GB" dirty="0" smtClean="0"/>
-              <a:t>keywords for kernel arguments where appropriate to make sure the compiler can optimise memory accesses</a:t>
+              <a:t>lags to control the optimization level </a:t>
+            </a:r>
+          </a:p>
+          <a:p>
+            <a:pPr>
+              <a:lnSpc>
+                <a:spcPct val="110000"/>
+              </a:lnSpc>
+            </a:pPr>
+            <a:r>
+              <a:rPr lang="en-GB" dirty="0" smtClean="0"/>
+              <a:t>AMD allow additional build options to be dynamically added using an environment variable: </a:t>
+            </a:r>
+            <a:r>
+              <a:rPr lang="en-GB" b="1" dirty="0">
+                <a:solidFill>
+                  <a:srgbClr val="3366FF"/>
+                </a:solidFill>
+                <a:latin typeface="Courier New"/>
+                <a:cs typeface="Courier New"/>
+              </a:rPr>
+              <a:t>AMD_OCL_BUILD_OPTIONS_APPEND</a:t>
             </a:r>
           </a:p>
         </p:txBody>
@@ -6535,7 +6707,7 @@
     </p:spTree>
     <p:extLst>
       <p:ext uri="{BB962C8B-B14F-4D97-AF65-F5344CB8AC3E}">
-        <p14:creationId xmlns:p14="http://schemas.microsoft.com/office/powerpoint/2010/main" val="1138100201"/>
+        <p14:creationId xmlns:p14="http://schemas.microsoft.com/office/powerpoint/2010/main" val="803196001"/>
       </p:ext>
     </p:extLst>
   </p:cSld>
@@ -6571,7 +6743,7 @@
       </p:grpSpPr>
       <p:sp>
         <p:nvSpPr>
-          <p:cNvPr id="2" name="Title 1"/>
+          <p:cNvPr id="4" name="Title 3"/>
           <p:cNvSpPr>
             <a:spLocks noGrp="1"/>
           </p:cNvSpPr>
@@ -6585,8 +6757,12 @@
           <a:lstStyle/>
           <a:p>
             <a:r>
-              <a:rPr lang="en-GB" dirty="0" err="1" smtClean="0"/>
-              <a:t>Metaprogramming</a:t>
+              <a:rPr lang="en-GB" smtClean="0"/>
+              <a:t>Other compilation </a:t>
+            </a:r>
+            <a:r>
+              <a:rPr lang="en-GB" dirty="0" smtClean="0"/>
+              <a:t>hints</a:t>
             </a:r>
             <a:endParaRPr lang="en-GB" dirty="0"/>
           </a:p>
@@ -6594,7 +6770,7 @@
       </p:sp>
       <p:sp>
         <p:nvSpPr>
-          <p:cNvPr id="3" name="Content Placeholder 2"/>
+          <p:cNvPr id="5" name="Content Placeholder 4"/>
           <p:cNvSpPr>
             <a:spLocks noGrp="1"/>
           </p:cNvSpPr>
@@ -6605,121 +6781,111 @@
         <p:spPr/>
         <p:txBody>
           <a:bodyPr>
-            <a:normAutofit lnSpcReduction="10000"/>
+            <a:normAutofit fontScale="92500"/>
           </a:bodyPr>
           <a:lstStyle/>
           <a:p>
+            <a:pPr>
+              <a:lnSpc>
+                <a:spcPct val="120000"/>
+              </a:lnSpc>
+            </a:pPr>
             <a:r>
               <a:rPr lang="en-GB" dirty="0" smtClean="0"/>
-              <a:t>We can exploit runtime compilation to embed values that are only known at runtime into kernels as compile-time constants</a:t>
-            </a:r>
-          </a:p>
-          <a:p>
+              <a:t>Can use an attribute to inform the compiler of the work-group size that you intend to launch kernels with:</a:t>
+            </a:r>
+          </a:p>
+          <a:p>
+            <a:pPr marL="457200" lvl="1" indent="0">
+              <a:lnSpc>
+                <a:spcPct val="120000"/>
+              </a:lnSpc>
+              <a:buNone/>
+            </a:pPr>
+            <a:r>
+              <a:rPr lang="en-GB" sz="2200" b="1" dirty="0" smtClean="0">
+                <a:solidFill>
+                  <a:srgbClr val="3366FF"/>
+                </a:solidFill>
+                <a:latin typeface="Courier New"/>
+                <a:cs typeface="Courier New"/>
+              </a:rPr>
+              <a:t>__attribute__((</a:t>
+            </a:r>
+            <a:r>
+              <a:rPr lang="en-GB" sz="2200" b="1" dirty="0" err="1" smtClean="0">
+                <a:solidFill>
+                  <a:srgbClr val="3366FF"/>
+                </a:solidFill>
+                <a:latin typeface="Courier New"/>
+                <a:cs typeface="Courier New"/>
+              </a:rPr>
+              <a:t>reqd_work_group_size</a:t>
+            </a:r>
+            <a:r>
+              <a:rPr lang="en-GB" sz="2200" b="1" dirty="0" smtClean="0">
+                <a:solidFill>
+                  <a:srgbClr val="3366FF"/>
+                </a:solidFill>
+                <a:latin typeface="Courier New"/>
+                <a:cs typeface="Courier New"/>
+              </a:rPr>
+              <a:t>(x, y, z)))</a:t>
+            </a:r>
+          </a:p>
+          <a:p>
+            <a:pPr>
+              <a:lnSpc>
+                <a:spcPct val="120000"/>
+              </a:lnSpc>
+            </a:pPr>
             <a:r>
               <a:rPr lang="en-GB" dirty="0" smtClean="0"/>
-              <a:t>In some cases this can significantly improve performance</a:t>
-            </a:r>
-          </a:p>
-          <a:p>
+              <a:t>As with C/C++, use the </a:t>
+            </a:r>
+            <a:r>
+              <a:rPr lang="en-GB" b="1" dirty="0" err="1" smtClean="0">
+                <a:solidFill>
+                  <a:srgbClr val="3366FF"/>
+                </a:solidFill>
+                <a:latin typeface="Courier New"/>
+                <a:cs typeface="Courier New"/>
+              </a:rPr>
+              <a:t>const</a:t>
+            </a:r>
             <a:r>
               <a:rPr lang="en-GB" dirty="0" smtClean="0"/>
-              <a:t>OpenCL compilers support the same </a:t>
-            </a:r>
-            <a:r>
-              <a:rPr lang="en-GB" dirty="0" err="1" smtClean="0"/>
-              <a:t>preprocessor</a:t>
+              <a:t>/</a:t>
+            </a:r>
+            <a:r>
+              <a:rPr lang="en-GB" b="1" dirty="0" smtClean="0">
+                <a:solidFill>
+                  <a:srgbClr val="3366FF"/>
+                </a:solidFill>
+                <a:latin typeface="Courier New"/>
+                <a:cs typeface="Courier New"/>
+              </a:rPr>
+              <a:t>restrict</a:t>
+            </a:r>
+            <a:r>
+              <a:rPr lang="en-GB" dirty="0" smtClean="0">
+                <a:solidFill>
+                  <a:srgbClr val="3366FF"/>
+                </a:solidFill>
+              </a:rPr>
+              <a:t> </a:t>
             </a:r>
             <a:r>
               <a:rPr lang="en-GB" dirty="0" smtClean="0"/>
-              <a:t> definition flags as GCC/Clang:</a:t>
-            </a:r>
-            <a:endParaRPr lang="en-GB" dirty="0"/>
-          </a:p>
-          <a:p>
-            <a:pPr marL="400050" lvl="1" indent="0">
-              <a:buNone/>
-            </a:pPr>
-            <a:r>
-              <a:rPr lang="en-GB" b="1" dirty="0" smtClean="0">
-                <a:solidFill>
-                  <a:srgbClr val="3366FF"/>
-                </a:solidFill>
-                <a:latin typeface="Courier New"/>
-                <a:cs typeface="Courier New"/>
-              </a:rPr>
-              <a:t>–</a:t>
-            </a:r>
-            <a:r>
-              <a:rPr lang="en-GB" b="1" dirty="0" err="1" smtClean="0">
-                <a:solidFill>
-                  <a:srgbClr val="3366FF"/>
-                </a:solidFill>
-                <a:latin typeface="Courier New"/>
-                <a:cs typeface="Courier New"/>
-              </a:rPr>
-              <a:t>Dname</a:t>
-            </a:r>
-            <a:endParaRPr lang="en-GB" b="1" dirty="0" smtClean="0">
-              <a:solidFill>
-                <a:srgbClr val="3366FF"/>
-              </a:solidFill>
-              <a:latin typeface="Courier New"/>
-              <a:cs typeface="Courier New"/>
-            </a:endParaRPr>
-          </a:p>
-          <a:p>
-            <a:pPr marL="400050" lvl="1" indent="0">
-              <a:buNone/>
-            </a:pPr>
-            <a:r>
-              <a:rPr lang="en-GB" b="1" dirty="0">
-                <a:solidFill>
-                  <a:srgbClr val="3366FF"/>
-                </a:solidFill>
-                <a:latin typeface="Courier New"/>
-                <a:cs typeface="Courier New"/>
-              </a:rPr>
-              <a:t>–</a:t>
-            </a:r>
-            <a:r>
-              <a:rPr lang="en-GB" b="1" dirty="0" err="1">
-                <a:solidFill>
-                  <a:srgbClr val="3366FF"/>
-                </a:solidFill>
-                <a:latin typeface="Courier New"/>
-                <a:cs typeface="Courier New"/>
-              </a:rPr>
-              <a:t>Dname</a:t>
-            </a:r>
-            <a:r>
-              <a:rPr lang="en-GB" b="1" dirty="0">
-                <a:solidFill>
-                  <a:srgbClr val="3366FF"/>
-                </a:solidFill>
-                <a:latin typeface="Courier New"/>
-                <a:cs typeface="Courier New"/>
-              </a:rPr>
-              <a:t>=value</a:t>
-            </a:r>
-          </a:p>
-          <a:p>
-            <a:pPr marL="400050" lvl="1" indent="0">
-              <a:buNone/>
-            </a:pPr>
-            <a:endParaRPr lang="en-GB" b="1" dirty="0" smtClean="0">
-              <a:solidFill>
-                <a:srgbClr val="3366FF"/>
-              </a:solidFill>
-              <a:latin typeface="Courier New"/>
-              <a:cs typeface="Courier New"/>
-            </a:endParaRPr>
+              <a:t>keywords for kernel arguments where appropriate to make sure the compiler can optimise memory accesses</a:t>
+            </a:r>
           </a:p>
         </p:txBody>
       </p:sp>
     </p:spTree>
     <p:extLst>
       <p:ext uri="{BB962C8B-B14F-4D97-AF65-F5344CB8AC3E}">
-        <p14:creationId xmlns:p14="http://schemas.microsoft.com/office/powerpoint/2010/main" val="2817190881"/>
+        <p14:creationId xmlns:p14="http://schemas.microsoft.com/office/powerpoint/2010/main" val="1138100201"/>
       </p:ext>
     </p:extLst>
   </p:cSld>
@@ -6948,6 +7114,190 @@
 </file>
 
 <file path=ppt/slides/slide20.xml><?xml version="1.0" encoding="utf-8"?>
+<p:sld xmlns:a="http://schemas.openxmlformats.org/drawingml/2006/main" xmlns:r="http://schemas.openxmlformats.org/officeDocument/2006/relationships" xmlns:p="http://schemas.openxmlformats.org/presentationml/2006/main">
+  <p:cSld>
+    <p:spTree>
+      <p:nvGrpSpPr>
+        <p:cNvPr id="1" name=""/>
+        <p:cNvGrpSpPr/>
+        <p:nvPr/>
+      </p:nvGrpSpPr>
+      <p:grpSpPr>
+        <a:xfrm>
+          <a:off x="0" y="0"/>
+          <a:ext cx="0" cy="0"/>
+          <a:chOff x="0" y="0"/>
+          <a:chExt cx="0" cy="0"/>
+        </a:xfrm>
+      </p:grpSpPr>
+      <p:sp>
+        <p:nvSpPr>
+          <p:cNvPr id="2" name="Title 1"/>
+          <p:cNvSpPr>
+            <a:spLocks noGrp="1"/>
+          </p:cNvSpPr>
+          <p:nvPr>
+            <p:ph type="title"/>
+          </p:nvPr>
+        </p:nvSpPr>
+        <p:spPr/>
+        <p:txBody>
+          <a:bodyPr/>
+          <a:lstStyle/>
+          <a:p>
+            <a:r>
+              <a:rPr lang="en-GB" dirty="0" err="1" smtClean="0"/>
+              <a:t>Metaprogramming</a:t>
+            </a:r>
+            <a:endParaRPr lang="en-GB" dirty="0"/>
+          </a:p>
+        </p:txBody>
+      </p:sp>
+      <p:sp>
+        <p:nvSpPr>
+          <p:cNvPr id="3" name="Content Placeholder 2"/>
+          <p:cNvSpPr>
+            <a:spLocks noGrp="1"/>
+          </p:cNvSpPr>
+          <p:nvPr>
+            <p:ph idx="1"/>
+          </p:nvPr>
+        </p:nvSpPr>
+        <p:spPr/>
+        <p:txBody>
+          <a:bodyPr>
+            <a:normAutofit lnSpcReduction="10000"/>
+          </a:bodyPr>
+          <a:lstStyle/>
+          <a:p>
+            <a:r>
+              <a:rPr lang="en-GB" dirty="0" smtClean="0"/>
+              <a:t>We can exploit runtime compilation to embed values that are only known at runtime into kernels as compile-time constants</a:t>
+            </a:r>
+          </a:p>
+          <a:p>
+            <a:r>
+              <a:rPr lang="en-GB" dirty="0" smtClean="0"/>
+              <a:t>In some cases this can significantly improve performance</a:t>
+            </a:r>
+          </a:p>
+          <a:p>
+            <a:r>
+              <a:rPr lang="en-GB" dirty="0" smtClean="0"/>
+              <a:t>OpenCL compilers support the same </a:t>
+            </a:r>
+            <a:r>
+              <a:rPr lang="en-GB" dirty="0" err="1" smtClean="0"/>
+              <a:t>preprocessor</a:t>
+            </a:r>
+            <a:r>
+              <a:rPr lang="en-GB" dirty="0" smtClean="0"/>
+              <a:t> definition flags as GCC/Clang:</a:t>
+            </a:r>
+            <a:endParaRPr lang="en-GB" dirty="0"/>
+          </a:p>
+          <a:p>
+            <a:pPr marL="400050" lvl="1" indent="0">
+              <a:buNone/>
+            </a:pPr>
+            <a:r>
+              <a:rPr lang="en-GB" b="1" dirty="0" smtClean="0">
+                <a:solidFill>
+                  <a:srgbClr val="3366FF"/>
+                </a:solidFill>
+                <a:latin typeface="Courier New"/>
+                <a:cs typeface="Courier New"/>
+              </a:rPr>
+              <a:t>–</a:t>
+            </a:r>
+            <a:r>
+              <a:rPr lang="en-GB" b="1" dirty="0" err="1" smtClean="0">
+                <a:solidFill>
+                  <a:srgbClr val="3366FF"/>
+                </a:solidFill>
+                <a:latin typeface="Courier New"/>
+                <a:cs typeface="Courier New"/>
+              </a:rPr>
+              <a:t>Dname</a:t>
+            </a:r>
+            <a:endParaRPr lang="en-GB" b="1" dirty="0" smtClean="0">
+              <a:solidFill>
+                <a:srgbClr val="3366FF"/>
+              </a:solidFill>
+              <a:latin typeface="Courier New"/>
+              <a:cs typeface="Courier New"/>
+            </a:endParaRPr>
+          </a:p>
+          <a:p>
+            <a:pPr marL="400050" lvl="1" indent="0">
+              <a:buNone/>
+            </a:pPr>
+            <a:r>
+              <a:rPr lang="en-GB" b="1" dirty="0">
+                <a:solidFill>
+                  <a:srgbClr val="3366FF"/>
+                </a:solidFill>
+                <a:latin typeface="Courier New"/>
+                <a:cs typeface="Courier New"/>
+              </a:rPr>
+              <a:t>–</a:t>
+            </a:r>
+            <a:r>
+              <a:rPr lang="en-GB" b="1" dirty="0" err="1">
+                <a:solidFill>
+                  <a:srgbClr val="3366FF"/>
+                </a:solidFill>
+                <a:latin typeface="Courier New"/>
+                <a:cs typeface="Courier New"/>
+              </a:rPr>
+              <a:t>Dname</a:t>
+            </a:r>
+            <a:r>
+              <a:rPr lang="en-GB" b="1" dirty="0">
+                <a:solidFill>
+                  <a:srgbClr val="3366FF"/>
+                </a:solidFill>
+                <a:latin typeface="Courier New"/>
+                <a:cs typeface="Courier New"/>
+              </a:rPr>
+              <a:t>=value</a:t>
+            </a:r>
+          </a:p>
+          <a:p>
+            <a:pPr marL="400050" lvl="1" indent="0">
+              <a:buNone/>
+            </a:pPr>
+            <a:endParaRPr lang="en-GB" b="1" dirty="0" smtClean="0">
+              <a:solidFill>
+                <a:srgbClr val="3366FF"/>
+              </a:solidFill>
+              <a:latin typeface="Courier New"/>
+              <a:cs typeface="Courier New"/>
+            </a:endParaRPr>
+          </a:p>
+        </p:txBody>
+      </p:sp>
+    </p:spTree>
+    <p:extLst>
+      <p:ext uri="{BB962C8B-B14F-4D97-AF65-F5344CB8AC3E}">
+        <p14:creationId xmlns:p14="http://schemas.microsoft.com/office/powerpoint/2010/main" val="2817190881"/>
+      </p:ext>
+    </p:extLst>
+  </p:cSld>
+  <p:clrMapOvr>
+    <a:masterClrMapping/>
+  </p:clrMapOvr>
+  <p:timing>
+    <p:tnLst>
+      <p:par>
+        <p:cTn xmlns:p14="http://schemas.microsoft.com/office/powerpoint/2010/main" id="1" dur="indefinite" restart="never" nodeType="tmRoot"/>
+      </p:par>
+    </p:tnLst>
+  </p:timing>
+</p:sld>
+</file>
+
+<file path=ppt/slides/slide21.xml><?xml version="1.0" encoding="utf-8"?>
 <p:sld xmlns:a="http://schemas.openxmlformats.org/drawingml/2006/main" xmlns:r="http://schemas.openxmlformats.org/officeDocument/2006/relationships" xmlns:p="http://schemas.openxmlformats.org/presentationml/2006/main">
   <p:cSld>
     <p:spTree>
@@ -8908,7 +9258,7 @@
 </p:sld>
 </file>
 
-<file path=ppt/slides/slide21.xml><?xml version="1.0" encoding="utf-8"?>
+<file path=ppt/slides/slide22.xml><?xml version="1.0" encoding="utf-8"?>
 <p:sld xmlns:a="http://schemas.openxmlformats.org/drawingml/2006/main" xmlns:r="http://schemas.openxmlformats.org/officeDocument/2006/relationships" xmlns:p="http://schemas.openxmlformats.org/presentationml/2006/main">
   <p:cSld>
     <p:spTree>
@@ -9144,7 +9494,7 @@
 </p:sld>
 </file>
 
-<file path=ppt/slides/slide22.xml><?xml version="1.0" encoding="utf-8"?>
+<file path=ppt/slides/slide23.xml><?xml version="1.0" encoding="utf-8"?>
 <p:sld xmlns:a="http://schemas.openxmlformats.org/drawingml/2006/main" xmlns:r="http://schemas.openxmlformats.org/officeDocument/2006/relationships" xmlns:p="http://schemas.openxmlformats.org/presentationml/2006/main">
   <p:cSld>
     <p:spTree>
@@ -9419,27 +9769,7 @@
                 <a:latin typeface="Courier New"/>
                 <a:cs typeface="Courier New"/>
               </a:rPr>
-              <a:t>// OpenCL C++ </a:t>
-            </a:r>
-            <a:r>
-              <a:rPr lang="en-GB" b="1" dirty="0" smtClean="0">
-                <a:solidFill>
-                  <a:srgbClr val="008000"/>
-                </a:solidFill>
-                <a:latin typeface="Courier New"/>
-                <a:cs typeface="Courier New"/>
-              </a:rPr>
-              <a:t>kernel </a:t>
-            </a:r>
-            <a:r>
-              <a:rPr lang="en-GB" b="1" dirty="0" smtClean="0">
-                <a:solidFill>
-                  <a:srgbClr val="008000"/>
-                </a:solidFill>
-                <a:latin typeface="Courier New"/>
-                <a:cs typeface="Courier New"/>
-              </a:rPr>
-              <a:t>code</a:t>
+              <a:t>// OpenCL C++ kernel code</a:t>
             </a:r>
           </a:p>
           <a:p>
@@ -10270,7 +10600,7 @@
 </p:sld>
 </file>
 
-<file path=ppt/slides/slide23.xml><?xml version="1.0" encoding="utf-8"?>
+<file path=ppt/slides/slide24.xml><?xml version="1.0" encoding="utf-8"?>
 <p:sld xmlns:a="http://schemas.openxmlformats.org/drawingml/2006/main" xmlns:r="http://schemas.openxmlformats.org/officeDocument/2006/relationships" xmlns:p="http://schemas.openxmlformats.org/presentationml/2006/main">
   <p:cSld>
     <p:spTree>
@@ -10513,7 +10843,7 @@
 </p:sld>
 </file>
 
-<file path=ppt/slides/slide24.xml><?xml version="1.0" encoding="utf-8"?>
+<file path=ppt/slides/slide25.xml><?xml version="1.0" encoding="utf-8"?>
 <p:sld xmlns:a="http://schemas.openxmlformats.org/drawingml/2006/main" xmlns:r="http://schemas.openxmlformats.org/officeDocument/2006/relationships" xmlns:p="http://schemas.openxmlformats.org/presentationml/2006/main">
   <p:cSld>
     <p:spTree>
@@ -10776,7 +11106,7 @@
 </p:sld>
 </file>
 
-<file path=ppt/slides/slide25.xml><?xml version="1.0" encoding="utf-8"?>
+<file path=ppt/slides/slide26.xml><?xml version="1.0" encoding="utf-8"?>
 <p:sld xmlns:a="http://schemas.openxmlformats.org/drawingml/2006/main" xmlns:r="http://schemas.openxmlformats.org/officeDocument/2006/relationships" xmlns:p="http://schemas.openxmlformats.org/presentationml/2006/main">
   <p:cSld>
     <p:spTree>

</xml_diff>

<commit_message>
Update metaprogramming exercise slides
</commit_message>
<xml_diff>
--- a/slides/advanced_part2.pptx
+++ b/slides/advanced_part2.pptx
@@ -921,11 +921,7 @@
             </a:r>
             <a:r>
               <a:rPr lang="en-GB" baseline="0" dirty="0" smtClean="0"/>
-              <a:t> in OpenCL </a:t>
-            </a:r>
-            <a:r>
-              <a:rPr lang="en-GB" baseline="0" dirty="0" smtClean="0"/>
-              <a:t>2.1</a:t>
+              <a:t> in OpenCL 2.1</a:t>
             </a:r>
           </a:p>
           <a:p>
@@ -933,7 +929,6 @@
               <a:rPr lang="en-GB" baseline="0" dirty="0" smtClean="0"/>
               <a:t>Intel shipping SPIR-V support</a:t>
             </a:r>
-            <a:endParaRPr lang="en-GB" baseline="0" dirty="0" smtClean="0"/>
           </a:p>
           <a:p>
             <a:endParaRPr lang="en-GB" baseline="0" dirty="0" smtClean="0"/>
@@ -10660,7 +10655,7 @@
         </p:spPr>
         <p:txBody>
           <a:bodyPr>
-            <a:normAutofit fontScale="85000" lnSpcReduction="10000"/>
+            <a:normAutofit/>
           </a:bodyPr>
           <a:lstStyle/>
           <a:p>
@@ -10680,8 +10675,25 @@
             <a:pPr lvl="1"/>
             <a:r>
               <a:rPr lang="en-GB" dirty="0" smtClean="0"/>
-              <a:t>Each pixel in output is some function of its neighbouring pixels in input</a:t>
-            </a:r>
+              <a:t>Each pixel </a:t>
+            </a:r>
+            <a:r>
+              <a:rPr lang="en-GB" dirty="0" smtClean="0"/>
+              <a:t>of output image is </a:t>
+            </a:r>
+            <a:r>
+              <a:rPr lang="en-GB" dirty="0" smtClean="0"/>
+              <a:t>some function of its neighbouring pixels </a:t>
+            </a:r>
+            <a:r>
+              <a:rPr lang="en-GB" dirty="0" smtClean="0"/>
+              <a:t>from</a:t>
+            </a:r>
+            <a:r>
+              <a:rPr lang="en-GB" dirty="0" smtClean="0"/>
+              <a:t> input image</a:t>
+            </a:r>
+            <a:endParaRPr lang="en-GB" dirty="0" smtClean="0"/>
           </a:p>
           <a:p>
             <a:pPr lvl="1"/>
@@ -10690,7 +10702,10 @@
               <a:t>Uses </a:t>
             </a:r>
             <a:r>
-              <a:rPr lang="en-GB" dirty="0" err="1" smtClean="0">
+              <a:rPr lang="en-GB" b="1" dirty="0" err="1" smtClean="0">
+                <a:solidFill>
+                  <a:srgbClr val="3366FF"/>
+                </a:solidFill>
                 <a:latin typeface="Courier New"/>
                 <a:cs typeface="Courier New"/>
               </a:rPr>
@@ -10701,18 +10716,32 @@
               <a:t>, </a:t>
             </a:r>
             <a:r>
-              <a:rPr lang="en-GB" dirty="0" err="1" smtClean="0">
+              <a:rPr lang="en-GB" b="1" dirty="0" err="1" smtClean="0">
+                <a:solidFill>
+                  <a:srgbClr val="3366FF"/>
+                </a:solidFill>
                 <a:latin typeface="Courier New"/>
                 <a:cs typeface="Courier New"/>
               </a:rPr>
               <a:t>exp</a:t>
             </a:r>
             <a:r>
+              <a:rPr lang="en-GB" dirty="0" smtClean="0">
+                <a:solidFill>
+                  <a:srgbClr val="3366FF"/>
+                </a:solidFill>
+              </a:rPr>
+              <a:t> </a:t>
+            </a:r>
+            <a:r>
               <a:rPr lang="en-GB" dirty="0" smtClean="0"/>
-              <a:t> and </a:t>
-            </a:r>
-            <a:r>
-              <a:rPr lang="en-GB" dirty="0" smtClean="0">
+              <a:t>and </a:t>
+            </a:r>
+            <a:r>
+              <a:rPr lang="en-GB" b="1" dirty="0" smtClean="0">
+                <a:solidFill>
+                  <a:srgbClr val="3366FF"/>
+                </a:solidFill>
                 <a:latin typeface="Courier New"/>
                 <a:cs typeface="Courier New"/>
               </a:rPr>
@@ -10729,97 +10758,22 @@
             <a:endParaRPr lang="en-GB" dirty="0" smtClean="0"/>
           </a:p>
           <a:p>
+            <a:endParaRPr lang="en-GB" dirty="0" smtClean="0"/>
+          </a:p>
+          <a:p>
             <a:r>
               <a:rPr lang="en-GB" dirty="0" smtClean="0"/>
-              <a:t>A fully working implementation of this code is provided as a starting point</a:t>
-            </a:r>
-          </a:p>
-          <a:p>
-            <a:r>
-              <a:rPr lang="en-GB" b="1" dirty="0" smtClean="0"/>
-              <a:t>NOTE:</a:t>
+              <a:t>A </a:t>
             </a:r>
             <a:r>
               <a:rPr lang="en-GB" dirty="0" smtClean="0"/>
-              <a:t> Requires the SDL2 library</a:t>
-            </a:r>
-          </a:p>
-          <a:p>
-            <a:pPr lvl="1"/>
+              <a:t>fully working implementation of this code is provided as a starting </a:t>
+            </a:r>
             <a:r>
               <a:rPr lang="en-GB" dirty="0" smtClean="0"/>
-              <a:t>Linux: </a:t>
-            </a:r>
-            <a:r>
-              <a:rPr lang="en-GB" dirty="0" smtClean="0">
-                <a:latin typeface="Courier New"/>
-                <a:cs typeface="Courier New"/>
-              </a:rPr>
-              <a:t>yum install SDL2-devel</a:t>
-            </a:r>
-            <a:r>
-              <a:rPr lang="en-GB" dirty="0" smtClean="0"/>
-              <a:t> or </a:t>
-            </a:r>
-            <a:r>
-              <a:rPr lang="en-GB" dirty="0" smtClean="0">
-                <a:latin typeface="Courier New"/>
-                <a:cs typeface="Courier New"/>
-              </a:rPr>
-              <a:t>apt-get install libsdl2</a:t>
-            </a:r>
-            <a:r>
-              <a:rPr lang="en-GB" dirty="0">
-                <a:latin typeface="Courier New"/>
-                <a:cs typeface="Courier New"/>
-              </a:rPr>
-              <a:t>-</a:t>
-            </a:r>
-            <a:r>
-              <a:rPr lang="en-GB" dirty="0" smtClean="0">
-                <a:latin typeface="Courier New"/>
-                <a:cs typeface="Courier New"/>
-              </a:rPr>
-              <a:t>dev</a:t>
-            </a:r>
-          </a:p>
-          <a:p>
-            <a:pPr lvl="1"/>
-            <a:r>
-              <a:rPr lang="en-GB" dirty="0" smtClean="0"/>
-              <a:t>OS X: Download and install SDL2 development framework</a:t>
-            </a:r>
-          </a:p>
-          <a:p>
-            <a:pPr lvl="2"/>
-            <a:r>
-              <a:rPr lang="en-GB" dirty="0">
-                <a:hlinkClick r:id="rId2"/>
-              </a:rPr>
-              <a:t>https://www.libsdl.org/download-2.0.</a:t>
-            </a:r>
-            <a:r>
-              <a:rPr lang="en-GB" dirty="0" smtClean="0">
-                <a:hlinkClick r:id="rId2"/>
-              </a:rPr>
-              <a:t>php</a:t>
-            </a:r>
-            <a:r>
-              <a:rPr lang="en-GB" dirty="0" smtClean="0"/>
-              <a:t> </a:t>
-            </a:r>
-          </a:p>
-          <a:p>
-            <a:pPr lvl="1"/>
-            <a:r>
-              <a:rPr lang="en-GB" dirty="0"/>
-              <a:t>Windows: SDL2 libraries/headers provided with </a:t>
-            </a:r>
-            <a:r>
-              <a:rPr lang="en-GB" dirty="0" smtClean="0"/>
-              <a:t>exercises</a:t>
-            </a:r>
-            <a:endParaRPr lang="en-GB" dirty="0"/>
+              <a:t>point</a:t>
+            </a:r>
+            <a:endParaRPr lang="en-GB" dirty="0" smtClean="0"/>
           </a:p>
         </p:txBody>
       </p:sp>
@@ -10908,7 +10862,7 @@
         </p:spPr>
         <p:txBody>
           <a:bodyPr>
-            <a:normAutofit fontScale="55000" lnSpcReduction="20000"/>
+            <a:normAutofit fontScale="70000" lnSpcReduction="20000"/>
           </a:bodyPr>
           <a:lstStyle/>
           <a:p>
@@ -10919,13 +10873,44 @@
             </a:pPr>
             <a:r>
               <a:rPr lang="en-GB" dirty="0" smtClean="0"/>
-              <a:t>Find the starting code in e.g. ~/Advanced-Exercises/exercises/</a:t>
-            </a:r>
-            <a:r>
-              <a:rPr lang="en-GB" dirty="0"/>
+              <a:t>Find the starting code </a:t>
+            </a:r>
+            <a:r>
+              <a:rPr lang="en-GB" dirty="0" smtClean="0"/>
+              <a:t>in </a:t>
+            </a:r>
+            <a:r>
+              <a:rPr lang="en-GB" b="1" dirty="0" smtClean="0">
+                <a:latin typeface="Courier New"/>
+                <a:cs typeface="Courier New"/>
+              </a:rPr>
+              <a:t>IWOCL2017</a:t>
+            </a:r>
+            <a:r>
+              <a:rPr lang="en-GB" b="1" dirty="0" smtClean="0">
+                <a:latin typeface="Courier New"/>
+                <a:cs typeface="Courier New"/>
+              </a:rPr>
+              <a:t>/exercises</a:t>
+            </a:r>
+            <a:r>
+              <a:rPr lang="en-GB" b="1" dirty="0" smtClean="0">
+                <a:latin typeface="Courier New"/>
+                <a:cs typeface="Courier New"/>
+              </a:rPr>
+              <a:t>/</a:t>
+            </a:r>
+            <a:r>
+              <a:rPr lang="en-GB" b="1" dirty="0">
+                <a:latin typeface="Courier New"/>
+                <a:cs typeface="Courier New"/>
+              </a:rPr>
               <a:t>Bilateral</a:t>
             </a:r>
-            <a:endParaRPr lang="en-GB" dirty="0" smtClean="0"/>
+            <a:endParaRPr lang="en-GB" b="1" dirty="0" smtClean="0">
+              <a:latin typeface="Courier New"/>
+              <a:cs typeface="Courier New"/>
+            </a:endParaRPr>
           </a:p>
           <a:p>
             <a:pPr>
@@ -11039,8 +11024,9 @@
             </a:pPr>
             <a:r>
               <a:rPr lang="en-GB" b="1" dirty="0" smtClean="0"/>
-              <a:t>Extras:</a:t>
-            </a:r>
+              <a:t>Extra:</a:t>
+            </a:r>
+            <a:endParaRPr lang="en-GB" dirty="0" smtClean="0"/>
           </a:p>
           <a:p>
             <a:pPr>
@@ -11050,37 +11036,11 @@
             </a:pPr>
             <a:r>
               <a:rPr lang="en-GB" dirty="0" smtClean="0"/>
-              <a:t>Make the work-group size inside the kernel a compile-time constant, and change the local memory allocation to only use as much as is needed</a:t>
-            </a:r>
-          </a:p>
-          <a:p>
-            <a:pPr>
-              <a:lnSpc>
-                <a:spcPct val="120000"/>
-              </a:lnSpc>
-            </a:pPr>
+              <a:t>Get </a:t>
+            </a:r>
             <a:r>
               <a:rPr lang="en-GB" dirty="0" smtClean="0"/>
-              <a:t>Modify </a:t>
-            </a:r>
-            <a:r>
-              <a:rPr lang="en-GB" dirty="0"/>
-              <a:t>the kernel to allow the runtime to toggle whether or not local memory is used at all, which could </a:t>
-            </a:r>
-            <a:r>
-              <a:rPr lang="en-GB" dirty="0" smtClean="0"/>
-              <a:t>improve performance portability on devices without physical local memory</a:t>
-            </a:r>
-          </a:p>
-          <a:p>
-            <a:pPr>
-              <a:lnSpc>
-                <a:spcPct val="120000"/>
-              </a:lnSpc>
-            </a:pPr>
-            <a:r>
-              <a:rPr lang="en-GB" dirty="0" smtClean="0"/>
-              <a:t>Get the compiler to generate the assembly code and look through this, correlating it to your source code</a:t>
+              <a:t>the compiler to generate the assembly code and look through this, correlating it to your source code</a:t>
             </a:r>
             <a:endParaRPr lang="en-GB" dirty="0"/>
           </a:p>

</xml_diff>

<commit_message>
Update bilateral numbers in slides
</commit_message>
<xml_diff>
--- a/slides/advanced_part2.pptx
+++ b/slides/advanced_part2.pptx
@@ -10675,25 +10675,8 @@
             <a:pPr lvl="1"/>
             <a:r>
               <a:rPr lang="en-GB" dirty="0" smtClean="0"/>
-              <a:t>Each pixel </a:t>
-            </a:r>
-            <a:r>
-              <a:rPr lang="en-GB" dirty="0" smtClean="0"/>
-              <a:t>of output image is </a:t>
-            </a:r>
-            <a:r>
-              <a:rPr lang="en-GB" dirty="0" smtClean="0"/>
-              <a:t>some function of its neighbouring pixels </a:t>
-            </a:r>
-            <a:r>
-              <a:rPr lang="en-GB" dirty="0" smtClean="0"/>
-              <a:t>from</a:t>
-            </a:r>
-            <a:r>
-              <a:rPr lang="en-GB" dirty="0" smtClean="0"/>
-              <a:t> input image</a:t>
-            </a:r>
-            <a:endParaRPr lang="en-GB" dirty="0" smtClean="0"/>
+              <a:t>Each pixel of output image is some function of its neighbouring pixels from input image</a:t>
+            </a:r>
           </a:p>
           <a:p>
             <a:pPr lvl="1"/>
@@ -10763,17 +10746,8 @@
           <a:p>
             <a:r>
               <a:rPr lang="en-GB" dirty="0" smtClean="0"/>
-              <a:t>A </a:t>
-            </a:r>
-            <a:r>
-              <a:rPr lang="en-GB" dirty="0" smtClean="0"/>
-              <a:t>fully working implementation of this code is provided as a starting </a:t>
-            </a:r>
-            <a:r>
-              <a:rPr lang="en-GB" dirty="0" smtClean="0"/>
-              <a:t>point</a:t>
-            </a:r>
-            <a:endParaRPr lang="en-GB" dirty="0" smtClean="0"/>
+              <a:t>A fully working implementation of this code is provided as a starting point</a:t>
+            </a:r>
           </a:p>
         </p:txBody>
       </p:sp>
@@ -10873,32 +10847,14 @@
             </a:pPr>
             <a:r>
               <a:rPr lang="en-GB" dirty="0" smtClean="0"/>
-              <a:t>Find the starting code </a:t>
-            </a:r>
-            <a:r>
-              <a:rPr lang="en-GB" dirty="0" smtClean="0"/>
-              <a:t>in </a:t>
+              <a:t>Find the starting code in </a:t>
             </a:r>
             <a:r>
               <a:rPr lang="en-GB" b="1" dirty="0" smtClean="0">
                 <a:latin typeface="Courier New"/>
                 <a:cs typeface="Courier New"/>
               </a:rPr>
-              <a:t>IWOCL2017</a:t>
-            </a:r>
-            <a:r>
-              <a:rPr lang="en-GB" b="1" dirty="0" smtClean="0">
-                <a:latin typeface="Courier New"/>
-                <a:cs typeface="Courier New"/>
-              </a:rPr>
-              <a:t>/exercises</a:t>
-            </a:r>
-            <a:r>
-              <a:rPr lang="en-GB" b="1" dirty="0" smtClean="0">
-                <a:latin typeface="Courier New"/>
-                <a:cs typeface="Courier New"/>
-              </a:rPr>
-              <a:t>/</a:t>
+              <a:t>IWOCL2017/exercises/</a:t>
             </a:r>
             <a:r>
               <a:rPr lang="en-GB" b="1" dirty="0">
@@ -11036,11 +10992,7 @@
             </a:pPr>
             <a:r>
               <a:rPr lang="en-GB" dirty="0" smtClean="0"/>
-              <a:t>Get </a:t>
-            </a:r>
-            <a:r>
-              <a:rPr lang="en-GB" dirty="0" smtClean="0"/>
-              <a:t>the compiler to generate the assembly code and look through this, correlating it to your source code</a:t>
+              <a:t>Get the compiler to generate the assembly code and look through this, correlating it to your source code</a:t>
             </a:r>
             <a:endParaRPr lang="en-GB" dirty="0"/>
           </a:p>
@@ -11154,7 +11106,7 @@
               <a:buNone/>
             </a:pPr>
             <a:r>
-              <a:rPr lang="en-GB" sz="2000" dirty="0" smtClean="0">
+              <a:rPr lang="en-GB" sz="2000" dirty="0">
                 <a:latin typeface="Courier New"/>
                 <a:cs typeface="Courier New"/>
               </a:rPr>
@@ -11165,16 +11117,40 @@
                 <a:latin typeface="Courier New"/>
                 <a:cs typeface="Courier New"/>
               </a:rPr>
-              <a:t>./</a:t>
-            </a:r>
-            <a:r>
-              <a:rPr lang="en-GB" sz="2000" b="1" dirty="0" smtClean="0">
-                <a:latin typeface="Courier New"/>
-                <a:cs typeface="Courier New"/>
-              </a:rPr>
-              <a:t>bilateral </a:t>
-            </a:r>
-            <a:endParaRPr lang="en-GB" sz="2000" b="1" dirty="0">
+              <a:t>./bilateral </a:t>
+            </a:r>
+          </a:p>
+          <a:p>
+            <a:pPr marL="0" indent="0">
+              <a:buNone/>
+            </a:pPr>
+            <a:r>
+              <a:rPr lang="en-GB" sz="2000" dirty="0">
+                <a:latin typeface="Courier New"/>
+                <a:cs typeface="Courier New"/>
+              </a:rPr>
+              <a:t>OpenCL took 427.7ms (</a:t>
+            </a:r>
+            <a:r>
+              <a:rPr lang="en-GB" sz="2000" b="1" dirty="0">
+                <a:latin typeface="Courier New"/>
+                <a:cs typeface="Courier New"/>
+              </a:rPr>
+              <a:t>13.4ms</a:t>
+            </a:r>
+            <a:r>
+              <a:rPr lang="en-GB" sz="2000" dirty="0">
+                <a:latin typeface="Courier New"/>
+                <a:cs typeface="Courier New"/>
+              </a:rPr>
+              <a:t> / frame)</a:t>
+            </a:r>
+          </a:p>
+          <a:p>
+            <a:pPr marL="0" indent="0">
+              <a:buNone/>
+            </a:pPr>
+            <a:endParaRPr lang="en-GB" sz="2000" dirty="0">
               <a:latin typeface="Courier New"/>
               <a:cs typeface="Courier New"/>
             </a:endParaRPr>
@@ -11188,111 +11164,74 @@
                 <a:latin typeface="Courier New"/>
                 <a:cs typeface="Courier New"/>
               </a:rPr>
-              <a:t>OpenCL took </a:t>
-            </a:r>
-            <a:r>
-              <a:rPr lang="en-GB" sz="2000" dirty="0" smtClean="0">
-                <a:latin typeface="Courier New"/>
-                <a:cs typeface="Courier New"/>
-              </a:rPr>
-              <a:t>425.2ms (</a:t>
-            </a:r>
-            <a:r>
-              <a:rPr lang="en-GB" sz="2000" b="1" dirty="0" smtClean="0">
-                <a:latin typeface="Courier New"/>
-                <a:cs typeface="Courier New"/>
-              </a:rPr>
-              <a:t>13.3ms</a:t>
-            </a:r>
-            <a:r>
-              <a:rPr lang="en-GB" sz="2000" dirty="0" smtClean="0">
-                <a:latin typeface="Courier New"/>
-                <a:cs typeface="Courier New"/>
-              </a:rPr>
-              <a:t> / frame)</a:t>
+              <a:t>$ </a:t>
+            </a:r>
+            <a:r>
+              <a:rPr lang="en-GB" sz="2000" b="1" dirty="0">
+                <a:latin typeface="Courier New"/>
+                <a:cs typeface="Courier New"/>
+              </a:rPr>
+              <a:t>./</a:t>
+            </a:r>
+            <a:r>
+              <a:rPr lang="en-GB" sz="2000" b="1" dirty="0" err="1">
+                <a:latin typeface="Courier New"/>
+                <a:cs typeface="Courier New"/>
+              </a:rPr>
+              <a:t>bilateral_meta</a:t>
+            </a:r>
+            <a:r>
+              <a:rPr lang="en-GB" sz="2000" b="1" dirty="0">
+                <a:latin typeface="Courier New"/>
+                <a:cs typeface="Courier New"/>
+              </a:rPr>
+              <a:t> </a:t>
             </a:r>
           </a:p>
           <a:p>
             <a:pPr marL="0" indent="0">
               <a:buNone/>
             </a:pPr>
-            <a:endParaRPr lang="en-GB" sz="2000" dirty="0" smtClean="0">
-              <a:latin typeface="Courier New"/>
-              <a:cs typeface="Courier New"/>
-            </a:endParaRPr>
+            <a:r>
+              <a:rPr lang="en-GB" sz="2000" dirty="0">
+                <a:latin typeface="Courier New"/>
+                <a:cs typeface="Courier New"/>
+              </a:rPr>
+              <a:t>OpenCL took 341.2ms (</a:t>
+            </a:r>
+            <a:r>
+              <a:rPr lang="en-GB" sz="2000" b="1" dirty="0">
+                <a:latin typeface="Courier New"/>
+                <a:cs typeface="Courier New"/>
+              </a:rPr>
+              <a:t>10.7ms</a:t>
+            </a:r>
+            <a:r>
+              <a:rPr lang="en-GB" sz="2000" dirty="0">
+                <a:latin typeface="Courier New"/>
+                <a:cs typeface="Courier New"/>
+              </a:rPr>
+              <a:t> / </a:t>
+            </a:r>
+            <a:r>
+              <a:rPr lang="en-GB" sz="2000">
+                <a:latin typeface="Courier New"/>
+                <a:cs typeface="Courier New"/>
+              </a:rPr>
+              <a:t>frame</a:t>
+            </a:r>
+            <a:r>
+              <a:rPr lang="en-GB" sz="2000" smtClean="0">
+                <a:latin typeface="Courier New"/>
+                <a:cs typeface="Courier New"/>
+              </a:rPr>
+              <a:t>)</a:t>
+            </a:r>
           </a:p>
           <a:p>
             <a:pPr marL="0" indent="0">
               <a:buNone/>
             </a:pPr>
-            <a:r>
-              <a:rPr lang="en-GB" sz="2000" smtClean="0">
-                <a:latin typeface="Courier New"/>
-                <a:cs typeface="Courier New"/>
-              </a:rPr>
-              <a:t>$ </a:t>
-            </a:r>
-            <a:r>
-              <a:rPr lang="en-GB" sz="2000" b="1" dirty="0">
-                <a:latin typeface="Courier New"/>
-                <a:cs typeface="Courier New"/>
-              </a:rPr>
-              <a:t>./</a:t>
-            </a:r>
-            <a:r>
-              <a:rPr lang="en-GB" sz="2000" b="1" dirty="0" err="1">
-                <a:latin typeface="Courier New"/>
-                <a:cs typeface="Courier New"/>
-              </a:rPr>
-              <a:t>bilateral_meta</a:t>
-            </a:r>
-            <a:r>
-              <a:rPr lang="en-GB" sz="2000" b="1" dirty="0">
-                <a:latin typeface="Courier New"/>
-                <a:cs typeface="Courier New"/>
-              </a:rPr>
-              <a:t> </a:t>
-            </a:r>
-          </a:p>
-          <a:p>
-            <a:pPr marL="0" indent="0">
-              <a:buNone/>
-            </a:pPr>
-            <a:r>
-              <a:rPr lang="en-GB" sz="2000" dirty="0" smtClean="0">
-                <a:latin typeface="Courier New"/>
-                <a:cs typeface="Courier New"/>
-              </a:rPr>
-              <a:t>OpenCL </a:t>
-            </a:r>
-            <a:r>
-              <a:rPr lang="en-GB" sz="2000" dirty="0">
-                <a:latin typeface="Courier New"/>
-                <a:cs typeface="Courier New"/>
-              </a:rPr>
-              <a:t>took 357.9ms (</a:t>
-            </a:r>
-            <a:r>
-              <a:rPr lang="en-GB" sz="2000" b="1" dirty="0">
-                <a:latin typeface="Courier New"/>
-                <a:cs typeface="Courier New"/>
-              </a:rPr>
-              <a:t>11.2ms</a:t>
-            </a:r>
-            <a:r>
-              <a:rPr lang="en-GB" sz="2000" dirty="0">
-                <a:latin typeface="Courier New"/>
-                <a:cs typeface="Courier New"/>
-              </a:rPr>
-              <a:t> / frame</a:t>
-            </a:r>
-            <a:r>
-              <a:rPr lang="en-GB" sz="2000" dirty="0" smtClean="0">
-                <a:latin typeface="Courier New"/>
-                <a:cs typeface="Courier New"/>
-              </a:rPr>
-              <a:t>)</a:t>
-            </a:r>
             <a:endParaRPr lang="en-GB" sz="2000" dirty="0">
               <a:latin typeface="Courier New"/>
               <a:cs typeface="Courier New"/>

</xml_diff>

<commit_message>
Update path in part2 exercise
</commit_message>
<xml_diff>
--- a/slides/advanced_part2.pptx
+++ b/slides/advanced_part2.pptx
@@ -134,7 +134,7 @@
   </p:defaultTextStyle>
   <p:extLst>
     <p:ext uri="{EFAFB233-063F-42B5-8137-9DF3F51BA10A}">
-      <p15:sldGuideLst xmlns:p15="http://schemas.microsoft.com/office/powerpoint/2012/main">
+      <p15:sldGuideLst xmlns:p15="http://schemas.microsoft.com/office/powerpoint/2012/main" xmlns="">
         <p15:guide id="1" orient="horz" pos="2160">
           <p15:clr>
             <a:srgbClr val="A4A3A4"/>
@@ -233,7 +233,7 @@
           <a:p>
             <a:fld id="{7FB74D45-CC88-7D46-9D48-9989C6A85D58}" type="datetimeFigureOut">
               <a:rPr lang="en-US" smtClean="0"/>
-              <a:t>5/13/17</a:t>
+              <a:t>15/05/17</a:t>
             </a:fld>
             <a:endParaRPr lang="en-US"/>
           </a:p>
@@ -1646,7 +1646,7 @@
           <a:p>
             <a:fld id="{D735EA19-98D7-5F47-83EC-D97C4239F8D5}" type="datetimeFigureOut">
               <a:rPr lang="en-US" smtClean="0"/>
-              <a:t>5/13/17</a:t>
+              <a:t>15/05/17</a:t>
             </a:fld>
             <a:endParaRPr lang="en-GB"/>
           </a:p>
@@ -1816,7 +1816,7 @@
           <a:p>
             <a:fld id="{D735EA19-98D7-5F47-83EC-D97C4239F8D5}" type="datetimeFigureOut">
               <a:rPr lang="en-US" smtClean="0"/>
-              <a:t>5/13/17</a:t>
+              <a:t>15/05/17</a:t>
             </a:fld>
             <a:endParaRPr lang="en-GB"/>
           </a:p>
@@ -1996,7 +1996,7 @@
           <a:p>
             <a:fld id="{D735EA19-98D7-5F47-83EC-D97C4239F8D5}" type="datetimeFigureOut">
               <a:rPr lang="en-US" smtClean="0"/>
-              <a:t>5/13/17</a:t>
+              <a:t>15/05/17</a:t>
             </a:fld>
             <a:endParaRPr lang="en-GB"/>
           </a:p>
@@ -2166,7 +2166,7 @@
           <a:p>
             <a:fld id="{D735EA19-98D7-5F47-83EC-D97C4239F8D5}" type="datetimeFigureOut">
               <a:rPr lang="en-US" smtClean="0"/>
-              <a:t>5/13/17</a:t>
+              <a:t>15/05/17</a:t>
             </a:fld>
             <a:endParaRPr lang="en-GB"/>
           </a:p>
@@ -2412,7 +2412,7 @@
           <a:p>
             <a:fld id="{D735EA19-98D7-5F47-83EC-D97C4239F8D5}" type="datetimeFigureOut">
               <a:rPr lang="en-US" smtClean="0"/>
-              <a:t>5/13/17</a:t>
+              <a:t>15/05/17</a:t>
             </a:fld>
             <a:endParaRPr lang="en-GB"/>
           </a:p>
@@ -2700,7 +2700,7 @@
           <a:p>
             <a:fld id="{D735EA19-98D7-5F47-83EC-D97C4239F8D5}" type="datetimeFigureOut">
               <a:rPr lang="en-US" smtClean="0"/>
-              <a:t>5/13/17</a:t>
+              <a:t>15/05/17</a:t>
             </a:fld>
             <a:endParaRPr lang="en-GB"/>
           </a:p>
@@ -3122,7 +3122,7 @@
           <a:p>
             <a:fld id="{D735EA19-98D7-5F47-83EC-D97C4239F8D5}" type="datetimeFigureOut">
               <a:rPr lang="en-US" smtClean="0"/>
-              <a:t>5/13/17</a:t>
+              <a:t>15/05/17</a:t>
             </a:fld>
             <a:endParaRPr lang="en-GB"/>
           </a:p>
@@ -3240,7 +3240,7 @@
           <a:p>
             <a:fld id="{D735EA19-98D7-5F47-83EC-D97C4239F8D5}" type="datetimeFigureOut">
               <a:rPr lang="en-US" smtClean="0"/>
-              <a:t>5/13/17</a:t>
+              <a:t>15/05/17</a:t>
             </a:fld>
             <a:endParaRPr lang="en-GB"/>
           </a:p>
@@ -3335,7 +3335,7 @@
           <a:p>
             <a:fld id="{D735EA19-98D7-5F47-83EC-D97C4239F8D5}" type="datetimeFigureOut">
               <a:rPr lang="en-US" smtClean="0"/>
-              <a:t>5/13/17</a:t>
+              <a:t>15/05/17</a:t>
             </a:fld>
             <a:endParaRPr lang="en-GB"/>
           </a:p>
@@ -3612,7 +3612,7 @@
           <a:p>
             <a:fld id="{D735EA19-98D7-5F47-83EC-D97C4239F8D5}" type="datetimeFigureOut">
               <a:rPr lang="en-US" smtClean="0"/>
-              <a:t>5/13/17</a:t>
+              <a:t>15/05/17</a:t>
             </a:fld>
             <a:endParaRPr lang="en-GB"/>
           </a:p>
@@ -3865,7 +3865,7 @@
           <a:p>
             <a:fld id="{D735EA19-98D7-5F47-83EC-D97C4239F8D5}" type="datetimeFigureOut">
               <a:rPr lang="en-US" smtClean="0"/>
-              <a:t>5/13/17</a:t>
+              <a:t>15/05/17</a:t>
             </a:fld>
             <a:endParaRPr lang="en-GB"/>
           </a:p>
@@ -4078,7 +4078,7 @@
           <a:p>
             <a:fld id="{D735EA19-98D7-5F47-83EC-D97C4239F8D5}" type="datetimeFigureOut">
               <a:rPr lang="en-US" smtClean="0"/>
-              <a:t>5/13/17</a:t>
+              <a:t>15/05/17</a:t>
             </a:fld>
             <a:endParaRPr lang="en-GB"/>
           </a:p>
@@ -4527,7 +4527,7 @@
   <p:timing>
     <p:tnLst>
       <p:par>
-        <p:cTn id="1" dur="indefinite" restart="never" nodeType="tmRoot"/>
+        <p:cTn xmlns:p14="http://schemas.microsoft.com/office/powerpoint/2010/main" id="1" dur="indefinite" restart="never" nodeType="tmRoot"/>
       </p:par>
     </p:tnLst>
   </p:timing>
@@ -4745,7 +4745,7 @@
   <p:timing>
     <p:tnLst>
       <p:par>
-        <p:cTn id="1" dur="indefinite" restart="never" nodeType="tmRoot"/>
+        <p:cTn xmlns:p14="http://schemas.microsoft.com/office/powerpoint/2010/main" id="1" dur="indefinite" restart="never" nodeType="tmRoot"/>
       </p:par>
     </p:tnLst>
   </p:timing>
@@ -4909,15 +4909,7 @@
             </a:pPr>
             <a:r>
               <a:rPr lang="en-GB" sz="2400" dirty="0" smtClean="0"/>
-              <a:t>OpenCL 2.2 introduces </a:t>
-            </a:r>
-            <a:r>
-              <a:rPr lang="en-GB" sz="2400" dirty="0" smtClean="0"/>
-              <a:t>a C</a:t>
-            </a:r>
-            <a:r>
-              <a:rPr lang="en-GB" sz="2400" dirty="0" smtClean="0"/>
-              <a:t>++ kernel language using SPIR-V 1.2</a:t>
+              <a:t>OpenCL 2.2 introduces a C++ kernel language using SPIR-V 1.2</a:t>
             </a:r>
           </a:p>
           <a:p>
@@ -5358,7 +5350,7 @@
   <p:timing>
     <p:tnLst>
       <p:par>
-        <p:cTn id="1" dur="indefinite" restart="never" nodeType="tmRoot"/>
+        <p:cTn xmlns:p14="http://schemas.microsoft.com/office/powerpoint/2010/main" id="1" dur="indefinite" restart="never" nodeType="tmRoot"/>
       </p:par>
     </p:tnLst>
   </p:timing>
@@ -5424,25 +5416,13 @@
           <a:p>
             <a:r>
               <a:rPr lang="en-GB" dirty="0" smtClean="0"/>
-              <a:t>A mechanism </a:t>
-            </a:r>
+              <a:t>A mechanism for automatically discovering and using new kernels, without having to write any new host code</a:t>
+            </a:r>
+          </a:p>
+          <a:p>
             <a:r>
               <a:rPr lang="en-GB" dirty="0" smtClean="0"/>
-              <a:t>for automatically discovering and using new kernels, without having to write any new host code</a:t>
-            </a:r>
-          </a:p>
-          <a:p>
-            <a:r>
-              <a:rPr lang="en-GB" dirty="0" smtClean="0"/>
-              <a:t>This c</a:t>
-            </a:r>
-            <a:r>
-              <a:rPr lang="en-GB" dirty="0" smtClean="0"/>
-              <a:t>an </a:t>
-            </a:r>
-            <a:r>
-              <a:rPr lang="en-GB" dirty="0" smtClean="0"/>
-              <a:t>make it much easier to add new kernels to an existing application</a:t>
+              <a:t>This can make it much easier to add new kernels to an existing application</a:t>
             </a:r>
           </a:p>
           <a:p>
@@ -5467,7 +5447,7 @@
   <p:timing>
     <p:tnLst>
       <p:par>
-        <p:cTn id="1" dur="indefinite" restart="never" nodeType="tmRoot"/>
+        <p:cTn xmlns:p14="http://schemas.microsoft.com/office/powerpoint/2010/main" id="1" dur="indefinite" restart="never" nodeType="tmRoot"/>
       </p:par>
     </p:tnLst>
   </p:timing>
@@ -5630,13 +5610,8 @@
           <a:p>
             <a:r>
               <a:rPr lang="en-GB" dirty="0" smtClean="0"/>
-              <a:t>We can also query information about kernel arguments </a:t>
-            </a:r>
-            <a:r>
-              <a:rPr lang="en-GB" dirty="0" smtClean="0"/>
-              <a:t>(from OpenCL 1.2 onwards):</a:t>
-            </a:r>
-            <a:endParaRPr lang="en-GB" dirty="0" smtClean="0"/>
+              <a:t>We can also query information about kernel arguments (from OpenCL 1.2 onwards):</a:t>
+            </a:r>
           </a:p>
           <a:p>
             <a:pPr marL="400050" lvl="1" indent="0">
@@ -5797,7 +5772,7 @@
   <p:timing>
     <p:tnLst>
       <p:par>
-        <p:cTn id="1" dur="indefinite" restart="never" nodeType="tmRoot"/>
+        <p:cTn xmlns:p14="http://schemas.microsoft.com/office/powerpoint/2010/main" id="1" dur="indefinite" restart="never" nodeType="tmRoot"/>
       </p:par>
     </p:tnLst>
   </p:timing>
@@ -5960,7 +5935,7 @@
   <p:timing>
     <p:tnLst>
       <p:par>
-        <p:cTn id="1" dur="indefinite" restart="never" nodeType="tmRoot"/>
+        <p:cTn xmlns:p14="http://schemas.microsoft.com/office/powerpoint/2010/main" id="1" dur="indefinite" restart="never" nodeType="tmRoot"/>
       </p:par>
     </p:tnLst>
   </p:timing>
@@ -6365,7 +6340,7 @@
   <p:timing>
     <p:tnLst>
       <p:par>
-        <p:cTn id="1" dur="indefinite" restart="never" nodeType="tmRoot">
+        <p:cTn xmlns:p14="http://schemas.microsoft.com/office/powerpoint/2010/main" id="1" dur="indefinite" restart="never" nodeType="tmRoot">
           <p:childTnLst>
             <p:seq concurrent="1" nextAc="seek">
               <p:cTn id="2" dur="indefinite" nodeType="mainSeq">
@@ -6745,7 +6720,7 @@
   <p:timing>
     <p:tnLst>
       <p:par>
-        <p:cTn id="1" dur="indefinite" restart="never" nodeType="tmRoot"/>
+        <p:cTn xmlns:p14="http://schemas.microsoft.com/office/powerpoint/2010/main" id="1" dur="indefinite" restart="never" nodeType="tmRoot"/>
       </p:par>
     </p:tnLst>
   </p:timing>
@@ -6923,7 +6898,7 @@
   <p:timing>
     <p:tnLst>
       <p:par>
-        <p:cTn id="1" dur="indefinite" restart="never" nodeType="tmRoot"/>
+        <p:cTn xmlns:p14="http://schemas.microsoft.com/office/powerpoint/2010/main" id="1" dur="indefinite" restart="never" nodeType="tmRoot"/>
       </p:par>
     </p:tnLst>
   </p:timing>
@@ -7123,18 +7098,18 @@
   <p:clrMapOvr>
     <a:masterClrMapping/>
   </p:clrMapOvr>
-  <mc:AlternateContent xmlns:mc="http://schemas.openxmlformats.org/markup-compatibility/2006">
-    <mc:Choice xmlns:p14="http://schemas.microsoft.com/office/powerpoint/2010/main" Requires="p14">
+  <mc:AlternateContent xmlns:mc="http://schemas.openxmlformats.org/markup-compatibility/2006" xmlns:p14="http://schemas.microsoft.com/office/powerpoint/2010/main">
+    <mc:Choice Requires="p14">
       <p:transition spd="slow" p14:dur="2000"/>
     </mc:Choice>
-    <mc:Fallback>
+    <mc:Fallback xmlns="">
       <p:transition spd="slow"/>
     </mc:Fallback>
   </mc:AlternateContent>
   <p:timing>
     <p:tnLst>
       <p:par>
-        <p:cTn id="1" dur="indefinite" restart="never" nodeType="tmRoot"/>
+        <p:cTn xmlns:p14="http://schemas.microsoft.com/office/powerpoint/2010/main" id="1" dur="indefinite" restart="never" nodeType="tmRoot"/>
       </p:par>
     </p:tnLst>
   </p:timing>
@@ -7318,7 +7293,7 @@
   <p:timing>
     <p:tnLst>
       <p:par>
-        <p:cTn id="1" dur="indefinite" restart="never" nodeType="tmRoot"/>
+        <p:cTn xmlns:p14="http://schemas.microsoft.com/office/powerpoint/2010/main" id="1" dur="indefinite" restart="never" nodeType="tmRoot"/>
       </p:par>
     </p:tnLst>
   </p:timing>
@@ -8711,7 +8686,7 @@
   <p:timing>
     <p:tnLst>
       <p:par>
-        <p:cTn id="1" dur="indefinite" restart="never" nodeType="tmRoot">
+        <p:cTn xmlns:p14="http://schemas.microsoft.com/office/powerpoint/2010/main" id="1" dur="indefinite" restart="never" nodeType="tmRoot">
           <p:childTnLst>
             <p:seq concurrent="1" nextAc="seek">
               <p:cTn id="2" dur="indefinite" nodeType="mainSeq">
@@ -9515,7 +9490,7 @@
   <p:timing>
     <p:tnLst>
       <p:par>
-        <p:cTn id="1" dur="indefinite" restart="never" nodeType="tmRoot"/>
+        <p:cTn xmlns:p14="http://schemas.microsoft.com/office/powerpoint/2010/main" id="1" dur="indefinite" restart="never" nodeType="tmRoot"/>
       </p:par>
     </p:tnLst>
   </p:timing>
@@ -10246,7 +10221,7 @@
   <p:timing>
     <p:tnLst>
       <p:par>
-        <p:cTn id="1" dur="indefinite" restart="never" nodeType="tmRoot">
+        <p:cTn xmlns:p14="http://schemas.microsoft.com/office/powerpoint/2010/main" id="1" dur="indefinite" restart="never" nodeType="tmRoot">
           <p:childTnLst>
             <p:seq concurrent="1" nextAc="seek">
               <p:cTn id="2" dur="indefinite" nodeType="mainSeq">
@@ -10708,23 +10683,7 @@
             <a:pPr lvl="1"/>
             <a:r>
               <a:rPr lang="en-GB" dirty="0" smtClean="0"/>
-              <a:t>Each pixel of </a:t>
-            </a:r>
-            <a:r>
-              <a:rPr lang="en-GB" dirty="0" smtClean="0"/>
-              <a:t>the output </a:t>
-            </a:r>
-            <a:r>
-              <a:rPr lang="en-GB" dirty="0" smtClean="0"/>
-              <a:t>image is some function of its neighbouring pixels from </a:t>
-            </a:r>
-            <a:r>
-              <a:rPr lang="en-GB" dirty="0" smtClean="0"/>
-              <a:t>the input </a:t>
-            </a:r>
-            <a:r>
-              <a:rPr lang="en-GB" dirty="0" smtClean="0"/>
-              <a:t>image</a:t>
+              <a:t>Each pixel of the output image is some function of its neighbouring pixels from the input image</a:t>
             </a:r>
           </a:p>
           <a:p>
@@ -10813,7 +10772,7 @@
   <p:timing>
     <p:tnLst>
       <p:par>
-        <p:cTn id="1" dur="indefinite" restart="never" nodeType="tmRoot"/>
+        <p:cTn xmlns:p14="http://schemas.microsoft.com/office/powerpoint/2010/main" id="1" dur="indefinite" restart="never" nodeType="tmRoot"/>
       </p:par>
     </p:tnLst>
   </p:timing>
@@ -10879,8 +10838,8 @@
         </p:nvSpPr>
         <p:spPr>
           <a:xfrm>
-            <a:off x="457200" y="1417638"/>
-            <a:ext cx="8229600" cy="5440362"/>
+            <a:off x="406908" y="1417638"/>
+            <a:ext cx="8482482" cy="5440362"/>
           </a:xfrm>
         </p:spPr>
         <p:txBody>
@@ -10903,7 +10862,14 @@
                 <a:latin typeface="Courier New"/>
                 <a:cs typeface="Courier New"/>
               </a:rPr>
-              <a:t>IWOCL2017/exercises/</a:t>
+              <a:t>IWOCL_2017</a:t>
+            </a:r>
+            <a:r>
+              <a:rPr lang="en-GB" b="1" dirty="0" smtClean="0">
+                <a:latin typeface="Courier New"/>
+                <a:cs typeface="Courier New"/>
+              </a:rPr>
+              <a:t>/exercises/</a:t>
             </a:r>
             <a:r>
               <a:rPr lang="en-GB" b="1" dirty="0">
@@ -11060,7 +11026,7 @@
   <p:timing>
     <p:tnLst>
       <p:par>
-        <p:cTn id="1" dur="indefinite" restart="never" nodeType="tmRoot"/>
+        <p:cTn xmlns:p14="http://schemas.microsoft.com/office/powerpoint/2010/main" id="1" dur="indefinite" restart="never" nodeType="tmRoot"/>
       </p:par>
     </p:tnLst>
   </p:timing>
@@ -12464,18 +12430,18 @@
   <p:clrMapOvr>
     <a:masterClrMapping/>
   </p:clrMapOvr>
-  <mc:AlternateContent xmlns:mc="http://schemas.openxmlformats.org/markup-compatibility/2006">
-    <mc:Choice xmlns:p14="http://schemas.microsoft.com/office/powerpoint/2010/main" Requires="p14">
+  <mc:AlternateContent xmlns:mc="http://schemas.openxmlformats.org/markup-compatibility/2006" xmlns:p14="http://schemas.microsoft.com/office/powerpoint/2010/main">
+    <mc:Choice Requires="p14">
       <p:transition spd="slow" p14:dur="2000"/>
     </mc:Choice>
-    <mc:Fallback>
+    <mc:Fallback xmlns="">
       <p:transition spd="slow"/>
     </mc:Fallback>
   </mc:AlternateContent>
   <p:timing>
     <p:tnLst>
       <p:par>
-        <p:cTn id="1" dur="indefinite" restart="never" nodeType="tmRoot"/>
+        <p:cTn xmlns:p14="http://schemas.microsoft.com/office/powerpoint/2010/main" id="1" dur="indefinite" restart="never" nodeType="tmRoot"/>
       </p:par>
     </p:tnLst>
   </p:timing>
@@ -13030,18 +12996,18 @@
   <p:clrMapOvr>
     <a:masterClrMapping/>
   </p:clrMapOvr>
-  <mc:AlternateContent xmlns:mc="http://schemas.openxmlformats.org/markup-compatibility/2006">
-    <mc:Choice xmlns:p14="http://schemas.microsoft.com/office/powerpoint/2010/main" Requires="p14">
+  <mc:AlternateContent xmlns:mc="http://schemas.openxmlformats.org/markup-compatibility/2006" xmlns:p14="http://schemas.microsoft.com/office/powerpoint/2010/main">
+    <mc:Choice Requires="p14">
       <p:transition spd="slow" p14:dur="2000"/>
     </mc:Choice>
-    <mc:Fallback>
+    <mc:Fallback xmlns="">
       <p:transition spd="slow"/>
     </mc:Fallback>
   </mc:AlternateContent>
   <p:timing>
     <p:tnLst>
       <p:par>
-        <p:cTn id="1" dur="indefinite" restart="never" nodeType="tmRoot"/>
+        <p:cTn xmlns:p14="http://schemas.microsoft.com/office/powerpoint/2010/main" id="1" dur="indefinite" restart="never" nodeType="tmRoot"/>
       </p:par>
     </p:tnLst>
   </p:timing>
@@ -13117,11 +13083,7 @@
             </a:r>
             <a:r>
               <a:rPr lang="en-GB" dirty="0" smtClean="0"/>
-              <a:t> </a:t>
-            </a:r>
-            <a:r>
-              <a:rPr lang="en-GB" dirty="0" smtClean="0"/>
-              <a:t>compilation in order to achieve portability</a:t>
+              <a:t> compilation in order to achieve portability</a:t>
             </a:r>
           </a:p>
           <a:p>
@@ -13140,13 +13102,8 @@
           <a:p>
             <a:r>
               <a:rPr lang="en-GB" dirty="0" smtClean="0"/>
-              <a:t>There are a few ways to try </a:t>
-            </a:r>
-            <a:r>
-              <a:rPr lang="en-GB" dirty="0" smtClean="0"/>
-              <a:t>protect your OpenCL kernels</a:t>
-            </a:r>
-            <a:endParaRPr lang="en-GB" dirty="0" smtClean="0"/>
+              <a:t>There are a few ways to try protect your OpenCL kernels</a:t>
+            </a:r>
           </a:p>
         </p:txBody>
       </p:sp>
@@ -13201,7 +13158,7 @@
   <p:timing>
     <p:tnLst>
       <p:par>
-        <p:cTn id="1" dur="indefinite" restart="never" nodeType="tmRoot"/>
+        <p:cTn xmlns:p14="http://schemas.microsoft.com/office/powerpoint/2010/main" id="1" dur="indefinite" restart="never" nodeType="tmRoot"/>
       </p:par>
     </p:tnLst>
   </p:timing>
@@ -13389,7 +13346,7 @@
   <p:timing>
     <p:tnLst>
       <p:par>
-        <p:cTn id="1" dur="indefinite" restart="never" nodeType="tmRoot"/>
+        <p:cTn xmlns:p14="http://schemas.microsoft.com/office/powerpoint/2010/main" id="1" dur="indefinite" restart="never" nodeType="tmRoot"/>
       </p:par>
     </p:tnLst>
   </p:timing>
@@ -13480,7 +13437,7 @@
   <p:timing>
     <p:tnLst>
       <p:par>
-        <p:cTn id="1" dur="indefinite" restart="never" nodeType="tmRoot"/>
+        <p:cTn xmlns:p14="http://schemas.microsoft.com/office/powerpoint/2010/main" id="1" dur="indefinite" restart="never" nodeType="tmRoot"/>
       </p:par>
     </p:tnLst>
   </p:timing>
@@ -14139,7 +14096,7 @@
   <p:timing>
     <p:tnLst>
       <p:par>
-        <p:cTn id="1" dur="indefinite" restart="never" nodeType="tmRoot">
+        <p:cTn xmlns:p14="http://schemas.microsoft.com/office/powerpoint/2010/main" id="1" dur="indefinite" restart="never" nodeType="tmRoot">
           <p:childTnLst>
             <p:seq concurrent="1" nextAc="seek">
               <p:cTn id="2" dur="indefinite" nodeType="mainSeq">
@@ -14509,7 +14466,7 @@
   <p:timing>
     <p:tnLst>
       <p:par>
-        <p:cTn id="1" dur="indefinite" restart="never" nodeType="tmRoot"/>
+        <p:cTn xmlns:p14="http://schemas.microsoft.com/office/powerpoint/2010/main" id="1" dur="indefinite" restart="never" nodeType="tmRoot"/>
       </p:par>
     </p:tnLst>
   </p:timing>

</xml_diff>

<commit_message>
Minor tweaks post IWOCL 2018
</commit_message>
<xml_diff>
--- a/slides/advanced_part2.pptx
+++ b/slides/advanced_part2.pptx
@@ -233,7 +233,7 @@
           <a:p>
             <a:fld id="{7FB74D45-CC88-7D46-9D48-9989C6A85D58}" type="datetimeFigureOut">
               <a:rPr lang="en-US" smtClean="0"/>
-              <a:t>5/9/18</a:t>
+              <a:t>5/14/18</a:t>
             </a:fld>
             <a:endParaRPr lang="en-US"/>
           </a:p>
@@ -1639,7 +1639,7 @@
           <a:p>
             <a:fld id="{D735EA19-98D7-5F47-83EC-D97C4239F8D5}" type="datetimeFigureOut">
               <a:rPr lang="en-US" smtClean="0"/>
-              <a:t>5/9/18</a:t>
+              <a:t>5/14/18</a:t>
             </a:fld>
             <a:endParaRPr lang="en-GB"/>
           </a:p>
@@ -1807,7 +1807,7 @@
           <a:p>
             <a:fld id="{D735EA19-98D7-5F47-83EC-D97C4239F8D5}" type="datetimeFigureOut">
               <a:rPr lang="en-US" smtClean="0"/>
-              <a:t>5/9/18</a:t>
+              <a:t>5/14/18</a:t>
             </a:fld>
             <a:endParaRPr lang="en-GB"/>
           </a:p>
@@ -1985,7 +1985,7 @@
           <a:p>
             <a:fld id="{D735EA19-98D7-5F47-83EC-D97C4239F8D5}" type="datetimeFigureOut">
               <a:rPr lang="en-US" smtClean="0"/>
-              <a:t>5/9/18</a:t>
+              <a:t>5/14/18</a:t>
             </a:fld>
             <a:endParaRPr lang="en-GB"/>
           </a:p>
@@ -2153,7 +2153,7 @@
           <a:p>
             <a:fld id="{D735EA19-98D7-5F47-83EC-D97C4239F8D5}" type="datetimeFigureOut">
               <a:rPr lang="en-US" smtClean="0"/>
-              <a:t>5/9/18</a:t>
+              <a:t>5/14/18</a:t>
             </a:fld>
             <a:endParaRPr lang="en-GB"/>
           </a:p>
@@ -2398,7 +2398,7 @@
           <a:p>
             <a:fld id="{D735EA19-98D7-5F47-83EC-D97C4239F8D5}" type="datetimeFigureOut">
               <a:rPr lang="en-US" smtClean="0"/>
-              <a:t>5/9/18</a:t>
+              <a:t>5/14/18</a:t>
             </a:fld>
             <a:endParaRPr lang="en-GB"/>
           </a:p>
@@ -2683,7 +2683,7 @@
           <a:p>
             <a:fld id="{D735EA19-98D7-5F47-83EC-D97C4239F8D5}" type="datetimeFigureOut">
               <a:rPr lang="en-US" smtClean="0"/>
-              <a:t>5/9/18</a:t>
+              <a:t>5/14/18</a:t>
             </a:fld>
             <a:endParaRPr lang="en-GB"/>
           </a:p>
@@ -3102,7 +3102,7 @@
           <a:p>
             <a:fld id="{D735EA19-98D7-5F47-83EC-D97C4239F8D5}" type="datetimeFigureOut">
               <a:rPr lang="en-US" smtClean="0"/>
-              <a:t>5/9/18</a:t>
+              <a:t>5/14/18</a:t>
             </a:fld>
             <a:endParaRPr lang="en-GB"/>
           </a:p>
@@ -3219,7 +3219,7 @@
           <a:p>
             <a:fld id="{D735EA19-98D7-5F47-83EC-D97C4239F8D5}" type="datetimeFigureOut">
               <a:rPr lang="en-US" smtClean="0"/>
-              <a:t>5/9/18</a:t>
+              <a:t>5/14/18</a:t>
             </a:fld>
             <a:endParaRPr lang="en-GB"/>
           </a:p>
@@ -3314,7 +3314,7 @@
           <a:p>
             <a:fld id="{D735EA19-98D7-5F47-83EC-D97C4239F8D5}" type="datetimeFigureOut">
               <a:rPr lang="en-US" smtClean="0"/>
-              <a:t>5/9/18</a:t>
+              <a:t>5/14/18</a:t>
             </a:fld>
             <a:endParaRPr lang="en-GB"/>
           </a:p>
@@ -3589,7 +3589,7 @@
           <a:p>
             <a:fld id="{D735EA19-98D7-5F47-83EC-D97C4239F8D5}" type="datetimeFigureOut">
               <a:rPr lang="en-US" smtClean="0"/>
-              <a:t>5/9/18</a:t>
+              <a:t>5/14/18</a:t>
             </a:fld>
             <a:endParaRPr lang="en-GB"/>
           </a:p>
@@ -3841,7 +3841,7 @@
           <a:p>
             <a:fld id="{D735EA19-98D7-5F47-83EC-D97C4239F8D5}" type="datetimeFigureOut">
               <a:rPr lang="en-US" smtClean="0"/>
-              <a:t>5/9/18</a:t>
+              <a:t>5/14/18</a:t>
             </a:fld>
             <a:endParaRPr lang="en-GB"/>
           </a:p>
@@ -4052,7 +4052,7 @@
           <a:p>
             <a:fld id="{D735EA19-98D7-5F47-83EC-D97C4239F8D5}" type="datetimeFigureOut">
               <a:rPr lang="en-US" smtClean="0"/>
-              <a:t>5/9/18</a:t>
+              <a:t>5/14/18</a:t>
             </a:fld>
             <a:endParaRPr lang="en-GB"/>
           </a:p>
@@ -6937,7 +6937,7 @@
           <a:p>
             <a:r>
               <a:rPr lang="en-GB" dirty="0"/>
-              <a:t>We can exploit runtime compilation to embed values that are only known at runtime into kernels as compile-time constants</a:t>
+              <a:t>We can exploit runtime kernel compilation to embed values that are only known at runtime into kernels as compile-time constants</a:t>
             </a:r>
           </a:p>
           <a:p>
@@ -8185,7 +8185,7 @@
         </p:nvSpPr>
         <p:spPr>
           <a:xfrm>
-            <a:off x="3496695" y="1883737"/>
+            <a:off x="3496695" y="2112337"/>
             <a:ext cx="3096344" cy="923330"/>
           </a:xfrm>
           <a:prstGeom prst="rect">
@@ -8254,14 +8254,15 @@
         <p:nvCxnSpPr>
           <p:cNvPr id="11" name="Straight Connector 10"/>
           <p:cNvCxnSpPr>
+            <a:cxnSpLocks/>
             <a:endCxn id="7" idx="1"/>
           </p:cNvCxnSpPr>
           <p:nvPr/>
         </p:nvCxnSpPr>
         <p:spPr>
           <a:xfrm flipV="1">
-            <a:off x="2920631" y="2345402"/>
-            <a:ext cx="576064" cy="474439"/>
+            <a:off x="2920631" y="2574002"/>
+            <a:ext cx="576064" cy="245839"/>
           </a:xfrm>
           <a:prstGeom prst="line">
             <a:avLst/>
@@ -9387,7 +9388,7 @@
                 <a:latin typeface="Courier New"/>
                 <a:cs typeface="Courier New"/>
               </a:rPr>
-              <a:t>// Create specialization constant with ID 1 and default value of 3.f</a:t>
+              <a:t>// Create specialization constant with ID 1 and default value of 3.0f</a:t>
             </a:r>
           </a:p>
           <a:p>
@@ -9457,7 +9458,7 @@
                 <a:latin typeface="Courier New"/>
                 <a:cs typeface="Courier New"/>
               </a:rPr>
-              <a:t>3.f</a:t>
+              <a:t>3.0f</a:t>
             </a:r>
             <a:r>
               <a:rPr lang="en-GB" b="1" dirty="0">

</xml_diff>